<commit_message>
Add Favourite class in the ModelClassDiagram
</commit_message>
<xml_diff>
--- a/docs/diagrams/ModelComponentClassDiagram.pptx
+++ b/docs/diagrams/ModelComponentClassDiagram.pptx
@@ -208,7 +208,7 @@
           <a:p>
             <a:fld id="{F5CC4B3F-88C1-4FFA-B1B6-F41C21DC6924}" type="datetimeFigureOut">
               <a:rPr lang="en-US" smtClean="0"/>
-              <a:t>1/1/18</a:t>
+              <a:t>3/11/2018</a:t>
             </a:fld>
             <a:endParaRPr lang="en-US"/>
           </a:p>
@@ -272,38 +272,37 @@
           <a:p>
             <a:pPr lvl="0"/>
             <a:r>
-              <a:rPr lang="en-US" smtClean="0"/>
+              <a:rPr lang="en-US"/>
               <a:t>Click to edit Master text styles</a:t>
             </a:r>
           </a:p>
           <a:p>
             <a:pPr lvl="1"/>
             <a:r>
-              <a:rPr lang="en-US" smtClean="0"/>
+              <a:rPr lang="en-US"/>
               <a:t>Second level</a:t>
             </a:r>
           </a:p>
           <a:p>
             <a:pPr lvl="2"/>
             <a:r>
-              <a:rPr lang="en-US" smtClean="0"/>
+              <a:rPr lang="en-US"/>
               <a:t>Third level</a:t>
             </a:r>
           </a:p>
           <a:p>
             <a:pPr lvl="3"/>
             <a:r>
-              <a:rPr lang="en-US" smtClean="0"/>
+              <a:rPr lang="en-US"/>
               <a:t>Fourth level</a:t>
             </a:r>
           </a:p>
           <a:p>
             <a:pPr lvl="4"/>
             <a:r>
-              <a:rPr lang="en-US" smtClean="0"/>
+              <a:rPr lang="en-US"/>
               <a:t>Fifth level</a:t>
             </a:r>
-            <a:endParaRPr lang="en-US"/>
           </a:p>
         </p:txBody>
       </p:sp>
@@ -514,10 +513,9 @@
           <a:lstStyle/>
           <a:p>
             <a:r>
-              <a:rPr lang="en-US" smtClean="0"/>
+              <a:rPr lang="en-US"/>
               <a:t>Click to edit Master title style</a:t>
             </a:r>
-            <a:endParaRPr lang="en-US"/>
           </a:p>
         </p:txBody>
       </p:sp>
@@ -633,10 +631,9 @@
           </a:lstStyle>
           <a:p>
             <a:r>
-              <a:rPr lang="en-US" smtClean="0"/>
+              <a:rPr lang="en-US"/>
               <a:t>Click to edit Master subtitle style</a:t>
             </a:r>
-            <a:endParaRPr lang="en-US"/>
           </a:p>
         </p:txBody>
       </p:sp>
@@ -657,7 +654,7 @@
           <a:p>
             <a:fld id="{78C97017-6FC3-485B-9764-EAC9E56C1D49}" type="datetimeFigureOut">
               <a:rPr lang="en-US" smtClean="0"/>
-              <a:t>1/1/18</a:t>
+              <a:t>3/11/2018</a:t>
             </a:fld>
             <a:endParaRPr lang="en-US"/>
           </a:p>
@@ -751,10 +748,9 @@
           <a:lstStyle/>
           <a:p>
             <a:r>
-              <a:rPr lang="en-US" smtClean="0"/>
+              <a:rPr lang="en-US"/>
               <a:t>Click to edit Master title style</a:t>
             </a:r>
-            <a:endParaRPr lang="en-US"/>
           </a:p>
         </p:txBody>
       </p:sp>
@@ -775,38 +771,37 @@
           <a:p>
             <a:pPr lvl="0"/>
             <a:r>
-              <a:rPr lang="en-US" smtClean="0"/>
+              <a:rPr lang="en-US"/>
               <a:t>Click to edit Master text styles</a:t>
             </a:r>
           </a:p>
           <a:p>
             <a:pPr lvl="1"/>
             <a:r>
-              <a:rPr lang="en-US" smtClean="0"/>
+              <a:rPr lang="en-US"/>
               <a:t>Second level</a:t>
             </a:r>
           </a:p>
           <a:p>
             <a:pPr lvl="2"/>
             <a:r>
-              <a:rPr lang="en-US" smtClean="0"/>
+              <a:rPr lang="en-US"/>
               <a:t>Third level</a:t>
             </a:r>
           </a:p>
           <a:p>
             <a:pPr lvl="3"/>
             <a:r>
-              <a:rPr lang="en-US" smtClean="0"/>
+              <a:rPr lang="en-US"/>
               <a:t>Fourth level</a:t>
             </a:r>
           </a:p>
           <a:p>
             <a:pPr lvl="4"/>
             <a:r>
-              <a:rPr lang="en-US" smtClean="0"/>
+              <a:rPr lang="en-US"/>
               <a:t>Fifth level</a:t>
             </a:r>
-            <a:endParaRPr lang="en-US"/>
           </a:p>
         </p:txBody>
       </p:sp>
@@ -827,7 +822,7 @@
           <a:p>
             <a:fld id="{78C97017-6FC3-485B-9764-EAC9E56C1D49}" type="datetimeFigureOut">
               <a:rPr lang="en-US" smtClean="0"/>
-              <a:t>1/1/18</a:t>
+              <a:t>3/11/2018</a:t>
             </a:fld>
             <a:endParaRPr lang="en-US"/>
           </a:p>
@@ -926,10 +921,9 @@
           <a:lstStyle/>
           <a:p>
             <a:r>
-              <a:rPr lang="en-US" smtClean="0"/>
+              <a:rPr lang="en-US"/>
               <a:t>Click to edit Master title style</a:t>
             </a:r>
-            <a:endParaRPr lang="en-US"/>
           </a:p>
         </p:txBody>
       </p:sp>
@@ -955,38 +949,37 @@
           <a:p>
             <a:pPr lvl="0"/>
             <a:r>
-              <a:rPr lang="en-US" smtClean="0"/>
+              <a:rPr lang="en-US"/>
               <a:t>Click to edit Master text styles</a:t>
             </a:r>
           </a:p>
           <a:p>
             <a:pPr lvl="1"/>
             <a:r>
-              <a:rPr lang="en-US" smtClean="0"/>
+              <a:rPr lang="en-US"/>
               <a:t>Second level</a:t>
             </a:r>
           </a:p>
           <a:p>
             <a:pPr lvl="2"/>
             <a:r>
-              <a:rPr lang="en-US" smtClean="0"/>
+              <a:rPr lang="en-US"/>
               <a:t>Third level</a:t>
             </a:r>
           </a:p>
           <a:p>
             <a:pPr lvl="3"/>
             <a:r>
-              <a:rPr lang="en-US" smtClean="0"/>
+              <a:rPr lang="en-US"/>
               <a:t>Fourth level</a:t>
             </a:r>
           </a:p>
           <a:p>
             <a:pPr lvl="4"/>
             <a:r>
-              <a:rPr lang="en-US" smtClean="0"/>
+              <a:rPr lang="en-US"/>
               <a:t>Fifth level</a:t>
             </a:r>
-            <a:endParaRPr lang="en-US"/>
           </a:p>
         </p:txBody>
       </p:sp>
@@ -1007,7 +1000,7 @@
           <a:p>
             <a:fld id="{78C97017-6FC3-485B-9764-EAC9E56C1D49}" type="datetimeFigureOut">
               <a:rPr lang="en-US" smtClean="0"/>
-              <a:t>1/1/18</a:t>
+              <a:t>3/11/2018</a:t>
             </a:fld>
             <a:endParaRPr lang="en-US"/>
           </a:p>
@@ -1101,10 +1094,9 @@
           <a:lstStyle/>
           <a:p>
             <a:r>
-              <a:rPr lang="en-US" smtClean="0"/>
+              <a:rPr lang="en-US"/>
               <a:t>Click to edit Master title style</a:t>
             </a:r>
-            <a:endParaRPr lang="en-US"/>
           </a:p>
         </p:txBody>
       </p:sp>
@@ -1125,38 +1117,37 @@
           <a:p>
             <a:pPr lvl="0"/>
             <a:r>
-              <a:rPr lang="en-US" smtClean="0"/>
+              <a:rPr lang="en-US"/>
               <a:t>Click to edit Master text styles</a:t>
             </a:r>
           </a:p>
           <a:p>
             <a:pPr lvl="1"/>
             <a:r>
-              <a:rPr lang="en-US" smtClean="0"/>
+              <a:rPr lang="en-US"/>
               <a:t>Second level</a:t>
             </a:r>
           </a:p>
           <a:p>
             <a:pPr lvl="2"/>
             <a:r>
-              <a:rPr lang="en-US" smtClean="0"/>
+              <a:rPr lang="en-US"/>
               <a:t>Third level</a:t>
             </a:r>
           </a:p>
           <a:p>
             <a:pPr lvl="3"/>
             <a:r>
-              <a:rPr lang="en-US" smtClean="0"/>
+              <a:rPr lang="en-US"/>
               <a:t>Fourth level</a:t>
             </a:r>
           </a:p>
           <a:p>
             <a:pPr lvl="4"/>
             <a:r>
-              <a:rPr lang="en-US" smtClean="0"/>
+              <a:rPr lang="en-US"/>
               <a:t>Fifth level</a:t>
             </a:r>
-            <a:endParaRPr lang="en-US"/>
           </a:p>
         </p:txBody>
       </p:sp>
@@ -1177,7 +1168,7 @@
           <a:p>
             <a:fld id="{78C97017-6FC3-485B-9764-EAC9E56C1D49}" type="datetimeFigureOut">
               <a:rPr lang="en-US" smtClean="0"/>
-              <a:t>1/1/18</a:t>
+              <a:t>3/11/2018</a:t>
             </a:fld>
             <a:endParaRPr lang="en-US"/>
           </a:p>
@@ -1280,10 +1271,9 @@
           </a:lstStyle>
           <a:p>
             <a:r>
-              <a:rPr lang="en-US" smtClean="0"/>
+              <a:rPr lang="en-US"/>
               <a:t>Click to edit Master title style</a:t>
             </a:r>
-            <a:endParaRPr lang="en-US"/>
           </a:p>
         </p:txBody>
       </p:sp>
@@ -1400,7 +1390,7 @@
           <a:p>
             <a:pPr lvl="0"/>
             <a:r>
-              <a:rPr lang="en-US" smtClean="0"/>
+              <a:rPr lang="en-US"/>
               <a:t>Click to edit Master text styles</a:t>
             </a:r>
           </a:p>
@@ -1423,7 +1413,7 @@
           <a:p>
             <a:fld id="{78C97017-6FC3-485B-9764-EAC9E56C1D49}" type="datetimeFigureOut">
               <a:rPr lang="en-US" smtClean="0"/>
-              <a:t>1/1/18</a:t>
+              <a:t>3/11/2018</a:t>
             </a:fld>
             <a:endParaRPr lang="en-US"/>
           </a:p>
@@ -1517,10 +1507,9 @@
           <a:lstStyle/>
           <a:p>
             <a:r>
-              <a:rPr lang="en-US" smtClean="0"/>
+              <a:rPr lang="en-US"/>
               <a:t>Click to edit Master title style</a:t>
             </a:r>
-            <a:endParaRPr lang="en-US"/>
           </a:p>
         </p:txBody>
       </p:sp>
@@ -1574,38 +1563,37 @@
           <a:p>
             <a:pPr lvl="0"/>
             <a:r>
-              <a:rPr lang="en-US" smtClean="0"/>
+              <a:rPr lang="en-US"/>
               <a:t>Click to edit Master text styles</a:t>
             </a:r>
           </a:p>
           <a:p>
             <a:pPr lvl="1"/>
             <a:r>
-              <a:rPr lang="en-US" smtClean="0"/>
+              <a:rPr lang="en-US"/>
               <a:t>Second level</a:t>
             </a:r>
           </a:p>
           <a:p>
             <a:pPr lvl="2"/>
             <a:r>
-              <a:rPr lang="en-US" smtClean="0"/>
+              <a:rPr lang="en-US"/>
               <a:t>Third level</a:t>
             </a:r>
           </a:p>
           <a:p>
             <a:pPr lvl="3"/>
             <a:r>
-              <a:rPr lang="en-US" smtClean="0"/>
+              <a:rPr lang="en-US"/>
               <a:t>Fourth level</a:t>
             </a:r>
           </a:p>
           <a:p>
             <a:pPr lvl="4"/>
             <a:r>
-              <a:rPr lang="en-US" smtClean="0"/>
+              <a:rPr lang="en-US"/>
               <a:t>Fifth level</a:t>
             </a:r>
-            <a:endParaRPr lang="en-US"/>
           </a:p>
         </p:txBody>
       </p:sp>
@@ -1659,38 +1647,37 @@
           <a:p>
             <a:pPr lvl="0"/>
             <a:r>
-              <a:rPr lang="en-US" smtClean="0"/>
+              <a:rPr lang="en-US"/>
               <a:t>Click to edit Master text styles</a:t>
             </a:r>
           </a:p>
           <a:p>
             <a:pPr lvl="1"/>
             <a:r>
-              <a:rPr lang="en-US" smtClean="0"/>
+              <a:rPr lang="en-US"/>
               <a:t>Second level</a:t>
             </a:r>
           </a:p>
           <a:p>
             <a:pPr lvl="2"/>
             <a:r>
-              <a:rPr lang="en-US" smtClean="0"/>
+              <a:rPr lang="en-US"/>
               <a:t>Third level</a:t>
             </a:r>
           </a:p>
           <a:p>
             <a:pPr lvl="3"/>
             <a:r>
-              <a:rPr lang="en-US" smtClean="0"/>
+              <a:rPr lang="en-US"/>
               <a:t>Fourth level</a:t>
             </a:r>
           </a:p>
           <a:p>
             <a:pPr lvl="4"/>
             <a:r>
-              <a:rPr lang="en-US" smtClean="0"/>
+              <a:rPr lang="en-US"/>
               <a:t>Fifth level</a:t>
             </a:r>
-            <a:endParaRPr lang="en-US"/>
           </a:p>
         </p:txBody>
       </p:sp>
@@ -1711,7 +1698,7 @@
           <a:p>
             <a:fld id="{78C97017-6FC3-485B-9764-EAC9E56C1D49}" type="datetimeFigureOut">
               <a:rPr lang="en-US" smtClean="0"/>
-              <a:t>1/1/18</a:t>
+              <a:t>3/11/2018</a:t>
             </a:fld>
             <a:endParaRPr lang="en-US"/>
           </a:p>
@@ -1809,10 +1796,9 @@
           </a:lstStyle>
           <a:p>
             <a:r>
-              <a:rPr lang="en-US" smtClean="0"/>
+              <a:rPr lang="en-US"/>
               <a:t>Click to edit Master title style</a:t>
             </a:r>
-            <a:endParaRPr lang="en-US"/>
           </a:p>
         </p:txBody>
       </p:sp>
@@ -1875,7 +1861,7 @@
           <a:p>
             <a:pPr lvl="0"/>
             <a:r>
-              <a:rPr lang="en-US" smtClean="0"/>
+              <a:rPr lang="en-US"/>
               <a:t>Click to edit Master text styles</a:t>
             </a:r>
           </a:p>
@@ -1931,38 +1917,37 @@
           <a:p>
             <a:pPr lvl="0"/>
             <a:r>
-              <a:rPr lang="en-US" smtClean="0"/>
+              <a:rPr lang="en-US"/>
               <a:t>Click to edit Master text styles</a:t>
             </a:r>
           </a:p>
           <a:p>
             <a:pPr lvl="1"/>
             <a:r>
-              <a:rPr lang="en-US" smtClean="0"/>
+              <a:rPr lang="en-US"/>
               <a:t>Second level</a:t>
             </a:r>
           </a:p>
           <a:p>
             <a:pPr lvl="2"/>
             <a:r>
-              <a:rPr lang="en-US" smtClean="0"/>
+              <a:rPr lang="en-US"/>
               <a:t>Third level</a:t>
             </a:r>
           </a:p>
           <a:p>
             <a:pPr lvl="3"/>
             <a:r>
-              <a:rPr lang="en-US" smtClean="0"/>
+              <a:rPr lang="en-US"/>
               <a:t>Fourth level</a:t>
             </a:r>
           </a:p>
           <a:p>
             <a:pPr lvl="4"/>
             <a:r>
-              <a:rPr lang="en-US" smtClean="0"/>
+              <a:rPr lang="en-US"/>
               <a:t>Fifth level</a:t>
             </a:r>
-            <a:endParaRPr lang="en-US"/>
           </a:p>
         </p:txBody>
       </p:sp>
@@ -2025,7 +2010,7 @@
           <a:p>
             <a:pPr lvl="0"/>
             <a:r>
-              <a:rPr lang="en-US" smtClean="0"/>
+              <a:rPr lang="en-US"/>
               <a:t>Click to edit Master text styles</a:t>
             </a:r>
           </a:p>
@@ -2081,38 +2066,37 @@
           <a:p>
             <a:pPr lvl="0"/>
             <a:r>
-              <a:rPr lang="en-US" smtClean="0"/>
+              <a:rPr lang="en-US"/>
               <a:t>Click to edit Master text styles</a:t>
             </a:r>
           </a:p>
           <a:p>
             <a:pPr lvl="1"/>
             <a:r>
-              <a:rPr lang="en-US" smtClean="0"/>
+              <a:rPr lang="en-US"/>
               <a:t>Second level</a:t>
             </a:r>
           </a:p>
           <a:p>
             <a:pPr lvl="2"/>
             <a:r>
-              <a:rPr lang="en-US" smtClean="0"/>
+              <a:rPr lang="en-US"/>
               <a:t>Third level</a:t>
             </a:r>
           </a:p>
           <a:p>
             <a:pPr lvl="3"/>
             <a:r>
-              <a:rPr lang="en-US" smtClean="0"/>
+              <a:rPr lang="en-US"/>
               <a:t>Fourth level</a:t>
             </a:r>
           </a:p>
           <a:p>
             <a:pPr lvl="4"/>
             <a:r>
-              <a:rPr lang="en-US" smtClean="0"/>
+              <a:rPr lang="en-US"/>
               <a:t>Fifth level</a:t>
             </a:r>
-            <a:endParaRPr lang="en-US"/>
           </a:p>
         </p:txBody>
       </p:sp>
@@ -2133,7 +2117,7 @@
           <a:p>
             <a:fld id="{78C97017-6FC3-485B-9764-EAC9E56C1D49}" type="datetimeFigureOut">
               <a:rPr lang="en-US" smtClean="0"/>
-              <a:t>1/1/18</a:t>
+              <a:t>3/11/2018</a:t>
             </a:fld>
             <a:endParaRPr lang="en-US"/>
           </a:p>
@@ -2227,10 +2211,9 @@
           <a:lstStyle/>
           <a:p>
             <a:r>
-              <a:rPr lang="en-US" smtClean="0"/>
+              <a:rPr lang="en-US"/>
               <a:t>Click to edit Master title style</a:t>
             </a:r>
-            <a:endParaRPr lang="en-US"/>
           </a:p>
         </p:txBody>
       </p:sp>
@@ -2251,7 +2234,7 @@
           <a:p>
             <a:fld id="{78C97017-6FC3-485B-9764-EAC9E56C1D49}" type="datetimeFigureOut">
               <a:rPr lang="en-US" smtClean="0"/>
-              <a:t>1/1/18</a:t>
+              <a:t>3/11/2018</a:t>
             </a:fld>
             <a:endParaRPr lang="en-US"/>
           </a:p>
@@ -2346,7 +2329,7 @@
           <a:p>
             <a:fld id="{78C97017-6FC3-485B-9764-EAC9E56C1D49}" type="datetimeFigureOut">
               <a:rPr lang="en-US" smtClean="0"/>
-              <a:t>1/1/18</a:t>
+              <a:t>3/11/2018</a:t>
             </a:fld>
             <a:endParaRPr lang="en-US"/>
           </a:p>
@@ -2449,10 +2432,9 @@
           </a:lstStyle>
           <a:p>
             <a:r>
-              <a:rPr lang="en-US" smtClean="0"/>
+              <a:rPr lang="en-US"/>
               <a:t>Click to edit Master title style</a:t>
             </a:r>
-            <a:endParaRPr lang="en-US"/>
           </a:p>
         </p:txBody>
       </p:sp>
@@ -2506,38 +2488,37 @@
           <a:p>
             <a:pPr lvl="0"/>
             <a:r>
-              <a:rPr lang="en-US" smtClean="0"/>
+              <a:rPr lang="en-US"/>
               <a:t>Click to edit Master text styles</a:t>
             </a:r>
           </a:p>
           <a:p>
             <a:pPr lvl="1"/>
             <a:r>
-              <a:rPr lang="en-US" smtClean="0"/>
+              <a:rPr lang="en-US"/>
               <a:t>Second level</a:t>
             </a:r>
           </a:p>
           <a:p>
             <a:pPr lvl="2"/>
             <a:r>
-              <a:rPr lang="en-US" smtClean="0"/>
+              <a:rPr lang="en-US"/>
               <a:t>Third level</a:t>
             </a:r>
           </a:p>
           <a:p>
             <a:pPr lvl="3"/>
             <a:r>
-              <a:rPr lang="en-US" smtClean="0"/>
+              <a:rPr lang="en-US"/>
               <a:t>Fourth level</a:t>
             </a:r>
           </a:p>
           <a:p>
             <a:pPr lvl="4"/>
             <a:r>
-              <a:rPr lang="en-US" smtClean="0"/>
+              <a:rPr lang="en-US"/>
               <a:t>Fifth level</a:t>
             </a:r>
-            <a:endParaRPr lang="en-US"/>
           </a:p>
         </p:txBody>
       </p:sp>
@@ -2600,7 +2581,7 @@
           <a:p>
             <a:pPr lvl="0"/>
             <a:r>
-              <a:rPr lang="en-US" smtClean="0"/>
+              <a:rPr lang="en-US"/>
               <a:t>Click to edit Master text styles</a:t>
             </a:r>
           </a:p>
@@ -2623,7 +2604,7 @@
           <a:p>
             <a:fld id="{78C97017-6FC3-485B-9764-EAC9E56C1D49}" type="datetimeFigureOut">
               <a:rPr lang="en-US" smtClean="0"/>
-              <a:t>1/1/18</a:t>
+              <a:t>3/11/2018</a:t>
             </a:fld>
             <a:endParaRPr lang="en-US"/>
           </a:p>
@@ -2726,10 +2707,9 @@
           </a:lstStyle>
           <a:p>
             <a:r>
-              <a:rPr lang="en-US" smtClean="0"/>
+              <a:rPr lang="en-US"/>
               <a:t>Click to edit Master title style</a:t>
             </a:r>
-            <a:endParaRPr lang="en-US"/>
           </a:p>
         </p:txBody>
       </p:sp>
@@ -2853,7 +2833,7 @@
           <a:p>
             <a:pPr lvl="0"/>
             <a:r>
-              <a:rPr lang="en-US" smtClean="0"/>
+              <a:rPr lang="en-US"/>
               <a:t>Click to edit Master text styles</a:t>
             </a:r>
           </a:p>
@@ -2876,7 +2856,7 @@
           <a:p>
             <a:fld id="{78C97017-6FC3-485B-9764-EAC9E56C1D49}" type="datetimeFigureOut">
               <a:rPr lang="en-US" smtClean="0"/>
-              <a:t>1/1/18</a:t>
+              <a:t>3/11/2018</a:t>
             </a:fld>
             <a:endParaRPr lang="en-US"/>
           </a:p>
@@ -2985,10 +2965,9 @@
           <a:lstStyle/>
           <a:p>
             <a:r>
-              <a:rPr lang="en-US" smtClean="0"/>
+              <a:rPr lang="en-US"/>
               <a:t>Click to edit Master title style</a:t>
             </a:r>
-            <a:endParaRPr lang="en-US"/>
           </a:p>
         </p:txBody>
       </p:sp>
@@ -3019,38 +2998,37 @@
           <a:p>
             <a:pPr lvl="0"/>
             <a:r>
-              <a:rPr lang="en-US" smtClean="0"/>
+              <a:rPr lang="en-US"/>
               <a:t>Click to edit Master text styles</a:t>
             </a:r>
           </a:p>
           <a:p>
             <a:pPr lvl="1"/>
             <a:r>
-              <a:rPr lang="en-US" smtClean="0"/>
+              <a:rPr lang="en-US"/>
               <a:t>Second level</a:t>
             </a:r>
           </a:p>
           <a:p>
             <a:pPr lvl="2"/>
             <a:r>
-              <a:rPr lang="en-US" smtClean="0"/>
+              <a:rPr lang="en-US"/>
               <a:t>Third level</a:t>
             </a:r>
           </a:p>
           <a:p>
             <a:pPr lvl="3"/>
             <a:r>
-              <a:rPr lang="en-US" smtClean="0"/>
+              <a:rPr lang="en-US"/>
               <a:t>Fourth level</a:t>
             </a:r>
           </a:p>
           <a:p>
             <a:pPr lvl="4"/>
             <a:r>
-              <a:rPr lang="en-US" smtClean="0"/>
+              <a:rPr lang="en-US"/>
               <a:t>Fifth level</a:t>
             </a:r>
-            <a:endParaRPr lang="en-US"/>
           </a:p>
         </p:txBody>
       </p:sp>
@@ -3089,7 +3067,7 @@
           <a:p>
             <a:fld id="{78C97017-6FC3-485B-9764-EAC9E56C1D49}" type="datetimeFigureOut">
               <a:rPr lang="en-US" smtClean="0"/>
-              <a:t>1/1/18</a:t>
+              <a:t>3/11/2018</a:t>
             </a:fld>
             <a:endParaRPr lang="en-US"/>
           </a:p>
@@ -3510,7 +3488,7 @@
           <a:lstStyle/>
           <a:p>
             <a:r>
-              <a:rPr lang="en-US" sz="1200" b="1" dirty="0" smtClean="0">
+              <a:rPr lang="en-US" sz="1200" b="1" dirty="0">
                 <a:solidFill>
                   <a:srgbClr val="7030A0"/>
                 </a:solidFill>
@@ -3569,7 +3547,7 @@
           <a:p>
             <a:pPr algn="ctr"/>
             <a:r>
-              <a:rPr lang="en-US" sz="1050" dirty="0" err="1" smtClean="0">
+              <a:rPr lang="en-US" sz="1050" dirty="0" err="1">
                 <a:solidFill>
                   <a:schemeClr val="bg1"/>
                 </a:solidFill>
@@ -3628,7 +3606,7 @@
           <a:p>
             <a:pPr algn="ctr"/>
             <a:r>
-              <a:rPr lang="en-US" sz="1050" dirty="0" err="1" smtClean="0">
+              <a:rPr lang="en-US" sz="1050" dirty="0" err="1">
                 <a:solidFill>
                   <a:schemeClr val="bg1"/>
                 </a:solidFill>
@@ -3742,7 +3720,7 @@
           <a:p>
             <a:pPr algn="ctr"/>
             <a:r>
-              <a:rPr lang="en-US" sz="1050" dirty="0" smtClean="0">
+              <a:rPr lang="en-US" sz="1050" dirty="0">
                 <a:solidFill>
                   <a:schemeClr val="bg1"/>
                 </a:solidFill>
@@ -4015,7 +3993,7 @@
           <a:p>
             <a:pPr algn="ctr"/>
             <a:r>
-              <a:rPr lang="en-US" sz="1050" dirty="0" err="1" smtClean="0">
+              <a:rPr lang="en-US" sz="1050" dirty="0" err="1">
                 <a:solidFill>
                   <a:srgbClr val="7030A0"/>
                 </a:solidFill>
@@ -4157,7 +4135,7 @@
           <a:p>
             <a:pPr algn="ctr"/>
             <a:r>
-              <a:rPr lang="en-US" sz="1050" dirty="0" err="1" smtClean="0">
+              <a:rPr lang="en-US" sz="1050" dirty="0" err="1">
                 <a:solidFill>
                   <a:srgbClr val="7030A0"/>
                 </a:solidFill>
@@ -4301,7 +4279,7 @@
           <a:p>
             <a:pPr algn="ctr"/>
             <a:r>
-              <a:rPr lang="en-US" sz="1050" dirty="0" err="1" smtClean="0">
+              <a:rPr lang="en-US" sz="1050" dirty="0" err="1">
                 <a:solidFill>
                   <a:srgbClr val="7030A0"/>
                 </a:solidFill>
@@ -4400,7 +4378,7 @@
           <a:p>
             <a:pPr algn="ctr"/>
             <a:r>
-              <a:rPr lang="en-US" sz="1050" dirty="0" smtClean="0">
+              <a:rPr lang="en-US" sz="1050" dirty="0">
                 <a:solidFill>
                   <a:srgbClr val="7030A0"/>
                 </a:solidFill>
@@ -4542,7 +4520,7 @@
           <a:p>
             <a:pPr algn="ctr"/>
             <a:r>
-              <a:rPr lang="en-US" sz="1050" dirty="0" smtClean="0">
+              <a:rPr lang="en-US" sz="1050" dirty="0">
                 <a:solidFill>
                   <a:srgbClr val="7030A0"/>
                 </a:solidFill>
@@ -4684,7 +4662,7 @@
           <a:p>
             <a:pPr algn="ctr"/>
             <a:r>
-              <a:rPr lang="en-US" sz="1050" dirty="0" smtClean="0">
+              <a:rPr lang="en-US" sz="1050" dirty="0">
                 <a:solidFill>
                   <a:srgbClr val="7030A0"/>
                 </a:solidFill>
@@ -4828,7 +4806,7 @@
           <a:p>
             <a:pPr algn="ctr"/>
             <a:r>
-              <a:rPr lang="en-US" sz="1050" dirty="0" smtClean="0">
+              <a:rPr lang="en-US" sz="1050" dirty="0">
                 <a:solidFill>
                   <a:srgbClr val="7030A0"/>
                 </a:solidFill>
@@ -4925,7 +4903,7 @@
           <a:p>
             <a:pPr algn="ctr"/>
             <a:r>
-              <a:rPr lang="en-US" sz="1050" dirty="0" smtClean="0">
+              <a:rPr lang="en-US" sz="1050" dirty="0">
                 <a:solidFill>
                   <a:srgbClr val="7030A0"/>
                 </a:solidFill>
@@ -5022,7 +5000,7 @@
           <a:p>
             <a:pPr algn="ctr"/>
             <a:r>
-              <a:rPr lang="en-US" sz="1050" dirty="0" smtClean="0">
+              <a:rPr lang="en-US" sz="1050" dirty="0">
                 <a:solidFill>
                   <a:srgbClr val="7030A0"/>
                 </a:solidFill>
@@ -5041,6 +5019,7 @@
         <p:nvCxnSpPr>
           <p:cNvPr id="86" name="Elbow Connector 85"/>
           <p:cNvCxnSpPr>
+            <a:cxnSpLocks/>
             <a:stCxn id="78" idx="3"/>
             <a:endCxn id="85" idx="1"/>
           </p:cNvCxnSpPr>
@@ -5210,7 +5189,7 @@
           <a:p>
             <a:pPr algn="ctr"/>
             <a:r>
-              <a:rPr lang="en-US" sz="1050" dirty="0" smtClean="0">
+              <a:rPr lang="en-US" sz="1050" dirty="0">
                 <a:solidFill>
                   <a:srgbClr val="7030A0"/>
                 </a:solidFill>
@@ -5218,14 +5197,14 @@
               <a:t>&lt;&lt;interface&gt;&gt;</a:t>
             </a:r>
             <a:br>
-              <a:rPr lang="en-US" sz="1050" dirty="0" smtClean="0">
+              <a:rPr lang="en-US" sz="1050" dirty="0">
                 <a:solidFill>
                   <a:srgbClr val="7030A0"/>
                 </a:solidFill>
               </a:rPr>
             </a:br>
             <a:r>
-              <a:rPr lang="en-US" sz="1050" dirty="0" err="1" smtClean="0">
+              <a:rPr lang="en-US" sz="1050" dirty="0" err="1">
                 <a:solidFill>
                   <a:srgbClr val="7030A0"/>
                 </a:solidFill>
@@ -5264,7 +5243,7 @@
           <a:p>
             <a:pPr algn="r"/>
             <a:r>
-              <a:rPr lang="en-US" sz="1100" dirty="0" smtClean="0">
+              <a:rPr lang="en-US" sz="1100" dirty="0">
                 <a:solidFill>
                   <a:srgbClr val="7030A0"/>
                 </a:solidFill>
@@ -5320,20 +5299,12 @@
           <a:p>
             <a:pPr algn="ctr"/>
             <a:r>
-              <a:rPr lang="en-US" sz="1050" dirty="0" smtClean="0">
+              <a:rPr lang="en-US" sz="1050" dirty="0">
                 <a:solidFill>
                   <a:srgbClr val="7030A0"/>
                 </a:solidFill>
               </a:rPr>
               <a:t>&lt;&lt;interface&gt;&gt;</a:t>
-            </a:r>
-            <a:r>
-              <a:rPr lang="en-US" sz="1050">
-                <a:solidFill>
-                  <a:srgbClr val="7030A0"/>
-                </a:solidFill>
-              </a:rPr>
-              <a:t/>
             </a:r>
             <a:br>
               <a:rPr lang="en-US" sz="1050">
@@ -5343,7 +5314,7 @@
               </a:rPr>
             </a:br>
             <a:r>
-              <a:rPr lang="en-US" sz="1050" dirty="0" err="1" smtClean="0">
+              <a:rPr lang="en-US" sz="1050" dirty="0" err="1">
                 <a:solidFill>
                   <a:srgbClr val="7030A0"/>
                 </a:solidFill>
@@ -5465,7 +5436,7 @@
           <a:p>
             <a:pPr algn="ctr"/>
             <a:r>
-              <a:rPr lang="en-US" sz="1100" dirty="0" smtClean="0">
+              <a:rPr lang="en-US" sz="1100" dirty="0">
                 <a:solidFill>
                   <a:srgbClr val="7030A0"/>
                 </a:solidFill>
@@ -5504,7 +5475,7 @@
           <a:p>
             <a:pPr algn="ctr"/>
             <a:r>
-              <a:rPr lang="en-US" sz="1100" dirty="0" smtClean="0">
+              <a:rPr lang="en-US" sz="1100" dirty="0">
                 <a:solidFill>
                   <a:srgbClr val="7030A0"/>
                 </a:solidFill>
@@ -5543,7 +5514,7 @@
           <a:p>
             <a:pPr algn="ctr"/>
             <a:r>
-              <a:rPr lang="en-US" sz="1100" dirty="0" smtClean="0">
+              <a:rPr lang="en-US" sz="1100" dirty="0">
                 <a:solidFill>
                   <a:srgbClr val="7030A0"/>
                 </a:solidFill>
@@ -5582,7 +5553,7 @@
           <a:p>
             <a:pPr algn="ctr"/>
             <a:r>
-              <a:rPr lang="en-US" sz="1100" dirty="0" smtClean="0">
+              <a:rPr lang="en-US" sz="1100" dirty="0">
                 <a:solidFill>
                   <a:srgbClr val="7030A0"/>
                 </a:solidFill>
@@ -5621,7 +5592,7 @@
           <a:p>
             <a:pPr algn="ctr"/>
             <a:r>
-              <a:rPr lang="en-US" sz="1100" dirty="0" smtClean="0">
+              <a:rPr lang="en-US" sz="1100" dirty="0">
                 <a:solidFill>
                   <a:srgbClr val="7030A0"/>
                 </a:solidFill>
@@ -5660,7 +5631,7 @@
           <a:p>
             <a:pPr algn="ctr"/>
             <a:r>
-              <a:rPr lang="en-US" sz="1100" dirty="0" smtClean="0">
+              <a:rPr lang="en-US" sz="1100" dirty="0">
                 <a:solidFill>
                   <a:srgbClr val="7030A0"/>
                 </a:solidFill>
@@ -5699,7 +5670,7 @@
           <a:p>
             <a:pPr algn="ctr"/>
             <a:r>
-              <a:rPr lang="en-US" sz="1100" dirty="0" smtClean="0">
+              <a:rPr lang="en-US" sz="1100" dirty="0">
                 <a:solidFill>
                   <a:srgbClr val="7030A0"/>
                 </a:solidFill>
@@ -5738,7 +5709,7 @@
           <a:p>
             <a:pPr algn="ctr"/>
             <a:r>
-              <a:rPr lang="en-US" sz="1100" dirty="0" smtClean="0">
+              <a:rPr lang="en-US" sz="1100" dirty="0">
                 <a:solidFill>
                   <a:srgbClr val="7030A0"/>
                 </a:solidFill>
@@ -5753,6 +5724,115 @@
           </a:p>
         </p:txBody>
       </p:sp>
+      <p:sp>
+        <p:nvSpPr>
+          <p:cNvPr id="53" name="Rectangle 8">
+            <a:extLst>
+              <a:ext uri="{FF2B5EF4-FFF2-40B4-BE49-F238E27FC236}">
+                <a16:creationId xmlns:a16="http://schemas.microsoft.com/office/drawing/2014/main" id="{96C39E02-A88C-4ED4-B2E2-9D70DE086394}"/>
+              </a:ext>
+            </a:extLst>
+          </p:cNvPr>
+          <p:cNvSpPr/>
+          <p:nvPr/>
+        </p:nvSpPr>
+        <p:spPr>
+          <a:xfrm>
+            <a:off x="7712397" y="3854242"/>
+            <a:ext cx="708186" cy="285783"/>
+          </a:xfrm>
+          <a:prstGeom prst="rect">
+            <a:avLst/>
+          </a:prstGeom>
+          <a:ln w="19050">
+            <a:solidFill>
+              <a:srgbClr val="7030A0"/>
+            </a:solidFill>
+          </a:ln>
+          <a:effectLst/>
+        </p:spPr>
+        <p:style>
+          <a:lnRef idx="1">
+            <a:schemeClr val="accent4"/>
+          </a:lnRef>
+          <a:fillRef idx="2">
+            <a:schemeClr val="accent4"/>
+          </a:fillRef>
+          <a:effectRef idx="1">
+            <a:schemeClr val="accent4"/>
+          </a:effectRef>
+          <a:fontRef idx="minor">
+            <a:schemeClr val="dk1"/>
+          </a:fontRef>
+        </p:style>
+        <p:txBody>
+          <a:bodyPr rtlCol="0" anchor="ctr"/>
+          <a:lstStyle/>
+          <a:p>
+            <a:pPr algn="ctr"/>
+            <a:r>
+              <a:rPr lang="en-US" sz="1050" dirty="0" err="1">
+                <a:solidFill>
+                  <a:srgbClr val="7030A0"/>
+                </a:solidFill>
+              </a:rPr>
+              <a:t>Favourite</a:t>
+            </a:r>
+            <a:endParaRPr lang="en-SG" sz="1050" dirty="0">
+              <a:solidFill>
+                <a:srgbClr val="7030A0"/>
+              </a:solidFill>
+            </a:endParaRPr>
+          </a:p>
+        </p:txBody>
+      </p:sp>
+      <p:cxnSp>
+        <p:nvCxnSpPr>
+          <p:cNvPr id="72" name="Elbow Connector 85">
+            <a:extLst>
+              <a:ext uri="{FF2B5EF4-FFF2-40B4-BE49-F238E27FC236}">
+                <a16:creationId xmlns:a16="http://schemas.microsoft.com/office/drawing/2014/main" id="{F9D6459B-69E6-446D-92DF-2B0B8A219F2D}"/>
+              </a:ext>
+            </a:extLst>
+          </p:cNvPr>
+          <p:cNvCxnSpPr>
+            <a:cxnSpLocks/>
+            <a:endCxn id="53" idx="1"/>
+          </p:cNvCxnSpPr>
+          <p:nvPr/>
+        </p:nvCxnSpPr>
+        <p:spPr>
+          <a:xfrm rot="16200000" flipH="1">
+            <a:off x="7319731" y="3604468"/>
+            <a:ext cx="568132" cy="217199"/>
+          </a:xfrm>
+          <a:prstGeom prst="bentConnector2">
+            <a:avLst/>
+          </a:prstGeom>
+          <a:ln w="19050">
+            <a:solidFill>
+              <a:srgbClr val="7030A0"/>
+            </a:solidFill>
+            <a:headEnd type="none" w="med" len="med"/>
+            <a:tailEnd type="arrow" w="med" len="med"/>
+          </a:ln>
+          <a:effectLst/>
+        </p:spPr>
+        <p:style>
+          <a:lnRef idx="1">
+            <a:schemeClr val="accent2"/>
+          </a:lnRef>
+          <a:fillRef idx="2">
+            <a:schemeClr val="accent2"/>
+          </a:fillRef>
+          <a:effectRef idx="1">
+            <a:schemeClr val="accent2"/>
+          </a:effectRef>
+          <a:fontRef idx="minor">
+            <a:schemeClr val="dk1"/>
+          </a:fontRef>
+        </p:style>
+      </p:cxnSp>
     </p:spTree>
     <p:extLst>
       <p:ext uri="{BB962C8B-B14F-4D97-AF65-F5344CB8AC3E}">
@@ -5763,13 +5843,6 @@
   <p:clrMapOvr>
     <a:masterClrMapping/>
   </p:clrMapOvr>
-  <p:timing>
-    <p:tnLst>
-      <p:par>
-        <p:cTn id="1" dur="indefinite" restart="never" nodeType="tmRoot"/>
-      </p:par>
-    </p:tnLst>
-  </p:timing>
 </p:sld>
 </file>
 

</xml_diff>

<commit_message>
Refactor terms in DeveloperGuide and fix typo in UserGuide [#109][#110] (#122)
* Add major/minor feature documentation for everyone

* Userguide typo fixes

* Fix title

* Fix image

* Refactor Design and Implementation
</commit_message>
<xml_diff>
--- a/docs/diagrams/ModelComponentClassDiagram.pptx
+++ b/docs/diagrams/ModelComponentClassDiagram.pptx
@@ -109,7 +109,7 @@
   </p:defaultTextStyle>
   <p:extLst>
     <p:ext uri="{EFAFB233-063F-42B5-8137-9DF3F51BA10A}">
-      <p15:sldGuideLst xmlns="" xmlns:p15="http://schemas.microsoft.com/office/powerpoint/2012/main">
+      <p15:sldGuideLst xmlns:p15="http://schemas.microsoft.com/office/powerpoint/2012/main">
         <p15:guide id="1" orient="horz" pos="1488">
           <p15:clr>
             <a:srgbClr val="A4A3A4"/>
@@ -208,7 +208,7 @@
           <a:p>
             <a:fld id="{F5CC4B3F-88C1-4FFA-B1B6-F41C21DC6924}" type="datetimeFigureOut">
               <a:rPr lang="en-US" smtClean="0"/>
-              <a:t>3/8/2018</a:t>
+              <a:t>3/17/2018</a:t>
             </a:fld>
             <a:endParaRPr lang="en-US"/>
           </a:p>
@@ -272,38 +272,37 @@
           <a:p>
             <a:pPr lvl="0"/>
             <a:r>
-              <a:rPr lang="en-US" smtClean="0"/>
+              <a:rPr lang="en-US"/>
               <a:t>Click to edit Master text styles</a:t>
             </a:r>
           </a:p>
           <a:p>
             <a:pPr lvl="1"/>
             <a:r>
-              <a:rPr lang="en-US" smtClean="0"/>
+              <a:rPr lang="en-US"/>
               <a:t>Second level</a:t>
             </a:r>
           </a:p>
           <a:p>
             <a:pPr lvl="2"/>
             <a:r>
-              <a:rPr lang="en-US" smtClean="0"/>
+              <a:rPr lang="en-US"/>
               <a:t>Third level</a:t>
             </a:r>
           </a:p>
           <a:p>
             <a:pPr lvl="3"/>
             <a:r>
-              <a:rPr lang="en-US" smtClean="0"/>
+              <a:rPr lang="en-US"/>
               <a:t>Fourth level</a:t>
             </a:r>
           </a:p>
           <a:p>
             <a:pPr lvl="4"/>
             <a:r>
-              <a:rPr lang="en-US" smtClean="0"/>
+              <a:rPr lang="en-US"/>
               <a:t>Fifth level</a:t>
             </a:r>
-            <a:endParaRPr lang="en-US"/>
           </a:p>
         </p:txBody>
       </p:sp>
@@ -514,10 +513,9 @@
           <a:lstStyle/>
           <a:p>
             <a:r>
-              <a:rPr lang="en-US" smtClean="0"/>
+              <a:rPr lang="en-US"/>
               <a:t>Click to edit Master title style</a:t>
             </a:r>
-            <a:endParaRPr lang="en-US"/>
           </a:p>
         </p:txBody>
       </p:sp>
@@ -633,10 +631,9 @@
           </a:lstStyle>
           <a:p>
             <a:r>
-              <a:rPr lang="en-US" smtClean="0"/>
+              <a:rPr lang="en-US"/>
               <a:t>Click to edit Master subtitle style</a:t>
             </a:r>
-            <a:endParaRPr lang="en-US"/>
           </a:p>
         </p:txBody>
       </p:sp>
@@ -657,7 +654,7 @@
           <a:p>
             <a:fld id="{78C97017-6FC3-485B-9764-EAC9E56C1D49}" type="datetimeFigureOut">
               <a:rPr lang="en-US" smtClean="0"/>
-              <a:t>3/8/2018</a:t>
+              <a:t>3/17/2018</a:t>
             </a:fld>
             <a:endParaRPr lang="en-US"/>
           </a:p>
@@ -751,10 +748,9 @@
           <a:lstStyle/>
           <a:p>
             <a:r>
-              <a:rPr lang="en-US" smtClean="0"/>
+              <a:rPr lang="en-US"/>
               <a:t>Click to edit Master title style</a:t>
             </a:r>
-            <a:endParaRPr lang="en-US"/>
           </a:p>
         </p:txBody>
       </p:sp>
@@ -775,38 +771,37 @@
           <a:p>
             <a:pPr lvl="0"/>
             <a:r>
-              <a:rPr lang="en-US" smtClean="0"/>
+              <a:rPr lang="en-US"/>
               <a:t>Click to edit Master text styles</a:t>
             </a:r>
           </a:p>
           <a:p>
             <a:pPr lvl="1"/>
             <a:r>
-              <a:rPr lang="en-US" smtClean="0"/>
+              <a:rPr lang="en-US"/>
               <a:t>Second level</a:t>
             </a:r>
           </a:p>
           <a:p>
             <a:pPr lvl="2"/>
             <a:r>
-              <a:rPr lang="en-US" smtClean="0"/>
+              <a:rPr lang="en-US"/>
               <a:t>Third level</a:t>
             </a:r>
           </a:p>
           <a:p>
             <a:pPr lvl="3"/>
             <a:r>
-              <a:rPr lang="en-US" smtClean="0"/>
+              <a:rPr lang="en-US"/>
               <a:t>Fourth level</a:t>
             </a:r>
           </a:p>
           <a:p>
             <a:pPr lvl="4"/>
             <a:r>
-              <a:rPr lang="en-US" smtClean="0"/>
+              <a:rPr lang="en-US"/>
               <a:t>Fifth level</a:t>
             </a:r>
-            <a:endParaRPr lang="en-US"/>
           </a:p>
         </p:txBody>
       </p:sp>
@@ -827,7 +822,7 @@
           <a:p>
             <a:fld id="{78C97017-6FC3-485B-9764-EAC9E56C1D49}" type="datetimeFigureOut">
               <a:rPr lang="en-US" smtClean="0"/>
-              <a:t>3/8/2018</a:t>
+              <a:t>3/17/2018</a:t>
             </a:fld>
             <a:endParaRPr lang="en-US"/>
           </a:p>
@@ -926,10 +921,9 @@
           <a:lstStyle/>
           <a:p>
             <a:r>
-              <a:rPr lang="en-US" smtClean="0"/>
+              <a:rPr lang="en-US"/>
               <a:t>Click to edit Master title style</a:t>
             </a:r>
-            <a:endParaRPr lang="en-US"/>
           </a:p>
         </p:txBody>
       </p:sp>
@@ -955,38 +949,37 @@
           <a:p>
             <a:pPr lvl="0"/>
             <a:r>
-              <a:rPr lang="en-US" smtClean="0"/>
+              <a:rPr lang="en-US"/>
               <a:t>Click to edit Master text styles</a:t>
             </a:r>
           </a:p>
           <a:p>
             <a:pPr lvl="1"/>
             <a:r>
-              <a:rPr lang="en-US" smtClean="0"/>
+              <a:rPr lang="en-US"/>
               <a:t>Second level</a:t>
             </a:r>
           </a:p>
           <a:p>
             <a:pPr lvl="2"/>
             <a:r>
-              <a:rPr lang="en-US" smtClean="0"/>
+              <a:rPr lang="en-US"/>
               <a:t>Third level</a:t>
             </a:r>
           </a:p>
           <a:p>
             <a:pPr lvl="3"/>
             <a:r>
-              <a:rPr lang="en-US" smtClean="0"/>
+              <a:rPr lang="en-US"/>
               <a:t>Fourth level</a:t>
             </a:r>
           </a:p>
           <a:p>
             <a:pPr lvl="4"/>
             <a:r>
-              <a:rPr lang="en-US" smtClean="0"/>
+              <a:rPr lang="en-US"/>
               <a:t>Fifth level</a:t>
             </a:r>
-            <a:endParaRPr lang="en-US"/>
           </a:p>
         </p:txBody>
       </p:sp>
@@ -1007,7 +1000,7 @@
           <a:p>
             <a:fld id="{78C97017-6FC3-485B-9764-EAC9E56C1D49}" type="datetimeFigureOut">
               <a:rPr lang="en-US" smtClean="0"/>
-              <a:t>3/8/2018</a:t>
+              <a:t>3/17/2018</a:t>
             </a:fld>
             <a:endParaRPr lang="en-US"/>
           </a:p>
@@ -1101,10 +1094,9 @@
           <a:lstStyle/>
           <a:p>
             <a:r>
-              <a:rPr lang="en-US" smtClean="0"/>
+              <a:rPr lang="en-US"/>
               <a:t>Click to edit Master title style</a:t>
             </a:r>
-            <a:endParaRPr lang="en-US"/>
           </a:p>
         </p:txBody>
       </p:sp>
@@ -1125,38 +1117,37 @@
           <a:p>
             <a:pPr lvl="0"/>
             <a:r>
-              <a:rPr lang="en-US" smtClean="0"/>
+              <a:rPr lang="en-US"/>
               <a:t>Click to edit Master text styles</a:t>
             </a:r>
           </a:p>
           <a:p>
             <a:pPr lvl="1"/>
             <a:r>
-              <a:rPr lang="en-US" smtClean="0"/>
+              <a:rPr lang="en-US"/>
               <a:t>Second level</a:t>
             </a:r>
           </a:p>
           <a:p>
             <a:pPr lvl="2"/>
             <a:r>
-              <a:rPr lang="en-US" smtClean="0"/>
+              <a:rPr lang="en-US"/>
               <a:t>Third level</a:t>
             </a:r>
           </a:p>
           <a:p>
             <a:pPr lvl="3"/>
             <a:r>
-              <a:rPr lang="en-US" smtClean="0"/>
+              <a:rPr lang="en-US"/>
               <a:t>Fourth level</a:t>
             </a:r>
           </a:p>
           <a:p>
             <a:pPr lvl="4"/>
             <a:r>
-              <a:rPr lang="en-US" smtClean="0"/>
+              <a:rPr lang="en-US"/>
               <a:t>Fifth level</a:t>
             </a:r>
-            <a:endParaRPr lang="en-US"/>
           </a:p>
         </p:txBody>
       </p:sp>
@@ -1177,7 +1168,7 @@
           <a:p>
             <a:fld id="{78C97017-6FC3-485B-9764-EAC9E56C1D49}" type="datetimeFigureOut">
               <a:rPr lang="en-US" smtClean="0"/>
-              <a:t>3/8/2018</a:t>
+              <a:t>3/17/2018</a:t>
             </a:fld>
             <a:endParaRPr lang="en-US"/>
           </a:p>
@@ -1280,10 +1271,9 @@
           </a:lstStyle>
           <a:p>
             <a:r>
-              <a:rPr lang="en-US" smtClean="0"/>
+              <a:rPr lang="en-US"/>
               <a:t>Click to edit Master title style</a:t>
             </a:r>
-            <a:endParaRPr lang="en-US"/>
           </a:p>
         </p:txBody>
       </p:sp>
@@ -1400,7 +1390,7 @@
           <a:p>
             <a:pPr lvl="0"/>
             <a:r>
-              <a:rPr lang="en-US" smtClean="0"/>
+              <a:rPr lang="en-US"/>
               <a:t>Click to edit Master text styles</a:t>
             </a:r>
           </a:p>
@@ -1423,7 +1413,7 @@
           <a:p>
             <a:fld id="{78C97017-6FC3-485B-9764-EAC9E56C1D49}" type="datetimeFigureOut">
               <a:rPr lang="en-US" smtClean="0"/>
-              <a:t>3/8/2018</a:t>
+              <a:t>3/17/2018</a:t>
             </a:fld>
             <a:endParaRPr lang="en-US"/>
           </a:p>
@@ -1517,10 +1507,9 @@
           <a:lstStyle/>
           <a:p>
             <a:r>
-              <a:rPr lang="en-US" smtClean="0"/>
+              <a:rPr lang="en-US"/>
               <a:t>Click to edit Master title style</a:t>
             </a:r>
-            <a:endParaRPr lang="en-US"/>
           </a:p>
         </p:txBody>
       </p:sp>
@@ -1574,38 +1563,37 @@
           <a:p>
             <a:pPr lvl="0"/>
             <a:r>
-              <a:rPr lang="en-US" smtClean="0"/>
+              <a:rPr lang="en-US"/>
               <a:t>Click to edit Master text styles</a:t>
             </a:r>
           </a:p>
           <a:p>
             <a:pPr lvl="1"/>
             <a:r>
-              <a:rPr lang="en-US" smtClean="0"/>
+              <a:rPr lang="en-US"/>
               <a:t>Second level</a:t>
             </a:r>
           </a:p>
           <a:p>
             <a:pPr lvl="2"/>
             <a:r>
-              <a:rPr lang="en-US" smtClean="0"/>
+              <a:rPr lang="en-US"/>
               <a:t>Third level</a:t>
             </a:r>
           </a:p>
           <a:p>
             <a:pPr lvl="3"/>
             <a:r>
-              <a:rPr lang="en-US" smtClean="0"/>
+              <a:rPr lang="en-US"/>
               <a:t>Fourth level</a:t>
             </a:r>
           </a:p>
           <a:p>
             <a:pPr lvl="4"/>
             <a:r>
-              <a:rPr lang="en-US" smtClean="0"/>
+              <a:rPr lang="en-US"/>
               <a:t>Fifth level</a:t>
             </a:r>
-            <a:endParaRPr lang="en-US"/>
           </a:p>
         </p:txBody>
       </p:sp>
@@ -1659,38 +1647,37 @@
           <a:p>
             <a:pPr lvl="0"/>
             <a:r>
-              <a:rPr lang="en-US" smtClean="0"/>
+              <a:rPr lang="en-US"/>
               <a:t>Click to edit Master text styles</a:t>
             </a:r>
           </a:p>
           <a:p>
             <a:pPr lvl="1"/>
             <a:r>
-              <a:rPr lang="en-US" smtClean="0"/>
+              <a:rPr lang="en-US"/>
               <a:t>Second level</a:t>
             </a:r>
           </a:p>
           <a:p>
             <a:pPr lvl="2"/>
             <a:r>
-              <a:rPr lang="en-US" smtClean="0"/>
+              <a:rPr lang="en-US"/>
               <a:t>Third level</a:t>
             </a:r>
           </a:p>
           <a:p>
             <a:pPr lvl="3"/>
             <a:r>
-              <a:rPr lang="en-US" smtClean="0"/>
+              <a:rPr lang="en-US"/>
               <a:t>Fourth level</a:t>
             </a:r>
           </a:p>
           <a:p>
             <a:pPr lvl="4"/>
             <a:r>
-              <a:rPr lang="en-US" smtClean="0"/>
+              <a:rPr lang="en-US"/>
               <a:t>Fifth level</a:t>
             </a:r>
-            <a:endParaRPr lang="en-US"/>
           </a:p>
         </p:txBody>
       </p:sp>
@@ -1711,7 +1698,7 @@
           <a:p>
             <a:fld id="{78C97017-6FC3-485B-9764-EAC9E56C1D49}" type="datetimeFigureOut">
               <a:rPr lang="en-US" smtClean="0"/>
-              <a:t>3/8/2018</a:t>
+              <a:t>3/17/2018</a:t>
             </a:fld>
             <a:endParaRPr lang="en-US"/>
           </a:p>
@@ -1809,10 +1796,9 @@
           </a:lstStyle>
           <a:p>
             <a:r>
-              <a:rPr lang="en-US" smtClean="0"/>
+              <a:rPr lang="en-US"/>
               <a:t>Click to edit Master title style</a:t>
             </a:r>
-            <a:endParaRPr lang="en-US"/>
           </a:p>
         </p:txBody>
       </p:sp>
@@ -1875,7 +1861,7 @@
           <a:p>
             <a:pPr lvl="0"/>
             <a:r>
-              <a:rPr lang="en-US" smtClean="0"/>
+              <a:rPr lang="en-US"/>
               <a:t>Click to edit Master text styles</a:t>
             </a:r>
           </a:p>
@@ -1931,38 +1917,37 @@
           <a:p>
             <a:pPr lvl="0"/>
             <a:r>
-              <a:rPr lang="en-US" smtClean="0"/>
+              <a:rPr lang="en-US"/>
               <a:t>Click to edit Master text styles</a:t>
             </a:r>
           </a:p>
           <a:p>
             <a:pPr lvl="1"/>
             <a:r>
-              <a:rPr lang="en-US" smtClean="0"/>
+              <a:rPr lang="en-US"/>
               <a:t>Second level</a:t>
             </a:r>
           </a:p>
           <a:p>
             <a:pPr lvl="2"/>
             <a:r>
-              <a:rPr lang="en-US" smtClean="0"/>
+              <a:rPr lang="en-US"/>
               <a:t>Third level</a:t>
             </a:r>
           </a:p>
           <a:p>
             <a:pPr lvl="3"/>
             <a:r>
-              <a:rPr lang="en-US" smtClean="0"/>
+              <a:rPr lang="en-US"/>
               <a:t>Fourth level</a:t>
             </a:r>
           </a:p>
           <a:p>
             <a:pPr lvl="4"/>
             <a:r>
-              <a:rPr lang="en-US" smtClean="0"/>
+              <a:rPr lang="en-US"/>
               <a:t>Fifth level</a:t>
             </a:r>
-            <a:endParaRPr lang="en-US"/>
           </a:p>
         </p:txBody>
       </p:sp>
@@ -2025,7 +2010,7 @@
           <a:p>
             <a:pPr lvl="0"/>
             <a:r>
-              <a:rPr lang="en-US" smtClean="0"/>
+              <a:rPr lang="en-US"/>
               <a:t>Click to edit Master text styles</a:t>
             </a:r>
           </a:p>
@@ -2081,38 +2066,37 @@
           <a:p>
             <a:pPr lvl="0"/>
             <a:r>
-              <a:rPr lang="en-US" smtClean="0"/>
+              <a:rPr lang="en-US"/>
               <a:t>Click to edit Master text styles</a:t>
             </a:r>
           </a:p>
           <a:p>
             <a:pPr lvl="1"/>
             <a:r>
-              <a:rPr lang="en-US" smtClean="0"/>
+              <a:rPr lang="en-US"/>
               <a:t>Second level</a:t>
             </a:r>
           </a:p>
           <a:p>
             <a:pPr lvl="2"/>
             <a:r>
-              <a:rPr lang="en-US" smtClean="0"/>
+              <a:rPr lang="en-US"/>
               <a:t>Third level</a:t>
             </a:r>
           </a:p>
           <a:p>
             <a:pPr lvl="3"/>
             <a:r>
-              <a:rPr lang="en-US" smtClean="0"/>
+              <a:rPr lang="en-US"/>
               <a:t>Fourth level</a:t>
             </a:r>
           </a:p>
           <a:p>
             <a:pPr lvl="4"/>
             <a:r>
-              <a:rPr lang="en-US" smtClean="0"/>
+              <a:rPr lang="en-US"/>
               <a:t>Fifth level</a:t>
             </a:r>
-            <a:endParaRPr lang="en-US"/>
           </a:p>
         </p:txBody>
       </p:sp>
@@ -2133,7 +2117,7 @@
           <a:p>
             <a:fld id="{78C97017-6FC3-485B-9764-EAC9E56C1D49}" type="datetimeFigureOut">
               <a:rPr lang="en-US" smtClean="0"/>
-              <a:t>3/8/2018</a:t>
+              <a:t>3/17/2018</a:t>
             </a:fld>
             <a:endParaRPr lang="en-US"/>
           </a:p>
@@ -2227,10 +2211,9 @@
           <a:lstStyle/>
           <a:p>
             <a:r>
-              <a:rPr lang="en-US" smtClean="0"/>
+              <a:rPr lang="en-US"/>
               <a:t>Click to edit Master title style</a:t>
             </a:r>
-            <a:endParaRPr lang="en-US"/>
           </a:p>
         </p:txBody>
       </p:sp>
@@ -2251,7 +2234,7 @@
           <a:p>
             <a:fld id="{78C97017-6FC3-485B-9764-EAC9E56C1D49}" type="datetimeFigureOut">
               <a:rPr lang="en-US" smtClean="0"/>
-              <a:t>3/8/2018</a:t>
+              <a:t>3/17/2018</a:t>
             </a:fld>
             <a:endParaRPr lang="en-US"/>
           </a:p>
@@ -2346,7 +2329,7 @@
           <a:p>
             <a:fld id="{78C97017-6FC3-485B-9764-EAC9E56C1D49}" type="datetimeFigureOut">
               <a:rPr lang="en-US" smtClean="0"/>
-              <a:t>3/8/2018</a:t>
+              <a:t>3/17/2018</a:t>
             </a:fld>
             <a:endParaRPr lang="en-US"/>
           </a:p>
@@ -2449,10 +2432,9 @@
           </a:lstStyle>
           <a:p>
             <a:r>
-              <a:rPr lang="en-US" smtClean="0"/>
+              <a:rPr lang="en-US"/>
               <a:t>Click to edit Master title style</a:t>
             </a:r>
-            <a:endParaRPr lang="en-US"/>
           </a:p>
         </p:txBody>
       </p:sp>
@@ -2506,38 +2488,37 @@
           <a:p>
             <a:pPr lvl="0"/>
             <a:r>
-              <a:rPr lang="en-US" smtClean="0"/>
+              <a:rPr lang="en-US"/>
               <a:t>Click to edit Master text styles</a:t>
             </a:r>
           </a:p>
           <a:p>
             <a:pPr lvl="1"/>
             <a:r>
-              <a:rPr lang="en-US" smtClean="0"/>
+              <a:rPr lang="en-US"/>
               <a:t>Second level</a:t>
             </a:r>
           </a:p>
           <a:p>
             <a:pPr lvl="2"/>
             <a:r>
-              <a:rPr lang="en-US" smtClean="0"/>
+              <a:rPr lang="en-US"/>
               <a:t>Third level</a:t>
             </a:r>
           </a:p>
           <a:p>
             <a:pPr lvl="3"/>
             <a:r>
-              <a:rPr lang="en-US" smtClean="0"/>
+              <a:rPr lang="en-US"/>
               <a:t>Fourth level</a:t>
             </a:r>
           </a:p>
           <a:p>
             <a:pPr lvl="4"/>
             <a:r>
-              <a:rPr lang="en-US" smtClean="0"/>
+              <a:rPr lang="en-US"/>
               <a:t>Fifth level</a:t>
             </a:r>
-            <a:endParaRPr lang="en-US"/>
           </a:p>
         </p:txBody>
       </p:sp>
@@ -2600,7 +2581,7 @@
           <a:p>
             <a:pPr lvl="0"/>
             <a:r>
-              <a:rPr lang="en-US" smtClean="0"/>
+              <a:rPr lang="en-US"/>
               <a:t>Click to edit Master text styles</a:t>
             </a:r>
           </a:p>
@@ -2623,7 +2604,7 @@
           <a:p>
             <a:fld id="{78C97017-6FC3-485B-9764-EAC9E56C1D49}" type="datetimeFigureOut">
               <a:rPr lang="en-US" smtClean="0"/>
-              <a:t>3/8/2018</a:t>
+              <a:t>3/17/2018</a:t>
             </a:fld>
             <a:endParaRPr lang="en-US"/>
           </a:p>
@@ -2726,10 +2707,9 @@
           </a:lstStyle>
           <a:p>
             <a:r>
-              <a:rPr lang="en-US" smtClean="0"/>
+              <a:rPr lang="en-US"/>
               <a:t>Click to edit Master title style</a:t>
             </a:r>
-            <a:endParaRPr lang="en-US"/>
           </a:p>
         </p:txBody>
       </p:sp>
@@ -2853,7 +2833,7 @@
           <a:p>
             <a:pPr lvl="0"/>
             <a:r>
-              <a:rPr lang="en-US" smtClean="0"/>
+              <a:rPr lang="en-US"/>
               <a:t>Click to edit Master text styles</a:t>
             </a:r>
           </a:p>
@@ -2876,7 +2856,7 @@
           <a:p>
             <a:fld id="{78C97017-6FC3-485B-9764-EAC9E56C1D49}" type="datetimeFigureOut">
               <a:rPr lang="en-US" smtClean="0"/>
-              <a:t>3/8/2018</a:t>
+              <a:t>3/17/2018</a:t>
             </a:fld>
             <a:endParaRPr lang="en-US"/>
           </a:p>
@@ -2985,10 +2965,9 @@
           <a:lstStyle/>
           <a:p>
             <a:r>
-              <a:rPr lang="en-US" smtClean="0"/>
+              <a:rPr lang="en-US"/>
               <a:t>Click to edit Master title style</a:t>
             </a:r>
-            <a:endParaRPr lang="en-US"/>
           </a:p>
         </p:txBody>
       </p:sp>
@@ -3019,38 +2998,37 @@
           <a:p>
             <a:pPr lvl="0"/>
             <a:r>
-              <a:rPr lang="en-US" smtClean="0"/>
+              <a:rPr lang="en-US"/>
               <a:t>Click to edit Master text styles</a:t>
             </a:r>
           </a:p>
           <a:p>
             <a:pPr lvl="1"/>
             <a:r>
-              <a:rPr lang="en-US" smtClean="0"/>
+              <a:rPr lang="en-US"/>
               <a:t>Second level</a:t>
             </a:r>
           </a:p>
           <a:p>
             <a:pPr lvl="2"/>
             <a:r>
-              <a:rPr lang="en-US" smtClean="0"/>
+              <a:rPr lang="en-US"/>
               <a:t>Third level</a:t>
             </a:r>
           </a:p>
           <a:p>
             <a:pPr lvl="3"/>
             <a:r>
-              <a:rPr lang="en-US" smtClean="0"/>
+              <a:rPr lang="en-US"/>
               <a:t>Fourth level</a:t>
             </a:r>
           </a:p>
           <a:p>
             <a:pPr lvl="4"/>
             <a:r>
-              <a:rPr lang="en-US" smtClean="0"/>
+              <a:rPr lang="en-US"/>
               <a:t>Fifth level</a:t>
             </a:r>
-            <a:endParaRPr lang="en-US"/>
           </a:p>
         </p:txBody>
       </p:sp>
@@ -3089,7 +3067,7 @@
           <a:p>
             <a:fld id="{78C97017-6FC3-485B-9764-EAC9E56C1D49}" type="datetimeFigureOut">
               <a:rPr lang="en-US" smtClean="0"/>
-              <a:t>3/8/2018</a:t>
+              <a:t>3/17/2018</a:t>
             </a:fld>
             <a:endParaRPr lang="en-US"/>
           </a:p>
@@ -3510,7 +3488,7 @@
           <a:lstStyle/>
           <a:p>
             <a:r>
-              <a:rPr lang="en-US" sz="1200" b="1" dirty="0" smtClean="0">
+              <a:rPr lang="en-US" sz="1200" b="1" dirty="0">
                 <a:solidFill>
                   <a:srgbClr val="7030A0"/>
                 </a:solidFill>
@@ -3569,7 +3547,7 @@
           <a:p>
             <a:pPr algn="ctr"/>
             <a:r>
-              <a:rPr lang="en-US" sz="1050" dirty="0" err="1" smtClean="0">
+              <a:rPr lang="en-US" sz="1050" dirty="0" err="1">
                 <a:solidFill>
                   <a:schemeClr val="bg1"/>
                 </a:solidFill>
@@ -3628,7 +3606,7 @@
           <a:p>
             <a:pPr algn="ctr"/>
             <a:r>
-              <a:rPr lang="en-US" sz="1050" dirty="0" err="1" smtClean="0">
+              <a:rPr lang="en-US" sz="1050" dirty="0" err="1">
                 <a:solidFill>
                   <a:schemeClr val="bg1"/>
                 </a:solidFill>
@@ -3742,7 +3720,7 @@
           <a:p>
             <a:pPr algn="ctr"/>
             <a:r>
-              <a:rPr lang="en-US" sz="1050" dirty="0" smtClean="0">
+              <a:rPr lang="en-US" sz="1050" dirty="0">
                 <a:solidFill>
                   <a:schemeClr val="bg1"/>
                 </a:solidFill>
@@ -4015,7 +3993,7 @@
           <a:p>
             <a:pPr algn="ctr"/>
             <a:r>
-              <a:rPr lang="en-US" sz="1050" dirty="0" smtClean="0">
+              <a:rPr lang="en-US" sz="1050" dirty="0">
                 <a:solidFill>
                   <a:srgbClr val="7030A0"/>
                 </a:solidFill>
@@ -4157,7 +4135,7 @@
           <a:p>
             <a:pPr algn="ctr"/>
             <a:r>
-              <a:rPr lang="en-US" sz="1050" dirty="0" err="1" smtClean="0">
+              <a:rPr lang="en-US" sz="1050" dirty="0" err="1">
                 <a:solidFill>
                   <a:srgbClr val="7030A0"/>
                 </a:solidFill>
@@ -4301,7 +4279,7 @@
           <a:p>
             <a:pPr algn="ctr"/>
             <a:r>
-              <a:rPr lang="en-US" sz="1050" dirty="0" err="1" smtClean="0">
+              <a:rPr lang="en-US" sz="1050" dirty="0" err="1">
                 <a:solidFill>
                   <a:srgbClr val="7030A0"/>
                 </a:solidFill>
@@ -4400,7 +4378,7 @@
           <a:p>
             <a:pPr algn="ctr"/>
             <a:r>
-              <a:rPr lang="en-US" sz="1050" dirty="0" smtClean="0">
+              <a:rPr lang="en-US" sz="1050" dirty="0">
                 <a:solidFill>
                   <a:srgbClr val="7030A0"/>
                 </a:solidFill>
@@ -4542,7 +4520,7 @@
           <a:p>
             <a:pPr algn="ctr"/>
             <a:r>
-              <a:rPr lang="en-US" sz="1050" dirty="0" smtClean="0">
+              <a:rPr lang="en-US" sz="1050" dirty="0">
                 <a:solidFill>
                   <a:srgbClr val="7030A0"/>
                 </a:solidFill>
@@ -4651,7 +4629,7 @@
         </p:nvSpPr>
         <p:spPr>
           <a:xfrm>
-            <a:off x="7712397" y="2564238"/>
+            <a:off x="7696805" y="2255953"/>
             <a:ext cx="822002" cy="285783"/>
           </a:xfrm>
           <a:prstGeom prst="rect">
@@ -4684,7 +4662,7 @@
           <a:p>
             <a:pPr algn="ctr"/>
             <a:r>
-              <a:rPr lang="en-US" sz="1050" dirty="0" smtClean="0">
+              <a:rPr lang="en-US" sz="1050" dirty="0">
                 <a:solidFill>
                   <a:srgbClr val="7030A0"/>
                 </a:solidFill>
@@ -4757,8 +4735,8 @@
         </p:nvCxnSpPr>
         <p:spPr>
           <a:xfrm flipV="1">
-            <a:off x="7277995" y="2707130"/>
-            <a:ext cx="434402" cy="327761"/>
+            <a:off x="7277995" y="2398845"/>
+            <a:ext cx="418810" cy="636046"/>
           </a:xfrm>
           <a:prstGeom prst="bentConnector3">
             <a:avLst/>
@@ -4795,7 +4773,7 @@
         </p:nvSpPr>
         <p:spPr>
           <a:xfrm>
-            <a:off x="7712397" y="2887216"/>
+            <a:off x="7702537" y="2574182"/>
             <a:ext cx="822002" cy="285783"/>
           </a:xfrm>
           <a:prstGeom prst="rect">
@@ -4828,7 +4806,7 @@
           <a:p>
             <a:pPr algn="ctr"/>
             <a:r>
-              <a:rPr lang="en-US" sz="1050" dirty="0" smtClean="0">
+              <a:rPr lang="en-US" sz="1050" dirty="0">
                 <a:solidFill>
                   <a:srgbClr val="7030A0"/>
                 </a:solidFill>
@@ -4854,8 +4832,8 @@
         </p:nvCxnSpPr>
         <p:spPr>
           <a:xfrm flipV="1">
-            <a:off x="7277995" y="3030108"/>
-            <a:ext cx="434402" cy="4783"/>
+            <a:off x="7277995" y="2717074"/>
+            <a:ext cx="424542" cy="317817"/>
           </a:xfrm>
           <a:prstGeom prst="bentConnector3">
             <a:avLst/>
@@ -4892,7 +4870,7 @@
         </p:nvSpPr>
         <p:spPr>
           <a:xfrm>
-            <a:off x="7712397" y="3210194"/>
+            <a:off x="7702537" y="2897160"/>
             <a:ext cx="822002" cy="285783"/>
           </a:xfrm>
           <a:prstGeom prst="rect">
@@ -4925,7 +4903,7 @@
           <a:p>
             <a:pPr algn="ctr"/>
             <a:r>
-              <a:rPr lang="en-US" sz="1050" dirty="0" smtClean="0">
+              <a:rPr lang="en-US" sz="1050" dirty="0">
                 <a:solidFill>
                   <a:srgbClr val="7030A0"/>
                 </a:solidFill>
@@ -4952,7 +4930,7 @@
         <p:spPr>
           <a:xfrm>
             <a:off x="7277995" y="3034891"/>
-            <a:ext cx="434402" cy="318195"/>
+            <a:ext cx="424542" cy="5161"/>
           </a:xfrm>
           <a:prstGeom prst="bentConnector3">
             <a:avLst/>
@@ -4989,7 +4967,7 @@
         </p:nvSpPr>
         <p:spPr>
           <a:xfrm>
-            <a:off x="7712396" y="3533171"/>
+            <a:off x="7702536" y="3220137"/>
             <a:ext cx="822003" cy="285783"/>
           </a:xfrm>
           <a:prstGeom prst="rect">
@@ -5022,7 +5000,7 @@
           <a:p>
             <a:pPr algn="ctr"/>
             <a:r>
-              <a:rPr lang="en-US" sz="1050" dirty="0" smtClean="0">
+              <a:rPr lang="en-US" sz="1050" dirty="0">
                 <a:solidFill>
                   <a:srgbClr val="7030A0"/>
                 </a:solidFill>
@@ -5049,7 +5027,7 @@
         <p:spPr>
           <a:xfrm>
             <a:off x="7277995" y="3034891"/>
-            <a:ext cx="434401" cy="641172"/>
+            <a:ext cx="424541" cy="328138"/>
           </a:xfrm>
           <a:prstGeom prst="bentConnector3">
             <a:avLst/>
@@ -5210,7 +5188,7 @@
           <a:p>
             <a:pPr algn="ctr"/>
             <a:r>
-              <a:rPr lang="en-US" sz="1050" dirty="0" smtClean="0">
+              <a:rPr lang="en-US" sz="1050" dirty="0">
                 <a:solidFill>
                   <a:srgbClr val="7030A0"/>
                 </a:solidFill>
@@ -5218,14 +5196,14 @@
               <a:t>&lt;&lt;interface&gt;&gt;</a:t>
             </a:r>
             <a:br>
-              <a:rPr lang="en-US" sz="1050" dirty="0" smtClean="0">
+              <a:rPr lang="en-US" sz="1050" dirty="0">
                 <a:solidFill>
                   <a:srgbClr val="7030A0"/>
                 </a:solidFill>
               </a:rPr>
             </a:br>
             <a:r>
-              <a:rPr lang="en-US" sz="1050" dirty="0" err="1" smtClean="0">
+              <a:rPr lang="en-US" sz="1050" dirty="0" err="1">
                 <a:solidFill>
                   <a:srgbClr val="7030A0"/>
                 </a:solidFill>
@@ -5264,7 +5242,7 @@
           <a:p>
             <a:pPr algn="r"/>
             <a:r>
-              <a:rPr lang="en-US" sz="1100" dirty="0" smtClean="0">
+              <a:rPr lang="en-US" sz="1100" dirty="0">
                 <a:solidFill>
                   <a:srgbClr val="7030A0"/>
                 </a:solidFill>
@@ -5320,20 +5298,12 @@
           <a:p>
             <a:pPr algn="ctr"/>
             <a:r>
-              <a:rPr lang="en-US" sz="1050" dirty="0" smtClean="0">
+              <a:rPr lang="en-US" sz="1050" dirty="0">
                 <a:solidFill>
                   <a:srgbClr val="7030A0"/>
                 </a:solidFill>
               </a:rPr>
               <a:t>&lt;&lt;interface&gt;&gt;</a:t>
-            </a:r>
-            <a:r>
-              <a:rPr lang="en-US" sz="1050">
-                <a:solidFill>
-                  <a:srgbClr val="7030A0"/>
-                </a:solidFill>
-              </a:rPr>
-              <a:t/>
             </a:r>
             <a:br>
               <a:rPr lang="en-US" sz="1050">
@@ -5343,7 +5313,7 @@
               </a:rPr>
             </a:br>
             <a:r>
-              <a:rPr lang="en-US" sz="1050" dirty="0" err="1" smtClean="0">
+              <a:rPr lang="en-US" sz="1050" dirty="0" err="1">
                 <a:solidFill>
                   <a:srgbClr val="7030A0"/>
                 </a:solidFill>
@@ -5465,7 +5435,7 @@
           <a:p>
             <a:pPr algn="ctr"/>
             <a:r>
-              <a:rPr lang="en-US" sz="1100" dirty="0" smtClean="0">
+              <a:rPr lang="en-US" sz="1100" dirty="0">
                 <a:solidFill>
                   <a:srgbClr val="7030A0"/>
                 </a:solidFill>
@@ -5504,7 +5474,7 @@
           <a:p>
             <a:pPr algn="ctr"/>
             <a:r>
-              <a:rPr lang="en-US" sz="1100" dirty="0" smtClean="0">
+              <a:rPr lang="en-US" sz="1100" dirty="0">
                 <a:solidFill>
                   <a:srgbClr val="7030A0"/>
                 </a:solidFill>
@@ -5543,7 +5513,7 @@
           <a:p>
             <a:pPr algn="ctr"/>
             <a:r>
-              <a:rPr lang="en-US" sz="1100" dirty="0" smtClean="0">
+              <a:rPr lang="en-US" sz="1100" dirty="0">
                 <a:solidFill>
                   <a:srgbClr val="7030A0"/>
                 </a:solidFill>
@@ -5582,7 +5552,7 @@
           <a:p>
             <a:pPr algn="ctr"/>
             <a:r>
-              <a:rPr lang="en-US" sz="1100" dirty="0" smtClean="0">
+              <a:rPr lang="en-US" sz="1100" dirty="0">
                 <a:solidFill>
                   <a:srgbClr val="7030A0"/>
                 </a:solidFill>
@@ -5621,7 +5591,7 @@
           <a:p>
             <a:pPr algn="ctr"/>
             <a:r>
-              <a:rPr lang="en-US" sz="1100" dirty="0" smtClean="0">
+              <a:rPr lang="en-US" sz="1100" dirty="0">
                 <a:solidFill>
                   <a:srgbClr val="7030A0"/>
                 </a:solidFill>
@@ -5660,7 +5630,7 @@
           <a:p>
             <a:pPr algn="ctr"/>
             <a:r>
-              <a:rPr lang="en-US" sz="1100" dirty="0" smtClean="0">
+              <a:rPr lang="en-US" sz="1100" dirty="0">
                 <a:solidFill>
                   <a:srgbClr val="7030A0"/>
                 </a:solidFill>
@@ -5699,7 +5669,7 @@
           <a:p>
             <a:pPr algn="ctr"/>
             <a:r>
-              <a:rPr lang="en-US" sz="1100" dirty="0" smtClean="0">
+              <a:rPr lang="en-US" sz="1100" dirty="0">
                 <a:solidFill>
                   <a:srgbClr val="7030A0"/>
                 </a:solidFill>
@@ -5738,7 +5708,7 @@
           <a:p>
             <a:pPr algn="ctr"/>
             <a:r>
-              <a:rPr lang="en-US" sz="1100" dirty="0" smtClean="0">
+              <a:rPr lang="en-US" sz="1100" dirty="0">
                 <a:solidFill>
                   <a:srgbClr val="7030A0"/>
                 </a:solidFill>
@@ -5761,7 +5731,7 @@
         </p:nvSpPr>
         <p:spPr>
           <a:xfrm>
-            <a:off x="7712397" y="3854242"/>
+            <a:off x="7702537" y="3541208"/>
             <a:ext cx="822002" cy="285783"/>
           </a:xfrm>
           <a:prstGeom prst="rect">
@@ -5794,7 +5764,7 @@
           <a:p>
             <a:pPr algn="ctr"/>
             <a:r>
-              <a:rPr lang="en-US" sz="1050" dirty="0" smtClean="0">
+              <a:rPr lang="en-US" sz="1050" dirty="0">
                 <a:solidFill>
                   <a:srgbClr val="7030A0"/>
                 </a:solidFill>
@@ -5817,7 +5787,7 @@
         </p:nvSpPr>
         <p:spPr>
           <a:xfrm>
-            <a:off x="7714129" y="2250759"/>
+            <a:off x="7704269" y="1937725"/>
             <a:ext cx="822002" cy="285783"/>
           </a:xfrm>
           <a:prstGeom prst="rect">
@@ -5850,7 +5820,7 @@
           <a:p>
             <a:pPr algn="ctr"/>
             <a:r>
-              <a:rPr lang="en-US" sz="1050" dirty="0" smtClean="0">
+              <a:rPr lang="en-US" sz="1050" dirty="0">
                 <a:solidFill>
                   <a:srgbClr val="7030A0"/>
                 </a:solidFill>
@@ -5869,13 +5839,13 @@
         <p:nvCxnSpPr>
           <p:cNvPr id="71" name="Elbow Connector 70"/>
           <p:cNvCxnSpPr>
-            <a:endCxn id="52" idx="1"/>
+            <a:cxnSpLocks/>
           </p:cNvCxnSpPr>
           <p:nvPr/>
         </p:nvCxnSpPr>
         <p:spPr>
           <a:xfrm rot="16200000" flipH="1">
-            <a:off x="7443261" y="3727997"/>
+            <a:off x="7433400" y="3414963"/>
             <a:ext cx="321071" cy="217201"/>
           </a:xfrm>
           <a:prstGeom prst="bentConnector2">
@@ -5915,7 +5885,7 @@
         </p:nvCxnSpPr>
         <p:spPr>
           <a:xfrm rot="5400000" flipH="1" flipV="1">
-            <a:off x="7447922" y="2440923"/>
+            <a:off x="7438062" y="2127889"/>
             <a:ext cx="313478" cy="218935"/>
           </a:xfrm>
           <a:prstGeom prst="bentConnector2">
@@ -5953,7 +5923,7 @@
         </p:nvSpPr>
         <p:spPr>
           <a:xfrm>
-            <a:off x="7714129" y="4178678"/>
+            <a:off x="7704269" y="3865644"/>
             <a:ext cx="822002" cy="285783"/>
           </a:xfrm>
           <a:prstGeom prst="rect">
@@ -5986,7 +5956,7 @@
           <a:p>
             <a:pPr algn="ctr"/>
             <a:r>
-              <a:rPr lang="en-US" sz="1050" dirty="0" smtClean="0">
+              <a:rPr lang="en-US" sz="1050" dirty="0">
                 <a:solidFill>
                   <a:srgbClr val="7030A0"/>
                 </a:solidFill>
@@ -6011,8 +5981,117 @@
         </p:nvCxnSpPr>
         <p:spPr>
           <a:xfrm rot="16200000" flipH="1">
-            <a:off x="7438376" y="4045816"/>
+            <a:off x="7428516" y="3732782"/>
             <a:ext cx="332573" cy="218933"/>
+          </a:xfrm>
+          <a:prstGeom prst="bentConnector2">
+            <a:avLst/>
+          </a:prstGeom>
+          <a:ln w="19050">
+            <a:solidFill>
+              <a:srgbClr val="7030A0"/>
+            </a:solidFill>
+            <a:headEnd type="none" w="med" len="med"/>
+            <a:tailEnd type="arrow" w="med" len="med"/>
+          </a:ln>
+          <a:effectLst/>
+        </p:spPr>
+        <p:style>
+          <a:lnRef idx="1">
+            <a:schemeClr val="accent2"/>
+          </a:lnRef>
+          <a:fillRef idx="2">
+            <a:schemeClr val="accent2"/>
+          </a:fillRef>
+          <a:effectRef idx="1">
+            <a:schemeClr val="accent2"/>
+          </a:effectRef>
+          <a:fontRef idx="minor">
+            <a:schemeClr val="dk1"/>
+          </a:fontRef>
+        </p:style>
+      </p:cxnSp>
+      <p:sp>
+        <p:nvSpPr>
+          <p:cNvPr id="74" name="Rectangle 8">
+            <a:extLst>
+              <a:ext uri="{FF2B5EF4-FFF2-40B4-BE49-F238E27FC236}">
+                <a16:creationId xmlns:a16="http://schemas.microsoft.com/office/drawing/2014/main" id="{D1EA267A-1EFE-4F58-9EFF-6A0405CC6ADE}"/>
+              </a:ext>
+            </a:extLst>
+          </p:cNvPr>
+          <p:cNvSpPr/>
+          <p:nvPr/>
+        </p:nvSpPr>
+        <p:spPr>
+          <a:xfrm>
+            <a:off x="7704269" y="4190571"/>
+            <a:ext cx="822002" cy="285783"/>
+          </a:xfrm>
+          <a:prstGeom prst="rect">
+            <a:avLst/>
+          </a:prstGeom>
+          <a:ln w="19050">
+            <a:solidFill>
+              <a:srgbClr val="7030A0"/>
+            </a:solidFill>
+          </a:ln>
+          <a:effectLst/>
+        </p:spPr>
+        <p:style>
+          <a:lnRef idx="1">
+            <a:schemeClr val="accent4"/>
+          </a:lnRef>
+          <a:fillRef idx="2">
+            <a:schemeClr val="accent4"/>
+          </a:fillRef>
+          <a:effectRef idx="1">
+            <a:schemeClr val="accent4"/>
+          </a:effectRef>
+          <a:fontRef idx="minor">
+            <a:schemeClr val="dk1"/>
+          </a:fontRef>
+        </p:style>
+        <p:txBody>
+          <a:bodyPr rtlCol="0" anchor="ctr"/>
+          <a:lstStyle/>
+          <a:p>
+            <a:pPr algn="ctr"/>
+            <a:r>
+              <a:rPr lang="en-US" sz="1050" dirty="0">
+                <a:solidFill>
+                  <a:srgbClr val="7030A0"/>
+                </a:solidFill>
+              </a:rPr>
+              <a:t>Status</a:t>
+            </a:r>
+            <a:endParaRPr lang="en-SG" sz="1050" dirty="0">
+              <a:solidFill>
+                <a:srgbClr val="7030A0"/>
+              </a:solidFill>
+            </a:endParaRPr>
+          </a:p>
+        </p:txBody>
+      </p:sp>
+      <p:cxnSp>
+        <p:nvCxnSpPr>
+          <p:cNvPr id="77" name="Elbow Connector 72">
+            <a:extLst>
+              <a:ext uri="{FF2B5EF4-FFF2-40B4-BE49-F238E27FC236}">
+                <a16:creationId xmlns:a16="http://schemas.microsoft.com/office/drawing/2014/main" id="{8AE386F3-2DFC-4117-9793-35573E1679BB}"/>
+              </a:ext>
+            </a:extLst>
+          </p:cNvPr>
+          <p:cNvCxnSpPr>
+            <a:cxnSpLocks/>
+            <a:endCxn id="74" idx="1"/>
+          </p:cNvCxnSpPr>
+          <p:nvPr/>
+        </p:nvCxnSpPr>
+        <p:spPr>
+          <a:xfrm rot="16200000" flipH="1">
+            <a:off x="7436600" y="4065794"/>
+            <a:ext cx="316404" cy="218934"/>
           </a:xfrm>
           <a:prstGeom prst="bentConnector2">
             <a:avLst/>
@@ -6051,13 +6130,6 @@
   <p:clrMapOvr>
     <a:masterClrMapping/>
   </p:clrMapOvr>
-  <p:timing>
-    <p:tnLst>
-      <p:par>
-        <p:cTn id="1" dur="indefinite" restart="never" nodeType="tmRoot"/>
-      </p:par>
-    </p:tnLst>
-  </p:timing>
 </p:sld>
 </file>
 

</xml_diff>

<commit_message>
Update diagrams to include alias
</commit_message>
<xml_diff>
--- a/docs/diagrams/ModelComponentClassDiagram.pptx
+++ b/docs/diagrams/ModelComponentClassDiagram.pptx
@@ -208,7 +208,7 @@
           <a:p>
             <a:fld id="{F5CC4B3F-88C1-4FFA-B1B6-F41C21DC6924}" type="datetimeFigureOut">
               <a:rPr lang="en-US" smtClean="0"/>
-              <a:t>3/14/2018</a:t>
+              <a:t>3/19/18</a:t>
             </a:fld>
             <a:endParaRPr lang="en-US"/>
           </a:p>
@@ -654,7 +654,7 @@
           <a:p>
             <a:fld id="{78C97017-6FC3-485B-9764-EAC9E56C1D49}" type="datetimeFigureOut">
               <a:rPr lang="en-US" smtClean="0"/>
-              <a:t>3/14/2018</a:t>
+              <a:t>3/19/18</a:t>
             </a:fld>
             <a:endParaRPr lang="en-US"/>
           </a:p>
@@ -822,7 +822,7 @@
           <a:p>
             <a:fld id="{78C97017-6FC3-485B-9764-EAC9E56C1D49}" type="datetimeFigureOut">
               <a:rPr lang="en-US" smtClean="0"/>
-              <a:t>3/14/2018</a:t>
+              <a:t>3/19/18</a:t>
             </a:fld>
             <a:endParaRPr lang="en-US"/>
           </a:p>
@@ -1000,7 +1000,7 @@
           <a:p>
             <a:fld id="{78C97017-6FC3-485B-9764-EAC9E56C1D49}" type="datetimeFigureOut">
               <a:rPr lang="en-US" smtClean="0"/>
-              <a:t>3/14/2018</a:t>
+              <a:t>3/19/18</a:t>
             </a:fld>
             <a:endParaRPr lang="en-US"/>
           </a:p>
@@ -1168,7 +1168,7 @@
           <a:p>
             <a:fld id="{78C97017-6FC3-485B-9764-EAC9E56C1D49}" type="datetimeFigureOut">
               <a:rPr lang="en-US" smtClean="0"/>
-              <a:t>3/14/2018</a:t>
+              <a:t>3/19/18</a:t>
             </a:fld>
             <a:endParaRPr lang="en-US"/>
           </a:p>
@@ -1413,7 +1413,7 @@
           <a:p>
             <a:fld id="{78C97017-6FC3-485B-9764-EAC9E56C1D49}" type="datetimeFigureOut">
               <a:rPr lang="en-US" smtClean="0"/>
-              <a:t>3/14/2018</a:t>
+              <a:t>3/19/18</a:t>
             </a:fld>
             <a:endParaRPr lang="en-US"/>
           </a:p>
@@ -1698,7 +1698,7 @@
           <a:p>
             <a:fld id="{78C97017-6FC3-485B-9764-EAC9E56C1D49}" type="datetimeFigureOut">
               <a:rPr lang="en-US" smtClean="0"/>
-              <a:t>3/14/2018</a:t>
+              <a:t>3/19/18</a:t>
             </a:fld>
             <a:endParaRPr lang="en-US"/>
           </a:p>
@@ -2117,7 +2117,7 @@
           <a:p>
             <a:fld id="{78C97017-6FC3-485B-9764-EAC9E56C1D49}" type="datetimeFigureOut">
               <a:rPr lang="en-US" smtClean="0"/>
-              <a:t>3/14/2018</a:t>
+              <a:t>3/19/18</a:t>
             </a:fld>
             <a:endParaRPr lang="en-US"/>
           </a:p>
@@ -2234,7 +2234,7 @@
           <a:p>
             <a:fld id="{78C97017-6FC3-485B-9764-EAC9E56C1D49}" type="datetimeFigureOut">
               <a:rPr lang="en-US" smtClean="0"/>
-              <a:t>3/14/2018</a:t>
+              <a:t>3/19/18</a:t>
             </a:fld>
             <a:endParaRPr lang="en-US"/>
           </a:p>
@@ -2329,7 +2329,7 @@
           <a:p>
             <a:fld id="{78C97017-6FC3-485B-9764-EAC9E56C1D49}" type="datetimeFigureOut">
               <a:rPr lang="en-US" smtClean="0"/>
-              <a:t>3/14/2018</a:t>
+              <a:t>3/19/18</a:t>
             </a:fld>
             <a:endParaRPr lang="en-US"/>
           </a:p>
@@ -2604,7 +2604,7 @@
           <a:p>
             <a:fld id="{78C97017-6FC3-485B-9764-EAC9E56C1D49}" type="datetimeFigureOut">
               <a:rPr lang="en-US" smtClean="0"/>
-              <a:t>3/14/2018</a:t>
+              <a:t>3/19/18</a:t>
             </a:fld>
             <a:endParaRPr lang="en-US"/>
           </a:p>
@@ -2856,7 +2856,7 @@
           <a:p>
             <a:fld id="{78C97017-6FC3-485B-9764-EAC9E56C1D49}" type="datetimeFigureOut">
               <a:rPr lang="en-US" smtClean="0"/>
-              <a:t>3/14/2018</a:t>
+              <a:t>3/19/18</a:t>
             </a:fld>
             <a:endParaRPr lang="en-US"/>
           </a:p>
@@ -3067,7 +3067,7 @@
           <a:p>
             <a:fld id="{78C97017-6FC3-485B-9764-EAC9E56C1D49}" type="datetimeFigureOut">
               <a:rPr lang="en-US" smtClean="0"/>
-              <a:t>3/14/2018</a:t>
+              <a:t>3/19/18</a:t>
             </a:fld>
             <a:endParaRPr lang="en-US"/>
           </a:p>
@@ -3450,8 +3450,8 @@
         </p:nvSpPr>
         <p:spPr>
           <a:xfrm>
-            <a:off x="1119865" y="1727200"/>
-            <a:ext cx="7490735" cy="2997200"/>
+            <a:off x="1119865" y="1066800"/>
+            <a:ext cx="7543800" cy="3810000"/>
           </a:xfrm>
           <a:prstGeom prst="roundRect">
             <a:avLst>
@@ -4102,7 +4102,7 @@
         </p:nvSpPr>
         <p:spPr>
           <a:xfrm>
-            <a:off x="4487017" y="2847371"/>
+            <a:off x="4627542" y="2847371"/>
             <a:ext cx="1156969" cy="346760"/>
           </a:xfrm>
           <a:prstGeom prst="rect">
@@ -4201,6 +4201,7 @@
         <p:nvCxnSpPr>
           <p:cNvPr id="30" name="Elbow Connector 29"/>
           <p:cNvCxnSpPr>
+            <a:cxnSpLocks/>
             <a:stCxn id="51" idx="3"/>
             <a:endCxn id="49" idx="1"/>
           </p:cNvCxnSpPr>
@@ -4209,7 +4210,7 @@
         <p:spPr>
           <a:xfrm>
             <a:off x="4220351" y="2760681"/>
-            <a:ext cx="266666" cy="260070"/>
+            <a:ext cx="407191" cy="260070"/>
           </a:xfrm>
           <a:prstGeom prst="bentConnector3">
             <a:avLst/>
@@ -4246,7 +4247,7 @@
         </p:nvSpPr>
         <p:spPr>
           <a:xfrm>
-            <a:off x="4477328" y="2280569"/>
+            <a:off x="4617853" y="2280569"/>
             <a:ext cx="1156969" cy="346760"/>
           </a:xfrm>
           <a:prstGeom prst="rect">
@@ -4298,6 +4299,7 @@
         <p:nvCxnSpPr>
           <p:cNvPr id="59" name="Elbow Connector 58"/>
           <p:cNvCxnSpPr>
+            <a:cxnSpLocks/>
             <a:stCxn id="51" idx="3"/>
             <a:endCxn id="57" idx="1"/>
           </p:cNvCxnSpPr>
@@ -4306,7 +4308,7 @@
         <p:spPr>
           <a:xfrm flipV="1">
             <a:off x="4220351" y="2453949"/>
-            <a:ext cx="256977" cy="306732"/>
+            <a:ext cx="397502" cy="306732"/>
           </a:xfrm>
           <a:prstGeom prst="bentConnector3">
             <a:avLst>
@@ -4401,7 +4403,7 @@
         </p:nvSpPr>
         <p:spPr>
           <a:xfrm>
-            <a:off x="5643227" y="2943979"/>
+            <a:off x="5783752" y="2943979"/>
             <a:ext cx="236048" cy="173380"/>
           </a:xfrm>
           <a:prstGeom prst="flowChartDecision">
@@ -4449,8 +4451,8 @@
         </p:nvCxnSpPr>
         <p:spPr>
           <a:xfrm>
-            <a:off x="5879275" y="3030669"/>
-            <a:ext cx="434402" cy="777"/>
+            <a:off x="6019800" y="3030669"/>
+            <a:ext cx="293877" cy="777"/>
           </a:xfrm>
           <a:prstGeom prst="bentConnector3">
             <a:avLst/>
@@ -4487,7 +4489,7 @@
         </p:nvSpPr>
         <p:spPr>
           <a:xfrm>
-            <a:off x="5336105" y="1809332"/>
+            <a:off x="5476630" y="1809332"/>
             <a:ext cx="483700" cy="346760"/>
           </a:xfrm>
           <a:prstGeom prst="rect">
@@ -4543,7 +4545,7 @@
         </p:nvSpPr>
         <p:spPr>
           <a:xfrm rot="16200000">
-            <a:off x="4921666" y="2066540"/>
+            <a:off x="5062191" y="2066540"/>
             <a:ext cx="236048" cy="173380"/>
           </a:xfrm>
           <a:prstGeom prst="flowChartDecision">
@@ -4591,7 +4593,7 @@
         </p:nvCxnSpPr>
         <p:spPr>
           <a:xfrm rot="5400000" flipH="1" flipV="1">
-            <a:off x="5161650" y="1860752"/>
+            <a:off x="5302175" y="1860752"/>
             <a:ext cx="52494" cy="296415"/>
           </a:xfrm>
           <a:prstGeom prst="bentConnector2">
@@ -5381,8 +5383,8 @@
         </p:nvCxnSpPr>
         <p:spPr>
           <a:xfrm rot="16200000" flipV="1">
-            <a:off x="5948976" y="2139271"/>
-            <a:ext cx="404117" cy="1033473"/>
+            <a:off x="6019238" y="2209534"/>
+            <a:ext cx="404117" cy="892948"/>
           </a:xfrm>
           <a:prstGeom prst="bentConnector2">
             <a:avLst/>
@@ -5419,7 +5421,7 @@
         </p:nvSpPr>
         <p:spPr>
           <a:xfrm>
-            <a:off x="4324972" y="2191228"/>
+            <a:off x="4465497" y="2191228"/>
             <a:ext cx="189257" cy="178683"/>
           </a:xfrm>
           <a:prstGeom prst="rect">
@@ -5458,7 +5460,7 @@
         </p:nvSpPr>
         <p:spPr>
           <a:xfrm>
-            <a:off x="4324972" y="3058864"/>
+            <a:off x="4465497" y="3058864"/>
             <a:ext cx="189257" cy="178683"/>
           </a:xfrm>
           <a:prstGeom prst="rect">
@@ -5497,7 +5499,7 @@
         </p:nvSpPr>
         <p:spPr>
           <a:xfrm>
-            <a:off x="5689761" y="2495413"/>
+            <a:off x="5830286" y="2495413"/>
             <a:ext cx="189257" cy="178683"/>
           </a:xfrm>
           <a:prstGeom prst="rect">
@@ -5536,7 +5538,7 @@
         </p:nvSpPr>
         <p:spPr>
           <a:xfrm>
-            <a:off x="5163172" y="1778919"/>
+            <a:off x="5303697" y="1778919"/>
             <a:ext cx="189257" cy="178683"/>
           </a:xfrm>
           <a:prstGeom prst="rect">
@@ -5828,6 +5830,363 @@
               <a:t>Birthday</a:t>
             </a:r>
             <a:endParaRPr lang="en-SG" sz="1050" dirty="0">
+              <a:solidFill>
+                <a:srgbClr val="7030A0"/>
+              </a:solidFill>
+            </a:endParaRPr>
+          </a:p>
+        </p:txBody>
+      </p:sp>
+      <p:sp>
+        <p:nvSpPr>
+          <p:cNvPr id="71" name="Rectangle 8">
+            <a:extLst>
+              <a:ext uri="{FF2B5EF4-FFF2-40B4-BE49-F238E27FC236}">
+                <a16:creationId xmlns:a16="http://schemas.microsoft.com/office/drawing/2014/main" id="{76D5EF6D-FCC2-0747-8417-DB0894F6D4D8}"/>
+              </a:ext>
+            </a:extLst>
+          </p:cNvPr>
+          <p:cNvSpPr/>
+          <p:nvPr/>
+        </p:nvSpPr>
+        <p:spPr>
+          <a:xfrm>
+            <a:off x="4601729" y="1341345"/>
+            <a:ext cx="1156969" cy="346760"/>
+          </a:xfrm>
+          <a:prstGeom prst="rect">
+            <a:avLst/>
+          </a:prstGeom>
+          <a:ln w="19050">
+            <a:solidFill>
+              <a:srgbClr val="7030A0"/>
+            </a:solidFill>
+          </a:ln>
+          <a:effectLst/>
+        </p:spPr>
+        <p:style>
+          <a:lnRef idx="1">
+            <a:schemeClr val="accent4"/>
+          </a:lnRef>
+          <a:fillRef idx="2">
+            <a:schemeClr val="accent4"/>
+          </a:fillRef>
+          <a:effectRef idx="1">
+            <a:schemeClr val="accent4"/>
+          </a:effectRef>
+          <a:fontRef idx="minor">
+            <a:schemeClr val="dk1"/>
+          </a:fontRef>
+        </p:style>
+        <p:txBody>
+          <a:bodyPr rtlCol="0" anchor="ctr"/>
+          <a:lstStyle/>
+          <a:p>
+            <a:pPr algn="ctr"/>
+            <a:r>
+              <a:rPr lang="en-US" sz="1050" dirty="0" err="1">
+                <a:solidFill>
+                  <a:srgbClr val="7030A0"/>
+                </a:solidFill>
+              </a:rPr>
+              <a:t>UniqueAliasList</a:t>
+            </a:r>
+            <a:endParaRPr lang="en-SG" sz="1050" dirty="0">
+              <a:solidFill>
+                <a:srgbClr val="7030A0"/>
+              </a:solidFill>
+            </a:endParaRPr>
+          </a:p>
+        </p:txBody>
+      </p:sp>
+      <p:cxnSp>
+        <p:nvCxnSpPr>
+          <p:cNvPr id="72" name="Elbow Connector 71">
+            <a:extLst>
+              <a:ext uri="{FF2B5EF4-FFF2-40B4-BE49-F238E27FC236}">
+                <a16:creationId xmlns:a16="http://schemas.microsoft.com/office/drawing/2014/main" id="{BC1253F9-1BA2-EA46-814E-F7D577F531E0}"/>
+              </a:ext>
+            </a:extLst>
+          </p:cNvPr>
+          <p:cNvCxnSpPr>
+            <a:cxnSpLocks/>
+          </p:cNvCxnSpPr>
+          <p:nvPr/>
+        </p:nvCxnSpPr>
+        <p:spPr>
+          <a:xfrm flipV="1">
+            <a:off x="4250860" y="1515583"/>
+            <a:ext cx="351649" cy="1257661"/>
+          </a:xfrm>
+          <a:prstGeom prst="bentConnector3">
+            <a:avLst>
+              <a:gd name="adj1" fmla="val 50000"/>
+            </a:avLst>
+          </a:prstGeom>
+          <a:ln w="19050">
+            <a:solidFill>
+              <a:srgbClr val="7030A0"/>
+            </a:solidFill>
+            <a:headEnd type="none" w="med" len="med"/>
+            <a:tailEnd type="arrow" w="med" len="med"/>
+          </a:ln>
+          <a:effectLst/>
+        </p:spPr>
+        <p:style>
+          <a:lnRef idx="1">
+            <a:schemeClr val="accent2"/>
+          </a:lnRef>
+          <a:fillRef idx="2">
+            <a:schemeClr val="accent2"/>
+          </a:fillRef>
+          <a:effectRef idx="1">
+            <a:schemeClr val="accent2"/>
+          </a:effectRef>
+          <a:fontRef idx="minor">
+            <a:schemeClr val="dk1"/>
+          </a:fontRef>
+        </p:style>
+      </p:cxnSp>
+      <p:sp>
+        <p:nvSpPr>
+          <p:cNvPr id="91" name="Rectangle 8">
+            <a:extLst>
+              <a:ext uri="{FF2B5EF4-FFF2-40B4-BE49-F238E27FC236}">
+                <a16:creationId xmlns:a16="http://schemas.microsoft.com/office/drawing/2014/main" id="{CF17ECC3-20C1-3F44-9AFD-0AE23786E25D}"/>
+              </a:ext>
+            </a:extLst>
+          </p:cNvPr>
+          <p:cNvSpPr/>
+          <p:nvPr/>
+        </p:nvSpPr>
+        <p:spPr>
+          <a:xfrm>
+            <a:off x="6308626" y="1342945"/>
+            <a:ext cx="708186" cy="346760"/>
+          </a:xfrm>
+          <a:prstGeom prst="rect">
+            <a:avLst/>
+          </a:prstGeom>
+          <a:ln w="19050">
+            <a:solidFill>
+              <a:srgbClr val="7030A0"/>
+            </a:solidFill>
+          </a:ln>
+          <a:effectLst/>
+        </p:spPr>
+        <p:style>
+          <a:lnRef idx="1">
+            <a:schemeClr val="accent4"/>
+          </a:lnRef>
+          <a:fillRef idx="2">
+            <a:schemeClr val="accent4"/>
+          </a:fillRef>
+          <a:effectRef idx="1">
+            <a:schemeClr val="accent4"/>
+          </a:effectRef>
+          <a:fontRef idx="minor">
+            <a:schemeClr val="dk1"/>
+          </a:fontRef>
+        </p:style>
+        <p:txBody>
+          <a:bodyPr rtlCol="0" anchor="ctr"/>
+          <a:lstStyle/>
+          <a:p>
+            <a:pPr algn="ctr"/>
+            <a:r>
+              <a:rPr lang="en-US" sz="1050" dirty="0">
+                <a:solidFill>
+                  <a:srgbClr val="7030A0"/>
+                </a:solidFill>
+              </a:rPr>
+              <a:t>Alias</a:t>
+            </a:r>
+            <a:endParaRPr lang="en-SG" sz="1050" dirty="0">
+              <a:solidFill>
+                <a:srgbClr val="7030A0"/>
+              </a:solidFill>
+            </a:endParaRPr>
+          </a:p>
+        </p:txBody>
+      </p:sp>
+      <p:sp>
+        <p:nvSpPr>
+          <p:cNvPr id="92" name="Flowchart: Decision 96">
+            <a:extLst>
+              <a:ext uri="{FF2B5EF4-FFF2-40B4-BE49-F238E27FC236}">
+                <a16:creationId xmlns:a16="http://schemas.microsoft.com/office/drawing/2014/main" id="{791017F0-DFB4-E149-BC6F-CAF2C30B087F}"/>
+              </a:ext>
+            </a:extLst>
+          </p:cNvPr>
+          <p:cNvSpPr/>
+          <p:nvPr/>
+        </p:nvSpPr>
+        <p:spPr>
+          <a:xfrm>
+            <a:off x="5778701" y="1428858"/>
+            <a:ext cx="236048" cy="173380"/>
+          </a:xfrm>
+          <a:prstGeom prst="flowChartDecision">
+            <a:avLst/>
+          </a:prstGeom>
+          <a:noFill/>
+          <a:ln w="19050">
+            <a:solidFill>
+              <a:srgbClr val="7030A0"/>
+            </a:solidFill>
+          </a:ln>
+          <a:effectLst/>
+        </p:spPr>
+        <p:style>
+          <a:lnRef idx="1">
+            <a:schemeClr val="accent6"/>
+          </a:lnRef>
+          <a:fillRef idx="2">
+            <a:schemeClr val="accent6"/>
+          </a:fillRef>
+          <a:effectRef idx="1">
+            <a:schemeClr val="accent6"/>
+          </a:effectRef>
+          <a:fontRef idx="minor">
+            <a:schemeClr val="dk1"/>
+          </a:fontRef>
+        </p:style>
+        <p:txBody>
+          <a:bodyPr rtlCol="0" anchor="ctr"/>
+          <a:lstStyle/>
+          <a:p>
+            <a:pPr algn="ctr"/>
+            <a:endParaRPr lang="en-US" sz="1050"/>
+          </a:p>
+        </p:txBody>
+      </p:sp>
+      <p:cxnSp>
+        <p:nvCxnSpPr>
+          <p:cNvPr id="93" name="Elbow Connector 92">
+            <a:extLst>
+              <a:ext uri="{FF2B5EF4-FFF2-40B4-BE49-F238E27FC236}">
+                <a16:creationId xmlns:a16="http://schemas.microsoft.com/office/drawing/2014/main" id="{C9031926-0904-8343-A94B-0EBCEB90075F}"/>
+              </a:ext>
+            </a:extLst>
+          </p:cNvPr>
+          <p:cNvCxnSpPr/>
+          <p:nvPr/>
+        </p:nvCxnSpPr>
+        <p:spPr>
+          <a:xfrm>
+            <a:off x="6014749" y="1515548"/>
+            <a:ext cx="293877" cy="777"/>
+          </a:xfrm>
+          <a:prstGeom prst="bentConnector3">
+            <a:avLst/>
+          </a:prstGeom>
+          <a:ln w="19050">
+            <a:solidFill>
+              <a:srgbClr val="7030A0"/>
+            </a:solidFill>
+            <a:headEnd type="none" w="med" len="med"/>
+            <a:tailEnd type="arrow" w="med" len="med"/>
+          </a:ln>
+          <a:effectLst/>
+        </p:spPr>
+        <p:style>
+          <a:lnRef idx="1">
+            <a:schemeClr val="accent2"/>
+          </a:lnRef>
+          <a:fillRef idx="2">
+            <a:schemeClr val="accent2"/>
+          </a:fillRef>
+          <a:effectRef idx="1">
+            <a:schemeClr val="accent2"/>
+          </a:effectRef>
+          <a:fontRef idx="minor">
+            <a:schemeClr val="dk1"/>
+          </a:fontRef>
+        </p:style>
+      </p:cxnSp>
+      <p:sp>
+        <p:nvSpPr>
+          <p:cNvPr id="94" name="TextBox 93">
+            <a:extLst>
+              <a:ext uri="{FF2B5EF4-FFF2-40B4-BE49-F238E27FC236}">
+                <a16:creationId xmlns:a16="http://schemas.microsoft.com/office/drawing/2014/main" id="{A3807421-1253-6A47-9539-7B06DFADEDF3}"/>
+              </a:ext>
+            </a:extLst>
+          </p:cNvPr>
+          <p:cNvSpPr txBox="1"/>
+          <p:nvPr/>
+        </p:nvSpPr>
+        <p:spPr>
+          <a:xfrm>
+            <a:off x="6130205" y="1582796"/>
+            <a:ext cx="189257" cy="178683"/>
+          </a:xfrm>
+          <a:prstGeom prst="rect">
+            <a:avLst/>
+          </a:prstGeom>
+          <a:noFill/>
+        </p:spPr>
+        <p:txBody>
+          <a:bodyPr wrap="square" lIns="0" tIns="0" rIns="0" bIns="0" rtlCol="0">
+            <a:noAutofit/>
+          </a:bodyPr>
+          <a:lstStyle/>
+          <a:p>
+            <a:pPr algn="ctr"/>
+            <a:r>
+              <a:rPr lang="en-US" sz="1100" dirty="0">
+                <a:solidFill>
+                  <a:srgbClr val="7030A0"/>
+                </a:solidFill>
+              </a:rPr>
+              <a:t>*</a:t>
+            </a:r>
+            <a:endParaRPr lang="en-SG" sz="1100" dirty="0">
+              <a:solidFill>
+                <a:srgbClr val="7030A0"/>
+              </a:solidFill>
+            </a:endParaRPr>
+          </a:p>
+        </p:txBody>
+      </p:sp>
+      <p:sp>
+        <p:nvSpPr>
+          <p:cNvPr id="95" name="TextBox 94">
+            <a:extLst>
+              <a:ext uri="{FF2B5EF4-FFF2-40B4-BE49-F238E27FC236}">
+                <a16:creationId xmlns:a16="http://schemas.microsoft.com/office/drawing/2014/main" id="{181A2D7A-7808-A142-8769-FC56B5D5EF93}"/>
+              </a:ext>
+            </a:extLst>
+          </p:cNvPr>
+          <p:cNvSpPr txBox="1"/>
+          <p:nvPr/>
+        </p:nvSpPr>
+        <p:spPr>
+          <a:xfrm>
+            <a:off x="4410966" y="1257307"/>
+            <a:ext cx="189257" cy="178683"/>
+          </a:xfrm>
+          <a:prstGeom prst="rect">
+            <a:avLst/>
+          </a:prstGeom>
+          <a:noFill/>
+        </p:spPr>
+        <p:txBody>
+          <a:bodyPr wrap="square" lIns="0" tIns="0" rIns="0" bIns="0" rtlCol="0">
+            <a:noAutofit/>
+          </a:bodyPr>
+          <a:lstStyle/>
+          <a:p>
+            <a:pPr algn="ctr"/>
+            <a:r>
+              <a:rPr lang="en-US" sz="1100" dirty="0">
+                <a:solidFill>
+                  <a:srgbClr val="7030A0"/>
+                </a:solidFill>
+              </a:rPr>
+              <a:t>1</a:t>
+            </a:r>
+            <a:endParaRPr lang="en-SG" sz="1100" dirty="0">
               <a:solidFill>
                 <a:srgbClr val="7030A0"/>
               </a:solidFill>

</xml_diff>

<commit_message>
Resolve merge conflict and edit grammatical and punctuation error
</commit_message>
<xml_diff>
--- a/docs/diagrams/ModelComponentClassDiagram.pptx
+++ b/docs/diagrams/ModelComponentClassDiagram.pptx
@@ -109,7 +109,7 @@
   </p:defaultTextStyle>
   <p:extLst>
     <p:ext uri="{EFAFB233-063F-42B5-8137-9DF3F51BA10A}">
-      <p15:sldGuideLst xmlns:p15="http://schemas.microsoft.com/office/powerpoint/2012/main" xmlns="">
+      <p15:sldGuideLst xmlns:p15="http://schemas.microsoft.com/office/powerpoint/2012/main">
         <p15:guide id="1" orient="horz" pos="1488">
           <p15:clr>
             <a:srgbClr val="A4A3A4"/>
@@ -208,7 +208,7 @@
           <a:p>
             <a:fld id="{F5CC4B3F-88C1-4FFA-B1B6-F41C21DC6924}" type="datetimeFigureOut">
               <a:rPr lang="en-US" smtClean="0"/>
-              <a:t>3/23/2018</a:t>
+              <a:t>3/26/2018</a:t>
             </a:fld>
             <a:endParaRPr lang="en-US"/>
           </a:p>
@@ -657,7 +657,7 @@
           <a:p>
             <a:fld id="{78C97017-6FC3-485B-9764-EAC9E56C1D49}" type="datetimeFigureOut">
               <a:rPr lang="en-US" smtClean="0"/>
-              <a:t>3/23/2018</a:t>
+              <a:t>3/26/2018</a:t>
             </a:fld>
             <a:endParaRPr lang="en-US"/>
           </a:p>
@@ -827,7 +827,7 @@
           <a:p>
             <a:fld id="{78C97017-6FC3-485B-9764-EAC9E56C1D49}" type="datetimeFigureOut">
               <a:rPr lang="en-US" smtClean="0"/>
-              <a:t>3/23/2018</a:t>
+              <a:t>3/26/2018</a:t>
             </a:fld>
             <a:endParaRPr lang="en-US"/>
           </a:p>
@@ -1007,7 +1007,7 @@
           <a:p>
             <a:fld id="{78C97017-6FC3-485B-9764-EAC9E56C1D49}" type="datetimeFigureOut">
               <a:rPr lang="en-US" smtClean="0"/>
-              <a:t>3/23/2018</a:t>
+              <a:t>3/26/2018</a:t>
             </a:fld>
             <a:endParaRPr lang="en-US"/>
           </a:p>
@@ -1177,7 +1177,7 @@
           <a:p>
             <a:fld id="{78C97017-6FC3-485B-9764-EAC9E56C1D49}" type="datetimeFigureOut">
               <a:rPr lang="en-US" smtClean="0"/>
-              <a:t>3/23/2018</a:t>
+              <a:t>3/26/2018</a:t>
             </a:fld>
             <a:endParaRPr lang="en-US"/>
           </a:p>
@@ -1423,7 +1423,7 @@
           <a:p>
             <a:fld id="{78C97017-6FC3-485B-9764-EAC9E56C1D49}" type="datetimeFigureOut">
               <a:rPr lang="en-US" smtClean="0"/>
-              <a:t>3/23/2018</a:t>
+              <a:t>3/26/2018</a:t>
             </a:fld>
             <a:endParaRPr lang="en-US"/>
           </a:p>
@@ -1711,7 +1711,7 @@
           <a:p>
             <a:fld id="{78C97017-6FC3-485B-9764-EAC9E56C1D49}" type="datetimeFigureOut">
               <a:rPr lang="en-US" smtClean="0"/>
-              <a:t>3/23/2018</a:t>
+              <a:t>3/26/2018</a:t>
             </a:fld>
             <a:endParaRPr lang="en-US"/>
           </a:p>
@@ -2133,7 +2133,7 @@
           <a:p>
             <a:fld id="{78C97017-6FC3-485B-9764-EAC9E56C1D49}" type="datetimeFigureOut">
               <a:rPr lang="en-US" smtClean="0"/>
-              <a:t>3/23/2018</a:t>
+              <a:t>3/26/2018</a:t>
             </a:fld>
             <a:endParaRPr lang="en-US"/>
           </a:p>
@@ -2251,7 +2251,7 @@
           <a:p>
             <a:fld id="{78C97017-6FC3-485B-9764-EAC9E56C1D49}" type="datetimeFigureOut">
               <a:rPr lang="en-US" smtClean="0"/>
-              <a:t>3/23/2018</a:t>
+              <a:t>3/26/2018</a:t>
             </a:fld>
             <a:endParaRPr lang="en-US"/>
           </a:p>
@@ -2346,7 +2346,7 @@
           <a:p>
             <a:fld id="{78C97017-6FC3-485B-9764-EAC9E56C1D49}" type="datetimeFigureOut">
               <a:rPr lang="en-US" smtClean="0"/>
-              <a:t>3/23/2018</a:t>
+              <a:t>3/26/2018</a:t>
             </a:fld>
             <a:endParaRPr lang="en-US"/>
           </a:p>
@@ -2623,7 +2623,7 @@
           <a:p>
             <a:fld id="{78C97017-6FC3-485B-9764-EAC9E56C1D49}" type="datetimeFigureOut">
               <a:rPr lang="en-US" smtClean="0"/>
-              <a:t>3/23/2018</a:t>
+              <a:t>3/26/2018</a:t>
             </a:fld>
             <a:endParaRPr lang="en-US"/>
           </a:p>
@@ -2876,7 +2876,7 @@
           <a:p>
             <a:fld id="{78C97017-6FC3-485B-9764-EAC9E56C1D49}" type="datetimeFigureOut">
               <a:rPr lang="en-US" smtClean="0"/>
-              <a:t>3/23/2018</a:t>
+              <a:t>3/26/2018</a:t>
             </a:fld>
             <a:endParaRPr lang="en-US"/>
           </a:p>
@@ -3089,7 +3089,7 @@
           <a:p>
             <a:fld id="{78C97017-6FC3-485B-9764-EAC9E56C1D49}" type="datetimeFigureOut">
               <a:rPr lang="en-US" smtClean="0"/>
-              <a:t>3/23/2018</a:t>
+              <a:t>3/26/2018</a:t>
             </a:fld>
             <a:endParaRPr lang="en-US"/>
           </a:p>
@@ -4406,11 +4406,6 @@
               </a:rPr>
               <a:t>(abstract)</a:t>
             </a:r>
-            <a:endParaRPr lang="en-US" altLang="zh-CN" sz="1050" dirty="0" smtClean="0">
-              <a:solidFill>
-                <a:srgbClr val="7030A0"/>
-              </a:solidFill>
-            </a:endParaRPr>
           </a:p>
           <a:p>
             <a:pPr algn="ctr"/>
@@ -5930,17 +5925,18 @@
           <p:cNvPr id="94" name="Elbow Connector 80"/>
           <p:cNvCxnSpPr>
             <a:stCxn id="93" idx="3"/>
+            <a:endCxn id="76" idx="1"/>
           </p:cNvCxnSpPr>
           <p:nvPr/>
         </p:nvCxnSpPr>
         <p:spPr>
           <a:xfrm flipV="1">
-            <a:off x="7833818" y="2112534"/>
-            <a:ext cx="240901" cy="185987"/>
+            <a:off x="7833818" y="2102326"/>
+            <a:ext cx="273806" cy="196195"/>
           </a:xfrm>
           <a:prstGeom prst="bentConnector3">
             <a:avLst>
-              <a:gd name="adj1" fmla="val 30590"/>
+              <a:gd name="adj1" fmla="val 50000"/>
             </a:avLst>
           </a:prstGeom>
           <a:ln w="19050">
@@ -5972,17 +5968,18 @@
           <p:cNvPr id="95" name="Elbow Connector 83"/>
           <p:cNvCxnSpPr>
             <a:stCxn id="93" idx="3"/>
+            <a:endCxn id="80" idx="1"/>
           </p:cNvCxnSpPr>
           <p:nvPr/>
         </p:nvCxnSpPr>
         <p:spPr>
           <a:xfrm>
             <a:off x="7833818" y="2298521"/>
-            <a:ext cx="240901" cy="136991"/>
+            <a:ext cx="273806" cy="126783"/>
           </a:xfrm>
           <a:prstGeom prst="bentConnector3">
             <a:avLst>
-              <a:gd name="adj1" fmla="val 30590"/>
+              <a:gd name="adj1" fmla="val 50000"/>
             </a:avLst>
           </a:prstGeom>
           <a:ln w="19050">
@@ -6025,7 +6022,7 @@
           </a:xfrm>
           <a:prstGeom prst="bentConnector3">
             <a:avLst>
-              <a:gd name="adj1" fmla="val 27230"/>
+              <a:gd name="adj1" fmla="val 49494"/>
             </a:avLst>
           </a:prstGeom>
           <a:ln w="19050">

</xml_diff>

<commit_message>
[#143][#173] Developer Guide edit (#184)
* Add major/minor feature documentation for everyone

* Userguide typo fixes

* Merge branch 'LoginTestDevelopment' of https://github.com/dominickenn/main

# Conflicts:
#	src/main/java/seedu/organizer/logic/parser/OrganizerParser.java
#	src/test/java/systemtests/AddCommandSystemTest.java
#	src/test/java/systemtests/EditCommandSystemTest.java
#	src/test/java/systemtests/FindNameCommandSystemTest.java

* Revert "Merge branch 'LoginTestDevelopment' of https://github.com/dominickenn/main"

This reverts commit a55ef3e16d15e877b55d8374e5d951c4dff07c01.

* Fix merge conflict

* Edit message

* Edit UML diagrams

* Edited implementation

* Edit logging

* Edit configuration

* Edit documentation

* Edit testing

* Edit dev ops

* Edit appendix A

* Edit appendix B

* Edit appendix C

* Minor edit appendix F

* Fix checkstyle
</commit_message>
<xml_diff>
--- a/docs/diagrams/ModelComponentClassDiagram.pptx
+++ b/docs/diagrams/ModelComponentClassDiagram.pptx
@@ -109,7 +109,7 @@
   </p:defaultTextStyle>
   <p:extLst>
     <p:ext uri="{EFAFB233-063F-42B5-8137-9DF3F51BA10A}">
-      <p15:sldGuideLst xmlns:p15="http://schemas.microsoft.com/office/powerpoint/2012/main">
+      <p15:sldGuideLst xmlns:p15="http://schemas.microsoft.com/office/powerpoint/2012/main" xmlns="">
         <p15:guide id="1" orient="horz" pos="1488">
           <p15:clr>
             <a:srgbClr val="A4A3A4"/>
@@ -208,7 +208,7 @@
           <a:p>
             <a:fld id="{F5CC4B3F-88C1-4FFA-B1B6-F41C21DC6924}" type="datetimeFigureOut">
               <a:rPr lang="en-US" smtClean="0"/>
-              <a:t>3/17/2018</a:t>
+              <a:t>4/2/2018</a:t>
             </a:fld>
             <a:endParaRPr lang="en-US"/>
           </a:p>
@@ -654,7 +654,7 @@
           <a:p>
             <a:fld id="{78C97017-6FC3-485B-9764-EAC9E56C1D49}" type="datetimeFigureOut">
               <a:rPr lang="en-US" smtClean="0"/>
-              <a:t>3/17/2018</a:t>
+              <a:t>4/2/2018</a:t>
             </a:fld>
             <a:endParaRPr lang="en-US"/>
           </a:p>
@@ -822,7 +822,7 @@
           <a:p>
             <a:fld id="{78C97017-6FC3-485B-9764-EAC9E56C1D49}" type="datetimeFigureOut">
               <a:rPr lang="en-US" smtClean="0"/>
-              <a:t>3/17/2018</a:t>
+              <a:t>4/2/2018</a:t>
             </a:fld>
             <a:endParaRPr lang="en-US"/>
           </a:p>
@@ -1000,7 +1000,7 @@
           <a:p>
             <a:fld id="{78C97017-6FC3-485B-9764-EAC9E56C1D49}" type="datetimeFigureOut">
               <a:rPr lang="en-US" smtClean="0"/>
-              <a:t>3/17/2018</a:t>
+              <a:t>4/2/2018</a:t>
             </a:fld>
             <a:endParaRPr lang="en-US"/>
           </a:p>
@@ -1168,7 +1168,7 @@
           <a:p>
             <a:fld id="{78C97017-6FC3-485B-9764-EAC9E56C1D49}" type="datetimeFigureOut">
               <a:rPr lang="en-US" smtClean="0"/>
-              <a:t>3/17/2018</a:t>
+              <a:t>4/2/2018</a:t>
             </a:fld>
             <a:endParaRPr lang="en-US"/>
           </a:p>
@@ -1413,7 +1413,7 @@
           <a:p>
             <a:fld id="{78C97017-6FC3-485B-9764-EAC9E56C1D49}" type="datetimeFigureOut">
               <a:rPr lang="en-US" smtClean="0"/>
-              <a:t>3/17/2018</a:t>
+              <a:t>4/2/2018</a:t>
             </a:fld>
             <a:endParaRPr lang="en-US"/>
           </a:p>
@@ -1698,7 +1698,7 @@
           <a:p>
             <a:fld id="{78C97017-6FC3-485B-9764-EAC9E56C1D49}" type="datetimeFigureOut">
               <a:rPr lang="en-US" smtClean="0"/>
-              <a:t>3/17/2018</a:t>
+              <a:t>4/2/2018</a:t>
             </a:fld>
             <a:endParaRPr lang="en-US"/>
           </a:p>
@@ -2117,7 +2117,7 @@
           <a:p>
             <a:fld id="{78C97017-6FC3-485B-9764-EAC9E56C1D49}" type="datetimeFigureOut">
               <a:rPr lang="en-US" smtClean="0"/>
-              <a:t>3/17/2018</a:t>
+              <a:t>4/2/2018</a:t>
             </a:fld>
             <a:endParaRPr lang="en-US"/>
           </a:p>
@@ -2234,7 +2234,7 @@
           <a:p>
             <a:fld id="{78C97017-6FC3-485B-9764-EAC9E56C1D49}" type="datetimeFigureOut">
               <a:rPr lang="en-US" smtClean="0"/>
-              <a:t>3/17/2018</a:t>
+              <a:t>4/2/2018</a:t>
             </a:fld>
             <a:endParaRPr lang="en-US"/>
           </a:p>
@@ -2329,7 +2329,7 @@
           <a:p>
             <a:fld id="{78C97017-6FC3-485B-9764-EAC9E56C1D49}" type="datetimeFigureOut">
               <a:rPr lang="en-US" smtClean="0"/>
-              <a:t>3/17/2018</a:t>
+              <a:t>4/2/2018</a:t>
             </a:fld>
             <a:endParaRPr lang="en-US"/>
           </a:p>
@@ -2604,7 +2604,7 @@
           <a:p>
             <a:fld id="{78C97017-6FC3-485B-9764-EAC9E56C1D49}" type="datetimeFigureOut">
               <a:rPr lang="en-US" smtClean="0"/>
-              <a:t>3/17/2018</a:t>
+              <a:t>4/2/2018</a:t>
             </a:fld>
             <a:endParaRPr lang="en-US"/>
           </a:p>
@@ -2856,7 +2856,7 @@
           <a:p>
             <a:fld id="{78C97017-6FC3-485B-9764-EAC9E56C1D49}" type="datetimeFigureOut">
               <a:rPr lang="en-US" smtClean="0"/>
-              <a:t>3/17/2018</a:t>
+              <a:t>4/2/2018</a:t>
             </a:fld>
             <a:endParaRPr lang="en-US"/>
           </a:p>
@@ -3067,7 +3067,7 @@
           <a:p>
             <a:fld id="{78C97017-6FC3-485B-9764-EAC9E56C1D49}" type="datetimeFigureOut">
               <a:rPr lang="en-US" smtClean="0"/>
-              <a:t>3/17/2018</a:t>
+              <a:t>4/2/2018</a:t>
             </a:fld>
             <a:endParaRPr lang="en-US"/>
           </a:p>
@@ -3636,7 +3636,7 @@
           </a:xfrm>
           <a:prstGeom prst="bentConnector4">
             <a:avLst>
-              <a:gd name="adj1" fmla="val -101829"/>
+              <a:gd name="adj1" fmla="val -125976"/>
               <a:gd name="adj2" fmla="val 99976"/>
             </a:avLst>
           </a:prstGeom>
@@ -5304,6 +5304,14 @@
                 </a:solidFill>
               </a:rPr>
               <a:t>&lt;&lt;interface&gt;&gt;</a:t>
+            </a:r>
+            <a:r>
+              <a:rPr lang="en-US" sz="1050">
+                <a:solidFill>
+                  <a:srgbClr val="7030A0"/>
+                </a:solidFill>
+              </a:rPr>
+              <a:t/>
             </a:r>
             <a:br>
               <a:rPr lang="en-US" sz="1050">
@@ -5845,11 +5853,13 @@
         </p:nvCxnSpPr>
         <p:spPr>
           <a:xfrm rot="16200000" flipH="1">
-            <a:off x="7433400" y="3414963"/>
-            <a:ext cx="321071" cy="217201"/>
-          </a:xfrm>
-          <a:prstGeom prst="bentConnector2">
-            <a:avLst/>
+            <a:off x="7438093" y="3419656"/>
+            <a:ext cx="313750" cy="215136"/>
+          </a:xfrm>
+          <a:prstGeom prst="bentConnector3">
+            <a:avLst>
+              <a:gd name="adj1" fmla="val 99788"/>
+            </a:avLst>
           </a:prstGeom>
           <a:ln w="19050">
             <a:solidFill>
@@ -5974,14 +5984,12 @@
       <p:cxnSp>
         <p:nvCxnSpPr>
           <p:cNvPr id="73" name="Elbow Connector 72"/>
-          <p:cNvCxnSpPr>
-            <a:endCxn id="55" idx="1"/>
-          </p:cNvCxnSpPr>
+          <p:cNvCxnSpPr/>
           <p:nvPr/>
         </p:nvCxnSpPr>
         <p:spPr>
           <a:xfrm rot="16200000" flipH="1">
-            <a:off x="7428516" y="3732782"/>
+            <a:off x="7430580" y="3730876"/>
             <a:ext cx="332573" cy="218933"/>
           </a:xfrm>
           <a:prstGeom prst="bentConnector2">
@@ -6016,7 +6024,7 @@
           <p:cNvPr id="74" name="Rectangle 8">
             <a:extLst>
               <a:ext uri="{FF2B5EF4-FFF2-40B4-BE49-F238E27FC236}">
-                <a16:creationId xmlns:a16="http://schemas.microsoft.com/office/drawing/2014/main" id="{D1EA267A-1EFE-4F58-9EFF-6A0405CC6ADE}"/>
+                <a16:creationId xmlns:a16="http://schemas.microsoft.com/office/drawing/2014/main" xmlns="" id="{D1EA267A-1EFE-4F58-9EFF-6A0405CC6ADE}"/>
               </a:ext>
             </a:extLst>
           </p:cNvPr>
@@ -6078,7 +6086,7 @@
           <p:cNvPr id="77" name="Elbow Connector 72">
             <a:extLst>
               <a:ext uri="{FF2B5EF4-FFF2-40B4-BE49-F238E27FC236}">
-                <a16:creationId xmlns:a16="http://schemas.microsoft.com/office/drawing/2014/main" id="{8AE386F3-2DFC-4117-9793-35573E1679BB}"/>
+                <a16:creationId xmlns:a16="http://schemas.microsoft.com/office/drawing/2014/main" xmlns="" id="{8AE386F3-2DFC-4117-9793-35573E1679BB}"/>
               </a:ext>
             </a:extLst>
           </p:cNvPr>
@@ -6120,6 +6128,371 @@
           </a:fontRef>
         </p:style>
       </p:cxnSp>
+      <p:sp>
+        <p:nvSpPr>
+          <p:cNvPr id="82" name="Rectangle 8"/>
+          <p:cNvSpPr/>
+          <p:nvPr/>
+        </p:nvSpPr>
+        <p:spPr>
+          <a:xfrm>
+            <a:off x="6394501" y="4190569"/>
+            <a:ext cx="483700" cy="285783"/>
+          </a:xfrm>
+          <a:prstGeom prst="rect">
+            <a:avLst/>
+          </a:prstGeom>
+          <a:ln w="19050">
+            <a:solidFill>
+              <a:srgbClr val="7030A0"/>
+            </a:solidFill>
+          </a:ln>
+          <a:effectLst/>
+        </p:spPr>
+        <p:style>
+          <a:lnRef idx="1">
+            <a:schemeClr val="accent4"/>
+          </a:lnRef>
+          <a:fillRef idx="2">
+            <a:schemeClr val="accent4"/>
+          </a:fillRef>
+          <a:effectRef idx="1">
+            <a:schemeClr val="accent4"/>
+          </a:effectRef>
+          <a:fontRef idx="minor">
+            <a:schemeClr val="dk1"/>
+          </a:fontRef>
+        </p:style>
+        <p:txBody>
+          <a:bodyPr rtlCol="0" anchor="ctr"/>
+          <a:lstStyle/>
+          <a:p>
+            <a:pPr algn="ctr"/>
+            <a:r>
+              <a:rPr lang="en-US" sz="1050" dirty="0" smtClean="0">
+                <a:solidFill>
+                  <a:srgbClr val="7030A0"/>
+                </a:solidFill>
+              </a:rPr>
+              <a:t>User</a:t>
+            </a:r>
+            <a:endParaRPr lang="en-SG" sz="1050" dirty="0">
+              <a:solidFill>
+                <a:srgbClr val="7030A0"/>
+              </a:solidFill>
+            </a:endParaRPr>
+          </a:p>
+        </p:txBody>
+      </p:sp>
+      <p:cxnSp>
+        <p:nvCxnSpPr>
+          <p:cNvPr id="87" name="Elbow Connector 72">
+            <a:extLst>
+              <a:ext uri="{FF2B5EF4-FFF2-40B4-BE49-F238E27FC236}">
+                <a16:creationId xmlns:a16="http://schemas.microsoft.com/office/drawing/2014/main" xmlns="" id="{8AE386F3-2DFC-4117-9793-35573E1679BB}"/>
+              </a:ext>
+            </a:extLst>
+          </p:cNvPr>
+          <p:cNvCxnSpPr>
+            <a:cxnSpLocks/>
+          </p:cNvCxnSpPr>
+          <p:nvPr/>
+        </p:nvCxnSpPr>
+        <p:spPr>
+          <a:xfrm rot="10800000" flipV="1">
+            <a:off x="6883135" y="4017058"/>
+            <a:ext cx="607131" cy="316408"/>
+          </a:xfrm>
+          <a:prstGeom prst="bentConnector3">
+            <a:avLst>
+              <a:gd name="adj1" fmla="val 633"/>
+            </a:avLst>
+          </a:prstGeom>
+          <a:ln w="19050">
+            <a:solidFill>
+              <a:srgbClr val="7030A0"/>
+            </a:solidFill>
+            <a:headEnd type="none" w="med" len="med"/>
+            <a:tailEnd type="arrow" w="med" len="med"/>
+          </a:ln>
+          <a:effectLst/>
+        </p:spPr>
+        <p:style>
+          <a:lnRef idx="1">
+            <a:schemeClr val="accent2"/>
+          </a:lnRef>
+          <a:fillRef idx="2">
+            <a:schemeClr val="accent2"/>
+          </a:fillRef>
+          <a:effectRef idx="1">
+            <a:schemeClr val="accent2"/>
+          </a:effectRef>
+          <a:fontRef idx="minor">
+            <a:schemeClr val="dk1"/>
+          </a:fontRef>
+        </p:style>
+      </p:cxnSp>
+      <p:sp>
+        <p:nvSpPr>
+          <p:cNvPr id="88" name="Rectangle 8"/>
+          <p:cNvSpPr/>
+          <p:nvPr/>
+        </p:nvSpPr>
+        <p:spPr>
+          <a:xfrm>
+            <a:off x="4477327" y="3370349"/>
+            <a:ext cx="1156969" cy="346760"/>
+          </a:xfrm>
+          <a:prstGeom prst="rect">
+            <a:avLst/>
+          </a:prstGeom>
+          <a:ln w="19050">
+            <a:solidFill>
+              <a:srgbClr val="7030A0"/>
+            </a:solidFill>
+          </a:ln>
+          <a:effectLst/>
+        </p:spPr>
+        <p:style>
+          <a:lnRef idx="1">
+            <a:schemeClr val="accent4"/>
+          </a:lnRef>
+          <a:fillRef idx="2">
+            <a:schemeClr val="accent4"/>
+          </a:fillRef>
+          <a:effectRef idx="1">
+            <a:schemeClr val="accent4"/>
+          </a:effectRef>
+          <a:fontRef idx="minor">
+            <a:schemeClr val="dk1"/>
+          </a:fontRef>
+        </p:style>
+        <p:txBody>
+          <a:bodyPr rtlCol="0" anchor="ctr"/>
+          <a:lstStyle/>
+          <a:p>
+            <a:pPr algn="ctr"/>
+            <a:r>
+              <a:rPr lang="en-US" sz="1050" dirty="0" err="1" smtClean="0">
+                <a:solidFill>
+                  <a:srgbClr val="7030A0"/>
+                </a:solidFill>
+              </a:rPr>
+              <a:t>UniqueUserList</a:t>
+            </a:r>
+            <a:endParaRPr lang="en-SG" sz="1050" dirty="0">
+              <a:solidFill>
+                <a:srgbClr val="7030A0"/>
+              </a:solidFill>
+            </a:endParaRPr>
+          </a:p>
+        </p:txBody>
+      </p:sp>
+      <p:cxnSp>
+        <p:nvCxnSpPr>
+          <p:cNvPr id="89" name="Elbow Connector 88"/>
+          <p:cNvCxnSpPr>
+            <a:stCxn id="51" idx="3"/>
+            <a:endCxn id="88" idx="1"/>
+          </p:cNvCxnSpPr>
+          <p:nvPr/>
+        </p:nvCxnSpPr>
+        <p:spPr>
+          <a:xfrm>
+            <a:off x="4220351" y="2760681"/>
+            <a:ext cx="256976" cy="783048"/>
+          </a:xfrm>
+          <a:prstGeom prst="bentConnector3">
+            <a:avLst/>
+          </a:prstGeom>
+          <a:ln w="19050">
+            <a:solidFill>
+              <a:srgbClr val="7030A0"/>
+            </a:solidFill>
+            <a:headEnd type="none" w="med" len="med"/>
+            <a:tailEnd type="arrow" w="med" len="med"/>
+          </a:ln>
+          <a:effectLst/>
+        </p:spPr>
+        <p:style>
+          <a:lnRef idx="1">
+            <a:schemeClr val="accent2"/>
+          </a:lnRef>
+          <a:fillRef idx="2">
+            <a:schemeClr val="accent2"/>
+          </a:fillRef>
+          <a:effectRef idx="1">
+            <a:schemeClr val="accent2"/>
+          </a:effectRef>
+          <a:fontRef idx="minor">
+            <a:schemeClr val="dk1"/>
+          </a:fontRef>
+        </p:style>
+      </p:cxnSp>
+      <p:sp>
+        <p:nvSpPr>
+          <p:cNvPr id="90" name="TextBox 89"/>
+          <p:cNvSpPr txBox="1"/>
+          <p:nvPr/>
+        </p:nvSpPr>
+        <p:spPr>
+          <a:xfrm>
+            <a:off x="4260823" y="3564733"/>
+            <a:ext cx="189257" cy="178683"/>
+          </a:xfrm>
+          <a:prstGeom prst="rect">
+            <a:avLst/>
+          </a:prstGeom>
+          <a:noFill/>
+        </p:spPr>
+        <p:txBody>
+          <a:bodyPr wrap="square" lIns="0" tIns="0" rIns="0" bIns="0" rtlCol="0">
+            <a:noAutofit/>
+          </a:bodyPr>
+          <a:lstStyle/>
+          <a:p>
+            <a:pPr algn="ctr"/>
+            <a:r>
+              <a:rPr lang="en-US" sz="1100" dirty="0">
+                <a:solidFill>
+                  <a:srgbClr val="7030A0"/>
+                </a:solidFill>
+              </a:rPr>
+              <a:t>1</a:t>
+            </a:r>
+            <a:endParaRPr lang="en-SG" sz="1100" dirty="0">
+              <a:solidFill>
+                <a:srgbClr val="7030A0"/>
+              </a:solidFill>
+            </a:endParaRPr>
+          </a:p>
+        </p:txBody>
+      </p:sp>
+      <p:sp>
+        <p:nvSpPr>
+          <p:cNvPr id="91" name="Flowchart: Decision 96"/>
+          <p:cNvSpPr/>
+          <p:nvPr/>
+        </p:nvSpPr>
+        <p:spPr>
+          <a:xfrm rot="16200000">
+            <a:off x="4921666" y="3755558"/>
+            <a:ext cx="236048" cy="173380"/>
+          </a:xfrm>
+          <a:prstGeom prst="flowChartDecision">
+            <a:avLst/>
+          </a:prstGeom>
+          <a:noFill/>
+          <a:ln w="19050">
+            <a:solidFill>
+              <a:srgbClr val="7030A0"/>
+            </a:solidFill>
+          </a:ln>
+          <a:effectLst/>
+        </p:spPr>
+        <p:style>
+          <a:lnRef idx="1">
+            <a:schemeClr val="accent6"/>
+          </a:lnRef>
+          <a:fillRef idx="2">
+            <a:schemeClr val="accent6"/>
+          </a:fillRef>
+          <a:effectRef idx="1">
+            <a:schemeClr val="accent6"/>
+          </a:effectRef>
+          <a:fontRef idx="minor">
+            <a:schemeClr val="dk1"/>
+          </a:fontRef>
+        </p:style>
+        <p:txBody>
+          <a:bodyPr rtlCol="0" anchor="ctr"/>
+          <a:lstStyle/>
+          <a:p>
+            <a:pPr algn="ctr"/>
+            <a:endParaRPr lang="en-US" sz="1050"/>
+          </a:p>
+        </p:txBody>
+      </p:sp>
+      <p:cxnSp>
+        <p:nvCxnSpPr>
+          <p:cNvPr id="92" name="Elbow Connector 91"/>
+          <p:cNvCxnSpPr>
+            <a:stCxn id="91" idx="1"/>
+            <a:endCxn id="82" idx="1"/>
+          </p:cNvCxnSpPr>
+          <p:nvPr/>
+        </p:nvCxnSpPr>
+        <p:spPr>
+          <a:xfrm rot="16200000" flipH="1">
+            <a:off x="5530501" y="3469460"/>
+            <a:ext cx="373189" cy="1354811"/>
+          </a:xfrm>
+          <a:prstGeom prst="bentConnector2">
+            <a:avLst/>
+          </a:prstGeom>
+          <a:ln w="19050">
+            <a:solidFill>
+              <a:srgbClr val="7030A0"/>
+            </a:solidFill>
+            <a:headEnd type="none" w="med" len="med"/>
+            <a:tailEnd type="arrow" w="med" len="med"/>
+          </a:ln>
+          <a:effectLst/>
+        </p:spPr>
+        <p:style>
+          <a:lnRef idx="1">
+            <a:schemeClr val="accent2"/>
+          </a:lnRef>
+          <a:fillRef idx="2">
+            <a:schemeClr val="accent2"/>
+          </a:fillRef>
+          <a:effectRef idx="1">
+            <a:schemeClr val="accent2"/>
+          </a:effectRef>
+          <a:fontRef idx="minor">
+            <a:schemeClr val="dk1"/>
+          </a:fontRef>
+        </p:style>
+      </p:cxnSp>
+      <p:sp>
+        <p:nvSpPr>
+          <p:cNvPr id="93" name="TextBox 92"/>
+          <p:cNvSpPr txBox="1"/>
+          <p:nvPr/>
+        </p:nvSpPr>
+        <p:spPr>
+          <a:xfrm>
+            <a:off x="6193193" y="4164717"/>
+            <a:ext cx="189257" cy="178683"/>
+          </a:xfrm>
+          <a:prstGeom prst="rect">
+            <a:avLst/>
+          </a:prstGeom>
+          <a:noFill/>
+        </p:spPr>
+        <p:txBody>
+          <a:bodyPr wrap="square" lIns="0" tIns="0" rIns="0" bIns="0" rtlCol="0">
+            <a:noAutofit/>
+          </a:bodyPr>
+          <a:lstStyle/>
+          <a:p>
+            <a:pPr algn="ctr"/>
+            <a:r>
+              <a:rPr lang="en-US" sz="1100" dirty="0">
+                <a:solidFill>
+                  <a:srgbClr val="7030A0"/>
+                </a:solidFill>
+              </a:rPr>
+              <a:t>*</a:t>
+            </a:r>
+            <a:endParaRPr lang="en-SG" sz="1100" dirty="0">
+              <a:solidFill>
+                <a:srgbClr val="7030A0"/>
+              </a:solidFill>
+            </a:endParaRPr>
+          </a:p>
+        </p:txBody>
+      </p:sp>
     </p:spTree>
     <p:extLst>
       <p:ext uri="{BB962C8B-B14F-4D97-AF65-F5344CB8AC3E}">

</xml_diff>

<commit_message>
Updated the stuff in the dg.
</commit_message>
<xml_diff>
--- a/docs/diagrams/ModelComponentClassDiagram.pptx
+++ b/docs/diagrams/ModelComponentClassDiagram.pptx
@@ -208,7 +208,7 @@
           <a:p>
             <a:fld id="{F5CC4B3F-88C1-4FFA-B1B6-F41C21DC6924}" type="datetimeFigureOut">
               <a:rPr lang="en-US" smtClean="0"/>
-              <a:t>1/1/18</a:t>
+              <a:t>4/3/2018</a:t>
             </a:fld>
             <a:endParaRPr lang="en-US"/>
           </a:p>
@@ -272,38 +272,37 @@
           <a:p>
             <a:pPr lvl="0"/>
             <a:r>
-              <a:rPr lang="en-US" smtClean="0"/>
+              <a:rPr lang="en-US"/>
               <a:t>Click to edit Master text styles</a:t>
             </a:r>
           </a:p>
           <a:p>
             <a:pPr lvl="1"/>
             <a:r>
-              <a:rPr lang="en-US" smtClean="0"/>
+              <a:rPr lang="en-US"/>
               <a:t>Second level</a:t>
             </a:r>
           </a:p>
           <a:p>
             <a:pPr lvl="2"/>
             <a:r>
-              <a:rPr lang="en-US" smtClean="0"/>
+              <a:rPr lang="en-US"/>
               <a:t>Third level</a:t>
             </a:r>
           </a:p>
           <a:p>
             <a:pPr lvl="3"/>
             <a:r>
-              <a:rPr lang="en-US" smtClean="0"/>
+              <a:rPr lang="en-US"/>
               <a:t>Fourth level</a:t>
             </a:r>
           </a:p>
           <a:p>
             <a:pPr lvl="4"/>
             <a:r>
-              <a:rPr lang="en-US" smtClean="0"/>
+              <a:rPr lang="en-US"/>
               <a:t>Fifth level</a:t>
             </a:r>
-            <a:endParaRPr lang="en-US"/>
           </a:p>
         </p:txBody>
       </p:sp>
@@ -514,10 +513,9 @@
           <a:lstStyle/>
           <a:p>
             <a:r>
-              <a:rPr lang="en-US" smtClean="0"/>
+              <a:rPr lang="en-US"/>
               <a:t>Click to edit Master title style</a:t>
             </a:r>
-            <a:endParaRPr lang="en-US"/>
           </a:p>
         </p:txBody>
       </p:sp>
@@ -633,10 +631,9 @@
           </a:lstStyle>
           <a:p>
             <a:r>
-              <a:rPr lang="en-US" smtClean="0"/>
+              <a:rPr lang="en-US"/>
               <a:t>Click to edit Master subtitle style</a:t>
             </a:r>
-            <a:endParaRPr lang="en-US"/>
           </a:p>
         </p:txBody>
       </p:sp>
@@ -657,7 +654,7 @@
           <a:p>
             <a:fld id="{78C97017-6FC3-485B-9764-EAC9E56C1D49}" type="datetimeFigureOut">
               <a:rPr lang="en-US" smtClean="0"/>
-              <a:t>1/1/18</a:t>
+              <a:t>4/3/2018</a:t>
             </a:fld>
             <a:endParaRPr lang="en-US"/>
           </a:p>
@@ -751,10 +748,9 @@
           <a:lstStyle/>
           <a:p>
             <a:r>
-              <a:rPr lang="en-US" smtClean="0"/>
+              <a:rPr lang="en-US"/>
               <a:t>Click to edit Master title style</a:t>
             </a:r>
-            <a:endParaRPr lang="en-US"/>
           </a:p>
         </p:txBody>
       </p:sp>
@@ -775,38 +771,37 @@
           <a:p>
             <a:pPr lvl="0"/>
             <a:r>
-              <a:rPr lang="en-US" smtClean="0"/>
+              <a:rPr lang="en-US"/>
               <a:t>Click to edit Master text styles</a:t>
             </a:r>
           </a:p>
           <a:p>
             <a:pPr lvl="1"/>
             <a:r>
-              <a:rPr lang="en-US" smtClean="0"/>
+              <a:rPr lang="en-US"/>
               <a:t>Second level</a:t>
             </a:r>
           </a:p>
           <a:p>
             <a:pPr lvl="2"/>
             <a:r>
-              <a:rPr lang="en-US" smtClean="0"/>
+              <a:rPr lang="en-US"/>
               <a:t>Third level</a:t>
             </a:r>
           </a:p>
           <a:p>
             <a:pPr lvl="3"/>
             <a:r>
-              <a:rPr lang="en-US" smtClean="0"/>
+              <a:rPr lang="en-US"/>
               <a:t>Fourth level</a:t>
             </a:r>
           </a:p>
           <a:p>
             <a:pPr lvl="4"/>
             <a:r>
-              <a:rPr lang="en-US" smtClean="0"/>
+              <a:rPr lang="en-US"/>
               <a:t>Fifth level</a:t>
             </a:r>
-            <a:endParaRPr lang="en-US"/>
           </a:p>
         </p:txBody>
       </p:sp>
@@ -827,7 +822,7 @@
           <a:p>
             <a:fld id="{78C97017-6FC3-485B-9764-EAC9E56C1D49}" type="datetimeFigureOut">
               <a:rPr lang="en-US" smtClean="0"/>
-              <a:t>1/1/18</a:t>
+              <a:t>4/3/2018</a:t>
             </a:fld>
             <a:endParaRPr lang="en-US"/>
           </a:p>
@@ -926,10 +921,9 @@
           <a:lstStyle/>
           <a:p>
             <a:r>
-              <a:rPr lang="en-US" smtClean="0"/>
+              <a:rPr lang="en-US"/>
               <a:t>Click to edit Master title style</a:t>
             </a:r>
-            <a:endParaRPr lang="en-US"/>
           </a:p>
         </p:txBody>
       </p:sp>
@@ -955,38 +949,37 @@
           <a:p>
             <a:pPr lvl="0"/>
             <a:r>
-              <a:rPr lang="en-US" smtClean="0"/>
+              <a:rPr lang="en-US"/>
               <a:t>Click to edit Master text styles</a:t>
             </a:r>
           </a:p>
           <a:p>
             <a:pPr lvl="1"/>
             <a:r>
-              <a:rPr lang="en-US" smtClean="0"/>
+              <a:rPr lang="en-US"/>
               <a:t>Second level</a:t>
             </a:r>
           </a:p>
           <a:p>
             <a:pPr lvl="2"/>
             <a:r>
-              <a:rPr lang="en-US" smtClean="0"/>
+              <a:rPr lang="en-US"/>
               <a:t>Third level</a:t>
             </a:r>
           </a:p>
           <a:p>
             <a:pPr lvl="3"/>
             <a:r>
-              <a:rPr lang="en-US" smtClean="0"/>
+              <a:rPr lang="en-US"/>
               <a:t>Fourth level</a:t>
             </a:r>
           </a:p>
           <a:p>
             <a:pPr lvl="4"/>
             <a:r>
-              <a:rPr lang="en-US" smtClean="0"/>
+              <a:rPr lang="en-US"/>
               <a:t>Fifth level</a:t>
             </a:r>
-            <a:endParaRPr lang="en-US"/>
           </a:p>
         </p:txBody>
       </p:sp>
@@ -1007,7 +1000,7 @@
           <a:p>
             <a:fld id="{78C97017-6FC3-485B-9764-EAC9E56C1D49}" type="datetimeFigureOut">
               <a:rPr lang="en-US" smtClean="0"/>
-              <a:t>1/1/18</a:t>
+              <a:t>4/3/2018</a:t>
             </a:fld>
             <a:endParaRPr lang="en-US"/>
           </a:p>
@@ -1101,10 +1094,9 @@
           <a:lstStyle/>
           <a:p>
             <a:r>
-              <a:rPr lang="en-US" smtClean="0"/>
+              <a:rPr lang="en-US"/>
               <a:t>Click to edit Master title style</a:t>
             </a:r>
-            <a:endParaRPr lang="en-US"/>
           </a:p>
         </p:txBody>
       </p:sp>
@@ -1125,38 +1117,37 @@
           <a:p>
             <a:pPr lvl="0"/>
             <a:r>
-              <a:rPr lang="en-US" smtClean="0"/>
+              <a:rPr lang="en-US"/>
               <a:t>Click to edit Master text styles</a:t>
             </a:r>
           </a:p>
           <a:p>
             <a:pPr lvl="1"/>
             <a:r>
-              <a:rPr lang="en-US" smtClean="0"/>
+              <a:rPr lang="en-US"/>
               <a:t>Second level</a:t>
             </a:r>
           </a:p>
           <a:p>
             <a:pPr lvl="2"/>
             <a:r>
-              <a:rPr lang="en-US" smtClean="0"/>
+              <a:rPr lang="en-US"/>
               <a:t>Third level</a:t>
             </a:r>
           </a:p>
           <a:p>
             <a:pPr lvl="3"/>
             <a:r>
-              <a:rPr lang="en-US" smtClean="0"/>
+              <a:rPr lang="en-US"/>
               <a:t>Fourth level</a:t>
             </a:r>
           </a:p>
           <a:p>
             <a:pPr lvl="4"/>
             <a:r>
-              <a:rPr lang="en-US" smtClean="0"/>
+              <a:rPr lang="en-US"/>
               <a:t>Fifth level</a:t>
             </a:r>
-            <a:endParaRPr lang="en-US"/>
           </a:p>
         </p:txBody>
       </p:sp>
@@ -1177,7 +1168,7 @@
           <a:p>
             <a:fld id="{78C97017-6FC3-485B-9764-EAC9E56C1D49}" type="datetimeFigureOut">
               <a:rPr lang="en-US" smtClean="0"/>
-              <a:t>1/1/18</a:t>
+              <a:t>4/3/2018</a:t>
             </a:fld>
             <a:endParaRPr lang="en-US"/>
           </a:p>
@@ -1280,10 +1271,9 @@
           </a:lstStyle>
           <a:p>
             <a:r>
-              <a:rPr lang="en-US" smtClean="0"/>
+              <a:rPr lang="en-US"/>
               <a:t>Click to edit Master title style</a:t>
             </a:r>
-            <a:endParaRPr lang="en-US"/>
           </a:p>
         </p:txBody>
       </p:sp>
@@ -1400,7 +1390,7 @@
           <a:p>
             <a:pPr lvl="0"/>
             <a:r>
-              <a:rPr lang="en-US" smtClean="0"/>
+              <a:rPr lang="en-US"/>
               <a:t>Click to edit Master text styles</a:t>
             </a:r>
           </a:p>
@@ -1423,7 +1413,7 @@
           <a:p>
             <a:fld id="{78C97017-6FC3-485B-9764-EAC9E56C1D49}" type="datetimeFigureOut">
               <a:rPr lang="en-US" smtClean="0"/>
-              <a:t>1/1/18</a:t>
+              <a:t>4/3/2018</a:t>
             </a:fld>
             <a:endParaRPr lang="en-US"/>
           </a:p>
@@ -1517,10 +1507,9 @@
           <a:lstStyle/>
           <a:p>
             <a:r>
-              <a:rPr lang="en-US" smtClean="0"/>
+              <a:rPr lang="en-US"/>
               <a:t>Click to edit Master title style</a:t>
             </a:r>
-            <a:endParaRPr lang="en-US"/>
           </a:p>
         </p:txBody>
       </p:sp>
@@ -1574,38 +1563,37 @@
           <a:p>
             <a:pPr lvl="0"/>
             <a:r>
-              <a:rPr lang="en-US" smtClean="0"/>
+              <a:rPr lang="en-US"/>
               <a:t>Click to edit Master text styles</a:t>
             </a:r>
           </a:p>
           <a:p>
             <a:pPr lvl="1"/>
             <a:r>
-              <a:rPr lang="en-US" smtClean="0"/>
+              <a:rPr lang="en-US"/>
               <a:t>Second level</a:t>
             </a:r>
           </a:p>
           <a:p>
             <a:pPr lvl="2"/>
             <a:r>
-              <a:rPr lang="en-US" smtClean="0"/>
+              <a:rPr lang="en-US"/>
               <a:t>Third level</a:t>
             </a:r>
           </a:p>
           <a:p>
             <a:pPr lvl="3"/>
             <a:r>
-              <a:rPr lang="en-US" smtClean="0"/>
+              <a:rPr lang="en-US"/>
               <a:t>Fourth level</a:t>
             </a:r>
           </a:p>
           <a:p>
             <a:pPr lvl="4"/>
             <a:r>
-              <a:rPr lang="en-US" smtClean="0"/>
+              <a:rPr lang="en-US"/>
               <a:t>Fifth level</a:t>
             </a:r>
-            <a:endParaRPr lang="en-US"/>
           </a:p>
         </p:txBody>
       </p:sp>
@@ -1659,38 +1647,37 @@
           <a:p>
             <a:pPr lvl="0"/>
             <a:r>
-              <a:rPr lang="en-US" smtClean="0"/>
+              <a:rPr lang="en-US"/>
               <a:t>Click to edit Master text styles</a:t>
             </a:r>
           </a:p>
           <a:p>
             <a:pPr lvl="1"/>
             <a:r>
-              <a:rPr lang="en-US" smtClean="0"/>
+              <a:rPr lang="en-US"/>
               <a:t>Second level</a:t>
             </a:r>
           </a:p>
           <a:p>
             <a:pPr lvl="2"/>
             <a:r>
-              <a:rPr lang="en-US" smtClean="0"/>
+              <a:rPr lang="en-US"/>
               <a:t>Third level</a:t>
             </a:r>
           </a:p>
           <a:p>
             <a:pPr lvl="3"/>
             <a:r>
-              <a:rPr lang="en-US" smtClean="0"/>
+              <a:rPr lang="en-US"/>
               <a:t>Fourth level</a:t>
             </a:r>
           </a:p>
           <a:p>
             <a:pPr lvl="4"/>
             <a:r>
-              <a:rPr lang="en-US" smtClean="0"/>
+              <a:rPr lang="en-US"/>
               <a:t>Fifth level</a:t>
             </a:r>
-            <a:endParaRPr lang="en-US"/>
           </a:p>
         </p:txBody>
       </p:sp>
@@ -1711,7 +1698,7 @@
           <a:p>
             <a:fld id="{78C97017-6FC3-485B-9764-EAC9E56C1D49}" type="datetimeFigureOut">
               <a:rPr lang="en-US" smtClean="0"/>
-              <a:t>1/1/18</a:t>
+              <a:t>4/3/2018</a:t>
             </a:fld>
             <a:endParaRPr lang="en-US"/>
           </a:p>
@@ -1809,10 +1796,9 @@
           </a:lstStyle>
           <a:p>
             <a:r>
-              <a:rPr lang="en-US" smtClean="0"/>
+              <a:rPr lang="en-US"/>
               <a:t>Click to edit Master title style</a:t>
             </a:r>
-            <a:endParaRPr lang="en-US"/>
           </a:p>
         </p:txBody>
       </p:sp>
@@ -1875,7 +1861,7 @@
           <a:p>
             <a:pPr lvl="0"/>
             <a:r>
-              <a:rPr lang="en-US" smtClean="0"/>
+              <a:rPr lang="en-US"/>
               <a:t>Click to edit Master text styles</a:t>
             </a:r>
           </a:p>
@@ -1931,38 +1917,37 @@
           <a:p>
             <a:pPr lvl="0"/>
             <a:r>
-              <a:rPr lang="en-US" smtClean="0"/>
+              <a:rPr lang="en-US"/>
               <a:t>Click to edit Master text styles</a:t>
             </a:r>
           </a:p>
           <a:p>
             <a:pPr lvl="1"/>
             <a:r>
-              <a:rPr lang="en-US" smtClean="0"/>
+              <a:rPr lang="en-US"/>
               <a:t>Second level</a:t>
             </a:r>
           </a:p>
           <a:p>
             <a:pPr lvl="2"/>
             <a:r>
-              <a:rPr lang="en-US" smtClean="0"/>
+              <a:rPr lang="en-US"/>
               <a:t>Third level</a:t>
             </a:r>
           </a:p>
           <a:p>
             <a:pPr lvl="3"/>
             <a:r>
-              <a:rPr lang="en-US" smtClean="0"/>
+              <a:rPr lang="en-US"/>
               <a:t>Fourth level</a:t>
             </a:r>
           </a:p>
           <a:p>
             <a:pPr lvl="4"/>
             <a:r>
-              <a:rPr lang="en-US" smtClean="0"/>
+              <a:rPr lang="en-US"/>
               <a:t>Fifth level</a:t>
             </a:r>
-            <a:endParaRPr lang="en-US"/>
           </a:p>
         </p:txBody>
       </p:sp>
@@ -2025,7 +2010,7 @@
           <a:p>
             <a:pPr lvl="0"/>
             <a:r>
-              <a:rPr lang="en-US" smtClean="0"/>
+              <a:rPr lang="en-US"/>
               <a:t>Click to edit Master text styles</a:t>
             </a:r>
           </a:p>
@@ -2081,38 +2066,37 @@
           <a:p>
             <a:pPr lvl="0"/>
             <a:r>
-              <a:rPr lang="en-US" smtClean="0"/>
+              <a:rPr lang="en-US"/>
               <a:t>Click to edit Master text styles</a:t>
             </a:r>
           </a:p>
           <a:p>
             <a:pPr lvl="1"/>
             <a:r>
-              <a:rPr lang="en-US" smtClean="0"/>
+              <a:rPr lang="en-US"/>
               <a:t>Second level</a:t>
             </a:r>
           </a:p>
           <a:p>
             <a:pPr lvl="2"/>
             <a:r>
-              <a:rPr lang="en-US" smtClean="0"/>
+              <a:rPr lang="en-US"/>
               <a:t>Third level</a:t>
             </a:r>
           </a:p>
           <a:p>
             <a:pPr lvl="3"/>
             <a:r>
-              <a:rPr lang="en-US" smtClean="0"/>
+              <a:rPr lang="en-US"/>
               <a:t>Fourth level</a:t>
             </a:r>
           </a:p>
           <a:p>
             <a:pPr lvl="4"/>
             <a:r>
-              <a:rPr lang="en-US" smtClean="0"/>
+              <a:rPr lang="en-US"/>
               <a:t>Fifth level</a:t>
             </a:r>
-            <a:endParaRPr lang="en-US"/>
           </a:p>
         </p:txBody>
       </p:sp>
@@ -2133,7 +2117,7 @@
           <a:p>
             <a:fld id="{78C97017-6FC3-485B-9764-EAC9E56C1D49}" type="datetimeFigureOut">
               <a:rPr lang="en-US" smtClean="0"/>
-              <a:t>1/1/18</a:t>
+              <a:t>4/3/2018</a:t>
             </a:fld>
             <a:endParaRPr lang="en-US"/>
           </a:p>
@@ -2227,10 +2211,9 @@
           <a:lstStyle/>
           <a:p>
             <a:r>
-              <a:rPr lang="en-US" smtClean="0"/>
+              <a:rPr lang="en-US"/>
               <a:t>Click to edit Master title style</a:t>
             </a:r>
-            <a:endParaRPr lang="en-US"/>
           </a:p>
         </p:txBody>
       </p:sp>
@@ -2251,7 +2234,7 @@
           <a:p>
             <a:fld id="{78C97017-6FC3-485B-9764-EAC9E56C1D49}" type="datetimeFigureOut">
               <a:rPr lang="en-US" smtClean="0"/>
-              <a:t>1/1/18</a:t>
+              <a:t>4/3/2018</a:t>
             </a:fld>
             <a:endParaRPr lang="en-US"/>
           </a:p>
@@ -2346,7 +2329,7 @@
           <a:p>
             <a:fld id="{78C97017-6FC3-485B-9764-EAC9E56C1D49}" type="datetimeFigureOut">
               <a:rPr lang="en-US" smtClean="0"/>
-              <a:t>1/1/18</a:t>
+              <a:t>4/3/2018</a:t>
             </a:fld>
             <a:endParaRPr lang="en-US"/>
           </a:p>
@@ -2449,10 +2432,9 @@
           </a:lstStyle>
           <a:p>
             <a:r>
-              <a:rPr lang="en-US" smtClean="0"/>
+              <a:rPr lang="en-US"/>
               <a:t>Click to edit Master title style</a:t>
             </a:r>
-            <a:endParaRPr lang="en-US"/>
           </a:p>
         </p:txBody>
       </p:sp>
@@ -2506,38 +2488,37 @@
           <a:p>
             <a:pPr lvl="0"/>
             <a:r>
-              <a:rPr lang="en-US" smtClean="0"/>
+              <a:rPr lang="en-US"/>
               <a:t>Click to edit Master text styles</a:t>
             </a:r>
           </a:p>
           <a:p>
             <a:pPr lvl="1"/>
             <a:r>
-              <a:rPr lang="en-US" smtClean="0"/>
+              <a:rPr lang="en-US"/>
               <a:t>Second level</a:t>
             </a:r>
           </a:p>
           <a:p>
             <a:pPr lvl="2"/>
             <a:r>
-              <a:rPr lang="en-US" smtClean="0"/>
+              <a:rPr lang="en-US"/>
               <a:t>Third level</a:t>
             </a:r>
           </a:p>
           <a:p>
             <a:pPr lvl="3"/>
             <a:r>
-              <a:rPr lang="en-US" smtClean="0"/>
+              <a:rPr lang="en-US"/>
               <a:t>Fourth level</a:t>
             </a:r>
           </a:p>
           <a:p>
             <a:pPr lvl="4"/>
             <a:r>
-              <a:rPr lang="en-US" smtClean="0"/>
+              <a:rPr lang="en-US"/>
               <a:t>Fifth level</a:t>
             </a:r>
-            <a:endParaRPr lang="en-US"/>
           </a:p>
         </p:txBody>
       </p:sp>
@@ -2600,7 +2581,7 @@
           <a:p>
             <a:pPr lvl="0"/>
             <a:r>
-              <a:rPr lang="en-US" smtClean="0"/>
+              <a:rPr lang="en-US"/>
               <a:t>Click to edit Master text styles</a:t>
             </a:r>
           </a:p>
@@ -2623,7 +2604,7 @@
           <a:p>
             <a:fld id="{78C97017-6FC3-485B-9764-EAC9E56C1D49}" type="datetimeFigureOut">
               <a:rPr lang="en-US" smtClean="0"/>
-              <a:t>1/1/18</a:t>
+              <a:t>4/3/2018</a:t>
             </a:fld>
             <a:endParaRPr lang="en-US"/>
           </a:p>
@@ -2726,10 +2707,9 @@
           </a:lstStyle>
           <a:p>
             <a:r>
-              <a:rPr lang="en-US" smtClean="0"/>
+              <a:rPr lang="en-US"/>
               <a:t>Click to edit Master title style</a:t>
             </a:r>
-            <a:endParaRPr lang="en-US"/>
           </a:p>
         </p:txBody>
       </p:sp>
@@ -2853,7 +2833,7 @@
           <a:p>
             <a:pPr lvl="0"/>
             <a:r>
-              <a:rPr lang="en-US" smtClean="0"/>
+              <a:rPr lang="en-US"/>
               <a:t>Click to edit Master text styles</a:t>
             </a:r>
           </a:p>
@@ -2876,7 +2856,7 @@
           <a:p>
             <a:fld id="{78C97017-6FC3-485B-9764-EAC9E56C1D49}" type="datetimeFigureOut">
               <a:rPr lang="en-US" smtClean="0"/>
-              <a:t>1/1/18</a:t>
+              <a:t>4/3/2018</a:t>
             </a:fld>
             <a:endParaRPr lang="en-US"/>
           </a:p>
@@ -2985,10 +2965,9 @@
           <a:lstStyle/>
           <a:p>
             <a:r>
-              <a:rPr lang="en-US" smtClean="0"/>
+              <a:rPr lang="en-US"/>
               <a:t>Click to edit Master title style</a:t>
             </a:r>
-            <a:endParaRPr lang="en-US"/>
           </a:p>
         </p:txBody>
       </p:sp>
@@ -3019,38 +2998,37 @@
           <a:p>
             <a:pPr lvl="0"/>
             <a:r>
-              <a:rPr lang="en-US" smtClean="0"/>
+              <a:rPr lang="en-US"/>
               <a:t>Click to edit Master text styles</a:t>
             </a:r>
           </a:p>
           <a:p>
             <a:pPr lvl="1"/>
             <a:r>
-              <a:rPr lang="en-US" smtClean="0"/>
+              <a:rPr lang="en-US"/>
               <a:t>Second level</a:t>
             </a:r>
           </a:p>
           <a:p>
             <a:pPr lvl="2"/>
             <a:r>
-              <a:rPr lang="en-US" smtClean="0"/>
+              <a:rPr lang="en-US"/>
               <a:t>Third level</a:t>
             </a:r>
           </a:p>
           <a:p>
             <a:pPr lvl="3"/>
             <a:r>
-              <a:rPr lang="en-US" smtClean="0"/>
+              <a:rPr lang="en-US"/>
               <a:t>Fourth level</a:t>
             </a:r>
           </a:p>
           <a:p>
             <a:pPr lvl="4"/>
             <a:r>
-              <a:rPr lang="en-US" smtClean="0"/>
+              <a:rPr lang="en-US"/>
               <a:t>Fifth level</a:t>
             </a:r>
-            <a:endParaRPr lang="en-US"/>
           </a:p>
         </p:txBody>
       </p:sp>
@@ -3089,7 +3067,7 @@
           <a:p>
             <a:fld id="{78C97017-6FC3-485B-9764-EAC9E56C1D49}" type="datetimeFigureOut">
               <a:rPr lang="en-US" smtClean="0"/>
-              <a:t>1/1/18</a:t>
+              <a:t>4/3/2018</a:t>
             </a:fld>
             <a:endParaRPr lang="en-US"/>
           </a:p>
@@ -3472,8 +3450,8 @@
         </p:nvSpPr>
         <p:spPr>
           <a:xfrm>
-            <a:off x="1119865" y="1727200"/>
-            <a:ext cx="7490735" cy="2997200"/>
+            <a:off x="1143000" y="1679260"/>
+            <a:ext cx="7467600" cy="3252393"/>
           </a:xfrm>
           <a:prstGeom prst="roundRect">
             <a:avLst>
@@ -3510,12 +3488,12 @@
           <a:lstStyle/>
           <a:p>
             <a:r>
-              <a:rPr lang="en-US" sz="1200" b="1" dirty="0" smtClean="0">
+              <a:rPr lang="en-US" sz="1200" b="1" dirty="0">
                 <a:solidFill>
                   <a:srgbClr val="7030A0"/>
                 </a:solidFill>
               </a:rPr>
-              <a:t>Model</a:t>
+              <a:t>Model </a:t>
             </a:r>
             <a:endParaRPr lang="en-SG" sz="1200" b="1" dirty="0">
               <a:solidFill>
@@ -3569,7 +3547,7 @@
           <a:p>
             <a:pPr algn="ctr"/>
             <a:r>
-              <a:rPr lang="en-US" sz="1050" dirty="0" err="1" smtClean="0">
+              <a:rPr lang="en-US" sz="1050" dirty="0" err="1">
                 <a:solidFill>
                   <a:schemeClr val="bg1"/>
                 </a:solidFill>
@@ -3628,7 +3606,7 @@
           <a:p>
             <a:pPr algn="ctr"/>
             <a:r>
-              <a:rPr lang="en-US" sz="1050" dirty="0" err="1" smtClean="0">
+              <a:rPr lang="en-US" sz="1050" dirty="0" err="1">
                 <a:solidFill>
                   <a:schemeClr val="bg1"/>
                 </a:solidFill>
@@ -3658,7 +3636,7 @@
           </a:xfrm>
           <a:prstGeom prst="bentConnector4">
             <a:avLst>
-              <a:gd name="adj1" fmla="val -101829"/>
+              <a:gd name="adj1" fmla="val -190196"/>
               <a:gd name="adj2" fmla="val 99976"/>
             </a:avLst>
           </a:prstGeom>
@@ -3742,7 +3720,7 @@
           <a:p>
             <a:pPr algn="ctr"/>
             <a:r>
-              <a:rPr lang="en-US" sz="1050" dirty="0" smtClean="0">
+              <a:rPr lang="en-US" sz="1050" dirty="0">
                 <a:solidFill>
                   <a:schemeClr val="bg1"/>
                 </a:solidFill>
@@ -4015,7 +3993,7 @@
           <a:p>
             <a:pPr algn="ctr"/>
             <a:r>
-              <a:rPr lang="en-US" sz="1050" dirty="0" err="1" smtClean="0">
+              <a:rPr lang="en-US" sz="1050" dirty="0" err="1">
                 <a:solidFill>
                   <a:srgbClr val="7030A0"/>
                 </a:solidFill>
@@ -4125,7 +4103,7 @@
         <p:spPr>
           <a:xfrm>
             <a:off x="4487017" y="2847371"/>
-            <a:ext cx="1156969" cy="346760"/>
+            <a:ext cx="1174640" cy="346760"/>
           </a:xfrm>
           <a:prstGeom prst="rect">
             <a:avLst/>
@@ -4157,7 +4135,7 @@
           <a:p>
             <a:pPr algn="ctr"/>
             <a:r>
-              <a:rPr lang="en-US" sz="1050" dirty="0" err="1" smtClean="0">
+              <a:rPr lang="en-US" sz="1050" dirty="0" err="1">
                 <a:solidFill>
                   <a:srgbClr val="7030A0"/>
                 </a:solidFill>
@@ -4223,6 +4201,7 @@
         <p:nvCxnSpPr>
           <p:cNvPr id="30" name="Elbow Connector 29"/>
           <p:cNvCxnSpPr>
+            <a:cxnSpLocks/>
             <a:stCxn id="51" idx="3"/>
             <a:endCxn id="49" idx="1"/>
           </p:cNvCxnSpPr>
@@ -4269,7 +4248,7 @@
         <p:spPr>
           <a:xfrm>
             <a:off x="4477328" y="2280569"/>
-            <a:ext cx="1156969" cy="346760"/>
+            <a:ext cx="1184328" cy="346760"/>
           </a:xfrm>
           <a:prstGeom prst="rect">
             <a:avLst/>
@@ -4301,7 +4280,7 @@
           <a:p>
             <a:pPr algn="ctr"/>
             <a:r>
-              <a:rPr lang="en-US" sz="1050" dirty="0" err="1" smtClean="0">
+              <a:rPr lang="en-US" sz="1050" dirty="0" err="1">
                 <a:solidFill>
                   <a:srgbClr val="7030A0"/>
                 </a:solidFill>
@@ -4320,6 +4299,7 @@
         <p:nvCxnSpPr>
           <p:cNvPr id="59" name="Elbow Connector 58"/>
           <p:cNvCxnSpPr>
+            <a:cxnSpLocks/>
             <a:stCxn id="51" idx="3"/>
             <a:endCxn id="57" idx="1"/>
           </p:cNvCxnSpPr>
@@ -4400,7 +4380,7 @@
           <a:p>
             <a:pPr algn="ctr"/>
             <a:r>
-              <a:rPr lang="en-US" sz="1050" dirty="0" smtClean="0">
+              <a:rPr lang="en-US" sz="1050" dirty="0">
                 <a:solidFill>
                   <a:srgbClr val="7030A0"/>
                 </a:solidFill>
@@ -4423,7 +4403,7 @@
         </p:nvSpPr>
         <p:spPr>
           <a:xfrm>
-            <a:off x="5643227" y="2943979"/>
+            <a:off x="5681741" y="2939409"/>
             <a:ext cx="236048" cy="173380"/>
           </a:xfrm>
           <a:prstGeom prst="flowChartDecision">
@@ -4464,18 +4444,20 @@
         <p:nvCxnSpPr>
           <p:cNvPr id="64" name="Elbow Connector 63"/>
           <p:cNvCxnSpPr>
+            <a:cxnSpLocks/>
             <a:stCxn id="63" idx="3"/>
-            <a:endCxn id="62" idx="1"/>
           </p:cNvCxnSpPr>
           <p:nvPr/>
         </p:nvCxnSpPr>
         <p:spPr>
           <a:xfrm>
-            <a:off x="5879275" y="3030669"/>
-            <a:ext cx="434402" cy="777"/>
+            <a:off x="5917789" y="3026099"/>
+            <a:ext cx="402505" cy="2275"/>
           </a:xfrm>
           <a:prstGeom prst="bentConnector3">
-            <a:avLst/>
+            <a:avLst>
+              <a:gd name="adj1" fmla="val 487"/>
+            </a:avLst>
           </a:prstGeom>
           <a:ln w="19050">
             <a:solidFill>
@@ -4542,7 +4524,7 @@
           <a:p>
             <a:pPr algn="ctr"/>
             <a:r>
-              <a:rPr lang="en-US" sz="1050" dirty="0" smtClean="0">
+              <a:rPr lang="en-US" sz="1050" dirty="0">
                 <a:solidFill>
                   <a:srgbClr val="7030A0"/>
                 </a:solidFill>
@@ -4684,7 +4666,7 @@
           <a:p>
             <a:pPr algn="ctr"/>
             <a:r>
-              <a:rPr lang="en-US" sz="1050" dirty="0" smtClean="0">
+              <a:rPr lang="en-US" sz="1050" dirty="0">
                 <a:solidFill>
                   <a:srgbClr val="7030A0"/>
                 </a:solidFill>
@@ -4828,12 +4810,12 @@
           <a:p>
             <a:pPr algn="ctr"/>
             <a:r>
-              <a:rPr lang="en-US" sz="1050" dirty="0" smtClean="0">
+              <a:rPr lang="en-US" sz="1050" dirty="0">
                 <a:solidFill>
                   <a:srgbClr val="7030A0"/>
                 </a:solidFill>
               </a:rPr>
-              <a:t>Phone</a:t>
+              <a:t>NRIC</a:t>
             </a:r>
             <a:endParaRPr lang="en-SG" sz="1050" dirty="0">
               <a:solidFill>
@@ -4925,12 +4907,12 @@
           <a:p>
             <a:pPr algn="ctr"/>
             <a:r>
-              <a:rPr lang="en-US" sz="1050" dirty="0" smtClean="0">
+              <a:rPr lang="en-US" sz="1050" dirty="0">
                 <a:solidFill>
                   <a:srgbClr val="7030A0"/>
                 </a:solidFill>
               </a:rPr>
-              <a:t>Email</a:t>
+              <a:t>Remark</a:t>
             </a:r>
             <a:endParaRPr lang="en-SG" sz="1050" dirty="0">
               <a:solidFill>
@@ -4953,103 +4935,6 @@
           <a:xfrm>
             <a:off x="7277995" y="3034891"/>
             <a:ext cx="434402" cy="318195"/>
-          </a:xfrm>
-          <a:prstGeom prst="bentConnector3">
-            <a:avLst/>
-          </a:prstGeom>
-          <a:ln w="19050">
-            <a:solidFill>
-              <a:srgbClr val="7030A0"/>
-            </a:solidFill>
-            <a:headEnd type="none" w="med" len="med"/>
-            <a:tailEnd type="arrow" w="med" len="med"/>
-          </a:ln>
-          <a:effectLst/>
-        </p:spPr>
-        <p:style>
-          <a:lnRef idx="1">
-            <a:schemeClr val="accent2"/>
-          </a:lnRef>
-          <a:fillRef idx="2">
-            <a:schemeClr val="accent2"/>
-          </a:fillRef>
-          <a:effectRef idx="1">
-            <a:schemeClr val="accent2"/>
-          </a:effectRef>
-          <a:fontRef idx="minor">
-            <a:schemeClr val="dk1"/>
-          </a:fontRef>
-        </p:style>
-      </p:cxnSp>
-      <p:sp>
-        <p:nvSpPr>
-          <p:cNvPr id="85" name="Rectangle 8"/>
-          <p:cNvSpPr/>
-          <p:nvPr/>
-        </p:nvSpPr>
-        <p:spPr>
-          <a:xfrm>
-            <a:off x="7712397" y="3533171"/>
-            <a:ext cx="708186" cy="285783"/>
-          </a:xfrm>
-          <a:prstGeom prst="rect">
-            <a:avLst/>
-          </a:prstGeom>
-          <a:ln w="19050">
-            <a:solidFill>
-              <a:srgbClr val="7030A0"/>
-            </a:solidFill>
-          </a:ln>
-          <a:effectLst/>
-        </p:spPr>
-        <p:style>
-          <a:lnRef idx="1">
-            <a:schemeClr val="accent4"/>
-          </a:lnRef>
-          <a:fillRef idx="2">
-            <a:schemeClr val="accent4"/>
-          </a:fillRef>
-          <a:effectRef idx="1">
-            <a:schemeClr val="accent4"/>
-          </a:effectRef>
-          <a:fontRef idx="minor">
-            <a:schemeClr val="dk1"/>
-          </a:fontRef>
-        </p:style>
-        <p:txBody>
-          <a:bodyPr rtlCol="0" anchor="ctr"/>
-          <a:lstStyle/>
-          <a:p>
-            <a:pPr algn="ctr"/>
-            <a:r>
-              <a:rPr lang="en-US" sz="1050" dirty="0" smtClean="0">
-                <a:solidFill>
-                  <a:srgbClr val="7030A0"/>
-                </a:solidFill>
-              </a:rPr>
-              <a:t>Address</a:t>
-            </a:r>
-            <a:endParaRPr lang="en-SG" sz="1050" dirty="0">
-              <a:solidFill>
-                <a:srgbClr val="7030A0"/>
-              </a:solidFill>
-            </a:endParaRPr>
-          </a:p>
-        </p:txBody>
-      </p:sp>
-      <p:cxnSp>
-        <p:nvCxnSpPr>
-          <p:cNvPr id="86" name="Elbow Connector 85"/>
-          <p:cNvCxnSpPr>
-            <a:stCxn id="78" idx="3"/>
-            <a:endCxn id="85" idx="1"/>
-          </p:cNvCxnSpPr>
-          <p:nvPr/>
-        </p:nvCxnSpPr>
-        <p:spPr>
-          <a:xfrm>
-            <a:off x="7277995" y="3034891"/>
-            <a:ext cx="434402" cy="641172"/>
           </a:xfrm>
           <a:prstGeom prst="bentConnector3">
             <a:avLst/>
@@ -5210,7 +5095,7 @@
           <a:p>
             <a:pPr algn="ctr"/>
             <a:r>
-              <a:rPr lang="en-US" sz="1050" dirty="0" smtClean="0">
+              <a:rPr lang="en-US" sz="1050" dirty="0">
                 <a:solidFill>
                   <a:srgbClr val="7030A0"/>
                 </a:solidFill>
@@ -5218,14 +5103,14 @@
               <a:t>&lt;&lt;interface&gt;&gt;</a:t>
             </a:r>
             <a:br>
-              <a:rPr lang="en-US" sz="1050" dirty="0" smtClean="0">
+              <a:rPr lang="en-US" sz="1050" dirty="0">
                 <a:solidFill>
                   <a:srgbClr val="7030A0"/>
                 </a:solidFill>
               </a:rPr>
             </a:br>
             <a:r>
-              <a:rPr lang="en-US" sz="1050" dirty="0" err="1" smtClean="0">
+              <a:rPr lang="en-US" sz="1050" dirty="0" err="1">
                 <a:solidFill>
                   <a:srgbClr val="7030A0"/>
                 </a:solidFill>
@@ -5264,7 +5149,7 @@
           <a:p>
             <a:pPr algn="r"/>
             <a:r>
-              <a:rPr lang="en-US" sz="1100" dirty="0" smtClean="0">
+              <a:rPr lang="en-US" sz="1100" dirty="0">
                 <a:solidFill>
                   <a:srgbClr val="7030A0"/>
                 </a:solidFill>
@@ -5287,7 +5172,7 @@
         </p:nvSpPr>
         <p:spPr>
           <a:xfrm>
-            <a:off x="2057401" y="4239491"/>
+            <a:off x="2057401" y="4419600"/>
             <a:ext cx="1066800" cy="346760"/>
           </a:xfrm>
           <a:prstGeom prst="rect">
@@ -5320,20 +5205,12 @@
           <a:p>
             <a:pPr algn="ctr"/>
             <a:r>
-              <a:rPr lang="en-US" sz="1050" dirty="0" smtClean="0">
+              <a:rPr lang="en-US" sz="1050" dirty="0">
                 <a:solidFill>
                   <a:srgbClr val="7030A0"/>
                 </a:solidFill>
               </a:rPr>
               <a:t>&lt;&lt;interface&gt;&gt;</a:t>
-            </a:r>
-            <a:r>
-              <a:rPr lang="en-US" sz="1050">
-                <a:solidFill>
-                  <a:srgbClr val="7030A0"/>
-                </a:solidFill>
-              </a:rPr>
-              <a:t/>
             </a:r>
             <a:br>
               <a:rPr lang="en-US" sz="1050">
@@ -5343,7 +5220,7 @@
               </a:rPr>
             </a:br>
             <a:r>
-              <a:rPr lang="en-US" sz="1050" dirty="0" err="1" smtClean="0">
+              <a:rPr lang="en-US" sz="1050" dirty="0" err="1">
                 <a:solidFill>
                   <a:srgbClr val="7030A0"/>
                 </a:solidFill>
@@ -5369,8 +5246,8 @@
         </p:nvCxnSpPr>
         <p:spPr>
           <a:xfrm rot="16200000" flipH="1">
-            <a:off x="1364475" y="3719944"/>
-            <a:ext cx="831471" cy="554381"/>
+            <a:off x="1274420" y="3809999"/>
+            <a:ext cx="1011580" cy="554381"/>
           </a:xfrm>
           <a:prstGeom prst="bentConnector2">
             <a:avLst/>
@@ -5404,6 +5281,7 @@
         <p:nvCxnSpPr>
           <p:cNvPr id="50" name="Elbow Connector 49"/>
           <p:cNvCxnSpPr>
+            <a:cxnSpLocks/>
             <a:stCxn id="62" idx="0"/>
             <a:endCxn id="57" idx="3"/>
           </p:cNvCxnSpPr>
@@ -5411,8 +5289,8 @@
         </p:nvCxnSpPr>
         <p:spPr>
           <a:xfrm rot="16200000" flipV="1">
-            <a:off x="5948976" y="2139271"/>
-            <a:ext cx="404117" cy="1033473"/>
+            <a:off x="5962655" y="2152951"/>
+            <a:ext cx="404117" cy="1006114"/>
           </a:xfrm>
           <a:prstGeom prst="bentConnector2">
             <a:avLst/>
@@ -5465,7 +5343,7 @@
           <a:p>
             <a:pPr algn="ctr"/>
             <a:r>
-              <a:rPr lang="en-US" sz="1100" dirty="0" smtClean="0">
+              <a:rPr lang="en-US" sz="1100" dirty="0">
                 <a:solidFill>
                   <a:srgbClr val="7030A0"/>
                 </a:solidFill>
@@ -5504,7 +5382,7 @@
           <a:p>
             <a:pPr algn="ctr"/>
             <a:r>
-              <a:rPr lang="en-US" sz="1100" dirty="0" smtClean="0">
+              <a:rPr lang="en-US" sz="1100" dirty="0">
                 <a:solidFill>
                   <a:srgbClr val="7030A0"/>
                 </a:solidFill>
@@ -5543,7 +5421,7 @@
           <a:p>
             <a:pPr algn="ctr"/>
             <a:r>
-              <a:rPr lang="en-US" sz="1100" dirty="0" smtClean="0">
+              <a:rPr lang="en-US" sz="1100" dirty="0">
                 <a:solidFill>
                   <a:srgbClr val="7030A0"/>
                 </a:solidFill>
@@ -5582,7 +5460,7 @@
           <a:p>
             <a:pPr algn="ctr"/>
             <a:r>
-              <a:rPr lang="en-US" sz="1100" dirty="0" smtClean="0">
+              <a:rPr lang="en-US" sz="1100" dirty="0">
                 <a:solidFill>
                   <a:srgbClr val="7030A0"/>
                 </a:solidFill>
@@ -5621,7 +5499,7 @@
           <a:p>
             <a:pPr algn="ctr"/>
             <a:r>
-              <a:rPr lang="en-US" sz="1100" dirty="0" smtClean="0">
+              <a:rPr lang="en-US" sz="1100" dirty="0">
                 <a:solidFill>
                   <a:srgbClr val="7030A0"/>
                 </a:solidFill>
@@ -5660,7 +5538,7 @@
           <a:p>
             <a:pPr algn="ctr"/>
             <a:r>
-              <a:rPr lang="en-US" sz="1100" dirty="0" smtClean="0">
+              <a:rPr lang="en-US" sz="1100" dirty="0">
                 <a:solidFill>
                   <a:srgbClr val="7030A0"/>
                 </a:solidFill>
@@ -5699,7 +5577,7 @@
           <a:p>
             <a:pPr algn="ctr"/>
             <a:r>
-              <a:rPr lang="en-US" sz="1100" dirty="0" smtClean="0">
+              <a:rPr lang="en-US" sz="1100" dirty="0">
                 <a:solidFill>
                   <a:srgbClr val="7030A0"/>
                 </a:solidFill>
@@ -5738,12 +5616,466 @@
           <a:p>
             <a:pPr algn="ctr"/>
             <a:r>
-              <a:rPr lang="en-US" sz="1100" dirty="0" smtClean="0">
+              <a:rPr lang="en-US" sz="1100" dirty="0">
                 <a:solidFill>
                   <a:srgbClr val="7030A0"/>
                 </a:solidFill>
               </a:rPr>
               <a:t>1</a:t>
+            </a:r>
+            <a:endParaRPr lang="en-SG" sz="1100" dirty="0">
+              <a:solidFill>
+                <a:srgbClr val="7030A0"/>
+              </a:solidFill>
+            </a:endParaRPr>
+          </a:p>
+        </p:txBody>
+      </p:sp>
+      <p:sp>
+        <p:nvSpPr>
+          <p:cNvPr id="52" name="Rectangle 8">
+            <a:extLst>
+              <a:ext uri="{FF2B5EF4-FFF2-40B4-BE49-F238E27FC236}">
+                <a16:creationId xmlns:a16="http://schemas.microsoft.com/office/drawing/2014/main" id="{4C81A460-4593-41DF-AEEC-1958D2E1074B}"/>
+              </a:ext>
+            </a:extLst>
+          </p:cNvPr>
+          <p:cNvSpPr/>
+          <p:nvPr/>
+        </p:nvSpPr>
+        <p:spPr>
+          <a:xfrm>
+            <a:off x="4495800" y="3387040"/>
+            <a:ext cx="1172189" cy="346760"/>
+          </a:xfrm>
+          <a:prstGeom prst="rect">
+            <a:avLst/>
+          </a:prstGeom>
+          <a:ln w="19050">
+            <a:solidFill>
+              <a:srgbClr val="7030A0"/>
+            </a:solidFill>
+          </a:ln>
+          <a:effectLst/>
+        </p:spPr>
+        <p:style>
+          <a:lnRef idx="1">
+            <a:schemeClr val="accent4"/>
+          </a:lnRef>
+          <a:fillRef idx="2">
+            <a:schemeClr val="accent4"/>
+          </a:fillRef>
+          <a:effectRef idx="1">
+            <a:schemeClr val="accent4"/>
+          </a:effectRef>
+          <a:fontRef idx="minor">
+            <a:schemeClr val="dk1"/>
+          </a:fontRef>
+        </p:style>
+        <p:txBody>
+          <a:bodyPr rtlCol="0" anchor="ctr"/>
+          <a:lstStyle/>
+          <a:p>
+            <a:pPr algn="ctr"/>
+            <a:r>
+              <a:rPr lang="en-US" sz="1050" dirty="0" err="1">
+                <a:solidFill>
+                  <a:srgbClr val="7030A0"/>
+                </a:solidFill>
+              </a:rPr>
+              <a:t>UniqueSubjectList</a:t>
+            </a:r>
+            <a:endParaRPr lang="en-SG" sz="1050" dirty="0">
+              <a:solidFill>
+                <a:srgbClr val="7030A0"/>
+              </a:solidFill>
+            </a:endParaRPr>
+          </a:p>
+        </p:txBody>
+      </p:sp>
+      <p:cxnSp>
+        <p:nvCxnSpPr>
+          <p:cNvPr id="53" name="Elbow Connector 29">
+            <a:extLst>
+              <a:ext uri="{FF2B5EF4-FFF2-40B4-BE49-F238E27FC236}">
+                <a16:creationId xmlns:a16="http://schemas.microsoft.com/office/drawing/2014/main" id="{7CE69C6D-79C6-453E-8A8A-8C64743B2578}"/>
+              </a:ext>
+            </a:extLst>
+          </p:cNvPr>
+          <p:cNvCxnSpPr>
+            <a:cxnSpLocks/>
+          </p:cNvCxnSpPr>
+          <p:nvPr/>
+        </p:nvCxnSpPr>
+        <p:spPr>
+          <a:xfrm rot="16200000" flipH="1">
+            <a:off x="4019732" y="3084352"/>
+            <a:ext cx="799736" cy="152397"/>
+          </a:xfrm>
+          <a:prstGeom prst="bentConnector3">
+            <a:avLst>
+              <a:gd name="adj1" fmla="val 99864"/>
+            </a:avLst>
+          </a:prstGeom>
+          <a:ln w="19050">
+            <a:solidFill>
+              <a:srgbClr val="7030A0"/>
+            </a:solidFill>
+            <a:headEnd type="none" w="med" len="med"/>
+            <a:tailEnd type="arrow" w="med" len="med"/>
+          </a:ln>
+          <a:effectLst/>
+        </p:spPr>
+        <p:style>
+          <a:lnRef idx="1">
+            <a:schemeClr val="accent2"/>
+          </a:lnRef>
+          <a:fillRef idx="2">
+            <a:schemeClr val="accent2"/>
+          </a:fillRef>
+          <a:effectRef idx="1">
+            <a:schemeClr val="accent2"/>
+          </a:effectRef>
+          <a:fontRef idx="minor">
+            <a:schemeClr val="dk1"/>
+          </a:fontRef>
+        </p:style>
+      </p:cxnSp>
+      <p:sp>
+        <p:nvSpPr>
+          <p:cNvPr id="71" name="TextBox 70">
+            <a:extLst>
+              <a:ext uri="{FF2B5EF4-FFF2-40B4-BE49-F238E27FC236}">
+                <a16:creationId xmlns:a16="http://schemas.microsoft.com/office/drawing/2014/main" id="{BF6814FF-622F-41DC-9AA8-BE5309479B5D}"/>
+              </a:ext>
+            </a:extLst>
+          </p:cNvPr>
+          <p:cNvSpPr txBox="1"/>
+          <p:nvPr/>
+        </p:nvSpPr>
+        <p:spPr>
+          <a:xfrm>
+            <a:off x="4314482" y="3343436"/>
+            <a:ext cx="189257" cy="178683"/>
+          </a:xfrm>
+          <a:prstGeom prst="rect">
+            <a:avLst/>
+          </a:prstGeom>
+          <a:noFill/>
+        </p:spPr>
+        <p:txBody>
+          <a:bodyPr wrap="square" lIns="0" tIns="0" rIns="0" bIns="0" rtlCol="0">
+            <a:noAutofit/>
+          </a:bodyPr>
+          <a:lstStyle/>
+          <a:p>
+            <a:pPr algn="ctr"/>
+            <a:r>
+              <a:rPr lang="en-US" sz="1100" dirty="0">
+                <a:solidFill>
+                  <a:srgbClr val="7030A0"/>
+                </a:solidFill>
+              </a:rPr>
+              <a:t>1</a:t>
+            </a:r>
+            <a:endParaRPr lang="en-SG" sz="1100" dirty="0">
+              <a:solidFill>
+                <a:srgbClr val="7030A0"/>
+              </a:solidFill>
+            </a:endParaRPr>
+          </a:p>
+        </p:txBody>
+      </p:sp>
+      <p:cxnSp>
+        <p:nvCxnSpPr>
+          <p:cNvPr id="72" name="Elbow Connector 29">
+            <a:extLst>
+              <a:ext uri="{FF2B5EF4-FFF2-40B4-BE49-F238E27FC236}">
+                <a16:creationId xmlns:a16="http://schemas.microsoft.com/office/drawing/2014/main" id="{028FF400-EDE2-4DFF-9267-A5DDED17363E}"/>
+              </a:ext>
+            </a:extLst>
+          </p:cNvPr>
+          <p:cNvCxnSpPr>
+            <a:cxnSpLocks/>
+            <a:stCxn id="62" idx="2"/>
+            <a:endCxn id="52" idx="3"/>
+          </p:cNvCxnSpPr>
+          <p:nvPr/>
+        </p:nvCxnSpPr>
+        <p:spPr>
+          <a:xfrm rot="5400000">
+            <a:off x="5990083" y="2882733"/>
+            <a:ext cx="355594" cy="999781"/>
+          </a:xfrm>
+          <a:prstGeom prst="bentConnector2">
+            <a:avLst/>
+          </a:prstGeom>
+          <a:ln w="19050">
+            <a:solidFill>
+              <a:srgbClr val="7030A0"/>
+            </a:solidFill>
+            <a:headEnd type="none" w="med" len="med"/>
+            <a:tailEnd type="arrow" w="med" len="med"/>
+          </a:ln>
+          <a:effectLst/>
+        </p:spPr>
+        <p:style>
+          <a:lnRef idx="1">
+            <a:schemeClr val="accent2"/>
+          </a:lnRef>
+          <a:fillRef idx="2">
+            <a:schemeClr val="accent2"/>
+          </a:fillRef>
+          <a:effectRef idx="1">
+            <a:schemeClr val="accent2"/>
+          </a:effectRef>
+          <a:fontRef idx="minor">
+            <a:schemeClr val="dk1"/>
+          </a:fontRef>
+        </p:style>
+      </p:cxnSp>
+      <p:sp>
+        <p:nvSpPr>
+          <p:cNvPr id="73" name="TextBox 72">
+            <a:extLst>
+              <a:ext uri="{FF2B5EF4-FFF2-40B4-BE49-F238E27FC236}">
+                <a16:creationId xmlns:a16="http://schemas.microsoft.com/office/drawing/2014/main" id="{46215EBF-26F4-43DC-A8EB-85FF8FB0DF77}"/>
+              </a:ext>
+            </a:extLst>
+          </p:cNvPr>
+          <p:cNvSpPr txBox="1"/>
+          <p:nvPr/>
+        </p:nvSpPr>
+        <p:spPr>
+          <a:xfrm>
+            <a:off x="5791200" y="3581400"/>
+            <a:ext cx="189257" cy="178683"/>
+          </a:xfrm>
+          <a:prstGeom prst="rect">
+            <a:avLst/>
+          </a:prstGeom>
+          <a:noFill/>
+        </p:spPr>
+        <p:txBody>
+          <a:bodyPr wrap="square" lIns="0" tIns="0" rIns="0" bIns="0" rtlCol="0">
+            <a:noAutofit/>
+          </a:bodyPr>
+          <a:lstStyle/>
+          <a:p>
+            <a:pPr algn="ctr"/>
+            <a:r>
+              <a:rPr lang="en-US" sz="1100" dirty="0">
+                <a:solidFill>
+                  <a:srgbClr val="7030A0"/>
+                </a:solidFill>
+              </a:rPr>
+              <a:t>1</a:t>
+            </a:r>
+            <a:endParaRPr lang="en-SG" sz="1100" dirty="0">
+              <a:solidFill>
+                <a:srgbClr val="7030A0"/>
+              </a:solidFill>
+            </a:endParaRPr>
+          </a:p>
+        </p:txBody>
+      </p:sp>
+      <p:sp>
+        <p:nvSpPr>
+          <p:cNvPr id="74" name="Flowchart: Decision 96">
+            <a:extLst>
+              <a:ext uri="{FF2B5EF4-FFF2-40B4-BE49-F238E27FC236}">
+                <a16:creationId xmlns:a16="http://schemas.microsoft.com/office/drawing/2014/main" id="{95A2CA35-3119-4A6D-8889-F07CCC030936}"/>
+              </a:ext>
+            </a:extLst>
+          </p:cNvPr>
+          <p:cNvSpPr/>
+          <p:nvPr/>
+        </p:nvSpPr>
+        <p:spPr>
+          <a:xfrm rot="16200000">
+            <a:off x="4976886" y="3765135"/>
+            <a:ext cx="236048" cy="173380"/>
+          </a:xfrm>
+          <a:prstGeom prst="flowChartDecision">
+            <a:avLst/>
+          </a:prstGeom>
+          <a:noFill/>
+          <a:ln w="19050">
+            <a:solidFill>
+              <a:srgbClr val="7030A0"/>
+            </a:solidFill>
+          </a:ln>
+          <a:effectLst/>
+        </p:spPr>
+        <p:style>
+          <a:lnRef idx="1">
+            <a:schemeClr val="accent6"/>
+          </a:lnRef>
+          <a:fillRef idx="2">
+            <a:schemeClr val="accent6"/>
+          </a:fillRef>
+          <a:effectRef idx="1">
+            <a:schemeClr val="accent6"/>
+          </a:effectRef>
+          <a:fontRef idx="minor">
+            <a:schemeClr val="dk1"/>
+          </a:fontRef>
+        </p:style>
+        <p:txBody>
+          <a:bodyPr rtlCol="0" anchor="ctr"/>
+          <a:lstStyle/>
+          <a:p>
+            <a:pPr algn="ctr"/>
+            <a:endParaRPr lang="en-US" sz="1050"/>
+          </a:p>
+        </p:txBody>
+      </p:sp>
+      <p:cxnSp>
+        <p:nvCxnSpPr>
+          <p:cNvPr id="77" name="Elbow Connector 29">
+            <a:extLst>
+              <a:ext uri="{FF2B5EF4-FFF2-40B4-BE49-F238E27FC236}">
+                <a16:creationId xmlns:a16="http://schemas.microsoft.com/office/drawing/2014/main" id="{741E281A-D77E-450D-95F4-554D8993FE01}"/>
+              </a:ext>
+            </a:extLst>
+          </p:cNvPr>
+          <p:cNvCxnSpPr>
+            <a:cxnSpLocks/>
+          </p:cNvCxnSpPr>
+          <p:nvPr/>
+        </p:nvCxnSpPr>
+        <p:spPr>
+          <a:xfrm rot="10800000" flipV="1">
+            <a:off x="4419600" y="3969813"/>
+            <a:ext cx="673180" cy="28466"/>
+          </a:xfrm>
+          <a:prstGeom prst="bentConnector3">
+            <a:avLst>
+              <a:gd name="adj1" fmla="val -67"/>
+            </a:avLst>
+          </a:prstGeom>
+          <a:ln w="19050">
+            <a:solidFill>
+              <a:srgbClr val="7030A0"/>
+            </a:solidFill>
+            <a:headEnd type="none" w="med" len="med"/>
+            <a:tailEnd type="arrow" w="med" len="med"/>
+          </a:ln>
+          <a:effectLst/>
+        </p:spPr>
+        <p:style>
+          <a:lnRef idx="1">
+            <a:schemeClr val="accent2"/>
+          </a:lnRef>
+          <a:fillRef idx="2">
+            <a:schemeClr val="accent2"/>
+          </a:fillRef>
+          <a:effectRef idx="1">
+            <a:schemeClr val="accent2"/>
+          </a:effectRef>
+          <a:fontRef idx="minor">
+            <a:schemeClr val="dk1"/>
+          </a:fontRef>
+        </p:style>
+      </p:cxnSp>
+      <p:sp>
+        <p:nvSpPr>
+          <p:cNvPr id="82" name="Rectangle 8">
+            <a:extLst>
+              <a:ext uri="{FF2B5EF4-FFF2-40B4-BE49-F238E27FC236}">
+                <a16:creationId xmlns:a16="http://schemas.microsoft.com/office/drawing/2014/main" id="{CA295839-526B-4037-94D1-FE0CA0E13033}"/>
+              </a:ext>
+            </a:extLst>
+          </p:cNvPr>
+          <p:cNvSpPr/>
+          <p:nvPr/>
+        </p:nvSpPr>
+        <p:spPr>
+          <a:xfrm>
+            <a:off x="3801837" y="3810000"/>
+            <a:ext cx="617763" cy="346760"/>
+          </a:xfrm>
+          <a:prstGeom prst="rect">
+            <a:avLst/>
+          </a:prstGeom>
+          <a:ln w="19050">
+            <a:solidFill>
+              <a:srgbClr val="7030A0"/>
+            </a:solidFill>
+          </a:ln>
+          <a:effectLst/>
+        </p:spPr>
+        <p:style>
+          <a:lnRef idx="1">
+            <a:schemeClr val="accent4"/>
+          </a:lnRef>
+          <a:fillRef idx="2">
+            <a:schemeClr val="accent4"/>
+          </a:fillRef>
+          <a:effectRef idx="1">
+            <a:schemeClr val="accent4"/>
+          </a:effectRef>
+          <a:fontRef idx="minor">
+            <a:schemeClr val="dk1"/>
+          </a:fontRef>
+        </p:style>
+        <p:txBody>
+          <a:bodyPr rtlCol="0" anchor="ctr"/>
+          <a:lstStyle/>
+          <a:p>
+            <a:pPr algn="ctr"/>
+            <a:r>
+              <a:rPr lang="en-US" sz="1050" dirty="0">
+                <a:solidFill>
+                  <a:srgbClr val="7030A0"/>
+                </a:solidFill>
+              </a:rPr>
+              <a:t>Subject</a:t>
+            </a:r>
+            <a:endParaRPr lang="en-SG" sz="1050" dirty="0">
+              <a:solidFill>
+                <a:srgbClr val="7030A0"/>
+              </a:solidFill>
+            </a:endParaRPr>
+          </a:p>
+        </p:txBody>
+      </p:sp>
+      <p:sp>
+        <p:nvSpPr>
+          <p:cNvPr id="87" name="TextBox 86">
+            <a:extLst>
+              <a:ext uri="{FF2B5EF4-FFF2-40B4-BE49-F238E27FC236}">
+                <a16:creationId xmlns:a16="http://schemas.microsoft.com/office/drawing/2014/main" id="{56124A3E-1574-4173-9752-7849D8899D54}"/>
+              </a:ext>
+            </a:extLst>
+          </p:cNvPr>
+          <p:cNvSpPr txBox="1"/>
+          <p:nvPr/>
+        </p:nvSpPr>
+        <p:spPr>
+          <a:xfrm>
+            <a:off x="4382743" y="4038600"/>
+            <a:ext cx="189257" cy="178683"/>
+          </a:xfrm>
+          <a:prstGeom prst="rect">
+            <a:avLst/>
+          </a:prstGeom>
+          <a:noFill/>
+        </p:spPr>
+        <p:txBody>
+          <a:bodyPr wrap="square" lIns="0" tIns="0" rIns="0" bIns="0" rtlCol="0">
+            <a:noAutofit/>
+          </a:bodyPr>
+          <a:lstStyle/>
+          <a:p>
+            <a:pPr algn="ctr"/>
+            <a:r>
+              <a:rPr lang="en-US" sz="1100" dirty="0">
+                <a:solidFill>
+                  <a:srgbClr val="7030A0"/>
+                </a:solidFill>
+              </a:rPr>
+              <a:t>*</a:t>
             </a:r>
             <a:endParaRPr lang="en-SG" sz="1100" dirty="0">
               <a:solidFill>
@@ -5763,13 +6095,6 @@
   <p:clrMapOvr>
     <a:masterClrMapping/>
   </p:clrMapOvr>
-  <p:timing>
-    <p:tnLst>
-      <p:par>
-        <p:cTn id="1" dur="indefinite" restart="never" nodeType="tmRoot"/>
-      </p:par>
-    </p:tnLst>
-  </p:timing>
 </p:sld>
 </file>
 

</xml_diff>

<commit_message>
Update model and storage class diagrams
</commit_message>
<xml_diff>
--- a/docs/diagrams/ModelComponentClassDiagram.pptx
+++ b/docs/diagrams/ModelComponentClassDiagram.pptx
@@ -208,7 +208,7 @@
           <a:p>
             <a:fld id="{F5CC4B3F-88C1-4FFA-B1B6-F41C21DC6924}" type="datetimeFigureOut">
               <a:rPr lang="en-US" smtClean="0"/>
-              <a:t>3/19/18</a:t>
+              <a:t>4/4/2018</a:t>
             </a:fld>
             <a:endParaRPr lang="en-US"/>
           </a:p>
@@ -654,7 +654,7 @@
           <a:p>
             <a:fld id="{78C97017-6FC3-485B-9764-EAC9E56C1D49}" type="datetimeFigureOut">
               <a:rPr lang="en-US" smtClean="0"/>
-              <a:t>3/19/18</a:t>
+              <a:t>4/4/2018</a:t>
             </a:fld>
             <a:endParaRPr lang="en-US"/>
           </a:p>
@@ -822,7 +822,7 @@
           <a:p>
             <a:fld id="{78C97017-6FC3-485B-9764-EAC9E56C1D49}" type="datetimeFigureOut">
               <a:rPr lang="en-US" smtClean="0"/>
-              <a:t>3/19/18</a:t>
+              <a:t>4/4/2018</a:t>
             </a:fld>
             <a:endParaRPr lang="en-US"/>
           </a:p>
@@ -1000,7 +1000,7 @@
           <a:p>
             <a:fld id="{78C97017-6FC3-485B-9764-EAC9E56C1D49}" type="datetimeFigureOut">
               <a:rPr lang="en-US" smtClean="0"/>
-              <a:t>3/19/18</a:t>
+              <a:t>4/4/2018</a:t>
             </a:fld>
             <a:endParaRPr lang="en-US"/>
           </a:p>
@@ -1168,7 +1168,7 @@
           <a:p>
             <a:fld id="{78C97017-6FC3-485B-9764-EAC9E56C1D49}" type="datetimeFigureOut">
               <a:rPr lang="en-US" smtClean="0"/>
-              <a:t>3/19/18</a:t>
+              <a:t>4/4/2018</a:t>
             </a:fld>
             <a:endParaRPr lang="en-US"/>
           </a:p>
@@ -1413,7 +1413,7 @@
           <a:p>
             <a:fld id="{78C97017-6FC3-485B-9764-EAC9E56C1D49}" type="datetimeFigureOut">
               <a:rPr lang="en-US" smtClean="0"/>
-              <a:t>3/19/18</a:t>
+              <a:t>4/4/2018</a:t>
             </a:fld>
             <a:endParaRPr lang="en-US"/>
           </a:p>
@@ -1698,7 +1698,7 @@
           <a:p>
             <a:fld id="{78C97017-6FC3-485B-9764-EAC9E56C1D49}" type="datetimeFigureOut">
               <a:rPr lang="en-US" smtClean="0"/>
-              <a:t>3/19/18</a:t>
+              <a:t>4/4/2018</a:t>
             </a:fld>
             <a:endParaRPr lang="en-US"/>
           </a:p>
@@ -2117,7 +2117,7 @@
           <a:p>
             <a:fld id="{78C97017-6FC3-485B-9764-EAC9E56C1D49}" type="datetimeFigureOut">
               <a:rPr lang="en-US" smtClean="0"/>
-              <a:t>3/19/18</a:t>
+              <a:t>4/4/2018</a:t>
             </a:fld>
             <a:endParaRPr lang="en-US"/>
           </a:p>
@@ -2234,7 +2234,7 @@
           <a:p>
             <a:fld id="{78C97017-6FC3-485B-9764-EAC9E56C1D49}" type="datetimeFigureOut">
               <a:rPr lang="en-US" smtClean="0"/>
-              <a:t>3/19/18</a:t>
+              <a:t>4/4/2018</a:t>
             </a:fld>
             <a:endParaRPr lang="en-US"/>
           </a:p>
@@ -2329,7 +2329,7 @@
           <a:p>
             <a:fld id="{78C97017-6FC3-485B-9764-EAC9E56C1D49}" type="datetimeFigureOut">
               <a:rPr lang="en-US" smtClean="0"/>
-              <a:t>3/19/18</a:t>
+              <a:t>4/4/2018</a:t>
             </a:fld>
             <a:endParaRPr lang="en-US"/>
           </a:p>
@@ -2604,7 +2604,7 @@
           <a:p>
             <a:fld id="{78C97017-6FC3-485B-9764-EAC9E56C1D49}" type="datetimeFigureOut">
               <a:rPr lang="en-US" smtClean="0"/>
-              <a:t>3/19/18</a:t>
+              <a:t>4/4/2018</a:t>
             </a:fld>
             <a:endParaRPr lang="en-US"/>
           </a:p>
@@ -2856,7 +2856,7 @@
           <a:p>
             <a:fld id="{78C97017-6FC3-485B-9764-EAC9E56C1D49}" type="datetimeFigureOut">
               <a:rPr lang="en-US" smtClean="0"/>
-              <a:t>3/19/18</a:t>
+              <a:t>4/4/2018</a:t>
             </a:fld>
             <a:endParaRPr lang="en-US"/>
           </a:p>
@@ -3067,7 +3067,7 @@
           <a:p>
             <a:fld id="{78C97017-6FC3-485B-9764-EAC9E56C1D49}" type="datetimeFigureOut">
               <a:rPr lang="en-US" smtClean="0"/>
-              <a:t>3/19/18</a:t>
+              <a:t>4/4/2018</a:t>
             </a:fld>
             <a:endParaRPr lang="en-US"/>
           </a:p>
@@ -3451,7 +3451,7 @@
         <p:spPr>
           <a:xfrm>
             <a:off x="1119865" y="1066800"/>
-            <a:ext cx="7543800" cy="3810000"/>
+            <a:ext cx="7543800" cy="4566280"/>
           </a:xfrm>
           <a:prstGeom prst="roundRect">
             <a:avLst>
@@ -3570,8 +3570,8 @@
         </p:nvSpPr>
         <p:spPr>
           <a:xfrm rot="16200000">
-            <a:off x="1683963" y="2868687"/>
-            <a:ext cx="1093635" cy="346760"/>
+            <a:off x="1446931" y="3105718"/>
+            <a:ext cx="1570828" cy="349889"/>
           </a:xfrm>
           <a:prstGeom prst="rect">
             <a:avLst/>
@@ -3625,19 +3625,20 @@
         <p:nvCxnSpPr>
           <p:cNvPr id="107" name="Elbow Connector 106"/>
           <p:cNvCxnSpPr>
+            <a:cxnSpLocks/>
             <a:stCxn id="9" idx="1"/>
+            <a:endCxn id="62" idx="2"/>
           </p:cNvCxnSpPr>
           <p:nvPr/>
         </p:nvCxnSpPr>
         <p:spPr>
           <a:xfrm rot="5400000" flipH="1" flipV="1">
-            <a:off x="4360065" y="1080909"/>
-            <a:ext cx="378691" cy="4637261"/>
-          </a:xfrm>
-          <a:prstGeom prst="bentConnector4">
+            <a:off x="4019432" y="1417740"/>
+            <a:ext cx="861251" cy="4435424"/>
+          </a:xfrm>
+          <a:prstGeom prst="bentConnector3">
             <a:avLst>
-              <a:gd name="adj1" fmla="val -101829"/>
-              <a:gd name="adj2" fmla="val 99976"/>
+              <a:gd name="adj1" fmla="val -74833"/>
             </a:avLst>
           </a:prstGeom>
           <a:ln w="19050">
@@ -3673,8 +3674,8 @@
         </p:nvSpPr>
         <p:spPr>
           <a:xfrm rot="16200000">
-            <a:off x="956202" y="2861202"/>
-            <a:ext cx="1093635" cy="346760"/>
+            <a:off x="723716" y="3093688"/>
+            <a:ext cx="1578312" cy="366464"/>
           </a:xfrm>
           <a:prstGeom prst="rect">
             <a:avLst/>
@@ -3743,7 +3744,7 @@
         </p:nvSpPr>
         <p:spPr>
           <a:xfrm rot="16200000">
-            <a:off x="1626910" y="2952291"/>
+            <a:off x="1615930" y="3164849"/>
             <a:ext cx="270504" cy="175523"/>
           </a:xfrm>
           <a:prstGeom prst="triangle">
@@ -3831,7 +3832,7 @@
         </p:nvCxnSpPr>
         <p:spPr>
           <a:xfrm>
-            <a:off x="910091" y="3040053"/>
+            <a:off x="908917" y="3253841"/>
             <a:ext cx="419548" cy="2860"/>
           </a:xfrm>
           <a:prstGeom prst="bentConnector3">
@@ -3876,7 +3877,7 @@
         </p:nvCxnSpPr>
         <p:spPr>
           <a:xfrm flipV="1">
-            <a:off x="1849924" y="3040052"/>
+            <a:off x="1838944" y="3252610"/>
             <a:ext cx="216105" cy="1"/>
           </a:xfrm>
           <a:prstGeom prst="line">
@@ -5267,7 +5268,7 @@
         </p:nvSpPr>
         <p:spPr>
           <a:xfrm>
-            <a:off x="2057401" y="4239491"/>
+            <a:off x="2029969" y="4867414"/>
             <a:ext cx="1066800" cy="346760"/>
           </a:xfrm>
           <a:prstGeom prst="rect">
@@ -5334,15 +5335,15 @@
         <p:nvCxnSpPr>
           <p:cNvPr id="124" name="Elbow Connector 122"/>
           <p:cNvCxnSpPr>
-            <a:stCxn id="119" idx="1"/>
+            <a:cxnSpLocks/>
             <a:endCxn id="122" idx="1"/>
           </p:cNvCxnSpPr>
           <p:nvPr/>
         </p:nvCxnSpPr>
         <p:spPr>
           <a:xfrm rot="16200000" flipH="1">
-            <a:off x="1364475" y="3719944"/>
-            <a:ext cx="831471" cy="554381"/>
+            <a:off x="1058072" y="4068897"/>
+            <a:ext cx="1358098" cy="585695"/>
           </a:xfrm>
           <a:prstGeom prst="bentConnector2">
             <a:avLst/>
@@ -6187,6 +6188,832 @@
               <a:t>1</a:t>
             </a:r>
             <a:endParaRPr lang="en-SG" sz="1100" dirty="0">
+              <a:solidFill>
+                <a:srgbClr val="7030A0"/>
+              </a:solidFill>
+            </a:endParaRPr>
+          </a:p>
+        </p:txBody>
+      </p:sp>
+      <p:cxnSp>
+        <p:nvCxnSpPr>
+          <p:cNvPr id="74" name="Straight Arrow Connector 73">
+            <a:extLst>
+              <a:ext uri="{FF2B5EF4-FFF2-40B4-BE49-F238E27FC236}">
+                <a16:creationId xmlns:a16="http://schemas.microsoft.com/office/drawing/2014/main" id="{53422C3A-1661-48CA-A8AD-8E6866FC2538}"/>
+              </a:ext>
+            </a:extLst>
+          </p:cNvPr>
+          <p:cNvCxnSpPr>
+            <a:cxnSpLocks/>
+            <a:stCxn id="77" idx="3"/>
+          </p:cNvCxnSpPr>
+          <p:nvPr/>
+        </p:nvCxnSpPr>
+        <p:spPr>
+          <a:xfrm>
+            <a:off x="2654064" y="3806855"/>
+            <a:ext cx="220810" cy="5284"/>
+          </a:xfrm>
+          <a:prstGeom prst="straightConnector1">
+            <a:avLst/>
+          </a:prstGeom>
+          <a:ln w="19050">
+            <a:solidFill>
+              <a:srgbClr val="7030A0"/>
+            </a:solidFill>
+            <a:headEnd type="none" w="med" len="med"/>
+            <a:tailEnd type="arrow" w="med" len="med"/>
+          </a:ln>
+          <a:effectLst/>
+        </p:spPr>
+        <p:style>
+          <a:lnRef idx="1">
+            <a:schemeClr val="accent2"/>
+          </a:lnRef>
+          <a:fillRef idx="2">
+            <a:schemeClr val="accent2"/>
+          </a:fillRef>
+          <a:effectRef idx="1">
+            <a:schemeClr val="accent2"/>
+          </a:effectRef>
+          <a:fontRef idx="minor">
+            <a:schemeClr val="dk1"/>
+          </a:fontRef>
+        </p:style>
+      </p:cxnSp>
+      <p:sp>
+        <p:nvSpPr>
+          <p:cNvPr id="77" name="Flowchart: Decision 96">
+            <a:extLst>
+              <a:ext uri="{FF2B5EF4-FFF2-40B4-BE49-F238E27FC236}">
+                <a16:creationId xmlns:a16="http://schemas.microsoft.com/office/drawing/2014/main" id="{EAC8CF8B-0C0E-4A08-8D9E-35CF729F9CFC}"/>
+              </a:ext>
+            </a:extLst>
+          </p:cNvPr>
+          <p:cNvSpPr/>
+          <p:nvPr/>
+        </p:nvSpPr>
+        <p:spPr>
+          <a:xfrm>
+            <a:off x="2418016" y="3720165"/>
+            <a:ext cx="236048" cy="173380"/>
+          </a:xfrm>
+          <a:prstGeom prst="flowChartDecision">
+            <a:avLst/>
+          </a:prstGeom>
+          <a:noFill/>
+          <a:ln w="19050">
+            <a:solidFill>
+              <a:srgbClr val="7030A0"/>
+            </a:solidFill>
+          </a:ln>
+          <a:effectLst/>
+        </p:spPr>
+        <p:style>
+          <a:lnRef idx="1">
+            <a:schemeClr val="accent6"/>
+          </a:lnRef>
+          <a:fillRef idx="2">
+            <a:schemeClr val="accent6"/>
+          </a:fillRef>
+          <a:effectRef idx="1">
+            <a:schemeClr val="accent6"/>
+          </a:effectRef>
+          <a:fontRef idx="minor">
+            <a:schemeClr val="dk1"/>
+          </a:fontRef>
+        </p:style>
+        <p:txBody>
+          <a:bodyPr rtlCol="0" anchor="ctr"/>
+          <a:lstStyle/>
+          <a:p>
+            <a:pPr algn="ctr"/>
+            <a:endParaRPr lang="en-US" sz="1050"/>
+          </a:p>
+        </p:txBody>
+      </p:sp>
+      <p:sp>
+        <p:nvSpPr>
+          <p:cNvPr id="82" name="TextBox 81">
+            <a:extLst>
+              <a:ext uri="{FF2B5EF4-FFF2-40B4-BE49-F238E27FC236}">
+                <a16:creationId xmlns:a16="http://schemas.microsoft.com/office/drawing/2014/main" id="{26A1EAA2-D9E3-46A4-9D49-83447EE0B03E}"/>
+              </a:ext>
+            </a:extLst>
+          </p:cNvPr>
+          <p:cNvSpPr txBox="1"/>
+          <p:nvPr/>
+        </p:nvSpPr>
+        <p:spPr>
+          <a:xfrm>
+            <a:off x="2654064" y="3866369"/>
+            <a:ext cx="189257" cy="178683"/>
+          </a:xfrm>
+          <a:prstGeom prst="rect">
+            <a:avLst/>
+          </a:prstGeom>
+          <a:noFill/>
+        </p:spPr>
+        <p:txBody>
+          <a:bodyPr wrap="square" lIns="0" tIns="0" rIns="0" bIns="0" rtlCol="0">
+            <a:noAutofit/>
+          </a:bodyPr>
+          <a:lstStyle/>
+          <a:p>
+            <a:pPr algn="ctr"/>
+            <a:r>
+              <a:rPr lang="en-US" sz="1100" dirty="0">
+                <a:solidFill>
+                  <a:srgbClr val="7030A0"/>
+                </a:solidFill>
+              </a:rPr>
+              <a:t>*</a:t>
+            </a:r>
+            <a:endParaRPr lang="en-SG" sz="1100" dirty="0">
+              <a:solidFill>
+                <a:srgbClr val="7030A0"/>
+              </a:solidFill>
+            </a:endParaRPr>
+          </a:p>
+        </p:txBody>
+      </p:sp>
+      <p:sp>
+        <p:nvSpPr>
+          <p:cNvPr id="87" name="Rectangle 8">
+            <a:extLst>
+              <a:ext uri="{FF2B5EF4-FFF2-40B4-BE49-F238E27FC236}">
+                <a16:creationId xmlns:a16="http://schemas.microsoft.com/office/drawing/2014/main" id="{4997BA9A-F15D-4E26-BA8B-F5F7703BCBA9}"/>
+              </a:ext>
+            </a:extLst>
+          </p:cNvPr>
+          <p:cNvSpPr/>
+          <p:nvPr/>
+        </p:nvSpPr>
+        <p:spPr>
+          <a:xfrm>
+            <a:off x="2874838" y="3646317"/>
+            <a:ext cx="638411" cy="346760"/>
+          </a:xfrm>
+          <a:prstGeom prst="rect">
+            <a:avLst/>
+          </a:prstGeom>
+          <a:ln w="19050">
+            <a:solidFill>
+              <a:srgbClr val="7030A0"/>
+            </a:solidFill>
+          </a:ln>
+          <a:effectLst/>
+        </p:spPr>
+        <p:style>
+          <a:lnRef idx="1">
+            <a:schemeClr val="accent4"/>
+          </a:lnRef>
+          <a:fillRef idx="2">
+            <a:schemeClr val="accent4"/>
+          </a:fillRef>
+          <a:effectRef idx="1">
+            <a:schemeClr val="accent4"/>
+          </a:effectRef>
+          <a:fontRef idx="minor">
+            <a:schemeClr val="dk1"/>
+          </a:fontRef>
+        </p:style>
+        <p:txBody>
+          <a:bodyPr rtlCol="0" anchor="ctr"/>
+          <a:lstStyle/>
+          <a:p>
+            <a:pPr algn="ctr"/>
+            <a:r>
+              <a:rPr lang="en-US" sz="1050" dirty="0">
+                <a:solidFill>
+                  <a:srgbClr val="7030A0"/>
+                </a:solidFill>
+              </a:rPr>
+              <a:t>Building</a:t>
+            </a:r>
+            <a:endParaRPr lang="en-SG" sz="1050" dirty="0">
+              <a:solidFill>
+                <a:srgbClr val="7030A0"/>
+              </a:solidFill>
+            </a:endParaRPr>
+          </a:p>
+        </p:txBody>
+      </p:sp>
+      <p:sp>
+        <p:nvSpPr>
+          <p:cNvPr id="88" name="Flowchart: Decision 96">
+            <a:extLst>
+              <a:ext uri="{FF2B5EF4-FFF2-40B4-BE49-F238E27FC236}">
+                <a16:creationId xmlns:a16="http://schemas.microsoft.com/office/drawing/2014/main" id="{559F1943-0BB8-4A47-B635-1E4E0AF69CD5}"/>
+              </a:ext>
+            </a:extLst>
+          </p:cNvPr>
+          <p:cNvSpPr/>
+          <p:nvPr/>
+        </p:nvSpPr>
+        <p:spPr>
+          <a:xfrm>
+            <a:off x="4452960" y="3717562"/>
+            <a:ext cx="287026" cy="173380"/>
+          </a:xfrm>
+          <a:prstGeom prst="flowChartDecision">
+            <a:avLst/>
+          </a:prstGeom>
+          <a:solidFill>
+            <a:srgbClr val="7030A0"/>
+          </a:solidFill>
+          <a:ln w="19050">
+            <a:solidFill>
+              <a:srgbClr val="7030A0"/>
+            </a:solidFill>
+          </a:ln>
+          <a:effectLst/>
+        </p:spPr>
+        <p:style>
+          <a:lnRef idx="1">
+            <a:schemeClr val="accent6"/>
+          </a:lnRef>
+          <a:fillRef idx="2">
+            <a:schemeClr val="accent6"/>
+          </a:fillRef>
+          <a:effectRef idx="1">
+            <a:schemeClr val="accent6"/>
+          </a:effectRef>
+          <a:fontRef idx="minor">
+            <a:schemeClr val="dk1"/>
+          </a:fontRef>
+        </p:style>
+        <p:txBody>
+          <a:bodyPr rtlCol="0" anchor="ctr"/>
+          <a:lstStyle/>
+          <a:p>
+            <a:pPr algn="ctr"/>
+            <a:endParaRPr lang="en-US" sz="1050"/>
+          </a:p>
+        </p:txBody>
+      </p:sp>
+      <p:cxnSp>
+        <p:nvCxnSpPr>
+          <p:cNvPr id="90" name="Straight Arrow Connector 89">
+            <a:extLst>
+              <a:ext uri="{FF2B5EF4-FFF2-40B4-BE49-F238E27FC236}">
+                <a16:creationId xmlns:a16="http://schemas.microsoft.com/office/drawing/2014/main" id="{6CC12790-66AC-49A6-9CFB-93A6ACA56C1E}"/>
+              </a:ext>
+            </a:extLst>
+          </p:cNvPr>
+          <p:cNvCxnSpPr>
+            <a:cxnSpLocks/>
+            <a:stCxn id="96" idx="3"/>
+          </p:cNvCxnSpPr>
+          <p:nvPr/>
+        </p:nvCxnSpPr>
+        <p:spPr>
+          <a:xfrm>
+            <a:off x="3747697" y="3816885"/>
+            <a:ext cx="220810" cy="5284"/>
+          </a:xfrm>
+          <a:prstGeom prst="straightConnector1">
+            <a:avLst/>
+          </a:prstGeom>
+          <a:ln w="19050">
+            <a:solidFill>
+              <a:srgbClr val="7030A0"/>
+            </a:solidFill>
+            <a:headEnd type="none" w="med" len="med"/>
+            <a:tailEnd type="arrow" w="med" len="med"/>
+          </a:ln>
+          <a:effectLst/>
+        </p:spPr>
+        <p:style>
+          <a:lnRef idx="1">
+            <a:schemeClr val="accent2"/>
+          </a:lnRef>
+          <a:fillRef idx="2">
+            <a:schemeClr val="accent2"/>
+          </a:fillRef>
+          <a:effectRef idx="1">
+            <a:schemeClr val="accent2"/>
+          </a:effectRef>
+          <a:fontRef idx="minor">
+            <a:schemeClr val="dk1"/>
+          </a:fontRef>
+        </p:style>
+      </p:cxnSp>
+      <p:sp>
+        <p:nvSpPr>
+          <p:cNvPr id="96" name="Flowchart: Decision 96">
+            <a:extLst>
+              <a:ext uri="{FF2B5EF4-FFF2-40B4-BE49-F238E27FC236}">
+                <a16:creationId xmlns:a16="http://schemas.microsoft.com/office/drawing/2014/main" id="{A2D6BECB-24E0-4655-87C5-A4E88C235E94}"/>
+              </a:ext>
+            </a:extLst>
+          </p:cNvPr>
+          <p:cNvSpPr/>
+          <p:nvPr/>
+        </p:nvSpPr>
+        <p:spPr>
+          <a:xfrm>
+            <a:off x="3511649" y="3730195"/>
+            <a:ext cx="236048" cy="173380"/>
+          </a:xfrm>
+          <a:prstGeom prst="flowChartDecision">
+            <a:avLst/>
+          </a:prstGeom>
+          <a:noFill/>
+          <a:ln w="19050">
+            <a:solidFill>
+              <a:srgbClr val="7030A0"/>
+            </a:solidFill>
+          </a:ln>
+          <a:effectLst/>
+        </p:spPr>
+        <p:style>
+          <a:lnRef idx="1">
+            <a:schemeClr val="accent6"/>
+          </a:lnRef>
+          <a:fillRef idx="2">
+            <a:schemeClr val="accent6"/>
+          </a:fillRef>
+          <a:effectRef idx="1">
+            <a:schemeClr val="accent6"/>
+          </a:effectRef>
+          <a:fontRef idx="minor">
+            <a:schemeClr val="dk1"/>
+          </a:fontRef>
+        </p:style>
+        <p:txBody>
+          <a:bodyPr rtlCol="0" anchor="ctr"/>
+          <a:lstStyle/>
+          <a:p>
+            <a:pPr algn="ctr"/>
+            <a:endParaRPr lang="en-US" sz="1050"/>
+          </a:p>
+        </p:txBody>
+      </p:sp>
+      <p:sp>
+        <p:nvSpPr>
+          <p:cNvPr id="98" name="TextBox 97">
+            <a:extLst>
+              <a:ext uri="{FF2B5EF4-FFF2-40B4-BE49-F238E27FC236}">
+                <a16:creationId xmlns:a16="http://schemas.microsoft.com/office/drawing/2014/main" id="{975E5A08-7C85-4DE3-91CC-3F6134DA79CD}"/>
+              </a:ext>
+            </a:extLst>
+          </p:cNvPr>
+          <p:cNvSpPr txBox="1"/>
+          <p:nvPr/>
+        </p:nvSpPr>
+        <p:spPr>
+          <a:xfrm>
+            <a:off x="3731240" y="3855974"/>
+            <a:ext cx="189257" cy="178683"/>
+          </a:xfrm>
+          <a:prstGeom prst="rect">
+            <a:avLst/>
+          </a:prstGeom>
+          <a:noFill/>
+        </p:spPr>
+        <p:txBody>
+          <a:bodyPr wrap="square" lIns="0" tIns="0" rIns="0" bIns="0" rtlCol="0">
+            <a:noAutofit/>
+          </a:bodyPr>
+          <a:lstStyle/>
+          <a:p>
+            <a:pPr algn="ctr"/>
+            <a:r>
+              <a:rPr lang="en-US" sz="1100" dirty="0">
+                <a:solidFill>
+                  <a:srgbClr val="7030A0"/>
+                </a:solidFill>
+              </a:rPr>
+              <a:t>*</a:t>
+            </a:r>
+            <a:endParaRPr lang="en-SG" sz="1100" dirty="0">
+              <a:solidFill>
+                <a:srgbClr val="7030A0"/>
+              </a:solidFill>
+            </a:endParaRPr>
+          </a:p>
+        </p:txBody>
+      </p:sp>
+      <p:sp>
+        <p:nvSpPr>
+          <p:cNvPr id="101" name="Rectangle 8">
+            <a:extLst>
+              <a:ext uri="{FF2B5EF4-FFF2-40B4-BE49-F238E27FC236}">
+                <a16:creationId xmlns:a16="http://schemas.microsoft.com/office/drawing/2014/main" id="{E5E88ABF-651A-4B65-8F78-59948AA8CBB6}"/>
+              </a:ext>
+            </a:extLst>
+          </p:cNvPr>
+          <p:cNvSpPr/>
+          <p:nvPr/>
+        </p:nvSpPr>
+        <p:spPr>
+          <a:xfrm>
+            <a:off x="3952014" y="3635922"/>
+            <a:ext cx="513484" cy="346760"/>
+          </a:xfrm>
+          <a:prstGeom prst="rect">
+            <a:avLst/>
+          </a:prstGeom>
+          <a:ln w="19050">
+            <a:solidFill>
+              <a:srgbClr val="7030A0"/>
+            </a:solidFill>
+          </a:ln>
+          <a:effectLst/>
+        </p:spPr>
+        <p:style>
+          <a:lnRef idx="1">
+            <a:schemeClr val="accent4"/>
+          </a:lnRef>
+          <a:fillRef idx="2">
+            <a:schemeClr val="accent4"/>
+          </a:fillRef>
+          <a:effectRef idx="1">
+            <a:schemeClr val="accent4"/>
+          </a:effectRef>
+          <a:fontRef idx="minor">
+            <a:schemeClr val="dk1"/>
+          </a:fontRef>
+        </p:style>
+        <p:txBody>
+          <a:bodyPr rtlCol="0" anchor="ctr"/>
+          <a:lstStyle/>
+          <a:p>
+            <a:pPr algn="ctr"/>
+            <a:r>
+              <a:rPr lang="en-US" sz="1050" dirty="0">
+                <a:solidFill>
+                  <a:srgbClr val="7030A0"/>
+                </a:solidFill>
+              </a:rPr>
+              <a:t>Room</a:t>
+            </a:r>
+            <a:endParaRPr lang="en-SG" sz="1050" dirty="0">
+              <a:solidFill>
+                <a:srgbClr val="7030A0"/>
+              </a:solidFill>
+            </a:endParaRPr>
+          </a:p>
+        </p:txBody>
+      </p:sp>
+      <p:sp>
+        <p:nvSpPr>
+          <p:cNvPr id="106" name="Flowchart: Decision 96">
+            <a:extLst>
+              <a:ext uri="{FF2B5EF4-FFF2-40B4-BE49-F238E27FC236}">
+                <a16:creationId xmlns:a16="http://schemas.microsoft.com/office/drawing/2014/main" id="{6415BBA5-22EB-456E-AF68-3DC3C1217768}"/>
+              </a:ext>
+            </a:extLst>
+          </p:cNvPr>
+          <p:cNvSpPr/>
+          <p:nvPr/>
+        </p:nvSpPr>
+        <p:spPr>
+          <a:xfrm>
+            <a:off x="5431316" y="3714471"/>
+            <a:ext cx="287026" cy="173380"/>
+          </a:xfrm>
+          <a:prstGeom prst="flowChartDecision">
+            <a:avLst/>
+          </a:prstGeom>
+          <a:solidFill>
+            <a:srgbClr val="7030A0"/>
+          </a:solidFill>
+          <a:ln w="19050">
+            <a:solidFill>
+              <a:srgbClr val="7030A0"/>
+            </a:solidFill>
+          </a:ln>
+          <a:effectLst/>
+        </p:spPr>
+        <p:style>
+          <a:lnRef idx="1">
+            <a:schemeClr val="accent6"/>
+          </a:lnRef>
+          <a:fillRef idx="2">
+            <a:schemeClr val="accent6"/>
+          </a:fillRef>
+          <a:effectRef idx="1">
+            <a:schemeClr val="accent6"/>
+          </a:effectRef>
+          <a:fontRef idx="minor">
+            <a:schemeClr val="dk1"/>
+          </a:fontRef>
+        </p:style>
+        <p:txBody>
+          <a:bodyPr rtlCol="0" anchor="ctr"/>
+          <a:lstStyle/>
+          <a:p>
+            <a:pPr algn="ctr"/>
+            <a:endParaRPr lang="en-US" sz="1050"/>
+          </a:p>
+        </p:txBody>
+      </p:sp>
+      <p:cxnSp>
+        <p:nvCxnSpPr>
+          <p:cNvPr id="108" name="Straight Arrow Connector 107">
+            <a:extLst>
+              <a:ext uri="{FF2B5EF4-FFF2-40B4-BE49-F238E27FC236}">
+                <a16:creationId xmlns:a16="http://schemas.microsoft.com/office/drawing/2014/main" id="{D888B210-7615-4034-8D7E-0BDE2AD6085B}"/>
+              </a:ext>
+            </a:extLst>
+          </p:cNvPr>
+          <p:cNvCxnSpPr>
+            <a:cxnSpLocks/>
+            <a:stCxn id="88" idx="3"/>
+            <a:endCxn id="110" idx="1"/>
+          </p:cNvCxnSpPr>
+          <p:nvPr/>
+        </p:nvCxnSpPr>
+        <p:spPr>
+          <a:xfrm>
+            <a:off x="4739986" y="3804252"/>
+            <a:ext cx="179169" cy="286"/>
+          </a:xfrm>
+          <a:prstGeom prst="straightConnector1">
+            <a:avLst/>
+          </a:prstGeom>
+          <a:ln w="19050">
+            <a:solidFill>
+              <a:srgbClr val="7030A0"/>
+            </a:solidFill>
+            <a:headEnd type="none" w="med" len="med"/>
+            <a:tailEnd type="arrow" w="med" len="med"/>
+          </a:ln>
+          <a:effectLst/>
+        </p:spPr>
+        <p:style>
+          <a:lnRef idx="1">
+            <a:schemeClr val="accent2"/>
+          </a:lnRef>
+          <a:fillRef idx="2">
+            <a:schemeClr val="accent2"/>
+          </a:fillRef>
+          <a:effectRef idx="1">
+            <a:schemeClr val="accent2"/>
+          </a:effectRef>
+          <a:fontRef idx="minor">
+            <a:schemeClr val="dk1"/>
+          </a:fontRef>
+        </p:style>
+      </p:cxnSp>
+      <p:sp>
+        <p:nvSpPr>
+          <p:cNvPr id="109" name="TextBox 108">
+            <a:extLst>
+              <a:ext uri="{FF2B5EF4-FFF2-40B4-BE49-F238E27FC236}">
+                <a16:creationId xmlns:a16="http://schemas.microsoft.com/office/drawing/2014/main" id="{89F7D40F-DF6D-4939-AA3B-67A5A6DE4553}"/>
+              </a:ext>
+            </a:extLst>
+          </p:cNvPr>
+          <p:cNvSpPr txBox="1"/>
+          <p:nvPr/>
+        </p:nvSpPr>
+        <p:spPr>
+          <a:xfrm>
+            <a:off x="4698381" y="3851210"/>
+            <a:ext cx="230130" cy="178683"/>
+          </a:xfrm>
+          <a:prstGeom prst="rect">
+            <a:avLst/>
+          </a:prstGeom>
+          <a:noFill/>
+        </p:spPr>
+        <p:txBody>
+          <a:bodyPr wrap="square" lIns="0" tIns="0" rIns="0" bIns="0" rtlCol="0">
+            <a:noAutofit/>
+          </a:bodyPr>
+          <a:lstStyle/>
+          <a:p>
+            <a:pPr algn="ctr"/>
+            <a:r>
+              <a:rPr lang="en-US" sz="1100" dirty="0">
+                <a:solidFill>
+                  <a:srgbClr val="7030A0"/>
+                </a:solidFill>
+              </a:rPr>
+              <a:t>1</a:t>
+            </a:r>
+            <a:endParaRPr lang="en-SG" sz="1100" dirty="0">
+              <a:solidFill>
+                <a:srgbClr val="7030A0"/>
+              </a:solidFill>
+            </a:endParaRPr>
+          </a:p>
+        </p:txBody>
+      </p:sp>
+      <p:sp>
+        <p:nvSpPr>
+          <p:cNvPr id="110" name="Rectangle 8">
+            <a:extLst>
+              <a:ext uri="{FF2B5EF4-FFF2-40B4-BE49-F238E27FC236}">
+                <a16:creationId xmlns:a16="http://schemas.microsoft.com/office/drawing/2014/main" id="{4C7FEF61-BD42-4181-9694-3375E6895E8E}"/>
+              </a:ext>
+            </a:extLst>
+          </p:cNvPr>
+          <p:cNvSpPr/>
+          <p:nvPr/>
+        </p:nvSpPr>
+        <p:spPr>
+          <a:xfrm>
+            <a:off x="4919155" y="3631158"/>
+            <a:ext cx="513484" cy="346760"/>
+          </a:xfrm>
+          <a:prstGeom prst="rect">
+            <a:avLst/>
+          </a:prstGeom>
+          <a:ln w="19050">
+            <a:solidFill>
+              <a:srgbClr val="7030A0"/>
+            </a:solidFill>
+          </a:ln>
+          <a:effectLst/>
+        </p:spPr>
+        <p:style>
+          <a:lnRef idx="1">
+            <a:schemeClr val="accent4"/>
+          </a:lnRef>
+          <a:fillRef idx="2">
+            <a:schemeClr val="accent4"/>
+          </a:fillRef>
+          <a:effectRef idx="1">
+            <a:schemeClr val="accent4"/>
+          </a:effectRef>
+          <a:fontRef idx="minor">
+            <a:schemeClr val="dk1"/>
+          </a:fontRef>
+        </p:style>
+        <p:txBody>
+          <a:bodyPr rtlCol="0" anchor="ctr"/>
+          <a:lstStyle/>
+          <a:p>
+            <a:pPr algn="ctr"/>
+            <a:r>
+              <a:rPr lang="en-US" sz="1050" dirty="0">
+                <a:solidFill>
+                  <a:srgbClr val="7030A0"/>
+                </a:solidFill>
+              </a:rPr>
+              <a:t>Week</a:t>
+            </a:r>
+            <a:endParaRPr lang="en-SG" sz="1050" dirty="0">
+              <a:solidFill>
+                <a:srgbClr val="7030A0"/>
+              </a:solidFill>
+            </a:endParaRPr>
+          </a:p>
+        </p:txBody>
+      </p:sp>
+      <p:cxnSp>
+        <p:nvCxnSpPr>
+          <p:cNvPr id="112" name="Straight Arrow Connector 111">
+            <a:extLst>
+              <a:ext uri="{FF2B5EF4-FFF2-40B4-BE49-F238E27FC236}">
+                <a16:creationId xmlns:a16="http://schemas.microsoft.com/office/drawing/2014/main" id="{077C77EA-B5A8-4A01-9628-312422DAF982}"/>
+              </a:ext>
+            </a:extLst>
+          </p:cNvPr>
+          <p:cNvCxnSpPr>
+            <a:cxnSpLocks/>
+            <a:stCxn id="106" idx="3"/>
+            <a:endCxn id="115" idx="1"/>
+          </p:cNvCxnSpPr>
+          <p:nvPr/>
+        </p:nvCxnSpPr>
+        <p:spPr>
+          <a:xfrm>
+            <a:off x="5718342" y="3801161"/>
+            <a:ext cx="189257" cy="3377"/>
+          </a:xfrm>
+          <a:prstGeom prst="straightConnector1">
+            <a:avLst/>
+          </a:prstGeom>
+          <a:ln w="19050">
+            <a:solidFill>
+              <a:srgbClr val="7030A0"/>
+            </a:solidFill>
+            <a:headEnd type="none" w="med" len="med"/>
+            <a:tailEnd type="arrow" w="med" len="med"/>
+          </a:ln>
+          <a:effectLst/>
+        </p:spPr>
+        <p:style>
+          <a:lnRef idx="1">
+            <a:schemeClr val="accent2"/>
+          </a:lnRef>
+          <a:fillRef idx="2">
+            <a:schemeClr val="accent2"/>
+          </a:fillRef>
+          <a:effectRef idx="1">
+            <a:schemeClr val="accent2"/>
+          </a:effectRef>
+          <a:fontRef idx="minor">
+            <a:schemeClr val="dk1"/>
+          </a:fontRef>
+        </p:style>
+      </p:cxnSp>
+      <p:sp>
+        <p:nvSpPr>
+          <p:cNvPr id="113" name="TextBox 112">
+            <a:extLst>
+              <a:ext uri="{FF2B5EF4-FFF2-40B4-BE49-F238E27FC236}">
+                <a16:creationId xmlns:a16="http://schemas.microsoft.com/office/drawing/2014/main" id="{9F034F12-BE68-4101-999D-4785EBEA8FB1}"/>
+              </a:ext>
+            </a:extLst>
+          </p:cNvPr>
+          <p:cNvSpPr txBox="1"/>
+          <p:nvPr/>
+        </p:nvSpPr>
+        <p:spPr>
+          <a:xfrm>
+            <a:off x="5733585" y="3851210"/>
+            <a:ext cx="230130" cy="178683"/>
+          </a:xfrm>
+          <a:prstGeom prst="rect">
+            <a:avLst/>
+          </a:prstGeom>
+          <a:noFill/>
+        </p:spPr>
+        <p:txBody>
+          <a:bodyPr wrap="square" lIns="0" tIns="0" rIns="0" bIns="0" rtlCol="0">
+            <a:noAutofit/>
+          </a:bodyPr>
+          <a:lstStyle/>
+          <a:p>
+            <a:pPr algn="ctr"/>
+            <a:r>
+              <a:rPr lang="en-US" sz="1100" dirty="0">
+                <a:solidFill>
+                  <a:srgbClr val="7030A0"/>
+                </a:solidFill>
+              </a:rPr>
+              <a:t>*</a:t>
+            </a:r>
+            <a:endParaRPr lang="en-SG" sz="1100" dirty="0">
+              <a:solidFill>
+                <a:srgbClr val="7030A0"/>
+              </a:solidFill>
+            </a:endParaRPr>
+          </a:p>
+        </p:txBody>
+      </p:sp>
+      <p:sp>
+        <p:nvSpPr>
+          <p:cNvPr id="115" name="Rectangle 8">
+            <a:extLst>
+              <a:ext uri="{FF2B5EF4-FFF2-40B4-BE49-F238E27FC236}">
+                <a16:creationId xmlns:a16="http://schemas.microsoft.com/office/drawing/2014/main" id="{F40D7CBB-D74B-4EB8-B2AB-E31CA7EBF93A}"/>
+              </a:ext>
+            </a:extLst>
+          </p:cNvPr>
+          <p:cNvSpPr/>
+          <p:nvPr/>
+        </p:nvSpPr>
+        <p:spPr>
+          <a:xfrm>
+            <a:off x="5907599" y="3631158"/>
+            <a:ext cx="703689" cy="346760"/>
+          </a:xfrm>
+          <a:prstGeom prst="rect">
+            <a:avLst/>
+          </a:prstGeom>
+          <a:ln w="19050">
+            <a:solidFill>
+              <a:srgbClr val="7030A0"/>
+            </a:solidFill>
+          </a:ln>
+          <a:effectLst/>
+        </p:spPr>
+        <p:style>
+          <a:lnRef idx="1">
+            <a:schemeClr val="accent4"/>
+          </a:lnRef>
+          <a:fillRef idx="2">
+            <a:schemeClr val="accent4"/>
+          </a:fillRef>
+          <a:effectRef idx="1">
+            <a:schemeClr val="accent4"/>
+          </a:effectRef>
+          <a:fontRef idx="minor">
+            <a:schemeClr val="dk1"/>
+          </a:fontRef>
+        </p:style>
+        <p:txBody>
+          <a:bodyPr rtlCol="0" anchor="ctr"/>
+          <a:lstStyle/>
+          <a:p>
+            <a:pPr algn="ctr"/>
+            <a:r>
+              <a:rPr lang="en-US" sz="1050" dirty="0" err="1">
+                <a:solidFill>
+                  <a:srgbClr val="7030A0"/>
+                </a:solidFill>
+              </a:rPr>
+              <a:t>WeekDay</a:t>
+            </a:r>
+            <a:endParaRPr lang="en-SG" sz="1050" dirty="0">
               <a:solidFill>
                 <a:srgbClr val="7030A0"/>
               </a:solidFill>

</xml_diff>

<commit_message>
[#189][#194][#151][#128] Add tests and update UML diagram (#197)
* Add major/minor feature documentation for everyone

* Userguide typo fixes

* Merge branch 'LoginTestDevelopment' of https://github.com/dominickenn/main

# Conflicts:
#	src/main/java/seedu/organizer/logic/parser/OrganizerParser.java
#	src/test/java/systemtests/AddCommandSystemTest.java
#	src/test/java/systemtests/EditCommandSystemTest.java
#	src/test/java/systemtests/FindNameCommandSystemTest.java

* Revert "Merge branch 'LoginTestDevelopment' of https://github.com/dominickenn/main"

This reverts commit a55ef3e16d15e877b55d8374e5d951c4dff07c01.

* Fix merge conflict

* Edit message

* Add tests

* Update UML diagram

* Fix checkstyle
</commit_message>
<xml_diff>
--- a/docs/diagrams/ModelComponentClassDiagram.pptx
+++ b/docs/diagrams/ModelComponentClassDiagram.pptx
@@ -109,7 +109,7 @@
   </p:defaultTextStyle>
   <p:extLst>
     <p:ext uri="{EFAFB233-063F-42B5-8137-9DF3F51BA10A}">
-      <p15:sldGuideLst xmlns:p15="http://schemas.microsoft.com/office/powerpoint/2012/main" xmlns="">
+      <p15:sldGuideLst xmlns="" xmlns:p15="http://schemas.microsoft.com/office/powerpoint/2012/main">
         <p15:guide id="1" orient="horz" pos="1488">
           <p15:clr>
             <a:srgbClr val="A4A3A4"/>
@@ -208,7 +208,7 @@
           <a:p>
             <a:fld id="{F5CC4B3F-88C1-4FFA-B1B6-F41C21DC6924}" type="datetimeFigureOut">
               <a:rPr lang="en-US" smtClean="0"/>
-              <a:t>4/2/2018</a:t>
+              <a:t>4/4/2018</a:t>
             </a:fld>
             <a:endParaRPr lang="en-US"/>
           </a:p>
@@ -654,7 +654,7 @@
           <a:p>
             <a:fld id="{78C97017-6FC3-485B-9764-EAC9E56C1D49}" type="datetimeFigureOut">
               <a:rPr lang="en-US" smtClean="0"/>
-              <a:t>4/2/2018</a:t>
+              <a:t>4/4/2018</a:t>
             </a:fld>
             <a:endParaRPr lang="en-US"/>
           </a:p>
@@ -822,7 +822,7 @@
           <a:p>
             <a:fld id="{78C97017-6FC3-485B-9764-EAC9E56C1D49}" type="datetimeFigureOut">
               <a:rPr lang="en-US" smtClean="0"/>
-              <a:t>4/2/2018</a:t>
+              <a:t>4/4/2018</a:t>
             </a:fld>
             <a:endParaRPr lang="en-US"/>
           </a:p>
@@ -1000,7 +1000,7 @@
           <a:p>
             <a:fld id="{78C97017-6FC3-485B-9764-EAC9E56C1D49}" type="datetimeFigureOut">
               <a:rPr lang="en-US" smtClean="0"/>
-              <a:t>4/2/2018</a:t>
+              <a:t>4/4/2018</a:t>
             </a:fld>
             <a:endParaRPr lang="en-US"/>
           </a:p>
@@ -1168,7 +1168,7 @@
           <a:p>
             <a:fld id="{78C97017-6FC3-485B-9764-EAC9E56C1D49}" type="datetimeFigureOut">
               <a:rPr lang="en-US" smtClean="0"/>
-              <a:t>4/2/2018</a:t>
+              <a:t>4/4/2018</a:t>
             </a:fld>
             <a:endParaRPr lang="en-US"/>
           </a:p>
@@ -1413,7 +1413,7 @@
           <a:p>
             <a:fld id="{78C97017-6FC3-485B-9764-EAC9E56C1D49}" type="datetimeFigureOut">
               <a:rPr lang="en-US" smtClean="0"/>
-              <a:t>4/2/2018</a:t>
+              <a:t>4/4/2018</a:t>
             </a:fld>
             <a:endParaRPr lang="en-US"/>
           </a:p>
@@ -1698,7 +1698,7 @@
           <a:p>
             <a:fld id="{78C97017-6FC3-485B-9764-EAC9E56C1D49}" type="datetimeFigureOut">
               <a:rPr lang="en-US" smtClean="0"/>
-              <a:t>4/2/2018</a:t>
+              <a:t>4/4/2018</a:t>
             </a:fld>
             <a:endParaRPr lang="en-US"/>
           </a:p>
@@ -2117,7 +2117,7 @@
           <a:p>
             <a:fld id="{78C97017-6FC3-485B-9764-EAC9E56C1D49}" type="datetimeFigureOut">
               <a:rPr lang="en-US" smtClean="0"/>
-              <a:t>4/2/2018</a:t>
+              <a:t>4/4/2018</a:t>
             </a:fld>
             <a:endParaRPr lang="en-US"/>
           </a:p>
@@ -2234,7 +2234,7 @@
           <a:p>
             <a:fld id="{78C97017-6FC3-485B-9764-EAC9E56C1D49}" type="datetimeFigureOut">
               <a:rPr lang="en-US" smtClean="0"/>
-              <a:t>4/2/2018</a:t>
+              <a:t>4/4/2018</a:t>
             </a:fld>
             <a:endParaRPr lang="en-US"/>
           </a:p>
@@ -2329,7 +2329,7 @@
           <a:p>
             <a:fld id="{78C97017-6FC3-485B-9764-EAC9E56C1D49}" type="datetimeFigureOut">
               <a:rPr lang="en-US" smtClean="0"/>
-              <a:t>4/2/2018</a:t>
+              <a:t>4/4/2018</a:t>
             </a:fld>
             <a:endParaRPr lang="en-US"/>
           </a:p>
@@ -2604,7 +2604,7 @@
           <a:p>
             <a:fld id="{78C97017-6FC3-485B-9764-EAC9E56C1D49}" type="datetimeFigureOut">
               <a:rPr lang="en-US" smtClean="0"/>
-              <a:t>4/2/2018</a:t>
+              <a:t>4/4/2018</a:t>
             </a:fld>
             <a:endParaRPr lang="en-US"/>
           </a:p>
@@ -2856,7 +2856,7 @@
           <a:p>
             <a:fld id="{78C97017-6FC3-485B-9764-EAC9E56C1D49}" type="datetimeFigureOut">
               <a:rPr lang="en-US" smtClean="0"/>
-              <a:t>4/2/2018</a:t>
+              <a:t>4/4/2018</a:t>
             </a:fld>
             <a:endParaRPr lang="en-US"/>
           </a:p>
@@ -3067,7 +3067,7 @@
           <a:p>
             <a:fld id="{78C97017-6FC3-485B-9764-EAC9E56C1D49}" type="datetimeFigureOut">
               <a:rPr lang="en-US" smtClean="0"/>
-              <a:t>4/2/2018</a:t>
+              <a:t>4/4/2018</a:t>
             </a:fld>
             <a:endParaRPr lang="en-US"/>
           </a:p>
@@ -3451,7 +3451,7 @@
         <p:spPr>
           <a:xfrm>
             <a:off x="1119865" y="1727200"/>
-            <a:ext cx="7490735" cy="2997200"/>
+            <a:ext cx="7490735" cy="3225800"/>
           </a:xfrm>
           <a:prstGeom prst="roundRect">
             <a:avLst>
@@ -6024,7 +6024,7 @@
           <p:cNvPr id="74" name="Rectangle 8">
             <a:extLst>
               <a:ext uri="{FF2B5EF4-FFF2-40B4-BE49-F238E27FC236}">
-                <a16:creationId xmlns:a16="http://schemas.microsoft.com/office/drawing/2014/main" xmlns="" id="{D1EA267A-1EFE-4F58-9EFF-6A0405CC6ADE}"/>
+                <a16:creationId xmlns="" xmlns:a16="http://schemas.microsoft.com/office/drawing/2014/main" id="{D1EA267A-1EFE-4F58-9EFF-6A0405CC6ADE}"/>
               </a:ext>
             </a:extLst>
           </p:cNvPr>
@@ -6086,7 +6086,7 @@
           <p:cNvPr id="77" name="Elbow Connector 72">
             <a:extLst>
               <a:ext uri="{FF2B5EF4-FFF2-40B4-BE49-F238E27FC236}">
-                <a16:creationId xmlns:a16="http://schemas.microsoft.com/office/drawing/2014/main" xmlns="" id="{8AE386F3-2DFC-4117-9793-35573E1679BB}"/>
+                <a16:creationId xmlns="" xmlns:a16="http://schemas.microsoft.com/office/drawing/2014/main" id="{8AE386F3-2DFC-4117-9793-35573E1679BB}"/>
               </a:ext>
             </a:extLst>
           </p:cNvPr>
@@ -6189,7 +6189,7 @@
           <p:cNvPr id="87" name="Elbow Connector 72">
             <a:extLst>
               <a:ext uri="{FF2B5EF4-FFF2-40B4-BE49-F238E27FC236}">
-                <a16:creationId xmlns:a16="http://schemas.microsoft.com/office/drawing/2014/main" xmlns="" id="{8AE386F3-2DFC-4117-9793-35573E1679BB}"/>
+                <a16:creationId xmlns="" xmlns:a16="http://schemas.microsoft.com/office/drawing/2014/main" id="{8AE386F3-2DFC-4117-9793-35573E1679BB}"/>
               </a:ext>
             </a:extLst>
           </p:cNvPr>
@@ -6488,6 +6488,198 @@
             <a:endParaRPr lang="en-SG" sz="1100" dirty="0">
               <a:solidFill>
                 <a:srgbClr val="7030A0"/>
+              </a:solidFill>
+            </a:endParaRPr>
+          </a:p>
+        </p:txBody>
+      </p:sp>
+      <p:sp>
+        <p:nvSpPr>
+          <p:cNvPr id="94" name="Rectangle 8"/>
+          <p:cNvSpPr/>
+          <p:nvPr/>
+        </p:nvSpPr>
+        <p:spPr>
+          <a:xfrm>
+            <a:off x="4238554" y="4514817"/>
+            <a:ext cx="1602270" cy="285783"/>
+          </a:xfrm>
+          <a:prstGeom prst="rect">
+            <a:avLst/>
+          </a:prstGeom>
+          <a:ln w="19050">
+            <a:solidFill>
+              <a:srgbClr val="7030A0"/>
+            </a:solidFill>
+          </a:ln>
+          <a:effectLst/>
+        </p:spPr>
+        <p:style>
+          <a:lnRef idx="1">
+            <a:schemeClr val="accent4"/>
+          </a:lnRef>
+          <a:fillRef idx="2">
+            <a:schemeClr val="accent4"/>
+          </a:fillRef>
+          <a:effectRef idx="1">
+            <a:schemeClr val="accent4"/>
+          </a:effectRef>
+          <a:fontRef idx="minor">
+            <a:schemeClr val="dk1"/>
+          </a:fontRef>
+        </p:style>
+        <p:txBody>
+          <a:bodyPr rtlCol="0" anchor="ctr"/>
+          <a:lstStyle/>
+          <a:p>
+            <a:pPr algn="ctr"/>
+            <a:r>
+              <a:rPr lang="en-US" sz="1050" dirty="0" err="1" smtClean="0">
+                <a:solidFill>
+                  <a:srgbClr val="7030A0"/>
+                </a:solidFill>
+              </a:rPr>
+              <a:t>UserWithQuestionAnswer</a:t>
+            </a:r>
+            <a:endParaRPr lang="en-SG" sz="1050" dirty="0">
+              <a:solidFill>
+                <a:srgbClr val="7030A0"/>
+              </a:solidFill>
+            </a:endParaRPr>
+          </a:p>
+        </p:txBody>
+      </p:sp>
+      <p:cxnSp>
+        <p:nvCxnSpPr>
+          <p:cNvPr id="95" name="Elbow Connector 94"/>
+          <p:cNvCxnSpPr>
+            <a:stCxn id="91" idx="1"/>
+            <a:endCxn id="94" idx="0"/>
+          </p:cNvCxnSpPr>
+          <p:nvPr/>
+        </p:nvCxnSpPr>
+        <p:spPr>
+          <a:xfrm rot="5400000">
+            <a:off x="4762418" y="4237544"/>
+            <a:ext cx="554545" cy="1"/>
+          </a:xfrm>
+          <a:prstGeom prst="bentConnector3">
+            <a:avLst>
+              <a:gd name="adj1" fmla="val 50000"/>
+            </a:avLst>
+          </a:prstGeom>
+          <a:ln w="19050">
+            <a:solidFill>
+              <a:srgbClr val="7030A0"/>
+            </a:solidFill>
+            <a:headEnd type="none" w="med" len="med"/>
+            <a:tailEnd type="arrow" w="med" len="med"/>
+          </a:ln>
+          <a:effectLst/>
+        </p:spPr>
+        <p:style>
+          <a:lnRef idx="1">
+            <a:schemeClr val="accent2"/>
+          </a:lnRef>
+          <a:fillRef idx="2">
+            <a:schemeClr val="accent2"/>
+          </a:fillRef>
+          <a:effectRef idx="1">
+            <a:schemeClr val="accent2"/>
+          </a:effectRef>
+          <a:fontRef idx="minor">
+            <a:schemeClr val="dk1"/>
+          </a:fontRef>
+        </p:style>
+      </p:cxnSp>
+      <p:cxnSp>
+        <p:nvCxnSpPr>
+          <p:cNvPr id="96" name="Elbow Connector 63"/>
+          <p:cNvCxnSpPr>
+            <a:stCxn id="98" idx="3"/>
+            <a:endCxn id="94" idx="3"/>
+          </p:cNvCxnSpPr>
+          <p:nvPr/>
+        </p:nvCxnSpPr>
+        <p:spPr>
+          <a:xfrm rot="5400000" flipH="1">
+            <a:off x="6233069" y="4265464"/>
+            <a:ext cx="1831" cy="786322"/>
+          </a:xfrm>
+          <a:prstGeom prst="bentConnector4">
+            <a:avLst>
+              <a:gd name="adj1" fmla="val -3828727"/>
+              <a:gd name="adj2" fmla="val 58600"/>
+            </a:avLst>
+          </a:prstGeom>
+          <a:ln w="19050">
+            <a:solidFill>
+              <a:srgbClr val="7030A0"/>
+            </a:solidFill>
+            <a:prstDash val="sysDot"/>
+            <a:headEnd type="none" w="med" len="med"/>
+            <a:tailEnd type="none" w="med" len="med"/>
+          </a:ln>
+          <a:effectLst/>
+        </p:spPr>
+        <p:style>
+          <a:lnRef idx="1">
+            <a:schemeClr val="accent2"/>
+          </a:lnRef>
+          <a:fillRef idx="2">
+            <a:schemeClr val="accent2"/>
+          </a:fillRef>
+          <a:effectRef idx="1">
+            <a:schemeClr val="accent2"/>
+          </a:effectRef>
+          <a:fontRef idx="minor">
+            <a:schemeClr val="dk1"/>
+          </a:fontRef>
+        </p:style>
+      </p:cxnSp>
+      <p:sp>
+        <p:nvSpPr>
+          <p:cNvPr id="98" name="Isosceles Triangle 102"/>
+          <p:cNvSpPr/>
+          <p:nvPr/>
+        </p:nvSpPr>
+        <p:spPr>
+          <a:xfrm rot="10800000" flipV="1">
+            <a:off x="6491894" y="4484017"/>
+            <a:ext cx="270504" cy="175523"/>
+          </a:xfrm>
+          <a:prstGeom prst="triangle">
+            <a:avLst/>
+          </a:prstGeom>
+          <a:ln w="19050">
+            <a:solidFill>
+              <a:srgbClr val="7030A0"/>
+            </a:solidFill>
+          </a:ln>
+          <a:effectLst/>
+        </p:spPr>
+        <p:style>
+          <a:lnRef idx="1">
+            <a:schemeClr val="accent4"/>
+          </a:lnRef>
+          <a:fillRef idx="2">
+            <a:schemeClr val="accent4"/>
+          </a:fillRef>
+          <a:effectRef idx="1">
+            <a:schemeClr val="accent4"/>
+          </a:effectRef>
+          <a:fontRef idx="minor">
+            <a:schemeClr val="dk1"/>
+          </a:fontRef>
+        </p:style>
+        <p:txBody>
+          <a:bodyPr rtlCol="0" anchor="ctr"/>
+          <a:lstStyle/>
+          <a:p>
+            <a:pPr algn="ctr"/>
+            <a:endParaRPr lang="en-SG" sz="1050" b="1">
+              <a:solidFill>
+                <a:srgbClr val="92D050"/>
               </a:solidFill>
             </a:endParaRPr>
           </a:p>

</xml_diff>

<commit_message>
Added Subject Support for HTML
</commit_message>
<xml_diff>
--- a/docs/diagrams/ModelComponentClassDiagram.pptx
+++ b/docs/diagrams/ModelComponentClassDiagram.pptx
@@ -208,7 +208,7 @@
           <a:p>
             <a:fld id="{F5CC4B3F-88C1-4FFA-B1B6-F41C21DC6924}" type="datetimeFigureOut">
               <a:rPr lang="en-US" smtClean="0"/>
-              <a:t>1/1/18</a:t>
+              <a:t>4/3/2018</a:t>
             </a:fld>
             <a:endParaRPr lang="en-US"/>
           </a:p>
@@ -272,38 +272,37 @@
           <a:p>
             <a:pPr lvl="0"/>
             <a:r>
-              <a:rPr lang="en-US" smtClean="0"/>
+              <a:rPr lang="en-US"/>
               <a:t>Click to edit Master text styles</a:t>
             </a:r>
           </a:p>
           <a:p>
             <a:pPr lvl="1"/>
             <a:r>
-              <a:rPr lang="en-US" smtClean="0"/>
+              <a:rPr lang="en-US"/>
               <a:t>Second level</a:t>
             </a:r>
           </a:p>
           <a:p>
             <a:pPr lvl="2"/>
             <a:r>
-              <a:rPr lang="en-US" smtClean="0"/>
+              <a:rPr lang="en-US"/>
               <a:t>Third level</a:t>
             </a:r>
           </a:p>
           <a:p>
             <a:pPr lvl="3"/>
             <a:r>
-              <a:rPr lang="en-US" smtClean="0"/>
+              <a:rPr lang="en-US"/>
               <a:t>Fourth level</a:t>
             </a:r>
           </a:p>
           <a:p>
             <a:pPr lvl="4"/>
             <a:r>
-              <a:rPr lang="en-US" smtClean="0"/>
+              <a:rPr lang="en-US"/>
               <a:t>Fifth level</a:t>
             </a:r>
-            <a:endParaRPr lang="en-US"/>
           </a:p>
         </p:txBody>
       </p:sp>
@@ -514,10 +513,9 @@
           <a:lstStyle/>
           <a:p>
             <a:r>
-              <a:rPr lang="en-US" smtClean="0"/>
+              <a:rPr lang="en-US"/>
               <a:t>Click to edit Master title style</a:t>
             </a:r>
-            <a:endParaRPr lang="en-US"/>
           </a:p>
         </p:txBody>
       </p:sp>
@@ -633,10 +631,9 @@
           </a:lstStyle>
           <a:p>
             <a:r>
-              <a:rPr lang="en-US" smtClean="0"/>
+              <a:rPr lang="en-US"/>
               <a:t>Click to edit Master subtitle style</a:t>
             </a:r>
-            <a:endParaRPr lang="en-US"/>
           </a:p>
         </p:txBody>
       </p:sp>
@@ -657,7 +654,7 @@
           <a:p>
             <a:fld id="{78C97017-6FC3-485B-9764-EAC9E56C1D49}" type="datetimeFigureOut">
               <a:rPr lang="en-US" smtClean="0"/>
-              <a:t>1/1/18</a:t>
+              <a:t>4/3/2018</a:t>
             </a:fld>
             <a:endParaRPr lang="en-US"/>
           </a:p>
@@ -751,10 +748,9 @@
           <a:lstStyle/>
           <a:p>
             <a:r>
-              <a:rPr lang="en-US" smtClean="0"/>
+              <a:rPr lang="en-US"/>
               <a:t>Click to edit Master title style</a:t>
             </a:r>
-            <a:endParaRPr lang="en-US"/>
           </a:p>
         </p:txBody>
       </p:sp>
@@ -775,38 +771,37 @@
           <a:p>
             <a:pPr lvl="0"/>
             <a:r>
-              <a:rPr lang="en-US" smtClean="0"/>
+              <a:rPr lang="en-US"/>
               <a:t>Click to edit Master text styles</a:t>
             </a:r>
           </a:p>
           <a:p>
             <a:pPr lvl="1"/>
             <a:r>
-              <a:rPr lang="en-US" smtClean="0"/>
+              <a:rPr lang="en-US"/>
               <a:t>Second level</a:t>
             </a:r>
           </a:p>
           <a:p>
             <a:pPr lvl="2"/>
             <a:r>
-              <a:rPr lang="en-US" smtClean="0"/>
+              <a:rPr lang="en-US"/>
               <a:t>Third level</a:t>
             </a:r>
           </a:p>
           <a:p>
             <a:pPr lvl="3"/>
             <a:r>
-              <a:rPr lang="en-US" smtClean="0"/>
+              <a:rPr lang="en-US"/>
               <a:t>Fourth level</a:t>
             </a:r>
           </a:p>
           <a:p>
             <a:pPr lvl="4"/>
             <a:r>
-              <a:rPr lang="en-US" smtClean="0"/>
+              <a:rPr lang="en-US"/>
               <a:t>Fifth level</a:t>
             </a:r>
-            <a:endParaRPr lang="en-US"/>
           </a:p>
         </p:txBody>
       </p:sp>
@@ -827,7 +822,7 @@
           <a:p>
             <a:fld id="{78C97017-6FC3-485B-9764-EAC9E56C1D49}" type="datetimeFigureOut">
               <a:rPr lang="en-US" smtClean="0"/>
-              <a:t>1/1/18</a:t>
+              <a:t>4/3/2018</a:t>
             </a:fld>
             <a:endParaRPr lang="en-US"/>
           </a:p>
@@ -926,10 +921,9 @@
           <a:lstStyle/>
           <a:p>
             <a:r>
-              <a:rPr lang="en-US" smtClean="0"/>
+              <a:rPr lang="en-US"/>
               <a:t>Click to edit Master title style</a:t>
             </a:r>
-            <a:endParaRPr lang="en-US"/>
           </a:p>
         </p:txBody>
       </p:sp>
@@ -955,38 +949,37 @@
           <a:p>
             <a:pPr lvl="0"/>
             <a:r>
-              <a:rPr lang="en-US" smtClean="0"/>
+              <a:rPr lang="en-US"/>
               <a:t>Click to edit Master text styles</a:t>
             </a:r>
           </a:p>
           <a:p>
             <a:pPr lvl="1"/>
             <a:r>
-              <a:rPr lang="en-US" smtClean="0"/>
+              <a:rPr lang="en-US"/>
               <a:t>Second level</a:t>
             </a:r>
           </a:p>
           <a:p>
             <a:pPr lvl="2"/>
             <a:r>
-              <a:rPr lang="en-US" smtClean="0"/>
+              <a:rPr lang="en-US"/>
               <a:t>Third level</a:t>
             </a:r>
           </a:p>
           <a:p>
             <a:pPr lvl="3"/>
             <a:r>
-              <a:rPr lang="en-US" smtClean="0"/>
+              <a:rPr lang="en-US"/>
               <a:t>Fourth level</a:t>
             </a:r>
           </a:p>
           <a:p>
             <a:pPr lvl="4"/>
             <a:r>
-              <a:rPr lang="en-US" smtClean="0"/>
+              <a:rPr lang="en-US"/>
               <a:t>Fifth level</a:t>
             </a:r>
-            <a:endParaRPr lang="en-US"/>
           </a:p>
         </p:txBody>
       </p:sp>
@@ -1007,7 +1000,7 @@
           <a:p>
             <a:fld id="{78C97017-6FC3-485B-9764-EAC9E56C1D49}" type="datetimeFigureOut">
               <a:rPr lang="en-US" smtClean="0"/>
-              <a:t>1/1/18</a:t>
+              <a:t>4/3/2018</a:t>
             </a:fld>
             <a:endParaRPr lang="en-US"/>
           </a:p>
@@ -1101,10 +1094,9 @@
           <a:lstStyle/>
           <a:p>
             <a:r>
-              <a:rPr lang="en-US" smtClean="0"/>
+              <a:rPr lang="en-US"/>
               <a:t>Click to edit Master title style</a:t>
             </a:r>
-            <a:endParaRPr lang="en-US"/>
           </a:p>
         </p:txBody>
       </p:sp>
@@ -1125,38 +1117,37 @@
           <a:p>
             <a:pPr lvl="0"/>
             <a:r>
-              <a:rPr lang="en-US" smtClean="0"/>
+              <a:rPr lang="en-US"/>
               <a:t>Click to edit Master text styles</a:t>
             </a:r>
           </a:p>
           <a:p>
             <a:pPr lvl="1"/>
             <a:r>
-              <a:rPr lang="en-US" smtClean="0"/>
+              <a:rPr lang="en-US"/>
               <a:t>Second level</a:t>
             </a:r>
           </a:p>
           <a:p>
             <a:pPr lvl="2"/>
             <a:r>
-              <a:rPr lang="en-US" smtClean="0"/>
+              <a:rPr lang="en-US"/>
               <a:t>Third level</a:t>
             </a:r>
           </a:p>
           <a:p>
             <a:pPr lvl="3"/>
             <a:r>
-              <a:rPr lang="en-US" smtClean="0"/>
+              <a:rPr lang="en-US"/>
               <a:t>Fourth level</a:t>
             </a:r>
           </a:p>
           <a:p>
             <a:pPr lvl="4"/>
             <a:r>
-              <a:rPr lang="en-US" smtClean="0"/>
+              <a:rPr lang="en-US"/>
               <a:t>Fifth level</a:t>
             </a:r>
-            <a:endParaRPr lang="en-US"/>
           </a:p>
         </p:txBody>
       </p:sp>
@@ -1177,7 +1168,7 @@
           <a:p>
             <a:fld id="{78C97017-6FC3-485B-9764-EAC9E56C1D49}" type="datetimeFigureOut">
               <a:rPr lang="en-US" smtClean="0"/>
-              <a:t>1/1/18</a:t>
+              <a:t>4/3/2018</a:t>
             </a:fld>
             <a:endParaRPr lang="en-US"/>
           </a:p>
@@ -1280,10 +1271,9 @@
           </a:lstStyle>
           <a:p>
             <a:r>
-              <a:rPr lang="en-US" smtClean="0"/>
+              <a:rPr lang="en-US"/>
               <a:t>Click to edit Master title style</a:t>
             </a:r>
-            <a:endParaRPr lang="en-US"/>
           </a:p>
         </p:txBody>
       </p:sp>
@@ -1400,7 +1390,7 @@
           <a:p>
             <a:pPr lvl="0"/>
             <a:r>
-              <a:rPr lang="en-US" smtClean="0"/>
+              <a:rPr lang="en-US"/>
               <a:t>Click to edit Master text styles</a:t>
             </a:r>
           </a:p>
@@ -1423,7 +1413,7 @@
           <a:p>
             <a:fld id="{78C97017-6FC3-485B-9764-EAC9E56C1D49}" type="datetimeFigureOut">
               <a:rPr lang="en-US" smtClean="0"/>
-              <a:t>1/1/18</a:t>
+              <a:t>4/3/2018</a:t>
             </a:fld>
             <a:endParaRPr lang="en-US"/>
           </a:p>
@@ -1517,10 +1507,9 @@
           <a:lstStyle/>
           <a:p>
             <a:r>
-              <a:rPr lang="en-US" smtClean="0"/>
+              <a:rPr lang="en-US"/>
               <a:t>Click to edit Master title style</a:t>
             </a:r>
-            <a:endParaRPr lang="en-US"/>
           </a:p>
         </p:txBody>
       </p:sp>
@@ -1574,38 +1563,37 @@
           <a:p>
             <a:pPr lvl="0"/>
             <a:r>
-              <a:rPr lang="en-US" smtClean="0"/>
+              <a:rPr lang="en-US"/>
               <a:t>Click to edit Master text styles</a:t>
             </a:r>
           </a:p>
           <a:p>
             <a:pPr lvl="1"/>
             <a:r>
-              <a:rPr lang="en-US" smtClean="0"/>
+              <a:rPr lang="en-US"/>
               <a:t>Second level</a:t>
             </a:r>
           </a:p>
           <a:p>
             <a:pPr lvl="2"/>
             <a:r>
-              <a:rPr lang="en-US" smtClean="0"/>
+              <a:rPr lang="en-US"/>
               <a:t>Third level</a:t>
             </a:r>
           </a:p>
           <a:p>
             <a:pPr lvl="3"/>
             <a:r>
-              <a:rPr lang="en-US" smtClean="0"/>
+              <a:rPr lang="en-US"/>
               <a:t>Fourth level</a:t>
             </a:r>
           </a:p>
           <a:p>
             <a:pPr lvl="4"/>
             <a:r>
-              <a:rPr lang="en-US" smtClean="0"/>
+              <a:rPr lang="en-US"/>
               <a:t>Fifth level</a:t>
             </a:r>
-            <a:endParaRPr lang="en-US"/>
           </a:p>
         </p:txBody>
       </p:sp>
@@ -1659,38 +1647,37 @@
           <a:p>
             <a:pPr lvl="0"/>
             <a:r>
-              <a:rPr lang="en-US" smtClean="0"/>
+              <a:rPr lang="en-US"/>
               <a:t>Click to edit Master text styles</a:t>
             </a:r>
           </a:p>
           <a:p>
             <a:pPr lvl="1"/>
             <a:r>
-              <a:rPr lang="en-US" smtClean="0"/>
+              <a:rPr lang="en-US"/>
               <a:t>Second level</a:t>
             </a:r>
           </a:p>
           <a:p>
             <a:pPr lvl="2"/>
             <a:r>
-              <a:rPr lang="en-US" smtClean="0"/>
+              <a:rPr lang="en-US"/>
               <a:t>Third level</a:t>
             </a:r>
           </a:p>
           <a:p>
             <a:pPr lvl="3"/>
             <a:r>
-              <a:rPr lang="en-US" smtClean="0"/>
+              <a:rPr lang="en-US"/>
               <a:t>Fourth level</a:t>
             </a:r>
           </a:p>
           <a:p>
             <a:pPr lvl="4"/>
             <a:r>
-              <a:rPr lang="en-US" smtClean="0"/>
+              <a:rPr lang="en-US"/>
               <a:t>Fifth level</a:t>
             </a:r>
-            <a:endParaRPr lang="en-US"/>
           </a:p>
         </p:txBody>
       </p:sp>
@@ -1711,7 +1698,7 @@
           <a:p>
             <a:fld id="{78C97017-6FC3-485B-9764-EAC9E56C1D49}" type="datetimeFigureOut">
               <a:rPr lang="en-US" smtClean="0"/>
-              <a:t>1/1/18</a:t>
+              <a:t>4/3/2018</a:t>
             </a:fld>
             <a:endParaRPr lang="en-US"/>
           </a:p>
@@ -1809,10 +1796,9 @@
           </a:lstStyle>
           <a:p>
             <a:r>
-              <a:rPr lang="en-US" smtClean="0"/>
+              <a:rPr lang="en-US"/>
               <a:t>Click to edit Master title style</a:t>
             </a:r>
-            <a:endParaRPr lang="en-US"/>
           </a:p>
         </p:txBody>
       </p:sp>
@@ -1875,7 +1861,7 @@
           <a:p>
             <a:pPr lvl="0"/>
             <a:r>
-              <a:rPr lang="en-US" smtClean="0"/>
+              <a:rPr lang="en-US"/>
               <a:t>Click to edit Master text styles</a:t>
             </a:r>
           </a:p>
@@ -1931,38 +1917,37 @@
           <a:p>
             <a:pPr lvl="0"/>
             <a:r>
-              <a:rPr lang="en-US" smtClean="0"/>
+              <a:rPr lang="en-US"/>
               <a:t>Click to edit Master text styles</a:t>
             </a:r>
           </a:p>
           <a:p>
             <a:pPr lvl="1"/>
             <a:r>
-              <a:rPr lang="en-US" smtClean="0"/>
+              <a:rPr lang="en-US"/>
               <a:t>Second level</a:t>
             </a:r>
           </a:p>
           <a:p>
             <a:pPr lvl="2"/>
             <a:r>
-              <a:rPr lang="en-US" smtClean="0"/>
+              <a:rPr lang="en-US"/>
               <a:t>Third level</a:t>
             </a:r>
           </a:p>
           <a:p>
             <a:pPr lvl="3"/>
             <a:r>
-              <a:rPr lang="en-US" smtClean="0"/>
+              <a:rPr lang="en-US"/>
               <a:t>Fourth level</a:t>
             </a:r>
           </a:p>
           <a:p>
             <a:pPr lvl="4"/>
             <a:r>
-              <a:rPr lang="en-US" smtClean="0"/>
+              <a:rPr lang="en-US"/>
               <a:t>Fifth level</a:t>
             </a:r>
-            <a:endParaRPr lang="en-US"/>
           </a:p>
         </p:txBody>
       </p:sp>
@@ -2025,7 +2010,7 @@
           <a:p>
             <a:pPr lvl="0"/>
             <a:r>
-              <a:rPr lang="en-US" smtClean="0"/>
+              <a:rPr lang="en-US"/>
               <a:t>Click to edit Master text styles</a:t>
             </a:r>
           </a:p>
@@ -2081,38 +2066,37 @@
           <a:p>
             <a:pPr lvl="0"/>
             <a:r>
-              <a:rPr lang="en-US" smtClean="0"/>
+              <a:rPr lang="en-US"/>
               <a:t>Click to edit Master text styles</a:t>
             </a:r>
           </a:p>
           <a:p>
             <a:pPr lvl="1"/>
             <a:r>
-              <a:rPr lang="en-US" smtClean="0"/>
+              <a:rPr lang="en-US"/>
               <a:t>Second level</a:t>
             </a:r>
           </a:p>
           <a:p>
             <a:pPr lvl="2"/>
             <a:r>
-              <a:rPr lang="en-US" smtClean="0"/>
+              <a:rPr lang="en-US"/>
               <a:t>Third level</a:t>
             </a:r>
           </a:p>
           <a:p>
             <a:pPr lvl="3"/>
             <a:r>
-              <a:rPr lang="en-US" smtClean="0"/>
+              <a:rPr lang="en-US"/>
               <a:t>Fourth level</a:t>
             </a:r>
           </a:p>
           <a:p>
             <a:pPr lvl="4"/>
             <a:r>
-              <a:rPr lang="en-US" smtClean="0"/>
+              <a:rPr lang="en-US"/>
               <a:t>Fifth level</a:t>
             </a:r>
-            <a:endParaRPr lang="en-US"/>
           </a:p>
         </p:txBody>
       </p:sp>
@@ -2133,7 +2117,7 @@
           <a:p>
             <a:fld id="{78C97017-6FC3-485B-9764-EAC9E56C1D49}" type="datetimeFigureOut">
               <a:rPr lang="en-US" smtClean="0"/>
-              <a:t>1/1/18</a:t>
+              <a:t>4/3/2018</a:t>
             </a:fld>
             <a:endParaRPr lang="en-US"/>
           </a:p>
@@ -2227,10 +2211,9 @@
           <a:lstStyle/>
           <a:p>
             <a:r>
-              <a:rPr lang="en-US" smtClean="0"/>
+              <a:rPr lang="en-US"/>
               <a:t>Click to edit Master title style</a:t>
             </a:r>
-            <a:endParaRPr lang="en-US"/>
           </a:p>
         </p:txBody>
       </p:sp>
@@ -2251,7 +2234,7 @@
           <a:p>
             <a:fld id="{78C97017-6FC3-485B-9764-EAC9E56C1D49}" type="datetimeFigureOut">
               <a:rPr lang="en-US" smtClean="0"/>
-              <a:t>1/1/18</a:t>
+              <a:t>4/3/2018</a:t>
             </a:fld>
             <a:endParaRPr lang="en-US"/>
           </a:p>
@@ -2346,7 +2329,7 @@
           <a:p>
             <a:fld id="{78C97017-6FC3-485B-9764-EAC9E56C1D49}" type="datetimeFigureOut">
               <a:rPr lang="en-US" smtClean="0"/>
-              <a:t>1/1/18</a:t>
+              <a:t>4/3/2018</a:t>
             </a:fld>
             <a:endParaRPr lang="en-US"/>
           </a:p>
@@ -2449,10 +2432,9 @@
           </a:lstStyle>
           <a:p>
             <a:r>
-              <a:rPr lang="en-US" smtClean="0"/>
+              <a:rPr lang="en-US"/>
               <a:t>Click to edit Master title style</a:t>
             </a:r>
-            <a:endParaRPr lang="en-US"/>
           </a:p>
         </p:txBody>
       </p:sp>
@@ -2506,38 +2488,37 @@
           <a:p>
             <a:pPr lvl="0"/>
             <a:r>
-              <a:rPr lang="en-US" smtClean="0"/>
+              <a:rPr lang="en-US"/>
               <a:t>Click to edit Master text styles</a:t>
             </a:r>
           </a:p>
           <a:p>
             <a:pPr lvl="1"/>
             <a:r>
-              <a:rPr lang="en-US" smtClean="0"/>
+              <a:rPr lang="en-US"/>
               <a:t>Second level</a:t>
             </a:r>
           </a:p>
           <a:p>
             <a:pPr lvl="2"/>
             <a:r>
-              <a:rPr lang="en-US" smtClean="0"/>
+              <a:rPr lang="en-US"/>
               <a:t>Third level</a:t>
             </a:r>
           </a:p>
           <a:p>
             <a:pPr lvl="3"/>
             <a:r>
-              <a:rPr lang="en-US" smtClean="0"/>
+              <a:rPr lang="en-US"/>
               <a:t>Fourth level</a:t>
             </a:r>
           </a:p>
           <a:p>
             <a:pPr lvl="4"/>
             <a:r>
-              <a:rPr lang="en-US" smtClean="0"/>
+              <a:rPr lang="en-US"/>
               <a:t>Fifth level</a:t>
             </a:r>
-            <a:endParaRPr lang="en-US"/>
           </a:p>
         </p:txBody>
       </p:sp>
@@ -2600,7 +2581,7 @@
           <a:p>
             <a:pPr lvl="0"/>
             <a:r>
-              <a:rPr lang="en-US" smtClean="0"/>
+              <a:rPr lang="en-US"/>
               <a:t>Click to edit Master text styles</a:t>
             </a:r>
           </a:p>
@@ -2623,7 +2604,7 @@
           <a:p>
             <a:fld id="{78C97017-6FC3-485B-9764-EAC9E56C1D49}" type="datetimeFigureOut">
               <a:rPr lang="en-US" smtClean="0"/>
-              <a:t>1/1/18</a:t>
+              <a:t>4/3/2018</a:t>
             </a:fld>
             <a:endParaRPr lang="en-US"/>
           </a:p>
@@ -2726,10 +2707,9 @@
           </a:lstStyle>
           <a:p>
             <a:r>
-              <a:rPr lang="en-US" smtClean="0"/>
+              <a:rPr lang="en-US"/>
               <a:t>Click to edit Master title style</a:t>
             </a:r>
-            <a:endParaRPr lang="en-US"/>
           </a:p>
         </p:txBody>
       </p:sp>
@@ -2853,7 +2833,7 @@
           <a:p>
             <a:pPr lvl="0"/>
             <a:r>
-              <a:rPr lang="en-US" smtClean="0"/>
+              <a:rPr lang="en-US"/>
               <a:t>Click to edit Master text styles</a:t>
             </a:r>
           </a:p>
@@ -2876,7 +2856,7 @@
           <a:p>
             <a:fld id="{78C97017-6FC3-485B-9764-EAC9E56C1D49}" type="datetimeFigureOut">
               <a:rPr lang="en-US" smtClean="0"/>
-              <a:t>1/1/18</a:t>
+              <a:t>4/3/2018</a:t>
             </a:fld>
             <a:endParaRPr lang="en-US"/>
           </a:p>
@@ -2985,10 +2965,9 @@
           <a:lstStyle/>
           <a:p>
             <a:r>
-              <a:rPr lang="en-US" smtClean="0"/>
+              <a:rPr lang="en-US"/>
               <a:t>Click to edit Master title style</a:t>
             </a:r>
-            <a:endParaRPr lang="en-US"/>
           </a:p>
         </p:txBody>
       </p:sp>
@@ -3019,38 +2998,37 @@
           <a:p>
             <a:pPr lvl="0"/>
             <a:r>
-              <a:rPr lang="en-US" smtClean="0"/>
+              <a:rPr lang="en-US"/>
               <a:t>Click to edit Master text styles</a:t>
             </a:r>
           </a:p>
           <a:p>
             <a:pPr lvl="1"/>
             <a:r>
-              <a:rPr lang="en-US" smtClean="0"/>
+              <a:rPr lang="en-US"/>
               <a:t>Second level</a:t>
             </a:r>
           </a:p>
           <a:p>
             <a:pPr lvl="2"/>
             <a:r>
-              <a:rPr lang="en-US" smtClean="0"/>
+              <a:rPr lang="en-US"/>
               <a:t>Third level</a:t>
             </a:r>
           </a:p>
           <a:p>
             <a:pPr lvl="3"/>
             <a:r>
-              <a:rPr lang="en-US" smtClean="0"/>
+              <a:rPr lang="en-US"/>
               <a:t>Fourth level</a:t>
             </a:r>
           </a:p>
           <a:p>
             <a:pPr lvl="4"/>
             <a:r>
-              <a:rPr lang="en-US" smtClean="0"/>
+              <a:rPr lang="en-US"/>
               <a:t>Fifth level</a:t>
             </a:r>
-            <a:endParaRPr lang="en-US"/>
           </a:p>
         </p:txBody>
       </p:sp>
@@ -3089,7 +3067,7 @@
           <a:p>
             <a:fld id="{78C97017-6FC3-485B-9764-EAC9E56C1D49}" type="datetimeFigureOut">
               <a:rPr lang="en-US" smtClean="0"/>
-              <a:t>1/1/18</a:t>
+              <a:t>4/3/2018</a:t>
             </a:fld>
             <a:endParaRPr lang="en-US"/>
           </a:p>
@@ -3472,8 +3450,8 @@
         </p:nvSpPr>
         <p:spPr>
           <a:xfrm>
-            <a:off x="1119865" y="1727200"/>
-            <a:ext cx="7490735" cy="2997200"/>
+            <a:off x="1143000" y="1679260"/>
+            <a:ext cx="7467600" cy="3252393"/>
           </a:xfrm>
           <a:prstGeom prst="roundRect">
             <a:avLst>
@@ -3510,12 +3488,12 @@
           <a:lstStyle/>
           <a:p>
             <a:r>
-              <a:rPr lang="en-US" sz="1200" b="1" dirty="0" smtClean="0">
+              <a:rPr lang="en-US" sz="1200" b="1" dirty="0">
                 <a:solidFill>
                   <a:srgbClr val="7030A0"/>
                 </a:solidFill>
               </a:rPr>
-              <a:t>Model</a:t>
+              <a:t>Model </a:t>
             </a:r>
             <a:endParaRPr lang="en-SG" sz="1200" b="1" dirty="0">
               <a:solidFill>
@@ -3569,7 +3547,7 @@
           <a:p>
             <a:pPr algn="ctr"/>
             <a:r>
-              <a:rPr lang="en-US" sz="1050" dirty="0" err="1" smtClean="0">
+              <a:rPr lang="en-US" sz="1050" dirty="0" err="1">
                 <a:solidFill>
                   <a:schemeClr val="bg1"/>
                 </a:solidFill>
@@ -3628,7 +3606,7 @@
           <a:p>
             <a:pPr algn="ctr"/>
             <a:r>
-              <a:rPr lang="en-US" sz="1050" dirty="0" err="1" smtClean="0">
+              <a:rPr lang="en-US" sz="1050" dirty="0" err="1">
                 <a:solidFill>
                   <a:schemeClr val="bg1"/>
                 </a:solidFill>
@@ -3658,7 +3636,7 @@
           </a:xfrm>
           <a:prstGeom prst="bentConnector4">
             <a:avLst>
-              <a:gd name="adj1" fmla="val -101829"/>
+              <a:gd name="adj1" fmla="val -190196"/>
               <a:gd name="adj2" fmla="val 99976"/>
             </a:avLst>
           </a:prstGeom>
@@ -3742,7 +3720,7 @@
           <a:p>
             <a:pPr algn="ctr"/>
             <a:r>
-              <a:rPr lang="en-US" sz="1050" dirty="0" smtClean="0">
+              <a:rPr lang="en-US" sz="1050" dirty="0">
                 <a:solidFill>
                   <a:schemeClr val="bg1"/>
                 </a:solidFill>
@@ -4015,7 +3993,7 @@
           <a:p>
             <a:pPr algn="ctr"/>
             <a:r>
-              <a:rPr lang="en-US" sz="1050" dirty="0" err="1" smtClean="0">
+              <a:rPr lang="en-US" sz="1050" dirty="0" err="1">
                 <a:solidFill>
                   <a:srgbClr val="7030A0"/>
                 </a:solidFill>
@@ -4125,7 +4103,7 @@
         <p:spPr>
           <a:xfrm>
             <a:off x="4487017" y="2847371"/>
-            <a:ext cx="1156969" cy="346760"/>
+            <a:ext cx="1174640" cy="346760"/>
           </a:xfrm>
           <a:prstGeom prst="rect">
             <a:avLst/>
@@ -4157,7 +4135,7 @@
           <a:p>
             <a:pPr algn="ctr"/>
             <a:r>
-              <a:rPr lang="en-US" sz="1050" dirty="0" err="1" smtClean="0">
+              <a:rPr lang="en-US" sz="1050" dirty="0" err="1">
                 <a:solidFill>
                   <a:srgbClr val="7030A0"/>
                 </a:solidFill>
@@ -4223,6 +4201,7 @@
         <p:nvCxnSpPr>
           <p:cNvPr id="30" name="Elbow Connector 29"/>
           <p:cNvCxnSpPr>
+            <a:cxnSpLocks/>
             <a:stCxn id="51" idx="3"/>
             <a:endCxn id="49" idx="1"/>
           </p:cNvCxnSpPr>
@@ -4269,7 +4248,7 @@
         <p:spPr>
           <a:xfrm>
             <a:off x="4477328" y="2280569"/>
-            <a:ext cx="1156969" cy="346760"/>
+            <a:ext cx="1184328" cy="346760"/>
           </a:xfrm>
           <a:prstGeom prst="rect">
             <a:avLst/>
@@ -4301,7 +4280,7 @@
           <a:p>
             <a:pPr algn="ctr"/>
             <a:r>
-              <a:rPr lang="en-US" sz="1050" dirty="0" err="1" smtClean="0">
+              <a:rPr lang="en-US" sz="1050" dirty="0" err="1">
                 <a:solidFill>
                   <a:srgbClr val="7030A0"/>
                 </a:solidFill>
@@ -4320,6 +4299,7 @@
         <p:nvCxnSpPr>
           <p:cNvPr id="59" name="Elbow Connector 58"/>
           <p:cNvCxnSpPr>
+            <a:cxnSpLocks/>
             <a:stCxn id="51" idx="3"/>
             <a:endCxn id="57" idx="1"/>
           </p:cNvCxnSpPr>
@@ -4400,7 +4380,7 @@
           <a:p>
             <a:pPr algn="ctr"/>
             <a:r>
-              <a:rPr lang="en-US" sz="1050" dirty="0" smtClean="0">
+              <a:rPr lang="en-US" sz="1050" dirty="0">
                 <a:solidFill>
                   <a:srgbClr val="7030A0"/>
                 </a:solidFill>
@@ -4423,7 +4403,7 @@
         </p:nvSpPr>
         <p:spPr>
           <a:xfrm>
-            <a:off x="5643227" y="2943979"/>
+            <a:off x="5681741" y="2939409"/>
             <a:ext cx="236048" cy="173380"/>
           </a:xfrm>
           <a:prstGeom prst="flowChartDecision">
@@ -4464,18 +4444,20 @@
         <p:nvCxnSpPr>
           <p:cNvPr id="64" name="Elbow Connector 63"/>
           <p:cNvCxnSpPr>
+            <a:cxnSpLocks/>
             <a:stCxn id="63" idx="3"/>
-            <a:endCxn id="62" idx="1"/>
           </p:cNvCxnSpPr>
           <p:nvPr/>
         </p:nvCxnSpPr>
         <p:spPr>
           <a:xfrm>
-            <a:off x="5879275" y="3030669"/>
-            <a:ext cx="434402" cy="777"/>
+            <a:off x="5917789" y="3026099"/>
+            <a:ext cx="402505" cy="2275"/>
           </a:xfrm>
           <a:prstGeom prst="bentConnector3">
-            <a:avLst/>
+            <a:avLst>
+              <a:gd name="adj1" fmla="val 487"/>
+            </a:avLst>
           </a:prstGeom>
           <a:ln w="19050">
             <a:solidFill>
@@ -4542,7 +4524,7 @@
           <a:p>
             <a:pPr algn="ctr"/>
             <a:r>
-              <a:rPr lang="en-US" sz="1050" dirty="0" smtClean="0">
+              <a:rPr lang="en-US" sz="1050" dirty="0">
                 <a:solidFill>
                   <a:srgbClr val="7030A0"/>
                 </a:solidFill>
@@ -4684,7 +4666,7 @@
           <a:p>
             <a:pPr algn="ctr"/>
             <a:r>
-              <a:rPr lang="en-US" sz="1050" dirty="0" smtClean="0">
+              <a:rPr lang="en-US" sz="1050" dirty="0">
                 <a:solidFill>
                   <a:srgbClr val="7030A0"/>
                 </a:solidFill>
@@ -4828,12 +4810,12 @@
           <a:p>
             <a:pPr algn="ctr"/>
             <a:r>
-              <a:rPr lang="en-US" sz="1050" dirty="0" smtClean="0">
+              <a:rPr lang="en-US" sz="1050" dirty="0">
                 <a:solidFill>
                   <a:srgbClr val="7030A0"/>
                 </a:solidFill>
               </a:rPr>
-              <a:t>Phone</a:t>
+              <a:t>NRIC</a:t>
             </a:r>
             <a:endParaRPr lang="en-SG" sz="1050" dirty="0">
               <a:solidFill>
@@ -4925,12 +4907,12 @@
           <a:p>
             <a:pPr algn="ctr"/>
             <a:r>
-              <a:rPr lang="en-US" sz="1050" dirty="0" smtClean="0">
+              <a:rPr lang="en-US" sz="1050" dirty="0">
                 <a:solidFill>
                   <a:srgbClr val="7030A0"/>
                 </a:solidFill>
               </a:rPr>
-              <a:t>Email</a:t>
+              <a:t>Remark</a:t>
             </a:r>
             <a:endParaRPr lang="en-SG" sz="1050" dirty="0">
               <a:solidFill>
@@ -4953,103 +4935,6 @@
           <a:xfrm>
             <a:off x="7277995" y="3034891"/>
             <a:ext cx="434402" cy="318195"/>
-          </a:xfrm>
-          <a:prstGeom prst="bentConnector3">
-            <a:avLst/>
-          </a:prstGeom>
-          <a:ln w="19050">
-            <a:solidFill>
-              <a:srgbClr val="7030A0"/>
-            </a:solidFill>
-            <a:headEnd type="none" w="med" len="med"/>
-            <a:tailEnd type="arrow" w="med" len="med"/>
-          </a:ln>
-          <a:effectLst/>
-        </p:spPr>
-        <p:style>
-          <a:lnRef idx="1">
-            <a:schemeClr val="accent2"/>
-          </a:lnRef>
-          <a:fillRef idx="2">
-            <a:schemeClr val="accent2"/>
-          </a:fillRef>
-          <a:effectRef idx="1">
-            <a:schemeClr val="accent2"/>
-          </a:effectRef>
-          <a:fontRef idx="minor">
-            <a:schemeClr val="dk1"/>
-          </a:fontRef>
-        </p:style>
-      </p:cxnSp>
-      <p:sp>
-        <p:nvSpPr>
-          <p:cNvPr id="85" name="Rectangle 8"/>
-          <p:cNvSpPr/>
-          <p:nvPr/>
-        </p:nvSpPr>
-        <p:spPr>
-          <a:xfrm>
-            <a:off x="7712397" y="3533171"/>
-            <a:ext cx="708186" cy="285783"/>
-          </a:xfrm>
-          <a:prstGeom prst="rect">
-            <a:avLst/>
-          </a:prstGeom>
-          <a:ln w="19050">
-            <a:solidFill>
-              <a:srgbClr val="7030A0"/>
-            </a:solidFill>
-          </a:ln>
-          <a:effectLst/>
-        </p:spPr>
-        <p:style>
-          <a:lnRef idx="1">
-            <a:schemeClr val="accent4"/>
-          </a:lnRef>
-          <a:fillRef idx="2">
-            <a:schemeClr val="accent4"/>
-          </a:fillRef>
-          <a:effectRef idx="1">
-            <a:schemeClr val="accent4"/>
-          </a:effectRef>
-          <a:fontRef idx="minor">
-            <a:schemeClr val="dk1"/>
-          </a:fontRef>
-        </p:style>
-        <p:txBody>
-          <a:bodyPr rtlCol="0" anchor="ctr"/>
-          <a:lstStyle/>
-          <a:p>
-            <a:pPr algn="ctr"/>
-            <a:r>
-              <a:rPr lang="en-US" sz="1050" dirty="0" smtClean="0">
-                <a:solidFill>
-                  <a:srgbClr val="7030A0"/>
-                </a:solidFill>
-              </a:rPr>
-              <a:t>Address</a:t>
-            </a:r>
-            <a:endParaRPr lang="en-SG" sz="1050" dirty="0">
-              <a:solidFill>
-                <a:srgbClr val="7030A0"/>
-              </a:solidFill>
-            </a:endParaRPr>
-          </a:p>
-        </p:txBody>
-      </p:sp>
-      <p:cxnSp>
-        <p:nvCxnSpPr>
-          <p:cNvPr id="86" name="Elbow Connector 85"/>
-          <p:cNvCxnSpPr>
-            <a:stCxn id="78" idx="3"/>
-            <a:endCxn id="85" idx="1"/>
-          </p:cNvCxnSpPr>
-          <p:nvPr/>
-        </p:nvCxnSpPr>
-        <p:spPr>
-          <a:xfrm>
-            <a:off x="7277995" y="3034891"/>
-            <a:ext cx="434402" cy="641172"/>
           </a:xfrm>
           <a:prstGeom prst="bentConnector3">
             <a:avLst/>
@@ -5210,7 +5095,7 @@
           <a:p>
             <a:pPr algn="ctr"/>
             <a:r>
-              <a:rPr lang="en-US" sz="1050" dirty="0" smtClean="0">
+              <a:rPr lang="en-US" sz="1050" dirty="0">
                 <a:solidFill>
                   <a:srgbClr val="7030A0"/>
                 </a:solidFill>
@@ -5218,14 +5103,14 @@
               <a:t>&lt;&lt;interface&gt;&gt;</a:t>
             </a:r>
             <a:br>
-              <a:rPr lang="en-US" sz="1050" dirty="0" smtClean="0">
+              <a:rPr lang="en-US" sz="1050" dirty="0">
                 <a:solidFill>
                   <a:srgbClr val="7030A0"/>
                 </a:solidFill>
               </a:rPr>
             </a:br>
             <a:r>
-              <a:rPr lang="en-US" sz="1050" dirty="0" err="1" smtClean="0">
+              <a:rPr lang="en-US" sz="1050" dirty="0" err="1">
                 <a:solidFill>
                   <a:srgbClr val="7030A0"/>
                 </a:solidFill>
@@ -5264,7 +5149,7 @@
           <a:p>
             <a:pPr algn="r"/>
             <a:r>
-              <a:rPr lang="en-US" sz="1100" dirty="0" smtClean="0">
+              <a:rPr lang="en-US" sz="1100" dirty="0">
                 <a:solidFill>
                   <a:srgbClr val="7030A0"/>
                 </a:solidFill>
@@ -5287,7 +5172,7 @@
         </p:nvSpPr>
         <p:spPr>
           <a:xfrm>
-            <a:off x="2057401" y="4239491"/>
+            <a:off x="2057401" y="4419600"/>
             <a:ext cx="1066800" cy="346760"/>
           </a:xfrm>
           <a:prstGeom prst="rect">
@@ -5320,20 +5205,12 @@
           <a:p>
             <a:pPr algn="ctr"/>
             <a:r>
-              <a:rPr lang="en-US" sz="1050" dirty="0" smtClean="0">
+              <a:rPr lang="en-US" sz="1050" dirty="0">
                 <a:solidFill>
                   <a:srgbClr val="7030A0"/>
                 </a:solidFill>
               </a:rPr>
               <a:t>&lt;&lt;interface&gt;&gt;</a:t>
-            </a:r>
-            <a:r>
-              <a:rPr lang="en-US" sz="1050">
-                <a:solidFill>
-                  <a:srgbClr val="7030A0"/>
-                </a:solidFill>
-              </a:rPr>
-              <a:t/>
             </a:r>
             <a:br>
               <a:rPr lang="en-US" sz="1050">
@@ -5343,7 +5220,7 @@
               </a:rPr>
             </a:br>
             <a:r>
-              <a:rPr lang="en-US" sz="1050" dirty="0" err="1" smtClean="0">
+              <a:rPr lang="en-US" sz="1050" dirty="0" err="1">
                 <a:solidFill>
                   <a:srgbClr val="7030A0"/>
                 </a:solidFill>
@@ -5369,8 +5246,8 @@
         </p:nvCxnSpPr>
         <p:spPr>
           <a:xfrm rot="16200000" flipH="1">
-            <a:off x="1364475" y="3719944"/>
-            <a:ext cx="831471" cy="554381"/>
+            <a:off x="1274420" y="3809999"/>
+            <a:ext cx="1011580" cy="554381"/>
           </a:xfrm>
           <a:prstGeom prst="bentConnector2">
             <a:avLst/>
@@ -5404,6 +5281,7 @@
         <p:nvCxnSpPr>
           <p:cNvPr id="50" name="Elbow Connector 49"/>
           <p:cNvCxnSpPr>
+            <a:cxnSpLocks/>
             <a:stCxn id="62" idx="0"/>
             <a:endCxn id="57" idx="3"/>
           </p:cNvCxnSpPr>
@@ -5411,8 +5289,8 @@
         </p:nvCxnSpPr>
         <p:spPr>
           <a:xfrm rot="16200000" flipV="1">
-            <a:off x="5948976" y="2139271"/>
-            <a:ext cx="404117" cy="1033473"/>
+            <a:off x="5962655" y="2152951"/>
+            <a:ext cx="404117" cy="1006114"/>
           </a:xfrm>
           <a:prstGeom prst="bentConnector2">
             <a:avLst/>
@@ -5465,7 +5343,7 @@
           <a:p>
             <a:pPr algn="ctr"/>
             <a:r>
-              <a:rPr lang="en-US" sz="1100" dirty="0" smtClean="0">
+              <a:rPr lang="en-US" sz="1100" dirty="0">
                 <a:solidFill>
                   <a:srgbClr val="7030A0"/>
                 </a:solidFill>
@@ -5504,7 +5382,7 @@
           <a:p>
             <a:pPr algn="ctr"/>
             <a:r>
-              <a:rPr lang="en-US" sz="1100" dirty="0" smtClean="0">
+              <a:rPr lang="en-US" sz="1100" dirty="0">
                 <a:solidFill>
                   <a:srgbClr val="7030A0"/>
                 </a:solidFill>
@@ -5543,7 +5421,7 @@
           <a:p>
             <a:pPr algn="ctr"/>
             <a:r>
-              <a:rPr lang="en-US" sz="1100" dirty="0" smtClean="0">
+              <a:rPr lang="en-US" sz="1100" dirty="0">
                 <a:solidFill>
                   <a:srgbClr val="7030A0"/>
                 </a:solidFill>
@@ -5582,7 +5460,7 @@
           <a:p>
             <a:pPr algn="ctr"/>
             <a:r>
-              <a:rPr lang="en-US" sz="1100" dirty="0" smtClean="0">
+              <a:rPr lang="en-US" sz="1100" dirty="0">
                 <a:solidFill>
                   <a:srgbClr val="7030A0"/>
                 </a:solidFill>
@@ -5621,7 +5499,7 @@
           <a:p>
             <a:pPr algn="ctr"/>
             <a:r>
-              <a:rPr lang="en-US" sz="1100" dirty="0" smtClean="0">
+              <a:rPr lang="en-US" sz="1100" dirty="0">
                 <a:solidFill>
                   <a:srgbClr val="7030A0"/>
                 </a:solidFill>
@@ -5660,7 +5538,7 @@
           <a:p>
             <a:pPr algn="ctr"/>
             <a:r>
-              <a:rPr lang="en-US" sz="1100" dirty="0" smtClean="0">
+              <a:rPr lang="en-US" sz="1100" dirty="0">
                 <a:solidFill>
                   <a:srgbClr val="7030A0"/>
                 </a:solidFill>
@@ -5699,7 +5577,7 @@
           <a:p>
             <a:pPr algn="ctr"/>
             <a:r>
-              <a:rPr lang="en-US" sz="1100" dirty="0" smtClean="0">
+              <a:rPr lang="en-US" sz="1100" dirty="0">
                 <a:solidFill>
                   <a:srgbClr val="7030A0"/>
                 </a:solidFill>
@@ -5738,12 +5616,466 @@
           <a:p>
             <a:pPr algn="ctr"/>
             <a:r>
-              <a:rPr lang="en-US" sz="1100" dirty="0" smtClean="0">
+              <a:rPr lang="en-US" sz="1100" dirty="0">
                 <a:solidFill>
                   <a:srgbClr val="7030A0"/>
                 </a:solidFill>
               </a:rPr>
               <a:t>1</a:t>
+            </a:r>
+            <a:endParaRPr lang="en-SG" sz="1100" dirty="0">
+              <a:solidFill>
+                <a:srgbClr val="7030A0"/>
+              </a:solidFill>
+            </a:endParaRPr>
+          </a:p>
+        </p:txBody>
+      </p:sp>
+      <p:sp>
+        <p:nvSpPr>
+          <p:cNvPr id="52" name="Rectangle 8">
+            <a:extLst>
+              <a:ext uri="{FF2B5EF4-FFF2-40B4-BE49-F238E27FC236}">
+                <a16:creationId xmlns:a16="http://schemas.microsoft.com/office/drawing/2014/main" id="{4C81A460-4593-41DF-AEEC-1958D2E1074B}"/>
+              </a:ext>
+            </a:extLst>
+          </p:cNvPr>
+          <p:cNvSpPr/>
+          <p:nvPr/>
+        </p:nvSpPr>
+        <p:spPr>
+          <a:xfrm>
+            <a:off x="4495800" y="3387040"/>
+            <a:ext cx="1172189" cy="346760"/>
+          </a:xfrm>
+          <a:prstGeom prst="rect">
+            <a:avLst/>
+          </a:prstGeom>
+          <a:ln w="19050">
+            <a:solidFill>
+              <a:srgbClr val="7030A0"/>
+            </a:solidFill>
+          </a:ln>
+          <a:effectLst/>
+        </p:spPr>
+        <p:style>
+          <a:lnRef idx="1">
+            <a:schemeClr val="accent4"/>
+          </a:lnRef>
+          <a:fillRef idx="2">
+            <a:schemeClr val="accent4"/>
+          </a:fillRef>
+          <a:effectRef idx="1">
+            <a:schemeClr val="accent4"/>
+          </a:effectRef>
+          <a:fontRef idx="minor">
+            <a:schemeClr val="dk1"/>
+          </a:fontRef>
+        </p:style>
+        <p:txBody>
+          <a:bodyPr rtlCol="0" anchor="ctr"/>
+          <a:lstStyle/>
+          <a:p>
+            <a:pPr algn="ctr"/>
+            <a:r>
+              <a:rPr lang="en-US" sz="1050" dirty="0" err="1">
+                <a:solidFill>
+                  <a:srgbClr val="7030A0"/>
+                </a:solidFill>
+              </a:rPr>
+              <a:t>UniqueSubjectList</a:t>
+            </a:r>
+            <a:endParaRPr lang="en-SG" sz="1050" dirty="0">
+              <a:solidFill>
+                <a:srgbClr val="7030A0"/>
+              </a:solidFill>
+            </a:endParaRPr>
+          </a:p>
+        </p:txBody>
+      </p:sp>
+      <p:cxnSp>
+        <p:nvCxnSpPr>
+          <p:cNvPr id="53" name="Elbow Connector 29">
+            <a:extLst>
+              <a:ext uri="{FF2B5EF4-FFF2-40B4-BE49-F238E27FC236}">
+                <a16:creationId xmlns:a16="http://schemas.microsoft.com/office/drawing/2014/main" id="{7CE69C6D-79C6-453E-8A8A-8C64743B2578}"/>
+              </a:ext>
+            </a:extLst>
+          </p:cNvPr>
+          <p:cNvCxnSpPr>
+            <a:cxnSpLocks/>
+          </p:cNvCxnSpPr>
+          <p:nvPr/>
+        </p:nvCxnSpPr>
+        <p:spPr>
+          <a:xfrm rot="16200000" flipH="1">
+            <a:off x="4019732" y="3084352"/>
+            <a:ext cx="799736" cy="152397"/>
+          </a:xfrm>
+          <a:prstGeom prst="bentConnector3">
+            <a:avLst>
+              <a:gd name="adj1" fmla="val 99864"/>
+            </a:avLst>
+          </a:prstGeom>
+          <a:ln w="19050">
+            <a:solidFill>
+              <a:srgbClr val="7030A0"/>
+            </a:solidFill>
+            <a:headEnd type="none" w="med" len="med"/>
+            <a:tailEnd type="arrow" w="med" len="med"/>
+          </a:ln>
+          <a:effectLst/>
+        </p:spPr>
+        <p:style>
+          <a:lnRef idx="1">
+            <a:schemeClr val="accent2"/>
+          </a:lnRef>
+          <a:fillRef idx="2">
+            <a:schemeClr val="accent2"/>
+          </a:fillRef>
+          <a:effectRef idx="1">
+            <a:schemeClr val="accent2"/>
+          </a:effectRef>
+          <a:fontRef idx="minor">
+            <a:schemeClr val="dk1"/>
+          </a:fontRef>
+        </p:style>
+      </p:cxnSp>
+      <p:sp>
+        <p:nvSpPr>
+          <p:cNvPr id="71" name="TextBox 70">
+            <a:extLst>
+              <a:ext uri="{FF2B5EF4-FFF2-40B4-BE49-F238E27FC236}">
+                <a16:creationId xmlns:a16="http://schemas.microsoft.com/office/drawing/2014/main" id="{BF6814FF-622F-41DC-9AA8-BE5309479B5D}"/>
+              </a:ext>
+            </a:extLst>
+          </p:cNvPr>
+          <p:cNvSpPr txBox="1"/>
+          <p:nvPr/>
+        </p:nvSpPr>
+        <p:spPr>
+          <a:xfrm>
+            <a:off x="4314482" y="3343436"/>
+            <a:ext cx="189257" cy="178683"/>
+          </a:xfrm>
+          <a:prstGeom prst="rect">
+            <a:avLst/>
+          </a:prstGeom>
+          <a:noFill/>
+        </p:spPr>
+        <p:txBody>
+          <a:bodyPr wrap="square" lIns="0" tIns="0" rIns="0" bIns="0" rtlCol="0">
+            <a:noAutofit/>
+          </a:bodyPr>
+          <a:lstStyle/>
+          <a:p>
+            <a:pPr algn="ctr"/>
+            <a:r>
+              <a:rPr lang="en-US" sz="1100" dirty="0">
+                <a:solidFill>
+                  <a:srgbClr val="7030A0"/>
+                </a:solidFill>
+              </a:rPr>
+              <a:t>1</a:t>
+            </a:r>
+            <a:endParaRPr lang="en-SG" sz="1100" dirty="0">
+              <a:solidFill>
+                <a:srgbClr val="7030A0"/>
+              </a:solidFill>
+            </a:endParaRPr>
+          </a:p>
+        </p:txBody>
+      </p:sp>
+      <p:cxnSp>
+        <p:nvCxnSpPr>
+          <p:cNvPr id="72" name="Elbow Connector 29">
+            <a:extLst>
+              <a:ext uri="{FF2B5EF4-FFF2-40B4-BE49-F238E27FC236}">
+                <a16:creationId xmlns:a16="http://schemas.microsoft.com/office/drawing/2014/main" id="{028FF400-EDE2-4DFF-9267-A5DDED17363E}"/>
+              </a:ext>
+            </a:extLst>
+          </p:cNvPr>
+          <p:cNvCxnSpPr>
+            <a:cxnSpLocks/>
+            <a:stCxn id="62" idx="2"/>
+            <a:endCxn id="52" idx="3"/>
+          </p:cNvCxnSpPr>
+          <p:nvPr/>
+        </p:nvCxnSpPr>
+        <p:spPr>
+          <a:xfrm rot="5400000">
+            <a:off x="5990083" y="2882733"/>
+            <a:ext cx="355594" cy="999781"/>
+          </a:xfrm>
+          <a:prstGeom prst="bentConnector2">
+            <a:avLst/>
+          </a:prstGeom>
+          <a:ln w="19050">
+            <a:solidFill>
+              <a:srgbClr val="7030A0"/>
+            </a:solidFill>
+            <a:headEnd type="none" w="med" len="med"/>
+            <a:tailEnd type="arrow" w="med" len="med"/>
+          </a:ln>
+          <a:effectLst/>
+        </p:spPr>
+        <p:style>
+          <a:lnRef idx="1">
+            <a:schemeClr val="accent2"/>
+          </a:lnRef>
+          <a:fillRef idx="2">
+            <a:schemeClr val="accent2"/>
+          </a:fillRef>
+          <a:effectRef idx="1">
+            <a:schemeClr val="accent2"/>
+          </a:effectRef>
+          <a:fontRef idx="minor">
+            <a:schemeClr val="dk1"/>
+          </a:fontRef>
+        </p:style>
+      </p:cxnSp>
+      <p:sp>
+        <p:nvSpPr>
+          <p:cNvPr id="73" name="TextBox 72">
+            <a:extLst>
+              <a:ext uri="{FF2B5EF4-FFF2-40B4-BE49-F238E27FC236}">
+                <a16:creationId xmlns:a16="http://schemas.microsoft.com/office/drawing/2014/main" id="{46215EBF-26F4-43DC-A8EB-85FF8FB0DF77}"/>
+              </a:ext>
+            </a:extLst>
+          </p:cNvPr>
+          <p:cNvSpPr txBox="1"/>
+          <p:nvPr/>
+        </p:nvSpPr>
+        <p:spPr>
+          <a:xfrm>
+            <a:off x="5791200" y="3581400"/>
+            <a:ext cx="189257" cy="178683"/>
+          </a:xfrm>
+          <a:prstGeom prst="rect">
+            <a:avLst/>
+          </a:prstGeom>
+          <a:noFill/>
+        </p:spPr>
+        <p:txBody>
+          <a:bodyPr wrap="square" lIns="0" tIns="0" rIns="0" bIns="0" rtlCol="0">
+            <a:noAutofit/>
+          </a:bodyPr>
+          <a:lstStyle/>
+          <a:p>
+            <a:pPr algn="ctr"/>
+            <a:r>
+              <a:rPr lang="en-US" sz="1100" dirty="0">
+                <a:solidFill>
+                  <a:srgbClr val="7030A0"/>
+                </a:solidFill>
+              </a:rPr>
+              <a:t>1</a:t>
+            </a:r>
+            <a:endParaRPr lang="en-SG" sz="1100" dirty="0">
+              <a:solidFill>
+                <a:srgbClr val="7030A0"/>
+              </a:solidFill>
+            </a:endParaRPr>
+          </a:p>
+        </p:txBody>
+      </p:sp>
+      <p:sp>
+        <p:nvSpPr>
+          <p:cNvPr id="74" name="Flowchart: Decision 96">
+            <a:extLst>
+              <a:ext uri="{FF2B5EF4-FFF2-40B4-BE49-F238E27FC236}">
+                <a16:creationId xmlns:a16="http://schemas.microsoft.com/office/drawing/2014/main" id="{95A2CA35-3119-4A6D-8889-F07CCC030936}"/>
+              </a:ext>
+            </a:extLst>
+          </p:cNvPr>
+          <p:cNvSpPr/>
+          <p:nvPr/>
+        </p:nvSpPr>
+        <p:spPr>
+          <a:xfrm rot="16200000">
+            <a:off x="4976886" y="3765135"/>
+            <a:ext cx="236048" cy="173380"/>
+          </a:xfrm>
+          <a:prstGeom prst="flowChartDecision">
+            <a:avLst/>
+          </a:prstGeom>
+          <a:noFill/>
+          <a:ln w="19050">
+            <a:solidFill>
+              <a:srgbClr val="7030A0"/>
+            </a:solidFill>
+          </a:ln>
+          <a:effectLst/>
+        </p:spPr>
+        <p:style>
+          <a:lnRef idx="1">
+            <a:schemeClr val="accent6"/>
+          </a:lnRef>
+          <a:fillRef idx="2">
+            <a:schemeClr val="accent6"/>
+          </a:fillRef>
+          <a:effectRef idx="1">
+            <a:schemeClr val="accent6"/>
+          </a:effectRef>
+          <a:fontRef idx="minor">
+            <a:schemeClr val="dk1"/>
+          </a:fontRef>
+        </p:style>
+        <p:txBody>
+          <a:bodyPr rtlCol="0" anchor="ctr"/>
+          <a:lstStyle/>
+          <a:p>
+            <a:pPr algn="ctr"/>
+            <a:endParaRPr lang="en-US" sz="1050"/>
+          </a:p>
+        </p:txBody>
+      </p:sp>
+      <p:cxnSp>
+        <p:nvCxnSpPr>
+          <p:cNvPr id="77" name="Elbow Connector 29">
+            <a:extLst>
+              <a:ext uri="{FF2B5EF4-FFF2-40B4-BE49-F238E27FC236}">
+                <a16:creationId xmlns:a16="http://schemas.microsoft.com/office/drawing/2014/main" id="{741E281A-D77E-450D-95F4-554D8993FE01}"/>
+              </a:ext>
+            </a:extLst>
+          </p:cNvPr>
+          <p:cNvCxnSpPr>
+            <a:cxnSpLocks/>
+          </p:cNvCxnSpPr>
+          <p:nvPr/>
+        </p:nvCxnSpPr>
+        <p:spPr>
+          <a:xfrm rot="10800000" flipV="1">
+            <a:off x="4419600" y="3969813"/>
+            <a:ext cx="673180" cy="28466"/>
+          </a:xfrm>
+          <a:prstGeom prst="bentConnector3">
+            <a:avLst>
+              <a:gd name="adj1" fmla="val -67"/>
+            </a:avLst>
+          </a:prstGeom>
+          <a:ln w="19050">
+            <a:solidFill>
+              <a:srgbClr val="7030A0"/>
+            </a:solidFill>
+            <a:headEnd type="none" w="med" len="med"/>
+            <a:tailEnd type="arrow" w="med" len="med"/>
+          </a:ln>
+          <a:effectLst/>
+        </p:spPr>
+        <p:style>
+          <a:lnRef idx="1">
+            <a:schemeClr val="accent2"/>
+          </a:lnRef>
+          <a:fillRef idx="2">
+            <a:schemeClr val="accent2"/>
+          </a:fillRef>
+          <a:effectRef idx="1">
+            <a:schemeClr val="accent2"/>
+          </a:effectRef>
+          <a:fontRef idx="minor">
+            <a:schemeClr val="dk1"/>
+          </a:fontRef>
+        </p:style>
+      </p:cxnSp>
+      <p:sp>
+        <p:nvSpPr>
+          <p:cNvPr id="82" name="Rectangle 8">
+            <a:extLst>
+              <a:ext uri="{FF2B5EF4-FFF2-40B4-BE49-F238E27FC236}">
+                <a16:creationId xmlns:a16="http://schemas.microsoft.com/office/drawing/2014/main" id="{CA295839-526B-4037-94D1-FE0CA0E13033}"/>
+              </a:ext>
+            </a:extLst>
+          </p:cNvPr>
+          <p:cNvSpPr/>
+          <p:nvPr/>
+        </p:nvSpPr>
+        <p:spPr>
+          <a:xfrm>
+            <a:off x="3801837" y="3810000"/>
+            <a:ext cx="617763" cy="346760"/>
+          </a:xfrm>
+          <a:prstGeom prst="rect">
+            <a:avLst/>
+          </a:prstGeom>
+          <a:ln w="19050">
+            <a:solidFill>
+              <a:srgbClr val="7030A0"/>
+            </a:solidFill>
+          </a:ln>
+          <a:effectLst/>
+        </p:spPr>
+        <p:style>
+          <a:lnRef idx="1">
+            <a:schemeClr val="accent4"/>
+          </a:lnRef>
+          <a:fillRef idx="2">
+            <a:schemeClr val="accent4"/>
+          </a:fillRef>
+          <a:effectRef idx="1">
+            <a:schemeClr val="accent4"/>
+          </a:effectRef>
+          <a:fontRef idx="minor">
+            <a:schemeClr val="dk1"/>
+          </a:fontRef>
+        </p:style>
+        <p:txBody>
+          <a:bodyPr rtlCol="0" anchor="ctr"/>
+          <a:lstStyle/>
+          <a:p>
+            <a:pPr algn="ctr"/>
+            <a:r>
+              <a:rPr lang="en-US" sz="1050" dirty="0">
+                <a:solidFill>
+                  <a:srgbClr val="7030A0"/>
+                </a:solidFill>
+              </a:rPr>
+              <a:t>Subject</a:t>
+            </a:r>
+            <a:endParaRPr lang="en-SG" sz="1050" dirty="0">
+              <a:solidFill>
+                <a:srgbClr val="7030A0"/>
+              </a:solidFill>
+            </a:endParaRPr>
+          </a:p>
+        </p:txBody>
+      </p:sp>
+      <p:sp>
+        <p:nvSpPr>
+          <p:cNvPr id="87" name="TextBox 86">
+            <a:extLst>
+              <a:ext uri="{FF2B5EF4-FFF2-40B4-BE49-F238E27FC236}">
+                <a16:creationId xmlns:a16="http://schemas.microsoft.com/office/drawing/2014/main" id="{56124A3E-1574-4173-9752-7849D8899D54}"/>
+              </a:ext>
+            </a:extLst>
+          </p:cNvPr>
+          <p:cNvSpPr txBox="1"/>
+          <p:nvPr/>
+        </p:nvSpPr>
+        <p:spPr>
+          <a:xfrm>
+            <a:off x="4382743" y="4038600"/>
+            <a:ext cx="189257" cy="178683"/>
+          </a:xfrm>
+          <a:prstGeom prst="rect">
+            <a:avLst/>
+          </a:prstGeom>
+          <a:noFill/>
+        </p:spPr>
+        <p:txBody>
+          <a:bodyPr wrap="square" lIns="0" tIns="0" rIns="0" bIns="0" rtlCol="0">
+            <a:noAutofit/>
+          </a:bodyPr>
+          <a:lstStyle/>
+          <a:p>
+            <a:pPr algn="ctr"/>
+            <a:r>
+              <a:rPr lang="en-US" sz="1100" dirty="0">
+                <a:solidFill>
+                  <a:srgbClr val="7030A0"/>
+                </a:solidFill>
+              </a:rPr>
+              <a:t>*</a:t>
             </a:r>
             <a:endParaRPr lang="en-SG" sz="1100" dirty="0">
               <a:solidFill>
@@ -5763,13 +6095,6 @@
   <p:clrMapOvr>
     <a:masterClrMapping/>
   </p:clrMapOvr>
-  <p:timing>
-    <p:tnLst>
-      <p:par>
-        <p:cTn id="1" dur="indefinite" restart="never" nodeType="tmRoot"/>
-      </p:par>
-    </p:tnLst>
-  </p:timing>
 </p:sld>
 </file>
 

</xml_diff>

<commit_message>
Update documentation and add new images
</commit_message>
<xml_diff>
--- a/docs/diagrams/ModelComponentClassDiagram.pptx
+++ b/docs/diagrams/ModelComponentClassDiagram.pptx
@@ -208,7 +208,7 @@
           <a:p>
             <a:fld id="{F5CC4B3F-88C1-4FFA-B1B6-F41C21DC6924}" type="datetimeFigureOut">
               <a:rPr lang="en-US" smtClean="0"/>
-              <a:t>4/4/2018</a:t>
+              <a:t>4/6/2018</a:t>
             </a:fld>
             <a:endParaRPr lang="en-US"/>
           </a:p>
@@ -654,7 +654,7 @@
           <a:p>
             <a:fld id="{78C97017-6FC3-485B-9764-EAC9E56C1D49}" type="datetimeFigureOut">
               <a:rPr lang="en-US" smtClean="0"/>
-              <a:t>4/4/2018</a:t>
+              <a:t>4/6/2018</a:t>
             </a:fld>
             <a:endParaRPr lang="en-US"/>
           </a:p>
@@ -822,7 +822,7 @@
           <a:p>
             <a:fld id="{78C97017-6FC3-485B-9764-EAC9E56C1D49}" type="datetimeFigureOut">
               <a:rPr lang="en-US" smtClean="0"/>
-              <a:t>4/4/2018</a:t>
+              <a:t>4/6/2018</a:t>
             </a:fld>
             <a:endParaRPr lang="en-US"/>
           </a:p>
@@ -1000,7 +1000,7 @@
           <a:p>
             <a:fld id="{78C97017-6FC3-485B-9764-EAC9E56C1D49}" type="datetimeFigureOut">
               <a:rPr lang="en-US" smtClean="0"/>
-              <a:t>4/4/2018</a:t>
+              <a:t>4/6/2018</a:t>
             </a:fld>
             <a:endParaRPr lang="en-US"/>
           </a:p>
@@ -1168,7 +1168,7 @@
           <a:p>
             <a:fld id="{78C97017-6FC3-485B-9764-EAC9E56C1D49}" type="datetimeFigureOut">
               <a:rPr lang="en-US" smtClean="0"/>
-              <a:t>4/4/2018</a:t>
+              <a:t>4/6/2018</a:t>
             </a:fld>
             <a:endParaRPr lang="en-US"/>
           </a:p>
@@ -1413,7 +1413,7 @@
           <a:p>
             <a:fld id="{78C97017-6FC3-485B-9764-EAC9E56C1D49}" type="datetimeFigureOut">
               <a:rPr lang="en-US" smtClean="0"/>
-              <a:t>4/4/2018</a:t>
+              <a:t>4/6/2018</a:t>
             </a:fld>
             <a:endParaRPr lang="en-US"/>
           </a:p>
@@ -1698,7 +1698,7 @@
           <a:p>
             <a:fld id="{78C97017-6FC3-485B-9764-EAC9E56C1D49}" type="datetimeFigureOut">
               <a:rPr lang="en-US" smtClean="0"/>
-              <a:t>4/4/2018</a:t>
+              <a:t>4/6/2018</a:t>
             </a:fld>
             <a:endParaRPr lang="en-US"/>
           </a:p>
@@ -2117,7 +2117,7 @@
           <a:p>
             <a:fld id="{78C97017-6FC3-485B-9764-EAC9E56C1D49}" type="datetimeFigureOut">
               <a:rPr lang="en-US" smtClean="0"/>
-              <a:t>4/4/2018</a:t>
+              <a:t>4/6/2018</a:t>
             </a:fld>
             <a:endParaRPr lang="en-US"/>
           </a:p>
@@ -2234,7 +2234,7 @@
           <a:p>
             <a:fld id="{78C97017-6FC3-485B-9764-EAC9E56C1D49}" type="datetimeFigureOut">
               <a:rPr lang="en-US" smtClean="0"/>
-              <a:t>4/4/2018</a:t>
+              <a:t>4/6/2018</a:t>
             </a:fld>
             <a:endParaRPr lang="en-US"/>
           </a:p>
@@ -2329,7 +2329,7 @@
           <a:p>
             <a:fld id="{78C97017-6FC3-485B-9764-EAC9E56C1D49}" type="datetimeFigureOut">
               <a:rPr lang="en-US" smtClean="0"/>
-              <a:t>4/4/2018</a:t>
+              <a:t>4/6/2018</a:t>
             </a:fld>
             <a:endParaRPr lang="en-US"/>
           </a:p>
@@ -2604,7 +2604,7 @@
           <a:p>
             <a:fld id="{78C97017-6FC3-485B-9764-EAC9E56C1D49}" type="datetimeFigureOut">
               <a:rPr lang="en-US" smtClean="0"/>
-              <a:t>4/4/2018</a:t>
+              <a:t>4/6/2018</a:t>
             </a:fld>
             <a:endParaRPr lang="en-US"/>
           </a:p>
@@ -2856,7 +2856,7 @@
           <a:p>
             <a:fld id="{78C97017-6FC3-485B-9764-EAC9E56C1D49}" type="datetimeFigureOut">
               <a:rPr lang="en-US" smtClean="0"/>
-              <a:t>4/4/2018</a:t>
+              <a:t>4/6/2018</a:t>
             </a:fld>
             <a:endParaRPr lang="en-US"/>
           </a:p>
@@ -3067,7 +3067,7 @@
           <a:p>
             <a:fld id="{78C97017-6FC3-485B-9764-EAC9E56C1D49}" type="datetimeFigureOut">
               <a:rPr lang="en-US" smtClean="0"/>
-              <a:t>4/4/2018</a:t>
+              <a:t>4/6/2018</a:t>
             </a:fld>
             <a:endParaRPr lang="en-US"/>
           </a:p>
@@ -3450,7 +3450,7 @@
         </p:nvSpPr>
         <p:spPr>
           <a:xfrm>
-            <a:off x="1119865" y="1066800"/>
+            <a:off x="1118691" y="1102910"/>
             <a:ext cx="7543800" cy="4566280"/>
           </a:xfrm>
           <a:prstGeom prst="roundRect">
@@ -7021,6 +7021,118 @@
           </a:p>
         </p:txBody>
       </p:sp>
+      <p:sp>
+        <p:nvSpPr>
+          <p:cNvPr id="89" name="Rectangle 8">
+            <a:extLst>
+              <a:ext uri="{FF2B5EF4-FFF2-40B4-BE49-F238E27FC236}">
+                <a16:creationId xmlns:a16="http://schemas.microsoft.com/office/drawing/2014/main" id="{28C87268-5BC4-4E16-B39F-5050009BA3E4}"/>
+              </a:ext>
+            </a:extLst>
+          </p:cNvPr>
+          <p:cNvSpPr/>
+          <p:nvPr/>
+        </p:nvSpPr>
+        <p:spPr>
+          <a:xfrm>
+            <a:off x="7721701" y="4175313"/>
+            <a:ext cx="708186" cy="285783"/>
+          </a:xfrm>
+          <a:prstGeom prst="rect">
+            <a:avLst/>
+          </a:prstGeom>
+          <a:ln w="19050">
+            <a:solidFill>
+              <a:srgbClr val="7030A0"/>
+            </a:solidFill>
+          </a:ln>
+          <a:effectLst/>
+        </p:spPr>
+        <p:style>
+          <a:lnRef idx="1">
+            <a:schemeClr val="accent4"/>
+          </a:lnRef>
+          <a:fillRef idx="2">
+            <a:schemeClr val="accent4"/>
+          </a:fillRef>
+          <a:effectRef idx="1">
+            <a:schemeClr val="accent4"/>
+          </a:effectRef>
+          <a:fontRef idx="minor">
+            <a:schemeClr val="dk1"/>
+          </a:fontRef>
+        </p:style>
+        <p:txBody>
+          <a:bodyPr rtlCol="0" anchor="ctr"/>
+          <a:lstStyle/>
+          <a:p>
+            <a:pPr algn="ctr"/>
+            <a:r>
+              <a:rPr lang="en-US" sz="1000" dirty="0">
+                <a:solidFill>
+                  <a:srgbClr val="7030A0"/>
+                </a:solidFill>
+              </a:rPr>
+              <a:t>Timetable</a:t>
+            </a:r>
+            <a:endParaRPr lang="en-SG" sz="1000" dirty="0">
+              <a:solidFill>
+                <a:srgbClr val="7030A0"/>
+              </a:solidFill>
+            </a:endParaRPr>
+          </a:p>
+        </p:txBody>
+      </p:sp>
+      <p:cxnSp>
+        <p:nvCxnSpPr>
+          <p:cNvPr id="102" name="Elbow Connector 85">
+            <a:extLst>
+              <a:ext uri="{FF2B5EF4-FFF2-40B4-BE49-F238E27FC236}">
+                <a16:creationId xmlns:a16="http://schemas.microsoft.com/office/drawing/2014/main" id="{4649D8A7-8FDD-4471-B372-352A35C4D7AB}"/>
+              </a:ext>
+            </a:extLst>
+          </p:cNvPr>
+          <p:cNvCxnSpPr>
+            <a:cxnSpLocks/>
+            <a:stCxn id="78" idx="3"/>
+            <a:endCxn id="89" idx="1"/>
+          </p:cNvCxnSpPr>
+          <p:nvPr/>
+        </p:nvCxnSpPr>
+        <p:spPr>
+          <a:xfrm>
+            <a:off x="7277995" y="3034891"/>
+            <a:ext cx="443706" cy="1283314"/>
+          </a:xfrm>
+          <a:prstGeom prst="bentConnector3">
+            <a:avLst>
+              <a:gd name="adj1" fmla="val 50000"/>
+            </a:avLst>
+          </a:prstGeom>
+          <a:ln w="19050">
+            <a:solidFill>
+              <a:srgbClr val="7030A0"/>
+            </a:solidFill>
+            <a:headEnd type="none" w="med" len="med"/>
+            <a:tailEnd type="arrow" w="med" len="med"/>
+          </a:ln>
+          <a:effectLst/>
+        </p:spPr>
+        <p:style>
+          <a:lnRef idx="1">
+            <a:schemeClr val="accent2"/>
+          </a:lnRef>
+          <a:fillRef idx="2">
+            <a:schemeClr val="accent2"/>
+          </a:fillRef>
+          <a:effectRef idx="1">
+            <a:schemeClr val="accent2"/>
+          </a:effectRef>
+          <a:fontRef idx="minor">
+            <a:schemeClr val="dk1"/>
+          </a:fontRef>
+        </p:style>
+      </p:cxnSp>
     </p:spTree>
     <p:extLst>
       <p:ext uri="{BB962C8B-B14F-4D97-AF65-F5344CB8AC3E}">

</xml_diff>

<commit_message>
Update UG and DG for v1.4
</commit_message>
<xml_diff>
--- a/docs/diagrams/ModelComponentClassDiagram.pptx
+++ b/docs/diagrams/ModelComponentClassDiagram.pptx
@@ -208,7 +208,7 @@
           <a:p>
             <a:fld id="{F5CC4B3F-88C1-4FFA-B1B6-F41C21DC6924}" type="datetimeFigureOut">
               <a:rPr lang="en-US" smtClean="0"/>
-              <a:t>3/26/2018</a:t>
+              <a:t>06-Apr-18</a:t>
             </a:fld>
             <a:endParaRPr lang="en-US"/>
           </a:p>
@@ -654,7 +654,7 @@
           <a:p>
             <a:fld id="{78C97017-6FC3-485B-9764-EAC9E56C1D49}" type="datetimeFigureOut">
               <a:rPr lang="en-US" smtClean="0"/>
-              <a:t>3/26/2018</a:t>
+              <a:t>06-Apr-18</a:t>
             </a:fld>
             <a:endParaRPr lang="en-US"/>
           </a:p>
@@ -822,7 +822,7 @@
           <a:p>
             <a:fld id="{78C97017-6FC3-485B-9764-EAC9E56C1D49}" type="datetimeFigureOut">
               <a:rPr lang="en-US" smtClean="0"/>
-              <a:t>3/26/2018</a:t>
+              <a:t>06-Apr-18</a:t>
             </a:fld>
             <a:endParaRPr lang="en-US"/>
           </a:p>
@@ -1000,7 +1000,7 @@
           <a:p>
             <a:fld id="{78C97017-6FC3-485B-9764-EAC9E56C1D49}" type="datetimeFigureOut">
               <a:rPr lang="en-US" smtClean="0"/>
-              <a:t>3/26/2018</a:t>
+              <a:t>06-Apr-18</a:t>
             </a:fld>
             <a:endParaRPr lang="en-US"/>
           </a:p>
@@ -1168,7 +1168,7 @@
           <a:p>
             <a:fld id="{78C97017-6FC3-485B-9764-EAC9E56C1D49}" type="datetimeFigureOut">
               <a:rPr lang="en-US" smtClean="0"/>
-              <a:t>3/26/2018</a:t>
+              <a:t>06-Apr-18</a:t>
             </a:fld>
             <a:endParaRPr lang="en-US"/>
           </a:p>
@@ -1413,7 +1413,7 @@
           <a:p>
             <a:fld id="{78C97017-6FC3-485B-9764-EAC9E56C1D49}" type="datetimeFigureOut">
               <a:rPr lang="en-US" smtClean="0"/>
-              <a:t>3/26/2018</a:t>
+              <a:t>06-Apr-18</a:t>
             </a:fld>
             <a:endParaRPr lang="en-US"/>
           </a:p>
@@ -1698,7 +1698,7 @@
           <a:p>
             <a:fld id="{78C97017-6FC3-485B-9764-EAC9E56C1D49}" type="datetimeFigureOut">
               <a:rPr lang="en-US" smtClean="0"/>
-              <a:t>3/26/2018</a:t>
+              <a:t>06-Apr-18</a:t>
             </a:fld>
             <a:endParaRPr lang="en-US"/>
           </a:p>
@@ -2117,7 +2117,7 @@
           <a:p>
             <a:fld id="{78C97017-6FC3-485B-9764-EAC9E56C1D49}" type="datetimeFigureOut">
               <a:rPr lang="en-US" smtClean="0"/>
-              <a:t>3/26/2018</a:t>
+              <a:t>06-Apr-18</a:t>
             </a:fld>
             <a:endParaRPr lang="en-US"/>
           </a:p>
@@ -2234,7 +2234,7 @@
           <a:p>
             <a:fld id="{78C97017-6FC3-485B-9764-EAC9E56C1D49}" type="datetimeFigureOut">
               <a:rPr lang="en-US" smtClean="0"/>
-              <a:t>3/26/2018</a:t>
+              <a:t>06-Apr-18</a:t>
             </a:fld>
             <a:endParaRPr lang="en-US"/>
           </a:p>
@@ -2329,7 +2329,7 @@
           <a:p>
             <a:fld id="{78C97017-6FC3-485B-9764-EAC9E56C1D49}" type="datetimeFigureOut">
               <a:rPr lang="en-US" smtClean="0"/>
-              <a:t>3/26/2018</a:t>
+              <a:t>06-Apr-18</a:t>
             </a:fld>
             <a:endParaRPr lang="en-US"/>
           </a:p>
@@ -2604,7 +2604,7 @@
           <a:p>
             <a:fld id="{78C97017-6FC3-485B-9764-EAC9E56C1D49}" type="datetimeFigureOut">
               <a:rPr lang="en-US" smtClean="0"/>
-              <a:t>3/26/2018</a:t>
+              <a:t>06-Apr-18</a:t>
             </a:fld>
             <a:endParaRPr lang="en-US"/>
           </a:p>
@@ -2856,7 +2856,7 @@
           <a:p>
             <a:fld id="{78C97017-6FC3-485B-9764-EAC9E56C1D49}" type="datetimeFigureOut">
               <a:rPr lang="en-US" smtClean="0"/>
-              <a:t>3/26/2018</a:t>
+              <a:t>06-Apr-18</a:t>
             </a:fld>
             <a:endParaRPr lang="en-US"/>
           </a:p>
@@ -3067,7 +3067,7 @@
           <a:p>
             <a:fld id="{78C97017-6FC3-485B-9764-EAC9E56C1D49}" type="datetimeFigureOut">
               <a:rPr lang="en-US" smtClean="0"/>
-              <a:t>3/26/2018</a:t>
+              <a:t>06-Apr-18</a:t>
             </a:fld>
             <a:endParaRPr lang="en-US"/>
           </a:p>
@@ -3450,8 +3450,8 @@
         </p:nvSpPr>
         <p:spPr>
           <a:xfrm>
-            <a:off x="533400" y="1676400"/>
-            <a:ext cx="8153400" cy="2997200"/>
+            <a:off x="533400" y="1222060"/>
+            <a:ext cx="8153400" cy="4182420"/>
           </a:xfrm>
           <a:prstGeom prst="roundRect">
             <a:avLst>
@@ -3511,7 +3511,7 @@
         </p:nvSpPr>
         <p:spPr>
           <a:xfrm>
-            <a:off x="2290715" y="3107640"/>
+            <a:off x="2290715" y="2946507"/>
             <a:ext cx="1093635" cy="346760"/>
           </a:xfrm>
           <a:prstGeom prst="rect">
@@ -3570,8 +3570,8 @@
         </p:nvSpPr>
         <p:spPr>
           <a:xfrm rot="16200000">
-            <a:off x="1097498" y="2817887"/>
-            <a:ext cx="1093635" cy="346760"/>
+            <a:off x="1055293" y="2860092"/>
+            <a:ext cx="1178046" cy="346760"/>
           </a:xfrm>
           <a:prstGeom prst="rect">
             <a:avLst/>
@@ -3625,19 +3625,20 @@
         <p:nvCxnSpPr>
           <p:cNvPr id="107" name="Elbow Connector 106"/>
           <p:cNvCxnSpPr>
-            <a:stCxn id="9" idx="1"/>
+            <a:cxnSpLocks/>
+            <a:stCxn id="9" idx="3"/>
+            <a:endCxn id="62" idx="0"/>
           </p:cNvCxnSpPr>
           <p:nvPr/>
         </p:nvCxnSpPr>
         <p:spPr>
-          <a:xfrm rot="5400000" flipH="1" flipV="1">
-            <a:off x="3773600" y="1030109"/>
-            <a:ext cx="378691" cy="4637261"/>
-          </a:xfrm>
-          <a:prstGeom prst="bentConnector4">
+          <a:xfrm rot="16200000" flipH="1">
+            <a:off x="3681401" y="407363"/>
+            <a:ext cx="362817" cy="4436989"/>
+          </a:xfrm>
+          <a:prstGeom prst="bentConnector3">
             <a:avLst>
-              <a:gd name="adj1" fmla="val -101829"/>
-              <a:gd name="adj2" fmla="val 99976"/>
+              <a:gd name="adj1" fmla="val -261707"/>
             </a:avLst>
           </a:prstGeom>
           <a:ln w="19050">
@@ -3673,8 +3674,8 @@
         </p:nvSpPr>
         <p:spPr>
           <a:xfrm rot="16200000">
-            <a:off x="369737" y="2810402"/>
-            <a:ext cx="1093635" cy="346760"/>
+            <a:off x="327532" y="2852607"/>
+            <a:ext cx="1178046" cy="346760"/>
           </a:xfrm>
           <a:prstGeom prst="rect">
             <a:avLst/>
@@ -3793,7 +3794,7 @@
         </p:nvCxnSpPr>
         <p:spPr>
           <a:xfrm>
-            <a:off x="2069905" y="3275736"/>
+            <a:off x="2069905" y="3114603"/>
             <a:ext cx="220810" cy="5284"/>
           </a:xfrm>
           <a:prstGeom prst="straightConnector1">
@@ -3915,7 +3916,7 @@
         </p:nvSpPr>
         <p:spPr>
           <a:xfrm>
-            <a:off x="1833857" y="3189046"/>
+            <a:off x="1833857" y="3027913"/>
             <a:ext cx="236048" cy="173380"/>
           </a:xfrm>
           <a:prstGeom prst="flowChartDecision">
@@ -3960,7 +3961,7 @@
         </p:nvSpPr>
         <p:spPr>
           <a:xfrm>
-            <a:off x="2293025" y="2576620"/>
+            <a:off x="2293025" y="2515762"/>
             <a:ext cx="1093635" cy="346760"/>
           </a:xfrm>
           <a:prstGeom prst="rect">
@@ -4019,7 +4020,7 @@
         </p:nvCxnSpPr>
         <p:spPr>
           <a:xfrm>
-            <a:off x="2072215" y="2744716"/>
+            <a:off x="2072215" y="2683858"/>
             <a:ext cx="220810" cy="5284"/>
           </a:xfrm>
           <a:prstGeom prst="straightConnector1">
@@ -4057,7 +4058,7 @@
         </p:nvSpPr>
         <p:spPr>
           <a:xfrm>
-            <a:off x="1836167" y="2658026"/>
+            <a:off x="1836167" y="2597168"/>
             <a:ext cx="236048" cy="173380"/>
           </a:xfrm>
           <a:prstGeom prst="flowChartDecision">
@@ -4158,7 +4159,7 @@
         </p:nvSpPr>
         <p:spPr>
           <a:xfrm>
-            <a:off x="3397838" y="2623191"/>
+            <a:off x="3397838" y="2562333"/>
             <a:ext cx="236048" cy="173380"/>
           </a:xfrm>
           <a:prstGeom prst="flowChartDecision">
@@ -4208,8 +4209,8 @@
         </p:nvCxnSpPr>
         <p:spPr>
           <a:xfrm>
-            <a:off x="3633886" y="2709881"/>
-            <a:ext cx="266666" cy="260070"/>
+            <a:off x="3633886" y="2649023"/>
+            <a:ext cx="266666" cy="320928"/>
           </a:xfrm>
           <a:prstGeom prst="bentConnector3">
             <a:avLst/>
@@ -4298,15 +4299,15 @@
         <p:nvCxnSpPr>
           <p:cNvPr id="59" name="Elbow Connector 58"/>
           <p:cNvCxnSpPr>
+            <a:cxnSpLocks/>
             <a:stCxn id="51" idx="3"/>
-            <a:endCxn id="57" idx="1"/>
           </p:cNvCxnSpPr>
           <p:nvPr/>
         </p:nvCxnSpPr>
         <p:spPr>
           <a:xfrm flipV="1">
-            <a:off x="3633886" y="2403149"/>
-            <a:ext cx="256977" cy="306732"/>
+            <a:off x="3633886" y="2405887"/>
+            <a:ext cx="261875" cy="243136"/>
           </a:xfrm>
           <a:prstGeom prst="bentConnector3">
             <a:avLst>
@@ -4629,7 +4630,7 @@
         </p:nvSpPr>
         <p:spPr>
           <a:xfrm>
-            <a:off x="7125932" y="2031013"/>
+            <a:off x="7125932" y="1337974"/>
             <a:ext cx="1470060" cy="285783"/>
           </a:xfrm>
           <a:prstGeom prst="rect">
@@ -4735,7 +4736,7 @@
         </p:nvCxnSpPr>
         <p:spPr>
           <a:xfrm rot="5400000" flipH="1" flipV="1">
-            <a:off x="6813511" y="2269125"/>
+            <a:off x="6813511" y="1576086"/>
             <a:ext cx="407641" cy="217202"/>
           </a:xfrm>
           <a:prstGeom prst="bentConnector2">
@@ -4773,7 +4774,7 @@
         </p:nvSpPr>
         <p:spPr>
           <a:xfrm>
-            <a:off x="7125932" y="2353991"/>
+            <a:off x="7125932" y="1660952"/>
             <a:ext cx="1470060" cy="285783"/>
           </a:xfrm>
           <a:prstGeom prst="rect">
@@ -4833,8 +4834,8 @@
         </p:nvCxnSpPr>
         <p:spPr>
           <a:xfrm flipV="1">
-            <a:off x="6691530" y="2496883"/>
-            <a:ext cx="434402" cy="487208"/>
+            <a:off x="6691530" y="1803844"/>
+            <a:ext cx="434402" cy="1180247"/>
           </a:xfrm>
           <a:prstGeom prst="bentConnector3">
             <a:avLst/>
@@ -4871,7 +4872,7 @@
         </p:nvSpPr>
         <p:spPr>
           <a:xfrm>
-            <a:off x="7125932" y="2676969"/>
+            <a:off x="7125932" y="1983930"/>
             <a:ext cx="1470060" cy="285783"/>
           </a:xfrm>
           <a:prstGeom prst="rect">
@@ -4931,8 +4932,8 @@
         </p:nvCxnSpPr>
         <p:spPr>
           <a:xfrm flipV="1">
-            <a:off x="6691530" y="2819861"/>
-            <a:ext cx="434402" cy="164230"/>
+            <a:off x="6691530" y="2126822"/>
+            <a:ext cx="434402" cy="857269"/>
           </a:xfrm>
           <a:prstGeom prst="bentConnector3">
             <a:avLst/>
@@ -4969,7 +4970,7 @@
         </p:nvSpPr>
         <p:spPr>
           <a:xfrm>
-            <a:off x="7125931" y="2999946"/>
+            <a:off x="7125931" y="2306907"/>
             <a:ext cx="1478517" cy="285783"/>
           </a:xfrm>
           <a:prstGeom prst="rect">
@@ -5028,7 +5029,7 @@
         </p:nvCxnSpPr>
         <p:spPr>
           <a:xfrm rot="16200000" flipH="1">
-            <a:off x="6686425" y="2703332"/>
+            <a:off x="6686425" y="2010293"/>
             <a:ext cx="661810" cy="217202"/>
           </a:xfrm>
           <a:prstGeom prst="bentConnector2">
@@ -5062,14 +5063,16 @@
         <p:nvCxnSpPr>
           <p:cNvPr id="97" name="Elbow Connector 63"/>
           <p:cNvCxnSpPr>
+            <a:cxnSpLocks/>
             <a:stCxn id="99" idx="3"/>
+            <a:endCxn id="46" idx="0"/>
           </p:cNvCxnSpPr>
           <p:nvPr/>
         </p:nvCxnSpPr>
         <p:spPr>
           <a:xfrm rot="16200000" flipH="1">
-            <a:off x="2692856" y="2434631"/>
-            <a:ext cx="293825" cy="1"/>
+            <a:off x="2725784" y="2401703"/>
+            <a:ext cx="228042" cy="75"/>
           </a:xfrm>
           <a:prstGeom prst="bentConnector3">
             <a:avLst>
@@ -5227,8 +5230,8 @@
           <p:nvPr/>
         </p:nvSpPr>
         <p:spPr>
-          <a:xfrm rot="16200000">
-            <a:off x="5941047" y="3535505"/>
+          <a:xfrm rot="5400000">
+            <a:off x="5753286" y="1757504"/>
             <a:ext cx="881018" cy="261610"/>
           </a:xfrm>
           <a:prstGeom prst="rect">
@@ -5267,7 +5270,7 @@
         </p:nvSpPr>
         <p:spPr>
           <a:xfrm>
-            <a:off x="1470936" y="4188691"/>
+            <a:off x="1470935" y="4911040"/>
             <a:ext cx="1066800" cy="346760"/>
           </a:xfrm>
           <a:prstGeom prst="rect">
@@ -5334,6 +5337,7 @@
         <p:nvCxnSpPr>
           <p:cNvPr id="124" name="Elbow Connector 122"/>
           <p:cNvCxnSpPr>
+            <a:cxnSpLocks/>
             <a:stCxn id="119" idx="1"/>
             <a:endCxn id="122" idx="1"/>
           </p:cNvCxnSpPr>
@@ -5341,8 +5345,8 @@
         </p:nvCxnSpPr>
         <p:spPr>
           <a:xfrm rot="16200000" flipH="1">
-            <a:off x="778010" y="3669144"/>
-            <a:ext cx="831471" cy="554381"/>
+            <a:off x="459040" y="4072525"/>
+            <a:ext cx="1469410" cy="554380"/>
           </a:xfrm>
           <a:prstGeom prst="bentConnector2">
             <a:avLst/>
@@ -5376,18 +5380,20 @@
         <p:nvCxnSpPr>
           <p:cNvPr id="50" name="Elbow Connector 49"/>
           <p:cNvCxnSpPr>
-            <a:stCxn id="62" idx="0"/>
+            <a:cxnSpLocks/>
             <a:endCxn id="57" idx="3"/>
           </p:cNvCxnSpPr>
           <p:nvPr/>
         </p:nvCxnSpPr>
         <p:spPr>
-          <a:xfrm rot="16200000" flipV="1">
-            <a:off x="5362511" y="2088471"/>
-            <a:ext cx="404117" cy="1033473"/>
-          </a:xfrm>
-          <a:prstGeom prst="bentConnector2">
-            <a:avLst/>
+          <a:xfrm rot="10800000">
+            <a:off x="5047832" y="2403150"/>
+            <a:ext cx="837114" cy="404117"/>
+          </a:xfrm>
+          <a:prstGeom prst="bentConnector3">
+            <a:avLst>
+              <a:gd name="adj1" fmla="val -823"/>
+            </a:avLst>
           </a:prstGeom>
           <a:ln w="19050">
             <a:solidFill>
@@ -5616,7 +5622,7 @@
         </p:nvSpPr>
         <p:spPr>
           <a:xfrm>
-            <a:off x="2101458" y="2513438"/>
+            <a:off x="2101458" y="2438400"/>
             <a:ext cx="189257" cy="178683"/>
           </a:xfrm>
           <a:prstGeom prst="rect">
@@ -5655,7 +5661,7 @@
         </p:nvSpPr>
         <p:spPr>
           <a:xfrm>
-            <a:off x="2069905" y="3335250"/>
+            <a:off x="2069905" y="3174117"/>
             <a:ext cx="189257" cy="178683"/>
           </a:xfrm>
           <a:prstGeom prst="rect">
@@ -5739,7 +5745,7 @@
         </p:nvSpPr>
         <p:spPr>
           <a:xfrm>
-            <a:off x="7125932" y="3321017"/>
+            <a:off x="7125932" y="2627978"/>
             <a:ext cx="1470060" cy="285783"/>
           </a:xfrm>
           <a:prstGeom prst="rect">
@@ -5804,7 +5810,7 @@
         </p:nvCxnSpPr>
         <p:spPr>
           <a:xfrm rot="16200000" flipH="1">
-            <a:off x="6733266" y="3071243"/>
+            <a:off x="6733266" y="2378204"/>
             <a:ext cx="568132" cy="217200"/>
           </a:xfrm>
           <a:prstGeom prst="bentConnector2">
@@ -5848,7 +5854,7 @@
         </p:nvSpPr>
         <p:spPr>
           <a:xfrm>
-            <a:off x="7125932" y="3642088"/>
+            <a:off x="7125932" y="2949049"/>
             <a:ext cx="1470060" cy="285783"/>
           </a:xfrm>
           <a:prstGeom prst="rect">
@@ -5910,7 +5916,7 @@
         </p:nvSpPr>
         <p:spPr>
           <a:xfrm>
-            <a:off x="7125931" y="3963159"/>
+            <a:off x="7125931" y="3270120"/>
             <a:ext cx="1470060" cy="285783"/>
           </a:xfrm>
           <a:prstGeom prst="rect">
@@ -5969,13 +5975,14 @@
           </p:cNvPr>
           <p:cNvCxnSpPr>
             <a:cxnSpLocks/>
+            <a:endCxn id="71" idx="1"/>
           </p:cNvCxnSpPr>
           <p:nvPr/>
         </p:nvCxnSpPr>
         <p:spPr>
           <a:xfrm rot="16200000" flipH="1">
-            <a:off x="6733264" y="3390597"/>
-            <a:ext cx="568132" cy="217200"/>
+            <a:off x="6799477" y="2765486"/>
+            <a:ext cx="435708" cy="217201"/>
           </a:xfrm>
           <a:prstGeom prst="bentConnector2">
             <a:avLst/>
@@ -6015,13 +6022,14 @@
           </p:cNvPr>
           <p:cNvCxnSpPr>
             <a:cxnSpLocks/>
+            <a:endCxn id="73" idx="1"/>
           </p:cNvCxnSpPr>
           <p:nvPr/>
         </p:nvCxnSpPr>
         <p:spPr>
           <a:xfrm rot="16200000" flipH="1">
-            <a:off x="6735298" y="3692640"/>
-            <a:ext cx="568132" cy="217200"/>
+            <a:off x="6790979" y="3078060"/>
+            <a:ext cx="454736" cy="215167"/>
           </a:xfrm>
           <a:prstGeom prst="bentConnector2">
             <a:avLst/>
@@ -6050,6 +6058,1065 @@
           </a:fontRef>
         </p:style>
       </p:cxnSp>
+      <p:sp>
+        <p:nvSpPr>
+          <p:cNvPr id="89" name="Rectangle 8">
+            <a:extLst>
+              <a:ext uri="{FF2B5EF4-FFF2-40B4-BE49-F238E27FC236}">
+                <a16:creationId xmlns:a16="http://schemas.microsoft.com/office/drawing/2014/main" id="{8AC14270-DE5F-4C7B-81FE-3082CB0808EB}"/>
+              </a:ext>
+            </a:extLst>
+          </p:cNvPr>
+          <p:cNvSpPr/>
+          <p:nvPr/>
+        </p:nvSpPr>
+        <p:spPr>
+          <a:xfrm>
+            <a:off x="2295140" y="3400848"/>
+            <a:ext cx="1107123" cy="346760"/>
+          </a:xfrm>
+          <a:prstGeom prst="rect">
+            <a:avLst/>
+          </a:prstGeom>
+          <a:ln w="19050">
+            <a:solidFill>
+              <a:srgbClr val="7030A0"/>
+            </a:solidFill>
+          </a:ln>
+          <a:effectLst/>
+        </p:spPr>
+        <p:style>
+          <a:lnRef idx="1">
+            <a:schemeClr val="accent4"/>
+          </a:lnRef>
+          <a:fillRef idx="2">
+            <a:schemeClr val="accent4"/>
+          </a:fillRef>
+          <a:effectRef idx="1">
+            <a:schemeClr val="accent4"/>
+          </a:effectRef>
+          <a:fontRef idx="minor">
+            <a:schemeClr val="dk1"/>
+          </a:fontRef>
+        </p:style>
+        <p:txBody>
+          <a:bodyPr rtlCol="0" anchor="ctr"/>
+          <a:lstStyle/>
+          <a:p>
+            <a:pPr algn="ctr"/>
+            <a:r>
+              <a:rPr lang="en-US" sz="1050" dirty="0">
+                <a:solidFill>
+                  <a:srgbClr val="7030A0"/>
+                </a:solidFill>
+              </a:rPr>
+              <a:t>Schedule</a:t>
+            </a:r>
+            <a:endParaRPr lang="en-SG" sz="1050" dirty="0">
+              <a:solidFill>
+                <a:srgbClr val="7030A0"/>
+              </a:solidFill>
+            </a:endParaRPr>
+          </a:p>
+        </p:txBody>
+      </p:sp>
+      <p:sp>
+        <p:nvSpPr>
+          <p:cNvPr id="104" name="Rectangle 8">
+            <a:extLst>
+              <a:ext uri="{FF2B5EF4-FFF2-40B4-BE49-F238E27FC236}">
+                <a16:creationId xmlns:a16="http://schemas.microsoft.com/office/drawing/2014/main" id="{895DC183-2B50-46BA-9E9A-346D4B8CE842}"/>
+              </a:ext>
+            </a:extLst>
+          </p:cNvPr>
+          <p:cNvSpPr/>
+          <p:nvPr/>
+        </p:nvSpPr>
+        <p:spPr>
+          <a:xfrm>
+            <a:off x="5707210" y="3654655"/>
+            <a:ext cx="1371600" cy="285783"/>
+          </a:xfrm>
+          <a:prstGeom prst="rect">
+            <a:avLst/>
+          </a:prstGeom>
+          <a:ln w="19050">
+            <a:solidFill>
+              <a:srgbClr val="7030A0"/>
+            </a:solidFill>
+          </a:ln>
+          <a:effectLst/>
+        </p:spPr>
+        <p:style>
+          <a:lnRef idx="1">
+            <a:schemeClr val="accent4"/>
+          </a:lnRef>
+          <a:fillRef idx="2">
+            <a:schemeClr val="accent4"/>
+          </a:fillRef>
+          <a:effectRef idx="1">
+            <a:schemeClr val="accent4"/>
+          </a:effectRef>
+          <a:fontRef idx="minor">
+            <a:schemeClr val="dk1"/>
+          </a:fontRef>
+        </p:style>
+        <p:txBody>
+          <a:bodyPr rtlCol="0" anchor="ctr"/>
+          <a:lstStyle/>
+          <a:p>
+            <a:pPr algn="ctr"/>
+            <a:r>
+              <a:rPr lang="en-US" sz="1050" dirty="0" err="1">
+                <a:solidFill>
+                  <a:srgbClr val="7030A0"/>
+                </a:solidFill>
+              </a:rPr>
+              <a:t>UniqueKey</a:t>
+            </a:r>
+            <a:endParaRPr lang="en-SG" sz="1050" dirty="0">
+              <a:solidFill>
+                <a:srgbClr val="7030A0"/>
+              </a:solidFill>
+            </a:endParaRPr>
+          </a:p>
+        </p:txBody>
+      </p:sp>
+      <p:cxnSp>
+        <p:nvCxnSpPr>
+          <p:cNvPr id="105" name="Elbow Connector 78">
+            <a:extLst>
+              <a:ext uri="{FF2B5EF4-FFF2-40B4-BE49-F238E27FC236}">
+                <a16:creationId xmlns:a16="http://schemas.microsoft.com/office/drawing/2014/main" id="{5C92D93A-CEF1-4C3F-BC75-93639BD03B86}"/>
+              </a:ext>
+            </a:extLst>
+          </p:cNvPr>
+          <p:cNvCxnSpPr>
+            <a:cxnSpLocks/>
+            <a:stCxn id="78" idx="2"/>
+            <a:endCxn id="104" idx="0"/>
+          </p:cNvCxnSpPr>
+          <p:nvPr/>
+        </p:nvCxnSpPr>
+        <p:spPr>
+          <a:xfrm rot="5400000">
+            <a:off x="6191321" y="3272470"/>
+            <a:ext cx="583874" cy="180496"/>
+          </a:xfrm>
+          <a:prstGeom prst="bentConnector3">
+            <a:avLst>
+              <a:gd name="adj1" fmla="val 50000"/>
+            </a:avLst>
+          </a:prstGeom>
+          <a:ln w="19050">
+            <a:solidFill>
+              <a:srgbClr val="7030A0"/>
+            </a:solidFill>
+            <a:headEnd type="none" w="med" len="med"/>
+            <a:tailEnd type="arrow" w="med" len="med"/>
+          </a:ln>
+          <a:effectLst/>
+        </p:spPr>
+        <p:style>
+          <a:lnRef idx="1">
+            <a:schemeClr val="accent2"/>
+          </a:lnRef>
+          <a:fillRef idx="2">
+            <a:schemeClr val="accent2"/>
+          </a:fillRef>
+          <a:effectRef idx="1">
+            <a:schemeClr val="accent2"/>
+          </a:effectRef>
+          <a:fontRef idx="minor">
+            <a:schemeClr val="dk1"/>
+          </a:fontRef>
+        </p:style>
+      </p:cxnSp>
+      <p:sp>
+        <p:nvSpPr>
+          <p:cNvPr id="111" name="Rectangle 8">
+            <a:extLst>
+              <a:ext uri="{FF2B5EF4-FFF2-40B4-BE49-F238E27FC236}">
+                <a16:creationId xmlns:a16="http://schemas.microsoft.com/office/drawing/2014/main" id="{CBEAB1BF-82F4-4BE0-960E-A27ECB39DF1E}"/>
+              </a:ext>
+            </a:extLst>
+          </p:cNvPr>
+          <p:cNvSpPr/>
+          <p:nvPr/>
+        </p:nvSpPr>
+        <p:spPr>
+          <a:xfrm>
+            <a:off x="3890863" y="3394663"/>
+            <a:ext cx="1156969" cy="346760"/>
+          </a:xfrm>
+          <a:prstGeom prst="rect">
+            <a:avLst/>
+          </a:prstGeom>
+          <a:ln w="19050">
+            <a:solidFill>
+              <a:srgbClr val="7030A0"/>
+            </a:solidFill>
+          </a:ln>
+          <a:effectLst/>
+        </p:spPr>
+        <p:style>
+          <a:lnRef idx="1">
+            <a:schemeClr val="accent4"/>
+          </a:lnRef>
+          <a:fillRef idx="2">
+            <a:schemeClr val="accent4"/>
+          </a:fillRef>
+          <a:effectRef idx="1">
+            <a:schemeClr val="accent4"/>
+          </a:effectRef>
+          <a:fontRef idx="minor">
+            <a:schemeClr val="dk1"/>
+          </a:fontRef>
+        </p:style>
+        <p:txBody>
+          <a:bodyPr rtlCol="0" anchor="ctr"/>
+          <a:lstStyle/>
+          <a:p>
+            <a:pPr algn="ctr"/>
+            <a:r>
+              <a:rPr lang="en-US" sz="1050" dirty="0" err="1">
+                <a:solidFill>
+                  <a:srgbClr val="7030A0"/>
+                </a:solidFill>
+              </a:rPr>
+              <a:t>LessonList</a:t>
+            </a:r>
+            <a:endParaRPr lang="en-SG" sz="1050" dirty="0">
+              <a:solidFill>
+                <a:srgbClr val="7030A0"/>
+              </a:solidFill>
+            </a:endParaRPr>
+          </a:p>
+        </p:txBody>
+      </p:sp>
+      <p:cxnSp>
+        <p:nvCxnSpPr>
+          <p:cNvPr id="117" name="Straight Arrow Connector 116">
+            <a:extLst>
+              <a:ext uri="{FF2B5EF4-FFF2-40B4-BE49-F238E27FC236}">
+                <a16:creationId xmlns:a16="http://schemas.microsoft.com/office/drawing/2014/main" id="{2FF7C894-E177-4B2A-8544-5A16049D5806}"/>
+              </a:ext>
+            </a:extLst>
+          </p:cNvPr>
+          <p:cNvCxnSpPr>
+            <a:cxnSpLocks/>
+            <a:stCxn id="121" idx="3"/>
+            <a:endCxn id="89" idx="1"/>
+          </p:cNvCxnSpPr>
+          <p:nvPr/>
+        </p:nvCxnSpPr>
+        <p:spPr>
+          <a:xfrm>
+            <a:off x="2065190" y="3571803"/>
+            <a:ext cx="229950" cy="2425"/>
+          </a:xfrm>
+          <a:prstGeom prst="straightConnector1">
+            <a:avLst/>
+          </a:prstGeom>
+          <a:ln w="19050">
+            <a:solidFill>
+              <a:srgbClr val="7030A0"/>
+            </a:solidFill>
+            <a:headEnd type="none" w="med" len="med"/>
+            <a:tailEnd type="arrow" w="med" len="med"/>
+          </a:ln>
+          <a:effectLst/>
+        </p:spPr>
+        <p:style>
+          <a:lnRef idx="1">
+            <a:schemeClr val="accent2"/>
+          </a:lnRef>
+          <a:fillRef idx="2">
+            <a:schemeClr val="accent2"/>
+          </a:fillRef>
+          <a:effectRef idx="1">
+            <a:schemeClr val="accent2"/>
+          </a:effectRef>
+          <a:fontRef idx="minor">
+            <a:schemeClr val="dk1"/>
+          </a:fontRef>
+        </p:style>
+      </p:cxnSp>
+      <p:sp>
+        <p:nvSpPr>
+          <p:cNvPr id="121" name="Flowchart: Decision 96">
+            <a:extLst>
+              <a:ext uri="{FF2B5EF4-FFF2-40B4-BE49-F238E27FC236}">
+                <a16:creationId xmlns:a16="http://schemas.microsoft.com/office/drawing/2014/main" id="{B1DD5BB4-4202-40DD-95C2-862E25664152}"/>
+              </a:ext>
+            </a:extLst>
+          </p:cNvPr>
+          <p:cNvSpPr/>
+          <p:nvPr/>
+        </p:nvSpPr>
+        <p:spPr>
+          <a:xfrm>
+            <a:off x="1829142" y="3485113"/>
+            <a:ext cx="236048" cy="173380"/>
+          </a:xfrm>
+          <a:prstGeom prst="flowChartDecision">
+            <a:avLst/>
+          </a:prstGeom>
+          <a:noFill/>
+          <a:ln w="19050">
+            <a:solidFill>
+              <a:srgbClr val="7030A0"/>
+            </a:solidFill>
+          </a:ln>
+          <a:effectLst/>
+        </p:spPr>
+        <p:style>
+          <a:lnRef idx="1">
+            <a:schemeClr val="accent6"/>
+          </a:lnRef>
+          <a:fillRef idx="2">
+            <a:schemeClr val="accent6"/>
+          </a:fillRef>
+          <a:effectRef idx="1">
+            <a:schemeClr val="accent6"/>
+          </a:effectRef>
+          <a:fontRef idx="minor">
+            <a:schemeClr val="dk1"/>
+          </a:fontRef>
+        </p:style>
+        <p:txBody>
+          <a:bodyPr rtlCol="0" anchor="ctr"/>
+          <a:lstStyle/>
+          <a:p>
+            <a:pPr algn="ctr"/>
+            <a:endParaRPr lang="en-US" sz="1050"/>
+          </a:p>
+        </p:txBody>
+      </p:sp>
+      <p:sp>
+        <p:nvSpPr>
+          <p:cNvPr id="123" name="TextBox 122">
+            <a:extLst>
+              <a:ext uri="{FF2B5EF4-FFF2-40B4-BE49-F238E27FC236}">
+                <a16:creationId xmlns:a16="http://schemas.microsoft.com/office/drawing/2014/main" id="{A8F85F4C-1FA1-44A5-9437-ADDCA765438A}"/>
+              </a:ext>
+            </a:extLst>
+          </p:cNvPr>
+          <p:cNvSpPr txBox="1"/>
+          <p:nvPr/>
+        </p:nvSpPr>
+        <p:spPr>
+          <a:xfrm>
+            <a:off x="2065190" y="3631317"/>
+            <a:ext cx="189257" cy="178683"/>
+          </a:xfrm>
+          <a:prstGeom prst="rect">
+            <a:avLst/>
+          </a:prstGeom>
+          <a:noFill/>
+        </p:spPr>
+        <p:txBody>
+          <a:bodyPr wrap="square" lIns="0" tIns="0" rIns="0" bIns="0" rtlCol="0">
+            <a:noAutofit/>
+          </a:bodyPr>
+          <a:lstStyle/>
+          <a:p>
+            <a:pPr algn="ctr"/>
+            <a:r>
+              <a:rPr lang="en-US" sz="1100" dirty="0">
+                <a:solidFill>
+                  <a:srgbClr val="7030A0"/>
+                </a:solidFill>
+              </a:rPr>
+              <a:t>1</a:t>
+            </a:r>
+            <a:endParaRPr lang="en-SG" sz="1100" dirty="0">
+              <a:solidFill>
+                <a:srgbClr val="7030A0"/>
+              </a:solidFill>
+            </a:endParaRPr>
+          </a:p>
+        </p:txBody>
+      </p:sp>
+      <p:sp>
+        <p:nvSpPr>
+          <p:cNvPr id="125" name="Flowchart: Decision 96">
+            <a:extLst>
+              <a:ext uri="{FF2B5EF4-FFF2-40B4-BE49-F238E27FC236}">
+                <a16:creationId xmlns:a16="http://schemas.microsoft.com/office/drawing/2014/main" id="{3E0268B5-5450-46EE-8AB2-16A1F796D986}"/>
+              </a:ext>
+            </a:extLst>
+          </p:cNvPr>
+          <p:cNvSpPr/>
+          <p:nvPr/>
+        </p:nvSpPr>
+        <p:spPr>
+          <a:xfrm>
+            <a:off x="3426077" y="3481353"/>
+            <a:ext cx="236048" cy="173380"/>
+          </a:xfrm>
+          <a:prstGeom prst="flowChartDecision">
+            <a:avLst/>
+          </a:prstGeom>
+          <a:solidFill>
+            <a:srgbClr val="7030A0"/>
+          </a:solidFill>
+          <a:ln w="19050">
+            <a:solidFill>
+              <a:srgbClr val="7030A0"/>
+            </a:solidFill>
+          </a:ln>
+          <a:effectLst/>
+        </p:spPr>
+        <p:style>
+          <a:lnRef idx="1">
+            <a:schemeClr val="accent6"/>
+          </a:lnRef>
+          <a:fillRef idx="2">
+            <a:schemeClr val="accent6"/>
+          </a:fillRef>
+          <a:effectRef idx="1">
+            <a:schemeClr val="accent6"/>
+          </a:effectRef>
+          <a:fontRef idx="minor">
+            <a:schemeClr val="dk1"/>
+          </a:fontRef>
+        </p:style>
+        <p:txBody>
+          <a:bodyPr rtlCol="0" anchor="ctr"/>
+          <a:lstStyle/>
+          <a:p>
+            <a:pPr algn="ctr"/>
+            <a:endParaRPr lang="en-US" sz="1050"/>
+          </a:p>
+        </p:txBody>
+      </p:sp>
+      <p:cxnSp>
+        <p:nvCxnSpPr>
+          <p:cNvPr id="126" name="Straight Arrow Connector 125">
+            <a:extLst>
+              <a:ext uri="{FF2B5EF4-FFF2-40B4-BE49-F238E27FC236}">
+                <a16:creationId xmlns:a16="http://schemas.microsoft.com/office/drawing/2014/main" id="{4C29F22F-0323-4F71-BF4E-9038ADADAF92}"/>
+              </a:ext>
+            </a:extLst>
+          </p:cNvPr>
+          <p:cNvCxnSpPr>
+            <a:cxnSpLocks/>
+            <a:stCxn id="125" idx="3"/>
+            <a:endCxn id="111" idx="1"/>
+          </p:cNvCxnSpPr>
+          <p:nvPr/>
+        </p:nvCxnSpPr>
+        <p:spPr>
+          <a:xfrm>
+            <a:off x="3662125" y="3568043"/>
+            <a:ext cx="228738" cy="0"/>
+          </a:xfrm>
+          <a:prstGeom prst="straightConnector1">
+            <a:avLst/>
+          </a:prstGeom>
+          <a:ln w="19050">
+            <a:solidFill>
+              <a:srgbClr val="7030A0"/>
+            </a:solidFill>
+            <a:headEnd type="none" w="med" len="med"/>
+            <a:tailEnd type="arrow" w="med" len="med"/>
+          </a:ln>
+          <a:effectLst/>
+        </p:spPr>
+        <p:style>
+          <a:lnRef idx="1">
+            <a:schemeClr val="accent2"/>
+          </a:lnRef>
+          <a:fillRef idx="2">
+            <a:schemeClr val="accent2"/>
+          </a:fillRef>
+          <a:effectRef idx="1">
+            <a:schemeClr val="accent2"/>
+          </a:effectRef>
+          <a:fontRef idx="minor">
+            <a:schemeClr val="dk1"/>
+          </a:fontRef>
+        </p:style>
+      </p:cxnSp>
+      <p:sp>
+        <p:nvSpPr>
+          <p:cNvPr id="127" name="Rectangle 8">
+            <a:extLst>
+              <a:ext uri="{FF2B5EF4-FFF2-40B4-BE49-F238E27FC236}">
+                <a16:creationId xmlns:a16="http://schemas.microsoft.com/office/drawing/2014/main" id="{82A90528-7BAD-4D77-A674-2C6CD3220E35}"/>
+              </a:ext>
+            </a:extLst>
+          </p:cNvPr>
+          <p:cNvSpPr/>
+          <p:nvPr/>
+        </p:nvSpPr>
+        <p:spPr>
+          <a:xfrm>
+            <a:off x="5231166" y="4328279"/>
+            <a:ext cx="708186" cy="346760"/>
+          </a:xfrm>
+          <a:prstGeom prst="rect">
+            <a:avLst/>
+          </a:prstGeom>
+          <a:ln w="19050">
+            <a:solidFill>
+              <a:srgbClr val="7030A0"/>
+            </a:solidFill>
+          </a:ln>
+          <a:effectLst/>
+        </p:spPr>
+        <p:style>
+          <a:lnRef idx="1">
+            <a:schemeClr val="accent4"/>
+          </a:lnRef>
+          <a:fillRef idx="2">
+            <a:schemeClr val="accent4"/>
+          </a:fillRef>
+          <a:effectRef idx="1">
+            <a:schemeClr val="accent4"/>
+          </a:effectRef>
+          <a:fontRef idx="minor">
+            <a:schemeClr val="dk1"/>
+          </a:fontRef>
+        </p:style>
+        <p:txBody>
+          <a:bodyPr rtlCol="0" anchor="ctr"/>
+          <a:lstStyle/>
+          <a:p>
+            <a:pPr algn="ctr"/>
+            <a:r>
+              <a:rPr lang="en-US" sz="1050" dirty="0">
+                <a:solidFill>
+                  <a:srgbClr val="7030A0"/>
+                </a:solidFill>
+              </a:rPr>
+              <a:t>Lesson</a:t>
+            </a:r>
+            <a:endParaRPr lang="en-SG" sz="1050" dirty="0">
+              <a:solidFill>
+                <a:srgbClr val="7030A0"/>
+              </a:solidFill>
+            </a:endParaRPr>
+          </a:p>
+        </p:txBody>
+      </p:sp>
+      <p:sp>
+        <p:nvSpPr>
+          <p:cNvPr id="128" name="Rectangle 8">
+            <a:extLst>
+              <a:ext uri="{FF2B5EF4-FFF2-40B4-BE49-F238E27FC236}">
+                <a16:creationId xmlns:a16="http://schemas.microsoft.com/office/drawing/2014/main" id="{AACCDA48-25E9-4708-9D2C-1AA1C71E7721}"/>
+              </a:ext>
+            </a:extLst>
+          </p:cNvPr>
+          <p:cNvSpPr/>
+          <p:nvPr/>
+        </p:nvSpPr>
+        <p:spPr>
+          <a:xfrm>
+            <a:off x="7131965" y="4114800"/>
+            <a:ext cx="1459506" cy="346760"/>
+          </a:xfrm>
+          <a:prstGeom prst="rect">
+            <a:avLst/>
+          </a:prstGeom>
+          <a:ln w="19050">
+            <a:solidFill>
+              <a:srgbClr val="7030A0"/>
+            </a:solidFill>
+          </a:ln>
+          <a:effectLst/>
+        </p:spPr>
+        <p:style>
+          <a:lnRef idx="1">
+            <a:schemeClr val="accent4"/>
+          </a:lnRef>
+          <a:fillRef idx="2">
+            <a:schemeClr val="accent4"/>
+          </a:fillRef>
+          <a:effectRef idx="1">
+            <a:schemeClr val="accent4"/>
+          </a:effectRef>
+          <a:fontRef idx="minor">
+            <a:schemeClr val="dk1"/>
+          </a:fontRef>
+        </p:style>
+        <p:txBody>
+          <a:bodyPr rtlCol="0" anchor="ctr"/>
+          <a:lstStyle/>
+          <a:p>
+            <a:pPr algn="ctr"/>
+            <a:r>
+              <a:rPr lang="en-US" sz="1050" dirty="0">
+                <a:solidFill>
+                  <a:srgbClr val="7030A0"/>
+                </a:solidFill>
+              </a:rPr>
+              <a:t>Day</a:t>
+            </a:r>
+            <a:endParaRPr lang="en-SG" sz="1050" dirty="0">
+              <a:solidFill>
+                <a:srgbClr val="7030A0"/>
+              </a:solidFill>
+            </a:endParaRPr>
+          </a:p>
+        </p:txBody>
+      </p:sp>
+      <p:sp>
+        <p:nvSpPr>
+          <p:cNvPr id="129" name="Rectangle 8">
+            <a:extLst>
+              <a:ext uri="{FF2B5EF4-FFF2-40B4-BE49-F238E27FC236}">
+                <a16:creationId xmlns:a16="http://schemas.microsoft.com/office/drawing/2014/main" id="{72B7D052-5404-4A07-BFD0-7CEC751435C3}"/>
+              </a:ext>
+            </a:extLst>
+          </p:cNvPr>
+          <p:cNvSpPr/>
+          <p:nvPr/>
+        </p:nvSpPr>
+        <p:spPr>
+          <a:xfrm>
+            <a:off x="7125931" y="4495800"/>
+            <a:ext cx="1470060" cy="353064"/>
+          </a:xfrm>
+          <a:prstGeom prst="rect">
+            <a:avLst/>
+          </a:prstGeom>
+          <a:ln w="19050">
+            <a:solidFill>
+              <a:srgbClr val="7030A0"/>
+            </a:solidFill>
+          </a:ln>
+          <a:effectLst/>
+        </p:spPr>
+        <p:style>
+          <a:lnRef idx="1">
+            <a:schemeClr val="accent4"/>
+          </a:lnRef>
+          <a:fillRef idx="2">
+            <a:schemeClr val="accent4"/>
+          </a:fillRef>
+          <a:effectRef idx="1">
+            <a:schemeClr val="accent4"/>
+          </a:effectRef>
+          <a:fontRef idx="minor">
+            <a:schemeClr val="dk1"/>
+          </a:fontRef>
+        </p:style>
+        <p:txBody>
+          <a:bodyPr rtlCol="0" anchor="ctr"/>
+          <a:lstStyle/>
+          <a:p>
+            <a:pPr algn="ctr"/>
+            <a:r>
+              <a:rPr lang="en-US" sz="1050" dirty="0">
+                <a:solidFill>
+                  <a:srgbClr val="7030A0"/>
+                </a:solidFill>
+              </a:rPr>
+              <a:t>Time</a:t>
+            </a:r>
+            <a:endParaRPr lang="en-SG" sz="1050" dirty="0">
+              <a:solidFill>
+                <a:srgbClr val="7030A0"/>
+              </a:solidFill>
+            </a:endParaRPr>
+          </a:p>
+        </p:txBody>
+      </p:sp>
+      <p:sp>
+        <p:nvSpPr>
+          <p:cNvPr id="143" name="Flowchart: Decision 96">
+            <a:extLst>
+              <a:ext uri="{FF2B5EF4-FFF2-40B4-BE49-F238E27FC236}">
+                <a16:creationId xmlns:a16="http://schemas.microsoft.com/office/drawing/2014/main" id="{67E624F4-46E6-48A2-B37B-2C18EC887BF2}"/>
+              </a:ext>
+            </a:extLst>
+          </p:cNvPr>
+          <p:cNvSpPr/>
+          <p:nvPr/>
+        </p:nvSpPr>
+        <p:spPr>
+          <a:xfrm>
+            <a:off x="5053457" y="3477457"/>
+            <a:ext cx="236048" cy="173380"/>
+          </a:xfrm>
+          <a:prstGeom prst="flowChartDecision">
+            <a:avLst/>
+          </a:prstGeom>
+          <a:noFill/>
+          <a:ln w="19050">
+            <a:solidFill>
+              <a:srgbClr val="7030A0"/>
+            </a:solidFill>
+          </a:ln>
+          <a:effectLst/>
+        </p:spPr>
+        <p:style>
+          <a:lnRef idx="1">
+            <a:schemeClr val="accent6"/>
+          </a:lnRef>
+          <a:fillRef idx="2">
+            <a:schemeClr val="accent6"/>
+          </a:fillRef>
+          <a:effectRef idx="1">
+            <a:schemeClr val="accent6"/>
+          </a:effectRef>
+          <a:fontRef idx="minor">
+            <a:schemeClr val="dk1"/>
+          </a:fontRef>
+        </p:style>
+        <p:txBody>
+          <a:bodyPr rtlCol="0" anchor="ctr"/>
+          <a:lstStyle/>
+          <a:p>
+            <a:pPr algn="ctr"/>
+            <a:endParaRPr lang="en-US" sz="1050"/>
+          </a:p>
+        </p:txBody>
+      </p:sp>
+      <p:cxnSp>
+        <p:nvCxnSpPr>
+          <p:cNvPr id="144" name="Elbow Connector 63">
+            <a:extLst>
+              <a:ext uri="{FF2B5EF4-FFF2-40B4-BE49-F238E27FC236}">
+                <a16:creationId xmlns:a16="http://schemas.microsoft.com/office/drawing/2014/main" id="{8B21A111-2703-4D4E-AEA4-B7E0F3576FE2}"/>
+              </a:ext>
+            </a:extLst>
+          </p:cNvPr>
+          <p:cNvCxnSpPr>
+            <a:cxnSpLocks/>
+            <a:stCxn id="143" idx="3"/>
+            <a:endCxn id="127" idx="0"/>
+          </p:cNvCxnSpPr>
+          <p:nvPr/>
+        </p:nvCxnSpPr>
+        <p:spPr>
+          <a:xfrm>
+            <a:off x="5289505" y="3564147"/>
+            <a:ext cx="295754" cy="764132"/>
+          </a:xfrm>
+          <a:prstGeom prst="bentConnector2">
+            <a:avLst/>
+          </a:prstGeom>
+          <a:ln w="19050">
+            <a:solidFill>
+              <a:srgbClr val="7030A0"/>
+            </a:solidFill>
+            <a:headEnd type="none" w="med" len="med"/>
+            <a:tailEnd type="arrow" w="med" len="med"/>
+          </a:ln>
+          <a:effectLst/>
+        </p:spPr>
+        <p:style>
+          <a:lnRef idx="1">
+            <a:schemeClr val="accent2"/>
+          </a:lnRef>
+          <a:fillRef idx="2">
+            <a:schemeClr val="accent2"/>
+          </a:fillRef>
+          <a:effectRef idx="1">
+            <a:schemeClr val="accent2"/>
+          </a:effectRef>
+          <a:fontRef idx="minor">
+            <a:schemeClr val="dk1"/>
+          </a:fontRef>
+        </p:style>
+      </p:cxnSp>
+      <p:sp>
+        <p:nvSpPr>
+          <p:cNvPr id="145" name="TextBox 144">
+            <a:extLst>
+              <a:ext uri="{FF2B5EF4-FFF2-40B4-BE49-F238E27FC236}">
+                <a16:creationId xmlns:a16="http://schemas.microsoft.com/office/drawing/2014/main" id="{6ACD0D3B-49B5-4AE0-9FF0-9204B22F5A2D}"/>
+              </a:ext>
+            </a:extLst>
+          </p:cNvPr>
+          <p:cNvSpPr txBox="1"/>
+          <p:nvPr/>
+        </p:nvSpPr>
+        <p:spPr>
+          <a:xfrm>
+            <a:off x="5412077" y="4147242"/>
+            <a:ext cx="189257" cy="178683"/>
+          </a:xfrm>
+          <a:prstGeom prst="rect">
+            <a:avLst/>
+          </a:prstGeom>
+          <a:noFill/>
+        </p:spPr>
+        <p:txBody>
+          <a:bodyPr wrap="square" lIns="0" tIns="0" rIns="0" bIns="0" rtlCol="0">
+            <a:noAutofit/>
+          </a:bodyPr>
+          <a:lstStyle/>
+          <a:p>
+            <a:pPr algn="ctr"/>
+            <a:r>
+              <a:rPr lang="en-US" sz="1100" dirty="0">
+                <a:solidFill>
+                  <a:srgbClr val="7030A0"/>
+                </a:solidFill>
+              </a:rPr>
+              <a:t>*</a:t>
+            </a:r>
+            <a:endParaRPr lang="en-SG" sz="1100" dirty="0">
+              <a:solidFill>
+                <a:srgbClr val="7030A0"/>
+              </a:solidFill>
+            </a:endParaRPr>
+          </a:p>
+        </p:txBody>
+      </p:sp>
+      <p:sp>
+        <p:nvSpPr>
+          <p:cNvPr id="147" name="Flowchart: Decision 96">
+            <a:extLst>
+              <a:ext uri="{FF2B5EF4-FFF2-40B4-BE49-F238E27FC236}">
+                <a16:creationId xmlns:a16="http://schemas.microsoft.com/office/drawing/2014/main" id="{26572E31-CB95-4380-9DE6-0A25D3F82ADC}"/>
+              </a:ext>
+            </a:extLst>
+          </p:cNvPr>
+          <p:cNvSpPr/>
+          <p:nvPr/>
+        </p:nvSpPr>
+        <p:spPr>
+          <a:xfrm>
+            <a:off x="5963280" y="4414969"/>
+            <a:ext cx="236048" cy="173380"/>
+          </a:xfrm>
+          <a:prstGeom prst="flowChartDecision">
+            <a:avLst/>
+          </a:prstGeom>
+          <a:solidFill>
+            <a:srgbClr val="7030A0"/>
+          </a:solidFill>
+          <a:ln w="19050">
+            <a:solidFill>
+              <a:srgbClr val="7030A0"/>
+            </a:solidFill>
+          </a:ln>
+          <a:effectLst/>
+        </p:spPr>
+        <p:style>
+          <a:lnRef idx="1">
+            <a:schemeClr val="accent6"/>
+          </a:lnRef>
+          <a:fillRef idx="2">
+            <a:schemeClr val="accent6"/>
+          </a:fillRef>
+          <a:effectRef idx="1">
+            <a:schemeClr val="accent6"/>
+          </a:effectRef>
+          <a:fontRef idx="minor">
+            <a:schemeClr val="dk1"/>
+          </a:fontRef>
+        </p:style>
+        <p:txBody>
+          <a:bodyPr rtlCol="0" anchor="ctr"/>
+          <a:lstStyle/>
+          <a:p>
+            <a:pPr algn="ctr"/>
+            <a:endParaRPr lang="en-US" sz="1050"/>
+          </a:p>
+        </p:txBody>
+      </p:sp>
+      <p:cxnSp>
+        <p:nvCxnSpPr>
+          <p:cNvPr id="148" name="Elbow Connector 78">
+            <a:extLst>
+              <a:ext uri="{FF2B5EF4-FFF2-40B4-BE49-F238E27FC236}">
+                <a16:creationId xmlns:a16="http://schemas.microsoft.com/office/drawing/2014/main" id="{932578D4-153A-4C5E-A805-067C842CBFAB}"/>
+              </a:ext>
+            </a:extLst>
+          </p:cNvPr>
+          <p:cNvCxnSpPr>
+            <a:cxnSpLocks/>
+            <a:stCxn id="147" idx="0"/>
+            <a:endCxn id="104" idx="2"/>
+          </p:cNvCxnSpPr>
+          <p:nvPr/>
+        </p:nvCxnSpPr>
+        <p:spPr>
+          <a:xfrm rot="5400000" flipH="1" flipV="1">
+            <a:off x="5999892" y="4021851"/>
+            <a:ext cx="474531" cy="311706"/>
+          </a:xfrm>
+          <a:prstGeom prst="bentConnector3">
+            <a:avLst>
+              <a:gd name="adj1" fmla="val 50000"/>
+            </a:avLst>
+          </a:prstGeom>
+          <a:ln w="19050">
+            <a:solidFill>
+              <a:srgbClr val="7030A0"/>
+            </a:solidFill>
+            <a:headEnd type="none" w="med" len="med"/>
+            <a:tailEnd type="arrow" w="med" len="med"/>
+          </a:ln>
+          <a:effectLst/>
+        </p:spPr>
+        <p:style>
+          <a:lnRef idx="1">
+            <a:schemeClr val="accent2"/>
+          </a:lnRef>
+          <a:fillRef idx="2">
+            <a:schemeClr val="accent2"/>
+          </a:fillRef>
+          <a:effectRef idx="1">
+            <a:schemeClr val="accent2"/>
+          </a:effectRef>
+          <a:fontRef idx="minor">
+            <a:schemeClr val="dk1"/>
+          </a:fontRef>
+        </p:style>
+      </p:cxnSp>
+      <p:cxnSp>
+        <p:nvCxnSpPr>
+          <p:cNvPr id="151" name="Elbow Connector 78">
+            <a:extLst>
+              <a:ext uri="{FF2B5EF4-FFF2-40B4-BE49-F238E27FC236}">
+                <a16:creationId xmlns:a16="http://schemas.microsoft.com/office/drawing/2014/main" id="{E837BC7B-4B05-4454-981C-A83D0885D7CA}"/>
+              </a:ext>
+            </a:extLst>
+          </p:cNvPr>
+          <p:cNvCxnSpPr>
+            <a:cxnSpLocks/>
+            <a:stCxn id="147" idx="3"/>
+            <a:endCxn id="128" idx="1"/>
+          </p:cNvCxnSpPr>
+          <p:nvPr/>
+        </p:nvCxnSpPr>
+        <p:spPr>
+          <a:xfrm flipV="1">
+            <a:off x="6199328" y="4288180"/>
+            <a:ext cx="932637" cy="213479"/>
+          </a:xfrm>
+          <a:prstGeom prst="bentConnector3">
+            <a:avLst>
+              <a:gd name="adj1" fmla="val 50000"/>
+            </a:avLst>
+          </a:prstGeom>
+          <a:ln w="19050">
+            <a:solidFill>
+              <a:srgbClr val="7030A0"/>
+            </a:solidFill>
+            <a:headEnd type="none" w="med" len="med"/>
+            <a:tailEnd type="arrow" w="med" len="med"/>
+          </a:ln>
+          <a:effectLst/>
+        </p:spPr>
+        <p:style>
+          <a:lnRef idx="1">
+            <a:schemeClr val="accent2"/>
+          </a:lnRef>
+          <a:fillRef idx="2">
+            <a:schemeClr val="accent2"/>
+          </a:fillRef>
+          <a:effectRef idx="1">
+            <a:schemeClr val="accent2"/>
+          </a:effectRef>
+          <a:fontRef idx="minor">
+            <a:schemeClr val="dk1"/>
+          </a:fontRef>
+        </p:style>
+      </p:cxnSp>
+      <p:cxnSp>
+        <p:nvCxnSpPr>
+          <p:cNvPr id="154" name="Elbow Connector 78">
+            <a:extLst>
+              <a:ext uri="{FF2B5EF4-FFF2-40B4-BE49-F238E27FC236}">
+                <a16:creationId xmlns:a16="http://schemas.microsoft.com/office/drawing/2014/main" id="{0F6D4DBE-EF20-4AC9-888E-D9C2F1FA21B7}"/>
+              </a:ext>
+            </a:extLst>
+          </p:cNvPr>
+          <p:cNvCxnSpPr>
+            <a:cxnSpLocks/>
+            <a:stCxn id="147" idx="3"/>
+            <a:endCxn id="129" idx="1"/>
+          </p:cNvCxnSpPr>
+          <p:nvPr/>
+        </p:nvCxnSpPr>
+        <p:spPr>
+          <a:xfrm>
+            <a:off x="6199328" y="4501659"/>
+            <a:ext cx="926603" cy="170673"/>
+          </a:xfrm>
+          <a:prstGeom prst="bentConnector3">
+            <a:avLst>
+              <a:gd name="adj1" fmla="val 50000"/>
+            </a:avLst>
+          </a:prstGeom>
+          <a:ln w="19050">
+            <a:solidFill>
+              <a:srgbClr val="7030A0"/>
+            </a:solidFill>
+            <a:headEnd type="none" w="med" len="med"/>
+            <a:tailEnd type="arrow" w="med" len="med"/>
+          </a:ln>
+          <a:effectLst/>
+        </p:spPr>
+        <p:style>
+          <a:lnRef idx="1">
+            <a:schemeClr val="accent2"/>
+          </a:lnRef>
+          <a:fillRef idx="2">
+            <a:schemeClr val="accent2"/>
+          </a:fillRef>
+          <a:effectRef idx="1">
+            <a:schemeClr val="accent2"/>
+          </a:effectRef>
+          <a:fontRef idx="minor">
+            <a:schemeClr val="dk1"/>
+          </a:fontRef>
+        </p:style>
+      </p:cxnSp>
+      <p:sp>
+        <p:nvSpPr>
+          <p:cNvPr id="169" name="TextBox 168">
+            <a:extLst>
+              <a:ext uri="{FF2B5EF4-FFF2-40B4-BE49-F238E27FC236}">
+                <a16:creationId xmlns:a16="http://schemas.microsoft.com/office/drawing/2014/main" id="{C5045183-3621-4CE4-B157-8BFB5A38B722}"/>
+              </a:ext>
+            </a:extLst>
+          </p:cNvPr>
+          <p:cNvSpPr txBox="1"/>
+          <p:nvPr/>
+        </p:nvSpPr>
+        <p:spPr>
+          <a:xfrm>
+            <a:off x="5632583" y="4698117"/>
+            <a:ext cx="189257" cy="178683"/>
+          </a:xfrm>
+          <a:prstGeom prst="rect">
+            <a:avLst/>
+          </a:prstGeom>
+          <a:noFill/>
+        </p:spPr>
+        <p:txBody>
+          <a:bodyPr wrap="square" lIns="0" tIns="0" rIns="0" bIns="0" rtlCol="0">
+            <a:noAutofit/>
+          </a:bodyPr>
+          <a:lstStyle/>
+          <a:p>
+            <a:pPr algn="ctr"/>
+            <a:r>
+              <a:rPr lang="en-US" sz="1100" dirty="0">
+                <a:solidFill>
+                  <a:srgbClr val="7030A0"/>
+                </a:solidFill>
+              </a:rPr>
+              <a:t>1</a:t>
+            </a:r>
+            <a:endParaRPr lang="en-SG" sz="1100" dirty="0">
+              <a:solidFill>
+                <a:srgbClr val="7030A0"/>
+              </a:solidFill>
+            </a:endParaRPr>
+          </a:p>
+        </p:txBody>
+      </p:sp>
     </p:spTree>
     <p:extLst>
       <p:ext uri="{BB962C8B-B14F-4D97-AF65-F5344CB8AC3E}">

</xml_diff>

<commit_message>
-updated DG (change app name, Component ClassDiagrams, Feature contribution, Implementation of scheduling modules, tidy up user stories & NFR, add glossary)
</commit_message>
<xml_diff>
--- a/docs/diagrams/ModelComponentClassDiagram.pptx
+++ b/docs/diagrams/ModelComponentClassDiagram.pptx
@@ -126,6 +126,10 @@
 </p:presentation>
 </file>
 
+<file path=ppt/revisionInfo.xml><?xml version="1.0" encoding="utf-8"?>
+<p1510:revInfo xmlns:a="http://schemas.openxmlformats.org/drawingml/2006/main" xmlns:r="http://schemas.openxmlformats.org/officeDocument/2006/relationships" xmlns:p1510="http://schemas.microsoft.com/office/powerpoint/2015/10/main"/>
+</file>
+
 <file path=ppt/notesMasters/notesMaster1.xml><?xml version="1.0" encoding="utf-8"?>
 <p:notesMaster xmlns:a="http://schemas.openxmlformats.org/drawingml/2006/main" xmlns:r="http://schemas.openxmlformats.org/officeDocument/2006/relationships" xmlns:p="http://schemas.openxmlformats.org/presentationml/2006/main">
   <p:cSld>
@@ -208,7 +212,7 @@
           <a:p>
             <a:fld id="{F5CC4B3F-88C1-4FFA-B1B6-F41C21DC6924}" type="datetimeFigureOut">
               <a:rPr lang="en-US" smtClean="0"/>
-              <a:t>1/1/18</a:t>
+              <a:t>4/10/2018</a:t>
             </a:fld>
             <a:endParaRPr lang="en-US"/>
           </a:p>
@@ -272,38 +276,37 @@
           <a:p>
             <a:pPr lvl="0"/>
             <a:r>
-              <a:rPr lang="en-US" smtClean="0"/>
+              <a:rPr lang="en-US"/>
               <a:t>Click to edit Master text styles</a:t>
             </a:r>
           </a:p>
           <a:p>
             <a:pPr lvl="1"/>
             <a:r>
-              <a:rPr lang="en-US" smtClean="0"/>
+              <a:rPr lang="en-US"/>
               <a:t>Second level</a:t>
             </a:r>
           </a:p>
           <a:p>
             <a:pPr lvl="2"/>
             <a:r>
-              <a:rPr lang="en-US" smtClean="0"/>
+              <a:rPr lang="en-US"/>
               <a:t>Third level</a:t>
             </a:r>
           </a:p>
           <a:p>
             <a:pPr lvl="3"/>
             <a:r>
-              <a:rPr lang="en-US" smtClean="0"/>
+              <a:rPr lang="en-US"/>
               <a:t>Fourth level</a:t>
             </a:r>
           </a:p>
           <a:p>
             <a:pPr lvl="4"/>
             <a:r>
-              <a:rPr lang="en-US" smtClean="0"/>
+              <a:rPr lang="en-US"/>
               <a:t>Fifth level</a:t>
             </a:r>
-            <a:endParaRPr lang="en-US"/>
           </a:p>
         </p:txBody>
       </p:sp>
@@ -514,10 +517,9 @@
           <a:lstStyle/>
           <a:p>
             <a:r>
-              <a:rPr lang="en-US" smtClean="0"/>
+              <a:rPr lang="en-US"/>
               <a:t>Click to edit Master title style</a:t>
             </a:r>
-            <a:endParaRPr lang="en-US"/>
           </a:p>
         </p:txBody>
       </p:sp>
@@ -633,10 +635,9 @@
           </a:lstStyle>
           <a:p>
             <a:r>
-              <a:rPr lang="en-US" smtClean="0"/>
+              <a:rPr lang="en-US"/>
               <a:t>Click to edit Master subtitle style</a:t>
             </a:r>
-            <a:endParaRPr lang="en-US"/>
           </a:p>
         </p:txBody>
       </p:sp>
@@ -657,7 +658,7 @@
           <a:p>
             <a:fld id="{78C97017-6FC3-485B-9764-EAC9E56C1D49}" type="datetimeFigureOut">
               <a:rPr lang="en-US" smtClean="0"/>
-              <a:t>1/1/18</a:t>
+              <a:t>4/10/2018</a:t>
             </a:fld>
             <a:endParaRPr lang="en-US"/>
           </a:p>
@@ -751,10 +752,9 @@
           <a:lstStyle/>
           <a:p>
             <a:r>
-              <a:rPr lang="en-US" smtClean="0"/>
+              <a:rPr lang="en-US"/>
               <a:t>Click to edit Master title style</a:t>
             </a:r>
-            <a:endParaRPr lang="en-US"/>
           </a:p>
         </p:txBody>
       </p:sp>
@@ -775,38 +775,37 @@
           <a:p>
             <a:pPr lvl="0"/>
             <a:r>
-              <a:rPr lang="en-US" smtClean="0"/>
+              <a:rPr lang="en-US"/>
               <a:t>Click to edit Master text styles</a:t>
             </a:r>
           </a:p>
           <a:p>
             <a:pPr lvl="1"/>
             <a:r>
-              <a:rPr lang="en-US" smtClean="0"/>
+              <a:rPr lang="en-US"/>
               <a:t>Second level</a:t>
             </a:r>
           </a:p>
           <a:p>
             <a:pPr lvl="2"/>
             <a:r>
-              <a:rPr lang="en-US" smtClean="0"/>
+              <a:rPr lang="en-US"/>
               <a:t>Third level</a:t>
             </a:r>
           </a:p>
           <a:p>
             <a:pPr lvl="3"/>
             <a:r>
-              <a:rPr lang="en-US" smtClean="0"/>
+              <a:rPr lang="en-US"/>
               <a:t>Fourth level</a:t>
             </a:r>
           </a:p>
           <a:p>
             <a:pPr lvl="4"/>
             <a:r>
-              <a:rPr lang="en-US" smtClean="0"/>
+              <a:rPr lang="en-US"/>
               <a:t>Fifth level</a:t>
             </a:r>
-            <a:endParaRPr lang="en-US"/>
           </a:p>
         </p:txBody>
       </p:sp>
@@ -827,7 +826,7 @@
           <a:p>
             <a:fld id="{78C97017-6FC3-485B-9764-EAC9E56C1D49}" type="datetimeFigureOut">
               <a:rPr lang="en-US" smtClean="0"/>
-              <a:t>1/1/18</a:t>
+              <a:t>4/10/2018</a:t>
             </a:fld>
             <a:endParaRPr lang="en-US"/>
           </a:p>
@@ -926,10 +925,9 @@
           <a:lstStyle/>
           <a:p>
             <a:r>
-              <a:rPr lang="en-US" smtClean="0"/>
+              <a:rPr lang="en-US"/>
               <a:t>Click to edit Master title style</a:t>
             </a:r>
-            <a:endParaRPr lang="en-US"/>
           </a:p>
         </p:txBody>
       </p:sp>
@@ -955,38 +953,37 @@
           <a:p>
             <a:pPr lvl="0"/>
             <a:r>
-              <a:rPr lang="en-US" smtClean="0"/>
+              <a:rPr lang="en-US"/>
               <a:t>Click to edit Master text styles</a:t>
             </a:r>
           </a:p>
           <a:p>
             <a:pPr lvl="1"/>
             <a:r>
-              <a:rPr lang="en-US" smtClean="0"/>
+              <a:rPr lang="en-US"/>
               <a:t>Second level</a:t>
             </a:r>
           </a:p>
           <a:p>
             <a:pPr lvl="2"/>
             <a:r>
-              <a:rPr lang="en-US" smtClean="0"/>
+              <a:rPr lang="en-US"/>
               <a:t>Third level</a:t>
             </a:r>
           </a:p>
           <a:p>
             <a:pPr lvl="3"/>
             <a:r>
-              <a:rPr lang="en-US" smtClean="0"/>
+              <a:rPr lang="en-US"/>
               <a:t>Fourth level</a:t>
             </a:r>
           </a:p>
           <a:p>
             <a:pPr lvl="4"/>
             <a:r>
-              <a:rPr lang="en-US" smtClean="0"/>
+              <a:rPr lang="en-US"/>
               <a:t>Fifth level</a:t>
             </a:r>
-            <a:endParaRPr lang="en-US"/>
           </a:p>
         </p:txBody>
       </p:sp>
@@ -1007,7 +1004,7 @@
           <a:p>
             <a:fld id="{78C97017-6FC3-485B-9764-EAC9E56C1D49}" type="datetimeFigureOut">
               <a:rPr lang="en-US" smtClean="0"/>
-              <a:t>1/1/18</a:t>
+              <a:t>4/10/2018</a:t>
             </a:fld>
             <a:endParaRPr lang="en-US"/>
           </a:p>
@@ -1101,10 +1098,9 @@
           <a:lstStyle/>
           <a:p>
             <a:r>
-              <a:rPr lang="en-US" smtClean="0"/>
+              <a:rPr lang="en-US"/>
               <a:t>Click to edit Master title style</a:t>
             </a:r>
-            <a:endParaRPr lang="en-US"/>
           </a:p>
         </p:txBody>
       </p:sp>
@@ -1125,38 +1121,37 @@
           <a:p>
             <a:pPr lvl="0"/>
             <a:r>
-              <a:rPr lang="en-US" smtClean="0"/>
+              <a:rPr lang="en-US"/>
               <a:t>Click to edit Master text styles</a:t>
             </a:r>
           </a:p>
           <a:p>
             <a:pPr lvl="1"/>
             <a:r>
-              <a:rPr lang="en-US" smtClean="0"/>
+              <a:rPr lang="en-US"/>
               <a:t>Second level</a:t>
             </a:r>
           </a:p>
           <a:p>
             <a:pPr lvl="2"/>
             <a:r>
-              <a:rPr lang="en-US" smtClean="0"/>
+              <a:rPr lang="en-US"/>
               <a:t>Third level</a:t>
             </a:r>
           </a:p>
           <a:p>
             <a:pPr lvl="3"/>
             <a:r>
-              <a:rPr lang="en-US" smtClean="0"/>
+              <a:rPr lang="en-US"/>
               <a:t>Fourth level</a:t>
             </a:r>
           </a:p>
           <a:p>
             <a:pPr lvl="4"/>
             <a:r>
-              <a:rPr lang="en-US" smtClean="0"/>
+              <a:rPr lang="en-US"/>
               <a:t>Fifth level</a:t>
             </a:r>
-            <a:endParaRPr lang="en-US"/>
           </a:p>
         </p:txBody>
       </p:sp>
@@ -1177,7 +1172,7 @@
           <a:p>
             <a:fld id="{78C97017-6FC3-485B-9764-EAC9E56C1D49}" type="datetimeFigureOut">
               <a:rPr lang="en-US" smtClean="0"/>
-              <a:t>1/1/18</a:t>
+              <a:t>4/10/2018</a:t>
             </a:fld>
             <a:endParaRPr lang="en-US"/>
           </a:p>
@@ -1280,10 +1275,9 @@
           </a:lstStyle>
           <a:p>
             <a:r>
-              <a:rPr lang="en-US" smtClean="0"/>
+              <a:rPr lang="en-US"/>
               <a:t>Click to edit Master title style</a:t>
             </a:r>
-            <a:endParaRPr lang="en-US"/>
           </a:p>
         </p:txBody>
       </p:sp>
@@ -1400,7 +1394,7 @@
           <a:p>
             <a:pPr lvl="0"/>
             <a:r>
-              <a:rPr lang="en-US" smtClean="0"/>
+              <a:rPr lang="en-US"/>
               <a:t>Click to edit Master text styles</a:t>
             </a:r>
           </a:p>
@@ -1423,7 +1417,7 @@
           <a:p>
             <a:fld id="{78C97017-6FC3-485B-9764-EAC9E56C1D49}" type="datetimeFigureOut">
               <a:rPr lang="en-US" smtClean="0"/>
-              <a:t>1/1/18</a:t>
+              <a:t>4/10/2018</a:t>
             </a:fld>
             <a:endParaRPr lang="en-US"/>
           </a:p>
@@ -1517,10 +1511,9 @@
           <a:lstStyle/>
           <a:p>
             <a:r>
-              <a:rPr lang="en-US" smtClean="0"/>
+              <a:rPr lang="en-US"/>
               <a:t>Click to edit Master title style</a:t>
             </a:r>
-            <a:endParaRPr lang="en-US"/>
           </a:p>
         </p:txBody>
       </p:sp>
@@ -1574,38 +1567,37 @@
           <a:p>
             <a:pPr lvl="0"/>
             <a:r>
-              <a:rPr lang="en-US" smtClean="0"/>
+              <a:rPr lang="en-US"/>
               <a:t>Click to edit Master text styles</a:t>
             </a:r>
           </a:p>
           <a:p>
             <a:pPr lvl="1"/>
             <a:r>
-              <a:rPr lang="en-US" smtClean="0"/>
+              <a:rPr lang="en-US"/>
               <a:t>Second level</a:t>
             </a:r>
           </a:p>
           <a:p>
             <a:pPr lvl="2"/>
             <a:r>
-              <a:rPr lang="en-US" smtClean="0"/>
+              <a:rPr lang="en-US"/>
               <a:t>Third level</a:t>
             </a:r>
           </a:p>
           <a:p>
             <a:pPr lvl="3"/>
             <a:r>
-              <a:rPr lang="en-US" smtClean="0"/>
+              <a:rPr lang="en-US"/>
               <a:t>Fourth level</a:t>
             </a:r>
           </a:p>
           <a:p>
             <a:pPr lvl="4"/>
             <a:r>
-              <a:rPr lang="en-US" smtClean="0"/>
+              <a:rPr lang="en-US"/>
               <a:t>Fifth level</a:t>
             </a:r>
-            <a:endParaRPr lang="en-US"/>
           </a:p>
         </p:txBody>
       </p:sp>
@@ -1659,38 +1651,37 @@
           <a:p>
             <a:pPr lvl="0"/>
             <a:r>
-              <a:rPr lang="en-US" smtClean="0"/>
+              <a:rPr lang="en-US"/>
               <a:t>Click to edit Master text styles</a:t>
             </a:r>
           </a:p>
           <a:p>
             <a:pPr lvl="1"/>
             <a:r>
-              <a:rPr lang="en-US" smtClean="0"/>
+              <a:rPr lang="en-US"/>
               <a:t>Second level</a:t>
             </a:r>
           </a:p>
           <a:p>
             <a:pPr lvl="2"/>
             <a:r>
-              <a:rPr lang="en-US" smtClean="0"/>
+              <a:rPr lang="en-US"/>
               <a:t>Third level</a:t>
             </a:r>
           </a:p>
           <a:p>
             <a:pPr lvl="3"/>
             <a:r>
-              <a:rPr lang="en-US" smtClean="0"/>
+              <a:rPr lang="en-US"/>
               <a:t>Fourth level</a:t>
             </a:r>
           </a:p>
           <a:p>
             <a:pPr lvl="4"/>
             <a:r>
-              <a:rPr lang="en-US" smtClean="0"/>
+              <a:rPr lang="en-US"/>
               <a:t>Fifth level</a:t>
             </a:r>
-            <a:endParaRPr lang="en-US"/>
           </a:p>
         </p:txBody>
       </p:sp>
@@ -1711,7 +1702,7 @@
           <a:p>
             <a:fld id="{78C97017-6FC3-485B-9764-EAC9E56C1D49}" type="datetimeFigureOut">
               <a:rPr lang="en-US" smtClean="0"/>
-              <a:t>1/1/18</a:t>
+              <a:t>4/10/2018</a:t>
             </a:fld>
             <a:endParaRPr lang="en-US"/>
           </a:p>
@@ -1809,10 +1800,9 @@
           </a:lstStyle>
           <a:p>
             <a:r>
-              <a:rPr lang="en-US" smtClean="0"/>
+              <a:rPr lang="en-US"/>
               <a:t>Click to edit Master title style</a:t>
             </a:r>
-            <a:endParaRPr lang="en-US"/>
           </a:p>
         </p:txBody>
       </p:sp>
@@ -1875,7 +1865,7 @@
           <a:p>
             <a:pPr lvl="0"/>
             <a:r>
-              <a:rPr lang="en-US" smtClean="0"/>
+              <a:rPr lang="en-US"/>
               <a:t>Click to edit Master text styles</a:t>
             </a:r>
           </a:p>
@@ -1931,38 +1921,37 @@
           <a:p>
             <a:pPr lvl="0"/>
             <a:r>
-              <a:rPr lang="en-US" smtClean="0"/>
+              <a:rPr lang="en-US"/>
               <a:t>Click to edit Master text styles</a:t>
             </a:r>
           </a:p>
           <a:p>
             <a:pPr lvl="1"/>
             <a:r>
-              <a:rPr lang="en-US" smtClean="0"/>
+              <a:rPr lang="en-US"/>
               <a:t>Second level</a:t>
             </a:r>
           </a:p>
           <a:p>
             <a:pPr lvl="2"/>
             <a:r>
-              <a:rPr lang="en-US" smtClean="0"/>
+              <a:rPr lang="en-US"/>
               <a:t>Third level</a:t>
             </a:r>
           </a:p>
           <a:p>
             <a:pPr lvl="3"/>
             <a:r>
-              <a:rPr lang="en-US" smtClean="0"/>
+              <a:rPr lang="en-US"/>
               <a:t>Fourth level</a:t>
             </a:r>
           </a:p>
           <a:p>
             <a:pPr lvl="4"/>
             <a:r>
-              <a:rPr lang="en-US" smtClean="0"/>
+              <a:rPr lang="en-US"/>
               <a:t>Fifth level</a:t>
             </a:r>
-            <a:endParaRPr lang="en-US"/>
           </a:p>
         </p:txBody>
       </p:sp>
@@ -2025,7 +2014,7 @@
           <a:p>
             <a:pPr lvl="0"/>
             <a:r>
-              <a:rPr lang="en-US" smtClean="0"/>
+              <a:rPr lang="en-US"/>
               <a:t>Click to edit Master text styles</a:t>
             </a:r>
           </a:p>
@@ -2081,38 +2070,37 @@
           <a:p>
             <a:pPr lvl="0"/>
             <a:r>
-              <a:rPr lang="en-US" smtClean="0"/>
+              <a:rPr lang="en-US"/>
               <a:t>Click to edit Master text styles</a:t>
             </a:r>
           </a:p>
           <a:p>
             <a:pPr lvl="1"/>
             <a:r>
-              <a:rPr lang="en-US" smtClean="0"/>
+              <a:rPr lang="en-US"/>
               <a:t>Second level</a:t>
             </a:r>
           </a:p>
           <a:p>
             <a:pPr lvl="2"/>
             <a:r>
-              <a:rPr lang="en-US" smtClean="0"/>
+              <a:rPr lang="en-US"/>
               <a:t>Third level</a:t>
             </a:r>
           </a:p>
           <a:p>
             <a:pPr lvl="3"/>
             <a:r>
-              <a:rPr lang="en-US" smtClean="0"/>
+              <a:rPr lang="en-US"/>
               <a:t>Fourth level</a:t>
             </a:r>
           </a:p>
           <a:p>
             <a:pPr lvl="4"/>
             <a:r>
-              <a:rPr lang="en-US" smtClean="0"/>
+              <a:rPr lang="en-US"/>
               <a:t>Fifth level</a:t>
             </a:r>
-            <a:endParaRPr lang="en-US"/>
           </a:p>
         </p:txBody>
       </p:sp>
@@ -2133,7 +2121,7 @@
           <a:p>
             <a:fld id="{78C97017-6FC3-485B-9764-EAC9E56C1D49}" type="datetimeFigureOut">
               <a:rPr lang="en-US" smtClean="0"/>
-              <a:t>1/1/18</a:t>
+              <a:t>4/10/2018</a:t>
             </a:fld>
             <a:endParaRPr lang="en-US"/>
           </a:p>
@@ -2227,10 +2215,9 @@
           <a:lstStyle/>
           <a:p>
             <a:r>
-              <a:rPr lang="en-US" smtClean="0"/>
+              <a:rPr lang="en-US"/>
               <a:t>Click to edit Master title style</a:t>
             </a:r>
-            <a:endParaRPr lang="en-US"/>
           </a:p>
         </p:txBody>
       </p:sp>
@@ -2251,7 +2238,7 @@
           <a:p>
             <a:fld id="{78C97017-6FC3-485B-9764-EAC9E56C1D49}" type="datetimeFigureOut">
               <a:rPr lang="en-US" smtClean="0"/>
-              <a:t>1/1/18</a:t>
+              <a:t>4/10/2018</a:t>
             </a:fld>
             <a:endParaRPr lang="en-US"/>
           </a:p>
@@ -2346,7 +2333,7 @@
           <a:p>
             <a:fld id="{78C97017-6FC3-485B-9764-EAC9E56C1D49}" type="datetimeFigureOut">
               <a:rPr lang="en-US" smtClean="0"/>
-              <a:t>1/1/18</a:t>
+              <a:t>4/10/2018</a:t>
             </a:fld>
             <a:endParaRPr lang="en-US"/>
           </a:p>
@@ -2449,10 +2436,9 @@
           </a:lstStyle>
           <a:p>
             <a:r>
-              <a:rPr lang="en-US" smtClean="0"/>
+              <a:rPr lang="en-US"/>
               <a:t>Click to edit Master title style</a:t>
             </a:r>
-            <a:endParaRPr lang="en-US"/>
           </a:p>
         </p:txBody>
       </p:sp>
@@ -2506,38 +2492,37 @@
           <a:p>
             <a:pPr lvl="0"/>
             <a:r>
-              <a:rPr lang="en-US" smtClean="0"/>
+              <a:rPr lang="en-US"/>
               <a:t>Click to edit Master text styles</a:t>
             </a:r>
           </a:p>
           <a:p>
             <a:pPr lvl="1"/>
             <a:r>
-              <a:rPr lang="en-US" smtClean="0"/>
+              <a:rPr lang="en-US"/>
               <a:t>Second level</a:t>
             </a:r>
           </a:p>
           <a:p>
             <a:pPr lvl="2"/>
             <a:r>
-              <a:rPr lang="en-US" smtClean="0"/>
+              <a:rPr lang="en-US"/>
               <a:t>Third level</a:t>
             </a:r>
           </a:p>
           <a:p>
             <a:pPr lvl="3"/>
             <a:r>
-              <a:rPr lang="en-US" smtClean="0"/>
+              <a:rPr lang="en-US"/>
               <a:t>Fourth level</a:t>
             </a:r>
           </a:p>
           <a:p>
             <a:pPr lvl="4"/>
             <a:r>
-              <a:rPr lang="en-US" smtClean="0"/>
+              <a:rPr lang="en-US"/>
               <a:t>Fifth level</a:t>
             </a:r>
-            <a:endParaRPr lang="en-US"/>
           </a:p>
         </p:txBody>
       </p:sp>
@@ -2600,7 +2585,7 @@
           <a:p>
             <a:pPr lvl="0"/>
             <a:r>
-              <a:rPr lang="en-US" smtClean="0"/>
+              <a:rPr lang="en-US"/>
               <a:t>Click to edit Master text styles</a:t>
             </a:r>
           </a:p>
@@ -2623,7 +2608,7 @@
           <a:p>
             <a:fld id="{78C97017-6FC3-485B-9764-EAC9E56C1D49}" type="datetimeFigureOut">
               <a:rPr lang="en-US" smtClean="0"/>
-              <a:t>1/1/18</a:t>
+              <a:t>4/10/2018</a:t>
             </a:fld>
             <a:endParaRPr lang="en-US"/>
           </a:p>
@@ -2726,10 +2711,9 @@
           </a:lstStyle>
           <a:p>
             <a:r>
-              <a:rPr lang="en-US" smtClean="0"/>
+              <a:rPr lang="en-US"/>
               <a:t>Click to edit Master title style</a:t>
             </a:r>
-            <a:endParaRPr lang="en-US"/>
           </a:p>
         </p:txBody>
       </p:sp>
@@ -2853,7 +2837,7 @@
           <a:p>
             <a:pPr lvl="0"/>
             <a:r>
-              <a:rPr lang="en-US" smtClean="0"/>
+              <a:rPr lang="en-US"/>
               <a:t>Click to edit Master text styles</a:t>
             </a:r>
           </a:p>
@@ -2876,7 +2860,7 @@
           <a:p>
             <a:fld id="{78C97017-6FC3-485B-9764-EAC9E56C1D49}" type="datetimeFigureOut">
               <a:rPr lang="en-US" smtClean="0"/>
-              <a:t>1/1/18</a:t>
+              <a:t>4/10/2018</a:t>
             </a:fld>
             <a:endParaRPr lang="en-US"/>
           </a:p>
@@ -2985,10 +2969,9 @@
           <a:lstStyle/>
           <a:p>
             <a:r>
-              <a:rPr lang="en-US" smtClean="0"/>
+              <a:rPr lang="en-US"/>
               <a:t>Click to edit Master title style</a:t>
             </a:r>
-            <a:endParaRPr lang="en-US"/>
           </a:p>
         </p:txBody>
       </p:sp>
@@ -3019,38 +3002,37 @@
           <a:p>
             <a:pPr lvl="0"/>
             <a:r>
-              <a:rPr lang="en-US" smtClean="0"/>
+              <a:rPr lang="en-US"/>
               <a:t>Click to edit Master text styles</a:t>
             </a:r>
           </a:p>
           <a:p>
             <a:pPr lvl="1"/>
             <a:r>
-              <a:rPr lang="en-US" smtClean="0"/>
+              <a:rPr lang="en-US"/>
               <a:t>Second level</a:t>
             </a:r>
           </a:p>
           <a:p>
             <a:pPr lvl="2"/>
             <a:r>
-              <a:rPr lang="en-US" smtClean="0"/>
+              <a:rPr lang="en-US"/>
               <a:t>Third level</a:t>
             </a:r>
           </a:p>
           <a:p>
             <a:pPr lvl="3"/>
             <a:r>
-              <a:rPr lang="en-US" smtClean="0"/>
+              <a:rPr lang="en-US"/>
               <a:t>Fourth level</a:t>
             </a:r>
           </a:p>
           <a:p>
             <a:pPr lvl="4"/>
             <a:r>
-              <a:rPr lang="en-US" smtClean="0"/>
+              <a:rPr lang="en-US"/>
               <a:t>Fifth level</a:t>
             </a:r>
-            <a:endParaRPr lang="en-US"/>
           </a:p>
         </p:txBody>
       </p:sp>
@@ -3089,7 +3071,7 @@
           <a:p>
             <a:fld id="{78C97017-6FC3-485B-9764-EAC9E56C1D49}" type="datetimeFigureOut">
               <a:rPr lang="en-US" smtClean="0"/>
-              <a:t>1/1/18</a:t>
+              <a:t>4/10/2018</a:t>
             </a:fld>
             <a:endParaRPr lang="en-US"/>
           </a:p>
@@ -3473,7 +3455,7 @@
         <p:spPr>
           <a:xfrm>
             <a:off x="1119865" y="1727200"/>
-            <a:ext cx="7490735" cy="2997200"/>
+            <a:ext cx="7490735" cy="4140200"/>
           </a:xfrm>
           <a:prstGeom prst="roundRect">
             <a:avLst>
@@ -3510,7 +3492,7 @@
           <a:lstStyle/>
           <a:p>
             <a:r>
-              <a:rPr lang="en-US" sz="1200" b="1" dirty="0" smtClean="0">
+              <a:rPr lang="en-US" sz="1200" b="1" dirty="0">
                 <a:solidFill>
                   <a:srgbClr val="7030A0"/>
                 </a:solidFill>
@@ -3569,7 +3551,7 @@
           <a:p>
             <a:pPr algn="ctr"/>
             <a:r>
-              <a:rPr lang="en-US" sz="1050" dirty="0" err="1" smtClean="0">
+              <a:rPr lang="en-US" sz="1050" dirty="0" err="1">
                 <a:solidFill>
                   <a:schemeClr val="bg1"/>
                 </a:solidFill>
@@ -3628,7 +3610,7 @@
           <a:p>
             <a:pPr algn="ctr"/>
             <a:r>
-              <a:rPr lang="en-US" sz="1050" dirty="0" err="1" smtClean="0">
+              <a:rPr lang="en-US" sz="1050" dirty="0" err="1">
                 <a:solidFill>
                   <a:schemeClr val="bg1"/>
                 </a:solidFill>
@@ -3742,7 +3724,7 @@
           <a:p>
             <a:pPr algn="ctr"/>
             <a:r>
-              <a:rPr lang="en-US" sz="1050" dirty="0" smtClean="0">
+              <a:rPr lang="en-US" sz="1050" dirty="0">
                 <a:solidFill>
                   <a:schemeClr val="bg1"/>
                 </a:solidFill>
@@ -4015,7 +3997,7 @@
           <a:p>
             <a:pPr algn="ctr"/>
             <a:r>
-              <a:rPr lang="en-US" sz="1050" dirty="0" err="1" smtClean="0">
+              <a:rPr lang="en-US" sz="1050" dirty="0" err="1">
                 <a:solidFill>
                   <a:srgbClr val="7030A0"/>
                 </a:solidFill>
@@ -4157,7 +4139,7 @@
           <a:p>
             <a:pPr algn="ctr"/>
             <a:r>
-              <a:rPr lang="en-US" sz="1050" dirty="0" err="1" smtClean="0">
+              <a:rPr lang="en-US" sz="1050" dirty="0" err="1">
                 <a:solidFill>
                   <a:srgbClr val="7030A0"/>
                 </a:solidFill>
@@ -4301,7 +4283,7 @@
           <a:p>
             <a:pPr algn="ctr"/>
             <a:r>
-              <a:rPr lang="en-US" sz="1050" dirty="0" err="1" smtClean="0">
+              <a:rPr lang="en-US" sz="1050" dirty="0" err="1">
                 <a:solidFill>
                   <a:srgbClr val="7030A0"/>
                 </a:solidFill>
@@ -4400,7 +4382,7 @@
           <a:p>
             <a:pPr algn="ctr"/>
             <a:r>
-              <a:rPr lang="en-US" sz="1050" dirty="0" smtClean="0">
+              <a:rPr lang="en-US" sz="1050" dirty="0">
                 <a:solidFill>
                   <a:srgbClr val="7030A0"/>
                 </a:solidFill>
@@ -4456,7 +4438,7 @@
           <a:lstStyle/>
           <a:p>
             <a:pPr algn="ctr"/>
-            <a:endParaRPr lang="en-US" sz="1050"/>
+            <a:endParaRPr lang="en-US" sz="1050" dirty="0"/>
           </a:p>
         </p:txBody>
       </p:sp>
@@ -4542,7 +4524,7 @@
           <a:p>
             <a:pPr algn="ctr"/>
             <a:r>
-              <a:rPr lang="en-US" sz="1050" dirty="0" smtClean="0">
+              <a:rPr lang="en-US" sz="1050" dirty="0">
                 <a:solidFill>
                   <a:srgbClr val="7030A0"/>
                 </a:solidFill>
@@ -4684,7 +4666,7 @@
           <a:p>
             <a:pPr algn="ctr"/>
             <a:r>
-              <a:rPr lang="en-US" sz="1050" dirty="0" smtClean="0">
+              <a:rPr lang="en-US" sz="1050" dirty="0">
                 <a:solidFill>
                   <a:srgbClr val="7030A0"/>
                 </a:solidFill>
@@ -4828,7 +4810,7 @@
           <a:p>
             <a:pPr algn="ctr"/>
             <a:r>
-              <a:rPr lang="en-US" sz="1050" dirty="0" smtClean="0">
+              <a:rPr lang="en-US" sz="1050" dirty="0">
                 <a:solidFill>
                   <a:srgbClr val="7030A0"/>
                 </a:solidFill>
@@ -4925,7 +4907,7 @@
           <a:p>
             <a:pPr algn="ctr"/>
             <a:r>
-              <a:rPr lang="en-US" sz="1050" dirty="0" smtClean="0">
+              <a:rPr lang="en-US" sz="1050" dirty="0">
                 <a:solidFill>
                   <a:srgbClr val="7030A0"/>
                 </a:solidFill>
@@ -5022,7 +5004,7 @@
           <a:p>
             <a:pPr algn="ctr"/>
             <a:r>
-              <a:rPr lang="en-US" sz="1050" dirty="0" smtClean="0">
+              <a:rPr lang="en-US" sz="1050" dirty="0">
                 <a:solidFill>
                   <a:srgbClr val="7030A0"/>
                 </a:solidFill>
@@ -5210,7 +5192,7 @@
           <a:p>
             <a:pPr algn="ctr"/>
             <a:r>
-              <a:rPr lang="en-US" sz="1050" dirty="0" smtClean="0">
+              <a:rPr lang="en-US" sz="1050" dirty="0">
                 <a:solidFill>
                   <a:srgbClr val="7030A0"/>
                 </a:solidFill>
@@ -5218,14 +5200,14 @@
               <a:t>&lt;&lt;interface&gt;&gt;</a:t>
             </a:r>
             <a:br>
-              <a:rPr lang="en-US" sz="1050" dirty="0" smtClean="0">
+              <a:rPr lang="en-US" sz="1050" dirty="0">
                 <a:solidFill>
                   <a:srgbClr val="7030A0"/>
                 </a:solidFill>
               </a:rPr>
             </a:br>
             <a:r>
-              <a:rPr lang="en-US" sz="1050" dirty="0" err="1" smtClean="0">
+              <a:rPr lang="en-US" sz="1050" dirty="0" err="1">
                 <a:solidFill>
                   <a:srgbClr val="7030A0"/>
                 </a:solidFill>
@@ -5264,7 +5246,7 @@
           <a:p>
             <a:pPr algn="r"/>
             <a:r>
-              <a:rPr lang="en-US" sz="1100" dirty="0" smtClean="0">
+              <a:rPr lang="en-US" sz="1100" dirty="0">
                 <a:solidFill>
                   <a:srgbClr val="7030A0"/>
                 </a:solidFill>
@@ -5320,20 +5302,12 @@
           <a:p>
             <a:pPr algn="ctr"/>
             <a:r>
-              <a:rPr lang="en-US" sz="1050" dirty="0" smtClean="0">
+              <a:rPr lang="en-US" sz="1050" dirty="0">
                 <a:solidFill>
                   <a:srgbClr val="7030A0"/>
                 </a:solidFill>
               </a:rPr>
               <a:t>&lt;&lt;interface&gt;&gt;</a:t>
-            </a:r>
-            <a:r>
-              <a:rPr lang="en-US" sz="1050">
-                <a:solidFill>
-                  <a:srgbClr val="7030A0"/>
-                </a:solidFill>
-              </a:rPr>
-              <a:t/>
             </a:r>
             <a:br>
               <a:rPr lang="en-US" sz="1050">
@@ -5343,7 +5317,7 @@
               </a:rPr>
             </a:br>
             <a:r>
-              <a:rPr lang="en-US" sz="1050" dirty="0" err="1" smtClean="0">
+              <a:rPr lang="en-US" sz="1050" dirty="0" err="1">
                 <a:solidFill>
                   <a:srgbClr val="7030A0"/>
                 </a:solidFill>
@@ -5465,7 +5439,7 @@
           <a:p>
             <a:pPr algn="ctr"/>
             <a:r>
-              <a:rPr lang="en-US" sz="1100" dirty="0" smtClean="0">
+              <a:rPr lang="en-US" sz="1100" dirty="0">
                 <a:solidFill>
                   <a:srgbClr val="7030A0"/>
                 </a:solidFill>
@@ -5504,7 +5478,7 @@
           <a:p>
             <a:pPr algn="ctr"/>
             <a:r>
-              <a:rPr lang="en-US" sz="1100" dirty="0" smtClean="0">
+              <a:rPr lang="en-US" sz="1100" dirty="0">
                 <a:solidFill>
                   <a:srgbClr val="7030A0"/>
                 </a:solidFill>
@@ -5543,7 +5517,7 @@
           <a:p>
             <a:pPr algn="ctr"/>
             <a:r>
-              <a:rPr lang="en-US" sz="1100" dirty="0" smtClean="0">
+              <a:rPr lang="en-US" sz="1100" dirty="0">
                 <a:solidFill>
                   <a:srgbClr val="7030A0"/>
                 </a:solidFill>
@@ -5582,7 +5556,7 @@
           <a:p>
             <a:pPr algn="ctr"/>
             <a:r>
-              <a:rPr lang="en-US" sz="1100" dirty="0" smtClean="0">
+              <a:rPr lang="en-US" sz="1100" dirty="0">
                 <a:solidFill>
                   <a:srgbClr val="7030A0"/>
                 </a:solidFill>
@@ -5605,7 +5579,7 @@
         </p:nvSpPr>
         <p:spPr>
           <a:xfrm>
-            <a:off x="6135256" y="3097917"/>
+            <a:off x="6135407" y="3097917"/>
             <a:ext cx="189257" cy="178683"/>
           </a:xfrm>
           <a:prstGeom prst="rect">
@@ -5621,7 +5595,7 @@
           <a:p>
             <a:pPr algn="ctr"/>
             <a:r>
-              <a:rPr lang="en-US" sz="1100" dirty="0" smtClean="0">
+              <a:rPr lang="en-US" sz="1100" dirty="0">
                 <a:solidFill>
                   <a:srgbClr val="7030A0"/>
                 </a:solidFill>
@@ -5660,7 +5634,7 @@
           <a:p>
             <a:pPr algn="ctr"/>
             <a:r>
-              <a:rPr lang="en-US" sz="1100" dirty="0" smtClean="0">
+              <a:rPr lang="en-US" sz="1100" dirty="0">
                 <a:solidFill>
                   <a:srgbClr val="7030A0"/>
                 </a:solidFill>
@@ -5699,7 +5673,7 @@
           <a:p>
             <a:pPr algn="ctr"/>
             <a:r>
-              <a:rPr lang="en-US" sz="1100" dirty="0" smtClean="0">
+              <a:rPr lang="en-US" sz="1100" dirty="0">
                 <a:solidFill>
                   <a:srgbClr val="7030A0"/>
                 </a:solidFill>
@@ -5738,12 +5712,1185 @@
           <a:p>
             <a:pPr algn="ctr"/>
             <a:r>
-              <a:rPr lang="en-US" sz="1100" dirty="0" smtClean="0">
+              <a:rPr lang="en-US" sz="1100" dirty="0">
                 <a:solidFill>
                   <a:srgbClr val="7030A0"/>
                 </a:solidFill>
               </a:rPr>
               <a:t>1</a:t>
+            </a:r>
+            <a:endParaRPr lang="en-SG" sz="1100" dirty="0">
+              <a:solidFill>
+                <a:srgbClr val="7030A0"/>
+              </a:solidFill>
+            </a:endParaRPr>
+          </a:p>
+        </p:txBody>
+      </p:sp>
+      <p:sp>
+        <p:nvSpPr>
+          <p:cNvPr id="52" name="Rectangle 8">
+            <a:extLst>
+              <a:ext uri="{FF2B5EF4-FFF2-40B4-BE49-F238E27FC236}">
+                <a16:creationId xmlns:a16="http://schemas.microsoft.com/office/drawing/2014/main" id="{BE892E0A-0896-43CB-84A6-65847C3D27E1}"/>
+              </a:ext>
+            </a:extLst>
+          </p:cNvPr>
+          <p:cNvSpPr/>
+          <p:nvPr/>
+        </p:nvSpPr>
+        <p:spPr>
+          <a:xfrm>
+            <a:off x="4490084" y="3419099"/>
+            <a:ext cx="1156969" cy="346760"/>
+          </a:xfrm>
+          <a:prstGeom prst="rect">
+            <a:avLst/>
+          </a:prstGeom>
+          <a:ln w="19050">
+            <a:solidFill>
+              <a:srgbClr val="7030A0"/>
+            </a:solidFill>
+          </a:ln>
+          <a:effectLst/>
+        </p:spPr>
+        <p:style>
+          <a:lnRef idx="1">
+            <a:schemeClr val="accent4"/>
+          </a:lnRef>
+          <a:fillRef idx="2">
+            <a:schemeClr val="accent4"/>
+          </a:fillRef>
+          <a:effectRef idx="1">
+            <a:schemeClr val="accent4"/>
+          </a:effectRef>
+          <a:fontRef idx="minor">
+            <a:schemeClr val="dk1"/>
+          </a:fontRef>
+        </p:style>
+        <p:txBody>
+          <a:bodyPr rtlCol="0" anchor="ctr"/>
+          <a:lstStyle/>
+          <a:p>
+            <a:pPr algn="ctr"/>
+            <a:r>
+              <a:rPr lang="en-US" sz="1050" dirty="0">
+                <a:solidFill>
+                  <a:srgbClr val="7030A0"/>
+                </a:solidFill>
+              </a:rPr>
+              <a:t>Unique</a:t>
+            </a:r>
+          </a:p>
+          <a:p>
+            <a:pPr algn="ctr"/>
+            <a:r>
+              <a:rPr lang="en-US" sz="1050" dirty="0" err="1">
+                <a:solidFill>
+                  <a:srgbClr val="7030A0"/>
+                </a:solidFill>
+              </a:rPr>
+              <a:t>AppointmentList</a:t>
+            </a:r>
+            <a:endParaRPr lang="en-SG" sz="1050" dirty="0">
+              <a:solidFill>
+                <a:srgbClr val="7030A0"/>
+              </a:solidFill>
+            </a:endParaRPr>
+          </a:p>
+        </p:txBody>
+      </p:sp>
+      <p:cxnSp>
+        <p:nvCxnSpPr>
+          <p:cNvPr id="71" name="Elbow Connector 63">
+            <a:extLst>
+              <a:ext uri="{FF2B5EF4-FFF2-40B4-BE49-F238E27FC236}">
+                <a16:creationId xmlns:a16="http://schemas.microsoft.com/office/drawing/2014/main" id="{69CEB31D-36BA-4D2C-A0E4-A3B8D5B76D67}"/>
+              </a:ext>
+            </a:extLst>
+          </p:cNvPr>
+          <p:cNvCxnSpPr>
+            <a:cxnSpLocks/>
+          </p:cNvCxnSpPr>
+          <p:nvPr/>
+        </p:nvCxnSpPr>
+        <p:spPr>
+          <a:xfrm rot="16200000" flipH="1">
+            <a:off x="4132212" y="3245294"/>
+            <a:ext cx="588061" cy="145112"/>
+          </a:xfrm>
+          <a:prstGeom prst="bentConnector3">
+            <a:avLst>
+              <a:gd name="adj1" fmla="val 99759"/>
+            </a:avLst>
+          </a:prstGeom>
+          <a:ln w="19050">
+            <a:solidFill>
+              <a:srgbClr val="7030A0"/>
+            </a:solidFill>
+            <a:headEnd type="none" w="med" len="med"/>
+            <a:tailEnd type="arrow" w="med" len="med"/>
+          </a:ln>
+          <a:effectLst/>
+        </p:spPr>
+        <p:style>
+          <a:lnRef idx="1">
+            <a:schemeClr val="accent2"/>
+          </a:lnRef>
+          <a:fillRef idx="2">
+            <a:schemeClr val="accent2"/>
+          </a:fillRef>
+          <a:effectRef idx="1">
+            <a:schemeClr val="accent2"/>
+          </a:effectRef>
+          <a:fontRef idx="minor">
+            <a:schemeClr val="dk1"/>
+          </a:fontRef>
+        </p:style>
+      </p:cxnSp>
+      <p:sp>
+        <p:nvSpPr>
+          <p:cNvPr id="72" name="TextBox 71">
+            <a:extLst>
+              <a:ext uri="{FF2B5EF4-FFF2-40B4-BE49-F238E27FC236}">
+                <a16:creationId xmlns:a16="http://schemas.microsoft.com/office/drawing/2014/main" id="{B22D2FC6-C76C-449E-905B-69C67F54AAD2}"/>
+              </a:ext>
+            </a:extLst>
+          </p:cNvPr>
+          <p:cNvSpPr txBox="1"/>
+          <p:nvPr/>
+        </p:nvSpPr>
+        <p:spPr>
+          <a:xfrm>
+            <a:off x="4324972" y="3397594"/>
+            <a:ext cx="189257" cy="178683"/>
+          </a:xfrm>
+          <a:prstGeom prst="rect">
+            <a:avLst/>
+          </a:prstGeom>
+          <a:noFill/>
+        </p:spPr>
+        <p:txBody>
+          <a:bodyPr wrap="square" lIns="0" tIns="0" rIns="0" bIns="0" rtlCol="0">
+            <a:noAutofit/>
+          </a:bodyPr>
+          <a:lstStyle/>
+          <a:p>
+            <a:pPr algn="ctr"/>
+            <a:r>
+              <a:rPr lang="en-US" sz="1100" dirty="0">
+                <a:solidFill>
+                  <a:srgbClr val="7030A0"/>
+                </a:solidFill>
+              </a:rPr>
+              <a:t>1</a:t>
+            </a:r>
+            <a:endParaRPr lang="en-SG" sz="1100" dirty="0">
+              <a:solidFill>
+                <a:srgbClr val="7030A0"/>
+              </a:solidFill>
+            </a:endParaRPr>
+          </a:p>
+        </p:txBody>
+      </p:sp>
+      <p:sp>
+        <p:nvSpPr>
+          <p:cNvPr id="73" name="Flowchart: Decision 96">
+            <a:extLst>
+              <a:ext uri="{FF2B5EF4-FFF2-40B4-BE49-F238E27FC236}">
+                <a16:creationId xmlns:a16="http://schemas.microsoft.com/office/drawing/2014/main" id="{8B43817C-B372-4D9D-9AF4-EC9B996F3910}"/>
+              </a:ext>
+            </a:extLst>
+          </p:cNvPr>
+          <p:cNvSpPr/>
+          <p:nvPr/>
+        </p:nvSpPr>
+        <p:spPr>
+          <a:xfrm>
+            <a:off x="5650792" y="3518258"/>
+            <a:ext cx="236048" cy="173380"/>
+          </a:xfrm>
+          <a:prstGeom prst="flowChartDecision">
+            <a:avLst/>
+          </a:prstGeom>
+          <a:noFill/>
+          <a:ln w="19050">
+            <a:solidFill>
+              <a:srgbClr val="7030A0"/>
+            </a:solidFill>
+          </a:ln>
+          <a:effectLst/>
+        </p:spPr>
+        <p:style>
+          <a:lnRef idx="1">
+            <a:schemeClr val="accent6"/>
+          </a:lnRef>
+          <a:fillRef idx="2">
+            <a:schemeClr val="accent6"/>
+          </a:fillRef>
+          <a:effectRef idx="1">
+            <a:schemeClr val="accent6"/>
+          </a:effectRef>
+          <a:fontRef idx="minor">
+            <a:schemeClr val="dk1"/>
+          </a:fontRef>
+        </p:style>
+        <p:txBody>
+          <a:bodyPr rtlCol="0" anchor="ctr"/>
+          <a:lstStyle/>
+          <a:p>
+            <a:pPr algn="ctr"/>
+            <a:endParaRPr lang="en-US" sz="1050" dirty="0"/>
+          </a:p>
+        </p:txBody>
+      </p:sp>
+      <p:cxnSp>
+        <p:nvCxnSpPr>
+          <p:cNvPr id="74" name="Elbow Connector 63">
+            <a:extLst>
+              <a:ext uri="{FF2B5EF4-FFF2-40B4-BE49-F238E27FC236}">
+                <a16:creationId xmlns:a16="http://schemas.microsoft.com/office/drawing/2014/main" id="{611A4D57-E50B-478C-B13D-DC589A5D45E1}"/>
+              </a:ext>
+            </a:extLst>
+          </p:cNvPr>
+          <p:cNvCxnSpPr>
+            <a:cxnSpLocks/>
+            <a:endCxn id="87" idx="0"/>
+          </p:cNvCxnSpPr>
+          <p:nvPr/>
+        </p:nvCxnSpPr>
+        <p:spPr>
+          <a:xfrm rot="16200000" flipH="1">
+            <a:off x="5719031" y="3769832"/>
+            <a:ext cx="957636" cy="643014"/>
+          </a:xfrm>
+          <a:prstGeom prst="bentConnector3">
+            <a:avLst>
+              <a:gd name="adj1" fmla="val 50000"/>
+            </a:avLst>
+          </a:prstGeom>
+          <a:ln w="19050">
+            <a:solidFill>
+              <a:srgbClr val="7030A0"/>
+            </a:solidFill>
+            <a:headEnd type="none" w="med" len="med"/>
+            <a:tailEnd type="arrow" w="med" len="med"/>
+          </a:ln>
+          <a:effectLst/>
+        </p:spPr>
+        <p:style>
+          <a:lnRef idx="1">
+            <a:schemeClr val="accent2"/>
+          </a:lnRef>
+          <a:fillRef idx="2">
+            <a:schemeClr val="accent2"/>
+          </a:fillRef>
+          <a:effectRef idx="1">
+            <a:schemeClr val="accent2"/>
+          </a:effectRef>
+          <a:fontRef idx="minor">
+            <a:schemeClr val="dk1"/>
+          </a:fontRef>
+        </p:style>
+      </p:cxnSp>
+      <p:sp>
+        <p:nvSpPr>
+          <p:cNvPr id="87" name="Rectangle 8">
+            <a:extLst>
+              <a:ext uri="{FF2B5EF4-FFF2-40B4-BE49-F238E27FC236}">
+                <a16:creationId xmlns:a16="http://schemas.microsoft.com/office/drawing/2014/main" id="{947AAAAE-C40B-4B03-9D21-022C0D9256F1}"/>
+              </a:ext>
+            </a:extLst>
+          </p:cNvPr>
+          <p:cNvSpPr/>
+          <p:nvPr/>
+        </p:nvSpPr>
+        <p:spPr>
+          <a:xfrm>
+            <a:off x="6019800" y="4570157"/>
+            <a:ext cx="999111" cy="346760"/>
+          </a:xfrm>
+          <a:prstGeom prst="rect">
+            <a:avLst/>
+          </a:prstGeom>
+          <a:ln w="19050">
+            <a:solidFill>
+              <a:srgbClr val="7030A0"/>
+            </a:solidFill>
+          </a:ln>
+          <a:effectLst/>
+        </p:spPr>
+        <p:style>
+          <a:lnRef idx="1">
+            <a:schemeClr val="accent4"/>
+          </a:lnRef>
+          <a:fillRef idx="2">
+            <a:schemeClr val="accent4"/>
+          </a:fillRef>
+          <a:effectRef idx="1">
+            <a:schemeClr val="accent4"/>
+          </a:effectRef>
+          <a:fontRef idx="minor">
+            <a:schemeClr val="dk1"/>
+          </a:fontRef>
+        </p:style>
+        <p:txBody>
+          <a:bodyPr rtlCol="0" anchor="ctr"/>
+          <a:lstStyle/>
+          <a:p>
+            <a:pPr algn="ctr"/>
+            <a:r>
+              <a:rPr lang="en-US" sz="1050" dirty="0">
+                <a:solidFill>
+                  <a:srgbClr val="7030A0"/>
+                </a:solidFill>
+              </a:rPr>
+              <a:t>Appointment</a:t>
+            </a:r>
+            <a:endParaRPr lang="en-SG" sz="1050" dirty="0">
+              <a:solidFill>
+                <a:srgbClr val="7030A0"/>
+              </a:solidFill>
+            </a:endParaRPr>
+          </a:p>
+        </p:txBody>
+      </p:sp>
+      <p:sp>
+        <p:nvSpPr>
+          <p:cNvPr id="94" name="Rectangle 8">
+            <a:extLst>
+              <a:ext uri="{FF2B5EF4-FFF2-40B4-BE49-F238E27FC236}">
+                <a16:creationId xmlns:a16="http://schemas.microsoft.com/office/drawing/2014/main" id="{F5DBF1E9-0751-4176-B5BE-4C5C9C06DA1F}"/>
+              </a:ext>
+            </a:extLst>
+          </p:cNvPr>
+          <p:cNvSpPr/>
+          <p:nvPr/>
+        </p:nvSpPr>
+        <p:spPr>
+          <a:xfrm>
+            <a:off x="7712397" y="4263385"/>
+            <a:ext cx="708186" cy="285783"/>
+          </a:xfrm>
+          <a:prstGeom prst="rect">
+            <a:avLst/>
+          </a:prstGeom>
+          <a:ln w="19050">
+            <a:solidFill>
+              <a:srgbClr val="7030A0"/>
+            </a:solidFill>
+          </a:ln>
+          <a:effectLst/>
+        </p:spPr>
+        <p:style>
+          <a:lnRef idx="1">
+            <a:schemeClr val="accent4"/>
+          </a:lnRef>
+          <a:fillRef idx="2">
+            <a:schemeClr val="accent4"/>
+          </a:fillRef>
+          <a:effectRef idx="1">
+            <a:schemeClr val="accent4"/>
+          </a:effectRef>
+          <a:fontRef idx="minor">
+            <a:schemeClr val="dk1"/>
+          </a:fontRef>
+        </p:style>
+        <p:txBody>
+          <a:bodyPr rtlCol="0" anchor="ctr"/>
+          <a:lstStyle/>
+          <a:p>
+            <a:pPr algn="ctr"/>
+            <a:r>
+              <a:rPr lang="en-US" sz="1050" dirty="0">
+                <a:solidFill>
+                  <a:srgbClr val="7030A0"/>
+                </a:solidFill>
+              </a:rPr>
+              <a:t>Person</a:t>
+            </a:r>
+          </a:p>
+          <a:p>
+            <a:pPr algn="ctr"/>
+            <a:r>
+              <a:rPr lang="en-US" sz="1050" dirty="0">
+                <a:solidFill>
+                  <a:srgbClr val="7030A0"/>
+                </a:solidFill>
+              </a:rPr>
+              <a:t>Name</a:t>
+            </a:r>
+            <a:endParaRPr lang="en-SG" sz="1050" dirty="0">
+              <a:solidFill>
+                <a:srgbClr val="7030A0"/>
+              </a:solidFill>
+            </a:endParaRPr>
+          </a:p>
+        </p:txBody>
+      </p:sp>
+      <p:sp>
+        <p:nvSpPr>
+          <p:cNvPr id="95" name="Flowchart: Decision 96">
+            <a:extLst>
+              <a:ext uri="{FF2B5EF4-FFF2-40B4-BE49-F238E27FC236}">
+                <a16:creationId xmlns:a16="http://schemas.microsoft.com/office/drawing/2014/main" id="{A7863D07-5324-483E-8D76-6F90BE0692F8}"/>
+              </a:ext>
+            </a:extLst>
+          </p:cNvPr>
+          <p:cNvSpPr/>
+          <p:nvPr/>
+        </p:nvSpPr>
+        <p:spPr>
+          <a:xfrm>
+            <a:off x="7041947" y="4647348"/>
+            <a:ext cx="236048" cy="173380"/>
+          </a:xfrm>
+          <a:prstGeom prst="flowChartDecision">
+            <a:avLst/>
+          </a:prstGeom>
+          <a:solidFill>
+            <a:srgbClr val="7030A0"/>
+          </a:solidFill>
+          <a:ln w="19050">
+            <a:solidFill>
+              <a:srgbClr val="7030A0"/>
+            </a:solidFill>
+          </a:ln>
+          <a:effectLst/>
+        </p:spPr>
+        <p:style>
+          <a:lnRef idx="1">
+            <a:schemeClr val="accent6"/>
+          </a:lnRef>
+          <a:fillRef idx="2">
+            <a:schemeClr val="accent6"/>
+          </a:fillRef>
+          <a:effectRef idx="1">
+            <a:schemeClr val="accent6"/>
+          </a:effectRef>
+          <a:fontRef idx="minor">
+            <a:schemeClr val="dk1"/>
+          </a:fontRef>
+        </p:style>
+        <p:txBody>
+          <a:bodyPr rtlCol="0" anchor="ctr"/>
+          <a:lstStyle/>
+          <a:p>
+            <a:pPr algn="ctr"/>
+            <a:endParaRPr lang="en-US" sz="1050"/>
+          </a:p>
+        </p:txBody>
+      </p:sp>
+      <p:cxnSp>
+        <p:nvCxnSpPr>
+          <p:cNvPr id="96" name="Elbow Connector 78">
+            <a:extLst>
+              <a:ext uri="{FF2B5EF4-FFF2-40B4-BE49-F238E27FC236}">
+                <a16:creationId xmlns:a16="http://schemas.microsoft.com/office/drawing/2014/main" id="{8EA42B6D-E8C4-4B59-A95C-1A147F5EA39B}"/>
+              </a:ext>
+            </a:extLst>
+          </p:cNvPr>
+          <p:cNvCxnSpPr>
+            <a:stCxn id="95" idx="3"/>
+            <a:endCxn id="94" idx="1"/>
+          </p:cNvCxnSpPr>
+          <p:nvPr/>
+        </p:nvCxnSpPr>
+        <p:spPr>
+          <a:xfrm flipV="1">
+            <a:off x="7277995" y="4406277"/>
+            <a:ext cx="434402" cy="327761"/>
+          </a:xfrm>
+          <a:prstGeom prst="bentConnector3">
+            <a:avLst/>
+          </a:prstGeom>
+          <a:ln w="19050">
+            <a:solidFill>
+              <a:srgbClr val="7030A0"/>
+            </a:solidFill>
+            <a:headEnd type="none" w="med" len="med"/>
+            <a:tailEnd type="arrow" w="med" len="med"/>
+          </a:ln>
+          <a:effectLst/>
+        </p:spPr>
+        <p:style>
+          <a:lnRef idx="1">
+            <a:schemeClr val="accent2"/>
+          </a:lnRef>
+          <a:fillRef idx="2">
+            <a:schemeClr val="accent2"/>
+          </a:fillRef>
+          <a:effectRef idx="1">
+            <a:schemeClr val="accent2"/>
+          </a:effectRef>
+          <a:fontRef idx="minor">
+            <a:schemeClr val="dk1"/>
+          </a:fontRef>
+        </p:style>
+      </p:cxnSp>
+      <p:sp>
+        <p:nvSpPr>
+          <p:cNvPr id="98" name="Rectangle 8">
+            <a:extLst>
+              <a:ext uri="{FF2B5EF4-FFF2-40B4-BE49-F238E27FC236}">
+                <a16:creationId xmlns:a16="http://schemas.microsoft.com/office/drawing/2014/main" id="{03B91E18-3CF0-4A07-A70A-EC58BBCCDC95}"/>
+              </a:ext>
+            </a:extLst>
+          </p:cNvPr>
+          <p:cNvSpPr/>
+          <p:nvPr/>
+        </p:nvSpPr>
+        <p:spPr>
+          <a:xfrm>
+            <a:off x="7712397" y="4586363"/>
+            <a:ext cx="708186" cy="285783"/>
+          </a:xfrm>
+          <a:prstGeom prst="rect">
+            <a:avLst/>
+          </a:prstGeom>
+          <a:ln w="19050">
+            <a:solidFill>
+              <a:srgbClr val="7030A0"/>
+            </a:solidFill>
+          </a:ln>
+          <a:effectLst/>
+        </p:spPr>
+        <p:style>
+          <a:lnRef idx="1">
+            <a:schemeClr val="accent4"/>
+          </a:lnRef>
+          <a:fillRef idx="2">
+            <a:schemeClr val="accent4"/>
+          </a:fillRef>
+          <a:effectRef idx="1">
+            <a:schemeClr val="accent4"/>
+          </a:effectRef>
+          <a:fontRef idx="minor">
+            <a:schemeClr val="dk1"/>
+          </a:fontRef>
+        </p:style>
+        <p:txBody>
+          <a:bodyPr rtlCol="0" anchor="ctr"/>
+          <a:lstStyle/>
+          <a:p>
+            <a:pPr algn="ctr"/>
+            <a:r>
+              <a:rPr lang="en-US" sz="1050" dirty="0">
+                <a:solidFill>
+                  <a:srgbClr val="7030A0"/>
+                </a:solidFill>
+              </a:rPr>
+              <a:t>Date</a:t>
+            </a:r>
+            <a:endParaRPr lang="en-SG" sz="1050" dirty="0">
+              <a:solidFill>
+                <a:srgbClr val="7030A0"/>
+              </a:solidFill>
+            </a:endParaRPr>
+          </a:p>
+        </p:txBody>
+      </p:sp>
+      <p:cxnSp>
+        <p:nvCxnSpPr>
+          <p:cNvPr id="101" name="Elbow Connector 80">
+            <a:extLst>
+              <a:ext uri="{FF2B5EF4-FFF2-40B4-BE49-F238E27FC236}">
+                <a16:creationId xmlns:a16="http://schemas.microsoft.com/office/drawing/2014/main" id="{DD9538BC-19C6-4EDD-80A0-6C4A69E7700A}"/>
+              </a:ext>
+            </a:extLst>
+          </p:cNvPr>
+          <p:cNvCxnSpPr>
+            <a:stCxn id="95" idx="3"/>
+            <a:endCxn id="98" idx="1"/>
+          </p:cNvCxnSpPr>
+          <p:nvPr/>
+        </p:nvCxnSpPr>
+        <p:spPr>
+          <a:xfrm flipV="1">
+            <a:off x="7277995" y="4729255"/>
+            <a:ext cx="434402" cy="4783"/>
+          </a:xfrm>
+          <a:prstGeom prst="bentConnector3">
+            <a:avLst/>
+          </a:prstGeom>
+          <a:ln w="19050">
+            <a:solidFill>
+              <a:srgbClr val="7030A0"/>
+            </a:solidFill>
+            <a:headEnd type="none" w="med" len="med"/>
+            <a:tailEnd type="arrow" w="med" len="med"/>
+          </a:ln>
+          <a:effectLst/>
+        </p:spPr>
+        <p:style>
+          <a:lnRef idx="1">
+            <a:schemeClr val="accent2"/>
+          </a:lnRef>
+          <a:fillRef idx="2">
+            <a:schemeClr val="accent2"/>
+          </a:fillRef>
+          <a:effectRef idx="1">
+            <a:schemeClr val="accent2"/>
+          </a:effectRef>
+          <a:fontRef idx="minor">
+            <a:schemeClr val="dk1"/>
+          </a:fontRef>
+        </p:style>
+      </p:cxnSp>
+      <p:sp>
+        <p:nvSpPr>
+          <p:cNvPr id="102" name="Rectangle 8">
+            <a:extLst>
+              <a:ext uri="{FF2B5EF4-FFF2-40B4-BE49-F238E27FC236}">
+                <a16:creationId xmlns:a16="http://schemas.microsoft.com/office/drawing/2014/main" id="{097025E9-B840-4123-93D6-B9899FF8D6E3}"/>
+              </a:ext>
+            </a:extLst>
+          </p:cNvPr>
+          <p:cNvSpPr/>
+          <p:nvPr/>
+        </p:nvSpPr>
+        <p:spPr>
+          <a:xfrm>
+            <a:off x="7712397" y="4909341"/>
+            <a:ext cx="708186" cy="285783"/>
+          </a:xfrm>
+          <a:prstGeom prst="rect">
+            <a:avLst/>
+          </a:prstGeom>
+          <a:ln w="19050">
+            <a:solidFill>
+              <a:srgbClr val="7030A0"/>
+            </a:solidFill>
+          </a:ln>
+          <a:effectLst/>
+        </p:spPr>
+        <p:style>
+          <a:lnRef idx="1">
+            <a:schemeClr val="accent4"/>
+          </a:lnRef>
+          <a:fillRef idx="2">
+            <a:schemeClr val="accent4"/>
+          </a:fillRef>
+          <a:effectRef idx="1">
+            <a:schemeClr val="accent4"/>
+          </a:effectRef>
+          <a:fontRef idx="minor">
+            <a:schemeClr val="dk1"/>
+          </a:fontRef>
+        </p:style>
+        <p:txBody>
+          <a:bodyPr rtlCol="0" anchor="ctr"/>
+          <a:lstStyle/>
+          <a:p>
+            <a:pPr algn="ctr"/>
+            <a:r>
+              <a:rPr lang="en-US" sz="1050" dirty="0">
+                <a:solidFill>
+                  <a:srgbClr val="7030A0"/>
+                </a:solidFill>
+              </a:rPr>
+              <a:t>Start</a:t>
+            </a:r>
+          </a:p>
+          <a:p>
+            <a:pPr algn="ctr"/>
+            <a:r>
+              <a:rPr lang="en-US" sz="1050" dirty="0">
+                <a:solidFill>
+                  <a:srgbClr val="7030A0"/>
+                </a:solidFill>
+              </a:rPr>
+              <a:t>Time</a:t>
+            </a:r>
+            <a:endParaRPr lang="en-SG" sz="1050" dirty="0">
+              <a:solidFill>
+                <a:srgbClr val="7030A0"/>
+              </a:solidFill>
+            </a:endParaRPr>
+          </a:p>
+        </p:txBody>
+      </p:sp>
+      <p:cxnSp>
+        <p:nvCxnSpPr>
+          <p:cNvPr id="103" name="Elbow Connector 83">
+            <a:extLst>
+              <a:ext uri="{FF2B5EF4-FFF2-40B4-BE49-F238E27FC236}">
+                <a16:creationId xmlns:a16="http://schemas.microsoft.com/office/drawing/2014/main" id="{4E03355A-8750-4F01-B1E3-8CB0D484FB4E}"/>
+              </a:ext>
+            </a:extLst>
+          </p:cNvPr>
+          <p:cNvCxnSpPr>
+            <a:stCxn id="95" idx="3"/>
+            <a:endCxn id="102" idx="1"/>
+          </p:cNvCxnSpPr>
+          <p:nvPr/>
+        </p:nvCxnSpPr>
+        <p:spPr>
+          <a:xfrm>
+            <a:off x="7277995" y="4734038"/>
+            <a:ext cx="434402" cy="318195"/>
+          </a:xfrm>
+          <a:prstGeom prst="bentConnector3">
+            <a:avLst/>
+          </a:prstGeom>
+          <a:ln w="19050">
+            <a:solidFill>
+              <a:srgbClr val="7030A0"/>
+            </a:solidFill>
+            <a:headEnd type="none" w="med" len="med"/>
+            <a:tailEnd type="arrow" w="med" len="med"/>
+          </a:ln>
+          <a:effectLst/>
+        </p:spPr>
+        <p:style>
+          <a:lnRef idx="1">
+            <a:schemeClr val="accent2"/>
+          </a:lnRef>
+          <a:fillRef idx="2">
+            <a:schemeClr val="accent2"/>
+          </a:fillRef>
+          <a:effectRef idx="1">
+            <a:schemeClr val="accent2"/>
+          </a:effectRef>
+          <a:fontRef idx="minor">
+            <a:schemeClr val="dk1"/>
+          </a:fontRef>
+        </p:style>
+      </p:cxnSp>
+      <p:sp>
+        <p:nvSpPr>
+          <p:cNvPr id="104" name="Rectangle 8">
+            <a:extLst>
+              <a:ext uri="{FF2B5EF4-FFF2-40B4-BE49-F238E27FC236}">
+                <a16:creationId xmlns:a16="http://schemas.microsoft.com/office/drawing/2014/main" id="{99AD9A83-C339-4332-B10A-76873580A603}"/>
+              </a:ext>
+            </a:extLst>
+          </p:cNvPr>
+          <p:cNvSpPr/>
+          <p:nvPr/>
+        </p:nvSpPr>
+        <p:spPr>
+          <a:xfrm>
+            <a:off x="7712397" y="5232318"/>
+            <a:ext cx="708186" cy="285783"/>
+          </a:xfrm>
+          <a:prstGeom prst="rect">
+            <a:avLst/>
+          </a:prstGeom>
+          <a:ln w="19050">
+            <a:solidFill>
+              <a:srgbClr val="7030A0"/>
+            </a:solidFill>
+          </a:ln>
+          <a:effectLst/>
+        </p:spPr>
+        <p:style>
+          <a:lnRef idx="1">
+            <a:schemeClr val="accent4"/>
+          </a:lnRef>
+          <a:fillRef idx="2">
+            <a:schemeClr val="accent4"/>
+          </a:fillRef>
+          <a:effectRef idx="1">
+            <a:schemeClr val="accent4"/>
+          </a:effectRef>
+          <a:fontRef idx="minor">
+            <a:schemeClr val="dk1"/>
+          </a:fontRef>
+        </p:style>
+        <p:txBody>
+          <a:bodyPr rtlCol="0" anchor="ctr"/>
+          <a:lstStyle/>
+          <a:p>
+            <a:pPr algn="ctr"/>
+            <a:r>
+              <a:rPr lang="en-US" sz="1050" dirty="0" err="1">
+                <a:solidFill>
+                  <a:srgbClr val="7030A0"/>
+                </a:solidFill>
+              </a:rPr>
+              <a:t>EndTime</a:t>
+            </a:r>
+            <a:endParaRPr lang="en-SG" sz="1050" dirty="0">
+              <a:solidFill>
+                <a:srgbClr val="7030A0"/>
+              </a:solidFill>
+            </a:endParaRPr>
+          </a:p>
+        </p:txBody>
+      </p:sp>
+      <p:cxnSp>
+        <p:nvCxnSpPr>
+          <p:cNvPr id="105" name="Elbow Connector 85">
+            <a:extLst>
+              <a:ext uri="{FF2B5EF4-FFF2-40B4-BE49-F238E27FC236}">
+                <a16:creationId xmlns:a16="http://schemas.microsoft.com/office/drawing/2014/main" id="{B591C7A6-F33A-4823-9A2E-E0C02E8DD5EC}"/>
+              </a:ext>
+            </a:extLst>
+          </p:cNvPr>
+          <p:cNvCxnSpPr>
+            <a:stCxn id="95" idx="3"/>
+            <a:endCxn id="104" idx="1"/>
+          </p:cNvCxnSpPr>
+          <p:nvPr/>
+        </p:nvCxnSpPr>
+        <p:spPr>
+          <a:xfrm>
+            <a:off x="7277995" y="4734038"/>
+            <a:ext cx="434402" cy="641172"/>
+          </a:xfrm>
+          <a:prstGeom prst="bentConnector3">
+            <a:avLst/>
+          </a:prstGeom>
+          <a:ln w="19050">
+            <a:solidFill>
+              <a:srgbClr val="7030A0"/>
+            </a:solidFill>
+            <a:headEnd type="none" w="med" len="med"/>
+            <a:tailEnd type="arrow" w="med" len="med"/>
+          </a:ln>
+          <a:effectLst/>
+        </p:spPr>
+        <p:style>
+          <a:lnRef idx="1">
+            <a:schemeClr val="accent2"/>
+          </a:lnRef>
+          <a:fillRef idx="2">
+            <a:schemeClr val="accent2"/>
+          </a:fillRef>
+          <a:effectRef idx="1">
+            <a:schemeClr val="accent2"/>
+          </a:effectRef>
+          <a:fontRef idx="minor">
+            <a:schemeClr val="dk1"/>
+          </a:fontRef>
+        </p:style>
+      </p:cxnSp>
+      <p:sp>
+        <p:nvSpPr>
+          <p:cNvPr id="117" name="TextBox 116">
+            <a:extLst>
+              <a:ext uri="{FF2B5EF4-FFF2-40B4-BE49-F238E27FC236}">
+                <a16:creationId xmlns:a16="http://schemas.microsoft.com/office/drawing/2014/main" id="{E2FD05F2-6C28-4802-84AB-21A4F4B74531}"/>
+              </a:ext>
+            </a:extLst>
+          </p:cNvPr>
+          <p:cNvSpPr txBox="1"/>
+          <p:nvPr/>
+        </p:nvSpPr>
+        <p:spPr>
+          <a:xfrm>
+            <a:off x="6547696" y="4421004"/>
+            <a:ext cx="189257" cy="187827"/>
+          </a:xfrm>
+          <a:prstGeom prst="rect">
+            <a:avLst/>
+          </a:prstGeom>
+          <a:noFill/>
+        </p:spPr>
+        <p:txBody>
+          <a:bodyPr wrap="square" lIns="0" tIns="0" rIns="0" bIns="0" rtlCol="0">
+            <a:noAutofit/>
+          </a:bodyPr>
+          <a:lstStyle/>
+          <a:p>
+            <a:pPr algn="ctr"/>
+            <a:r>
+              <a:rPr lang="en-US" sz="1100" dirty="0">
+                <a:solidFill>
+                  <a:srgbClr val="7030A0"/>
+                </a:solidFill>
+              </a:rPr>
+              <a:t>*</a:t>
+            </a:r>
+            <a:endParaRPr lang="en-SG" sz="1100" dirty="0">
+              <a:solidFill>
+                <a:srgbClr val="7030A0"/>
+              </a:solidFill>
+            </a:endParaRPr>
+          </a:p>
+        </p:txBody>
+      </p:sp>
+      <p:sp>
+        <p:nvSpPr>
+          <p:cNvPr id="121" name="Rectangle 8">
+            <a:extLst>
+              <a:ext uri="{FF2B5EF4-FFF2-40B4-BE49-F238E27FC236}">
+                <a16:creationId xmlns:a16="http://schemas.microsoft.com/office/drawing/2014/main" id="{1A0AB412-FC16-4154-BFFD-3368F1D11238}"/>
+              </a:ext>
+            </a:extLst>
+          </p:cNvPr>
+          <p:cNvSpPr/>
+          <p:nvPr/>
+        </p:nvSpPr>
+        <p:spPr>
+          <a:xfrm>
+            <a:off x="7712397" y="5556422"/>
+            <a:ext cx="708186" cy="285783"/>
+          </a:xfrm>
+          <a:prstGeom prst="rect">
+            <a:avLst/>
+          </a:prstGeom>
+          <a:ln w="19050">
+            <a:solidFill>
+              <a:srgbClr val="7030A0"/>
+            </a:solidFill>
+          </a:ln>
+          <a:effectLst/>
+        </p:spPr>
+        <p:style>
+          <a:lnRef idx="1">
+            <a:schemeClr val="accent4"/>
+          </a:lnRef>
+          <a:fillRef idx="2">
+            <a:schemeClr val="accent4"/>
+          </a:fillRef>
+          <a:effectRef idx="1">
+            <a:schemeClr val="accent4"/>
+          </a:effectRef>
+          <a:fontRef idx="minor">
+            <a:schemeClr val="dk1"/>
+          </a:fontRef>
+        </p:style>
+        <p:txBody>
+          <a:bodyPr rtlCol="0" anchor="ctr"/>
+          <a:lstStyle/>
+          <a:p>
+            <a:pPr algn="ctr"/>
+            <a:r>
+              <a:rPr lang="en-US" sz="1050" dirty="0">
+                <a:solidFill>
+                  <a:srgbClr val="7030A0"/>
+                </a:solidFill>
+              </a:rPr>
+              <a:t>Location</a:t>
+            </a:r>
+            <a:endParaRPr lang="en-SG" sz="1050" dirty="0">
+              <a:solidFill>
+                <a:srgbClr val="7030A0"/>
+              </a:solidFill>
+            </a:endParaRPr>
+          </a:p>
+        </p:txBody>
+      </p:sp>
+      <p:cxnSp>
+        <p:nvCxnSpPr>
+          <p:cNvPr id="126" name="Elbow Connector 85">
+            <a:extLst>
+              <a:ext uri="{FF2B5EF4-FFF2-40B4-BE49-F238E27FC236}">
+                <a16:creationId xmlns:a16="http://schemas.microsoft.com/office/drawing/2014/main" id="{B100DFD4-60F2-4E47-94E8-6657A39B74B1}"/>
+              </a:ext>
+            </a:extLst>
+          </p:cNvPr>
+          <p:cNvCxnSpPr>
+            <a:cxnSpLocks/>
+          </p:cNvCxnSpPr>
+          <p:nvPr/>
+        </p:nvCxnSpPr>
+        <p:spPr>
+          <a:xfrm rot="16200000" flipH="1">
+            <a:off x="7439004" y="5431400"/>
+            <a:ext cx="329584" cy="217201"/>
+          </a:xfrm>
+          <a:prstGeom prst="bentConnector3">
+            <a:avLst>
+              <a:gd name="adj1" fmla="val 100733"/>
+            </a:avLst>
+          </a:prstGeom>
+          <a:ln w="19050">
+            <a:solidFill>
+              <a:srgbClr val="7030A0"/>
+            </a:solidFill>
+            <a:headEnd type="none" w="med" len="med"/>
+            <a:tailEnd type="arrow" w="med" len="med"/>
+          </a:ln>
+          <a:effectLst/>
+        </p:spPr>
+        <p:style>
+          <a:lnRef idx="1">
+            <a:schemeClr val="accent2"/>
+          </a:lnRef>
+          <a:fillRef idx="2">
+            <a:schemeClr val="accent2"/>
+          </a:fillRef>
+          <a:effectRef idx="1">
+            <a:schemeClr val="accent2"/>
+          </a:effectRef>
+          <a:fontRef idx="minor">
+            <a:schemeClr val="dk1"/>
+          </a:fontRef>
+        </p:style>
+      </p:cxnSp>
+      <p:cxnSp>
+        <p:nvCxnSpPr>
+          <p:cNvPr id="127" name="Elbow Connector 106">
+            <a:extLst>
+              <a:ext uri="{FF2B5EF4-FFF2-40B4-BE49-F238E27FC236}">
+                <a16:creationId xmlns:a16="http://schemas.microsoft.com/office/drawing/2014/main" id="{B8BD238E-75A8-41F3-BF6B-D883DFB67118}"/>
+              </a:ext>
+            </a:extLst>
+          </p:cNvPr>
+          <p:cNvCxnSpPr>
+            <a:cxnSpLocks/>
+            <a:endCxn id="87" idx="1"/>
+          </p:cNvCxnSpPr>
+          <p:nvPr/>
+        </p:nvCxnSpPr>
+        <p:spPr>
+          <a:xfrm>
+            <a:off x="2095473" y="4115338"/>
+            <a:ext cx="3924327" cy="628199"/>
+          </a:xfrm>
+          <a:prstGeom prst="bentConnector3">
+            <a:avLst>
+              <a:gd name="adj1" fmla="val 50000"/>
+            </a:avLst>
+          </a:prstGeom>
+          <a:ln w="19050">
+            <a:solidFill>
+              <a:srgbClr val="7030A0"/>
+            </a:solidFill>
+            <a:prstDash val="solid"/>
+            <a:headEnd type="none" w="med" len="med"/>
+            <a:tailEnd type="arrow" w="med" len="med"/>
+          </a:ln>
+          <a:effectLst/>
+        </p:spPr>
+        <p:style>
+          <a:lnRef idx="1">
+            <a:schemeClr val="accent2"/>
+          </a:lnRef>
+          <a:fillRef idx="2">
+            <a:schemeClr val="accent2"/>
+          </a:fillRef>
+          <a:effectRef idx="1">
+            <a:schemeClr val="accent2"/>
+          </a:effectRef>
+          <a:fontRef idx="minor">
+            <a:schemeClr val="dk1"/>
+          </a:fontRef>
+        </p:style>
+      </p:cxnSp>
+      <p:cxnSp>
+        <p:nvCxnSpPr>
+          <p:cNvPr id="131" name="Straight Connector 130">
+            <a:extLst>
+              <a:ext uri="{FF2B5EF4-FFF2-40B4-BE49-F238E27FC236}">
+                <a16:creationId xmlns:a16="http://schemas.microsoft.com/office/drawing/2014/main" id="{5BE3F9A7-AEA4-495C-B6C2-564221468848}"/>
+              </a:ext>
+            </a:extLst>
+          </p:cNvPr>
+          <p:cNvCxnSpPr>
+            <a:cxnSpLocks/>
+          </p:cNvCxnSpPr>
+          <p:nvPr/>
+        </p:nvCxnSpPr>
+        <p:spPr>
+          <a:xfrm>
+            <a:off x="2095473" y="3588885"/>
+            <a:ext cx="0" cy="535434"/>
+          </a:xfrm>
+          <a:prstGeom prst="line">
+            <a:avLst/>
+          </a:prstGeom>
+          <a:ln w="19050"/>
+        </p:spPr>
+        <p:style>
+          <a:lnRef idx="1">
+            <a:schemeClr val="accent4"/>
+          </a:lnRef>
+          <a:fillRef idx="0">
+            <a:schemeClr val="accent4"/>
+          </a:fillRef>
+          <a:effectRef idx="0">
+            <a:schemeClr val="accent4"/>
+          </a:effectRef>
+          <a:fontRef idx="minor">
+            <a:schemeClr val="tx1"/>
+          </a:fontRef>
+        </p:style>
+      </p:cxnSp>
+      <p:sp>
+        <p:nvSpPr>
+          <p:cNvPr id="135" name="TextBox 134">
+            <a:extLst>
+              <a:ext uri="{FF2B5EF4-FFF2-40B4-BE49-F238E27FC236}">
+                <a16:creationId xmlns:a16="http://schemas.microsoft.com/office/drawing/2014/main" id="{648AA63E-9E0A-4D51-814D-B2E78AB22BA8}"/>
+              </a:ext>
+            </a:extLst>
+          </p:cNvPr>
+          <p:cNvSpPr txBox="1"/>
+          <p:nvPr/>
+        </p:nvSpPr>
+        <p:spPr>
+          <a:xfrm>
+            <a:off x="5724397" y="4549168"/>
+            <a:ext cx="189257" cy="178683"/>
+          </a:xfrm>
+          <a:prstGeom prst="rect">
+            <a:avLst/>
+          </a:prstGeom>
+          <a:noFill/>
+        </p:spPr>
+        <p:txBody>
+          <a:bodyPr wrap="square" lIns="0" tIns="0" rIns="0" bIns="0" rtlCol="0">
+            <a:noAutofit/>
+          </a:bodyPr>
+          <a:lstStyle/>
+          <a:p>
+            <a:pPr algn="ctr"/>
+            <a:r>
+              <a:rPr lang="en-US" sz="1100" dirty="0">
+                <a:solidFill>
+                  <a:srgbClr val="7030A0"/>
+                </a:solidFill>
+              </a:rPr>
+              <a:t>1</a:t>
+            </a:r>
+            <a:endParaRPr lang="en-SG" sz="1100" dirty="0">
+              <a:solidFill>
+                <a:srgbClr val="7030A0"/>
+              </a:solidFill>
+            </a:endParaRPr>
+          </a:p>
+        </p:txBody>
+      </p:sp>
+      <p:sp>
+        <p:nvSpPr>
+          <p:cNvPr id="137" name="TextBox 136">
+            <a:extLst>
+              <a:ext uri="{FF2B5EF4-FFF2-40B4-BE49-F238E27FC236}">
+                <a16:creationId xmlns:a16="http://schemas.microsoft.com/office/drawing/2014/main" id="{15841A37-B5A6-433A-82E7-39FF85DEB129}"/>
+              </a:ext>
+            </a:extLst>
+          </p:cNvPr>
+          <p:cNvSpPr txBox="1"/>
+          <p:nvPr/>
+        </p:nvSpPr>
+        <p:spPr>
+          <a:xfrm>
+            <a:off x="5137446" y="4723889"/>
+            <a:ext cx="881018" cy="261610"/>
+          </a:xfrm>
+          <a:prstGeom prst="rect">
+            <a:avLst/>
+          </a:prstGeom>
+          <a:noFill/>
+        </p:spPr>
+        <p:txBody>
+          <a:bodyPr wrap="square" rtlCol="0">
+            <a:spAutoFit/>
+          </a:bodyPr>
+          <a:lstStyle/>
+          <a:p>
+            <a:pPr algn="r"/>
+            <a:r>
+              <a:rPr lang="en-US" sz="1100" dirty="0">
+                <a:solidFill>
+                  <a:srgbClr val="7030A0"/>
+                </a:solidFill>
+              </a:rPr>
+              <a:t>filtered list</a:t>
             </a:r>
             <a:endParaRPr lang="en-SG" sz="1100" dirty="0">
               <a:solidFill>
@@ -5763,13 +6910,6 @@
   <p:clrMapOvr>
     <a:masterClrMapping/>
   </p:clrMapOvr>
-  <p:timing>
-    <p:tnLst>
-      <p:par>
-        <p:cTn id="1" dur="indefinite" restart="never" nodeType="tmRoot"/>
-      </p:par>
-    </p:tnLst>
-  </p:timing>
 </p:sld>
 </file>
 

</xml_diff>

<commit_message>
changed model diagram and added student with pl diagram
</commit_message>
<xml_diff>
--- a/docs/diagrams/ModelComponentClassDiagram.pptx
+++ b/docs/diagrams/ModelComponentClassDiagram.pptx
@@ -208,7 +208,7 @@
           <a:p>
             <a:fld id="{F5CC4B3F-88C1-4FFA-B1B6-F41C21DC6924}" type="datetimeFigureOut">
               <a:rPr lang="en-US" smtClean="0"/>
-              <a:t>06-Apr-18</a:t>
+              <a:t>12-Apr-18</a:t>
             </a:fld>
             <a:endParaRPr lang="en-US"/>
           </a:p>
@@ -654,7 +654,7 @@
           <a:p>
             <a:fld id="{78C97017-6FC3-485B-9764-EAC9E56C1D49}" type="datetimeFigureOut">
               <a:rPr lang="en-US" smtClean="0"/>
-              <a:t>06-Apr-18</a:t>
+              <a:t>12-Apr-18</a:t>
             </a:fld>
             <a:endParaRPr lang="en-US"/>
           </a:p>
@@ -822,7 +822,7 @@
           <a:p>
             <a:fld id="{78C97017-6FC3-485B-9764-EAC9E56C1D49}" type="datetimeFigureOut">
               <a:rPr lang="en-US" smtClean="0"/>
-              <a:t>06-Apr-18</a:t>
+              <a:t>12-Apr-18</a:t>
             </a:fld>
             <a:endParaRPr lang="en-US"/>
           </a:p>
@@ -1000,7 +1000,7 @@
           <a:p>
             <a:fld id="{78C97017-6FC3-485B-9764-EAC9E56C1D49}" type="datetimeFigureOut">
               <a:rPr lang="en-US" smtClean="0"/>
-              <a:t>06-Apr-18</a:t>
+              <a:t>12-Apr-18</a:t>
             </a:fld>
             <a:endParaRPr lang="en-US"/>
           </a:p>
@@ -1168,7 +1168,7 @@
           <a:p>
             <a:fld id="{78C97017-6FC3-485B-9764-EAC9E56C1D49}" type="datetimeFigureOut">
               <a:rPr lang="en-US" smtClean="0"/>
-              <a:t>06-Apr-18</a:t>
+              <a:t>12-Apr-18</a:t>
             </a:fld>
             <a:endParaRPr lang="en-US"/>
           </a:p>
@@ -1413,7 +1413,7 @@
           <a:p>
             <a:fld id="{78C97017-6FC3-485B-9764-EAC9E56C1D49}" type="datetimeFigureOut">
               <a:rPr lang="en-US" smtClean="0"/>
-              <a:t>06-Apr-18</a:t>
+              <a:t>12-Apr-18</a:t>
             </a:fld>
             <a:endParaRPr lang="en-US"/>
           </a:p>
@@ -1698,7 +1698,7 @@
           <a:p>
             <a:fld id="{78C97017-6FC3-485B-9764-EAC9E56C1D49}" type="datetimeFigureOut">
               <a:rPr lang="en-US" smtClean="0"/>
-              <a:t>06-Apr-18</a:t>
+              <a:t>12-Apr-18</a:t>
             </a:fld>
             <a:endParaRPr lang="en-US"/>
           </a:p>
@@ -2117,7 +2117,7 @@
           <a:p>
             <a:fld id="{78C97017-6FC3-485B-9764-EAC9E56C1D49}" type="datetimeFigureOut">
               <a:rPr lang="en-US" smtClean="0"/>
-              <a:t>06-Apr-18</a:t>
+              <a:t>12-Apr-18</a:t>
             </a:fld>
             <a:endParaRPr lang="en-US"/>
           </a:p>
@@ -2234,7 +2234,7 @@
           <a:p>
             <a:fld id="{78C97017-6FC3-485B-9764-EAC9E56C1D49}" type="datetimeFigureOut">
               <a:rPr lang="en-US" smtClean="0"/>
-              <a:t>06-Apr-18</a:t>
+              <a:t>12-Apr-18</a:t>
             </a:fld>
             <a:endParaRPr lang="en-US"/>
           </a:p>
@@ -2329,7 +2329,7 @@
           <a:p>
             <a:fld id="{78C97017-6FC3-485B-9764-EAC9E56C1D49}" type="datetimeFigureOut">
               <a:rPr lang="en-US" smtClean="0"/>
-              <a:t>06-Apr-18</a:t>
+              <a:t>12-Apr-18</a:t>
             </a:fld>
             <a:endParaRPr lang="en-US"/>
           </a:p>
@@ -2604,7 +2604,7 @@
           <a:p>
             <a:fld id="{78C97017-6FC3-485B-9764-EAC9E56C1D49}" type="datetimeFigureOut">
               <a:rPr lang="en-US" smtClean="0"/>
-              <a:t>06-Apr-18</a:t>
+              <a:t>12-Apr-18</a:t>
             </a:fld>
             <a:endParaRPr lang="en-US"/>
           </a:p>
@@ -2856,7 +2856,7 @@
           <a:p>
             <a:fld id="{78C97017-6FC3-485B-9764-EAC9E56C1D49}" type="datetimeFigureOut">
               <a:rPr lang="en-US" smtClean="0"/>
-              <a:t>06-Apr-18</a:t>
+              <a:t>12-Apr-18</a:t>
             </a:fld>
             <a:endParaRPr lang="en-US"/>
           </a:p>
@@ -3067,7 +3067,7 @@
           <a:p>
             <a:fld id="{78C97017-6FC3-485B-9764-EAC9E56C1D49}" type="datetimeFigureOut">
               <a:rPr lang="en-US" smtClean="0"/>
-              <a:t>06-Apr-18</a:t>
+              <a:t>12-Apr-18</a:t>
             </a:fld>
             <a:endParaRPr lang="en-US"/>
           </a:p>
@@ -3450,8 +3450,8 @@
         </p:nvSpPr>
         <p:spPr>
           <a:xfrm>
-            <a:off x="533400" y="1222060"/>
-            <a:ext cx="8153400" cy="4182420"/>
+            <a:off x="304800" y="1143000"/>
+            <a:ext cx="8744174" cy="4490080"/>
           </a:xfrm>
           <a:prstGeom prst="roundRect">
             <a:avLst>
@@ -3511,7 +3511,7 @@
         </p:nvSpPr>
         <p:spPr>
           <a:xfrm>
-            <a:off x="2290715" y="2946507"/>
+            <a:off x="2062115" y="2867447"/>
             <a:ext cx="1093635" cy="346760"/>
           </a:xfrm>
           <a:prstGeom prst="rect">
@@ -3570,7 +3570,7 @@
         </p:nvSpPr>
         <p:spPr>
           <a:xfrm rot="16200000">
-            <a:off x="1055293" y="2860092"/>
+            <a:off x="826693" y="2781032"/>
             <a:ext cx="1178046" cy="346760"/>
           </a:xfrm>
           <a:prstGeom prst="rect">
@@ -3633,7 +3633,7 @@
         </p:nvCxnSpPr>
         <p:spPr>
           <a:xfrm rot="16200000" flipH="1">
-            <a:off x="3681401" y="407363"/>
+            <a:off x="3452801" y="328303"/>
             <a:ext cx="362817" cy="4436989"/>
           </a:xfrm>
           <a:prstGeom prst="bentConnector3">
@@ -3674,7 +3674,7 @@
         </p:nvSpPr>
         <p:spPr>
           <a:xfrm rot="16200000">
-            <a:off x="327532" y="2852607"/>
+            <a:off x="98932" y="2773547"/>
             <a:ext cx="1178046" cy="346760"/>
           </a:xfrm>
           <a:prstGeom prst="rect">
@@ -3744,7 +3744,7 @@
         </p:nvSpPr>
         <p:spPr>
           <a:xfrm rot="16200000">
-            <a:off x="1040445" y="2901491"/>
+            <a:off x="811845" y="2822431"/>
             <a:ext cx="270504" cy="175523"/>
           </a:xfrm>
           <a:prstGeom prst="triangle">
@@ -3794,7 +3794,7 @@
         </p:nvCxnSpPr>
         <p:spPr>
           <a:xfrm>
-            <a:off x="2069905" y="3114603"/>
+            <a:off x="1841305" y="3035543"/>
             <a:ext cx="220810" cy="5284"/>
           </a:xfrm>
           <a:prstGeom prst="straightConnector1">
@@ -3827,12 +3827,14 @@
       <p:cxnSp>
         <p:nvCxnSpPr>
           <p:cNvPr id="75" name="Elbow Connector 122"/>
-          <p:cNvCxnSpPr/>
+          <p:cNvCxnSpPr>
+            <a:cxnSpLocks/>
+          </p:cNvCxnSpPr>
           <p:nvPr/>
         </p:nvCxnSpPr>
         <p:spPr>
           <a:xfrm>
-            <a:off x="323626" y="2989253"/>
+            <a:off x="95026" y="2910193"/>
             <a:ext cx="419548" cy="2860"/>
           </a:xfrm>
           <a:prstGeom prst="bentConnector3">
@@ -3877,7 +3879,7 @@
         </p:nvCxnSpPr>
         <p:spPr>
           <a:xfrm flipV="1">
-            <a:off x="1263459" y="2989252"/>
+            <a:off x="1034859" y="2910192"/>
             <a:ext cx="216105" cy="1"/>
           </a:xfrm>
           <a:prstGeom prst="line">
@@ -3916,7 +3918,7 @@
         </p:nvSpPr>
         <p:spPr>
           <a:xfrm>
-            <a:off x="1833857" y="3027913"/>
+            <a:off x="1605257" y="2948853"/>
             <a:ext cx="236048" cy="173380"/>
           </a:xfrm>
           <a:prstGeom prst="flowChartDecision">
@@ -3961,7 +3963,7 @@
         </p:nvSpPr>
         <p:spPr>
           <a:xfrm>
-            <a:off x="2293025" y="2515762"/>
+            <a:off x="2064425" y="2436702"/>
             <a:ext cx="1093635" cy="346760"/>
           </a:xfrm>
           <a:prstGeom prst="rect">
@@ -4020,7 +4022,7 @@
         </p:nvCxnSpPr>
         <p:spPr>
           <a:xfrm>
-            <a:off x="2072215" y="2683858"/>
+            <a:off x="1843615" y="2604798"/>
             <a:ext cx="220810" cy="5284"/>
           </a:xfrm>
           <a:prstGeom prst="straightConnector1">
@@ -4058,7 +4060,7 @@
         </p:nvSpPr>
         <p:spPr>
           <a:xfrm>
-            <a:off x="1836167" y="2597168"/>
+            <a:off x="1607567" y="2518108"/>
             <a:ext cx="236048" cy="173380"/>
           </a:xfrm>
           <a:prstGeom prst="flowChartDecision">
@@ -4103,7 +4105,7 @@
         </p:nvSpPr>
         <p:spPr>
           <a:xfrm>
-            <a:off x="3900552" y="2796571"/>
+            <a:off x="3671952" y="2717511"/>
             <a:ext cx="1156969" cy="346760"/>
           </a:xfrm>
           <a:prstGeom prst="rect">
@@ -4159,7 +4161,7 @@
         </p:nvSpPr>
         <p:spPr>
           <a:xfrm>
-            <a:off x="3397838" y="2562333"/>
+            <a:off x="3169238" y="2483273"/>
             <a:ext cx="236048" cy="173380"/>
           </a:xfrm>
           <a:prstGeom prst="flowChartDecision">
@@ -4209,7 +4211,7 @@
         </p:nvCxnSpPr>
         <p:spPr>
           <a:xfrm>
-            <a:off x="3633886" y="2649023"/>
+            <a:off x="3405286" y="2569963"/>
             <a:ext cx="266666" cy="320928"/>
           </a:xfrm>
           <a:prstGeom prst="bentConnector3">
@@ -4247,7 +4249,7 @@
         </p:nvSpPr>
         <p:spPr>
           <a:xfrm>
-            <a:off x="3890863" y="2229769"/>
+            <a:off x="3662263" y="2150709"/>
             <a:ext cx="1156969" cy="346760"/>
           </a:xfrm>
           <a:prstGeom prst="rect">
@@ -4306,7 +4308,7 @@
         </p:nvCxnSpPr>
         <p:spPr>
           <a:xfrm flipV="1">
-            <a:off x="3633886" y="2405887"/>
+            <a:off x="3405286" y="2326827"/>
             <a:ext cx="261875" cy="243136"/>
           </a:xfrm>
           <a:prstGeom prst="bentConnector3">
@@ -4346,7 +4348,7 @@
         </p:nvSpPr>
         <p:spPr>
           <a:xfrm>
-            <a:off x="5727212" y="2807266"/>
+            <a:off x="5498612" y="2728206"/>
             <a:ext cx="708186" cy="346760"/>
           </a:xfrm>
           <a:prstGeom prst="rect">
@@ -4402,7 +4404,7 @@
         </p:nvSpPr>
         <p:spPr>
           <a:xfrm>
-            <a:off x="5056762" y="2893179"/>
+            <a:off x="4828162" y="2814119"/>
             <a:ext cx="236048" cy="173380"/>
           </a:xfrm>
           <a:prstGeom prst="flowChartDecision">
@@ -4450,7 +4452,7 @@
         </p:nvCxnSpPr>
         <p:spPr>
           <a:xfrm>
-            <a:off x="5292810" y="2979869"/>
+            <a:off x="5064210" y="2900809"/>
             <a:ext cx="434402" cy="777"/>
           </a:xfrm>
           <a:prstGeom prst="bentConnector3">
@@ -4488,7 +4490,7 @@
         </p:nvSpPr>
         <p:spPr>
           <a:xfrm>
-            <a:off x="4749640" y="1758532"/>
+            <a:off x="4521040" y="1679472"/>
             <a:ext cx="483700" cy="346760"/>
           </a:xfrm>
           <a:prstGeom prst="rect">
@@ -4544,7 +4546,7 @@
         </p:nvSpPr>
         <p:spPr>
           <a:xfrm rot="16200000">
-            <a:off x="4335201" y="2015740"/>
+            <a:off x="4106601" y="1936680"/>
             <a:ext cx="236048" cy="173380"/>
           </a:xfrm>
           <a:prstGeom prst="flowChartDecision">
@@ -4592,7 +4594,7 @@
         </p:nvCxnSpPr>
         <p:spPr>
           <a:xfrm rot="5400000" flipH="1" flipV="1">
-            <a:off x="4575185" y="1809952"/>
+            <a:off x="4346585" y="1730892"/>
             <a:ext cx="52494" cy="296415"/>
           </a:xfrm>
           <a:prstGeom prst="bentConnector2">
@@ -4630,7 +4632,7 @@
         </p:nvSpPr>
         <p:spPr>
           <a:xfrm>
-            <a:off x="7125932" y="1337974"/>
+            <a:off x="6897332" y="1258914"/>
             <a:ext cx="1470060" cy="285783"/>
           </a:xfrm>
           <a:prstGeom prst="rect">
@@ -4686,7 +4688,7 @@
         </p:nvSpPr>
         <p:spPr>
           <a:xfrm>
-            <a:off x="6455482" y="2897401"/>
+            <a:off x="6226882" y="2818341"/>
             <a:ext cx="236048" cy="173380"/>
           </a:xfrm>
           <a:prstGeom prst="flowChartDecision">
@@ -4736,7 +4738,7 @@
         </p:nvCxnSpPr>
         <p:spPr>
           <a:xfrm rot="5400000" flipH="1" flipV="1">
-            <a:off x="6813511" y="1576086"/>
+            <a:off x="6584911" y="1497026"/>
             <a:ext cx="407641" cy="217202"/>
           </a:xfrm>
           <a:prstGeom prst="bentConnector2">
@@ -4774,7 +4776,7 @@
         </p:nvSpPr>
         <p:spPr>
           <a:xfrm>
-            <a:off x="7125932" y="1660952"/>
+            <a:off x="6897332" y="1581892"/>
             <a:ext cx="1470060" cy="285783"/>
           </a:xfrm>
           <a:prstGeom prst="rect">
@@ -4834,7 +4836,7 @@
         </p:nvCxnSpPr>
         <p:spPr>
           <a:xfrm flipV="1">
-            <a:off x="6691530" y="1803844"/>
+            <a:off x="6462930" y="1724784"/>
             <a:ext cx="434402" cy="1180247"/>
           </a:xfrm>
           <a:prstGeom prst="bentConnector3">
@@ -4872,7 +4874,7 @@
         </p:nvSpPr>
         <p:spPr>
           <a:xfrm>
-            <a:off x="7125932" y="1983930"/>
+            <a:off x="6897332" y="1904870"/>
             <a:ext cx="1470060" cy="285783"/>
           </a:xfrm>
           <a:prstGeom prst="rect">
@@ -4932,7 +4934,7 @@
         </p:nvCxnSpPr>
         <p:spPr>
           <a:xfrm flipV="1">
-            <a:off x="6691530" y="2126822"/>
+            <a:off x="6462930" y="2047762"/>
             <a:ext cx="434402" cy="857269"/>
           </a:xfrm>
           <a:prstGeom prst="bentConnector3">
@@ -4970,7 +4972,7 @@
         </p:nvSpPr>
         <p:spPr>
           <a:xfrm>
-            <a:off x="7125931" y="2306907"/>
+            <a:off x="6897331" y="2227847"/>
             <a:ext cx="1478517" cy="285783"/>
           </a:xfrm>
           <a:prstGeom prst="rect">
@@ -5029,7 +5031,7 @@
         </p:nvCxnSpPr>
         <p:spPr>
           <a:xfrm rot="16200000" flipH="1">
-            <a:off x="6686425" y="2010293"/>
+            <a:off x="6457825" y="1931233"/>
             <a:ext cx="661810" cy="217202"/>
           </a:xfrm>
           <a:prstGeom prst="bentConnector2">
@@ -5071,7 +5073,7 @@
         </p:nvCxnSpPr>
         <p:spPr>
           <a:xfrm rot="16200000" flipH="1">
-            <a:off x="2725784" y="2401703"/>
+            <a:off x="2497184" y="2322643"/>
             <a:ext cx="228042" cy="75"/>
           </a:xfrm>
           <a:prstGeom prst="bentConnector3">
@@ -5112,7 +5114,7 @@
         </p:nvSpPr>
         <p:spPr>
           <a:xfrm rot="10800000" flipV="1">
-            <a:off x="2704516" y="2112197"/>
+            <a:off x="2475916" y="2033137"/>
             <a:ext cx="270504" cy="175523"/>
           </a:xfrm>
           <a:prstGeom prst="triangle">
@@ -5160,7 +5162,7 @@
         </p:nvSpPr>
         <p:spPr>
           <a:xfrm>
-            <a:off x="2073838" y="1755670"/>
+            <a:off x="1845238" y="1676610"/>
             <a:ext cx="1539926" cy="346760"/>
           </a:xfrm>
           <a:prstGeom prst="rect">
@@ -5231,7 +5233,7 @@
         </p:nvSpPr>
         <p:spPr>
           <a:xfrm rot="5400000">
-            <a:off x="5753286" y="1757504"/>
+            <a:off x="5524686" y="1678444"/>
             <a:ext cx="881018" cy="261610"/>
           </a:xfrm>
           <a:prstGeom prst="rect">
@@ -5270,7 +5272,7 @@
         </p:nvSpPr>
         <p:spPr>
           <a:xfrm>
-            <a:off x="1470935" y="4911040"/>
+            <a:off x="1242335" y="4831980"/>
             <a:ext cx="1066800" cy="346760"/>
           </a:xfrm>
           <a:prstGeom prst="rect">
@@ -5345,7 +5347,7 @@
         </p:nvCxnSpPr>
         <p:spPr>
           <a:xfrm rot="16200000" flipH="1">
-            <a:off x="459040" y="4072525"/>
+            <a:off x="230440" y="3993465"/>
             <a:ext cx="1469410" cy="554380"/>
           </a:xfrm>
           <a:prstGeom prst="bentConnector2">
@@ -5387,7 +5389,7 @@
         </p:nvCxnSpPr>
         <p:spPr>
           <a:xfrm rot="10800000">
-            <a:off x="5047832" y="2403150"/>
+            <a:off x="4819232" y="2324090"/>
             <a:ext cx="837114" cy="404117"/>
           </a:xfrm>
           <a:prstGeom prst="bentConnector3">
@@ -5427,7 +5429,7 @@
         </p:nvSpPr>
         <p:spPr>
           <a:xfrm>
-            <a:off x="3738507" y="2140428"/>
+            <a:off x="3509907" y="2061368"/>
             <a:ext cx="189257" cy="178683"/>
           </a:xfrm>
           <a:prstGeom prst="rect">
@@ -5466,7 +5468,7 @@
         </p:nvSpPr>
         <p:spPr>
           <a:xfrm>
-            <a:off x="3738507" y="3008064"/>
+            <a:off x="3509907" y="2929004"/>
             <a:ext cx="189257" cy="178683"/>
           </a:xfrm>
           <a:prstGeom prst="rect">
@@ -5505,7 +5507,7 @@
         </p:nvSpPr>
         <p:spPr>
           <a:xfrm>
-            <a:off x="5103296" y="2444613"/>
+            <a:off x="4874696" y="2365553"/>
             <a:ext cx="189257" cy="178683"/>
           </a:xfrm>
           <a:prstGeom prst="rect">
@@ -5544,7 +5546,7 @@
         </p:nvSpPr>
         <p:spPr>
           <a:xfrm>
-            <a:off x="4576707" y="1728119"/>
+            <a:off x="4348107" y="1649059"/>
             <a:ext cx="189257" cy="178683"/>
           </a:xfrm>
           <a:prstGeom prst="rect">
@@ -5583,7 +5585,7 @@
         </p:nvSpPr>
         <p:spPr>
           <a:xfrm>
-            <a:off x="5548791" y="3047117"/>
+            <a:off x="5320191" y="2968057"/>
             <a:ext cx="189257" cy="178683"/>
           </a:xfrm>
           <a:prstGeom prst="rect">
@@ -5622,7 +5624,7 @@
         </p:nvSpPr>
         <p:spPr>
           <a:xfrm>
-            <a:off x="2101458" y="2438400"/>
+            <a:off x="1872858" y="2359340"/>
             <a:ext cx="189257" cy="178683"/>
           </a:xfrm>
           <a:prstGeom prst="rect">
@@ -5661,7 +5663,7 @@
         </p:nvSpPr>
         <p:spPr>
           <a:xfrm>
-            <a:off x="2069905" y="3174117"/>
+            <a:off x="1841305" y="3095057"/>
             <a:ext cx="189257" cy="178683"/>
           </a:xfrm>
           <a:prstGeom prst="rect">
@@ -5700,7 +5702,7 @@
         </p:nvSpPr>
         <p:spPr>
           <a:xfrm>
-            <a:off x="6081305" y="3159394"/>
+            <a:off x="5852705" y="3080334"/>
             <a:ext cx="189257" cy="178683"/>
           </a:xfrm>
           <a:prstGeom prst="rect">
@@ -5745,7 +5747,7 @@
         </p:nvSpPr>
         <p:spPr>
           <a:xfrm>
-            <a:off x="7125932" y="2627978"/>
+            <a:off x="6897332" y="2548918"/>
             <a:ext cx="1470060" cy="285783"/>
           </a:xfrm>
           <a:prstGeom prst="rect">
@@ -5810,7 +5812,7 @@
         </p:nvCxnSpPr>
         <p:spPr>
           <a:xfrm rot="16200000" flipH="1">
-            <a:off x="6733266" y="2378204"/>
+            <a:off x="6504666" y="2299144"/>
             <a:ext cx="568132" cy="217200"/>
           </a:xfrm>
           <a:prstGeom prst="bentConnector2">
@@ -5854,7 +5856,7 @@
         </p:nvSpPr>
         <p:spPr>
           <a:xfrm>
-            <a:off x="7125932" y="2949049"/>
+            <a:off x="6897332" y="2869989"/>
             <a:ext cx="1470060" cy="285783"/>
           </a:xfrm>
           <a:prstGeom prst="rect">
@@ -5916,7 +5918,7 @@
         </p:nvSpPr>
         <p:spPr>
           <a:xfrm>
-            <a:off x="7125931" y="3270120"/>
+            <a:off x="6897331" y="3191060"/>
             <a:ext cx="1470060" cy="285783"/>
           </a:xfrm>
           <a:prstGeom prst="rect">
@@ -5981,7 +5983,7 @@
         </p:nvCxnSpPr>
         <p:spPr>
           <a:xfrm rot="16200000" flipH="1">
-            <a:off x="6799477" y="2765486"/>
+            <a:off x="6570877" y="2686426"/>
             <a:ext cx="435708" cy="217201"/>
           </a:xfrm>
           <a:prstGeom prst="bentConnector2">
@@ -6028,7 +6030,7 @@
         </p:nvCxnSpPr>
         <p:spPr>
           <a:xfrm rot="16200000" flipH="1">
-            <a:off x="6790979" y="3078060"/>
+            <a:off x="6562379" y="2999000"/>
             <a:ext cx="454736" cy="215167"/>
           </a:xfrm>
           <a:prstGeom prst="bentConnector2">
@@ -6072,7 +6074,7 @@
         </p:nvSpPr>
         <p:spPr>
           <a:xfrm>
-            <a:off x="2295140" y="3400848"/>
+            <a:off x="2066540" y="3321788"/>
             <a:ext cx="1107123" cy="346760"/>
           </a:xfrm>
           <a:prstGeom prst="rect">
@@ -6134,7 +6136,7 @@
         </p:nvSpPr>
         <p:spPr>
           <a:xfrm>
-            <a:off x="5707210" y="3654655"/>
+            <a:off x="5478610" y="3794289"/>
             <a:ext cx="1371600" cy="285783"/>
           </a:xfrm>
           <a:prstGeom prst="rect">
@@ -6200,8 +6202,8 @@
         </p:nvCxnSpPr>
         <p:spPr>
           <a:xfrm rot="5400000">
-            <a:off x="6191321" y="3272470"/>
-            <a:ext cx="583874" cy="180496"/>
+            <a:off x="5853374" y="3302757"/>
+            <a:ext cx="802568" cy="180496"/>
           </a:xfrm>
           <a:prstGeom prst="bentConnector3">
             <a:avLst>
@@ -6246,7 +6248,7 @@
         </p:nvSpPr>
         <p:spPr>
           <a:xfrm>
-            <a:off x="3890863" y="3394663"/>
+            <a:off x="3662263" y="3315603"/>
             <a:ext cx="1156969" cy="346760"/>
           </a:xfrm>
           <a:prstGeom prst="rect">
@@ -6312,7 +6314,7 @@
         </p:nvCxnSpPr>
         <p:spPr>
           <a:xfrm>
-            <a:off x="2065190" y="3571803"/>
+            <a:off x="1836590" y="3492743"/>
             <a:ext cx="229950" cy="2425"/>
           </a:xfrm>
           <a:prstGeom prst="straightConnector1">
@@ -6356,7 +6358,7 @@
         </p:nvSpPr>
         <p:spPr>
           <a:xfrm>
-            <a:off x="1829142" y="3485113"/>
+            <a:off x="1600542" y="3406053"/>
             <a:ext cx="236048" cy="173380"/>
           </a:xfrm>
           <a:prstGeom prst="flowChartDecision">
@@ -6407,7 +6409,7 @@
         </p:nvSpPr>
         <p:spPr>
           <a:xfrm>
-            <a:off x="2065190" y="3631317"/>
+            <a:off x="1836590" y="3552257"/>
             <a:ext cx="189257" cy="178683"/>
           </a:xfrm>
           <a:prstGeom prst="rect">
@@ -6452,7 +6454,7 @@
         </p:nvSpPr>
         <p:spPr>
           <a:xfrm>
-            <a:off x="3426077" y="3481353"/>
+            <a:off x="3197477" y="3402293"/>
             <a:ext cx="236048" cy="173380"/>
           </a:xfrm>
           <a:prstGeom prst="flowChartDecision">
@@ -6509,7 +6511,7 @@
         </p:nvCxnSpPr>
         <p:spPr>
           <a:xfrm>
-            <a:off x="3662125" y="3568043"/>
+            <a:off x="3433525" y="3488983"/>
             <a:ext cx="228738" cy="0"/>
           </a:xfrm>
           <a:prstGeom prst="straightConnector1">
@@ -6553,7 +6555,7 @@
         </p:nvSpPr>
         <p:spPr>
           <a:xfrm>
-            <a:off x="5231166" y="4328279"/>
+            <a:off x="5002566" y="4249219"/>
             <a:ext cx="708186" cy="346760"/>
           </a:xfrm>
           <a:prstGeom prst="rect">
@@ -6615,8 +6617,8 @@
         </p:nvSpPr>
         <p:spPr>
           <a:xfrm>
-            <a:off x="7131965" y="4114800"/>
-            <a:ext cx="1459506" cy="346760"/>
+            <a:off x="5966774" y="4659052"/>
+            <a:ext cx="1470060" cy="216023"/>
           </a:xfrm>
           <a:prstGeom prst="rect">
             <a:avLst/>
@@ -6677,8 +6679,8 @@
         </p:nvSpPr>
         <p:spPr>
           <a:xfrm>
-            <a:off x="7125931" y="4495800"/>
-            <a:ext cx="1470060" cy="353064"/>
+            <a:off x="5966775" y="4944835"/>
+            <a:ext cx="1470059" cy="233906"/>
           </a:xfrm>
           <a:prstGeom prst="rect">
             <a:avLst/>
@@ -6710,12 +6712,12 @@
           <a:p>
             <a:pPr algn="ctr"/>
             <a:r>
-              <a:rPr lang="en-US" sz="1050" dirty="0">
+              <a:rPr lang="en-US" sz="1050" dirty="0" err="1">
                 <a:solidFill>
                   <a:srgbClr val="7030A0"/>
                 </a:solidFill>
               </a:rPr>
-              <a:t>Time</a:t>
+              <a:t>StartTime</a:t>
             </a:r>
             <a:endParaRPr lang="en-SG" sz="1050" dirty="0">
               <a:solidFill>
@@ -6739,7 +6741,7 @@
         </p:nvSpPr>
         <p:spPr>
           <a:xfrm>
-            <a:off x="5053457" y="3477457"/>
+            <a:off x="4824857" y="3398397"/>
             <a:ext cx="236048" cy="173380"/>
           </a:xfrm>
           <a:prstGeom prst="flowChartDecision">
@@ -6794,7 +6796,7 @@
         </p:nvCxnSpPr>
         <p:spPr>
           <a:xfrm>
-            <a:off x="5289505" y="3564147"/>
+            <a:off x="5060905" y="3485087"/>
             <a:ext cx="295754" cy="764132"/>
           </a:xfrm>
           <a:prstGeom prst="bentConnector2">
@@ -6838,7 +6840,7 @@
         </p:nvSpPr>
         <p:spPr>
           <a:xfrm>
-            <a:off x="5412077" y="4147242"/>
+            <a:off x="5183477" y="4068182"/>
             <a:ext cx="189257" cy="178683"/>
           </a:xfrm>
           <a:prstGeom prst="rect">
@@ -6883,7 +6885,7 @@
         </p:nvSpPr>
         <p:spPr>
           <a:xfrm>
-            <a:off x="5963280" y="4414969"/>
+            <a:off x="5734680" y="4335909"/>
             <a:ext cx="236048" cy="173380"/>
           </a:xfrm>
           <a:prstGeom prst="flowChartDecision">
@@ -6940,8 +6942,8 @@
         </p:nvCxnSpPr>
         <p:spPr>
           <a:xfrm rot="5400000" flipH="1" flipV="1">
-            <a:off x="5999892" y="4021851"/>
-            <a:ext cx="474531" cy="311706"/>
+            <a:off x="5880639" y="4052138"/>
+            <a:ext cx="255837" cy="311706"/>
           </a:xfrm>
           <a:prstGeom prst="bentConnector3">
             <a:avLst>
@@ -6983,19 +6985,18 @@
           </p:cNvPr>
           <p:cNvCxnSpPr>
             <a:cxnSpLocks/>
-            <a:stCxn id="147" idx="3"/>
             <a:endCxn id="128" idx="1"/>
           </p:cNvCxnSpPr>
           <p:nvPr/>
         </p:nvCxnSpPr>
         <p:spPr>
-          <a:xfrm flipV="1">
-            <a:off x="6199328" y="4288180"/>
-            <a:ext cx="932637" cy="213479"/>
+          <a:xfrm>
+            <a:off x="5729261" y="4767064"/>
+            <a:ext cx="237513" cy="12700"/>
           </a:xfrm>
           <a:prstGeom prst="bentConnector3">
             <a:avLst>
-              <a:gd name="adj1" fmla="val 50000"/>
+              <a:gd name="adj1" fmla="val 1235"/>
             </a:avLst>
           </a:prstGeom>
           <a:ln w="19050">
@@ -7039,13 +7040,15 @@
           <p:nvPr/>
         </p:nvCxnSpPr>
         <p:spPr>
-          <a:xfrm>
-            <a:off x="6199328" y="4501659"/>
-            <a:ext cx="926603" cy="170673"/>
-          </a:xfrm>
-          <a:prstGeom prst="bentConnector3">
+          <a:xfrm flipH="1">
+            <a:off x="5966775" y="4422599"/>
+            <a:ext cx="3953" cy="639189"/>
+          </a:xfrm>
+          <a:prstGeom prst="bentConnector5">
             <a:avLst>
-              <a:gd name="adj1" fmla="val 50000"/>
+              <a:gd name="adj1" fmla="val -5782950"/>
+              <a:gd name="adj2" fmla="val 33327"/>
+              <a:gd name="adj3" fmla="val 5882950"/>
             </a:avLst>
           </a:prstGeom>
           <a:ln w="19050">
@@ -7086,7 +7089,862 @@
         </p:nvSpPr>
         <p:spPr>
           <a:xfrm>
-            <a:off x="5632583" y="4698117"/>
+            <a:off x="5403983" y="4619057"/>
+            <a:ext cx="189257" cy="178683"/>
+          </a:xfrm>
+          <a:prstGeom prst="rect">
+            <a:avLst/>
+          </a:prstGeom>
+          <a:noFill/>
+        </p:spPr>
+        <p:txBody>
+          <a:bodyPr wrap="square" lIns="0" tIns="0" rIns="0" bIns="0" rtlCol="0">
+            <a:noAutofit/>
+          </a:bodyPr>
+          <a:lstStyle/>
+          <a:p>
+            <a:pPr algn="ctr"/>
+            <a:r>
+              <a:rPr lang="en-US" sz="1100" dirty="0">
+                <a:solidFill>
+                  <a:srgbClr val="7030A0"/>
+                </a:solidFill>
+              </a:rPr>
+              <a:t>1</a:t>
+            </a:r>
+            <a:endParaRPr lang="en-SG" sz="1100" dirty="0">
+              <a:solidFill>
+                <a:srgbClr val="7030A0"/>
+              </a:solidFill>
+            </a:endParaRPr>
+          </a:p>
+        </p:txBody>
+      </p:sp>
+      <p:sp>
+        <p:nvSpPr>
+          <p:cNvPr id="87" name="Rectangle 8">
+            <a:extLst>
+              <a:ext uri="{FF2B5EF4-FFF2-40B4-BE49-F238E27FC236}">
+                <a16:creationId xmlns:a16="http://schemas.microsoft.com/office/drawing/2014/main" id="{5DDFC096-731B-45F6-AC76-940F37D7D8F9}"/>
+              </a:ext>
+            </a:extLst>
+          </p:cNvPr>
+          <p:cNvSpPr/>
+          <p:nvPr/>
+        </p:nvSpPr>
+        <p:spPr>
+          <a:xfrm>
+            <a:off x="6905788" y="3501849"/>
+            <a:ext cx="1470060" cy="285783"/>
+          </a:xfrm>
+          <a:prstGeom prst="rect">
+            <a:avLst/>
+          </a:prstGeom>
+          <a:ln w="19050">
+            <a:solidFill>
+              <a:srgbClr val="7030A0"/>
+            </a:solidFill>
+          </a:ln>
+          <a:effectLst/>
+        </p:spPr>
+        <p:style>
+          <a:lnRef idx="1">
+            <a:schemeClr val="accent4"/>
+          </a:lnRef>
+          <a:fillRef idx="2">
+            <a:schemeClr val="accent4"/>
+          </a:fillRef>
+          <a:effectRef idx="1">
+            <a:schemeClr val="accent4"/>
+          </a:effectRef>
+          <a:fontRef idx="minor">
+            <a:schemeClr val="dk1"/>
+          </a:fontRef>
+        </p:style>
+        <p:txBody>
+          <a:bodyPr rtlCol="0" anchor="ctr"/>
+          <a:lstStyle/>
+          <a:p>
+            <a:pPr algn="ctr"/>
+            <a:r>
+              <a:rPr lang="en-US" sz="1050" dirty="0">
+                <a:solidFill>
+                  <a:srgbClr val="7030A0"/>
+                </a:solidFill>
+              </a:rPr>
+              <a:t>Miscellaneous info</a:t>
+            </a:r>
+            <a:endParaRPr lang="en-SG" sz="1050" dirty="0">
+              <a:solidFill>
+                <a:srgbClr val="7030A0"/>
+              </a:solidFill>
+            </a:endParaRPr>
+          </a:p>
+        </p:txBody>
+      </p:sp>
+      <p:cxnSp>
+        <p:nvCxnSpPr>
+          <p:cNvPr id="88" name="Elbow Connector 85">
+            <a:extLst>
+              <a:ext uri="{FF2B5EF4-FFF2-40B4-BE49-F238E27FC236}">
+                <a16:creationId xmlns:a16="http://schemas.microsoft.com/office/drawing/2014/main" id="{AB19D800-0B41-4F44-9AE9-E545E2B4982B}"/>
+              </a:ext>
+            </a:extLst>
+          </p:cNvPr>
+          <p:cNvCxnSpPr>
+            <a:cxnSpLocks/>
+          </p:cNvCxnSpPr>
+          <p:nvPr/>
+        </p:nvCxnSpPr>
+        <p:spPr>
+          <a:xfrm rot="16200000" flipH="1">
+            <a:off x="6561362" y="3266525"/>
+            <a:ext cx="454736" cy="215167"/>
+          </a:xfrm>
+          <a:prstGeom prst="bentConnector2">
+            <a:avLst/>
+          </a:prstGeom>
+          <a:ln w="19050">
+            <a:solidFill>
+              <a:srgbClr val="7030A0"/>
+            </a:solidFill>
+            <a:headEnd type="none" w="med" len="med"/>
+            <a:tailEnd type="arrow" w="med" len="med"/>
+          </a:ln>
+          <a:effectLst/>
+        </p:spPr>
+        <p:style>
+          <a:lnRef idx="1">
+            <a:schemeClr val="accent2"/>
+          </a:lnRef>
+          <a:fillRef idx="2">
+            <a:schemeClr val="accent2"/>
+          </a:fillRef>
+          <a:effectRef idx="1">
+            <a:schemeClr val="accent2"/>
+          </a:effectRef>
+          <a:fontRef idx="minor">
+            <a:schemeClr val="dk1"/>
+          </a:fontRef>
+        </p:style>
+      </p:cxnSp>
+      <p:sp>
+        <p:nvSpPr>
+          <p:cNvPr id="91" name="Rectangle 8">
+            <a:extLst>
+              <a:ext uri="{FF2B5EF4-FFF2-40B4-BE49-F238E27FC236}">
+                <a16:creationId xmlns:a16="http://schemas.microsoft.com/office/drawing/2014/main" id="{631A63C6-2D86-4146-A560-947542B541C6}"/>
+              </a:ext>
+            </a:extLst>
+          </p:cNvPr>
+          <p:cNvSpPr/>
+          <p:nvPr/>
+        </p:nvSpPr>
+        <p:spPr>
+          <a:xfrm>
+            <a:off x="7842869" y="3938549"/>
+            <a:ext cx="1087832" cy="276354"/>
+          </a:xfrm>
+          <a:prstGeom prst="rect">
+            <a:avLst/>
+          </a:prstGeom>
+          <a:ln w="19050">
+            <a:solidFill>
+              <a:srgbClr val="7030A0"/>
+            </a:solidFill>
+          </a:ln>
+          <a:effectLst/>
+        </p:spPr>
+        <p:style>
+          <a:lnRef idx="1">
+            <a:schemeClr val="accent4"/>
+          </a:lnRef>
+          <a:fillRef idx="2">
+            <a:schemeClr val="accent4"/>
+          </a:fillRef>
+          <a:effectRef idx="1">
+            <a:schemeClr val="accent4"/>
+          </a:effectRef>
+          <a:fontRef idx="minor">
+            <a:schemeClr val="dk1"/>
+          </a:fontRef>
+        </p:style>
+        <p:txBody>
+          <a:bodyPr rtlCol="0" anchor="ctr"/>
+          <a:lstStyle/>
+          <a:p>
+            <a:pPr algn="ctr"/>
+            <a:r>
+              <a:rPr lang="en-US" sz="1050" dirty="0">
+                <a:solidFill>
+                  <a:srgbClr val="7030A0"/>
+                </a:solidFill>
+              </a:rPr>
+              <a:t>Allergies</a:t>
+            </a:r>
+            <a:endParaRPr lang="en-SG" sz="1050" dirty="0">
+              <a:solidFill>
+                <a:srgbClr val="7030A0"/>
+              </a:solidFill>
+            </a:endParaRPr>
+          </a:p>
+        </p:txBody>
+      </p:sp>
+      <p:sp>
+        <p:nvSpPr>
+          <p:cNvPr id="92" name="Flowchart: Decision 96">
+            <a:extLst>
+              <a:ext uri="{FF2B5EF4-FFF2-40B4-BE49-F238E27FC236}">
+                <a16:creationId xmlns:a16="http://schemas.microsoft.com/office/drawing/2014/main" id="{F4BDD891-322A-44E4-83E4-5AF70CDB8C64}"/>
+              </a:ext>
+            </a:extLst>
+          </p:cNvPr>
+          <p:cNvSpPr/>
+          <p:nvPr/>
+        </p:nvSpPr>
+        <p:spPr>
+          <a:xfrm>
+            <a:off x="8370934" y="3549880"/>
+            <a:ext cx="236048" cy="173380"/>
+          </a:xfrm>
+          <a:prstGeom prst="flowChartDecision">
+            <a:avLst/>
+          </a:prstGeom>
+          <a:solidFill>
+            <a:srgbClr val="7030A0"/>
+          </a:solidFill>
+          <a:ln w="19050">
+            <a:solidFill>
+              <a:srgbClr val="7030A0"/>
+            </a:solidFill>
+          </a:ln>
+          <a:effectLst/>
+        </p:spPr>
+        <p:style>
+          <a:lnRef idx="1">
+            <a:schemeClr val="accent6"/>
+          </a:lnRef>
+          <a:fillRef idx="2">
+            <a:schemeClr val="accent6"/>
+          </a:fillRef>
+          <a:effectRef idx="1">
+            <a:schemeClr val="accent6"/>
+          </a:effectRef>
+          <a:fontRef idx="minor">
+            <a:schemeClr val="dk1"/>
+          </a:fontRef>
+        </p:style>
+        <p:txBody>
+          <a:bodyPr rtlCol="0" anchor="ctr"/>
+          <a:lstStyle/>
+          <a:p>
+            <a:pPr algn="ctr"/>
+            <a:endParaRPr lang="en-US" sz="1050"/>
+          </a:p>
+        </p:txBody>
+      </p:sp>
+      <p:sp>
+        <p:nvSpPr>
+          <p:cNvPr id="94" name="Rectangle 8">
+            <a:extLst>
+              <a:ext uri="{FF2B5EF4-FFF2-40B4-BE49-F238E27FC236}">
+                <a16:creationId xmlns:a16="http://schemas.microsoft.com/office/drawing/2014/main" id="{818F642C-0654-4BEC-AFBE-D61C02466B97}"/>
+              </a:ext>
+            </a:extLst>
+          </p:cNvPr>
+          <p:cNvSpPr/>
+          <p:nvPr/>
+        </p:nvSpPr>
+        <p:spPr>
+          <a:xfrm>
+            <a:off x="7845305" y="4287003"/>
+            <a:ext cx="1093867" cy="278206"/>
+          </a:xfrm>
+          <a:prstGeom prst="rect">
+            <a:avLst/>
+          </a:prstGeom>
+          <a:ln w="19050">
+            <a:solidFill>
+              <a:srgbClr val="7030A0"/>
+            </a:solidFill>
+          </a:ln>
+          <a:effectLst/>
+        </p:spPr>
+        <p:style>
+          <a:lnRef idx="1">
+            <a:schemeClr val="accent4"/>
+          </a:lnRef>
+          <a:fillRef idx="2">
+            <a:schemeClr val="accent4"/>
+          </a:fillRef>
+          <a:effectRef idx="1">
+            <a:schemeClr val="accent4"/>
+          </a:effectRef>
+          <a:fontRef idx="minor">
+            <a:schemeClr val="dk1"/>
+          </a:fontRef>
+        </p:style>
+        <p:txBody>
+          <a:bodyPr rtlCol="0" anchor="ctr"/>
+          <a:lstStyle/>
+          <a:p>
+            <a:pPr algn="ctr"/>
+            <a:r>
+              <a:rPr lang="en-US" sz="1050" dirty="0" err="1">
+                <a:solidFill>
+                  <a:srgbClr val="7030A0"/>
+                </a:solidFill>
+              </a:rPr>
+              <a:t>NextOfKinName</a:t>
+            </a:r>
+            <a:endParaRPr lang="en-SG" sz="1050" dirty="0">
+              <a:solidFill>
+                <a:srgbClr val="7030A0"/>
+              </a:solidFill>
+            </a:endParaRPr>
+          </a:p>
+        </p:txBody>
+      </p:sp>
+      <p:sp>
+        <p:nvSpPr>
+          <p:cNvPr id="95" name="Rectangle 8">
+            <a:extLst>
+              <a:ext uri="{FF2B5EF4-FFF2-40B4-BE49-F238E27FC236}">
+                <a16:creationId xmlns:a16="http://schemas.microsoft.com/office/drawing/2014/main" id="{87C7C466-D5DB-4D71-A09B-14F25700291E}"/>
+              </a:ext>
+            </a:extLst>
+          </p:cNvPr>
+          <p:cNvSpPr/>
+          <p:nvPr/>
+        </p:nvSpPr>
+        <p:spPr>
+          <a:xfrm>
+            <a:off x="7842869" y="4649968"/>
+            <a:ext cx="1093867" cy="276354"/>
+          </a:xfrm>
+          <a:prstGeom prst="rect">
+            <a:avLst/>
+          </a:prstGeom>
+          <a:ln w="19050">
+            <a:solidFill>
+              <a:srgbClr val="7030A0"/>
+            </a:solidFill>
+          </a:ln>
+          <a:effectLst/>
+        </p:spPr>
+        <p:style>
+          <a:lnRef idx="1">
+            <a:schemeClr val="accent4"/>
+          </a:lnRef>
+          <a:fillRef idx="2">
+            <a:schemeClr val="accent4"/>
+          </a:fillRef>
+          <a:effectRef idx="1">
+            <a:schemeClr val="accent4"/>
+          </a:effectRef>
+          <a:fontRef idx="minor">
+            <a:schemeClr val="dk1"/>
+          </a:fontRef>
+        </p:style>
+        <p:txBody>
+          <a:bodyPr rtlCol="0" anchor="ctr"/>
+          <a:lstStyle/>
+          <a:p>
+            <a:pPr algn="ctr"/>
+            <a:r>
+              <a:rPr lang="en-US" sz="1050" dirty="0" err="1">
+                <a:solidFill>
+                  <a:srgbClr val="7030A0"/>
+                </a:solidFill>
+              </a:rPr>
+              <a:t>NextOfKinPhone</a:t>
+            </a:r>
+            <a:endParaRPr lang="en-SG" sz="1050" dirty="0">
+              <a:solidFill>
+                <a:srgbClr val="7030A0"/>
+              </a:solidFill>
+            </a:endParaRPr>
+          </a:p>
+        </p:txBody>
+      </p:sp>
+      <p:sp>
+        <p:nvSpPr>
+          <p:cNvPr id="96" name="Rectangle 8">
+            <a:extLst>
+              <a:ext uri="{FF2B5EF4-FFF2-40B4-BE49-F238E27FC236}">
+                <a16:creationId xmlns:a16="http://schemas.microsoft.com/office/drawing/2014/main" id="{46AC95C1-ED27-4993-BEDA-BC9C50C73519}"/>
+              </a:ext>
+            </a:extLst>
+          </p:cNvPr>
+          <p:cNvSpPr/>
+          <p:nvPr/>
+        </p:nvSpPr>
+        <p:spPr>
+          <a:xfrm>
+            <a:off x="7830924" y="4966745"/>
+            <a:ext cx="1108248" cy="285783"/>
+          </a:xfrm>
+          <a:prstGeom prst="rect">
+            <a:avLst/>
+          </a:prstGeom>
+          <a:ln w="19050">
+            <a:solidFill>
+              <a:srgbClr val="7030A0"/>
+            </a:solidFill>
+          </a:ln>
+          <a:effectLst/>
+        </p:spPr>
+        <p:style>
+          <a:lnRef idx="1">
+            <a:schemeClr val="accent4"/>
+          </a:lnRef>
+          <a:fillRef idx="2">
+            <a:schemeClr val="accent4"/>
+          </a:fillRef>
+          <a:effectRef idx="1">
+            <a:schemeClr val="accent4"/>
+          </a:effectRef>
+          <a:fontRef idx="minor">
+            <a:schemeClr val="dk1"/>
+          </a:fontRef>
+        </p:style>
+        <p:txBody>
+          <a:bodyPr rtlCol="0" anchor="ctr"/>
+          <a:lstStyle/>
+          <a:p>
+            <a:pPr algn="ctr"/>
+            <a:r>
+              <a:rPr lang="en-US" sz="1050" dirty="0">
+                <a:solidFill>
+                  <a:srgbClr val="7030A0"/>
+                </a:solidFill>
+              </a:rPr>
+              <a:t>Remarks</a:t>
+            </a:r>
+            <a:endParaRPr lang="en-SG" sz="1050" dirty="0">
+              <a:solidFill>
+                <a:srgbClr val="7030A0"/>
+              </a:solidFill>
+            </a:endParaRPr>
+          </a:p>
+        </p:txBody>
+      </p:sp>
+      <p:cxnSp>
+        <p:nvCxnSpPr>
+          <p:cNvPr id="102" name="Elbow Connector 78">
+            <a:extLst>
+              <a:ext uri="{FF2B5EF4-FFF2-40B4-BE49-F238E27FC236}">
+                <a16:creationId xmlns:a16="http://schemas.microsoft.com/office/drawing/2014/main" id="{65E7948A-1BF9-4A24-A369-30066313A6EC}"/>
+              </a:ext>
+            </a:extLst>
+          </p:cNvPr>
+          <p:cNvCxnSpPr>
+            <a:cxnSpLocks/>
+            <a:stCxn id="92" idx="3"/>
+            <a:endCxn id="91" idx="1"/>
+          </p:cNvCxnSpPr>
+          <p:nvPr/>
+        </p:nvCxnSpPr>
+        <p:spPr>
+          <a:xfrm flipH="1">
+            <a:off x="7842869" y="3636570"/>
+            <a:ext cx="764113" cy="440156"/>
+          </a:xfrm>
+          <a:prstGeom prst="bentConnector5">
+            <a:avLst>
+              <a:gd name="adj1" fmla="val -29917"/>
+              <a:gd name="adj2" fmla="val 44151"/>
+              <a:gd name="adj3" fmla="val 129917"/>
+            </a:avLst>
+          </a:prstGeom>
+          <a:ln w="19050">
+            <a:solidFill>
+              <a:srgbClr val="7030A0"/>
+            </a:solidFill>
+            <a:headEnd type="none" w="med" len="med"/>
+            <a:tailEnd type="arrow" w="med" len="med"/>
+          </a:ln>
+          <a:effectLst/>
+        </p:spPr>
+        <p:style>
+          <a:lnRef idx="1">
+            <a:schemeClr val="accent2"/>
+          </a:lnRef>
+          <a:fillRef idx="2">
+            <a:schemeClr val="accent2"/>
+          </a:fillRef>
+          <a:effectRef idx="1">
+            <a:schemeClr val="accent2"/>
+          </a:effectRef>
+          <a:fontRef idx="minor">
+            <a:schemeClr val="dk1"/>
+          </a:fontRef>
+        </p:style>
+      </p:cxnSp>
+      <p:cxnSp>
+        <p:nvCxnSpPr>
+          <p:cNvPr id="131" name="Elbow Connector 85">
+            <a:extLst>
+              <a:ext uri="{FF2B5EF4-FFF2-40B4-BE49-F238E27FC236}">
+                <a16:creationId xmlns:a16="http://schemas.microsoft.com/office/drawing/2014/main" id="{32191219-1404-432E-A34E-745F4825EAB8}"/>
+              </a:ext>
+            </a:extLst>
+          </p:cNvPr>
+          <p:cNvCxnSpPr>
+            <a:cxnSpLocks/>
+          </p:cNvCxnSpPr>
+          <p:nvPr/>
+        </p:nvCxnSpPr>
+        <p:spPr>
+          <a:xfrm rot="16200000" flipH="1">
+            <a:off x="7500216" y="4098310"/>
+            <a:ext cx="454736" cy="215167"/>
+          </a:xfrm>
+          <a:prstGeom prst="bentConnector2">
+            <a:avLst/>
+          </a:prstGeom>
+          <a:ln w="19050">
+            <a:solidFill>
+              <a:srgbClr val="7030A0"/>
+            </a:solidFill>
+            <a:headEnd type="none" w="med" len="med"/>
+            <a:tailEnd type="arrow" w="med" len="med"/>
+          </a:ln>
+          <a:effectLst/>
+        </p:spPr>
+        <p:style>
+          <a:lnRef idx="1">
+            <a:schemeClr val="accent2"/>
+          </a:lnRef>
+          <a:fillRef idx="2">
+            <a:schemeClr val="accent2"/>
+          </a:fillRef>
+          <a:effectRef idx="1">
+            <a:schemeClr val="accent2"/>
+          </a:effectRef>
+          <a:fontRef idx="minor">
+            <a:schemeClr val="dk1"/>
+          </a:fontRef>
+        </p:style>
+      </p:cxnSp>
+      <p:cxnSp>
+        <p:nvCxnSpPr>
+          <p:cNvPr id="132" name="Elbow Connector 85">
+            <a:extLst>
+              <a:ext uri="{FF2B5EF4-FFF2-40B4-BE49-F238E27FC236}">
+                <a16:creationId xmlns:a16="http://schemas.microsoft.com/office/drawing/2014/main" id="{2245C61B-29E1-4868-A365-BFEC907D19D2}"/>
+              </a:ext>
+            </a:extLst>
+          </p:cNvPr>
+          <p:cNvCxnSpPr>
+            <a:cxnSpLocks/>
+          </p:cNvCxnSpPr>
+          <p:nvPr/>
+        </p:nvCxnSpPr>
+        <p:spPr>
+          <a:xfrm rot="16200000" flipH="1">
+            <a:off x="7500216" y="4440900"/>
+            <a:ext cx="454736" cy="215167"/>
+          </a:xfrm>
+          <a:prstGeom prst="bentConnector2">
+            <a:avLst/>
+          </a:prstGeom>
+          <a:ln w="19050">
+            <a:solidFill>
+              <a:srgbClr val="7030A0"/>
+            </a:solidFill>
+            <a:headEnd type="none" w="med" len="med"/>
+            <a:tailEnd type="arrow" w="med" len="med"/>
+          </a:ln>
+          <a:effectLst/>
+        </p:spPr>
+        <p:style>
+          <a:lnRef idx="1">
+            <a:schemeClr val="accent2"/>
+          </a:lnRef>
+          <a:fillRef idx="2">
+            <a:schemeClr val="accent2"/>
+          </a:fillRef>
+          <a:effectRef idx="1">
+            <a:schemeClr val="accent2"/>
+          </a:effectRef>
+          <a:fontRef idx="minor">
+            <a:schemeClr val="dk1"/>
+          </a:fontRef>
+        </p:style>
+      </p:cxnSp>
+      <p:cxnSp>
+        <p:nvCxnSpPr>
+          <p:cNvPr id="133" name="Elbow Connector 85">
+            <a:extLst>
+              <a:ext uri="{FF2B5EF4-FFF2-40B4-BE49-F238E27FC236}">
+                <a16:creationId xmlns:a16="http://schemas.microsoft.com/office/drawing/2014/main" id="{5D0A9053-2EE0-433B-8085-7C551F4099A1}"/>
+              </a:ext>
+            </a:extLst>
+          </p:cNvPr>
+          <p:cNvCxnSpPr>
+            <a:cxnSpLocks/>
+          </p:cNvCxnSpPr>
+          <p:nvPr/>
+        </p:nvCxnSpPr>
+        <p:spPr>
+          <a:xfrm rot="16200000" flipH="1">
+            <a:off x="7500216" y="4775164"/>
+            <a:ext cx="454736" cy="215167"/>
+          </a:xfrm>
+          <a:prstGeom prst="bentConnector2">
+            <a:avLst/>
+          </a:prstGeom>
+          <a:ln w="19050">
+            <a:solidFill>
+              <a:srgbClr val="7030A0"/>
+            </a:solidFill>
+            <a:headEnd type="none" w="med" len="med"/>
+            <a:tailEnd type="arrow" w="med" len="med"/>
+          </a:ln>
+          <a:effectLst/>
+        </p:spPr>
+        <p:style>
+          <a:lnRef idx="1">
+            <a:schemeClr val="accent2"/>
+          </a:lnRef>
+          <a:fillRef idx="2">
+            <a:schemeClr val="accent2"/>
+          </a:fillRef>
+          <a:effectRef idx="1">
+            <a:schemeClr val="accent2"/>
+          </a:effectRef>
+          <a:fontRef idx="minor">
+            <a:schemeClr val="dk1"/>
+          </a:fontRef>
+        </p:style>
+      </p:cxnSp>
+      <p:sp>
+        <p:nvSpPr>
+          <p:cNvPr id="134" name="Rectangle 8">
+            <a:extLst>
+              <a:ext uri="{FF2B5EF4-FFF2-40B4-BE49-F238E27FC236}">
+                <a16:creationId xmlns:a16="http://schemas.microsoft.com/office/drawing/2014/main" id="{B547C6C8-6790-4C27-AD7A-18261EA4E9DB}"/>
+              </a:ext>
+            </a:extLst>
+          </p:cNvPr>
+          <p:cNvSpPr/>
+          <p:nvPr/>
+        </p:nvSpPr>
+        <p:spPr>
+          <a:xfrm>
+            <a:off x="7822468" y="5289419"/>
+            <a:ext cx="1116704" cy="273234"/>
+          </a:xfrm>
+          <a:prstGeom prst="rect">
+            <a:avLst/>
+          </a:prstGeom>
+          <a:ln w="19050">
+            <a:solidFill>
+              <a:srgbClr val="7030A0"/>
+            </a:solidFill>
+          </a:ln>
+          <a:effectLst/>
+        </p:spPr>
+        <p:style>
+          <a:lnRef idx="1">
+            <a:schemeClr val="accent4"/>
+          </a:lnRef>
+          <a:fillRef idx="2">
+            <a:schemeClr val="accent4"/>
+          </a:fillRef>
+          <a:effectRef idx="1">
+            <a:schemeClr val="accent4"/>
+          </a:effectRef>
+          <a:fontRef idx="minor">
+            <a:schemeClr val="dk1"/>
+          </a:fontRef>
+        </p:style>
+        <p:txBody>
+          <a:bodyPr rtlCol="0" anchor="ctr"/>
+          <a:lstStyle/>
+          <a:p>
+            <a:pPr algn="ctr"/>
+            <a:r>
+              <a:rPr lang="en-SG" sz="1050" dirty="0">
+                <a:solidFill>
+                  <a:srgbClr val="7030A0"/>
+                </a:solidFill>
+              </a:rPr>
+              <a:t>Profile Picture</a:t>
+            </a:r>
+          </a:p>
+        </p:txBody>
+      </p:sp>
+      <p:cxnSp>
+        <p:nvCxnSpPr>
+          <p:cNvPr id="135" name="Elbow Connector 85">
+            <a:extLst>
+              <a:ext uri="{FF2B5EF4-FFF2-40B4-BE49-F238E27FC236}">
+                <a16:creationId xmlns:a16="http://schemas.microsoft.com/office/drawing/2014/main" id="{973BADC6-E79C-4BDF-A410-5D5279B3FE19}"/>
+              </a:ext>
+            </a:extLst>
+          </p:cNvPr>
+          <p:cNvCxnSpPr>
+            <a:cxnSpLocks/>
+          </p:cNvCxnSpPr>
+          <p:nvPr/>
+        </p:nvCxnSpPr>
+        <p:spPr>
+          <a:xfrm rot="16200000" flipH="1">
+            <a:off x="7500217" y="5080221"/>
+            <a:ext cx="454736" cy="215167"/>
+          </a:xfrm>
+          <a:prstGeom prst="bentConnector2">
+            <a:avLst/>
+          </a:prstGeom>
+          <a:ln w="19050">
+            <a:solidFill>
+              <a:srgbClr val="7030A0"/>
+            </a:solidFill>
+            <a:headEnd type="none" w="med" len="med"/>
+            <a:tailEnd type="arrow" w="med" len="med"/>
+          </a:ln>
+          <a:effectLst/>
+        </p:spPr>
+        <p:style>
+          <a:lnRef idx="1">
+            <a:schemeClr val="accent2"/>
+          </a:lnRef>
+          <a:fillRef idx="2">
+            <a:schemeClr val="accent2"/>
+          </a:fillRef>
+          <a:effectRef idx="1">
+            <a:schemeClr val="accent2"/>
+          </a:effectRef>
+          <a:fontRef idx="minor">
+            <a:schemeClr val="dk1"/>
+          </a:fontRef>
+        </p:style>
+      </p:cxnSp>
+      <p:sp>
+        <p:nvSpPr>
+          <p:cNvPr id="136" name="Rectangle 8">
+            <a:extLst>
+              <a:ext uri="{FF2B5EF4-FFF2-40B4-BE49-F238E27FC236}">
+                <a16:creationId xmlns:a16="http://schemas.microsoft.com/office/drawing/2014/main" id="{35FD07B1-68C0-434B-B2AA-4569E01649DC}"/>
+              </a:ext>
+            </a:extLst>
+          </p:cNvPr>
+          <p:cNvSpPr/>
+          <p:nvPr/>
+        </p:nvSpPr>
+        <p:spPr>
+          <a:xfrm>
+            <a:off x="5975553" y="5229808"/>
+            <a:ext cx="1461282" cy="216023"/>
+          </a:xfrm>
+          <a:prstGeom prst="rect">
+            <a:avLst/>
+          </a:prstGeom>
+          <a:ln w="19050">
+            <a:solidFill>
+              <a:srgbClr val="7030A0"/>
+            </a:solidFill>
+          </a:ln>
+          <a:effectLst/>
+        </p:spPr>
+        <p:style>
+          <a:lnRef idx="1">
+            <a:schemeClr val="accent4"/>
+          </a:lnRef>
+          <a:fillRef idx="2">
+            <a:schemeClr val="accent4"/>
+          </a:fillRef>
+          <a:effectRef idx="1">
+            <a:schemeClr val="accent4"/>
+          </a:effectRef>
+          <a:fontRef idx="minor">
+            <a:schemeClr val="dk1"/>
+          </a:fontRef>
+        </p:style>
+        <p:txBody>
+          <a:bodyPr rtlCol="0" anchor="ctr"/>
+          <a:lstStyle/>
+          <a:p>
+            <a:pPr algn="ctr"/>
+            <a:r>
+              <a:rPr lang="en-US" sz="1050" dirty="0" err="1">
+                <a:solidFill>
+                  <a:srgbClr val="7030A0"/>
+                </a:solidFill>
+              </a:rPr>
+              <a:t>EndTime</a:t>
+            </a:r>
+            <a:endParaRPr lang="en-SG" sz="1050" dirty="0">
+              <a:solidFill>
+                <a:srgbClr val="7030A0"/>
+              </a:solidFill>
+            </a:endParaRPr>
+          </a:p>
+        </p:txBody>
+      </p:sp>
+      <p:cxnSp>
+        <p:nvCxnSpPr>
+          <p:cNvPr id="155" name="Elbow Connector 85">
+            <a:extLst>
+              <a:ext uri="{FF2B5EF4-FFF2-40B4-BE49-F238E27FC236}">
+                <a16:creationId xmlns:a16="http://schemas.microsoft.com/office/drawing/2014/main" id="{BCED55EE-4B83-4F53-BE2E-6C99B83FFD76}"/>
+              </a:ext>
+            </a:extLst>
+          </p:cNvPr>
+          <p:cNvCxnSpPr>
+            <a:cxnSpLocks/>
+          </p:cNvCxnSpPr>
+          <p:nvPr/>
+        </p:nvCxnSpPr>
+        <p:spPr>
+          <a:xfrm rot="16200000" flipH="1">
+            <a:off x="5620649" y="4981265"/>
+            <a:ext cx="454736" cy="215167"/>
+          </a:xfrm>
+          <a:prstGeom prst="bentConnector2">
+            <a:avLst/>
+          </a:prstGeom>
+          <a:ln w="19050">
+            <a:solidFill>
+              <a:srgbClr val="7030A0"/>
+            </a:solidFill>
+            <a:headEnd type="none" w="med" len="med"/>
+            <a:tailEnd type="arrow" w="med" len="med"/>
+          </a:ln>
+          <a:effectLst/>
+        </p:spPr>
+        <p:style>
+          <a:lnRef idx="1">
+            <a:schemeClr val="accent2"/>
+          </a:lnRef>
+          <a:fillRef idx="2">
+            <a:schemeClr val="accent2"/>
+          </a:fillRef>
+          <a:effectRef idx="1">
+            <a:schemeClr val="accent2"/>
+          </a:effectRef>
+          <a:fontRef idx="minor">
+            <a:schemeClr val="dk1"/>
+          </a:fontRef>
+        </p:style>
+      </p:cxnSp>
+      <p:sp>
+        <p:nvSpPr>
+          <p:cNvPr id="156" name="TextBox 155">
+            <a:extLst>
+              <a:ext uri="{FF2B5EF4-FFF2-40B4-BE49-F238E27FC236}">
+                <a16:creationId xmlns:a16="http://schemas.microsoft.com/office/drawing/2014/main" id="{B634604D-7CF5-406B-BC3C-370B0B958570}"/>
+              </a:ext>
+            </a:extLst>
+          </p:cNvPr>
+          <p:cNvSpPr txBox="1"/>
+          <p:nvPr/>
+        </p:nvSpPr>
+        <p:spPr>
+          <a:xfrm>
+            <a:off x="6728986" y="3619182"/>
             <a:ext cx="189257" cy="178683"/>
           </a:xfrm>
           <a:prstGeom prst="rect">

</xml_diff>

<commit_message>
more dev guide updates
</commit_message>
<xml_diff>
--- a/docs/diagrams/ModelComponentClassDiagram.pptx
+++ b/docs/diagrams/ModelComponentClassDiagram.pptx
@@ -3451,7 +3451,7 @@
         <p:spPr>
           <a:xfrm>
             <a:off x="304800" y="1143000"/>
-            <a:ext cx="8744174" cy="4490080"/>
+            <a:ext cx="8686800" cy="5020620"/>
           </a:xfrm>
           <a:prstGeom prst="roundRect">
             <a:avLst>
@@ -6136,7 +6136,7 @@
         </p:nvSpPr>
         <p:spPr>
           <a:xfrm>
-            <a:off x="5478610" y="3794289"/>
+            <a:off x="5151684" y="4088305"/>
             <a:ext cx="1371600" cy="285783"/>
           </a:xfrm>
           <a:prstGeom prst="rect">
@@ -6202,8 +6202,8 @@
         </p:nvCxnSpPr>
         <p:spPr>
           <a:xfrm rot="5400000">
-            <a:off x="5853374" y="3302757"/>
-            <a:ext cx="802568" cy="180496"/>
+            <a:off x="5542903" y="3286302"/>
+            <a:ext cx="1096584" cy="507422"/>
           </a:xfrm>
           <a:prstGeom prst="bentConnector3">
             <a:avLst>
@@ -6555,7 +6555,7 @@
         </p:nvSpPr>
         <p:spPr>
           <a:xfrm>
-            <a:off x="5002566" y="4249219"/>
+            <a:off x="4685212" y="4415797"/>
             <a:ext cx="708186" cy="346760"/>
           </a:xfrm>
           <a:prstGeom prst="rect">
@@ -6617,7 +6617,7 @@
         </p:nvSpPr>
         <p:spPr>
           <a:xfrm>
-            <a:off x="5966774" y="4659052"/>
+            <a:off x="5649420" y="4825630"/>
             <a:ext cx="1470060" cy="216023"/>
           </a:xfrm>
           <a:prstGeom prst="rect">
@@ -6679,7 +6679,7 @@
         </p:nvSpPr>
         <p:spPr>
           <a:xfrm>
-            <a:off x="5966775" y="4944835"/>
+            <a:off x="5649421" y="5111413"/>
             <a:ext cx="1470059" cy="233906"/>
           </a:xfrm>
           <a:prstGeom prst="rect">
@@ -6795,12 +6795,15 @@
           <p:nvPr/>
         </p:nvCxnSpPr>
         <p:spPr>
-          <a:xfrm>
-            <a:off x="5060905" y="3485087"/>
-            <a:ext cx="295754" cy="764132"/>
-          </a:xfrm>
-          <a:prstGeom prst="bentConnector2">
-            <a:avLst/>
+          <a:xfrm flipH="1">
+            <a:off x="5039305" y="3485087"/>
+            <a:ext cx="21600" cy="930710"/>
+          </a:xfrm>
+          <a:prstGeom prst="bentConnector4">
+            <a:avLst>
+              <a:gd name="adj1" fmla="val -1058333"/>
+              <a:gd name="adj2" fmla="val 54657"/>
+            </a:avLst>
           </a:prstGeom>
           <a:ln w="19050">
             <a:solidFill>
@@ -6885,7 +6888,7 @@
         </p:nvSpPr>
         <p:spPr>
           <a:xfrm>
-            <a:off x="5734680" y="4335909"/>
+            <a:off x="5417326" y="4502487"/>
             <a:ext cx="236048" cy="173380"/>
           </a:xfrm>
           <a:prstGeom prst="flowChartDecision">
@@ -6942,8 +6945,8 @@
         </p:nvCxnSpPr>
         <p:spPr>
           <a:xfrm rot="5400000" flipH="1" flipV="1">
-            <a:off x="5880639" y="4052138"/>
-            <a:ext cx="255837" cy="311706"/>
+            <a:off x="5622218" y="4287221"/>
+            <a:ext cx="128399" cy="302134"/>
           </a:xfrm>
           <a:prstGeom prst="bentConnector3">
             <a:avLst>
@@ -6991,7 +6994,7 @@
         </p:nvCxnSpPr>
         <p:spPr>
           <a:xfrm>
-            <a:off x="5729261" y="4767064"/>
+            <a:off x="5411907" y="4933642"/>
             <a:ext cx="237513" cy="12700"/>
           </a:xfrm>
           <a:prstGeom prst="bentConnector3">
@@ -7041,7 +7044,7 @@
         </p:nvCxnSpPr>
         <p:spPr>
           <a:xfrm flipH="1">
-            <a:off x="5966775" y="4422599"/>
+            <a:off x="5649421" y="4589177"/>
             <a:ext cx="3953" cy="639189"/>
           </a:xfrm>
           <a:prstGeom prst="bentConnector5">
@@ -7089,7 +7092,7 @@
         </p:nvSpPr>
         <p:spPr>
           <a:xfrm>
-            <a:off x="5403983" y="4619057"/>
+            <a:off x="4941947" y="4754958"/>
             <a:ext cx="189257" cy="178683"/>
           </a:xfrm>
           <a:prstGeom prst="rect">
@@ -7134,7 +7137,7 @@
         </p:nvSpPr>
         <p:spPr>
           <a:xfrm>
-            <a:off x="6905788" y="3501849"/>
+            <a:off x="6913378" y="3818381"/>
             <a:ext cx="1470060" cy="285783"/>
           </a:xfrm>
           <a:prstGeom prst="rect">
@@ -7167,12 +7170,12 @@
           <a:p>
             <a:pPr algn="ctr"/>
             <a:r>
-              <a:rPr lang="en-US" sz="1050" dirty="0">
+              <a:rPr lang="en-US" sz="1050" dirty="0" err="1">
                 <a:solidFill>
                   <a:srgbClr val="7030A0"/>
                 </a:solidFill>
               </a:rPr>
-              <a:t>Miscellaneous info</a:t>
+              <a:t>MiscellaneousInfo</a:t>
             </a:r>
             <a:endParaRPr lang="en-SG" sz="1050" dirty="0">
               <a:solidFill>
@@ -7242,7 +7245,7 @@
         </p:nvSpPr>
         <p:spPr>
           <a:xfrm>
-            <a:off x="7842869" y="3938549"/>
+            <a:off x="7826786" y="4283467"/>
             <a:ext cx="1087832" cy="276354"/>
           </a:xfrm>
           <a:prstGeom prst="rect">
@@ -7304,7 +7307,7 @@
         </p:nvSpPr>
         <p:spPr>
           <a:xfrm>
-            <a:off x="8370934" y="3549880"/>
+            <a:off x="8383905" y="3894802"/>
             <a:ext cx="236048" cy="173380"/>
           </a:xfrm>
           <a:prstGeom prst="flowChartDecision">
@@ -7357,7 +7360,7 @@
         </p:nvSpPr>
         <p:spPr>
           <a:xfrm>
-            <a:off x="7845305" y="4287003"/>
+            <a:off x="7829222" y="4631921"/>
             <a:ext cx="1093867" cy="278206"/>
           </a:xfrm>
           <a:prstGeom prst="rect">
@@ -7419,7 +7422,7 @@
         </p:nvSpPr>
         <p:spPr>
           <a:xfrm>
-            <a:off x="7842869" y="4649968"/>
+            <a:off x="7826786" y="4994886"/>
             <a:ext cx="1093867" cy="276354"/>
           </a:xfrm>
           <a:prstGeom prst="rect">
@@ -7481,7 +7484,7 @@
         </p:nvSpPr>
         <p:spPr>
           <a:xfrm>
-            <a:off x="7830924" y="4966745"/>
+            <a:off x="7814841" y="5311663"/>
             <a:ext cx="1108248" cy="285783"/>
           </a:xfrm>
           <a:prstGeom prst="rect">
@@ -7540,14 +7543,13 @@
           </p:cNvPr>
           <p:cNvCxnSpPr>
             <a:cxnSpLocks/>
-            <a:stCxn id="92" idx="3"/>
             <a:endCxn id="91" idx="1"/>
           </p:cNvCxnSpPr>
           <p:nvPr/>
         </p:nvCxnSpPr>
         <p:spPr>
           <a:xfrm flipH="1">
-            <a:off x="7842869" y="3636570"/>
+            <a:off x="7826786" y="3981488"/>
             <a:ext cx="764113" cy="440156"/>
           </a:xfrm>
           <a:prstGeom prst="bentConnector5">
@@ -7597,7 +7599,7 @@
         </p:nvCxnSpPr>
         <p:spPr>
           <a:xfrm rot="16200000" flipH="1">
-            <a:off x="7500216" y="4098310"/>
+            <a:off x="7484133" y="4443228"/>
             <a:ext cx="454736" cy="215167"/>
           </a:xfrm>
           <a:prstGeom prst="bentConnector2">
@@ -7643,7 +7645,7 @@
         </p:nvCxnSpPr>
         <p:spPr>
           <a:xfrm rot="16200000" flipH="1">
-            <a:off x="7500216" y="4440900"/>
+            <a:off x="7484133" y="4785818"/>
             <a:ext cx="454736" cy="215167"/>
           </a:xfrm>
           <a:prstGeom prst="bentConnector2">
@@ -7689,7 +7691,7 @@
         </p:nvCxnSpPr>
         <p:spPr>
           <a:xfrm rot="16200000" flipH="1">
-            <a:off x="7500216" y="4775164"/>
+            <a:off x="7484133" y="5120082"/>
             <a:ext cx="454736" cy="215167"/>
           </a:xfrm>
           <a:prstGeom prst="bentConnector2">
@@ -7721,10 +7723,10 @@
       </p:cxnSp>
       <p:sp>
         <p:nvSpPr>
-          <p:cNvPr id="134" name="Rectangle 8">
+          <p:cNvPr id="136" name="Rectangle 8">
             <a:extLst>
               <a:ext uri="{FF2B5EF4-FFF2-40B4-BE49-F238E27FC236}">
-                <a16:creationId xmlns:a16="http://schemas.microsoft.com/office/drawing/2014/main" id="{B547C6C8-6790-4C27-AD7A-18261EA4E9DB}"/>
+                <a16:creationId xmlns:a16="http://schemas.microsoft.com/office/drawing/2014/main" id="{35FD07B1-68C0-434B-B2AA-4569E01649DC}"/>
               </a:ext>
             </a:extLst>
           </p:cNvPr>
@@ -7733,8 +7735,8 @@
         </p:nvSpPr>
         <p:spPr>
           <a:xfrm>
-            <a:off x="7822468" y="5289419"/>
-            <a:ext cx="1116704" cy="273234"/>
+            <a:off x="5658199" y="5396386"/>
+            <a:ext cx="1461282" cy="216023"/>
           </a:xfrm>
           <a:prstGeom prst="rect">
             <a:avLst/>
@@ -7766,22 +7768,27 @@
           <a:p>
             <a:pPr algn="ctr"/>
             <a:r>
-              <a:rPr lang="en-SG" sz="1050" dirty="0">
+              <a:rPr lang="en-US" sz="1050" dirty="0" err="1">
                 <a:solidFill>
                   <a:srgbClr val="7030A0"/>
                 </a:solidFill>
               </a:rPr>
-              <a:t>Profile Picture</a:t>
-            </a:r>
+              <a:t>EndTime</a:t>
+            </a:r>
+            <a:endParaRPr lang="en-SG" sz="1050" dirty="0">
+              <a:solidFill>
+                <a:srgbClr val="7030A0"/>
+              </a:solidFill>
+            </a:endParaRPr>
           </a:p>
         </p:txBody>
       </p:sp>
       <p:cxnSp>
         <p:nvCxnSpPr>
-          <p:cNvPr id="135" name="Elbow Connector 85">
+          <p:cNvPr id="155" name="Elbow Connector 85">
             <a:extLst>
               <a:ext uri="{FF2B5EF4-FFF2-40B4-BE49-F238E27FC236}">
-                <a16:creationId xmlns:a16="http://schemas.microsoft.com/office/drawing/2014/main" id="{973BADC6-E79C-4BDF-A410-5D5279B3FE19}"/>
+                <a16:creationId xmlns:a16="http://schemas.microsoft.com/office/drawing/2014/main" id="{BCED55EE-4B83-4F53-BE2E-6C99B83FFD76}"/>
               </a:ext>
             </a:extLst>
           </p:cNvPr>
@@ -7792,7 +7799,7 @@
         </p:nvCxnSpPr>
         <p:spPr>
           <a:xfrm rot="16200000" flipH="1">
-            <a:off x="7500217" y="5080221"/>
+            <a:off x="5303295" y="5147843"/>
             <a:ext cx="454736" cy="215167"/>
           </a:xfrm>
           <a:prstGeom prst="bentConnector2">
@@ -7824,10 +7831,55 @@
       </p:cxnSp>
       <p:sp>
         <p:nvSpPr>
-          <p:cNvPr id="136" name="Rectangle 8">
+          <p:cNvPr id="156" name="TextBox 155">
             <a:extLst>
               <a:ext uri="{FF2B5EF4-FFF2-40B4-BE49-F238E27FC236}">
-                <a16:creationId xmlns:a16="http://schemas.microsoft.com/office/drawing/2014/main" id="{35FD07B1-68C0-434B-B2AA-4569E01649DC}"/>
+                <a16:creationId xmlns:a16="http://schemas.microsoft.com/office/drawing/2014/main" id="{B634604D-7CF5-406B-BC3C-370B0B958570}"/>
+              </a:ext>
+            </a:extLst>
+          </p:cNvPr>
+          <p:cNvSpPr txBox="1"/>
+          <p:nvPr/>
+        </p:nvSpPr>
+        <p:spPr>
+          <a:xfrm>
+            <a:off x="6756691" y="3934769"/>
+            <a:ext cx="189257" cy="178683"/>
+          </a:xfrm>
+          <a:prstGeom prst="rect">
+            <a:avLst/>
+          </a:prstGeom>
+          <a:noFill/>
+        </p:spPr>
+        <p:txBody>
+          <a:bodyPr wrap="square" lIns="0" tIns="0" rIns="0" bIns="0" rtlCol="0">
+            <a:noAutofit/>
+          </a:bodyPr>
+          <a:lstStyle/>
+          <a:p>
+            <a:pPr algn="ctr"/>
+            <a:r>
+              <a:rPr lang="en-US" sz="1100" dirty="0">
+                <a:solidFill>
+                  <a:srgbClr val="7030A0"/>
+                </a:solidFill>
+              </a:rPr>
+              <a:t>1</a:t>
+            </a:r>
+            <a:endParaRPr lang="en-SG" sz="1100" dirty="0">
+              <a:solidFill>
+                <a:srgbClr val="7030A0"/>
+              </a:solidFill>
+            </a:endParaRPr>
+          </a:p>
+        </p:txBody>
+      </p:sp>
+      <p:sp>
+        <p:nvSpPr>
+          <p:cNvPr id="110" name="Rectangle 8">
+            <a:extLst>
+              <a:ext uri="{FF2B5EF4-FFF2-40B4-BE49-F238E27FC236}">
+                <a16:creationId xmlns:a16="http://schemas.microsoft.com/office/drawing/2014/main" id="{CDEE74DE-0813-4E88-85BE-237B438DDAD5}"/>
               </a:ext>
             </a:extLst>
           </p:cNvPr>
@@ -7836,8 +7888,8 @@
         </p:nvSpPr>
         <p:spPr>
           <a:xfrm>
-            <a:off x="5975553" y="5229808"/>
-            <a:ext cx="1461282" cy="216023"/>
+            <a:off x="6901485" y="3497562"/>
+            <a:ext cx="1470060" cy="285783"/>
           </a:xfrm>
           <a:prstGeom prst="rect">
             <a:avLst/>
@@ -7874,7 +7926,7 @@
                   <a:srgbClr val="7030A0"/>
                 </a:solidFill>
               </a:rPr>
-              <a:t>EndTime</a:t>
+              <a:t>ProfilePicturePath</a:t>
             </a:r>
             <a:endParaRPr lang="en-SG" sz="1050" dirty="0">
               <a:solidFill>
@@ -7886,10 +7938,10 @@
       </p:sp>
       <p:cxnSp>
         <p:nvCxnSpPr>
-          <p:cNvPr id="155" name="Elbow Connector 85">
+          <p:cNvPr id="112" name="Elbow Connector 85">
             <a:extLst>
               <a:ext uri="{FF2B5EF4-FFF2-40B4-BE49-F238E27FC236}">
-                <a16:creationId xmlns:a16="http://schemas.microsoft.com/office/drawing/2014/main" id="{BCED55EE-4B83-4F53-BE2E-6C99B83FFD76}"/>
+                <a16:creationId xmlns:a16="http://schemas.microsoft.com/office/drawing/2014/main" id="{F0E875D8-27BE-4541-9D6E-3FB9DC479D07}"/>
               </a:ext>
             </a:extLst>
           </p:cNvPr>
@@ -7900,7 +7952,7 @@
         </p:nvCxnSpPr>
         <p:spPr>
           <a:xfrm rot="16200000" flipH="1">
-            <a:off x="5620649" y="4981265"/>
+            <a:off x="6561363" y="3605713"/>
             <a:ext cx="454736" cy="215167"/>
           </a:xfrm>
           <a:prstGeom prst="bentConnector2">
@@ -7930,51 +7982,6 @@
           </a:fontRef>
         </p:style>
       </p:cxnSp>
-      <p:sp>
-        <p:nvSpPr>
-          <p:cNvPr id="156" name="TextBox 155">
-            <a:extLst>
-              <a:ext uri="{FF2B5EF4-FFF2-40B4-BE49-F238E27FC236}">
-                <a16:creationId xmlns:a16="http://schemas.microsoft.com/office/drawing/2014/main" id="{B634604D-7CF5-406B-BC3C-370B0B958570}"/>
-              </a:ext>
-            </a:extLst>
-          </p:cNvPr>
-          <p:cNvSpPr txBox="1"/>
-          <p:nvPr/>
-        </p:nvSpPr>
-        <p:spPr>
-          <a:xfrm>
-            <a:off x="6728986" y="3619182"/>
-            <a:ext cx="189257" cy="178683"/>
-          </a:xfrm>
-          <a:prstGeom prst="rect">
-            <a:avLst/>
-          </a:prstGeom>
-          <a:noFill/>
-        </p:spPr>
-        <p:txBody>
-          <a:bodyPr wrap="square" lIns="0" tIns="0" rIns="0" bIns="0" rtlCol="0">
-            <a:noAutofit/>
-          </a:bodyPr>
-          <a:lstStyle/>
-          <a:p>
-            <a:pPr algn="ctr"/>
-            <a:r>
-              <a:rPr lang="en-US" sz="1100" dirty="0">
-                <a:solidFill>
-                  <a:srgbClr val="7030A0"/>
-                </a:solidFill>
-              </a:rPr>
-              <a:t>1</a:t>
-            </a:r>
-            <a:endParaRPr lang="en-SG" sz="1100" dirty="0">
-              <a:solidFill>
-                <a:srgbClr val="7030A0"/>
-              </a:solidFill>
-            </a:endParaRPr>
-          </a:p>
-        </p:txBody>
-      </p:sp>
     </p:spTree>
     <p:extLst>
       <p:ext uri="{BB962C8B-B14F-4D97-AF65-F5344CB8AC3E}">

</xml_diff>

<commit_message>
Udated class diagrams for Model and Storage components in DG
</commit_message>
<xml_diff>
--- a/docs/diagrams/ModelComponentClassDiagram.pptx
+++ b/docs/diagrams/ModelComponentClassDiagram.pptx
@@ -208,7 +208,7 @@
           <a:p>
             <a:fld id="{F5CC4B3F-88C1-4FFA-B1B6-F41C21DC6924}" type="datetimeFigureOut">
               <a:rPr lang="en-US" smtClean="0"/>
-              <a:t>3/27/2018</a:t>
+              <a:t>4/14/2018</a:t>
             </a:fld>
             <a:endParaRPr lang="en-US"/>
           </a:p>
@@ -654,7 +654,7 @@
           <a:p>
             <a:fld id="{78C97017-6FC3-485B-9764-EAC9E56C1D49}" type="datetimeFigureOut">
               <a:rPr lang="en-US" smtClean="0"/>
-              <a:t>3/27/2018</a:t>
+              <a:t>4/14/2018</a:t>
             </a:fld>
             <a:endParaRPr lang="en-US"/>
           </a:p>
@@ -822,7 +822,7 @@
           <a:p>
             <a:fld id="{78C97017-6FC3-485B-9764-EAC9E56C1D49}" type="datetimeFigureOut">
               <a:rPr lang="en-US" smtClean="0"/>
-              <a:t>3/27/2018</a:t>
+              <a:t>4/14/2018</a:t>
             </a:fld>
             <a:endParaRPr lang="en-US"/>
           </a:p>
@@ -1000,7 +1000,7 @@
           <a:p>
             <a:fld id="{78C97017-6FC3-485B-9764-EAC9E56C1D49}" type="datetimeFigureOut">
               <a:rPr lang="en-US" smtClean="0"/>
-              <a:t>3/27/2018</a:t>
+              <a:t>4/14/2018</a:t>
             </a:fld>
             <a:endParaRPr lang="en-US"/>
           </a:p>
@@ -1168,7 +1168,7 @@
           <a:p>
             <a:fld id="{78C97017-6FC3-485B-9764-EAC9E56C1D49}" type="datetimeFigureOut">
               <a:rPr lang="en-US" smtClean="0"/>
-              <a:t>3/27/2018</a:t>
+              <a:t>4/14/2018</a:t>
             </a:fld>
             <a:endParaRPr lang="en-US"/>
           </a:p>
@@ -1413,7 +1413,7 @@
           <a:p>
             <a:fld id="{78C97017-6FC3-485B-9764-EAC9E56C1D49}" type="datetimeFigureOut">
               <a:rPr lang="en-US" smtClean="0"/>
-              <a:t>3/27/2018</a:t>
+              <a:t>4/14/2018</a:t>
             </a:fld>
             <a:endParaRPr lang="en-US"/>
           </a:p>
@@ -1698,7 +1698,7 @@
           <a:p>
             <a:fld id="{78C97017-6FC3-485B-9764-EAC9E56C1D49}" type="datetimeFigureOut">
               <a:rPr lang="en-US" smtClean="0"/>
-              <a:t>3/27/2018</a:t>
+              <a:t>4/14/2018</a:t>
             </a:fld>
             <a:endParaRPr lang="en-US"/>
           </a:p>
@@ -2117,7 +2117,7 @@
           <a:p>
             <a:fld id="{78C97017-6FC3-485B-9764-EAC9E56C1D49}" type="datetimeFigureOut">
               <a:rPr lang="en-US" smtClean="0"/>
-              <a:t>3/27/2018</a:t>
+              <a:t>4/14/2018</a:t>
             </a:fld>
             <a:endParaRPr lang="en-US"/>
           </a:p>
@@ -2234,7 +2234,7 @@
           <a:p>
             <a:fld id="{78C97017-6FC3-485B-9764-EAC9E56C1D49}" type="datetimeFigureOut">
               <a:rPr lang="en-US" smtClean="0"/>
-              <a:t>3/27/2018</a:t>
+              <a:t>4/14/2018</a:t>
             </a:fld>
             <a:endParaRPr lang="en-US"/>
           </a:p>
@@ -2329,7 +2329,7 @@
           <a:p>
             <a:fld id="{78C97017-6FC3-485B-9764-EAC9E56C1D49}" type="datetimeFigureOut">
               <a:rPr lang="en-US" smtClean="0"/>
-              <a:t>3/27/2018</a:t>
+              <a:t>4/14/2018</a:t>
             </a:fld>
             <a:endParaRPr lang="en-US"/>
           </a:p>
@@ -2604,7 +2604,7 @@
           <a:p>
             <a:fld id="{78C97017-6FC3-485B-9764-EAC9E56C1D49}" type="datetimeFigureOut">
               <a:rPr lang="en-US" smtClean="0"/>
-              <a:t>3/27/2018</a:t>
+              <a:t>4/14/2018</a:t>
             </a:fld>
             <a:endParaRPr lang="en-US"/>
           </a:p>
@@ -2856,7 +2856,7 @@
           <a:p>
             <a:fld id="{78C97017-6FC3-485B-9764-EAC9E56C1D49}" type="datetimeFigureOut">
               <a:rPr lang="en-US" smtClean="0"/>
-              <a:t>3/27/2018</a:t>
+              <a:t>4/14/2018</a:t>
             </a:fld>
             <a:endParaRPr lang="en-US"/>
           </a:p>
@@ -3067,7 +3067,7 @@
           <a:p>
             <a:fld id="{78C97017-6FC3-485B-9764-EAC9E56C1D49}" type="datetimeFigureOut">
               <a:rPr lang="en-US" smtClean="0"/>
-              <a:t>3/27/2018</a:t>
+              <a:t>4/14/2018</a:t>
             </a:fld>
             <a:endParaRPr lang="en-US"/>
           </a:p>
@@ -3451,7 +3451,7 @@
         <p:spPr>
           <a:xfrm>
             <a:off x="1140081" y="620881"/>
-            <a:ext cx="7490735" cy="4106220"/>
+            <a:ext cx="7490735" cy="4159699"/>
           </a:xfrm>
           <a:prstGeom prst="roundRect">
             <a:avLst>
@@ -3625,19 +3625,20 @@
         <p:nvCxnSpPr>
           <p:cNvPr id="107" name="Elbow Connector 106"/>
           <p:cNvCxnSpPr>
+            <a:cxnSpLocks/>
             <a:stCxn id="9" idx="1"/>
+            <a:endCxn id="62" idx="2"/>
           </p:cNvCxnSpPr>
           <p:nvPr/>
         </p:nvCxnSpPr>
         <p:spPr>
           <a:xfrm rot="5400000" flipH="1" flipV="1">
-            <a:off x="4360065" y="1080909"/>
-            <a:ext cx="378691" cy="4637261"/>
-          </a:xfrm>
-          <a:prstGeom prst="bentConnector4">
+            <a:off x="4450026" y="1362155"/>
+            <a:ext cx="7485" cy="4445976"/>
+          </a:xfrm>
+          <a:prstGeom prst="bentConnector3">
             <a:avLst>
-              <a:gd name="adj1" fmla="val -101829"/>
-              <a:gd name="adj2" fmla="val 99976"/>
+              <a:gd name="adj1" fmla="val -2954108"/>
             </a:avLst>
           </a:prstGeom>
           <a:ln w="19050">
@@ -4102,7 +4103,7 @@
         </p:nvSpPr>
         <p:spPr>
           <a:xfrm>
-            <a:off x="4487017" y="2847371"/>
+            <a:off x="4495788" y="3140366"/>
             <a:ext cx="1156969" cy="346760"/>
           </a:xfrm>
           <a:prstGeom prst="rect">
@@ -4209,10 +4210,12 @@
         <p:spPr>
           <a:xfrm>
             <a:off x="4220351" y="2760681"/>
-            <a:ext cx="266666" cy="260070"/>
+            <a:ext cx="275437" cy="553065"/>
           </a:xfrm>
           <a:prstGeom prst="bentConnector3">
-            <a:avLst/>
+            <a:avLst>
+              <a:gd name="adj1" fmla="val 46777"/>
+            </a:avLst>
           </a:prstGeom>
           <a:ln w="19050">
             <a:solidFill>
@@ -4345,7 +4348,7 @@
         </p:nvSpPr>
         <p:spPr>
           <a:xfrm>
-            <a:off x="6313677" y="2858066"/>
+            <a:off x="6322664" y="3234640"/>
             <a:ext cx="708186" cy="346760"/>
           </a:xfrm>
           <a:prstGeom prst="rect">
@@ -4401,7 +4404,7 @@
         </p:nvSpPr>
         <p:spPr>
           <a:xfrm>
-            <a:off x="5643227" y="2943979"/>
+            <a:off x="5652214" y="3237547"/>
             <a:ext cx="236048" cy="173380"/>
           </a:xfrm>
           <a:prstGeom prst="flowChartDecision">
@@ -4449,8 +4452,8 @@
         </p:nvCxnSpPr>
         <p:spPr>
           <a:xfrm>
-            <a:off x="5879275" y="3030669"/>
-            <a:ext cx="434402" cy="777"/>
+            <a:off x="5888262" y="3324237"/>
+            <a:ext cx="434402" cy="83783"/>
           </a:xfrm>
           <a:prstGeom prst="bentConnector3">
             <a:avLst/>
@@ -4685,7 +4688,7 @@
         </p:nvSpPr>
         <p:spPr>
           <a:xfrm>
-            <a:off x="7041947" y="2948201"/>
+            <a:off x="7041434" y="3357966"/>
             <a:ext cx="236048" cy="173380"/>
           </a:xfrm>
           <a:prstGeom prst="flowChartDecision">
@@ -4735,8 +4738,8 @@
         </p:nvCxnSpPr>
         <p:spPr>
           <a:xfrm flipV="1">
-            <a:off x="7277995" y="2707130"/>
-            <a:ext cx="434402" cy="327761"/>
+            <a:off x="7277482" y="2707130"/>
+            <a:ext cx="434915" cy="737526"/>
           </a:xfrm>
           <a:prstGeom prst="bentConnector3">
             <a:avLst/>
@@ -4832,8 +4835,8 @@
         </p:nvCxnSpPr>
         <p:spPr>
           <a:xfrm flipV="1">
-            <a:off x="7277995" y="3030108"/>
-            <a:ext cx="434402" cy="4783"/>
+            <a:off x="7277482" y="3030108"/>
+            <a:ext cx="434915" cy="414548"/>
           </a:xfrm>
           <a:prstGeom prst="bentConnector3">
             <a:avLst/>
@@ -4928,9 +4931,9 @@
           <p:nvPr/>
         </p:nvCxnSpPr>
         <p:spPr>
-          <a:xfrm>
-            <a:off x="7277995" y="3034891"/>
-            <a:ext cx="434402" cy="318195"/>
+          <a:xfrm flipV="1">
+            <a:off x="7277482" y="3353086"/>
+            <a:ext cx="434915" cy="91570"/>
           </a:xfrm>
           <a:prstGeom prst="bentConnector3">
             <a:avLst/>
@@ -5026,8 +5029,8 @@
         </p:nvCxnSpPr>
         <p:spPr>
           <a:xfrm>
-            <a:off x="7277995" y="3034891"/>
-            <a:ext cx="434402" cy="641172"/>
+            <a:off x="7277482" y="3444656"/>
+            <a:ext cx="434915" cy="231407"/>
           </a:xfrm>
           <a:prstGeom prst="bentConnector3">
             <a:avLst/>
@@ -5225,8 +5228,8 @@
           <p:nvPr/>
         </p:nvSpPr>
         <p:spPr>
-          <a:xfrm rot="16200000">
-            <a:off x="6527512" y="3586305"/>
+          <a:xfrm>
+            <a:off x="5838574" y="3765578"/>
             <a:ext cx="881018" cy="261610"/>
           </a:xfrm>
           <a:prstGeom prst="rect">
@@ -5381,8 +5384,8 @@
         </p:nvCxnSpPr>
         <p:spPr>
           <a:xfrm rot="16200000" flipV="1">
-            <a:off x="5948976" y="2139271"/>
-            <a:ext cx="404117" cy="1033473"/>
+            <a:off x="5765182" y="2323065"/>
+            <a:ext cx="780691" cy="1042460"/>
           </a:xfrm>
           <a:prstGeom prst="bentConnector2">
             <a:avLst/>
@@ -5575,7 +5578,7 @@
         </p:nvSpPr>
         <p:spPr>
           <a:xfrm>
-            <a:off x="6135256" y="3097917"/>
+            <a:off x="6134894" y="3187445"/>
             <a:ext cx="189257" cy="178683"/>
           </a:xfrm>
           <a:prstGeom prst="rect">
@@ -5692,7 +5695,7 @@
         </p:nvSpPr>
         <p:spPr>
           <a:xfrm>
-            <a:off x="6667770" y="3210194"/>
+            <a:off x="6704769" y="3579409"/>
             <a:ext cx="189257" cy="178683"/>
           </a:xfrm>
           <a:prstGeom prst="rect">
@@ -5796,13 +5799,15 @@
           </p:cNvPr>
           <p:cNvCxnSpPr>
             <a:cxnSpLocks/>
+            <a:stCxn id="51" idx="3"/>
+            <a:endCxn id="52" idx="1"/>
           </p:cNvCxnSpPr>
           <p:nvPr/>
         </p:nvCxnSpPr>
         <p:spPr>
-          <a:xfrm rot="5400000" flipH="1" flipV="1">
-            <a:off x="3905582" y="2062984"/>
-            <a:ext cx="1194234" cy="318598"/>
+          <a:xfrm flipV="1">
+            <a:off x="4220351" y="1468780"/>
+            <a:ext cx="261480" cy="1291901"/>
           </a:xfrm>
           <a:prstGeom prst="bentConnector3">
             <a:avLst>
@@ -5847,7 +5852,7 @@
         </p:nvSpPr>
         <p:spPr>
           <a:xfrm>
-            <a:off x="4419600" y="1726317"/>
+            <a:off x="4306531" y="1235724"/>
             <a:ext cx="189257" cy="178683"/>
           </a:xfrm>
           <a:prstGeom prst="rect">
@@ -5891,8 +5896,8 @@
           <p:nvPr/>
         </p:nvSpPr>
         <p:spPr>
-          <a:xfrm rot="16200000">
-            <a:off x="4845466" y="1098134"/>
+          <a:xfrm>
+            <a:off x="5643303" y="1402279"/>
             <a:ext cx="236048" cy="173380"/>
           </a:xfrm>
           <a:prstGeom prst="flowChartDecision">
@@ -5946,11 +5951,11 @@
           <p:nvPr/>
         </p:nvCxnSpPr>
         <p:spPr>
-          <a:xfrm rot="5400000" flipH="1" flipV="1">
-            <a:off x="5069784" y="905286"/>
-            <a:ext cx="55220" cy="267809"/>
-          </a:xfrm>
-          <a:prstGeom prst="bentConnector2">
+          <a:xfrm flipV="1">
+            <a:off x="5879351" y="1485175"/>
+            <a:ext cx="625793" cy="3794"/>
+          </a:xfrm>
+          <a:prstGeom prst="straightConnector1">
             <a:avLst/>
           </a:prstGeom>
           <a:ln w="19050">
@@ -5991,7 +5996,7 @@
         </p:nvSpPr>
         <p:spPr>
           <a:xfrm>
-            <a:off x="5231299" y="838200"/>
+            <a:off x="6505144" y="1311795"/>
             <a:ext cx="588505" cy="346760"/>
           </a:xfrm>
           <a:prstGeom prst="rect">
@@ -6047,8 +6052,8 @@
           <p:nvPr/>
         </p:nvSpPr>
         <p:spPr>
-          <a:xfrm>
-            <a:off x="5819804" y="924890"/>
+          <a:xfrm rot="5400000">
+            <a:off x="6681372" y="1692004"/>
             <a:ext cx="236048" cy="173380"/>
           </a:xfrm>
           <a:prstGeom prst="flowChartDecision">
@@ -6098,18 +6103,18 @@
           </p:cNvPr>
           <p:cNvCxnSpPr>
             <a:cxnSpLocks/>
+            <a:stCxn id="82" idx="3"/>
+            <a:endCxn id="88" idx="1"/>
           </p:cNvCxnSpPr>
           <p:nvPr/>
         </p:nvCxnSpPr>
         <p:spPr>
-          <a:xfrm flipV="1">
-            <a:off x="5999324" y="830942"/>
-            <a:ext cx="493870" cy="171834"/>
-          </a:xfrm>
-          <a:prstGeom prst="bentConnector3">
-            <a:avLst>
-              <a:gd name="adj1" fmla="val 48111"/>
-            </a:avLst>
+          <a:xfrm rot="16200000" flipH="1">
+            <a:off x="7106130" y="1589984"/>
+            <a:ext cx="207137" cy="820604"/>
+          </a:xfrm>
+          <a:prstGeom prst="bentConnector2">
+            <a:avLst/>
           </a:prstGeom>
           <a:ln w="19050">
             <a:solidFill>
@@ -6149,8 +6154,8 @@
         </p:nvSpPr>
         <p:spPr>
           <a:xfrm>
-            <a:off x="6477000" y="685800"/>
-            <a:ext cx="914400" cy="325780"/>
+            <a:off x="7620000" y="1940965"/>
+            <a:ext cx="827658" cy="325780"/>
           </a:xfrm>
           <a:prstGeom prst="rect">
             <a:avLst/>
@@ -6190,6 +6195,672 @@
               <a:t>Information</a:t>
             </a:r>
             <a:endParaRPr lang="en-SG" sz="1050" dirty="0">
+              <a:solidFill>
+                <a:srgbClr val="7030A0"/>
+              </a:solidFill>
+            </a:endParaRPr>
+          </a:p>
+        </p:txBody>
+      </p:sp>
+      <p:cxnSp>
+        <p:nvCxnSpPr>
+          <p:cNvPr id="74" name="Elbow Connector 85">
+            <a:extLst>
+              <a:ext uri="{FF2B5EF4-FFF2-40B4-BE49-F238E27FC236}">
+                <a16:creationId xmlns:a16="http://schemas.microsoft.com/office/drawing/2014/main" id="{364E3DC3-34CB-4956-9A45-875504CEBCCA}"/>
+              </a:ext>
+            </a:extLst>
+          </p:cNvPr>
+          <p:cNvCxnSpPr>
+            <a:cxnSpLocks/>
+            <a:stCxn id="78" idx="3"/>
+            <a:endCxn id="89" idx="1"/>
+          </p:cNvCxnSpPr>
+          <p:nvPr/>
+        </p:nvCxnSpPr>
+        <p:spPr>
+          <a:xfrm>
+            <a:off x="7277482" y="3444656"/>
+            <a:ext cx="434915" cy="566299"/>
+          </a:xfrm>
+          <a:prstGeom prst="bentConnector3">
+            <a:avLst>
+              <a:gd name="adj1" fmla="val 50000"/>
+            </a:avLst>
+          </a:prstGeom>
+          <a:ln w="19050">
+            <a:solidFill>
+              <a:srgbClr val="7030A0"/>
+            </a:solidFill>
+            <a:headEnd type="none" w="med" len="med"/>
+            <a:tailEnd type="arrow" w="med" len="med"/>
+          </a:ln>
+          <a:effectLst/>
+        </p:spPr>
+        <p:style>
+          <a:lnRef idx="1">
+            <a:schemeClr val="accent2"/>
+          </a:lnRef>
+          <a:fillRef idx="2">
+            <a:schemeClr val="accent2"/>
+          </a:fillRef>
+          <a:effectRef idx="1">
+            <a:schemeClr val="accent2"/>
+          </a:effectRef>
+          <a:fontRef idx="minor">
+            <a:schemeClr val="dk1"/>
+          </a:fontRef>
+        </p:style>
+      </p:cxnSp>
+      <p:sp>
+        <p:nvSpPr>
+          <p:cNvPr id="89" name="Rectangle 8">
+            <a:extLst>
+              <a:ext uri="{FF2B5EF4-FFF2-40B4-BE49-F238E27FC236}">
+                <a16:creationId xmlns:a16="http://schemas.microsoft.com/office/drawing/2014/main" id="{E99164BD-821B-4E71-883D-A883FD3AEDF6}"/>
+              </a:ext>
+            </a:extLst>
+          </p:cNvPr>
+          <p:cNvSpPr/>
+          <p:nvPr/>
+        </p:nvSpPr>
+        <p:spPr>
+          <a:xfrm>
+            <a:off x="7712397" y="3864291"/>
+            <a:ext cx="708186" cy="293328"/>
+          </a:xfrm>
+          <a:prstGeom prst="rect">
+            <a:avLst/>
+          </a:prstGeom>
+          <a:ln w="19050">
+            <a:solidFill>
+              <a:srgbClr val="7030A0"/>
+            </a:solidFill>
+          </a:ln>
+          <a:effectLst/>
+        </p:spPr>
+        <p:style>
+          <a:lnRef idx="1">
+            <a:schemeClr val="accent4"/>
+          </a:lnRef>
+          <a:fillRef idx="2">
+            <a:schemeClr val="accent4"/>
+          </a:fillRef>
+          <a:effectRef idx="1">
+            <a:schemeClr val="accent4"/>
+          </a:effectRef>
+          <a:fontRef idx="minor">
+            <a:schemeClr val="dk1"/>
+          </a:fontRef>
+        </p:style>
+        <p:txBody>
+          <a:bodyPr rtlCol="0" anchor="ctr"/>
+          <a:lstStyle/>
+          <a:p>
+            <a:pPr algn="ctr"/>
+            <a:r>
+              <a:rPr lang="en-US" sz="1050" dirty="0">
+                <a:solidFill>
+                  <a:srgbClr val="7030A0"/>
+                </a:solidFill>
+              </a:rPr>
+              <a:t>Time</a:t>
+            </a:r>
+          </a:p>
+          <a:p>
+            <a:pPr algn="ctr"/>
+            <a:r>
+              <a:rPr lang="en-US" sz="1050" dirty="0" err="1">
+                <a:solidFill>
+                  <a:srgbClr val="7030A0"/>
+                </a:solidFill>
+              </a:rPr>
+              <a:t>TableLink</a:t>
+            </a:r>
+            <a:endParaRPr lang="en-SG" sz="1050" dirty="0">
+              <a:solidFill>
+                <a:srgbClr val="7030A0"/>
+              </a:solidFill>
+            </a:endParaRPr>
+          </a:p>
+        </p:txBody>
+      </p:sp>
+      <p:cxnSp>
+        <p:nvCxnSpPr>
+          <p:cNvPr id="90" name="Elbow Connector 85">
+            <a:extLst>
+              <a:ext uri="{FF2B5EF4-FFF2-40B4-BE49-F238E27FC236}">
+                <a16:creationId xmlns:a16="http://schemas.microsoft.com/office/drawing/2014/main" id="{3DFEE2C0-5320-45A9-A045-4FDA4929D157}"/>
+              </a:ext>
+            </a:extLst>
+          </p:cNvPr>
+          <p:cNvCxnSpPr>
+            <a:cxnSpLocks/>
+            <a:stCxn id="82" idx="3"/>
+            <a:endCxn id="49" idx="0"/>
+          </p:cNvCxnSpPr>
+          <p:nvPr/>
+        </p:nvCxnSpPr>
+        <p:spPr>
+          <a:xfrm rot="5400000">
+            <a:off x="5315011" y="1655981"/>
+            <a:ext cx="1243648" cy="1725123"/>
+          </a:xfrm>
+          <a:prstGeom prst="bentConnector3">
+            <a:avLst>
+              <a:gd name="adj1" fmla="val 77154"/>
+            </a:avLst>
+          </a:prstGeom>
+          <a:ln w="19050">
+            <a:solidFill>
+              <a:srgbClr val="7030A0"/>
+            </a:solidFill>
+            <a:headEnd type="none" w="med" len="med"/>
+            <a:tailEnd type="arrow" w="med" len="med"/>
+          </a:ln>
+          <a:effectLst/>
+        </p:spPr>
+        <p:style>
+          <a:lnRef idx="1">
+            <a:schemeClr val="accent2"/>
+          </a:lnRef>
+          <a:fillRef idx="2">
+            <a:schemeClr val="accent2"/>
+          </a:fillRef>
+          <a:effectRef idx="1">
+            <a:schemeClr val="accent2"/>
+          </a:effectRef>
+          <a:fontRef idx="minor">
+            <a:schemeClr val="dk1"/>
+          </a:fontRef>
+        </p:style>
+      </p:cxnSp>
+      <p:sp>
+        <p:nvSpPr>
+          <p:cNvPr id="91" name="TextBox 90">
+            <a:extLst>
+              <a:ext uri="{FF2B5EF4-FFF2-40B4-BE49-F238E27FC236}">
+                <a16:creationId xmlns:a16="http://schemas.microsoft.com/office/drawing/2014/main" id="{0F4392FB-FDF8-4019-9974-163C0925353D}"/>
+              </a:ext>
+            </a:extLst>
+          </p:cNvPr>
+          <p:cNvSpPr txBox="1"/>
+          <p:nvPr/>
+        </p:nvSpPr>
+        <p:spPr>
+          <a:xfrm>
+            <a:off x="6312755" y="1312937"/>
+            <a:ext cx="189257" cy="178683"/>
+          </a:xfrm>
+          <a:prstGeom prst="rect">
+            <a:avLst/>
+          </a:prstGeom>
+          <a:noFill/>
+        </p:spPr>
+        <p:txBody>
+          <a:bodyPr wrap="square" lIns="0" tIns="0" rIns="0" bIns="0" rtlCol="0">
+            <a:noAutofit/>
+          </a:bodyPr>
+          <a:lstStyle/>
+          <a:p>
+            <a:pPr algn="ctr"/>
+            <a:r>
+              <a:rPr lang="en-US" sz="1100" dirty="0">
+                <a:solidFill>
+                  <a:srgbClr val="7030A0"/>
+                </a:solidFill>
+              </a:rPr>
+              <a:t>*</a:t>
+            </a:r>
+            <a:endParaRPr lang="en-SG" sz="1100" dirty="0">
+              <a:solidFill>
+                <a:srgbClr val="7030A0"/>
+              </a:solidFill>
+            </a:endParaRPr>
+          </a:p>
+        </p:txBody>
+      </p:sp>
+      <p:sp>
+        <p:nvSpPr>
+          <p:cNvPr id="92" name="TextBox 91">
+            <a:extLst>
+              <a:ext uri="{FF2B5EF4-FFF2-40B4-BE49-F238E27FC236}">
+                <a16:creationId xmlns:a16="http://schemas.microsoft.com/office/drawing/2014/main" id="{9493738F-15DB-4A2D-B393-A41873FE67C4}"/>
+              </a:ext>
+            </a:extLst>
+          </p:cNvPr>
+          <p:cNvSpPr txBox="1"/>
+          <p:nvPr/>
+        </p:nvSpPr>
+        <p:spPr>
+          <a:xfrm>
+            <a:off x="5126380" y="2948331"/>
+            <a:ext cx="189257" cy="178683"/>
+          </a:xfrm>
+          <a:prstGeom prst="rect">
+            <a:avLst/>
+          </a:prstGeom>
+          <a:noFill/>
+        </p:spPr>
+        <p:txBody>
+          <a:bodyPr wrap="square" lIns="0" tIns="0" rIns="0" bIns="0" rtlCol="0">
+            <a:noAutofit/>
+          </a:bodyPr>
+          <a:lstStyle/>
+          <a:p>
+            <a:pPr algn="ctr"/>
+            <a:r>
+              <a:rPr lang="en-US" sz="1100" dirty="0">
+                <a:solidFill>
+                  <a:srgbClr val="7030A0"/>
+                </a:solidFill>
+              </a:rPr>
+              <a:t>1</a:t>
+            </a:r>
+            <a:endParaRPr lang="en-SG" sz="1100" dirty="0">
+              <a:solidFill>
+                <a:srgbClr val="7030A0"/>
+              </a:solidFill>
+            </a:endParaRPr>
+          </a:p>
+        </p:txBody>
+      </p:sp>
+      <p:sp>
+        <p:nvSpPr>
+          <p:cNvPr id="93" name="TextBox 92">
+            <a:extLst>
+              <a:ext uri="{FF2B5EF4-FFF2-40B4-BE49-F238E27FC236}">
+                <a16:creationId xmlns:a16="http://schemas.microsoft.com/office/drawing/2014/main" id="{EF707226-80AC-4DA6-B45F-314D20281B96}"/>
+              </a:ext>
+            </a:extLst>
+          </p:cNvPr>
+          <p:cNvSpPr txBox="1"/>
+          <p:nvPr/>
+        </p:nvSpPr>
+        <p:spPr>
+          <a:xfrm>
+            <a:off x="7297210" y="1880687"/>
+            <a:ext cx="189257" cy="178683"/>
+          </a:xfrm>
+          <a:prstGeom prst="rect">
+            <a:avLst/>
+          </a:prstGeom>
+          <a:noFill/>
+        </p:spPr>
+        <p:txBody>
+          <a:bodyPr wrap="square" lIns="0" tIns="0" rIns="0" bIns="0" rtlCol="0">
+            <a:noAutofit/>
+          </a:bodyPr>
+          <a:lstStyle/>
+          <a:p>
+            <a:pPr algn="ctr"/>
+            <a:r>
+              <a:rPr lang="en-US" sz="1100" dirty="0">
+                <a:solidFill>
+                  <a:srgbClr val="7030A0"/>
+                </a:solidFill>
+              </a:rPr>
+              <a:t>1</a:t>
+            </a:r>
+            <a:endParaRPr lang="en-SG" sz="1100" dirty="0">
+              <a:solidFill>
+                <a:srgbClr val="7030A0"/>
+              </a:solidFill>
+            </a:endParaRPr>
+          </a:p>
+        </p:txBody>
+      </p:sp>
+      <p:sp>
+        <p:nvSpPr>
+          <p:cNvPr id="126" name="Rectangle 8">
+            <a:extLst>
+              <a:ext uri="{FF2B5EF4-FFF2-40B4-BE49-F238E27FC236}">
+                <a16:creationId xmlns:a16="http://schemas.microsoft.com/office/drawing/2014/main" id="{DE0DCC95-DB6A-46BF-A787-D74C76C23B3D}"/>
+              </a:ext>
+            </a:extLst>
+          </p:cNvPr>
+          <p:cNvSpPr/>
+          <p:nvPr/>
+        </p:nvSpPr>
+        <p:spPr>
+          <a:xfrm>
+            <a:off x="4479147" y="745241"/>
+            <a:ext cx="1156969" cy="346760"/>
+          </a:xfrm>
+          <a:prstGeom prst="rect">
+            <a:avLst/>
+          </a:prstGeom>
+          <a:ln w="19050">
+            <a:solidFill>
+              <a:srgbClr val="7030A0"/>
+            </a:solidFill>
+          </a:ln>
+          <a:effectLst/>
+        </p:spPr>
+        <p:style>
+          <a:lnRef idx="1">
+            <a:schemeClr val="accent4"/>
+          </a:lnRef>
+          <a:fillRef idx="2">
+            <a:schemeClr val="accent4"/>
+          </a:fillRef>
+          <a:effectRef idx="1">
+            <a:schemeClr val="accent4"/>
+          </a:effectRef>
+          <a:fontRef idx="minor">
+            <a:schemeClr val="dk1"/>
+          </a:fontRef>
+        </p:style>
+        <p:txBody>
+          <a:bodyPr rtlCol="0" anchor="ctr"/>
+          <a:lstStyle/>
+          <a:p>
+            <a:pPr algn="ctr"/>
+            <a:r>
+              <a:rPr lang="en-US" sz="1050" dirty="0" err="1">
+                <a:solidFill>
+                  <a:srgbClr val="7030A0"/>
+                </a:solidFill>
+              </a:rPr>
+              <a:t>UniqueEventList</a:t>
+            </a:r>
+            <a:endParaRPr lang="en-SG" sz="1050" dirty="0">
+              <a:solidFill>
+                <a:srgbClr val="7030A0"/>
+              </a:solidFill>
+            </a:endParaRPr>
+          </a:p>
+        </p:txBody>
+      </p:sp>
+      <p:cxnSp>
+        <p:nvCxnSpPr>
+          <p:cNvPr id="127" name="Elbow Connector 58">
+            <a:extLst>
+              <a:ext uri="{FF2B5EF4-FFF2-40B4-BE49-F238E27FC236}">
+                <a16:creationId xmlns:a16="http://schemas.microsoft.com/office/drawing/2014/main" id="{E7869A49-2D16-43F1-A618-5E73C861718D}"/>
+              </a:ext>
+            </a:extLst>
+          </p:cNvPr>
+          <p:cNvCxnSpPr>
+            <a:cxnSpLocks/>
+            <a:stCxn id="51" idx="3"/>
+            <a:endCxn id="126" idx="1"/>
+          </p:cNvCxnSpPr>
+          <p:nvPr/>
+        </p:nvCxnSpPr>
+        <p:spPr>
+          <a:xfrm flipV="1">
+            <a:off x="4220351" y="918621"/>
+            <a:ext cx="258796" cy="1842060"/>
+          </a:xfrm>
+          <a:prstGeom prst="bentConnector3">
+            <a:avLst>
+              <a:gd name="adj1" fmla="val 50000"/>
+            </a:avLst>
+          </a:prstGeom>
+          <a:ln w="19050">
+            <a:solidFill>
+              <a:srgbClr val="7030A0"/>
+            </a:solidFill>
+            <a:headEnd type="none" w="med" len="med"/>
+            <a:tailEnd type="arrow" w="med" len="med"/>
+          </a:ln>
+          <a:effectLst/>
+        </p:spPr>
+        <p:style>
+          <a:lnRef idx="1">
+            <a:schemeClr val="accent2"/>
+          </a:lnRef>
+          <a:fillRef idx="2">
+            <a:schemeClr val="accent2"/>
+          </a:fillRef>
+          <a:effectRef idx="1">
+            <a:schemeClr val="accent2"/>
+          </a:effectRef>
+          <a:fontRef idx="minor">
+            <a:schemeClr val="dk1"/>
+          </a:fontRef>
+        </p:style>
+      </p:cxnSp>
+      <p:sp>
+        <p:nvSpPr>
+          <p:cNvPr id="128" name="TextBox 127">
+            <a:extLst>
+              <a:ext uri="{FF2B5EF4-FFF2-40B4-BE49-F238E27FC236}">
+                <a16:creationId xmlns:a16="http://schemas.microsoft.com/office/drawing/2014/main" id="{31F39A52-CF1E-46A9-81B8-AB631531411D}"/>
+              </a:ext>
+            </a:extLst>
+          </p:cNvPr>
+          <p:cNvSpPr txBox="1"/>
+          <p:nvPr/>
+        </p:nvSpPr>
+        <p:spPr>
+          <a:xfrm>
+            <a:off x="4306530" y="666453"/>
+            <a:ext cx="189257" cy="178683"/>
+          </a:xfrm>
+          <a:prstGeom prst="rect">
+            <a:avLst/>
+          </a:prstGeom>
+          <a:noFill/>
+        </p:spPr>
+        <p:txBody>
+          <a:bodyPr wrap="square" lIns="0" tIns="0" rIns="0" bIns="0" rtlCol="0">
+            <a:noAutofit/>
+          </a:bodyPr>
+          <a:lstStyle/>
+          <a:p>
+            <a:pPr algn="ctr"/>
+            <a:r>
+              <a:rPr lang="en-US" sz="1100" dirty="0">
+                <a:solidFill>
+                  <a:srgbClr val="7030A0"/>
+                </a:solidFill>
+              </a:rPr>
+              <a:t>1</a:t>
+            </a:r>
+            <a:endParaRPr lang="en-SG" sz="1100" dirty="0">
+              <a:solidFill>
+                <a:srgbClr val="7030A0"/>
+              </a:solidFill>
+            </a:endParaRPr>
+          </a:p>
+        </p:txBody>
+      </p:sp>
+      <p:sp>
+        <p:nvSpPr>
+          <p:cNvPr id="130" name="Flowchart: Decision 96">
+            <a:extLst>
+              <a:ext uri="{FF2B5EF4-FFF2-40B4-BE49-F238E27FC236}">
+                <a16:creationId xmlns:a16="http://schemas.microsoft.com/office/drawing/2014/main" id="{8EC98B0B-4BF4-4934-A19A-E777C4096E03}"/>
+              </a:ext>
+            </a:extLst>
+          </p:cNvPr>
+          <p:cNvSpPr/>
+          <p:nvPr/>
+        </p:nvSpPr>
+        <p:spPr>
+          <a:xfrm>
+            <a:off x="5644212" y="827097"/>
+            <a:ext cx="236048" cy="173380"/>
+          </a:xfrm>
+          <a:prstGeom prst="flowChartDecision">
+            <a:avLst/>
+          </a:prstGeom>
+          <a:noFill/>
+          <a:ln w="19050">
+            <a:solidFill>
+              <a:srgbClr val="7030A0"/>
+            </a:solidFill>
+          </a:ln>
+          <a:effectLst/>
+        </p:spPr>
+        <p:style>
+          <a:lnRef idx="1">
+            <a:schemeClr val="accent6"/>
+          </a:lnRef>
+          <a:fillRef idx="2">
+            <a:schemeClr val="accent6"/>
+          </a:fillRef>
+          <a:effectRef idx="1">
+            <a:schemeClr val="accent6"/>
+          </a:effectRef>
+          <a:fontRef idx="minor">
+            <a:schemeClr val="dk1"/>
+          </a:fontRef>
+        </p:style>
+        <p:txBody>
+          <a:bodyPr rtlCol="0" anchor="ctr"/>
+          <a:lstStyle/>
+          <a:p>
+            <a:pPr algn="ctr"/>
+            <a:endParaRPr lang="en-US" sz="1050"/>
+          </a:p>
+        </p:txBody>
+      </p:sp>
+      <p:cxnSp>
+        <p:nvCxnSpPr>
+          <p:cNvPr id="131" name="Elbow Connector 68">
+            <a:extLst>
+              <a:ext uri="{FF2B5EF4-FFF2-40B4-BE49-F238E27FC236}">
+                <a16:creationId xmlns:a16="http://schemas.microsoft.com/office/drawing/2014/main" id="{8D3BDF71-A831-471B-BEC8-36679847DE2C}"/>
+              </a:ext>
+            </a:extLst>
+          </p:cNvPr>
+          <p:cNvCxnSpPr>
+            <a:cxnSpLocks/>
+            <a:stCxn id="130" idx="3"/>
+            <a:endCxn id="132" idx="1"/>
+          </p:cNvCxnSpPr>
+          <p:nvPr/>
+        </p:nvCxnSpPr>
+        <p:spPr>
+          <a:xfrm flipV="1">
+            <a:off x="5880260" y="909993"/>
+            <a:ext cx="625793" cy="3794"/>
+          </a:xfrm>
+          <a:prstGeom prst="straightConnector1">
+            <a:avLst/>
+          </a:prstGeom>
+          <a:ln w="19050">
+            <a:solidFill>
+              <a:srgbClr val="7030A0"/>
+            </a:solidFill>
+            <a:headEnd type="none" w="med" len="med"/>
+            <a:tailEnd type="arrow" w="med" len="med"/>
+          </a:ln>
+          <a:effectLst/>
+        </p:spPr>
+        <p:style>
+          <a:lnRef idx="1">
+            <a:schemeClr val="accent2"/>
+          </a:lnRef>
+          <a:fillRef idx="2">
+            <a:schemeClr val="accent2"/>
+          </a:fillRef>
+          <a:effectRef idx="1">
+            <a:schemeClr val="accent2"/>
+          </a:effectRef>
+          <a:fontRef idx="minor">
+            <a:schemeClr val="dk1"/>
+          </a:fontRef>
+        </p:style>
+      </p:cxnSp>
+      <p:sp>
+        <p:nvSpPr>
+          <p:cNvPr id="132" name="Rectangle 8">
+            <a:extLst>
+              <a:ext uri="{FF2B5EF4-FFF2-40B4-BE49-F238E27FC236}">
+                <a16:creationId xmlns:a16="http://schemas.microsoft.com/office/drawing/2014/main" id="{5E70EFB8-B848-47BB-AF10-14C5748EBC2A}"/>
+              </a:ext>
+            </a:extLst>
+          </p:cNvPr>
+          <p:cNvSpPr/>
+          <p:nvPr/>
+        </p:nvSpPr>
+        <p:spPr>
+          <a:xfrm>
+            <a:off x="6506053" y="736613"/>
+            <a:ext cx="588505" cy="346760"/>
+          </a:xfrm>
+          <a:prstGeom prst="rect">
+            <a:avLst/>
+          </a:prstGeom>
+          <a:ln w="19050">
+            <a:solidFill>
+              <a:srgbClr val="7030A0"/>
+            </a:solidFill>
+          </a:ln>
+          <a:effectLst/>
+        </p:spPr>
+        <p:style>
+          <a:lnRef idx="1">
+            <a:schemeClr val="accent4"/>
+          </a:lnRef>
+          <a:fillRef idx="2">
+            <a:schemeClr val="accent4"/>
+          </a:fillRef>
+          <a:effectRef idx="1">
+            <a:schemeClr val="accent4"/>
+          </a:effectRef>
+          <a:fontRef idx="minor">
+            <a:schemeClr val="dk1"/>
+          </a:fontRef>
+        </p:style>
+        <p:txBody>
+          <a:bodyPr rtlCol="0" anchor="ctr"/>
+          <a:lstStyle/>
+          <a:p>
+            <a:pPr algn="ctr"/>
+            <a:r>
+              <a:rPr lang="en-SG" sz="1050" dirty="0">
+                <a:solidFill>
+                  <a:srgbClr val="7030A0"/>
+                </a:solidFill>
+              </a:rPr>
+              <a:t>Events</a:t>
+            </a:r>
+          </a:p>
+        </p:txBody>
+      </p:sp>
+      <p:sp>
+        <p:nvSpPr>
+          <p:cNvPr id="133" name="TextBox 132">
+            <a:extLst>
+              <a:ext uri="{FF2B5EF4-FFF2-40B4-BE49-F238E27FC236}">
+                <a16:creationId xmlns:a16="http://schemas.microsoft.com/office/drawing/2014/main" id="{8B70DF53-AA6A-4178-BED2-FA9C9C5734EB}"/>
+              </a:ext>
+            </a:extLst>
+          </p:cNvPr>
+          <p:cNvSpPr txBox="1"/>
+          <p:nvPr/>
+        </p:nvSpPr>
+        <p:spPr>
+          <a:xfrm>
+            <a:off x="6313664" y="737755"/>
+            <a:ext cx="189257" cy="178683"/>
+          </a:xfrm>
+          <a:prstGeom prst="rect">
+            <a:avLst/>
+          </a:prstGeom>
+          <a:noFill/>
+        </p:spPr>
+        <p:txBody>
+          <a:bodyPr wrap="square" lIns="0" tIns="0" rIns="0" bIns="0" rtlCol="0">
+            <a:noAutofit/>
+          </a:bodyPr>
+          <a:lstStyle/>
+          <a:p>
+            <a:pPr algn="ctr"/>
+            <a:r>
+              <a:rPr lang="en-US" sz="1100" dirty="0">
+                <a:solidFill>
+                  <a:srgbClr val="7030A0"/>
+                </a:solidFill>
+              </a:rPr>
+              <a:t>*</a:t>
+            </a:r>
+            <a:endParaRPr lang="en-SG" sz="1100" dirty="0">
               <a:solidFill>
                 <a:srgbClr val="7030A0"/>
               </a:solidFill>

</xml_diff>

<commit_message>
update Model Diagram to include UniqueToDoList
</commit_message>
<xml_diff>
--- a/docs/diagrams/ModelComponentClassDiagram.pptx
+++ b/docs/diagrams/ModelComponentClassDiagram.pptx
@@ -3450,8 +3450,8 @@
         </p:nvSpPr>
         <p:spPr>
           <a:xfrm>
-            <a:off x="1140081" y="620881"/>
-            <a:ext cx="7490735" cy="4159699"/>
+            <a:off x="1123653" y="536260"/>
+            <a:ext cx="7490735" cy="4947280"/>
           </a:xfrm>
           <a:prstGeom prst="roundRect">
             <a:avLst>
@@ -3488,14 +3488,14 @@
           <a:lstStyle/>
           <a:p>
             <a:r>
-              <a:rPr lang="en-US" sz="1200" b="1" dirty="0">
+              <a:rPr lang="en-US" sz="1200" b="1" baseline="-25000" dirty="0">
                 <a:solidFill>
                   <a:srgbClr val="7030A0"/>
                 </a:solidFill>
               </a:rPr>
               <a:t>Model</a:t>
             </a:r>
-            <a:endParaRPr lang="en-SG" sz="1200" b="1" dirty="0">
+            <a:endParaRPr lang="en-SG" sz="1200" b="1" baseline="-25000" dirty="0">
               <a:solidFill>
                 <a:srgbClr val="7030A0"/>
               </a:solidFill>
@@ -3638,7 +3638,7 @@
           </a:xfrm>
           <a:prstGeom prst="bentConnector3">
             <a:avLst>
-              <a:gd name="adj1" fmla="val -2954108"/>
+              <a:gd name="adj1" fmla="val -5753747"/>
             </a:avLst>
           </a:prstGeom>
           <a:ln w="19050">
@@ -4202,6 +4202,7 @@
         <p:nvCxnSpPr>
           <p:cNvPr id="30" name="Elbow Connector 29"/>
           <p:cNvCxnSpPr>
+            <a:cxnSpLocks/>
             <a:stCxn id="51" idx="3"/>
             <a:endCxn id="49" idx="1"/>
           </p:cNvCxnSpPr>
@@ -5335,6 +5336,7 @@
         <p:nvCxnSpPr>
           <p:cNvPr id="124" name="Elbow Connector 122"/>
           <p:cNvCxnSpPr>
+            <a:cxnSpLocks/>
             <a:stCxn id="119" idx="1"/>
             <a:endCxn id="122" idx="1"/>
           </p:cNvCxnSpPr>
@@ -6039,12 +6041,59 @@
           </a:p>
         </p:txBody>
       </p:sp>
-      <p:sp>
-        <p:nvSpPr>
-          <p:cNvPr id="82" name="Flowchart: Decision 96">
+      <p:cxnSp>
+        <p:nvCxnSpPr>
+          <p:cNvPr id="87" name="Elbow Connector 68">
             <a:extLst>
               <a:ext uri="{FF2B5EF4-FFF2-40B4-BE49-F238E27FC236}">
-                <a16:creationId xmlns:a16="http://schemas.microsoft.com/office/drawing/2014/main" id="{69E85AA0-AF4D-427B-A2DF-DA5023BBD8CE}"/>
+                <a16:creationId xmlns:a16="http://schemas.microsoft.com/office/drawing/2014/main" id="{EB3E3FF9-5E7F-4C42-8324-9904894D7BBE}"/>
+              </a:ext>
+            </a:extLst>
+          </p:cNvPr>
+          <p:cNvCxnSpPr>
+            <a:cxnSpLocks/>
+            <a:endCxn id="88" idx="1"/>
+          </p:cNvCxnSpPr>
+          <p:nvPr/>
+        </p:nvCxnSpPr>
+        <p:spPr>
+          <a:xfrm rot="16200000" flipH="1">
+            <a:off x="7106130" y="1380639"/>
+            <a:ext cx="207137" cy="820604"/>
+          </a:xfrm>
+          <a:prstGeom prst="bentConnector2">
+            <a:avLst/>
+          </a:prstGeom>
+          <a:ln w="19050">
+            <a:solidFill>
+              <a:srgbClr val="7030A0"/>
+            </a:solidFill>
+            <a:headEnd type="none" w="med" len="med"/>
+            <a:tailEnd type="arrow" w="med" len="med"/>
+          </a:ln>
+          <a:effectLst/>
+        </p:spPr>
+        <p:style>
+          <a:lnRef idx="1">
+            <a:schemeClr val="accent2"/>
+          </a:lnRef>
+          <a:fillRef idx="2">
+            <a:schemeClr val="accent2"/>
+          </a:fillRef>
+          <a:effectRef idx="1">
+            <a:schemeClr val="accent2"/>
+          </a:effectRef>
+          <a:fontRef idx="minor">
+            <a:schemeClr val="dk1"/>
+          </a:fontRef>
+        </p:style>
+      </p:cxnSp>
+      <p:sp>
+        <p:nvSpPr>
+          <p:cNvPr id="88" name="Rectangle 8">
+            <a:extLst>
+              <a:ext uri="{FF2B5EF4-FFF2-40B4-BE49-F238E27FC236}">
+                <a16:creationId xmlns:a16="http://schemas.microsoft.com/office/drawing/2014/main" id="{4D9E0984-F58B-4DCE-A38E-9AE58D3AFCA0}"/>
               </a:ext>
             </a:extLst>
           </p:cNvPr>
@@ -6052,16 +6101,541 @@
           <p:nvPr/>
         </p:nvSpPr>
         <p:spPr>
+          <a:xfrm>
+            <a:off x="7620000" y="1731620"/>
+            <a:ext cx="827658" cy="325780"/>
+          </a:xfrm>
+          <a:prstGeom prst="rect">
+            <a:avLst/>
+          </a:prstGeom>
+          <a:ln w="19050">
+            <a:solidFill>
+              <a:srgbClr val="7030A0"/>
+            </a:solidFill>
+          </a:ln>
+          <a:effectLst/>
+        </p:spPr>
+        <p:style>
+          <a:lnRef idx="1">
+            <a:schemeClr val="accent4"/>
+          </a:lnRef>
+          <a:fillRef idx="2">
+            <a:schemeClr val="accent4"/>
+          </a:fillRef>
+          <a:effectRef idx="1">
+            <a:schemeClr val="accent4"/>
+          </a:effectRef>
+          <a:fontRef idx="minor">
+            <a:schemeClr val="dk1"/>
+          </a:fontRef>
+        </p:style>
+        <p:txBody>
+          <a:bodyPr rtlCol="0" anchor="ctr"/>
+          <a:lstStyle/>
+          <a:p>
+            <a:pPr algn="ctr"/>
+            <a:r>
+              <a:rPr lang="en-US" sz="1050" dirty="0">
+                <a:solidFill>
+                  <a:srgbClr val="7030A0"/>
+                </a:solidFill>
+              </a:rPr>
+              <a:t>Information</a:t>
+            </a:r>
+            <a:endParaRPr lang="en-SG" sz="1050" dirty="0">
+              <a:solidFill>
+                <a:srgbClr val="7030A0"/>
+              </a:solidFill>
+            </a:endParaRPr>
+          </a:p>
+        </p:txBody>
+      </p:sp>
+      <p:cxnSp>
+        <p:nvCxnSpPr>
+          <p:cNvPr id="74" name="Elbow Connector 85">
+            <a:extLst>
+              <a:ext uri="{FF2B5EF4-FFF2-40B4-BE49-F238E27FC236}">
+                <a16:creationId xmlns:a16="http://schemas.microsoft.com/office/drawing/2014/main" id="{364E3DC3-34CB-4956-9A45-875504CEBCCA}"/>
+              </a:ext>
+            </a:extLst>
+          </p:cNvPr>
+          <p:cNvCxnSpPr>
+            <a:cxnSpLocks/>
+            <a:stCxn id="78" idx="3"/>
+            <a:endCxn id="89" idx="1"/>
+          </p:cNvCxnSpPr>
+          <p:nvPr/>
+        </p:nvCxnSpPr>
+        <p:spPr>
+          <a:xfrm>
+            <a:off x="7277482" y="3444656"/>
+            <a:ext cx="434915" cy="594099"/>
+          </a:xfrm>
+          <a:prstGeom prst="bentConnector3">
+            <a:avLst>
+              <a:gd name="adj1" fmla="val 50000"/>
+            </a:avLst>
+          </a:prstGeom>
+          <a:ln w="19050">
+            <a:solidFill>
+              <a:srgbClr val="7030A0"/>
+            </a:solidFill>
+            <a:headEnd type="none" w="med" len="med"/>
+            <a:tailEnd type="arrow" w="med" len="med"/>
+          </a:ln>
+          <a:effectLst/>
+        </p:spPr>
+        <p:style>
+          <a:lnRef idx="1">
+            <a:schemeClr val="accent2"/>
+          </a:lnRef>
+          <a:fillRef idx="2">
+            <a:schemeClr val="accent2"/>
+          </a:fillRef>
+          <a:effectRef idx="1">
+            <a:schemeClr val="accent2"/>
+          </a:effectRef>
+          <a:fontRef idx="minor">
+            <a:schemeClr val="dk1"/>
+          </a:fontRef>
+        </p:style>
+      </p:cxnSp>
+      <p:sp>
+        <p:nvSpPr>
+          <p:cNvPr id="89" name="Rectangle 8">
+            <a:extLst>
+              <a:ext uri="{FF2B5EF4-FFF2-40B4-BE49-F238E27FC236}">
+                <a16:creationId xmlns:a16="http://schemas.microsoft.com/office/drawing/2014/main" id="{E99164BD-821B-4E71-883D-A883FD3AEDF6}"/>
+              </a:ext>
+            </a:extLst>
+          </p:cNvPr>
+          <p:cNvSpPr/>
+          <p:nvPr/>
+        </p:nvSpPr>
+        <p:spPr>
+          <a:xfrm>
+            <a:off x="7712397" y="3864290"/>
+            <a:ext cx="708186" cy="348929"/>
+          </a:xfrm>
+          <a:prstGeom prst="rect">
+            <a:avLst/>
+          </a:prstGeom>
+          <a:ln w="19050">
+            <a:solidFill>
+              <a:srgbClr val="7030A0"/>
+            </a:solidFill>
+          </a:ln>
+          <a:effectLst/>
+        </p:spPr>
+        <p:style>
+          <a:lnRef idx="1">
+            <a:schemeClr val="accent4"/>
+          </a:lnRef>
+          <a:fillRef idx="2">
+            <a:schemeClr val="accent4"/>
+          </a:fillRef>
+          <a:effectRef idx="1">
+            <a:schemeClr val="accent4"/>
+          </a:effectRef>
+          <a:fontRef idx="minor">
+            <a:schemeClr val="dk1"/>
+          </a:fontRef>
+        </p:style>
+        <p:txBody>
+          <a:bodyPr rtlCol="0" anchor="ctr"/>
+          <a:lstStyle/>
+          <a:p>
+            <a:pPr algn="ctr"/>
+            <a:r>
+              <a:rPr lang="en-US" sz="1050" dirty="0">
+                <a:solidFill>
+                  <a:srgbClr val="7030A0"/>
+                </a:solidFill>
+              </a:rPr>
+              <a:t>Time</a:t>
+            </a:r>
+          </a:p>
+          <a:p>
+            <a:pPr algn="ctr"/>
+            <a:r>
+              <a:rPr lang="en-US" sz="1050" dirty="0" err="1">
+                <a:solidFill>
+                  <a:srgbClr val="7030A0"/>
+                </a:solidFill>
+              </a:rPr>
+              <a:t>TableLink</a:t>
+            </a:r>
+            <a:endParaRPr lang="en-SG" sz="1050" dirty="0">
+              <a:solidFill>
+                <a:srgbClr val="7030A0"/>
+              </a:solidFill>
+            </a:endParaRPr>
+          </a:p>
+        </p:txBody>
+      </p:sp>
+      <p:cxnSp>
+        <p:nvCxnSpPr>
+          <p:cNvPr id="90" name="Elbow Connector 85">
+            <a:extLst>
+              <a:ext uri="{FF2B5EF4-FFF2-40B4-BE49-F238E27FC236}">
+                <a16:creationId xmlns:a16="http://schemas.microsoft.com/office/drawing/2014/main" id="{3DFEE2C0-5320-45A9-A045-4FDA4929D157}"/>
+              </a:ext>
+            </a:extLst>
+          </p:cNvPr>
+          <p:cNvCxnSpPr>
+            <a:cxnSpLocks/>
+            <a:stCxn id="77" idx="2"/>
+            <a:endCxn id="49" idx="0"/>
+          </p:cNvCxnSpPr>
+          <p:nvPr/>
+        </p:nvCxnSpPr>
+        <p:spPr>
           <a:xfrm rot="5400000">
-            <a:off x="6681372" y="1692004"/>
+            <a:off x="5195930" y="1536898"/>
+            <a:ext cx="1481811" cy="1725124"/>
+          </a:xfrm>
+          <a:prstGeom prst="bentConnector3">
+            <a:avLst>
+              <a:gd name="adj1" fmla="val 80854"/>
+            </a:avLst>
+          </a:prstGeom>
+          <a:ln w="19050">
+            <a:solidFill>
+              <a:srgbClr val="7030A0"/>
+            </a:solidFill>
+            <a:headEnd type="none" w="med" len="med"/>
+            <a:tailEnd type="arrow" w="med" len="med"/>
+          </a:ln>
+          <a:effectLst/>
+        </p:spPr>
+        <p:style>
+          <a:lnRef idx="1">
+            <a:schemeClr val="accent2"/>
+          </a:lnRef>
+          <a:fillRef idx="2">
+            <a:schemeClr val="accent2"/>
+          </a:fillRef>
+          <a:effectRef idx="1">
+            <a:schemeClr val="accent2"/>
+          </a:effectRef>
+          <a:fontRef idx="minor">
+            <a:schemeClr val="dk1"/>
+          </a:fontRef>
+        </p:style>
+      </p:cxnSp>
+      <p:sp>
+        <p:nvSpPr>
+          <p:cNvPr id="91" name="TextBox 90">
+            <a:extLst>
+              <a:ext uri="{FF2B5EF4-FFF2-40B4-BE49-F238E27FC236}">
+                <a16:creationId xmlns:a16="http://schemas.microsoft.com/office/drawing/2014/main" id="{0F4392FB-FDF8-4019-9974-163C0925353D}"/>
+              </a:ext>
+            </a:extLst>
+          </p:cNvPr>
+          <p:cNvSpPr txBox="1"/>
+          <p:nvPr/>
+        </p:nvSpPr>
+        <p:spPr>
+          <a:xfrm>
+            <a:off x="6312755" y="1312937"/>
+            <a:ext cx="189257" cy="178683"/>
+          </a:xfrm>
+          <a:prstGeom prst="rect">
+            <a:avLst/>
+          </a:prstGeom>
+          <a:noFill/>
+        </p:spPr>
+        <p:txBody>
+          <a:bodyPr wrap="square" lIns="0" tIns="0" rIns="0" bIns="0" rtlCol="0">
+            <a:noAutofit/>
+          </a:bodyPr>
+          <a:lstStyle/>
+          <a:p>
+            <a:pPr algn="ctr"/>
+            <a:r>
+              <a:rPr lang="en-US" sz="1100" dirty="0">
+                <a:solidFill>
+                  <a:srgbClr val="7030A0"/>
+                </a:solidFill>
+              </a:rPr>
+              <a:t>*</a:t>
+            </a:r>
+            <a:endParaRPr lang="en-SG" sz="1100" dirty="0">
+              <a:solidFill>
+                <a:srgbClr val="7030A0"/>
+              </a:solidFill>
+            </a:endParaRPr>
+          </a:p>
+        </p:txBody>
+      </p:sp>
+      <p:sp>
+        <p:nvSpPr>
+          <p:cNvPr id="92" name="TextBox 91">
+            <a:extLst>
+              <a:ext uri="{FF2B5EF4-FFF2-40B4-BE49-F238E27FC236}">
+                <a16:creationId xmlns:a16="http://schemas.microsoft.com/office/drawing/2014/main" id="{9493738F-15DB-4A2D-B393-A41873FE67C4}"/>
+              </a:ext>
+            </a:extLst>
+          </p:cNvPr>
+          <p:cNvSpPr txBox="1"/>
+          <p:nvPr/>
+        </p:nvSpPr>
+        <p:spPr>
+          <a:xfrm>
+            <a:off x="5126380" y="2948331"/>
+            <a:ext cx="189257" cy="178683"/>
+          </a:xfrm>
+          <a:prstGeom prst="rect">
+            <a:avLst/>
+          </a:prstGeom>
+          <a:noFill/>
+        </p:spPr>
+        <p:txBody>
+          <a:bodyPr wrap="square" lIns="0" tIns="0" rIns="0" bIns="0" rtlCol="0">
+            <a:noAutofit/>
+          </a:bodyPr>
+          <a:lstStyle/>
+          <a:p>
+            <a:pPr algn="ctr"/>
+            <a:r>
+              <a:rPr lang="en-US" sz="1100" dirty="0">
+                <a:solidFill>
+                  <a:srgbClr val="7030A0"/>
+                </a:solidFill>
+              </a:rPr>
+              <a:t>1</a:t>
+            </a:r>
+            <a:endParaRPr lang="en-SG" sz="1100" dirty="0">
+              <a:solidFill>
+                <a:srgbClr val="7030A0"/>
+              </a:solidFill>
+            </a:endParaRPr>
+          </a:p>
+        </p:txBody>
+      </p:sp>
+      <p:sp>
+        <p:nvSpPr>
+          <p:cNvPr id="93" name="TextBox 92">
+            <a:extLst>
+              <a:ext uri="{FF2B5EF4-FFF2-40B4-BE49-F238E27FC236}">
+                <a16:creationId xmlns:a16="http://schemas.microsoft.com/office/drawing/2014/main" id="{EF707226-80AC-4DA6-B45F-314D20281B96}"/>
+              </a:ext>
+            </a:extLst>
+          </p:cNvPr>
+          <p:cNvSpPr txBox="1"/>
+          <p:nvPr/>
+        </p:nvSpPr>
+        <p:spPr>
+          <a:xfrm>
+            <a:off x="7354543" y="1676400"/>
+            <a:ext cx="189257" cy="178683"/>
+          </a:xfrm>
+          <a:prstGeom prst="rect">
+            <a:avLst/>
+          </a:prstGeom>
+          <a:noFill/>
+        </p:spPr>
+        <p:txBody>
+          <a:bodyPr wrap="square" lIns="0" tIns="0" rIns="0" bIns="0" rtlCol="0">
+            <a:noAutofit/>
+          </a:bodyPr>
+          <a:lstStyle/>
+          <a:p>
+            <a:pPr algn="ctr"/>
+            <a:r>
+              <a:rPr lang="en-US" sz="1100" dirty="0">
+                <a:solidFill>
+                  <a:srgbClr val="7030A0"/>
+                </a:solidFill>
+              </a:rPr>
+              <a:t>1</a:t>
+            </a:r>
+            <a:endParaRPr lang="en-SG" sz="1100" dirty="0">
+              <a:solidFill>
+                <a:srgbClr val="7030A0"/>
+              </a:solidFill>
+            </a:endParaRPr>
+          </a:p>
+        </p:txBody>
+      </p:sp>
+      <p:sp>
+        <p:nvSpPr>
+          <p:cNvPr id="126" name="Rectangle 8">
+            <a:extLst>
+              <a:ext uri="{FF2B5EF4-FFF2-40B4-BE49-F238E27FC236}">
+                <a16:creationId xmlns:a16="http://schemas.microsoft.com/office/drawing/2014/main" id="{DE0DCC95-DB6A-46BF-A787-D74C76C23B3D}"/>
+              </a:ext>
+            </a:extLst>
+          </p:cNvPr>
+          <p:cNvSpPr/>
+          <p:nvPr/>
+        </p:nvSpPr>
+        <p:spPr>
+          <a:xfrm>
+            <a:off x="4479147" y="745241"/>
+            <a:ext cx="1156969" cy="346760"/>
+          </a:xfrm>
+          <a:prstGeom prst="rect">
+            <a:avLst/>
+          </a:prstGeom>
+          <a:ln w="19050">
+            <a:solidFill>
+              <a:srgbClr val="7030A0"/>
+            </a:solidFill>
+          </a:ln>
+          <a:effectLst/>
+        </p:spPr>
+        <p:style>
+          <a:lnRef idx="1">
+            <a:schemeClr val="accent4"/>
+          </a:lnRef>
+          <a:fillRef idx="2">
+            <a:schemeClr val="accent4"/>
+          </a:fillRef>
+          <a:effectRef idx="1">
+            <a:schemeClr val="accent4"/>
+          </a:effectRef>
+          <a:fontRef idx="minor">
+            <a:schemeClr val="dk1"/>
+          </a:fontRef>
+        </p:style>
+        <p:txBody>
+          <a:bodyPr rtlCol="0" anchor="ctr"/>
+          <a:lstStyle/>
+          <a:p>
+            <a:pPr algn="ctr"/>
+            <a:r>
+              <a:rPr lang="en-US" sz="1050" dirty="0" err="1">
+                <a:solidFill>
+                  <a:srgbClr val="7030A0"/>
+                </a:solidFill>
+              </a:rPr>
+              <a:t>UniqueEventList</a:t>
+            </a:r>
+            <a:endParaRPr lang="en-SG" sz="1050" dirty="0">
+              <a:solidFill>
+                <a:srgbClr val="7030A0"/>
+              </a:solidFill>
+            </a:endParaRPr>
+          </a:p>
+        </p:txBody>
+      </p:sp>
+      <p:cxnSp>
+        <p:nvCxnSpPr>
+          <p:cNvPr id="127" name="Elbow Connector 58">
+            <a:extLst>
+              <a:ext uri="{FF2B5EF4-FFF2-40B4-BE49-F238E27FC236}">
+                <a16:creationId xmlns:a16="http://schemas.microsoft.com/office/drawing/2014/main" id="{E7869A49-2D16-43F1-A618-5E73C861718D}"/>
+              </a:ext>
+            </a:extLst>
+          </p:cNvPr>
+          <p:cNvCxnSpPr>
+            <a:cxnSpLocks/>
+            <a:stCxn id="51" idx="3"/>
+            <a:endCxn id="126" idx="1"/>
+          </p:cNvCxnSpPr>
+          <p:nvPr/>
+        </p:nvCxnSpPr>
+        <p:spPr>
+          <a:xfrm flipV="1">
+            <a:off x="4220351" y="918621"/>
+            <a:ext cx="258796" cy="1842060"/>
+          </a:xfrm>
+          <a:prstGeom prst="bentConnector3">
+            <a:avLst>
+              <a:gd name="adj1" fmla="val 50000"/>
+            </a:avLst>
+          </a:prstGeom>
+          <a:ln w="19050">
+            <a:solidFill>
+              <a:srgbClr val="7030A0"/>
+            </a:solidFill>
+            <a:headEnd type="none" w="med" len="med"/>
+            <a:tailEnd type="arrow" w="med" len="med"/>
+          </a:ln>
+          <a:effectLst/>
+        </p:spPr>
+        <p:style>
+          <a:lnRef idx="1">
+            <a:schemeClr val="accent2"/>
+          </a:lnRef>
+          <a:fillRef idx="2">
+            <a:schemeClr val="accent2"/>
+          </a:fillRef>
+          <a:effectRef idx="1">
+            <a:schemeClr val="accent2"/>
+          </a:effectRef>
+          <a:fontRef idx="minor">
+            <a:schemeClr val="dk1"/>
+          </a:fontRef>
+        </p:style>
+      </p:cxnSp>
+      <p:sp>
+        <p:nvSpPr>
+          <p:cNvPr id="128" name="TextBox 127">
+            <a:extLst>
+              <a:ext uri="{FF2B5EF4-FFF2-40B4-BE49-F238E27FC236}">
+                <a16:creationId xmlns:a16="http://schemas.microsoft.com/office/drawing/2014/main" id="{31F39A52-CF1E-46A9-81B8-AB631531411D}"/>
+              </a:ext>
+            </a:extLst>
+          </p:cNvPr>
+          <p:cNvSpPr txBox="1"/>
+          <p:nvPr/>
+        </p:nvSpPr>
+        <p:spPr>
+          <a:xfrm>
+            <a:off x="4306530" y="666453"/>
+            <a:ext cx="189257" cy="178683"/>
+          </a:xfrm>
+          <a:prstGeom prst="rect">
+            <a:avLst/>
+          </a:prstGeom>
+          <a:noFill/>
+        </p:spPr>
+        <p:txBody>
+          <a:bodyPr wrap="square" lIns="0" tIns="0" rIns="0" bIns="0" rtlCol="0">
+            <a:noAutofit/>
+          </a:bodyPr>
+          <a:lstStyle/>
+          <a:p>
+            <a:pPr algn="ctr"/>
+            <a:r>
+              <a:rPr lang="en-US" sz="1100" dirty="0">
+                <a:solidFill>
+                  <a:srgbClr val="7030A0"/>
+                </a:solidFill>
+              </a:rPr>
+              <a:t>1</a:t>
+            </a:r>
+            <a:endParaRPr lang="en-SG" sz="1100" dirty="0">
+              <a:solidFill>
+                <a:srgbClr val="7030A0"/>
+              </a:solidFill>
+            </a:endParaRPr>
+          </a:p>
+        </p:txBody>
+      </p:sp>
+      <p:sp>
+        <p:nvSpPr>
+          <p:cNvPr id="130" name="Flowchart: Decision 96">
+            <a:extLst>
+              <a:ext uri="{FF2B5EF4-FFF2-40B4-BE49-F238E27FC236}">
+                <a16:creationId xmlns:a16="http://schemas.microsoft.com/office/drawing/2014/main" id="{8EC98B0B-4BF4-4934-A19A-E777C4096E03}"/>
+              </a:ext>
+            </a:extLst>
+          </p:cNvPr>
+          <p:cNvSpPr/>
+          <p:nvPr/>
+        </p:nvSpPr>
+        <p:spPr>
+          <a:xfrm>
+            <a:off x="5644212" y="827097"/>
             <a:ext cx="236048" cy="173380"/>
           </a:xfrm>
           <a:prstGeom prst="flowChartDecision">
             <a:avLst/>
           </a:prstGeom>
-          <a:solidFill>
-            <a:srgbClr val="7030A0"/>
-          </a:solidFill>
+          <a:noFill/>
           <a:ln w="19050">
             <a:solidFill>
               <a:srgbClr val="7030A0"/>
@@ -6094,26 +6668,26 @@
       </p:sp>
       <p:cxnSp>
         <p:nvCxnSpPr>
-          <p:cNvPr id="87" name="Elbow Connector 68">
+          <p:cNvPr id="131" name="Elbow Connector 68">
             <a:extLst>
               <a:ext uri="{FF2B5EF4-FFF2-40B4-BE49-F238E27FC236}">
-                <a16:creationId xmlns:a16="http://schemas.microsoft.com/office/drawing/2014/main" id="{EB3E3FF9-5E7F-4C42-8324-9904894D7BBE}"/>
+                <a16:creationId xmlns:a16="http://schemas.microsoft.com/office/drawing/2014/main" id="{8D3BDF71-A831-471B-BEC8-36679847DE2C}"/>
               </a:ext>
             </a:extLst>
           </p:cNvPr>
           <p:cNvCxnSpPr>
             <a:cxnSpLocks/>
-            <a:stCxn id="82" idx="3"/>
-            <a:endCxn id="88" idx="1"/>
+            <a:stCxn id="130" idx="3"/>
+            <a:endCxn id="132" idx="1"/>
           </p:cNvCxnSpPr>
           <p:nvPr/>
         </p:nvCxnSpPr>
         <p:spPr>
-          <a:xfrm rot="16200000" flipH="1">
-            <a:off x="7106130" y="1589984"/>
-            <a:ext cx="207137" cy="820604"/>
-          </a:xfrm>
-          <a:prstGeom prst="bentConnector2">
+          <a:xfrm flipV="1">
+            <a:off x="5880260" y="909993"/>
+            <a:ext cx="625793" cy="3794"/>
+          </a:xfrm>
+          <a:prstGeom prst="straightConnector1">
             <a:avLst/>
           </a:prstGeom>
           <a:ln w="19050">
@@ -6142,10 +6716,10 @@
       </p:cxnSp>
       <p:sp>
         <p:nvSpPr>
-          <p:cNvPr id="88" name="Rectangle 8">
+          <p:cNvPr id="132" name="Rectangle 8">
             <a:extLst>
               <a:ext uri="{FF2B5EF4-FFF2-40B4-BE49-F238E27FC236}">
-                <a16:creationId xmlns:a16="http://schemas.microsoft.com/office/drawing/2014/main" id="{4D9E0984-F58B-4DCE-A38E-9AE58D3AFCA0}"/>
+                <a16:creationId xmlns:a16="http://schemas.microsoft.com/office/drawing/2014/main" id="{5E70EFB8-B848-47BB-AF10-14C5748EBC2A}"/>
               </a:ext>
             </a:extLst>
           </p:cNvPr>
@@ -6154,8 +6728,8 @@
         </p:nvSpPr>
         <p:spPr>
           <a:xfrm>
-            <a:off x="7620000" y="1940965"/>
-            <a:ext cx="827658" cy="325780"/>
+            <a:off x="6506053" y="736613"/>
+            <a:ext cx="588505" cy="346760"/>
           </a:xfrm>
           <a:prstGeom prst="rect">
             <a:avLst/>
@@ -6187,14 +6761,54 @@
           <a:p>
             <a:pPr algn="ctr"/>
             <a:r>
-              <a:rPr lang="en-US" sz="1050" dirty="0">
+              <a:rPr lang="en-SG" sz="1050" dirty="0">
                 <a:solidFill>
                   <a:srgbClr val="7030A0"/>
                 </a:solidFill>
               </a:rPr>
-              <a:t>Information</a:t>
-            </a:r>
-            <a:endParaRPr lang="en-SG" sz="1050" dirty="0">
+              <a:t>Events</a:t>
+            </a:r>
+          </a:p>
+        </p:txBody>
+      </p:sp>
+      <p:sp>
+        <p:nvSpPr>
+          <p:cNvPr id="133" name="TextBox 132">
+            <a:extLst>
+              <a:ext uri="{FF2B5EF4-FFF2-40B4-BE49-F238E27FC236}">
+                <a16:creationId xmlns:a16="http://schemas.microsoft.com/office/drawing/2014/main" id="{8B70DF53-AA6A-4178-BED2-FA9C9C5734EB}"/>
+              </a:ext>
+            </a:extLst>
+          </p:cNvPr>
+          <p:cNvSpPr txBox="1"/>
+          <p:nvPr/>
+        </p:nvSpPr>
+        <p:spPr>
+          <a:xfrm>
+            <a:off x="6313664" y="737755"/>
+            <a:ext cx="189257" cy="178683"/>
+          </a:xfrm>
+          <a:prstGeom prst="rect">
+            <a:avLst/>
+          </a:prstGeom>
+          <a:noFill/>
+        </p:spPr>
+        <p:txBody>
+          <a:bodyPr wrap="square" lIns="0" tIns="0" rIns="0" bIns="0" rtlCol="0">
+            <a:noAutofit/>
+          </a:bodyPr>
+          <a:lstStyle/>
+          <a:p>
+            <a:pPr algn="ctr"/>
+            <a:r>
+              <a:rPr lang="en-US" sz="1100" dirty="0">
+                <a:solidFill>
+                  <a:srgbClr val="7030A0"/>
+                </a:solidFill>
+              </a:rPr>
+              <a:t>*</a:t>
+            </a:r>
+            <a:endParaRPr lang="en-SG" sz="1100" dirty="0">
               <a:solidFill>
                 <a:srgbClr val="7030A0"/>
               </a:solidFill>
@@ -6204,34 +6818,32 @@
       </p:sp>
       <p:cxnSp>
         <p:nvCxnSpPr>
-          <p:cNvPr id="74" name="Elbow Connector 85">
+          <p:cNvPr id="96" name="Elbow Connector 106">
             <a:extLst>
               <a:ext uri="{FF2B5EF4-FFF2-40B4-BE49-F238E27FC236}">
-                <a16:creationId xmlns:a16="http://schemas.microsoft.com/office/drawing/2014/main" id="{364E3DC3-34CB-4956-9A45-875504CEBCCA}"/>
+                <a16:creationId xmlns:a16="http://schemas.microsoft.com/office/drawing/2014/main" id="{D831F718-081B-4FF3-A10F-2AAC5DE1084B}"/>
               </a:ext>
             </a:extLst>
           </p:cNvPr>
           <p:cNvCxnSpPr>
             <a:cxnSpLocks/>
-            <a:stCxn id="78" idx="3"/>
-            <a:endCxn id="89" idx="1"/>
+            <a:endCxn id="98" idx="1"/>
           </p:cNvCxnSpPr>
           <p:nvPr/>
         </p:nvCxnSpPr>
         <p:spPr>
-          <a:xfrm>
-            <a:off x="7277482" y="3444656"/>
-            <a:ext cx="434915" cy="566299"/>
-          </a:xfrm>
-          <a:prstGeom prst="bentConnector3">
-            <a:avLst>
-              <a:gd name="adj1" fmla="val 50000"/>
-            </a:avLst>
+          <a:xfrm rot="16200000" flipH="1">
+            <a:off x="3454457" y="3637302"/>
+            <a:ext cx="1926259" cy="137495"/>
+          </a:xfrm>
+          <a:prstGeom prst="bentConnector2">
+            <a:avLst/>
           </a:prstGeom>
           <a:ln w="19050">
             <a:solidFill>
               <a:srgbClr val="7030A0"/>
             </a:solidFill>
+            <a:prstDash val="solid"/>
             <a:headEnd type="none" w="med" len="med"/>
             <a:tailEnd type="arrow" w="med" len="med"/>
           </a:ln>
@@ -6254,10 +6866,10 @@
       </p:cxnSp>
       <p:sp>
         <p:nvSpPr>
-          <p:cNvPr id="89" name="Rectangle 8">
+          <p:cNvPr id="98" name="Rectangle 8">
             <a:extLst>
               <a:ext uri="{FF2B5EF4-FFF2-40B4-BE49-F238E27FC236}">
-                <a16:creationId xmlns:a16="http://schemas.microsoft.com/office/drawing/2014/main" id="{E99164BD-821B-4E71-883D-A883FD3AEDF6}"/>
+                <a16:creationId xmlns:a16="http://schemas.microsoft.com/office/drawing/2014/main" id="{57BF02B6-23A0-460D-9F48-C522CE5E4A90}"/>
               </a:ext>
             </a:extLst>
           </p:cNvPr>
@@ -6266,8 +6878,8 @@
         </p:nvSpPr>
         <p:spPr>
           <a:xfrm>
-            <a:off x="7712397" y="3864291"/>
-            <a:ext cx="708186" cy="293328"/>
+            <a:off x="4486334" y="4495800"/>
+            <a:ext cx="1156969" cy="346760"/>
           </a:xfrm>
           <a:prstGeom prst="rect">
             <a:avLst/>
@@ -6299,23 +6911,12 @@
           <a:p>
             <a:pPr algn="ctr"/>
             <a:r>
-              <a:rPr lang="en-US" sz="1050" dirty="0">
-                <a:solidFill>
-                  <a:srgbClr val="7030A0"/>
-                </a:solidFill>
-              </a:rPr>
-              <a:t>Time</a:t>
-            </a:r>
-          </a:p>
-          <a:p>
-            <a:pPr algn="ctr"/>
-            <a:r>
               <a:rPr lang="en-US" sz="1050" dirty="0" err="1">
                 <a:solidFill>
                   <a:srgbClr val="7030A0"/>
                 </a:solidFill>
               </a:rPr>
-              <a:t>TableLink</a:t>
+              <a:t>UniqueToDoList</a:t>
             </a:r>
             <a:endParaRPr lang="en-SG" sz="1050" dirty="0">
               <a:solidFill>
@@ -6325,197 +6926,12 @@
           </a:p>
         </p:txBody>
       </p:sp>
-      <p:cxnSp>
-        <p:nvCxnSpPr>
-          <p:cNvPr id="90" name="Elbow Connector 85">
+      <p:sp>
+        <p:nvSpPr>
+          <p:cNvPr id="101" name="Rectangle 8">
             <a:extLst>
               <a:ext uri="{FF2B5EF4-FFF2-40B4-BE49-F238E27FC236}">
-                <a16:creationId xmlns:a16="http://schemas.microsoft.com/office/drawing/2014/main" id="{3DFEE2C0-5320-45A9-A045-4FDA4929D157}"/>
-              </a:ext>
-            </a:extLst>
-          </p:cNvPr>
-          <p:cNvCxnSpPr>
-            <a:cxnSpLocks/>
-            <a:stCxn id="82" idx="3"/>
-            <a:endCxn id="49" idx="0"/>
-          </p:cNvCxnSpPr>
-          <p:nvPr/>
-        </p:nvCxnSpPr>
-        <p:spPr>
-          <a:xfrm rot="5400000">
-            <a:off x="5315011" y="1655981"/>
-            <a:ext cx="1243648" cy="1725123"/>
-          </a:xfrm>
-          <a:prstGeom prst="bentConnector3">
-            <a:avLst>
-              <a:gd name="adj1" fmla="val 77154"/>
-            </a:avLst>
-          </a:prstGeom>
-          <a:ln w="19050">
-            <a:solidFill>
-              <a:srgbClr val="7030A0"/>
-            </a:solidFill>
-            <a:headEnd type="none" w="med" len="med"/>
-            <a:tailEnd type="arrow" w="med" len="med"/>
-          </a:ln>
-          <a:effectLst/>
-        </p:spPr>
-        <p:style>
-          <a:lnRef idx="1">
-            <a:schemeClr val="accent2"/>
-          </a:lnRef>
-          <a:fillRef idx="2">
-            <a:schemeClr val="accent2"/>
-          </a:fillRef>
-          <a:effectRef idx="1">
-            <a:schemeClr val="accent2"/>
-          </a:effectRef>
-          <a:fontRef idx="minor">
-            <a:schemeClr val="dk1"/>
-          </a:fontRef>
-        </p:style>
-      </p:cxnSp>
-      <p:sp>
-        <p:nvSpPr>
-          <p:cNvPr id="91" name="TextBox 90">
-            <a:extLst>
-              <a:ext uri="{FF2B5EF4-FFF2-40B4-BE49-F238E27FC236}">
-                <a16:creationId xmlns:a16="http://schemas.microsoft.com/office/drawing/2014/main" id="{0F4392FB-FDF8-4019-9974-163C0925353D}"/>
-              </a:ext>
-            </a:extLst>
-          </p:cNvPr>
-          <p:cNvSpPr txBox="1"/>
-          <p:nvPr/>
-        </p:nvSpPr>
-        <p:spPr>
-          <a:xfrm>
-            <a:off x="6312755" y="1312937"/>
-            <a:ext cx="189257" cy="178683"/>
-          </a:xfrm>
-          <a:prstGeom prst="rect">
-            <a:avLst/>
-          </a:prstGeom>
-          <a:noFill/>
-        </p:spPr>
-        <p:txBody>
-          <a:bodyPr wrap="square" lIns="0" tIns="0" rIns="0" bIns="0" rtlCol="0">
-            <a:noAutofit/>
-          </a:bodyPr>
-          <a:lstStyle/>
-          <a:p>
-            <a:pPr algn="ctr"/>
-            <a:r>
-              <a:rPr lang="en-US" sz="1100" dirty="0">
-                <a:solidFill>
-                  <a:srgbClr val="7030A0"/>
-                </a:solidFill>
-              </a:rPr>
-              <a:t>*</a:t>
-            </a:r>
-            <a:endParaRPr lang="en-SG" sz="1100" dirty="0">
-              <a:solidFill>
-                <a:srgbClr val="7030A0"/>
-              </a:solidFill>
-            </a:endParaRPr>
-          </a:p>
-        </p:txBody>
-      </p:sp>
-      <p:sp>
-        <p:nvSpPr>
-          <p:cNvPr id="92" name="TextBox 91">
-            <a:extLst>
-              <a:ext uri="{FF2B5EF4-FFF2-40B4-BE49-F238E27FC236}">
-                <a16:creationId xmlns:a16="http://schemas.microsoft.com/office/drawing/2014/main" id="{9493738F-15DB-4A2D-B393-A41873FE67C4}"/>
-              </a:ext>
-            </a:extLst>
-          </p:cNvPr>
-          <p:cNvSpPr txBox="1"/>
-          <p:nvPr/>
-        </p:nvSpPr>
-        <p:spPr>
-          <a:xfrm>
-            <a:off x="5126380" y="2948331"/>
-            <a:ext cx="189257" cy="178683"/>
-          </a:xfrm>
-          <a:prstGeom prst="rect">
-            <a:avLst/>
-          </a:prstGeom>
-          <a:noFill/>
-        </p:spPr>
-        <p:txBody>
-          <a:bodyPr wrap="square" lIns="0" tIns="0" rIns="0" bIns="0" rtlCol="0">
-            <a:noAutofit/>
-          </a:bodyPr>
-          <a:lstStyle/>
-          <a:p>
-            <a:pPr algn="ctr"/>
-            <a:r>
-              <a:rPr lang="en-US" sz="1100" dirty="0">
-                <a:solidFill>
-                  <a:srgbClr val="7030A0"/>
-                </a:solidFill>
-              </a:rPr>
-              <a:t>1</a:t>
-            </a:r>
-            <a:endParaRPr lang="en-SG" sz="1100" dirty="0">
-              <a:solidFill>
-                <a:srgbClr val="7030A0"/>
-              </a:solidFill>
-            </a:endParaRPr>
-          </a:p>
-        </p:txBody>
-      </p:sp>
-      <p:sp>
-        <p:nvSpPr>
-          <p:cNvPr id="93" name="TextBox 92">
-            <a:extLst>
-              <a:ext uri="{FF2B5EF4-FFF2-40B4-BE49-F238E27FC236}">
-                <a16:creationId xmlns:a16="http://schemas.microsoft.com/office/drawing/2014/main" id="{EF707226-80AC-4DA6-B45F-314D20281B96}"/>
-              </a:ext>
-            </a:extLst>
-          </p:cNvPr>
-          <p:cNvSpPr txBox="1"/>
-          <p:nvPr/>
-        </p:nvSpPr>
-        <p:spPr>
-          <a:xfrm>
-            <a:off x="7297210" y="1880687"/>
-            <a:ext cx="189257" cy="178683"/>
-          </a:xfrm>
-          <a:prstGeom prst="rect">
-            <a:avLst/>
-          </a:prstGeom>
-          <a:noFill/>
-        </p:spPr>
-        <p:txBody>
-          <a:bodyPr wrap="square" lIns="0" tIns="0" rIns="0" bIns="0" rtlCol="0">
-            <a:noAutofit/>
-          </a:bodyPr>
-          <a:lstStyle/>
-          <a:p>
-            <a:pPr algn="ctr"/>
-            <a:r>
-              <a:rPr lang="en-US" sz="1100" dirty="0">
-                <a:solidFill>
-                  <a:srgbClr val="7030A0"/>
-                </a:solidFill>
-              </a:rPr>
-              <a:t>1</a:t>
-            </a:r>
-            <a:endParaRPr lang="en-SG" sz="1100" dirty="0">
-              <a:solidFill>
-                <a:srgbClr val="7030A0"/>
-              </a:solidFill>
-            </a:endParaRPr>
-          </a:p>
-        </p:txBody>
-      </p:sp>
-      <p:sp>
-        <p:nvSpPr>
-          <p:cNvPr id="126" name="Rectangle 8">
-            <a:extLst>
-              <a:ext uri="{FF2B5EF4-FFF2-40B4-BE49-F238E27FC236}">
-                <a16:creationId xmlns:a16="http://schemas.microsoft.com/office/drawing/2014/main" id="{DE0DCC95-DB6A-46BF-A787-D74C76C23B3D}"/>
+                <a16:creationId xmlns:a16="http://schemas.microsoft.com/office/drawing/2014/main" id="{D21B9CA8-9851-4D19-A015-4B15A4F19C0F}"/>
               </a:ext>
             </a:extLst>
           </p:cNvPr>
@@ -6524,8 +6940,8 @@
         </p:nvSpPr>
         <p:spPr>
           <a:xfrm>
-            <a:off x="4479147" y="745241"/>
-            <a:ext cx="1156969" cy="346760"/>
+            <a:off x="6312755" y="4495800"/>
+            <a:ext cx="708186" cy="346760"/>
           </a:xfrm>
           <a:prstGeom prst="rect">
             <a:avLst/>
@@ -6562,7 +6978,7 @@
                   <a:srgbClr val="7030A0"/>
                 </a:solidFill>
               </a:rPr>
-              <a:t>UniqueEventList</a:t>
+              <a:t>ToDo</a:t>
             </a:r>
             <a:endParaRPr lang="en-SG" sz="1050" dirty="0">
               <a:solidFill>
@@ -6572,107 +6988,12 @@
           </a:p>
         </p:txBody>
       </p:sp>
-      <p:cxnSp>
-        <p:nvCxnSpPr>
-          <p:cNvPr id="127" name="Elbow Connector 58">
+      <p:sp>
+        <p:nvSpPr>
+          <p:cNvPr id="102" name="Flowchart: Decision 96">
             <a:extLst>
               <a:ext uri="{FF2B5EF4-FFF2-40B4-BE49-F238E27FC236}">
-                <a16:creationId xmlns:a16="http://schemas.microsoft.com/office/drawing/2014/main" id="{E7869A49-2D16-43F1-A618-5E73C861718D}"/>
-              </a:ext>
-            </a:extLst>
-          </p:cNvPr>
-          <p:cNvCxnSpPr>
-            <a:cxnSpLocks/>
-            <a:stCxn id="51" idx="3"/>
-            <a:endCxn id="126" idx="1"/>
-          </p:cNvCxnSpPr>
-          <p:nvPr/>
-        </p:nvCxnSpPr>
-        <p:spPr>
-          <a:xfrm flipV="1">
-            <a:off x="4220351" y="918621"/>
-            <a:ext cx="258796" cy="1842060"/>
-          </a:xfrm>
-          <a:prstGeom prst="bentConnector3">
-            <a:avLst>
-              <a:gd name="adj1" fmla="val 50000"/>
-            </a:avLst>
-          </a:prstGeom>
-          <a:ln w="19050">
-            <a:solidFill>
-              <a:srgbClr val="7030A0"/>
-            </a:solidFill>
-            <a:headEnd type="none" w="med" len="med"/>
-            <a:tailEnd type="arrow" w="med" len="med"/>
-          </a:ln>
-          <a:effectLst/>
-        </p:spPr>
-        <p:style>
-          <a:lnRef idx="1">
-            <a:schemeClr val="accent2"/>
-          </a:lnRef>
-          <a:fillRef idx="2">
-            <a:schemeClr val="accent2"/>
-          </a:fillRef>
-          <a:effectRef idx="1">
-            <a:schemeClr val="accent2"/>
-          </a:effectRef>
-          <a:fontRef idx="minor">
-            <a:schemeClr val="dk1"/>
-          </a:fontRef>
-        </p:style>
-      </p:cxnSp>
-      <p:sp>
-        <p:nvSpPr>
-          <p:cNvPr id="128" name="TextBox 127">
-            <a:extLst>
-              <a:ext uri="{FF2B5EF4-FFF2-40B4-BE49-F238E27FC236}">
-                <a16:creationId xmlns:a16="http://schemas.microsoft.com/office/drawing/2014/main" id="{31F39A52-CF1E-46A9-81B8-AB631531411D}"/>
-              </a:ext>
-            </a:extLst>
-          </p:cNvPr>
-          <p:cNvSpPr txBox="1"/>
-          <p:nvPr/>
-        </p:nvSpPr>
-        <p:spPr>
-          <a:xfrm>
-            <a:off x="4306530" y="666453"/>
-            <a:ext cx="189257" cy="178683"/>
-          </a:xfrm>
-          <a:prstGeom prst="rect">
-            <a:avLst/>
-          </a:prstGeom>
-          <a:noFill/>
-        </p:spPr>
-        <p:txBody>
-          <a:bodyPr wrap="square" lIns="0" tIns="0" rIns="0" bIns="0" rtlCol="0">
-            <a:noAutofit/>
-          </a:bodyPr>
-          <a:lstStyle/>
-          <a:p>
-            <a:pPr algn="ctr"/>
-            <a:r>
-              <a:rPr lang="en-US" sz="1100" dirty="0">
-                <a:solidFill>
-                  <a:srgbClr val="7030A0"/>
-                </a:solidFill>
-              </a:rPr>
-              <a:t>1</a:t>
-            </a:r>
-            <a:endParaRPr lang="en-SG" sz="1100" dirty="0">
-              <a:solidFill>
-                <a:srgbClr val="7030A0"/>
-              </a:solidFill>
-            </a:endParaRPr>
-          </a:p>
-        </p:txBody>
-      </p:sp>
-      <p:sp>
-        <p:nvSpPr>
-          <p:cNvPr id="130" name="Flowchart: Decision 96">
-            <a:extLst>
-              <a:ext uri="{FF2B5EF4-FFF2-40B4-BE49-F238E27FC236}">
-                <a16:creationId xmlns:a16="http://schemas.microsoft.com/office/drawing/2014/main" id="{8EC98B0B-4BF4-4934-A19A-E777C4096E03}"/>
+                <a16:creationId xmlns:a16="http://schemas.microsoft.com/office/drawing/2014/main" id="{F06D0554-4C23-4C37-935A-E73C7478FB17}"/>
               </a:ext>
             </a:extLst>
           </p:cNvPr>
@@ -6681,7 +7002,7 @@
         </p:nvSpPr>
         <p:spPr>
           <a:xfrm>
-            <a:off x="5644212" y="827097"/>
+            <a:off x="5662774" y="4576121"/>
             <a:ext cx="236048" cy="173380"/>
           </a:xfrm>
           <a:prstGeom prst="flowChartDecision">
@@ -6720,24 +7041,23 @@
       </p:sp>
       <p:cxnSp>
         <p:nvCxnSpPr>
-          <p:cNvPr id="131" name="Elbow Connector 68">
+          <p:cNvPr id="104" name="Elbow Connector 68">
             <a:extLst>
               <a:ext uri="{FF2B5EF4-FFF2-40B4-BE49-F238E27FC236}">
-                <a16:creationId xmlns:a16="http://schemas.microsoft.com/office/drawing/2014/main" id="{8D3BDF71-A831-471B-BEC8-36679847DE2C}"/>
+                <a16:creationId xmlns:a16="http://schemas.microsoft.com/office/drawing/2014/main" id="{8C078F55-5316-4E6E-9132-3731970EC52C}"/>
               </a:ext>
             </a:extLst>
           </p:cNvPr>
           <p:cNvCxnSpPr>
             <a:cxnSpLocks/>
-            <a:stCxn id="130" idx="3"/>
-            <a:endCxn id="132" idx="1"/>
+            <a:endCxn id="101" idx="1"/>
           </p:cNvCxnSpPr>
           <p:nvPr/>
         </p:nvCxnSpPr>
         <p:spPr>
-          <a:xfrm flipV="1">
-            <a:off x="5880260" y="909993"/>
-            <a:ext cx="625793" cy="3794"/>
+          <a:xfrm>
+            <a:off x="5887368" y="4664708"/>
+            <a:ext cx="425387" cy="4472"/>
           </a:xfrm>
           <a:prstGeom prst="straightConnector1">
             <a:avLst/>
@@ -6768,10 +7088,10 @@
       </p:cxnSp>
       <p:sp>
         <p:nvSpPr>
-          <p:cNvPr id="132" name="Rectangle 8">
+          <p:cNvPr id="105" name="Flowchart: Decision 96">
             <a:extLst>
               <a:ext uri="{FF2B5EF4-FFF2-40B4-BE49-F238E27FC236}">
-                <a16:creationId xmlns:a16="http://schemas.microsoft.com/office/drawing/2014/main" id="{5E70EFB8-B848-47BB-AF10-14C5748EBC2A}"/>
+                <a16:creationId xmlns:a16="http://schemas.microsoft.com/office/drawing/2014/main" id="{C5F9B72E-0094-485C-84EC-66B06A2535DE}"/>
               </a:ext>
             </a:extLst>
           </p:cNvPr>
@@ -6780,8 +7100,61 @@
         </p:nvSpPr>
         <p:spPr>
           <a:xfrm>
-            <a:off x="6506053" y="736613"/>
-            <a:ext cx="588505" cy="346760"/>
+            <a:off x="7030850" y="4586251"/>
+            <a:ext cx="236048" cy="173380"/>
+          </a:xfrm>
+          <a:prstGeom prst="flowChartDecision">
+            <a:avLst/>
+          </a:prstGeom>
+          <a:solidFill>
+            <a:srgbClr val="7030A0"/>
+          </a:solidFill>
+          <a:ln w="19050">
+            <a:solidFill>
+              <a:srgbClr val="7030A0"/>
+            </a:solidFill>
+          </a:ln>
+          <a:effectLst/>
+        </p:spPr>
+        <p:style>
+          <a:lnRef idx="1">
+            <a:schemeClr val="accent6"/>
+          </a:lnRef>
+          <a:fillRef idx="2">
+            <a:schemeClr val="accent6"/>
+          </a:fillRef>
+          <a:effectRef idx="1">
+            <a:schemeClr val="accent6"/>
+          </a:effectRef>
+          <a:fontRef idx="minor">
+            <a:schemeClr val="dk1"/>
+          </a:fontRef>
+        </p:style>
+        <p:txBody>
+          <a:bodyPr rtlCol="0" anchor="ctr"/>
+          <a:lstStyle/>
+          <a:p>
+            <a:pPr algn="ctr"/>
+            <a:endParaRPr lang="en-US" sz="1050"/>
+          </a:p>
+        </p:txBody>
+      </p:sp>
+      <p:sp>
+        <p:nvSpPr>
+          <p:cNvPr id="106" name="Rectangle 8">
+            <a:extLst>
+              <a:ext uri="{FF2B5EF4-FFF2-40B4-BE49-F238E27FC236}">
+                <a16:creationId xmlns:a16="http://schemas.microsoft.com/office/drawing/2014/main" id="{CAD00984-D4E3-44F5-9AF3-F21B2B47D302}"/>
+              </a:ext>
+            </a:extLst>
+          </p:cNvPr>
+          <p:cNvSpPr/>
+          <p:nvPr/>
+        </p:nvSpPr>
+        <p:spPr>
+          <a:xfrm>
+            <a:off x="7712397" y="4393305"/>
+            <a:ext cx="708186" cy="285783"/>
           </a:xfrm>
           <a:prstGeom prst="rect">
             <a:avLst/>
@@ -6813,22 +7186,185 @@
           <a:p>
             <a:pPr algn="ctr"/>
             <a:r>
-              <a:rPr lang="en-SG" sz="1050" dirty="0">
+              <a:rPr lang="en-US" sz="1050" dirty="0">
                 <a:solidFill>
                   <a:srgbClr val="7030A0"/>
                 </a:solidFill>
               </a:rPr>
-              <a:t>Events</a:t>
-            </a:r>
-          </a:p>
-        </p:txBody>
-      </p:sp>
-      <p:sp>
-        <p:nvSpPr>
-          <p:cNvPr id="133" name="TextBox 132">
+              <a:t>Content</a:t>
+            </a:r>
+            <a:endParaRPr lang="en-SG" sz="1050" dirty="0">
+              <a:solidFill>
+                <a:srgbClr val="7030A0"/>
+              </a:solidFill>
+            </a:endParaRPr>
+          </a:p>
+        </p:txBody>
+      </p:sp>
+      <p:sp>
+        <p:nvSpPr>
+          <p:cNvPr id="108" name="Rectangle 8">
             <a:extLst>
               <a:ext uri="{FF2B5EF4-FFF2-40B4-BE49-F238E27FC236}">
-                <a16:creationId xmlns:a16="http://schemas.microsoft.com/office/drawing/2014/main" id="{8B70DF53-AA6A-4178-BED2-FA9C9C5734EB}"/>
+                <a16:creationId xmlns:a16="http://schemas.microsoft.com/office/drawing/2014/main" id="{6B321128-4873-4BE9-BF5A-48460ACE8145}"/>
+              </a:ext>
+            </a:extLst>
+          </p:cNvPr>
+          <p:cNvSpPr/>
+          <p:nvPr/>
+        </p:nvSpPr>
+        <p:spPr>
+          <a:xfrm>
+            <a:off x="7705925" y="4724400"/>
+            <a:ext cx="708186" cy="285783"/>
+          </a:xfrm>
+          <a:prstGeom prst="rect">
+            <a:avLst/>
+          </a:prstGeom>
+          <a:ln w="19050">
+            <a:solidFill>
+              <a:srgbClr val="7030A0"/>
+            </a:solidFill>
+          </a:ln>
+          <a:effectLst/>
+        </p:spPr>
+        <p:style>
+          <a:lnRef idx="1">
+            <a:schemeClr val="accent4"/>
+          </a:lnRef>
+          <a:fillRef idx="2">
+            <a:schemeClr val="accent4"/>
+          </a:fillRef>
+          <a:effectRef idx="1">
+            <a:schemeClr val="accent4"/>
+          </a:effectRef>
+          <a:fontRef idx="minor">
+            <a:schemeClr val="dk1"/>
+          </a:fontRef>
+        </p:style>
+        <p:txBody>
+          <a:bodyPr rtlCol="0" anchor="ctr"/>
+          <a:lstStyle/>
+          <a:p>
+            <a:pPr algn="ctr"/>
+            <a:r>
+              <a:rPr lang="en-US" sz="1050" dirty="0">
+                <a:solidFill>
+                  <a:srgbClr val="7030A0"/>
+                </a:solidFill>
+              </a:rPr>
+              <a:t>Status</a:t>
+            </a:r>
+            <a:endParaRPr lang="en-SG" sz="1050" dirty="0">
+              <a:solidFill>
+                <a:srgbClr val="7030A0"/>
+              </a:solidFill>
+            </a:endParaRPr>
+          </a:p>
+        </p:txBody>
+      </p:sp>
+      <p:cxnSp>
+        <p:nvCxnSpPr>
+          <p:cNvPr id="109" name="Elbow Connector 85">
+            <a:extLst>
+              <a:ext uri="{FF2B5EF4-FFF2-40B4-BE49-F238E27FC236}">
+                <a16:creationId xmlns:a16="http://schemas.microsoft.com/office/drawing/2014/main" id="{A9FF7F8E-3AE0-4446-83C5-616CEA3CEE33}"/>
+              </a:ext>
+            </a:extLst>
+          </p:cNvPr>
+          <p:cNvCxnSpPr>
+            <a:cxnSpLocks/>
+            <a:stCxn id="105" idx="3"/>
+            <a:endCxn id="108" idx="1"/>
+          </p:cNvCxnSpPr>
+          <p:nvPr/>
+        </p:nvCxnSpPr>
+        <p:spPr>
+          <a:xfrm>
+            <a:off x="7266898" y="4672941"/>
+            <a:ext cx="439027" cy="194351"/>
+          </a:xfrm>
+          <a:prstGeom prst="bentConnector3">
+            <a:avLst>
+              <a:gd name="adj1" fmla="val 50000"/>
+            </a:avLst>
+          </a:prstGeom>
+          <a:ln w="19050">
+            <a:solidFill>
+              <a:srgbClr val="7030A0"/>
+            </a:solidFill>
+            <a:headEnd type="none" w="med" len="med"/>
+            <a:tailEnd type="arrow" w="med" len="med"/>
+          </a:ln>
+          <a:effectLst/>
+        </p:spPr>
+        <p:style>
+          <a:lnRef idx="1">
+            <a:schemeClr val="accent2"/>
+          </a:lnRef>
+          <a:fillRef idx="2">
+            <a:schemeClr val="accent2"/>
+          </a:fillRef>
+          <a:effectRef idx="1">
+            <a:schemeClr val="accent2"/>
+          </a:effectRef>
+          <a:fontRef idx="minor">
+            <a:schemeClr val="dk1"/>
+          </a:fontRef>
+        </p:style>
+      </p:cxnSp>
+      <p:cxnSp>
+        <p:nvCxnSpPr>
+          <p:cNvPr id="111" name="Elbow Connector 78">
+            <a:extLst>
+              <a:ext uri="{FF2B5EF4-FFF2-40B4-BE49-F238E27FC236}">
+                <a16:creationId xmlns:a16="http://schemas.microsoft.com/office/drawing/2014/main" id="{883CFB6F-6A05-42DB-811B-48ADF56D1F04}"/>
+              </a:ext>
+            </a:extLst>
+          </p:cNvPr>
+          <p:cNvCxnSpPr>
+            <a:cxnSpLocks/>
+          </p:cNvCxnSpPr>
+          <p:nvPr/>
+        </p:nvCxnSpPr>
+        <p:spPr>
+          <a:xfrm flipV="1">
+            <a:off x="7264152" y="4536197"/>
+            <a:ext cx="448245" cy="132982"/>
+          </a:xfrm>
+          <a:prstGeom prst="bentConnector3">
+            <a:avLst/>
+          </a:prstGeom>
+          <a:ln w="19050">
+            <a:solidFill>
+              <a:srgbClr val="7030A0"/>
+            </a:solidFill>
+            <a:headEnd type="none" w="med" len="med"/>
+            <a:tailEnd type="arrow" w="med" len="med"/>
+          </a:ln>
+          <a:effectLst/>
+        </p:spPr>
+        <p:style>
+          <a:lnRef idx="1">
+            <a:schemeClr val="accent2"/>
+          </a:lnRef>
+          <a:fillRef idx="2">
+            <a:schemeClr val="accent2"/>
+          </a:fillRef>
+          <a:effectRef idx="1">
+            <a:schemeClr val="accent2"/>
+          </a:effectRef>
+          <a:fontRef idx="minor">
+            <a:schemeClr val="dk1"/>
+          </a:fontRef>
+        </p:style>
+      </p:cxnSp>
+      <p:sp>
+        <p:nvSpPr>
+          <p:cNvPr id="112" name="TextBox 111">
+            <a:extLst>
+              <a:ext uri="{FF2B5EF4-FFF2-40B4-BE49-F238E27FC236}">
+                <a16:creationId xmlns:a16="http://schemas.microsoft.com/office/drawing/2014/main" id="{8B1575BF-74F7-407C-A601-6E6394907515}"/>
               </a:ext>
             </a:extLst>
           </p:cNvPr>
@@ -6837,7 +7373,7 @@
         </p:nvSpPr>
         <p:spPr>
           <a:xfrm>
-            <a:off x="6313664" y="737755"/>
+            <a:off x="6096521" y="4484128"/>
             <a:ext cx="189257" cy="178683"/>
           </a:xfrm>
           <a:prstGeom prst="rect">
@@ -6859,6 +7395,192 @@
                 </a:solidFill>
               </a:rPr>
               <a:t>*</a:t>
+            </a:r>
+            <a:endParaRPr lang="en-SG" sz="1100" dirty="0">
+              <a:solidFill>
+                <a:srgbClr val="7030A0"/>
+              </a:solidFill>
+            </a:endParaRPr>
+          </a:p>
+        </p:txBody>
+      </p:sp>
+      <p:sp>
+        <p:nvSpPr>
+          <p:cNvPr id="129" name="TextBox 128">
+            <a:extLst>
+              <a:ext uri="{FF2B5EF4-FFF2-40B4-BE49-F238E27FC236}">
+                <a16:creationId xmlns:a16="http://schemas.microsoft.com/office/drawing/2014/main" id="{62BE2E0C-E431-4707-86A1-DEEDD8585157}"/>
+              </a:ext>
+            </a:extLst>
+          </p:cNvPr>
+          <p:cNvSpPr txBox="1"/>
+          <p:nvPr/>
+        </p:nvSpPr>
+        <p:spPr>
+          <a:xfrm>
+            <a:off x="4327789" y="4424830"/>
+            <a:ext cx="189257" cy="178683"/>
+          </a:xfrm>
+          <a:prstGeom prst="rect">
+            <a:avLst/>
+          </a:prstGeom>
+          <a:noFill/>
+        </p:spPr>
+        <p:txBody>
+          <a:bodyPr wrap="square" lIns="0" tIns="0" rIns="0" bIns="0" rtlCol="0">
+            <a:noAutofit/>
+          </a:bodyPr>
+          <a:lstStyle/>
+          <a:p>
+            <a:pPr algn="ctr"/>
+            <a:r>
+              <a:rPr lang="en-US" sz="1100" dirty="0">
+                <a:solidFill>
+                  <a:srgbClr val="7030A0"/>
+                </a:solidFill>
+              </a:rPr>
+              <a:t>1</a:t>
+            </a:r>
+            <a:endParaRPr lang="en-SG" sz="1100" dirty="0">
+              <a:solidFill>
+                <a:srgbClr val="7030A0"/>
+              </a:solidFill>
+            </a:endParaRPr>
+          </a:p>
+        </p:txBody>
+      </p:sp>
+      <p:cxnSp>
+        <p:nvCxnSpPr>
+          <p:cNvPr id="137" name="Elbow Connector 106">
+            <a:extLst>
+              <a:ext uri="{FF2B5EF4-FFF2-40B4-BE49-F238E27FC236}">
+                <a16:creationId xmlns:a16="http://schemas.microsoft.com/office/drawing/2014/main" id="{F4A0DEA8-B272-4134-B635-C2B950E059A2}"/>
+              </a:ext>
+            </a:extLst>
+          </p:cNvPr>
+          <p:cNvCxnSpPr>
+            <a:cxnSpLocks/>
+            <a:endCxn id="101" idx="2"/>
+          </p:cNvCxnSpPr>
+          <p:nvPr/>
+        </p:nvCxnSpPr>
+        <p:spPr>
+          <a:xfrm>
+            <a:off x="3615586" y="4027188"/>
+            <a:ext cx="3051262" cy="815372"/>
+          </a:xfrm>
+          <a:prstGeom prst="bentConnector4">
+            <a:avLst>
+              <a:gd name="adj1" fmla="val -219"/>
+              <a:gd name="adj2" fmla="val 128036"/>
+            </a:avLst>
+          </a:prstGeom>
+          <a:ln w="19050">
+            <a:solidFill>
+              <a:srgbClr val="7030A0"/>
+            </a:solidFill>
+            <a:prstDash val="solid"/>
+            <a:headEnd type="none" w="med" len="med"/>
+            <a:tailEnd type="arrow" w="med" len="med"/>
+          </a:ln>
+          <a:effectLst/>
+        </p:spPr>
+        <p:style>
+          <a:lnRef idx="1">
+            <a:schemeClr val="accent2"/>
+          </a:lnRef>
+          <a:fillRef idx="2">
+            <a:schemeClr val="accent2"/>
+          </a:fillRef>
+          <a:effectRef idx="1">
+            <a:schemeClr val="accent2"/>
+          </a:effectRef>
+          <a:fontRef idx="minor">
+            <a:schemeClr val="dk1"/>
+          </a:fontRef>
+        </p:style>
+      </p:cxnSp>
+      <p:sp>
+        <p:nvSpPr>
+          <p:cNvPr id="145" name="TextBox 144">
+            <a:extLst>
+              <a:ext uri="{FF2B5EF4-FFF2-40B4-BE49-F238E27FC236}">
+                <a16:creationId xmlns:a16="http://schemas.microsoft.com/office/drawing/2014/main" id="{AF715AE1-5E61-4951-80B7-C9BA0807BF6B}"/>
+              </a:ext>
+            </a:extLst>
+          </p:cNvPr>
+          <p:cNvSpPr txBox="1"/>
+          <p:nvPr/>
+        </p:nvSpPr>
+        <p:spPr>
+          <a:xfrm>
+            <a:off x="6691161" y="4852246"/>
+            <a:ext cx="189257" cy="178683"/>
+          </a:xfrm>
+          <a:prstGeom prst="rect">
+            <a:avLst/>
+          </a:prstGeom>
+          <a:noFill/>
+        </p:spPr>
+        <p:txBody>
+          <a:bodyPr wrap="square" lIns="0" tIns="0" rIns="0" bIns="0" rtlCol="0">
+            <a:noAutofit/>
+          </a:bodyPr>
+          <a:lstStyle/>
+          <a:p>
+            <a:pPr algn="ctr"/>
+            <a:r>
+              <a:rPr lang="en-US" sz="1100" dirty="0">
+                <a:solidFill>
+                  <a:srgbClr val="7030A0"/>
+                </a:solidFill>
+              </a:rPr>
+              <a:t>1</a:t>
+            </a:r>
+            <a:endParaRPr lang="en-SG" sz="1100" dirty="0">
+              <a:solidFill>
+                <a:srgbClr val="7030A0"/>
+              </a:solidFill>
+            </a:endParaRPr>
+          </a:p>
+        </p:txBody>
+      </p:sp>
+      <p:sp>
+        <p:nvSpPr>
+          <p:cNvPr id="146" name="TextBox 145">
+            <a:extLst>
+              <a:ext uri="{FF2B5EF4-FFF2-40B4-BE49-F238E27FC236}">
+                <a16:creationId xmlns:a16="http://schemas.microsoft.com/office/drawing/2014/main" id="{C0629F7D-B6AB-44C1-9766-8DF287C51FCA}"/>
+              </a:ext>
+            </a:extLst>
+          </p:cNvPr>
+          <p:cNvSpPr txBox="1"/>
+          <p:nvPr/>
+        </p:nvSpPr>
+        <p:spPr>
+          <a:xfrm>
+            <a:off x="5872246" y="5066525"/>
+            <a:ext cx="881018" cy="261610"/>
+          </a:xfrm>
+          <a:prstGeom prst="rect">
+            <a:avLst/>
+          </a:prstGeom>
+          <a:noFill/>
+        </p:spPr>
+        <p:txBody>
+          <a:bodyPr wrap="square" rtlCol="0">
+            <a:spAutoFit/>
+          </a:bodyPr>
+          <a:lstStyle/>
+          <a:p>
+            <a:pPr algn="r"/>
+            <a:r>
+              <a:rPr lang="en-US" sz="1100" dirty="0">
+                <a:solidFill>
+                  <a:srgbClr val="7030A0"/>
+                </a:solidFill>
+              </a:rPr>
+              <a:t>filtered list</a:t>
             </a:r>
             <a:endParaRPr lang="en-SG" sz="1100" dirty="0">
               <a:solidFill>

</xml_diff>

<commit_message>
add more pictures/update pictures in ugdg
</commit_message>
<xml_diff>
--- a/docs/diagrams/ModelComponentClassDiagram.pptx
+++ b/docs/diagrams/ModelComponentClassDiagram.pptx
@@ -208,7 +208,7 @@
           <a:p>
             <a:fld id="{F5CC4B3F-88C1-4FFA-B1B6-F41C21DC6924}" type="datetimeFigureOut">
               <a:rPr lang="en-US" smtClean="0"/>
-              <a:t>4/3/2018</a:t>
+              <a:t>4/14/2018</a:t>
             </a:fld>
             <a:endParaRPr lang="en-US"/>
           </a:p>
@@ -654,7 +654,7 @@
           <a:p>
             <a:fld id="{78C97017-6FC3-485B-9764-EAC9E56C1D49}" type="datetimeFigureOut">
               <a:rPr lang="en-US" smtClean="0"/>
-              <a:t>4/3/2018</a:t>
+              <a:t>4/14/2018</a:t>
             </a:fld>
             <a:endParaRPr lang="en-US"/>
           </a:p>
@@ -822,7 +822,7 @@
           <a:p>
             <a:fld id="{78C97017-6FC3-485B-9764-EAC9E56C1D49}" type="datetimeFigureOut">
               <a:rPr lang="en-US" smtClean="0"/>
-              <a:t>4/3/2018</a:t>
+              <a:t>4/14/2018</a:t>
             </a:fld>
             <a:endParaRPr lang="en-US"/>
           </a:p>
@@ -1000,7 +1000,7 @@
           <a:p>
             <a:fld id="{78C97017-6FC3-485B-9764-EAC9E56C1D49}" type="datetimeFigureOut">
               <a:rPr lang="en-US" smtClean="0"/>
-              <a:t>4/3/2018</a:t>
+              <a:t>4/14/2018</a:t>
             </a:fld>
             <a:endParaRPr lang="en-US"/>
           </a:p>
@@ -1168,7 +1168,7 @@
           <a:p>
             <a:fld id="{78C97017-6FC3-485B-9764-EAC9E56C1D49}" type="datetimeFigureOut">
               <a:rPr lang="en-US" smtClean="0"/>
-              <a:t>4/3/2018</a:t>
+              <a:t>4/14/2018</a:t>
             </a:fld>
             <a:endParaRPr lang="en-US"/>
           </a:p>
@@ -1413,7 +1413,7 @@
           <a:p>
             <a:fld id="{78C97017-6FC3-485B-9764-EAC9E56C1D49}" type="datetimeFigureOut">
               <a:rPr lang="en-US" smtClean="0"/>
-              <a:t>4/3/2018</a:t>
+              <a:t>4/14/2018</a:t>
             </a:fld>
             <a:endParaRPr lang="en-US"/>
           </a:p>
@@ -1698,7 +1698,7 @@
           <a:p>
             <a:fld id="{78C97017-6FC3-485B-9764-EAC9E56C1D49}" type="datetimeFigureOut">
               <a:rPr lang="en-US" smtClean="0"/>
-              <a:t>4/3/2018</a:t>
+              <a:t>4/14/2018</a:t>
             </a:fld>
             <a:endParaRPr lang="en-US"/>
           </a:p>
@@ -2117,7 +2117,7 @@
           <a:p>
             <a:fld id="{78C97017-6FC3-485B-9764-EAC9E56C1D49}" type="datetimeFigureOut">
               <a:rPr lang="en-US" smtClean="0"/>
-              <a:t>4/3/2018</a:t>
+              <a:t>4/14/2018</a:t>
             </a:fld>
             <a:endParaRPr lang="en-US"/>
           </a:p>
@@ -2234,7 +2234,7 @@
           <a:p>
             <a:fld id="{78C97017-6FC3-485B-9764-EAC9E56C1D49}" type="datetimeFigureOut">
               <a:rPr lang="en-US" smtClean="0"/>
-              <a:t>4/3/2018</a:t>
+              <a:t>4/14/2018</a:t>
             </a:fld>
             <a:endParaRPr lang="en-US"/>
           </a:p>
@@ -2329,7 +2329,7 @@
           <a:p>
             <a:fld id="{78C97017-6FC3-485B-9764-EAC9E56C1D49}" type="datetimeFigureOut">
               <a:rPr lang="en-US" smtClean="0"/>
-              <a:t>4/3/2018</a:t>
+              <a:t>4/14/2018</a:t>
             </a:fld>
             <a:endParaRPr lang="en-US"/>
           </a:p>
@@ -2604,7 +2604,7 @@
           <a:p>
             <a:fld id="{78C97017-6FC3-485B-9764-EAC9E56C1D49}" type="datetimeFigureOut">
               <a:rPr lang="en-US" smtClean="0"/>
-              <a:t>4/3/2018</a:t>
+              <a:t>4/14/2018</a:t>
             </a:fld>
             <a:endParaRPr lang="en-US"/>
           </a:p>
@@ -2856,7 +2856,7 @@
           <a:p>
             <a:fld id="{78C97017-6FC3-485B-9764-EAC9E56C1D49}" type="datetimeFigureOut">
               <a:rPr lang="en-US" smtClean="0"/>
-              <a:t>4/3/2018</a:t>
+              <a:t>4/14/2018</a:t>
             </a:fld>
             <a:endParaRPr lang="en-US"/>
           </a:p>
@@ -3067,7 +3067,7 @@
           <a:p>
             <a:fld id="{78C97017-6FC3-485B-9764-EAC9E56C1D49}" type="datetimeFigureOut">
               <a:rPr lang="en-US" smtClean="0"/>
-              <a:t>4/3/2018</a:t>
+              <a:t>4/14/2018</a:t>
             </a:fld>
             <a:endParaRPr lang="en-US"/>
           </a:p>
@@ -3450,8 +3450,8 @@
         </p:nvSpPr>
         <p:spPr>
           <a:xfrm>
-            <a:off x="1143000" y="1679260"/>
-            <a:ext cx="7467600" cy="3252393"/>
+            <a:off x="1119864" y="1649717"/>
+            <a:ext cx="8328935" cy="3760483"/>
           </a:xfrm>
           <a:prstGeom prst="roundRect">
             <a:avLst>
@@ -3547,7 +3547,7 @@
           <a:p>
             <a:pPr algn="ctr"/>
             <a:r>
-              <a:rPr lang="en-US" sz="1050" dirty="0" err="1">
+              <a:rPr lang="en-US" sz="1050" dirty="0">
                 <a:solidFill>
                   <a:schemeClr val="bg1"/>
                 </a:solidFill>
@@ -3606,7 +3606,7 @@
           <a:p>
             <a:pPr algn="ctr"/>
             <a:r>
-              <a:rPr lang="en-US" sz="1050" dirty="0" err="1">
+              <a:rPr lang="en-US" sz="1050" dirty="0">
                 <a:solidFill>
                   <a:schemeClr val="bg1"/>
                 </a:solidFill>
@@ -3636,7 +3636,7 @@
           </a:xfrm>
           <a:prstGeom prst="bentConnector4">
             <a:avLst>
-              <a:gd name="adj1" fmla="val -190196"/>
+              <a:gd name="adj1" fmla="val -303382"/>
               <a:gd name="adj2" fmla="val 99976"/>
             </a:avLst>
           </a:prstGeom>
@@ -3993,7 +3993,7 @@
           <a:p>
             <a:pPr algn="ctr"/>
             <a:r>
-              <a:rPr lang="en-US" sz="1050" dirty="0" err="1">
+              <a:rPr lang="en-US" sz="1050" dirty="0">
                 <a:solidFill>
                   <a:srgbClr val="7030A0"/>
                 </a:solidFill>
@@ -4102,7 +4102,7 @@
         </p:nvSpPr>
         <p:spPr>
           <a:xfrm>
-            <a:off x="4487017" y="2847371"/>
+            <a:off x="4495037" y="2666630"/>
             <a:ext cx="1174640" cy="346760"/>
           </a:xfrm>
           <a:prstGeom prst="rect">
@@ -4135,7 +4135,7 @@
           <a:p>
             <a:pPr algn="ctr"/>
             <a:r>
-              <a:rPr lang="en-US" sz="1050" dirty="0" err="1">
+              <a:rPr lang="en-US" sz="1050" dirty="0">
                 <a:solidFill>
                   <a:srgbClr val="7030A0"/>
                 </a:solidFill>
@@ -4210,7 +4210,7 @@
         <p:spPr>
           <a:xfrm>
             <a:off x="4220351" y="2760681"/>
-            <a:ext cx="266666" cy="260070"/>
+            <a:ext cx="274686" cy="79329"/>
           </a:xfrm>
           <a:prstGeom prst="bentConnector3">
             <a:avLst/>
@@ -4247,7 +4247,7 @@
         </p:nvSpPr>
         <p:spPr>
           <a:xfrm>
-            <a:off x="4477328" y="2280569"/>
+            <a:off x="4477329" y="2214728"/>
             <a:ext cx="1184328" cy="346760"/>
           </a:xfrm>
           <a:prstGeom prst="rect">
@@ -4280,7 +4280,7 @@
           <a:p>
             <a:pPr algn="ctr"/>
             <a:r>
-              <a:rPr lang="en-US" sz="1050" dirty="0" err="1">
+              <a:rPr lang="en-US" sz="1050" dirty="0">
                 <a:solidFill>
                   <a:srgbClr val="7030A0"/>
                 </a:solidFill>
@@ -4307,8 +4307,8 @@
         </p:nvCxnSpPr>
         <p:spPr>
           <a:xfrm flipV="1">
-            <a:off x="4220351" y="2453949"/>
-            <a:ext cx="256977" cy="306732"/>
+            <a:off x="4220351" y="2388108"/>
+            <a:ext cx="256978" cy="372573"/>
           </a:xfrm>
           <a:prstGeom prst="bentConnector3">
             <a:avLst>
@@ -4403,7 +4403,7 @@
         </p:nvSpPr>
         <p:spPr>
           <a:xfrm>
-            <a:off x="5681741" y="2939409"/>
+            <a:off x="5661657" y="2693140"/>
             <a:ext cx="236048" cy="173380"/>
           </a:xfrm>
           <a:prstGeom prst="flowChartDecision">
@@ -4446,17 +4446,18 @@
           <p:cNvCxnSpPr>
             <a:cxnSpLocks/>
             <a:stCxn id="63" idx="3"/>
+            <a:endCxn id="62" idx="1"/>
           </p:cNvCxnSpPr>
           <p:nvPr/>
         </p:nvCxnSpPr>
         <p:spPr>
           <a:xfrm>
-            <a:off x="5917789" y="3026099"/>
-            <a:ext cx="402505" cy="2275"/>
+            <a:off x="5897705" y="2779830"/>
+            <a:ext cx="415972" cy="251616"/>
           </a:xfrm>
           <a:prstGeom prst="bentConnector3">
             <a:avLst>
-              <a:gd name="adj1" fmla="val 487"/>
+              <a:gd name="adj1" fmla="val 50000"/>
             </a:avLst>
           </a:prstGeom>
           <a:ln w="19050">
@@ -4491,7 +4492,7 @@
         </p:nvSpPr>
         <p:spPr>
           <a:xfrm>
-            <a:off x="5336105" y="1809332"/>
+            <a:off x="5565151" y="1722341"/>
             <a:ext cx="483700" cy="346760"/>
           </a:xfrm>
           <a:prstGeom prst="rect">
@@ -4547,7 +4548,7 @@
         </p:nvSpPr>
         <p:spPr>
           <a:xfrm rot="16200000">
-            <a:off x="4921666" y="2066540"/>
+            <a:off x="4921580" y="2010014"/>
             <a:ext cx="236048" cy="173380"/>
           </a:xfrm>
           <a:prstGeom prst="flowChartDecision">
@@ -4595,8 +4596,8 @@
         </p:nvCxnSpPr>
         <p:spPr>
           <a:xfrm rot="5400000" flipH="1" flipV="1">
-            <a:off x="5161650" y="1860752"/>
-            <a:ext cx="52494" cy="296415"/>
+            <a:off x="5260898" y="1674428"/>
+            <a:ext cx="82959" cy="525547"/>
           </a:xfrm>
           <a:prstGeom prst="bentConnector2">
             <a:avLst/>
@@ -5110,7 +5111,7 @@
               </a:rPr>
             </a:br>
             <a:r>
-              <a:rPr lang="en-US" sz="1050" dirty="0" err="1">
+              <a:rPr lang="en-US" sz="1050" dirty="0">
                 <a:solidFill>
                   <a:srgbClr val="7030A0"/>
                 </a:solidFill>
@@ -5172,7 +5173,7 @@
         </p:nvSpPr>
         <p:spPr>
           <a:xfrm>
-            <a:off x="2057401" y="4419600"/>
+            <a:off x="2075554" y="4802602"/>
             <a:ext cx="1066800" cy="346760"/>
           </a:xfrm>
           <a:prstGeom prst="rect">
@@ -5213,14 +5214,14 @@
               <a:t>&lt;&lt;interface&gt;&gt;</a:t>
             </a:r>
             <a:br>
-              <a:rPr lang="en-US" sz="1050">
+              <a:rPr lang="en-US" sz="1050" dirty="0">
                 <a:solidFill>
                   <a:srgbClr val="7030A0"/>
                 </a:solidFill>
               </a:rPr>
             </a:br>
             <a:r>
-              <a:rPr lang="en-US" sz="1050" dirty="0" err="1">
+              <a:rPr lang="en-US" sz="1050" dirty="0">
                 <a:solidFill>
                   <a:srgbClr val="7030A0"/>
                 </a:solidFill>
@@ -5246,8 +5247,8 @@
         </p:nvCxnSpPr>
         <p:spPr>
           <a:xfrm rot="16200000" flipH="1">
-            <a:off x="1274420" y="3809999"/>
-            <a:ext cx="1011580" cy="554381"/>
+            <a:off x="1091996" y="3992424"/>
+            <a:ext cx="1394582" cy="572534"/>
           </a:xfrm>
           <a:prstGeom prst="bentConnector2">
             <a:avLst/>
@@ -5289,8 +5290,8 @@
         </p:nvCxnSpPr>
         <p:spPr>
           <a:xfrm rot="16200000" flipV="1">
-            <a:off x="5962655" y="2152951"/>
-            <a:ext cx="404117" cy="1006114"/>
+            <a:off x="5929735" y="2120030"/>
+            <a:ext cx="469958" cy="1006113"/>
           </a:xfrm>
           <a:prstGeom prst="bentConnector2">
             <a:avLst/>
@@ -5366,7 +5367,7 @@
         </p:nvSpPr>
         <p:spPr>
           <a:xfrm>
-            <a:off x="4324972" y="3058864"/>
+            <a:off x="4315046" y="2621090"/>
             <a:ext cx="189257" cy="178683"/>
           </a:xfrm>
           <a:prstGeom prst="rect">
@@ -5405,7 +5406,7 @@
         </p:nvSpPr>
         <p:spPr>
           <a:xfrm>
-            <a:off x="5689761" y="2495413"/>
+            <a:off x="5774892" y="2218429"/>
             <a:ext cx="189257" cy="178683"/>
           </a:xfrm>
           <a:prstGeom prst="rect">
@@ -5636,7 +5637,7 @@
           <p:cNvPr id="52" name="Rectangle 8">
             <a:extLst>
               <a:ext uri="{FF2B5EF4-FFF2-40B4-BE49-F238E27FC236}">
-                <a16:creationId xmlns:a16="http://schemas.microsoft.com/office/drawing/2014/main" id="{4C81A460-4593-41DF-AEEC-1958D2E1074B}"/>
+                <a16:creationId xmlns:a16="http://schemas.microsoft.com/office/drawing/2014/main" xmlns="" id="{4C81A460-4593-41DF-AEEC-1958D2E1074B}"/>
               </a:ext>
             </a:extLst>
           </p:cNvPr>
@@ -5645,7 +5646,7 @@
         </p:nvSpPr>
         <p:spPr>
           <a:xfrm>
-            <a:off x="4495800" y="3387040"/>
+            <a:off x="4502258" y="3102534"/>
             <a:ext cx="1172189" cy="346760"/>
           </a:xfrm>
           <a:prstGeom prst="rect">
@@ -5678,7 +5679,7 @@
           <a:p>
             <a:pPr algn="ctr"/>
             <a:r>
-              <a:rPr lang="en-US" sz="1050" dirty="0" err="1">
+              <a:rPr lang="en-US" sz="1050" dirty="0">
                 <a:solidFill>
                   <a:srgbClr val="7030A0"/>
                 </a:solidFill>
@@ -5698,24 +5699,23 @@
           <p:cNvPr id="53" name="Elbow Connector 29">
             <a:extLst>
               <a:ext uri="{FF2B5EF4-FFF2-40B4-BE49-F238E27FC236}">
-                <a16:creationId xmlns:a16="http://schemas.microsoft.com/office/drawing/2014/main" id="{7CE69C6D-79C6-453E-8A8A-8C64743B2578}"/>
+                <a16:creationId xmlns:a16="http://schemas.microsoft.com/office/drawing/2014/main" xmlns="" id="{7CE69C6D-79C6-453E-8A8A-8C64743B2578}"/>
               </a:ext>
             </a:extLst>
           </p:cNvPr>
           <p:cNvCxnSpPr>
             <a:cxnSpLocks/>
+            <a:endCxn id="52" idx="1"/>
           </p:cNvCxnSpPr>
           <p:nvPr/>
         </p:nvCxnSpPr>
         <p:spPr>
           <a:xfrm rot="16200000" flipH="1">
-            <a:off x="4019732" y="3084352"/>
-            <a:ext cx="799736" cy="152397"/>
-          </a:xfrm>
-          <a:prstGeom prst="bentConnector3">
-            <a:avLst>
-              <a:gd name="adj1" fmla="val 99864"/>
-            </a:avLst>
+            <a:off x="4165214" y="2938869"/>
+            <a:ext cx="515231" cy="158857"/>
+          </a:xfrm>
+          <a:prstGeom prst="bentConnector2">
+            <a:avLst/>
           </a:prstGeom>
           <a:ln w="19050">
             <a:solidFill>
@@ -5746,7 +5746,7 @@
           <p:cNvPr id="71" name="TextBox 70">
             <a:extLst>
               <a:ext uri="{FF2B5EF4-FFF2-40B4-BE49-F238E27FC236}">
-                <a16:creationId xmlns:a16="http://schemas.microsoft.com/office/drawing/2014/main" id="{BF6814FF-622F-41DC-9AA8-BE5309479B5D}"/>
+                <a16:creationId xmlns:a16="http://schemas.microsoft.com/office/drawing/2014/main" xmlns="" id="{BF6814FF-622F-41DC-9AA8-BE5309479B5D}"/>
               </a:ext>
             </a:extLst>
           </p:cNvPr>
@@ -5755,7 +5755,7 @@
         </p:nvSpPr>
         <p:spPr>
           <a:xfrm>
-            <a:off x="4314482" y="3343436"/>
+            <a:off x="4315447" y="3038996"/>
             <a:ext cx="189257" cy="178683"/>
           </a:xfrm>
           <a:prstGeom prst="rect">
@@ -5791,7 +5791,7 @@
           <p:cNvPr id="72" name="Elbow Connector 29">
             <a:extLst>
               <a:ext uri="{FF2B5EF4-FFF2-40B4-BE49-F238E27FC236}">
-                <a16:creationId xmlns:a16="http://schemas.microsoft.com/office/drawing/2014/main" id="{028FF400-EDE2-4DFF-9267-A5DDED17363E}"/>
+                <a16:creationId xmlns:a16="http://schemas.microsoft.com/office/drawing/2014/main" xmlns="" id="{028FF400-EDE2-4DFF-9267-A5DDED17363E}"/>
               </a:ext>
             </a:extLst>
           </p:cNvPr>
@@ -5804,8 +5804,8 @@
         </p:nvCxnSpPr>
         <p:spPr>
           <a:xfrm rot="5400000">
-            <a:off x="5990083" y="2882733"/>
-            <a:ext cx="355594" cy="999781"/>
+            <a:off x="6135565" y="2743709"/>
+            <a:ext cx="71088" cy="993323"/>
           </a:xfrm>
           <a:prstGeom prst="bentConnector2">
             <a:avLst/>
@@ -5839,7 +5839,7 @@
           <p:cNvPr id="73" name="TextBox 72">
             <a:extLst>
               <a:ext uri="{FF2B5EF4-FFF2-40B4-BE49-F238E27FC236}">
-                <a16:creationId xmlns:a16="http://schemas.microsoft.com/office/drawing/2014/main" id="{46215EBF-26F4-43DC-A8EB-85FF8FB0DF77}"/>
+                <a16:creationId xmlns:a16="http://schemas.microsoft.com/office/drawing/2014/main" xmlns="" id="{46215EBF-26F4-43DC-A8EB-85FF8FB0DF77}"/>
               </a:ext>
             </a:extLst>
           </p:cNvPr>
@@ -5848,7 +5848,7 @@
         </p:nvSpPr>
         <p:spPr>
           <a:xfrm>
-            <a:off x="5791200" y="3581400"/>
+            <a:off x="5801988" y="3065571"/>
             <a:ext cx="189257" cy="178683"/>
           </a:xfrm>
           <a:prstGeom prst="rect">
@@ -5879,12 +5879,60 @@
           </a:p>
         </p:txBody>
       </p:sp>
-      <p:sp>
-        <p:nvSpPr>
-          <p:cNvPr id="74" name="Flowchart: Decision 96">
+      <p:cxnSp>
+        <p:nvCxnSpPr>
+          <p:cNvPr id="77" name="Elbow Connector 29">
             <a:extLst>
               <a:ext uri="{FF2B5EF4-FFF2-40B4-BE49-F238E27FC236}">
-                <a16:creationId xmlns:a16="http://schemas.microsoft.com/office/drawing/2014/main" id="{95A2CA35-3119-4A6D-8889-F07CCC030936}"/>
+                <a16:creationId xmlns:a16="http://schemas.microsoft.com/office/drawing/2014/main" xmlns="" id="{741E281A-D77E-450D-95F4-554D8993FE01}"/>
+              </a:ext>
+            </a:extLst>
+          </p:cNvPr>
+          <p:cNvCxnSpPr>
+            <a:cxnSpLocks/>
+            <a:stCxn id="89" idx="3"/>
+            <a:endCxn id="82" idx="1"/>
+          </p:cNvCxnSpPr>
+          <p:nvPr/>
+        </p:nvCxnSpPr>
+        <p:spPr>
+          <a:xfrm rot="16200000" flipH="1">
+            <a:off x="5362216" y="3411886"/>
+            <a:ext cx="38131" cy="508713"/>
+          </a:xfrm>
+          <a:prstGeom prst="bentConnector2">
+            <a:avLst/>
+          </a:prstGeom>
+          <a:ln w="19050">
+            <a:solidFill>
+              <a:srgbClr val="7030A0"/>
+            </a:solidFill>
+            <a:headEnd type="none" w="med" len="med"/>
+            <a:tailEnd type="arrow" w="med" len="med"/>
+          </a:ln>
+          <a:effectLst/>
+        </p:spPr>
+        <p:style>
+          <a:lnRef idx="1">
+            <a:schemeClr val="accent2"/>
+          </a:lnRef>
+          <a:fillRef idx="2">
+            <a:schemeClr val="accent2"/>
+          </a:fillRef>
+          <a:effectRef idx="1">
+            <a:schemeClr val="accent2"/>
+          </a:effectRef>
+          <a:fontRef idx="minor">
+            <a:schemeClr val="dk1"/>
+          </a:fontRef>
+        </p:style>
+      </p:cxnSp>
+      <p:sp>
+        <p:nvSpPr>
+          <p:cNvPr id="82" name="Rectangle 8">
+            <a:extLst>
+              <a:ext uri="{FF2B5EF4-FFF2-40B4-BE49-F238E27FC236}">
+                <a16:creationId xmlns:a16="http://schemas.microsoft.com/office/drawing/2014/main" xmlns="" id="{CA295839-526B-4037-94D1-FE0CA0E13033}"/>
               </a:ext>
             </a:extLst>
           </p:cNvPr>
@@ -5892,9 +5940,271 @@
           <p:nvPr/>
         </p:nvSpPr>
         <p:spPr>
-          <a:xfrm rot="16200000">
-            <a:off x="4976886" y="3765135"/>
-            <a:ext cx="236048" cy="173380"/>
+          <a:xfrm>
+            <a:off x="5635638" y="3511929"/>
+            <a:ext cx="617763" cy="346760"/>
+          </a:xfrm>
+          <a:prstGeom prst="rect">
+            <a:avLst/>
+          </a:prstGeom>
+          <a:ln w="19050">
+            <a:solidFill>
+              <a:srgbClr val="7030A0"/>
+            </a:solidFill>
+          </a:ln>
+          <a:effectLst/>
+        </p:spPr>
+        <p:style>
+          <a:lnRef idx="1">
+            <a:schemeClr val="accent4"/>
+          </a:lnRef>
+          <a:fillRef idx="2">
+            <a:schemeClr val="accent4"/>
+          </a:fillRef>
+          <a:effectRef idx="1">
+            <a:schemeClr val="accent4"/>
+          </a:effectRef>
+          <a:fontRef idx="minor">
+            <a:schemeClr val="dk1"/>
+          </a:fontRef>
+        </p:style>
+        <p:txBody>
+          <a:bodyPr rtlCol="0" anchor="ctr"/>
+          <a:lstStyle/>
+          <a:p>
+            <a:pPr algn="ctr"/>
+            <a:r>
+              <a:rPr lang="en-US" sz="1050" dirty="0">
+                <a:solidFill>
+                  <a:srgbClr val="7030A0"/>
+                </a:solidFill>
+              </a:rPr>
+              <a:t>Subject</a:t>
+            </a:r>
+            <a:endParaRPr lang="en-SG" sz="1050" dirty="0">
+              <a:solidFill>
+                <a:srgbClr val="7030A0"/>
+              </a:solidFill>
+            </a:endParaRPr>
+          </a:p>
+        </p:txBody>
+      </p:sp>
+      <p:sp>
+        <p:nvSpPr>
+          <p:cNvPr id="87" name="TextBox 86">
+            <a:extLst>
+              <a:ext uri="{FF2B5EF4-FFF2-40B4-BE49-F238E27FC236}">
+                <a16:creationId xmlns:a16="http://schemas.microsoft.com/office/drawing/2014/main" xmlns="" id="{56124A3E-1574-4173-9752-7849D8899D54}"/>
+              </a:ext>
+            </a:extLst>
+          </p:cNvPr>
+          <p:cNvSpPr txBox="1"/>
+          <p:nvPr/>
+        </p:nvSpPr>
+        <p:spPr>
+          <a:xfrm>
+            <a:off x="4539162" y="4494626"/>
+            <a:ext cx="189257" cy="178683"/>
+          </a:xfrm>
+          <a:prstGeom prst="rect">
+            <a:avLst/>
+          </a:prstGeom>
+          <a:noFill/>
+        </p:spPr>
+        <p:txBody>
+          <a:bodyPr wrap="square" lIns="0" tIns="0" rIns="0" bIns="0" rtlCol="0">
+            <a:noAutofit/>
+          </a:bodyPr>
+          <a:lstStyle/>
+          <a:p>
+            <a:pPr algn="ctr"/>
+            <a:r>
+              <a:rPr lang="en-US" sz="1100" dirty="0">
+                <a:solidFill>
+                  <a:srgbClr val="7030A0"/>
+                </a:solidFill>
+              </a:rPr>
+              <a:t>*</a:t>
+            </a:r>
+            <a:endParaRPr lang="en-SG" sz="1100" dirty="0">
+              <a:solidFill>
+                <a:srgbClr val="7030A0"/>
+              </a:solidFill>
+            </a:endParaRPr>
+          </a:p>
+        </p:txBody>
+      </p:sp>
+      <p:sp>
+        <p:nvSpPr>
+          <p:cNvPr id="85" name="Rectangle 8"/>
+          <p:cNvSpPr/>
+          <p:nvPr/>
+        </p:nvSpPr>
+        <p:spPr>
+          <a:xfrm>
+            <a:off x="7714186" y="3533172"/>
+            <a:ext cx="822003" cy="285783"/>
+          </a:xfrm>
+          <a:prstGeom prst="rect">
+            <a:avLst/>
+          </a:prstGeom>
+          <a:ln w="19050">
+            <a:solidFill>
+              <a:srgbClr val="7030A0"/>
+            </a:solidFill>
+          </a:ln>
+          <a:effectLst/>
+        </p:spPr>
+        <p:style>
+          <a:lnRef idx="1">
+            <a:schemeClr val="accent4"/>
+          </a:lnRef>
+          <a:fillRef idx="2">
+            <a:schemeClr val="accent4"/>
+          </a:fillRef>
+          <a:effectRef idx="1">
+            <a:schemeClr val="accent4"/>
+          </a:effectRef>
+          <a:fontRef idx="minor">
+            <a:schemeClr val="dk1"/>
+          </a:fontRef>
+        </p:style>
+        <p:txBody>
+          <a:bodyPr rtlCol="0" anchor="ctr"/>
+          <a:lstStyle/>
+          <a:p>
+            <a:pPr algn="ctr"/>
+            <a:r>
+              <a:rPr lang="en-US" sz="1050" dirty="0" smtClean="0">
+                <a:solidFill>
+                  <a:srgbClr val="7030A0"/>
+                </a:solidFill>
+              </a:rPr>
+              <a:t>NextOfKin</a:t>
+            </a:r>
+            <a:endParaRPr lang="en-SG" sz="1050" dirty="0">
+              <a:solidFill>
+                <a:srgbClr val="7030A0"/>
+              </a:solidFill>
+            </a:endParaRPr>
+          </a:p>
+        </p:txBody>
+      </p:sp>
+      <p:cxnSp>
+        <p:nvCxnSpPr>
+          <p:cNvPr id="86" name="Elbow Connector 85"/>
+          <p:cNvCxnSpPr>
+            <a:stCxn id="78" idx="3"/>
+            <a:endCxn id="85" idx="1"/>
+          </p:cNvCxnSpPr>
+          <p:nvPr/>
+        </p:nvCxnSpPr>
+        <p:spPr>
+          <a:xfrm>
+            <a:off x="7277995" y="3034891"/>
+            <a:ext cx="436191" cy="641173"/>
+          </a:xfrm>
+          <a:prstGeom prst="bentConnector3">
+            <a:avLst>
+              <a:gd name="adj1" fmla="val 50000"/>
+            </a:avLst>
+          </a:prstGeom>
+          <a:ln w="19050">
+            <a:solidFill>
+              <a:srgbClr val="7030A0"/>
+            </a:solidFill>
+            <a:headEnd type="none" w="med" len="med"/>
+            <a:tailEnd type="arrow" w="med" len="med"/>
+          </a:ln>
+          <a:effectLst/>
+        </p:spPr>
+        <p:style>
+          <a:lnRef idx="1">
+            <a:schemeClr val="accent2"/>
+          </a:lnRef>
+          <a:fillRef idx="2">
+            <a:schemeClr val="accent2"/>
+          </a:fillRef>
+          <a:effectRef idx="1">
+            <a:schemeClr val="accent2"/>
+          </a:effectRef>
+          <a:fontRef idx="minor">
+            <a:schemeClr val="dk1"/>
+          </a:fontRef>
+        </p:style>
+      </p:cxnSp>
+      <p:sp>
+        <p:nvSpPr>
+          <p:cNvPr id="88" name="Rectangle 8">
+            <a:extLst>
+              <a:ext uri="{FF2B5EF4-FFF2-40B4-BE49-F238E27FC236}">
+                <a16:creationId xmlns:a16="http://schemas.microsoft.com/office/drawing/2014/main" xmlns="" id="{4C81A460-4593-41DF-AEEC-1958D2E1074B}"/>
+              </a:ext>
+            </a:extLst>
+          </p:cNvPr>
+          <p:cNvSpPr/>
+          <p:nvPr/>
+        </p:nvSpPr>
+        <p:spPr>
+          <a:xfrm>
+            <a:off x="4502258" y="3916873"/>
+            <a:ext cx="1631517" cy="346760"/>
+          </a:xfrm>
+          <a:prstGeom prst="rect">
+            <a:avLst/>
+          </a:prstGeom>
+          <a:ln w="19050">
+            <a:solidFill>
+              <a:srgbClr val="7030A0"/>
+            </a:solidFill>
+          </a:ln>
+          <a:effectLst/>
+        </p:spPr>
+        <p:style>
+          <a:lnRef idx="1">
+            <a:schemeClr val="accent4"/>
+          </a:lnRef>
+          <a:fillRef idx="2">
+            <a:schemeClr val="accent4"/>
+          </a:fillRef>
+          <a:effectRef idx="1">
+            <a:schemeClr val="accent4"/>
+          </a:effectRef>
+          <a:fontRef idx="minor">
+            <a:schemeClr val="dk1"/>
+          </a:fontRef>
+        </p:style>
+        <p:txBody>
+          <a:bodyPr rtlCol="0" anchor="ctr"/>
+          <a:lstStyle/>
+          <a:p>
+            <a:pPr algn="ctr"/>
+            <a:r>
+              <a:rPr lang="en-US" sz="1050" dirty="0" smtClean="0">
+                <a:solidFill>
+                  <a:srgbClr val="7030A0"/>
+                </a:solidFill>
+              </a:rPr>
+              <a:t>UniqueAppointmentList</a:t>
+            </a:r>
+            <a:endParaRPr lang="en-SG" sz="1050" dirty="0">
+              <a:solidFill>
+                <a:srgbClr val="7030A0"/>
+              </a:solidFill>
+            </a:endParaRPr>
+          </a:p>
+        </p:txBody>
+      </p:sp>
+      <p:sp>
+        <p:nvSpPr>
+          <p:cNvPr id="89" name="Flowchart: Decision 96"/>
+          <p:cNvSpPr/>
+          <p:nvPr/>
+        </p:nvSpPr>
+        <p:spPr>
+          <a:xfrm rot="5400000">
+            <a:off x="5036575" y="3489450"/>
+            <a:ext cx="180700" cy="134756"/>
           </a:xfrm>
           <a:prstGeom prst="flowChartDecision">
             <a:avLst/>
@@ -5932,26 +6242,28 @@
       </p:sp>
       <p:cxnSp>
         <p:nvCxnSpPr>
-          <p:cNvPr id="77" name="Elbow Connector 29">
+          <p:cNvPr id="90" name="Elbow Connector 29">
             <a:extLst>
               <a:ext uri="{FF2B5EF4-FFF2-40B4-BE49-F238E27FC236}">
-                <a16:creationId xmlns:a16="http://schemas.microsoft.com/office/drawing/2014/main" id="{741E281A-D77E-450D-95F4-554D8993FE01}"/>
+                <a16:creationId xmlns:a16="http://schemas.microsoft.com/office/drawing/2014/main" xmlns="" id="{7CE69C6D-79C6-453E-8A8A-8C64743B2578}"/>
               </a:ext>
             </a:extLst>
           </p:cNvPr>
           <p:cNvCxnSpPr>
             <a:cxnSpLocks/>
+            <a:stCxn id="51" idx="3"/>
+            <a:endCxn id="88" idx="1"/>
           </p:cNvCxnSpPr>
           <p:nvPr/>
         </p:nvCxnSpPr>
         <p:spPr>
-          <a:xfrm rot="10800000" flipV="1">
-            <a:off x="4419600" y="3969813"/>
-            <a:ext cx="673180" cy="28466"/>
+          <a:xfrm>
+            <a:off x="4220351" y="2760681"/>
+            <a:ext cx="281907" cy="1329572"/>
           </a:xfrm>
           <a:prstGeom prst="bentConnector3">
             <a:avLst>
-              <a:gd name="adj1" fmla="val -67"/>
+              <a:gd name="adj1" fmla="val 50000"/>
             </a:avLst>
           </a:prstGeom>
           <a:ln w="19050">
@@ -5978,12 +6290,243 @@
           </a:fontRef>
         </p:style>
       </p:cxnSp>
-      <p:sp>
-        <p:nvSpPr>
-          <p:cNvPr id="82" name="Rectangle 8">
+      <p:cxnSp>
+        <p:nvCxnSpPr>
+          <p:cNvPr id="91" name="Elbow Connector 29">
             <a:extLst>
               <a:ext uri="{FF2B5EF4-FFF2-40B4-BE49-F238E27FC236}">
-                <a16:creationId xmlns:a16="http://schemas.microsoft.com/office/drawing/2014/main" id="{CA295839-526B-4037-94D1-FE0CA0E13033}"/>
+                <a16:creationId xmlns:a16="http://schemas.microsoft.com/office/drawing/2014/main" xmlns="" id="{028FF400-EDE2-4DFF-9267-A5DDED17363E}"/>
+              </a:ext>
+            </a:extLst>
+          </p:cNvPr>
+          <p:cNvCxnSpPr>
+            <a:cxnSpLocks/>
+            <a:stCxn id="62" idx="2"/>
+            <a:endCxn id="88" idx="3"/>
+          </p:cNvCxnSpPr>
+          <p:nvPr/>
+        </p:nvCxnSpPr>
+        <p:spPr>
+          <a:xfrm rot="5400000">
+            <a:off x="5958060" y="3380542"/>
+            <a:ext cx="885427" cy="533995"/>
+          </a:xfrm>
+          <a:prstGeom prst="bentConnector2">
+            <a:avLst/>
+          </a:prstGeom>
+          <a:ln w="19050">
+            <a:solidFill>
+              <a:srgbClr val="7030A0"/>
+            </a:solidFill>
+            <a:headEnd type="none" w="med" len="med"/>
+            <a:tailEnd type="arrow" w="med" len="med"/>
+          </a:ln>
+          <a:effectLst/>
+        </p:spPr>
+        <p:style>
+          <a:lnRef idx="1">
+            <a:schemeClr val="accent2"/>
+          </a:lnRef>
+          <a:fillRef idx="2">
+            <a:schemeClr val="accent2"/>
+          </a:fillRef>
+          <a:effectRef idx="1">
+            <a:schemeClr val="accent2"/>
+          </a:effectRef>
+          <a:fontRef idx="minor">
+            <a:schemeClr val="dk1"/>
+          </a:fontRef>
+        </p:style>
+      </p:cxnSp>
+      <p:sp>
+        <p:nvSpPr>
+          <p:cNvPr id="93" name="TextBox 92">
+            <a:extLst>
+              <a:ext uri="{FF2B5EF4-FFF2-40B4-BE49-F238E27FC236}">
+                <a16:creationId xmlns:a16="http://schemas.microsoft.com/office/drawing/2014/main" xmlns="" id="{46215EBF-26F4-43DC-A8EB-85FF8FB0DF77}"/>
+              </a:ext>
+            </a:extLst>
+          </p:cNvPr>
+          <p:cNvSpPr txBox="1"/>
+          <p:nvPr/>
+        </p:nvSpPr>
+        <p:spPr>
+          <a:xfrm>
+            <a:off x="6248920" y="3869727"/>
+            <a:ext cx="189257" cy="178683"/>
+          </a:xfrm>
+          <a:prstGeom prst="rect">
+            <a:avLst/>
+          </a:prstGeom>
+          <a:noFill/>
+        </p:spPr>
+        <p:txBody>
+          <a:bodyPr wrap="square" lIns="0" tIns="0" rIns="0" bIns="0" rtlCol="0">
+            <a:noAutofit/>
+          </a:bodyPr>
+          <a:lstStyle/>
+          <a:p>
+            <a:pPr algn="ctr"/>
+            <a:r>
+              <a:rPr lang="en-US" sz="1100" dirty="0">
+                <a:solidFill>
+                  <a:srgbClr val="7030A0"/>
+                </a:solidFill>
+              </a:rPr>
+              <a:t>1</a:t>
+            </a:r>
+            <a:endParaRPr lang="en-SG" sz="1100" dirty="0">
+              <a:solidFill>
+                <a:srgbClr val="7030A0"/>
+              </a:solidFill>
+            </a:endParaRPr>
+          </a:p>
+        </p:txBody>
+      </p:sp>
+      <p:sp>
+        <p:nvSpPr>
+          <p:cNvPr id="94" name="TextBox 93">
+            <a:extLst>
+              <a:ext uri="{FF2B5EF4-FFF2-40B4-BE49-F238E27FC236}">
+                <a16:creationId xmlns:a16="http://schemas.microsoft.com/office/drawing/2014/main" xmlns="" id="{46215EBF-26F4-43DC-A8EB-85FF8FB0DF77}"/>
+              </a:ext>
+            </a:extLst>
+          </p:cNvPr>
+          <p:cNvSpPr txBox="1"/>
+          <p:nvPr/>
+        </p:nvSpPr>
+        <p:spPr>
+          <a:xfrm>
+            <a:off x="4313002" y="3856376"/>
+            <a:ext cx="189257" cy="178683"/>
+          </a:xfrm>
+          <a:prstGeom prst="rect">
+            <a:avLst/>
+          </a:prstGeom>
+          <a:noFill/>
+        </p:spPr>
+        <p:txBody>
+          <a:bodyPr wrap="square" lIns="0" tIns="0" rIns="0" bIns="0" rtlCol="0">
+            <a:noAutofit/>
+          </a:bodyPr>
+          <a:lstStyle/>
+          <a:p>
+            <a:pPr algn="ctr"/>
+            <a:r>
+              <a:rPr lang="en-US" sz="1100" dirty="0">
+                <a:solidFill>
+                  <a:srgbClr val="7030A0"/>
+                </a:solidFill>
+              </a:rPr>
+              <a:t>1</a:t>
+            </a:r>
+            <a:endParaRPr lang="en-SG" sz="1100" dirty="0">
+              <a:solidFill>
+                <a:srgbClr val="7030A0"/>
+              </a:solidFill>
+            </a:endParaRPr>
+          </a:p>
+        </p:txBody>
+      </p:sp>
+      <p:sp>
+        <p:nvSpPr>
+          <p:cNvPr id="98" name="Flowchart: Decision 96"/>
+          <p:cNvSpPr/>
+          <p:nvPr/>
+        </p:nvSpPr>
+        <p:spPr>
+          <a:xfrm rot="5400000">
+            <a:off x="5201178" y="4303126"/>
+            <a:ext cx="180700" cy="134756"/>
+          </a:xfrm>
+          <a:prstGeom prst="flowChartDecision">
+            <a:avLst/>
+          </a:prstGeom>
+          <a:noFill/>
+          <a:ln w="19050">
+            <a:solidFill>
+              <a:srgbClr val="7030A0"/>
+            </a:solidFill>
+          </a:ln>
+          <a:effectLst/>
+        </p:spPr>
+        <p:style>
+          <a:lnRef idx="1">
+            <a:schemeClr val="accent6"/>
+          </a:lnRef>
+          <a:fillRef idx="2">
+            <a:schemeClr val="accent6"/>
+          </a:fillRef>
+          <a:effectRef idx="1">
+            <a:schemeClr val="accent6"/>
+          </a:effectRef>
+          <a:fontRef idx="minor">
+            <a:schemeClr val="dk1"/>
+          </a:fontRef>
+        </p:style>
+        <p:txBody>
+          <a:bodyPr rtlCol="0" anchor="ctr"/>
+          <a:lstStyle/>
+          <a:p>
+            <a:pPr algn="ctr"/>
+            <a:endParaRPr lang="en-US" sz="1050"/>
+          </a:p>
+        </p:txBody>
+      </p:sp>
+      <p:cxnSp>
+        <p:nvCxnSpPr>
+          <p:cNvPr id="101" name="Elbow Connector 29">
+            <a:extLst>
+              <a:ext uri="{FF2B5EF4-FFF2-40B4-BE49-F238E27FC236}">
+                <a16:creationId xmlns:a16="http://schemas.microsoft.com/office/drawing/2014/main" xmlns="" id="{741E281A-D77E-450D-95F4-554D8993FE01}"/>
+              </a:ext>
+            </a:extLst>
+          </p:cNvPr>
+          <p:cNvCxnSpPr>
+            <a:cxnSpLocks/>
+            <a:stCxn id="98" idx="3"/>
+            <a:endCxn id="102" idx="3"/>
+          </p:cNvCxnSpPr>
+          <p:nvPr/>
+        </p:nvCxnSpPr>
+        <p:spPr>
+          <a:xfrm rot="5400000" flipH="1">
+            <a:off x="4820434" y="3989761"/>
+            <a:ext cx="417" cy="941771"/>
+          </a:xfrm>
+          <a:prstGeom prst="bentConnector2">
+            <a:avLst/>
+          </a:prstGeom>
+          <a:ln w="19050">
+            <a:solidFill>
+              <a:srgbClr val="7030A0"/>
+            </a:solidFill>
+            <a:headEnd type="none" w="med" len="med"/>
+            <a:tailEnd type="arrow" w="med" len="med"/>
+          </a:ln>
+          <a:effectLst/>
+        </p:spPr>
+        <p:style>
+          <a:lnRef idx="1">
+            <a:schemeClr val="accent2"/>
+          </a:lnRef>
+          <a:fillRef idx="2">
+            <a:schemeClr val="accent2"/>
+          </a:fillRef>
+          <a:effectRef idx="1">
+            <a:schemeClr val="accent2"/>
+          </a:effectRef>
+          <a:fontRef idx="minor">
+            <a:schemeClr val="dk1"/>
+          </a:fontRef>
+        </p:style>
+      </p:cxnSp>
+      <p:sp>
+        <p:nvSpPr>
+          <p:cNvPr id="102" name="Rectangle 8">
+            <a:extLst>
+              <a:ext uri="{FF2B5EF4-FFF2-40B4-BE49-F238E27FC236}">
+                <a16:creationId xmlns:a16="http://schemas.microsoft.com/office/drawing/2014/main" xmlns="" id="{CA295839-526B-4037-94D1-FE0CA0E13033}"/>
               </a:ext>
             </a:extLst>
           </p:cNvPr>
@@ -5992,8 +6535,8 @@
         </p:nvSpPr>
         <p:spPr>
           <a:xfrm>
-            <a:off x="3801837" y="3810000"/>
-            <a:ext cx="617763" cy="346760"/>
+            <a:off x="3320267" y="4287057"/>
+            <a:ext cx="1029490" cy="346760"/>
           </a:xfrm>
           <a:prstGeom prst="rect">
             <a:avLst/>
@@ -6025,12 +6568,12 @@
           <a:p>
             <a:pPr algn="ctr"/>
             <a:r>
-              <a:rPr lang="en-US" sz="1050" dirty="0">
+              <a:rPr lang="en-US" sz="1050" dirty="0" smtClean="0">
                 <a:solidFill>
                   <a:srgbClr val="7030A0"/>
                 </a:solidFill>
               </a:rPr>
-              <a:t>Subject</a:t>
+              <a:t>Appointment</a:t>
             </a:r>
             <a:endParaRPr lang="en-SG" sz="1050" dirty="0">
               <a:solidFill>
@@ -6042,19 +6585,13 @@
       </p:sp>
       <p:sp>
         <p:nvSpPr>
-          <p:cNvPr id="87" name="TextBox 86">
-            <a:extLst>
-              <a:ext uri="{FF2B5EF4-FFF2-40B4-BE49-F238E27FC236}">
-                <a16:creationId xmlns:a16="http://schemas.microsoft.com/office/drawing/2014/main" id="{56124A3E-1574-4173-9752-7849D8899D54}"/>
-              </a:ext>
-            </a:extLst>
-          </p:cNvPr>
+          <p:cNvPr id="110" name="TextBox 109"/>
           <p:cNvSpPr txBox="1"/>
           <p:nvPr/>
         </p:nvSpPr>
         <p:spPr>
           <a:xfrm>
-            <a:off x="4382743" y="4038600"/>
+            <a:off x="5328357" y="3538749"/>
             <a:ext cx="189257" cy="178683"/>
           </a:xfrm>
           <a:prstGeom prst="rect">
@@ -6085,6 +6622,441 @@
           </a:p>
         </p:txBody>
       </p:sp>
+      <p:sp>
+        <p:nvSpPr>
+          <p:cNvPr id="111" name="Flowchart: Decision 96"/>
+          <p:cNvSpPr/>
+          <p:nvPr/>
+        </p:nvSpPr>
+        <p:spPr>
+          <a:xfrm rot="5400000">
+            <a:off x="8007163" y="3850289"/>
+            <a:ext cx="236048" cy="173380"/>
+          </a:xfrm>
+          <a:prstGeom prst="flowChartDecision">
+            <a:avLst/>
+          </a:prstGeom>
+          <a:solidFill>
+            <a:srgbClr val="7030A0"/>
+          </a:solidFill>
+          <a:ln w="19050">
+            <a:solidFill>
+              <a:srgbClr val="7030A0"/>
+            </a:solidFill>
+          </a:ln>
+          <a:effectLst/>
+        </p:spPr>
+        <p:style>
+          <a:lnRef idx="1">
+            <a:schemeClr val="accent6"/>
+          </a:lnRef>
+          <a:fillRef idx="2">
+            <a:schemeClr val="accent6"/>
+          </a:fillRef>
+          <a:effectRef idx="1">
+            <a:schemeClr val="accent6"/>
+          </a:effectRef>
+          <a:fontRef idx="minor">
+            <a:schemeClr val="dk1"/>
+          </a:fontRef>
+        </p:style>
+        <p:txBody>
+          <a:bodyPr rtlCol="0" anchor="ctr"/>
+          <a:lstStyle/>
+          <a:p>
+            <a:pPr algn="ctr"/>
+            <a:endParaRPr lang="en-US" sz="1050"/>
+          </a:p>
+        </p:txBody>
+      </p:sp>
+      <p:sp>
+        <p:nvSpPr>
+          <p:cNvPr id="112" name="Rectangle 8"/>
+          <p:cNvSpPr/>
+          <p:nvPr/>
+        </p:nvSpPr>
+        <p:spPr>
+          <a:xfrm>
+            <a:off x="8555839" y="3925525"/>
+            <a:ext cx="708186" cy="285783"/>
+          </a:xfrm>
+          <a:prstGeom prst="rect">
+            <a:avLst/>
+          </a:prstGeom>
+          <a:ln w="19050">
+            <a:solidFill>
+              <a:srgbClr val="7030A0"/>
+            </a:solidFill>
+          </a:ln>
+          <a:effectLst/>
+        </p:spPr>
+        <p:style>
+          <a:lnRef idx="1">
+            <a:schemeClr val="accent4"/>
+          </a:lnRef>
+          <a:fillRef idx="2">
+            <a:schemeClr val="accent4"/>
+          </a:fillRef>
+          <a:effectRef idx="1">
+            <a:schemeClr val="accent4"/>
+          </a:effectRef>
+          <a:fontRef idx="minor">
+            <a:schemeClr val="dk1"/>
+          </a:fontRef>
+        </p:style>
+        <p:txBody>
+          <a:bodyPr rtlCol="0" anchor="ctr"/>
+          <a:lstStyle/>
+          <a:p>
+            <a:pPr algn="ctr"/>
+            <a:r>
+              <a:rPr lang="en-US" sz="1050" dirty="0">
+                <a:solidFill>
+                  <a:srgbClr val="7030A0"/>
+                </a:solidFill>
+              </a:rPr>
+              <a:t>Name</a:t>
+            </a:r>
+            <a:endParaRPr lang="en-SG" sz="1050" dirty="0">
+              <a:solidFill>
+                <a:srgbClr val="7030A0"/>
+              </a:solidFill>
+            </a:endParaRPr>
+          </a:p>
+        </p:txBody>
+      </p:sp>
+      <p:sp>
+        <p:nvSpPr>
+          <p:cNvPr id="115" name="Rectangle 8"/>
+          <p:cNvSpPr/>
+          <p:nvPr/>
+        </p:nvSpPr>
+        <p:spPr>
+          <a:xfrm>
+            <a:off x="8550514" y="4263633"/>
+            <a:ext cx="708186" cy="285783"/>
+          </a:xfrm>
+          <a:prstGeom prst="rect">
+            <a:avLst/>
+          </a:prstGeom>
+          <a:ln w="19050">
+            <a:solidFill>
+              <a:srgbClr val="7030A0"/>
+            </a:solidFill>
+          </a:ln>
+          <a:effectLst/>
+        </p:spPr>
+        <p:style>
+          <a:lnRef idx="1">
+            <a:schemeClr val="accent4"/>
+          </a:lnRef>
+          <a:fillRef idx="2">
+            <a:schemeClr val="accent4"/>
+          </a:fillRef>
+          <a:effectRef idx="1">
+            <a:schemeClr val="accent4"/>
+          </a:effectRef>
+          <a:fontRef idx="minor">
+            <a:schemeClr val="dk1"/>
+          </a:fontRef>
+        </p:style>
+        <p:txBody>
+          <a:bodyPr rtlCol="0" anchor="ctr"/>
+          <a:lstStyle/>
+          <a:p>
+            <a:pPr algn="ctr"/>
+            <a:r>
+              <a:rPr lang="en-US" sz="1050" dirty="0" smtClean="0">
+                <a:solidFill>
+                  <a:srgbClr val="7030A0"/>
+                </a:solidFill>
+              </a:rPr>
+              <a:t>Phone</a:t>
+            </a:r>
+            <a:endParaRPr lang="en-SG" sz="1050" dirty="0">
+              <a:solidFill>
+                <a:srgbClr val="7030A0"/>
+              </a:solidFill>
+            </a:endParaRPr>
+          </a:p>
+        </p:txBody>
+      </p:sp>
+      <p:sp>
+        <p:nvSpPr>
+          <p:cNvPr id="116" name="Rectangle 8"/>
+          <p:cNvSpPr/>
+          <p:nvPr/>
+        </p:nvSpPr>
+        <p:spPr>
+          <a:xfrm>
+            <a:off x="8550514" y="4929201"/>
+            <a:ext cx="708186" cy="285783"/>
+          </a:xfrm>
+          <a:prstGeom prst="rect">
+            <a:avLst/>
+          </a:prstGeom>
+          <a:ln w="19050">
+            <a:solidFill>
+              <a:srgbClr val="7030A0"/>
+            </a:solidFill>
+          </a:ln>
+          <a:effectLst/>
+        </p:spPr>
+        <p:style>
+          <a:lnRef idx="1">
+            <a:schemeClr val="accent4"/>
+          </a:lnRef>
+          <a:fillRef idx="2">
+            <a:schemeClr val="accent4"/>
+          </a:fillRef>
+          <a:effectRef idx="1">
+            <a:schemeClr val="accent4"/>
+          </a:effectRef>
+          <a:fontRef idx="minor">
+            <a:schemeClr val="dk1"/>
+          </a:fontRef>
+        </p:style>
+        <p:txBody>
+          <a:bodyPr rtlCol="0" anchor="ctr"/>
+          <a:lstStyle/>
+          <a:p>
+            <a:pPr algn="ctr"/>
+            <a:r>
+              <a:rPr lang="en-US" sz="1050" dirty="0">
+                <a:solidFill>
+                  <a:srgbClr val="7030A0"/>
+                </a:solidFill>
+              </a:rPr>
+              <a:t>Remark</a:t>
+            </a:r>
+            <a:endParaRPr lang="en-SG" sz="1050" dirty="0">
+              <a:solidFill>
+                <a:srgbClr val="7030A0"/>
+              </a:solidFill>
+            </a:endParaRPr>
+          </a:p>
+        </p:txBody>
+      </p:sp>
+      <p:sp>
+        <p:nvSpPr>
+          <p:cNvPr id="117" name="Rectangle 8"/>
+          <p:cNvSpPr/>
+          <p:nvPr/>
+        </p:nvSpPr>
+        <p:spPr>
+          <a:xfrm>
+            <a:off x="8550514" y="4596417"/>
+            <a:ext cx="708186" cy="285783"/>
+          </a:xfrm>
+          <a:prstGeom prst="rect">
+            <a:avLst/>
+          </a:prstGeom>
+          <a:ln w="19050">
+            <a:solidFill>
+              <a:srgbClr val="7030A0"/>
+            </a:solidFill>
+          </a:ln>
+          <a:effectLst/>
+        </p:spPr>
+        <p:style>
+          <a:lnRef idx="1">
+            <a:schemeClr val="accent4"/>
+          </a:lnRef>
+          <a:fillRef idx="2">
+            <a:schemeClr val="accent4"/>
+          </a:fillRef>
+          <a:effectRef idx="1">
+            <a:schemeClr val="accent4"/>
+          </a:effectRef>
+          <a:fontRef idx="minor">
+            <a:schemeClr val="dk1"/>
+          </a:fontRef>
+        </p:style>
+        <p:txBody>
+          <a:bodyPr rtlCol="0" anchor="ctr"/>
+          <a:lstStyle/>
+          <a:p>
+            <a:pPr algn="ctr"/>
+            <a:r>
+              <a:rPr lang="en-US" sz="1050" dirty="0" smtClean="0">
+                <a:solidFill>
+                  <a:srgbClr val="7030A0"/>
+                </a:solidFill>
+              </a:rPr>
+              <a:t>Email</a:t>
+            </a:r>
+            <a:endParaRPr lang="en-SG" sz="1050" dirty="0">
+              <a:solidFill>
+                <a:srgbClr val="7030A0"/>
+              </a:solidFill>
+            </a:endParaRPr>
+          </a:p>
+        </p:txBody>
+      </p:sp>
+      <p:cxnSp>
+        <p:nvCxnSpPr>
+          <p:cNvPr id="121" name="Elbow Connector 120"/>
+          <p:cNvCxnSpPr>
+            <a:stCxn id="111" idx="3"/>
+            <a:endCxn id="112" idx="1"/>
+          </p:cNvCxnSpPr>
+          <p:nvPr/>
+        </p:nvCxnSpPr>
+        <p:spPr>
+          <a:xfrm rot="16200000" flipH="1">
+            <a:off x="8333806" y="3846384"/>
+            <a:ext cx="13414" cy="430652"/>
+          </a:xfrm>
+          <a:prstGeom prst="bentConnector2">
+            <a:avLst/>
+          </a:prstGeom>
+          <a:ln w="19050">
+            <a:solidFill>
+              <a:srgbClr val="7030A0"/>
+            </a:solidFill>
+            <a:headEnd type="none" w="med" len="med"/>
+            <a:tailEnd type="arrow" w="med" len="med"/>
+          </a:ln>
+          <a:effectLst/>
+        </p:spPr>
+        <p:style>
+          <a:lnRef idx="1">
+            <a:schemeClr val="accent2"/>
+          </a:lnRef>
+          <a:fillRef idx="2">
+            <a:schemeClr val="accent2"/>
+          </a:fillRef>
+          <a:effectRef idx="1">
+            <a:schemeClr val="accent2"/>
+          </a:effectRef>
+          <a:fontRef idx="minor">
+            <a:schemeClr val="dk1"/>
+          </a:fontRef>
+        </p:style>
+      </p:cxnSp>
+      <p:cxnSp>
+        <p:nvCxnSpPr>
+          <p:cNvPr id="123" name="Elbow Connector 122"/>
+          <p:cNvCxnSpPr>
+            <a:stCxn id="111" idx="3"/>
+            <a:endCxn id="115" idx="1"/>
+          </p:cNvCxnSpPr>
+          <p:nvPr/>
+        </p:nvCxnSpPr>
+        <p:spPr>
+          <a:xfrm rot="16200000" flipH="1">
+            <a:off x="8162089" y="4018100"/>
+            <a:ext cx="351522" cy="425327"/>
+          </a:xfrm>
+          <a:prstGeom prst="bentConnector2">
+            <a:avLst/>
+          </a:prstGeom>
+          <a:ln w="19050">
+            <a:solidFill>
+              <a:srgbClr val="7030A0"/>
+            </a:solidFill>
+            <a:headEnd type="none" w="med" len="med"/>
+            <a:tailEnd type="arrow" w="med" len="med"/>
+          </a:ln>
+          <a:effectLst/>
+        </p:spPr>
+        <p:style>
+          <a:lnRef idx="1">
+            <a:schemeClr val="accent2"/>
+          </a:lnRef>
+          <a:fillRef idx="2">
+            <a:schemeClr val="accent2"/>
+          </a:fillRef>
+          <a:effectRef idx="1">
+            <a:schemeClr val="accent2"/>
+          </a:effectRef>
+          <a:fontRef idx="minor">
+            <a:schemeClr val="dk1"/>
+          </a:fontRef>
+        </p:style>
+      </p:cxnSp>
+      <p:cxnSp>
+        <p:nvCxnSpPr>
+          <p:cNvPr id="125" name="Elbow Connector 124"/>
+          <p:cNvCxnSpPr>
+            <a:stCxn id="111" idx="3"/>
+            <a:endCxn id="117" idx="1"/>
+          </p:cNvCxnSpPr>
+          <p:nvPr/>
+        </p:nvCxnSpPr>
+        <p:spPr>
+          <a:xfrm rot="16200000" flipH="1">
+            <a:off x="7995697" y="4184492"/>
+            <a:ext cx="684306" cy="425327"/>
+          </a:xfrm>
+          <a:prstGeom prst="bentConnector2">
+            <a:avLst/>
+          </a:prstGeom>
+          <a:ln w="19050">
+            <a:solidFill>
+              <a:srgbClr val="7030A0"/>
+            </a:solidFill>
+            <a:headEnd type="none" w="med" len="med"/>
+            <a:tailEnd type="arrow" w="med" len="med"/>
+          </a:ln>
+          <a:effectLst/>
+        </p:spPr>
+        <p:style>
+          <a:lnRef idx="1">
+            <a:schemeClr val="accent2"/>
+          </a:lnRef>
+          <a:fillRef idx="2">
+            <a:schemeClr val="accent2"/>
+          </a:fillRef>
+          <a:effectRef idx="1">
+            <a:schemeClr val="accent2"/>
+          </a:effectRef>
+          <a:fontRef idx="minor">
+            <a:schemeClr val="dk1"/>
+          </a:fontRef>
+        </p:style>
+      </p:cxnSp>
+      <p:cxnSp>
+        <p:nvCxnSpPr>
+          <p:cNvPr id="127" name="Elbow Connector 126"/>
+          <p:cNvCxnSpPr>
+            <a:stCxn id="111" idx="3"/>
+            <a:endCxn id="116" idx="1"/>
+          </p:cNvCxnSpPr>
+          <p:nvPr/>
+        </p:nvCxnSpPr>
+        <p:spPr>
+          <a:xfrm rot="16200000" flipH="1">
+            <a:off x="7829305" y="4350884"/>
+            <a:ext cx="1017090" cy="425327"/>
+          </a:xfrm>
+          <a:prstGeom prst="bentConnector2">
+            <a:avLst/>
+          </a:prstGeom>
+          <a:ln w="19050">
+            <a:solidFill>
+              <a:srgbClr val="7030A0"/>
+            </a:solidFill>
+            <a:headEnd type="none" w="med" len="med"/>
+            <a:tailEnd type="arrow" w="med" len="med"/>
+          </a:ln>
+          <a:effectLst/>
+        </p:spPr>
+        <p:style>
+          <a:lnRef idx="1">
+            <a:schemeClr val="accent2"/>
+          </a:lnRef>
+          <a:fillRef idx="2">
+            <a:schemeClr val="accent2"/>
+          </a:fillRef>
+          <a:effectRef idx="1">
+            <a:schemeClr val="accent2"/>
+          </a:effectRef>
+          <a:fontRef idx="minor">
+            <a:schemeClr val="dk1"/>
+          </a:fontRef>
+        </p:style>
+      </p:cxnSp>
     </p:spTree>
     <p:extLst>
       <p:ext uri="{BB962C8B-B14F-4D97-AF65-F5344CB8AC3E}">

</xml_diff>

<commit_message>
Updated Model Class diagram and links in 2.4 and 6.5 in DeveloperGuide
</commit_message>
<xml_diff>
--- a/docs/diagrams/ModelComponentClassDiagram.pptx
+++ b/docs/diagrams/ModelComponentClassDiagram.pptx
@@ -208,7 +208,7 @@
           <a:p>
             <a:fld id="{F5CC4B3F-88C1-4FFA-B1B6-F41C21DC6924}" type="datetimeFigureOut">
               <a:rPr lang="en-US" smtClean="0"/>
-              <a:t>1/1/18</a:t>
+              <a:t>4/15/2018</a:t>
             </a:fld>
             <a:endParaRPr lang="en-US"/>
           </a:p>
@@ -272,38 +272,37 @@
           <a:p>
             <a:pPr lvl="0"/>
             <a:r>
-              <a:rPr lang="en-US" smtClean="0"/>
+              <a:rPr lang="en-US"/>
               <a:t>Click to edit Master text styles</a:t>
             </a:r>
           </a:p>
           <a:p>
             <a:pPr lvl="1"/>
             <a:r>
-              <a:rPr lang="en-US" smtClean="0"/>
+              <a:rPr lang="en-US"/>
               <a:t>Second level</a:t>
             </a:r>
           </a:p>
           <a:p>
             <a:pPr lvl="2"/>
             <a:r>
-              <a:rPr lang="en-US" smtClean="0"/>
+              <a:rPr lang="en-US"/>
               <a:t>Third level</a:t>
             </a:r>
           </a:p>
           <a:p>
             <a:pPr lvl="3"/>
             <a:r>
-              <a:rPr lang="en-US" smtClean="0"/>
+              <a:rPr lang="en-US"/>
               <a:t>Fourth level</a:t>
             </a:r>
           </a:p>
           <a:p>
             <a:pPr lvl="4"/>
             <a:r>
-              <a:rPr lang="en-US" smtClean="0"/>
+              <a:rPr lang="en-US"/>
               <a:t>Fifth level</a:t>
             </a:r>
-            <a:endParaRPr lang="en-US"/>
           </a:p>
         </p:txBody>
       </p:sp>
@@ -514,10 +513,9 @@
           <a:lstStyle/>
           <a:p>
             <a:r>
-              <a:rPr lang="en-US" smtClean="0"/>
+              <a:rPr lang="en-US"/>
               <a:t>Click to edit Master title style</a:t>
             </a:r>
-            <a:endParaRPr lang="en-US"/>
           </a:p>
         </p:txBody>
       </p:sp>
@@ -633,10 +631,9 @@
           </a:lstStyle>
           <a:p>
             <a:r>
-              <a:rPr lang="en-US" smtClean="0"/>
+              <a:rPr lang="en-US"/>
               <a:t>Click to edit Master subtitle style</a:t>
             </a:r>
-            <a:endParaRPr lang="en-US"/>
           </a:p>
         </p:txBody>
       </p:sp>
@@ -657,7 +654,7 @@
           <a:p>
             <a:fld id="{78C97017-6FC3-485B-9764-EAC9E56C1D49}" type="datetimeFigureOut">
               <a:rPr lang="en-US" smtClean="0"/>
-              <a:t>1/1/18</a:t>
+              <a:t>4/15/2018</a:t>
             </a:fld>
             <a:endParaRPr lang="en-US"/>
           </a:p>
@@ -751,10 +748,9 @@
           <a:lstStyle/>
           <a:p>
             <a:r>
-              <a:rPr lang="en-US" smtClean="0"/>
+              <a:rPr lang="en-US"/>
               <a:t>Click to edit Master title style</a:t>
             </a:r>
-            <a:endParaRPr lang="en-US"/>
           </a:p>
         </p:txBody>
       </p:sp>
@@ -775,38 +771,37 @@
           <a:p>
             <a:pPr lvl="0"/>
             <a:r>
-              <a:rPr lang="en-US" smtClean="0"/>
+              <a:rPr lang="en-US"/>
               <a:t>Click to edit Master text styles</a:t>
             </a:r>
           </a:p>
           <a:p>
             <a:pPr lvl="1"/>
             <a:r>
-              <a:rPr lang="en-US" smtClean="0"/>
+              <a:rPr lang="en-US"/>
               <a:t>Second level</a:t>
             </a:r>
           </a:p>
           <a:p>
             <a:pPr lvl="2"/>
             <a:r>
-              <a:rPr lang="en-US" smtClean="0"/>
+              <a:rPr lang="en-US"/>
               <a:t>Third level</a:t>
             </a:r>
           </a:p>
           <a:p>
             <a:pPr lvl="3"/>
             <a:r>
-              <a:rPr lang="en-US" smtClean="0"/>
+              <a:rPr lang="en-US"/>
               <a:t>Fourth level</a:t>
             </a:r>
           </a:p>
           <a:p>
             <a:pPr lvl="4"/>
             <a:r>
-              <a:rPr lang="en-US" smtClean="0"/>
+              <a:rPr lang="en-US"/>
               <a:t>Fifth level</a:t>
             </a:r>
-            <a:endParaRPr lang="en-US"/>
           </a:p>
         </p:txBody>
       </p:sp>
@@ -827,7 +822,7 @@
           <a:p>
             <a:fld id="{78C97017-6FC3-485B-9764-EAC9E56C1D49}" type="datetimeFigureOut">
               <a:rPr lang="en-US" smtClean="0"/>
-              <a:t>1/1/18</a:t>
+              <a:t>4/15/2018</a:t>
             </a:fld>
             <a:endParaRPr lang="en-US"/>
           </a:p>
@@ -926,10 +921,9 @@
           <a:lstStyle/>
           <a:p>
             <a:r>
-              <a:rPr lang="en-US" smtClean="0"/>
+              <a:rPr lang="en-US"/>
               <a:t>Click to edit Master title style</a:t>
             </a:r>
-            <a:endParaRPr lang="en-US"/>
           </a:p>
         </p:txBody>
       </p:sp>
@@ -955,38 +949,37 @@
           <a:p>
             <a:pPr lvl="0"/>
             <a:r>
-              <a:rPr lang="en-US" smtClean="0"/>
+              <a:rPr lang="en-US"/>
               <a:t>Click to edit Master text styles</a:t>
             </a:r>
           </a:p>
           <a:p>
             <a:pPr lvl="1"/>
             <a:r>
-              <a:rPr lang="en-US" smtClean="0"/>
+              <a:rPr lang="en-US"/>
               <a:t>Second level</a:t>
             </a:r>
           </a:p>
           <a:p>
             <a:pPr lvl="2"/>
             <a:r>
-              <a:rPr lang="en-US" smtClean="0"/>
+              <a:rPr lang="en-US"/>
               <a:t>Third level</a:t>
             </a:r>
           </a:p>
           <a:p>
             <a:pPr lvl="3"/>
             <a:r>
-              <a:rPr lang="en-US" smtClean="0"/>
+              <a:rPr lang="en-US"/>
               <a:t>Fourth level</a:t>
             </a:r>
           </a:p>
           <a:p>
             <a:pPr lvl="4"/>
             <a:r>
-              <a:rPr lang="en-US" smtClean="0"/>
+              <a:rPr lang="en-US"/>
               <a:t>Fifth level</a:t>
             </a:r>
-            <a:endParaRPr lang="en-US"/>
           </a:p>
         </p:txBody>
       </p:sp>
@@ -1007,7 +1000,7 @@
           <a:p>
             <a:fld id="{78C97017-6FC3-485B-9764-EAC9E56C1D49}" type="datetimeFigureOut">
               <a:rPr lang="en-US" smtClean="0"/>
-              <a:t>1/1/18</a:t>
+              <a:t>4/15/2018</a:t>
             </a:fld>
             <a:endParaRPr lang="en-US"/>
           </a:p>
@@ -1101,10 +1094,9 @@
           <a:lstStyle/>
           <a:p>
             <a:r>
-              <a:rPr lang="en-US" smtClean="0"/>
+              <a:rPr lang="en-US"/>
               <a:t>Click to edit Master title style</a:t>
             </a:r>
-            <a:endParaRPr lang="en-US"/>
           </a:p>
         </p:txBody>
       </p:sp>
@@ -1125,38 +1117,37 @@
           <a:p>
             <a:pPr lvl="0"/>
             <a:r>
-              <a:rPr lang="en-US" smtClean="0"/>
+              <a:rPr lang="en-US"/>
               <a:t>Click to edit Master text styles</a:t>
             </a:r>
           </a:p>
           <a:p>
             <a:pPr lvl="1"/>
             <a:r>
-              <a:rPr lang="en-US" smtClean="0"/>
+              <a:rPr lang="en-US"/>
               <a:t>Second level</a:t>
             </a:r>
           </a:p>
           <a:p>
             <a:pPr lvl="2"/>
             <a:r>
-              <a:rPr lang="en-US" smtClean="0"/>
+              <a:rPr lang="en-US"/>
               <a:t>Third level</a:t>
             </a:r>
           </a:p>
           <a:p>
             <a:pPr lvl="3"/>
             <a:r>
-              <a:rPr lang="en-US" smtClean="0"/>
+              <a:rPr lang="en-US"/>
               <a:t>Fourth level</a:t>
             </a:r>
           </a:p>
           <a:p>
             <a:pPr lvl="4"/>
             <a:r>
-              <a:rPr lang="en-US" smtClean="0"/>
+              <a:rPr lang="en-US"/>
               <a:t>Fifth level</a:t>
             </a:r>
-            <a:endParaRPr lang="en-US"/>
           </a:p>
         </p:txBody>
       </p:sp>
@@ -1177,7 +1168,7 @@
           <a:p>
             <a:fld id="{78C97017-6FC3-485B-9764-EAC9E56C1D49}" type="datetimeFigureOut">
               <a:rPr lang="en-US" smtClean="0"/>
-              <a:t>1/1/18</a:t>
+              <a:t>4/15/2018</a:t>
             </a:fld>
             <a:endParaRPr lang="en-US"/>
           </a:p>
@@ -1280,10 +1271,9 @@
           </a:lstStyle>
           <a:p>
             <a:r>
-              <a:rPr lang="en-US" smtClean="0"/>
+              <a:rPr lang="en-US"/>
               <a:t>Click to edit Master title style</a:t>
             </a:r>
-            <a:endParaRPr lang="en-US"/>
           </a:p>
         </p:txBody>
       </p:sp>
@@ -1400,7 +1390,7 @@
           <a:p>
             <a:pPr lvl="0"/>
             <a:r>
-              <a:rPr lang="en-US" smtClean="0"/>
+              <a:rPr lang="en-US"/>
               <a:t>Click to edit Master text styles</a:t>
             </a:r>
           </a:p>
@@ -1423,7 +1413,7 @@
           <a:p>
             <a:fld id="{78C97017-6FC3-485B-9764-EAC9E56C1D49}" type="datetimeFigureOut">
               <a:rPr lang="en-US" smtClean="0"/>
-              <a:t>1/1/18</a:t>
+              <a:t>4/15/2018</a:t>
             </a:fld>
             <a:endParaRPr lang="en-US"/>
           </a:p>
@@ -1517,10 +1507,9 @@
           <a:lstStyle/>
           <a:p>
             <a:r>
-              <a:rPr lang="en-US" smtClean="0"/>
+              <a:rPr lang="en-US"/>
               <a:t>Click to edit Master title style</a:t>
             </a:r>
-            <a:endParaRPr lang="en-US"/>
           </a:p>
         </p:txBody>
       </p:sp>
@@ -1574,38 +1563,37 @@
           <a:p>
             <a:pPr lvl="0"/>
             <a:r>
-              <a:rPr lang="en-US" smtClean="0"/>
+              <a:rPr lang="en-US"/>
               <a:t>Click to edit Master text styles</a:t>
             </a:r>
           </a:p>
           <a:p>
             <a:pPr lvl="1"/>
             <a:r>
-              <a:rPr lang="en-US" smtClean="0"/>
+              <a:rPr lang="en-US"/>
               <a:t>Second level</a:t>
             </a:r>
           </a:p>
           <a:p>
             <a:pPr lvl="2"/>
             <a:r>
-              <a:rPr lang="en-US" smtClean="0"/>
+              <a:rPr lang="en-US"/>
               <a:t>Third level</a:t>
             </a:r>
           </a:p>
           <a:p>
             <a:pPr lvl="3"/>
             <a:r>
-              <a:rPr lang="en-US" smtClean="0"/>
+              <a:rPr lang="en-US"/>
               <a:t>Fourth level</a:t>
             </a:r>
           </a:p>
           <a:p>
             <a:pPr lvl="4"/>
             <a:r>
-              <a:rPr lang="en-US" smtClean="0"/>
+              <a:rPr lang="en-US"/>
               <a:t>Fifth level</a:t>
             </a:r>
-            <a:endParaRPr lang="en-US"/>
           </a:p>
         </p:txBody>
       </p:sp>
@@ -1659,38 +1647,37 @@
           <a:p>
             <a:pPr lvl="0"/>
             <a:r>
-              <a:rPr lang="en-US" smtClean="0"/>
+              <a:rPr lang="en-US"/>
               <a:t>Click to edit Master text styles</a:t>
             </a:r>
           </a:p>
           <a:p>
             <a:pPr lvl="1"/>
             <a:r>
-              <a:rPr lang="en-US" smtClean="0"/>
+              <a:rPr lang="en-US"/>
               <a:t>Second level</a:t>
             </a:r>
           </a:p>
           <a:p>
             <a:pPr lvl="2"/>
             <a:r>
-              <a:rPr lang="en-US" smtClean="0"/>
+              <a:rPr lang="en-US"/>
               <a:t>Third level</a:t>
             </a:r>
           </a:p>
           <a:p>
             <a:pPr lvl="3"/>
             <a:r>
-              <a:rPr lang="en-US" smtClean="0"/>
+              <a:rPr lang="en-US"/>
               <a:t>Fourth level</a:t>
             </a:r>
           </a:p>
           <a:p>
             <a:pPr lvl="4"/>
             <a:r>
-              <a:rPr lang="en-US" smtClean="0"/>
+              <a:rPr lang="en-US"/>
               <a:t>Fifth level</a:t>
             </a:r>
-            <a:endParaRPr lang="en-US"/>
           </a:p>
         </p:txBody>
       </p:sp>
@@ -1711,7 +1698,7 @@
           <a:p>
             <a:fld id="{78C97017-6FC3-485B-9764-EAC9E56C1D49}" type="datetimeFigureOut">
               <a:rPr lang="en-US" smtClean="0"/>
-              <a:t>1/1/18</a:t>
+              <a:t>4/15/2018</a:t>
             </a:fld>
             <a:endParaRPr lang="en-US"/>
           </a:p>
@@ -1809,10 +1796,9 @@
           </a:lstStyle>
           <a:p>
             <a:r>
-              <a:rPr lang="en-US" smtClean="0"/>
+              <a:rPr lang="en-US"/>
               <a:t>Click to edit Master title style</a:t>
             </a:r>
-            <a:endParaRPr lang="en-US"/>
           </a:p>
         </p:txBody>
       </p:sp>
@@ -1875,7 +1861,7 @@
           <a:p>
             <a:pPr lvl="0"/>
             <a:r>
-              <a:rPr lang="en-US" smtClean="0"/>
+              <a:rPr lang="en-US"/>
               <a:t>Click to edit Master text styles</a:t>
             </a:r>
           </a:p>
@@ -1931,38 +1917,37 @@
           <a:p>
             <a:pPr lvl="0"/>
             <a:r>
-              <a:rPr lang="en-US" smtClean="0"/>
+              <a:rPr lang="en-US"/>
               <a:t>Click to edit Master text styles</a:t>
             </a:r>
           </a:p>
           <a:p>
             <a:pPr lvl="1"/>
             <a:r>
-              <a:rPr lang="en-US" smtClean="0"/>
+              <a:rPr lang="en-US"/>
               <a:t>Second level</a:t>
             </a:r>
           </a:p>
           <a:p>
             <a:pPr lvl="2"/>
             <a:r>
-              <a:rPr lang="en-US" smtClean="0"/>
+              <a:rPr lang="en-US"/>
               <a:t>Third level</a:t>
             </a:r>
           </a:p>
           <a:p>
             <a:pPr lvl="3"/>
             <a:r>
-              <a:rPr lang="en-US" smtClean="0"/>
+              <a:rPr lang="en-US"/>
               <a:t>Fourth level</a:t>
             </a:r>
           </a:p>
           <a:p>
             <a:pPr lvl="4"/>
             <a:r>
-              <a:rPr lang="en-US" smtClean="0"/>
+              <a:rPr lang="en-US"/>
               <a:t>Fifth level</a:t>
             </a:r>
-            <a:endParaRPr lang="en-US"/>
           </a:p>
         </p:txBody>
       </p:sp>
@@ -2025,7 +2010,7 @@
           <a:p>
             <a:pPr lvl="0"/>
             <a:r>
-              <a:rPr lang="en-US" smtClean="0"/>
+              <a:rPr lang="en-US"/>
               <a:t>Click to edit Master text styles</a:t>
             </a:r>
           </a:p>
@@ -2081,38 +2066,37 @@
           <a:p>
             <a:pPr lvl="0"/>
             <a:r>
-              <a:rPr lang="en-US" smtClean="0"/>
+              <a:rPr lang="en-US"/>
               <a:t>Click to edit Master text styles</a:t>
             </a:r>
           </a:p>
           <a:p>
             <a:pPr lvl="1"/>
             <a:r>
-              <a:rPr lang="en-US" smtClean="0"/>
+              <a:rPr lang="en-US"/>
               <a:t>Second level</a:t>
             </a:r>
           </a:p>
           <a:p>
             <a:pPr lvl="2"/>
             <a:r>
-              <a:rPr lang="en-US" smtClean="0"/>
+              <a:rPr lang="en-US"/>
               <a:t>Third level</a:t>
             </a:r>
           </a:p>
           <a:p>
             <a:pPr lvl="3"/>
             <a:r>
-              <a:rPr lang="en-US" smtClean="0"/>
+              <a:rPr lang="en-US"/>
               <a:t>Fourth level</a:t>
             </a:r>
           </a:p>
           <a:p>
             <a:pPr lvl="4"/>
             <a:r>
-              <a:rPr lang="en-US" smtClean="0"/>
+              <a:rPr lang="en-US"/>
               <a:t>Fifth level</a:t>
             </a:r>
-            <a:endParaRPr lang="en-US"/>
           </a:p>
         </p:txBody>
       </p:sp>
@@ -2133,7 +2117,7 @@
           <a:p>
             <a:fld id="{78C97017-6FC3-485B-9764-EAC9E56C1D49}" type="datetimeFigureOut">
               <a:rPr lang="en-US" smtClean="0"/>
-              <a:t>1/1/18</a:t>
+              <a:t>4/15/2018</a:t>
             </a:fld>
             <a:endParaRPr lang="en-US"/>
           </a:p>
@@ -2227,10 +2211,9 @@
           <a:lstStyle/>
           <a:p>
             <a:r>
-              <a:rPr lang="en-US" smtClean="0"/>
+              <a:rPr lang="en-US"/>
               <a:t>Click to edit Master title style</a:t>
             </a:r>
-            <a:endParaRPr lang="en-US"/>
           </a:p>
         </p:txBody>
       </p:sp>
@@ -2251,7 +2234,7 @@
           <a:p>
             <a:fld id="{78C97017-6FC3-485B-9764-EAC9E56C1D49}" type="datetimeFigureOut">
               <a:rPr lang="en-US" smtClean="0"/>
-              <a:t>1/1/18</a:t>
+              <a:t>4/15/2018</a:t>
             </a:fld>
             <a:endParaRPr lang="en-US"/>
           </a:p>
@@ -2346,7 +2329,7 @@
           <a:p>
             <a:fld id="{78C97017-6FC3-485B-9764-EAC9E56C1D49}" type="datetimeFigureOut">
               <a:rPr lang="en-US" smtClean="0"/>
-              <a:t>1/1/18</a:t>
+              <a:t>4/15/2018</a:t>
             </a:fld>
             <a:endParaRPr lang="en-US"/>
           </a:p>
@@ -2449,10 +2432,9 @@
           </a:lstStyle>
           <a:p>
             <a:r>
-              <a:rPr lang="en-US" smtClean="0"/>
+              <a:rPr lang="en-US"/>
               <a:t>Click to edit Master title style</a:t>
             </a:r>
-            <a:endParaRPr lang="en-US"/>
           </a:p>
         </p:txBody>
       </p:sp>
@@ -2506,38 +2488,37 @@
           <a:p>
             <a:pPr lvl="0"/>
             <a:r>
-              <a:rPr lang="en-US" smtClean="0"/>
+              <a:rPr lang="en-US"/>
               <a:t>Click to edit Master text styles</a:t>
             </a:r>
           </a:p>
           <a:p>
             <a:pPr lvl="1"/>
             <a:r>
-              <a:rPr lang="en-US" smtClean="0"/>
+              <a:rPr lang="en-US"/>
               <a:t>Second level</a:t>
             </a:r>
           </a:p>
           <a:p>
             <a:pPr lvl="2"/>
             <a:r>
-              <a:rPr lang="en-US" smtClean="0"/>
+              <a:rPr lang="en-US"/>
               <a:t>Third level</a:t>
             </a:r>
           </a:p>
           <a:p>
             <a:pPr lvl="3"/>
             <a:r>
-              <a:rPr lang="en-US" smtClean="0"/>
+              <a:rPr lang="en-US"/>
               <a:t>Fourth level</a:t>
             </a:r>
           </a:p>
           <a:p>
             <a:pPr lvl="4"/>
             <a:r>
-              <a:rPr lang="en-US" smtClean="0"/>
+              <a:rPr lang="en-US"/>
               <a:t>Fifth level</a:t>
             </a:r>
-            <a:endParaRPr lang="en-US"/>
           </a:p>
         </p:txBody>
       </p:sp>
@@ -2600,7 +2581,7 @@
           <a:p>
             <a:pPr lvl="0"/>
             <a:r>
-              <a:rPr lang="en-US" smtClean="0"/>
+              <a:rPr lang="en-US"/>
               <a:t>Click to edit Master text styles</a:t>
             </a:r>
           </a:p>
@@ -2623,7 +2604,7 @@
           <a:p>
             <a:fld id="{78C97017-6FC3-485B-9764-EAC9E56C1D49}" type="datetimeFigureOut">
               <a:rPr lang="en-US" smtClean="0"/>
-              <a:t>1/1/18</a:t>
+              <a:t>4/15/2018</a:t>
             </a:fld>
             <a:endParaRPr lang="en-US"/>
           </a:p>
@@ -2726,10 +2707,9 @@
           </a:lstStyle>
           <a:p>
             <a:r>
-              <a:rPr lang="en-US" smtClean="0"/>
+              <a:rPr lang="en-US"/>
               <a:t>Click to edit Master title style</a:t>
             </a:r>
-            <a:endParaRPr lang="en-US"/>
           </a:p>
         </p:txBody>
       </p:sp>
@@ -2853,7 +2833,7 @@
           <a:p>
             <a:pPr lvl="0"/>
             <a:r>
-              <a:rPr lang="en-US" smtClean="0"/>
+              <a:rPr lang="en-US"/>
               <a:t>Click to edit Master text styles</a:t>
             </a:r>
           </a:p>
@@ -2876,7 +2856,7 @@
           <a:p>
             <a:fld id="{78C97017-6FC3-485B-9764-EAC9E56C1D49}" type="datetimeFigureOut">
               <a:rPr lang="en-US" smtClean="0"/>
-              <a:t>1/1/18</a:t>
+              <a:t>4/15/2018</a:t>
             </a:fld>
             <a:endParaRPr lang="en-US"/>
           </a:p>
@@ -2985,10 +2965,9 @@
           <a:lstStyle/>
           <a:p>
             <a:r>
-              <a:rPr lang="en-US" smtClean="0"/>
+              <a:rPr lang="en-US"/>
               <a:t>Click to edit Master title style</a:t>
             </a:r>
-            <a:endParaRPr lang="en-US"/>
           </a:p>
         </p:txBody>
       </p:sp>
@@ -3019,38 +2998,37 @@
           <a:p>
             <a:pPr lvl="0"/>
             <a:r>
-              <a:rPr lang="en-US" smtClean="0"/>
+              <a:rPr lang="en-US"/>
               <a:t>Click to edit Master text styles</a:t>
             </a:r>
           </a:p>
           <a:p>
             <a:pPr lvl="1"/>
             <a:r>
-              <a:rPr lang="en-US" smtClean="0"/>
+              <a:rPr lang="en-US"/>
               <a:t>Second level</a:t>
             </a:r>
           </a:p>
           <a:p>
             <a:pPr lvl="2"/>
             <a:r>
-              <a:rPr lang="en-US" smtClean="0"/>
+              <a:rPr lang="en-US"/>
               <a:t>Third level</a:t>
             </a:r>
           </a:p>
           <a:p>
             <a:pPr lvl="3"/>
             <a:r>
-              <a:rPr lang="en-US" smtClean="0"/>
+              <a:rPr lang="en-US"/>
               <a:t>Fourth level</a:t>
             </a:r>
           </a:p>
           <a:p>
             <a:pPr lvl="4"/>
             <a:r>
-              <a:rPr lang="en-US" smtClean="0"/>
+              <a:rPr lang="en-US"/>
               <a:t>Fifth level</a:t>
             </a:r>
-            <a:endParaRPr lang="en-US"/>
           </a:p>
         </p:txBody>
       </p:sp>
@@ -3089,7 +3067,7 @@
           <a:p>
             <a:fld id="{78C97017-6FC3-485B-9764-EAC9E56C1D49}" type="datetimeFigureOut">
               <a:rPr lang="en-US" smtClean="0"/>
-              <a:t>1/1/18</a:t>
+              <a:t>4/15/2018</a:t>
             </a:fld>
             <a:endParaRPr lang="en-US"/>
           </a:p>
@@ -3472,8 +3450,8 @@
         </p:nvSpPr>
         <p:spPr>
           <a:xfrm>
-            <a:off x="1119865" y="1727200"/>
-            <a:ext cx="7490735" cy="2997200"/>
+            <a:off x="990600" y="1219200"/>
+            <a:ext cx="7543800" cy="3352800"/>
           </a:xfrm>
           <a:prstGeom prst="roundRect">
             <a:avLst>
@@ -3510,7 +3488,7 @@
           <a:lstStyle/>
           <a:p>
             <a:r>
-              <a:rPr lang="en-US" sz="1200" b="1" dirty="0" smtClean="0">
+              <a:rPr lang="en-US" sz="1200" b="1" dirty="0">
                 <a:solidFill>
                   <a:srgbClr val="7030A0"/>
                 </a:solidFill>
@@ -3533,7 +3511,7 @@
         </p:nvSpPr>
         <p:spPr>
           <a:xfrm>
-            <a:off x="2877180" y="3158440"/>
+            <a:off x="2877180" y="3657600"/>
             <a:ext cx="1093635" cy="346760"/>
           </a:xfrm>
           <a:prstGeom prst="rect">
@@ -3569,7 +3547,7 @@
           <a:p>
             <a:pPr algn="ctr"/>
             <a:r>
-              <a:rPr lang="en-US" sz="1050" dirty="0" err="1" smtClean="0">
+              <a:rPr lang="en-US" sz="1050" dirty="0" err="1">
                 <a:solidFill>
                   <a:schemeClr val="bg1"/>
                 </a:solidFill>
@@ -3592,7 +3570,7 @@
         </p:nvSpPr>
         <p:spPr>
           <a:xfrm rot="16200000">
-            <a:off x="1683963" y="2868687"/>
+            <a:off x="1683963" y="3227436"/>
             <a:ext cx="1093635" cy="346760"/>
           </a:xfrm>
           <a:prstGeom prst="rect">
@@ -3628,7 +3606,7 @@
           <a:p>
             <a:pPr algn="ctr"/>
             <a:r>
-              <a:rPr lang="en-US" sz="1050" dirty="0" err="1" smtClean="0">
+              <a:rPr lang="en-US" sz="1050" dirty="0" err="1">
                 <a:solidFill>
                   <a:schemeClr val="bg1"/>
                 </a:solidFill>
@@ -3647,19 +3625,20 @@
         <p:nvCxnSpPr>
           <p:cNvPr id="107" name="Elbow Connector 106"/>
           <p:cNvCxnSpPr>
+            <a:cxnSpLocks/>
             <a:stCxn id="9" idx="1"/>
+            <a:endCxn id="62" idx="2"/>
           </p:cNvCxnSpPr>
           <p:nvPr/>
         </p:nvCxnSpPr>
         <p:spPr>
           <a:xfrm rot="5400000" flipH="1" flipV="1">
-            <a:off x="4360065" y="1080909"/>
-            <a:ext cx="378691" cy="4637261"/>
-          </a:xfrm>
-          <a:prstGeom prst="bentConnector4">
+            <a:off x="4405728" y="1685592"/>
+            <a:ext cx="87094" cy="4436989"/>
+          </a:xfrm>
+          <a:prstGeom prst="bentConnector3">
             <a:avLst>
-              <a:gd name="adj1" fmla="val -101829"/>
-              <a:gd name="adj2" fmla="val 99976"/>
+              <a:gd name="adj1" fmla="val -561439"/>
             </a:avLst>
           </a:prstGeom>
           <a:ln w="19050">
@@ -3695,7 +3674,7 @@
         </p:nvSpPr>
         <p:spPr>
           <a:xfrm rot="16200000">
-            <a:off x="956202" y="2861202"/>
+            <a:off x="956202" y="3219951"/>
             <a:ext cx="1093635" cy="346760"/>
           </a:xfrm>
           <a:prstGeom prst="rect">
@@ -3742,7 +3721,7 @@
           <a:p>
             <a:pPr algn="ctr"/>
             <a:r>
-              <a:rPr lang="en-US" sz="1050" dirty="0" smtClean="0">
+              <a:rPr lang="en-US" sz="1050" dirty="0">
                 <a:solidFill>
                   <a:schemeClr val="bg1"/>
                 </a:solidFill>
@@ -3765,7 +3744,7 @@
         </p:nvSpPr>
         <p:spPr>
           <a:xfrm rot="16200000">
-            <a:off x="1626910" y="2952291"/>
+            <a:off x="1626910" y="3311040"/>
             <a:ext cx="270504" cy="175523"/>
           </a:xfrm>
           <a:prstGeom prst="triangle">
@@ -3808,6 +3787,7 @@
         <p:nvCxnSpPr>
           <p:cNvPr id="58" name="Straight Arrow Connector 57"/>
           <p:cNvCxnSpPr>
+            <a:cxnSpLocks/>
             <a:stCxn id="42" idx="3"/>
             <a:endCxn id="2" idx="1"/>
           </p:cNvCxnSpPr>
@@ -3815,7 +3795,7 @@
         </p:nvCxnSpPr>
         <p:spPr>
           <a:xfrm>
-            <a:off x="2656370" y="3326536"/>
+            <a:off x="2656370" y="3825696"/>
             <a:ext cx="220810" cy="5284"/>
           </a:xfrm>
           <a:prstGeom prst="straightConnector1">
@@ -3853,7 +3833,7 @@
         </p:nvCxnSpPr>
         <p:spPr>
           <a:xfrm>
-            <a:off x="910091" y="3040053"/>
+            <a:off x="910091" y="3398802"/>
             <a:ext cx="419548" cy="2860"/>
           </a:xfrm>
           <a:prstGeom prst="bentConnector3">
@@ -3898,7 +3878,7 @@
         </p:nvCxnSpPr>
         <p:spPr>
           <a:xfrm flipV="1">
-            <a:off x="1849924" y="3040052"/>
+            <a:off x="1849924" y="3398801"/>
             <a:ext cx="216105" cy="1"/>
           </a:xfrm>
           <a:prstGeom prst="line">
@@ -3937,7 +3917,7 @@
         </p:nvSpPr>
         <p:spPr>
           <a:xfrm>
-            <a:off x="2420322" y="3239846"/>
+            <a:off x="2420322" y="3739006"/>
             <a:ext cx="236048" cy="173380"/>
           </a:xfrm>
           <a:prstGeom prst="flowChartDecision">
@@ -3982,7 +3962,7 @@
         </p:nvSpPr>
         <p:spPr>
           <a:xfrm>
-            <a:off x="2879490" y="2627420"/>
+            <a:off x="2879490" y="3283134"/>
             <a:ext cx="1093635" cy="346760"/>
           </a:xfrm>
           <a:prstGeom prst="rect">
@@ -4015,12 +3995,12 @@
           <a:p>
             <a:pPr algn="ctr"/>
             <a:r>
-              <a:rPr lang="en-US" sz="1050" dirty="0" err="1" smtClean="0">
+              <a:rPr lang="en-US" sz="1050" dirty="0">
                 <a:solidFill>
                   <a:srgbClr val="7030A0"/>
                 </a:solidFill>
               </a:rPr>
-              <a:t>AddressBook</a:t>
+              <a:t>Catalogue</a:t>
             </a:r>
             <a:endParaRPr lang="en-SG" sz="1050" dirty="0">
               <a:solidFill>
@@ -4034,6 +4014,7 @@
         <p:nvCxnSpPr>
           <p:cNvPr id="47" name="Straight Arrow Connector 46"/>
           <p:cNvCxnSpPr>
+            <a:cxnSpLocks/>
             <a:stCxn id="48" idx="3"/>
             <a:endCxn id="46" idx="1"/>
           </p:cNvCxnSpPr>
@@ -4041,7 +4022,7 @@
         </p:nvCxnSpPr>
         <p:spPr>
           <a:xfrm>
-            <a:off x="2658680" y="2795516"/>
+            <a:off x="2658680" y="3451230"/>
             <a:ext cx="220810" cy="5284"/>
           </a:xfrm>
           <a:prstGeom prst="straightConnector1">
@@ -4079,7 +4060,7 @@
         </p:nvSpPr>
         <p:spPr>
           <a:xfrm>
-            <a:off x="2422632" y="2708826"/>
+            <a:off x="2422632" y="3364540"/>
             <a:ext cx="236048" cy="173380"/>
           </a:xfrm>
           <a:prstGeom prst="flowChartDecision">
@@ -4124,7 +4105,7 @@
         </p:nvSpPr>
         <p:spPr>
           <a:xfrm>
-            <a:off x="4487017" y="2847371"/>
+            <a:off x="4487017" y="3503085"/>
             <a:ext cx="1156969" cy="346760"/>
           </a:xfrm>
           <a:prstGeom prst="rect">
@@ -4157,12 +4138,12 @@
           <a:p>
             <a:pPr algn="ctr"/>
             <a:r>
-              <a:rPr lang="en-US" sz="1050" dirty="0" err="1" smtClean="0">
+              <a:rPr lang="en-US" sz="1050" dirty="0" err="1">
                 <a:solidFill>
                   <a:srgbClr val="7030A0"/>
                 </a:solidFill>
               </a:rPr>
-              <a:t>UniquePersonList</a:t>
+              <a:t>UniqueBookList</a:t>
             </a:r>
             <a:endParaRPr lang="en-SG" sz="1050" dirty="0">
               <a:solidFill>
@@ -4180,7 +4161,7 @@
         </p:nvSpPr>
         <p:spPr>
           <a:xfrm>
-            <a:off x="3984303" y="2673991"/>
+            <a:off x="3984303" y="3329705"/>
             <a:ext cx="236048" cy="173380"/>
           </a:xfrm>
           <a:prstGeom prst="flowChartDecision">
@@ -4230,7 +4211,7 @@
         </p:nvCxnSpPr>
         <p:spPr>
           <a:xfrm>
-            <a:off x="4220351" y="2760681"/>
+            <a:off x="4220351" y="3416395"/>
             <a:ext cx="266666" cy="260070"/>
           </a:xfrm>
           <a:prstGeom prst="bentConnector3">
@@ -4268,7 +4249,7 @@
         </p:nvSpPr>
         <p:spPr>
           <a:xfrm>
-            <a:off x="4477328" y="2280569"/>
+            <a:off x="4477328" y="2936283"/>
             <a:ext cx="1156969" cy="346760"/>
           </a:xfrm>
           <a:prstGeom prst="rect">
@@ -4301,7 +4282,7 @@
           <a:p>
             <a:pPr algn="ctr"/>
             <a:r>
-              <a:rPr lang="en-US" sz="1050" dirty="0" err="1" smtClean="0">
+              <a:rPr lang="en-US" sz="1050" dirty="0" err="1">
                 <a:solidFill>
                   <a:srgbClr val="7030A0"/>
                 </a:solidFill>
@@ -4327,7 +4308,7 @@
         </p:nvCxnSpPr>
         <p:spPr>
           <a:xfrm flipV="1">
-            <a:off x="4220351" y="2453949"/>
+            <a:off x="4220351" y="3109663"/>
             <a:ext cx="256977" cy="306732"/>
           </a:xfrm>
           <a:prstGeom prst="bentConnector3">
@@ -4367,7 +4348,7 @@
         </p:nvSpPr>
         <p:spPr>
           <a:xfrm>
-            <a:off x="6313677" y="2858066"/>
+            <a:off x="6313677" y="3513780"/>
             <a:ext cx="708186" cy="346760"/>
           </a:xfrm>
           <a:prstGeom prst="rect">
@@ -4400,12 +4381,12 @@
           <a:p>
             <a:pPr algn="ctr"/>
             <a:r>
-              <a:rPr lang="en-US" sz="1050" dirty="0" smtClean="0">
+              <a:rPr lang="en-US" sz="1050" dirty="0">
                 <a:solidFill>
                   <a:srgbClr val="7030A0"/>
                 </a:solidFill>
               </a:rPr>
-              <a:t>Person</a:t>
+              <a:t>Book</a:t>
             </a:r>
             <a:endParaRPr lang="en-SG" sz="1050" dirty="0">
               <a:solidFill>
@@ -4423,7 +4404,7 @@
         </p:nvSpPr>
         <p:spPr>
           <a:xfrm>
-            <a:off x="5643227" y="2943979"/>
+            <a:off x="5643227" y="3599693"/>
             <a:ext cx="236048" cy="173380"/>
           </a:xfrm>
           <a:prstGeom prst="flowChartDecision">
@@ -4471,7 +4452,7 @@
         </p:nvCxnSpPr>
         <p:spPr>
           <a:xfrm>
-            <a:off x="5879275" y="3030669"/>
+            <a:off x="5879275" y="3686383"/>
             <a:ext cx="434402" cy="777"/>
           </a:xfrm>
           <a:prstGeom prst="bentConnector3">
@@ -4509,7 +4490,7 @@
         </p:nvSpPr>
         <p:spPr>
           <a:xfrm>
-            <a:off x="5336105" y="1809332"/>
+            <a:off x="5336105" y="2465046"/>
             <a:ext cx="483700" cy="346760"/>
           </a:xfrm>
           <a:prstGeom prst="rect">
@@ -4542,7 +4523,7 @@
           <a:p>
             <a:pPr algn="ctr"/>
             <a:r>
-              <a:rPr lang="en-US" sz="1050" dirty="0" smtClean="0">
+              <a:rPr lang="en-US" sz="1050" dirty="0">
                 <a:solidFill>
                   <a:srgbClr val="7030A0"/>
                 </a:solidFill>
@@ -4565,7 +4546,7 @@
         </p:nvSpPr>
         <p:spPr>
           <a:xfrm rot="16200000">
-            <a:off x="4921666" y="2066540"/>
+            <a:off x="4921666" y="2722254"/>
             <a:ext cx="236048" cy="173380"/>
           </a:xfrm>
           <a:prstGeom prst="flowChartDecision">
@@ -4606,6 +4587,7 @@
         <p:nvCxnSpPr>
           <p:cNvPr id="69" name="Elbow Connector 68"/>
           <p:cNvCxnSpPr>
+            <a:cxnSpLocks/>
             <a:stCxn id="68" idx="3"/>
             <a:endCxn id="67" idx="1"/>
           </p:cNvCxnSpPr>
@@ -4613,7 +4595,7 @@
         </p:nvCxnSpPr>
         <p:spPr>
           <a:xfrm rot="5400000" flipH="1" flipV="1">
-            <a:off x="5161650" y="1860752"/>
+            <a:off x="5161650" y="2516466"/>
             <a:ext cx="52494" cy="296415"/>
           </a:xfrm>
           <a:prstGeom prst="bentConnector2">
@@ -4651,8 +4633,8 @@
         </p:nvSpPr>
         <p:spPr>
           <a:xfrm>
-            <a:off x="7712397" y="2564238"/>
-            <a:ext cx="708186" cy="285783"/>
+            <a:off x="7605443" y="2895600"/>
+            <a:ext cx="776557" cy="306915"/>
           </a:xfrm>
           <a:prstGeom prst="rect">
             <a:avLst/>
@@ -4684,12 +4666,12 @@
           <a:p>
             <a:pPr algn="ctr"/>
             <a:r>
-              <a:rPr lang="en-US" sz="1050" dirty="0" smtClean="0">
+              <a:rPr lang="en-US" sz="1050" dirty="0">
                 <a:solidFill>
                   <a:srgbClr val="7030A0"/>
                 </a:solidFill>
               </a:rPr>
-              <a:t>Name</a:t>
+              <a:t>Title</a:t>
             </a:r>
             <a:endParaRPr lang="en-SG" sz="1050" dirty="0">
               <a:solidFill>
@@ -4707,7 +4689,7 @@
         </p:nvSpPr>
         <p:spPr>
           <a:xfrm>
-            <a:off x="7041947" y="2948201"/>
+            <a:off x="7041947" y="3603915"/>
             <a:ext cx="236048" cy="173380"/>
           </a:xfrm>
           <a:prstGeom prst="flowChartDecision">
@@ -4750,6 +4732,7 @@
         <p:nvCxnSpPr>
           <p:cNvPr id="79" name="Elbow Connector 78"/>
           <p:cNvCxnSpPr>
+            <a:cxnSpLocks/>
             <a:stCxn id="78" idx="3"/>
             <a:endCxn id="76" idx="1"/>
           </p:cNvCxnSpPr>
@@ -4757,8 +4740,8 @@
         </p:nvCxnSpPr>
         <p:spPr>
           <a:xfrm flipV="1">
-            <a:off x="7277995" y="2707130"/>
-            <a:ext cx="434402" cy="327761"/>
+            <a:off x="7277995" y="3049058"/>
+            <a:ext cx="327448" cy="641547"/>
           </a:xfrm>
           <a:prstGeom prst="bentConnector3">
             <a:avLst/>
@@ -4795,8 +4778,8 @@
         </p:nvSpPr>
         <p:spPr>
           <a:xfrm>
-            <a:off x="7712397" y="2887216"/>
-            <a:ext cx="708186" cy="285783"/>
+            <a:off x="7605443" y="3218578"/>
+            <a:ext cx="776557" cy="306915"/>
           </a:xfrm>
           <a:prstGeom prst="rect">
             <a:avLst/>
@@ -4828,12 +4811,12 @@
           <a:p>
             <a:pPr algn="ctr"/>
             <a:r>
-              <a:rPr lang="en-US" sz="1050" dirty="0" smtClean="0">
+              <a:rPr lang="en-US" sz="1050" dirty="0">
                 <a:solidFill>
                   <a:srgbClr val="7030A0"/>
                 </a:solidFill>
               </a:rPr>
-              <a:t>Phone</a:t>
+              <a:t>Author</a:t>
             </a:r>
             <a:endParaRPr lang="en-SG" sz="1050" dirty="0">
               <a:solidFill>
@@ -4847,6 +4830,7 @@
         <p:nvCxnSpPr>
           <p:cNvPr id="81" name="Elbow Connector 80"/>
           <p:cNvCxnSpPr>
+            <a:cxnSpLocks/>
             <a:stCxn id="78" idx="3"/>
             <a:endCxn id="80" idx="1"/>
           </p:cNvCxnSpPr>
@@ -4854,8 +4838,8 @@
         </p:nvCxnSpPr>
         <p:spPr>
           <a:xfrm flipV="1">
-            <a:off x="7277995" y="3030108"/>
-            <a:ext cx="434402" cy="4783"/>
+            <a:off x="7277995" y="3372036"/>
+            <a:ext cx="327448" cy="318569"/>
           </a:xfrm>
           <a:prstGeom prst="bentConnector3">
             <a:avLst/>
@@ -4892,8 +4876,8 @@
         </p:nvSpPr>
         <p:spPr>
           <a:xfrm>
-            <a:off x="7712397" y="3210194"/>
-            <a:ext cx="708186" cy="285783"/>
+            <a:off x="7605443" y="3541556"/>
+            <a:ext cx="776557" cy="306915"/>
           </a:xfrm>
           <a:prstGeom prst="rect">
             <a:avLst/>
@@ -4925,12 +4909,12 @@
           <a:p>
             <a:pPr algn="ctr"/>
             <a:r>
-              <a:rPr lang="en-US" sz="1050" dirty="0" smtClean="0">
+              <a:rPr lang="en-US" sz="1050" dirty="0">
                 <a:solidFill>
                   <a:srgbClr val="7030A0"/>
                 </a:solidFill>
               </a:rPr>
-              <a:t>Email</a:t>
+              <a:t>Availability</a:t>
             </a:r>
             <a:endParaRPr lang="en-SG" sz="1050" dirty="0">
               <a:solidFill>
@@ -4944,6 +4928,7 @@
         <p:nvCxnSpPr>
           <p:cNvPr id="84" name="Elbow Connector 83"/>
           <p:cNvCxnSpPr>
+            <a:cxnSpLocks/>
             <a:stCxn id="78" idx="3"/>
             <a:endCxn id="83" idx="1"/>
           </p:cNvCxnSpPr>
@@ -4951,8 +4936,8 @@
         </p:nvCxnSpPr>
         <p:spPr>
           <a:xfrm>
-            <a:off x="7277995" y="3034891"/>
-            <a:ext cx="434402" cy="318195"/>
+            <a:off x="7277995" y="3690605"/>
+            <a:ext cx="327448" cy="4409"/>
           </a:xfrm>
           <a:prstGeom prst="bentConnector3">
             <a:avLst/>
@@ -4989,8 +4974,8 @@
         </p:nvSpPr>
         <p:spPr>
           <a:xfrm>
-            <a:off x="7712397" y="3533171"/>
-            <a:ext cx="708186" cy="285783"/>
+            <a:off x="7605443" y="3864533"/>
+            <a:ext cx="776557" cy="306915"/>
           </a:xfrm>
           <a:prstGeom prst="rect">
             <a:avLst/>
@@ -5022,18 +5007,13 @@
           <a:p>
             <a:pPr algn="ctr"/>
             <a:r>
-              <a:rPr lang="en-US" sz="1050" dirty="0" smtClean="0">
+              <a:rPr lang="en-US" sz="1050" dirty="0">
                 <a:solidFill>
                   <a:srgbClr val="7030A0"/>
                 </a:solidFill>
               </a:rPr>
-              <a:t>Address</a:t>
-            </a:r>
-            <a:endParaRPr lang="en-SG" sz="1050" dirty="0">
-              <a:solidFill>
-                <a:srgbClr val="7030A0"/>
-              </a:solidFill>
-            </a:endParaRPr>
+              <a:t>ISBN</a:t>
+            </a:r>
           </a:p>
         </p:txBody>
       </p:sp>
@@ -5041,6 +5021,7 @@
         <p:nvCxnSpPr>
           <p:cNvPr id="86" name="Elbow Connector 85"/>
           <p:cNvCxnSpPr>
+            <a:cxnSpLocks/>
             <a:stCxn id="78" idx="3"/>
             <a:endCxn id="85" idx="1"/>
           </p:cNvCxnSpPr>
@@ -5048,8 +5029,8 @@
         </p:nvCxnSpPr>
         <p:spPr>
           <a:xfrm>
-            <a:off x="7277995" y="3034891"/>
-            <a:ext cx="434402" cy="641172"/>
+            <a:off x="7277995" y="3690605"/>
+            <a:ext cx="327448" cy="327386"/>
           </a:xfrm>
           <a:prstGeom prst="bentConnector3">
             <a:avLst/>
@@ -5088,7 +5069,7 @@
         </p:nvCxnSpPr>
         <p:spPr>
           <a:xfrm rot="16200000" flipH="1">
-            <a:off x="3279321" y="2485431"/>
+            <a:off x="3279321" y="3141145"/>
             <a:ext cx="293825" cy="1"/>
           </a:xfrm>
           <a:prstGeom prst="bentConnector3">
@@ -5129,7 +5110,7 @@
         </p:nvSpPr>
         <p:spPr>
           <a:xfrm rot="10800000" flipV="1">
-            <a:off x="3290981" y="2162997"/>
+            <a:off x="3290981" y="2818711"/>
             <a:ext cx="270504" cy="175523"/>
           </a:xfrm>
           <a:prstGeom prst="triangle">
@@ -5177,8 +5158,8 @@
         </p:nvSpPr>
         <p:spPr>
           <a:xfrm>
-            <a:off x="2660303" y="1806470"/>
-            <a:ext cx="1539926" cy="346760"/>
+            <a:off x="2828583" y="2442685"/>
+            <a:ext cx="1290115" cy="346760"/>
           </a:xfrm>
           <a:prstGeom prst="rect">
             <a:avLst/>
@@ -5210,7 +5191,7 @@
           <a:p>
             <a:pPr algn="ctr"/>
             <a:r>
-              <a:rPr lang="en-US" sz="1050" dirty="0" smtClean="0">
+              <a:rPr lang="en-US" sz="1050" dirty="0">
                 <a:solidFill>
                   <a:srgbClr val="7030A0"/>
                 </a:solidFill>
@@ -5218,19 +5199,19 @@
               <a:t>&lt;&lt;interface&gt;&gt;</a:t>
             </a:r>
             <a:br>
-              <a:rPr lang="en-US" sz="1050" dirty="0" smtClean="0">
+              <a:rPr lang="en-US" sz="1050" dirty="0">
                 <a:solidFill>
                   <a:srgbClr val="7030A0"/>
                 </a:solidFill>
               </a:rPr>
             </a:br>
             <a:r>
-              <a:rPr lang="en-US" sz="1050" dirty="0" err="1" smtClean="0">
+              <a:rPr lang="en-US" sz="1050" dirty="0" err="1">
                 <a:solidFill>
                   <a:srgbClr val="7030A0"/>
                 </a:solidFill>
               </a:rPr>
-              <a:t>ReadOnlyAddressBook</a:t>
+              <a:t>ReadOnlyCatalogue</a:t>
             </a:r>
             <a:endParaRPr lang="en-SG" sz="1050" dirty="0">
               <a:solidFill>
@@ -5248,7 +5229,7 @@
         </p:nvSpPr>
         <p:spPr>
           <a:xfrm rot="16200000">
-            <a:off x="6527512" y="3586305"/>
+            <a:off x="6431301" y="4152676"/>
             <a:ext cx="881018" cy="261610"/>
           </a:xfrm>
           <a:prstGeom prst="rect">
@@ -5264,7 +5245,7 @@
           <a:p>
             <a:pPr algn="r"/>
             <a:r>
-              <a:rPr lang="en-US" sz="1100" dirty="0" smtClean="0">
+              <a:rPr lang="en-US" sz="1100" dirty="0">
                 <a:solidFill>
                   <a:srgbClr val="7030A0"/>
                 </a:solidFill>
@@ -5287,7 +5268,7 @@
         </p:nvSpPr>
         <p:spPr>
           <a:xfrm>
-            <a:off x="2057401" y="4239491"/>
+            <a:off x="2312227" y="1412038"/>
             <a:ext cx="1066800" cy="346760"/>
           </a:xfrm>
           <a:prstGeom prst="rect">
@@ -5320,30 +5301,22 @@
           <a:p>
             <a:pPr algn="ctr"/>
             <a:r>
-              <a:rPr lang="en-US" sz="1050" dirty="0" smtClean="0">
+              <a:rPr lang="en-US" sz="1050" dirty="0">
                 <a:solidFill>
                   <a:srgbClr val="7030A0"/>
                 </a:solidFill>
               </a:rPr>
               <a:t>&lt;&lt;interface&gt;&gt;</a:t>
             </a:r>
-            <a:r>
-              <a:rPr lang="en-US" sz="1050">
-                <a:solidFill>
-                  <a:srgbClr val="7030A0"/>
-                </a:solidFill>
-              </a:rPr>
-              <a:t/>
-            </a:r>
             <a:br>
-              <a:rPr lang="en-US" sz="1050">
+              <a:rPr lang="en-US" sz="1050" dirty="0">
                 <a:solidFill>
                   <a:srgbClr val="7030A0"/>
                 </a:solidFill>
               </a:rPr>
             </a:br>
             <a:r>
-              <a:rPr lang="en-US" sz="1050" dirty="0" err="1" smtClean="0">
+              <a:rPr lang="en-US" sz="1050" dirty="0" err="1">
                 <a:solidFill>
                   <a:srgbClr val="7030A0"/>
                 </a:solidFill>
@@ -5362,15 +5335,16 @@
         <p:nvCxnSpPr>
           <p:cNvPr id="124" name="Elbow Connector 122"/>
           <p:cNvCxnSpPr>
-            <a:stCxn id="119" idx="1"/>
+            <a:cxnSpLocks/>
+            <a:stCxn id="119" idx="3"/>
             <a:endCxn id="122" idx="1"/>
           </p:cNvCxnSpPr>
           <p:nvPr/>
         </p:nvCxnSpPr>
         <p:spPr>
-          <a:xfrm rot="16200000" flipH="1">
-            <a:off x="1364475" y="3719944"/>
-            <a:ext cx="831471" cy="554381"/>
+          <a:xfrm rot="5400000" flipH="1" flipV="1">
+            <a:off x="1277075" y="1811362"/>
+            <a:ext cx="1261096" cy="809208"/>
           </a:xfrm>
           <a:prstGeom prst="bentConnector2">
             <a:avLst/>
@@ -5411,7 +5385,7 @@
         </p:nvCxnSpPr>
         <p:spPr>
           <a:xfrm rot="16200000" flipV="1">
-            <a:off x="5948976" y="2139271"/>
+            <a:off x="5948976" y="2794985"/>
             <a:ext cx="404117" cy="1033473"/>
           </a:xfrm>
           <a:prstGeom prst="bentConnector2">
@@ -5449,7 +5423,7 @@
         </p:nvSpPr>
         <p:spPr>
           <a:xfrm>
-            <a:off x="4324972" y="2191228"/>
+            <a:off x="4324972" y="2846942"/>
             <a:ext cx="189257" cy="178683"/>
           </a:xfrm>
           <a:prstGeom prst="rect">
@@ -5465,7 +5439,7 @@
           <a:p>
             <a:pPr algn="ctr"/>
             <a:r>
-              <a:rPr lang="en-US" sz="1100" dirty="0" smtClean="0">
+              <a:rPr lang="en-US" sz="1100" dirty="0">
                 <a:solidFill>
                   <a:srgbClr val="7030A0"/>
                 </a:solidFill>
@@ -5488,7 +5462,7 @@
         </p:nvSpPr>
         <p:spPr>
           <a:xfrm>
-            <a:off x="4324972" y="3058864"/>
+            <a:off x="4324972" y="3714578"/>
             <a:ext cx="189257" cy="178683"/>
           </a:xfrm>
           <a:prstGeom prst="rect">
@@ -5504,7 +5478,7 @@
           <a:p>
             <a:pPr algn="ctr"/>
             <a:r>
-              <a:rPr lang="en-US" sz="1100" dirty="0" smtClean="0">
+              <a:rPr lang="en-US" sz="1100" dirty="0">
                 <a:solidFill>
                   <a:srgbClr val="7030A0"/>
                 </a:solidFill>
@@ -5527,7 +5501,7 @@
         </p:nvSpPr>
         <p:spPr>
           <a:xfrm>
-            <a:off x="5689761" y="2495413"/>
+            <a:off x="5689761" y="3151127"/>
             <a:ext cx="189257" cy="178683"/>
           </a:xfrm>
           <a:prstGeom prst="rect">
@@ -5543,7 +5517,7 @@
           <a:p>
             <a:pPr algn="ctr"/>
             <a:r>
-              <a:rPr lang="en-US" sz="1100" dirty="0" smtClean="0">
+              <a:rPr lang="en-US" sz="1100" dirty="0">
                 <a:solidFill>
                   <a:srgbClr val="7030A0"/>
                 </a:solidFill>
@@ -5566,7 +5540,7 @@
         </p:nvSpPr>
         <p:spPr>
           <a:xfrm>
-            <a:off x="5163172" y="1778919"/>
+            <a:off x="5163172" y="2434633"/>
             <a:ext cx="189257" cy="178683"/>
           </a:xfrm>
           <a:prstGeom prst="rect">
@@ -5582,7 +5556,7 @@
           <a:p>
             <a:pPr algn="ctr"/>
             <a:r>
-              <a:rPr lang="en-US" sz="1100" dirty="0" smtClean="0">
+              <a:rPr lang="en-US" sz="1100" dirty="0">
                 <a:solidFill>
                   <a:srgbClr val="7030A0"/>
                 </a:solidFill>
@@ -5605,7 +5579,7 @@
         </p:nvSpPr>
         <p:spPr>
           <a:xfrm>
-            <a:off x="6135256" y="3097917"/>
+            <a:off x="6135256" y="3753631"/>
             <a:ext cx="189257" cy="178683"/>
           </a:xfrm>
           <a:prstGeom prst="rect">
@@ -5621,7 +5595,7 @@
           <a:p>
             <a:pPr algn="ctr"/>
             <a:r>
-              <a:rPr lang="en-US" sz="1100" dirty="0" smtClean="0">
+              <a:rPr lang="en-US" sz="1100" dirty="0">
                 <a:solidFill>
                   <a:srgbClr val="7030A0"/>
                 </a:solidFill>
@@ -5644,7 +5618,7 @@
         </p:nvSpPr>
         <p:spPr>
           <a:xfrm>
-            <a:off x="2687923" y="2564238"/>
+            <a:off x="2687923" y="3219952"/>
             <a:ext cx="189257" cy="178683"/>
           </a:xfrm>
           <a:prstGeom prst="rect">
@@ -5660,7 +5634,7 @@
           <a:p>
             <a:pPr algn="ctr"/>
             <a:r>
-              <a:rPr lang="en-US" sz="1100" dirty="0" smtClean="0">
+              <a:rPr lang="en-US" sz="1100" dirty="0">
                 <a:solidFill>
                   <a:srgbClr val="7030A0"/>
                 </a:solidFill>
@@ -5683,7 +5657,7 @@
         </p:nvSpPr>
         <p:spPr>
           <a:xfrm>
-            <a:off x="2656370" y="3386050"/>
+            <a:off x="2656370" y="3885210"/>
             <a:ext cx="189257" cy="178683"/>
           </a:xfrm>
           <a:prstGeom prst="rect">
@@ -5699,7 +5673,7 @@
           <a:p>
             <a:pPr algn="ctr"/>
             <a:r>
-              <a:rPr lang="en-US" sz="1100" dirty="0" smtClean="0">
+              <a:rPr lang="en-US" sz="1100" dirty="0">
                 <a:solidFill>
                   <a:srgbClr val="7030A0"/>
                 </a:solidFill>
@@ -5722,7 +5696,7 @@
         </p:nvSpPr>
         <p:spPr>
           <a:xfrm>
-            <a:off x="6667770" y="3210194"/>
+            <a:off x="6667770" y="3865908"/>
             <a:ext cx="189257" cy="178683"/>
           </a:xfrm>
           <a:prstGeom prst="rect">
@@ -5738,7 +5712,7 @@
           <a:p>
             <a:pPr algn="ctr"/>
             <a:r>
-              <a:rPr lang="en-US" sz="1100" dirty="0" smtClean="0">
+              <a:rPr lang="en-US" sz="1100" dirty="0">
                 <a:solidFill>
                   <a:srgbClr val="7030A0"/>
                 </a:solidFill>
@@ -5750,6 +5724,1185 @@
                 <a:srgbClr val="7030A0"/>
               </a:solidFill>
             </a:endParaRPr>
+          </a:p>
+        </p:txBody>
+      </p:sp>
+      <p:sp>
+        <p:nvSpPr>
+          <p:cNvPr id="73" name="Rectangle 8">
+            <a:extLst>
+              <a:ext uri="{FF2B5EF4-FFF2-40B4-BE49-F238E27FC236}">
+                <a16:creationId xmlns:a16="http://schemas.microsoft.com/office/drawing/2014/main" id="{21094B5E-8071-4335-B2A2-C04660D761C1}"/>
+              </a:ext>
+            </a:extLst>
+          </p:cNvPr>
+          <p:cNvSpPr/>
+          <p:nvPr/>
+        </p:nvSpPr>
+        <p:spPr>
+          <a:xfrm>
+            <a:off x="2924331" y="1953021"/>
+            <a:ext cx="1230197" cy="346760"/>
+          </a:xfrm>
+          <a:prstGeom prst="rect">
+            <a:avLst/>
+          </a:prstGeom>
+          <a:ln w="19050">
+            <a:solidFill>
+              <a:srgbClr val="7030A0"/>
+            </a:solidFill>
+          </a:ln>
+          <a:effectLst/>
+        </p:spPr>
+        <p:style>
+          <a:lnRef idx="1">
+            <a:schemeClr val="accent4"/>
+          </a:lnRef>
+          <a:fillRef idx="2">
+            <a:schemeClr val="accent4"/>
+          </a:fillRef>
+          <a:effectRef idx="1">
+            <a:schemeClr val="accent4"/>
+          </a:effectRef>
+          <a:fontRef idx="minor">
+            <a:schemeClr val="dk1"/>
+          </a:fontRef>
+        </p:style>
+        <p:txBody>
+          <a:bodyPr rtlCol="0" anchor="ctr"/>
+          <a:lstStyle/>
+          <a:p>
+            <a:pPr algn="ctr"/>
+            <a:r>
+              <a:rPr lang="en-US" sz="1050" dirty="0" err="1">
+                <a:solidFill>
+                  <a:srgbClr val="7030A0"/>
+                </a:solidFill>
+              </a:rPr>
+              <a:t>UniqueAccountList</a:t>
+            </a:r>
+            <a:endParaRPr lang="en-SG" sz="1050" dirty="0">
+              <a:solidFill>
+                <a:srgbClr val="7030A0"/>
+              </a:solidFill>
+            </a:endParaRPr>
+          </a:p>
+        </p:txBody>
+      </p:sp>
+      <p:cxnSp>
+        <p:nvCxnSpPr>
+          <p:cNvPr id="74" name="Elbow Connector 29">
+            <a:extLst>
+              <a:ext uri="{FF2B5EF4-FFF2-40B4-BE49-F238E27FC236}">
+                <a16:creationId xmlns:a16="http://schemas.microsoft.com/office/drawing/2014/main" id="{474E258F-54E6-495C-8944-AD30FD553B6E}"/>
+              </a:ext>
+            </a:extLst>
+          </p:cNvPr>
+          <p:cNvCxnSpPr>
+            <a:cxnSpLocks/>
+            <a:stCxn id="131" idx="3"/>
+            <a:endCxn id="73" idx="1"/>
+          </p:cNvCxnSpPr>
+          <p:nvPr/>
+        </p:nvCxnSpPr>
+        <p:spPr>
+          <a:xfrm flipV="1">
+            <a:off x="2656096" y="2126401"/>
+            <a:ext cx="268235" cy="936383"/>
+          </a:xfrm>
+          <a:prstGeom prst="bentConnector3">
+            <a:avLst>
+              <a:gd name="adj1" fmla="val 27274"/>
+            </a:avLst>
+          </a:prstGeom>
+          <a:ln w="19050">
+            <a:solidFill>
+              <a:srgbClr val="7030A0"/>
+            </a:solidFill>
+            <a:headEnd type="none" w="med" len="med"/>
+            <a:tailEnd type="arrow" w="med" len="med"/>
+          </a:ln>
+          <a:effectLst/>
+        </p:spPr>
+        <p:style>
+          <a:lnRef idx="1">
+            <a:schemeClr val="accent2"/>
+          </a:lnRef>
+          <a:fillRef idx="2">
+            <a:schemeClr val="accent2"/>
+          </a:fillRef>
+          <a:effectRef idx="1">
+            <a:schemeClr val="accent2"/>
+          </a:effectRef>
+          <a:fontRef idx="minor">
+            <a:schemeClr val="dk1"/>
+          </a:fontRef>
+        </p:style>
+      </p:cxnSp>
+      <p:sp>
+        <p:nvSpPr>
+          <p:cNvPr id="77" name="TextBox 76">
+            <a:extLst>
+              <a:ext uri="{FF2B5EF4-FFF2-40B4-BE49-F238E27FC236}">
+                <a16:creationId xmlns:a16="http://schemas.microsoft.com/office/drawing/2014/main" id="{A02947EB-56A5-4D58-8E1A-D69C97BF6DD0}"/>
+              </a:ext>
+            </a:extLst>
+          </p:cNvPr>
+          <p:cNvSpPr txBox="1"/>
+          <p:nvPr/>
+        </p:nvSpPr>
+        <p:spPr>
+          <a:xfrm>
+            <a:off x="2774784" y="2199682"/>
+            <a:ext cx="189257" cy="178683"/>
+          </a:xfrm>
+          <a:prstGeom prst="rect">
+            <a:avLst/>
+          </a:prstGeom>
+          <a:noFill/>
+        </p:spPr>
+        <p:txBody>
+          <a:bodyPr wrap="square" lIns="0" tIns="0" rIns="0" bIns="0" rtlCol="0">
+            <a:noAutofit/>
+          </a:bodyPr>
+          <a:lstStyle/>
+          <a:p>
+            <a:pPr algn="ctr"/>
+            <a:r>
+              <a:rPr lang="en-US" sz="1100" dirty="0">
+                <a:solidFill>
+                  <a:srgbClr val="7030A0"/>
+                </a:solidFill>
+              </a:rPr>
+              <a:t>1</a:t>
+            </a:r>
+            <a:endParaRPr lang="en-SG" sz="1100" dirty="0">
+              <a:solidFill>
+                <a:srgbClr val="7030A0"/>
+              </a:solidFill>
+            </a:endParaRPr>
+          </a:p>
+        </p:txBody>
+      </p:sp>
+      <p:sp>
+        <p:nvSpPr>
+          <p:cNvPr id="82" name="Flowchart: Decision 96">
+            <a:extLst>
+              <a:ext uri="{FF2B5EF4-FFF2-40B4-BE49-F238E27FC236}">
+                <a16:creationId xmlns:a16="http://schemas.microsoft.com/office/drawing/2014/main" id="{0FD0F7D9-06A3-46E4-A638-23F170E5CABE}"/>
+              </a:ext>
+            </a:extLst>
+          </p:cNvPr>
+          <p:cNvSpPr/>
+          <p:nvPr/>
+        </p:nvSpPr>
+        <p:spPr>
+          <a:xfrm>
+            <a:off x="4180082" y="2039711"/>
+            <a:ext cx="236048" cy="173380"/>
+          </a:xfrm>
+          <a:prstGeom prst="flowChartDecision">
+            <a:avLst/>
+          </a:prstGeom>
+          <a:noFill/>
+          <a:ln w="19050">
+            <a:solidFill>
+              <a:srgbClr val="7030A0"/>
+            </a:solidFill>
+          </a:ln>
+          <a:effectLst/>
+        </p:spPr>
+        <p:style>
+          <a:lnRef idx="1">
+            <a:schemeClr val="accent6"/>
+          </a:lnRef>
+          <a:fillRef idx="2">
+            <a:schemeClr val="accent6"/>
+          </a:fillRef>
+          <a:effectRef idx="1">
+            <a:schemeClr val="accent6"/>
+          </a:effectRef>
+          <a:fontRef idx="minor">
+            <a:schemeClr val="dk1"/>
+          </a:fontRef>
+        </p:style>
+        <p:txBody>
+          <a:bodyPr rtlCol="0" anchor="ctr"/>
+          <a:lstStyle/>
+          <a:p>
+            <a:pPr algn="ctr"/>
+            <a:endParaRPr lang="en-US" sz="1050"/>
+          </a:p>
+        </p:txBody>
+      </p:sp>
+      <p:cxnSp>
+        <p:nvCxnSpPr>
+          <p:cNvPr id="87" name="Elbow Connector 63">
+            <a:extLst>
+              <a:ext uri="{FF2B5EF4-FFF2-40B4-BE49-F238E27FC236}">
+                <a16:creationId xmlns:a16="http://schemas.microsoft.com/office/drawing/2014/main" id="{5E3161EE-F0C7-4B5B-8535-CBC3AC64385C}"/>
+              </a:ext>
+            </a:extLst>
+          </p:cNvPr>
+          <p:cNvCxnSpPr>
+            <a:cxnSpLocks/>
+            <a:stCxn id="82" idx="3"/>
+            <a:endCxn id="88" idx="1"/>
+          </p:cNvCxnSpPr>
+          <p:nvPr/>
+        </p:nvCxnSpPr>
+        <p:spPr>
+          <a:xfrm flipV="1">
+            <a:off x="4416130" y="2124879"/>
+            <a:ext cx="239689" cy="1522"/>
+          </a:xfrm>
+          <a:prstGeom prst="bentConnector3">
+            <a:avLst/>
+          </a:prstGeom>
+          <a:ln w="19050">
+            <a:solidFill>
+              <a:srgbClr val="7030A0"/>
+            </a:solidFill>
+            <a:headEnd type="none" w="med" len="med"/>
+            <a:tailEnd type="arrow" w="med" len="med"/>
+          </a:ln>
+          <a:effectLst/>
+        </p:spPr>
+        <p:style>
+          <a:lnRef idx="1">
+            <a:schemeClr val="accent2"/>
+          </a:lnRef>
+          <a:fillRef idx="2">
+            <a:schemeClr val="accent2"/>
+          </a:fillRef>
+          <a:effectRef idx="1">
+            <a:schemeClr val="accent2"/>
+          </a:effectRef>
+          <a:fontRef idx="minor">
+            <a:schemeClr val="dk1"/>
+          </a:fontRef>
+        </p:style>
+      </p:cxnSp>
+      <p:sp>
+        <p:nvSpPr>
+          <p:cNvPr id="88" name="Rectangle 8">
+            <a:extLst>
+              <a:ext uri="{FF2B5EF4-FFF2-40B4-BE49-F238E27FC236}">
+                <a16:creationId xmlns:a16="http://schemas.microsoft.com/office/drawing/2014/main" id="{C51688FB-A5C4-43BC-95DA-E985BD87B4C0}"/>
+              </a:ext>
+            </a:extLst>
+          </p:cNvPr>
+          <p:cNvSpPr/>
+          <p:nvPr/>
+        </p:nvSpPr>
+        <p:spPr>
+          <a:xfrm>
+            <a:off x="4655819" y="1951499"/>
+            <a:ext cx="708186" cy="346760"/>
+          </a:xfrm>
+          <a:prstGeom prst="rect">
+            <a:avLst/>
+          </a:prstGeom>
+          <a:ln w="19050">
+            <a:solidFill>
+              <a:srgbClr val="7030A0"/>
+            </a:solidFill>
+          </a:ln>
+          <a:effectLst/>
+        </p:spPr>
+        <p:style>
+          <a:lnRef idx="1">
+            <a:schemeClr val="accent4"/>
+          </a:lnRef>
+          <a:fillRef idx="2">
+            <a:schemeClr val="accent4"/>
+          </a:fillRef>
+          <a:effectRef idx="1">
+            <a:schemeClr val="accent4"/>
+          </a:effectRef>
+          <a:fontRef idx="minor">
+            <a:schemeClr val="dk1"/>
+          </a:fontRef>
+        </p:style>
+        <p:txBody>
+          <a:bodyPr rtlCol="0" anchor="ctr"/>
+          <a:lstStyle/>
+          <a:p>
+            <a:pPr algn="ctr"/>
+            <a:r>
+              <a:rPr lang="en-US" sz="1050" dirty="0">
+                <a:solidFill>
+                  <a:srgbClr val="7030A0"/>
+                </a:solidFill>
+              </a:rPr>
+              <a:t>Account</a:t>
+            </a:r>
+            <a:endParaRPr lang="en-SG" sz="1050" dirty="0">
+              <a:solidFill>
+                <a:srgbClr val="7030A0"/>
+              </a:solidFill>
+            </a:endParaRPr>
+          </a:p>
+        </p:txBody>
+      </p:sp>
+      <p:sp>
+        <p:nvSpPr>
+          <p:cNvPr id="89" name="TextBox 88">
+            <a:extLst>
+              <a:ext uri="{FF2B5EF4-FFF2-40B4-BE49-F238E27FC236}">
+                <a16:creationId xmlns:a16="http://schemas.microsoft.com/office/drawing/2014/main" id="{DA933B4A-E840-47BE-AF77-58DE8CB9166C}"/>
+              </a:ext>
+            </a:extLst>
+          </p:cNvPr>
+          <p:cNvSpPr txBox="1"/>
+          <p:nvPr/>
+        </p:nvSpPr>
+        <p:spPr>
+          <a:xfrm>
+            <a:off x="4524585" y="2172265"/>
+            <a:ext cx="189257" cy="178683"/>
+          </a:xfrm>
+          <a:prstGeom prst="rect">
+            <a:avLst/>
+          </a:prstGeom>
+          <a:noFill/>
+        </p:spPr>
+        <p:txBody>
+          <a:bodyPr wrap="square" lIns="0" tIns="0" rIns="0" bIns="0" rtlCol="0">
+            <a:noAutofit/>
+          </a:bodyPr>
+          <a:lstStyle/>
+          <a:p>
+            <a:pPr algn="ctr"/>
+            <a:r>
+              <a:rPr lang="en-US" sz="1100" dirty="0">
+                <a:solidFill>
+                  <a:srgbClr val="7030A0"/>
+                </a:solidFill>
+              </a:rPr>
+              <a:t>*</a:t>
+            </a:r>
+            <a:endParaRPr lang="en-SG" sz="1100" dirty="0">
+              <a:solidFill>
+                <a:srgbClr val="7030A0"/>
+              </a:solidFill>
+            </a:endParaRPr>
+          </a:p>
+        </p:txBody>
+      </p:sp>
+      <p:sp>
+        <p:nvSpPr>
+          <p:cNvPr id="90" name="Rectangle 8">
+            <a:extLst>
+              <a:ext uri="{FF2B5EF4-FFF2-40B4-BE49-F238E27FC236}">
+                <a16:creationId xmlns:a16="http://schemas.microsoft.com/office/drawing/2014/main" id="{2818A21B-0D56-46CA-BEC1-8AE2E00BD7B7}"/>
+              </a:ext>
+            </a:extLst>
+          </p:cNvPr>
+          <p:cNvSpPr/>
+          <p:nvPr/>
+        </p:nvSpPr>
+        <p:spPr>
+          <a:xfrm>
+            <a:off x="6248400" y="1627565"/>
+            <a:ext cx="776557" cy="306915"/>
+          </a:xfrm>
+          <a:prstGeom prst="rect">
+            <a:avLst/>
+          </a:prstGeom>
+          <a:ln w="19050">
+            <a:solidFill>
+              <a:srgbClr val="7030A0"/>
+            </a:solidFill>
+          </a:ln>
+          <a:effectLst/>
+        </p:spPr>
+        <p:style>
+          <a:lnRef idx="1">
+            <a:schemeClr val="accent4"/>
+          </a:lnRef>
+          <a:fillRef idx="2">
+            <a:schemeClr val="accent4"/>
+          </a:fillRef>
+          <a:effectRef idx="1">
+            <a:schemeClr val="accent4"/>
+          </a:effectRef>
+          <a:fontRef idx="minor">
+            <a:schemeClr val="dk1"/>
+          </a:fontRef>
+        </p:style>
+        <p:txBody>
+          <a:bodyPr rtlCol="0" anchor="ctr"/>
+          <a:lstStyle/>
+          <a:p>
+            <a:pPr algn="ctr"/>
+            <a:r>
+              <a:rPr lang="en-US" sz="1050" dirty="0">
+                <a:solidFill>
+                  <a:srgbClr val="7030A0"/>
+                </a:solidFill>
+              </a:rPr>
+              <a:t>Credential</a:t>
+            </a:r>
+            <a:endParaRPr lang="en-SG" sz="1050" dirty="0">
+              <a:solidFill>
+                <a:srgbClr val="7030A0"/>
+              </a:solidFill>
+            </a:endParaRPr>
+          </a:p>
+        </p:txBody>
+      </p:sp>
+      <p:sp>
+        <p:nvSpPr>
+          <p:cNvPr id="91" name="Flowchart: Decision 96">
+            <a:extLst>
+              <a:ext uri="{FF2B5EF4-FFF2-40B4-BE49-F238E27FC236}">
+                <a16:creationId xmlns:a16="http://schemas.microsoft.com/office/drawing/2014/main" id="{FF4C95DB-A28F-492C-8960-245BB1AC5846}"/>
+              </a:ext>
+            </a:extLst>
+          </p:cNvPr>
+          <p:cNvSpPr/>
+          <p:nvPr/>
+        </p:nvSpPr>
+        <p:spPr>
+          <a:xfrm>
+            <a:off x="5364845" y="2048490"/>
+            <a:ext cx="236048" cy="173380"/>
+          </a:xfrm>
+          <a:prstGeom prst="flowChartDecision">
+            <a:avLst/>
+          </a:prstGeom>
+          <a:solidFill>
+            <a:srgbClr val="7030A0"/>
+          </a:solidFill>
+          <a:ln w="19050">
+            <a:solidFill>
+              <a:srgbClr val="7030A0"/>
+            </a:solidFill>
+          </a:ln>
+          <a:effectLst/>
+        </p:spPr>
+        <p:style>
+          <a:lnRef idx="1">
+            <a:schemeClr val="accent6"/>
+          </a:lnRef>
+          <a:fillRef idx="2">
+            <a:schemeClr val="accent6"/>
+          </a:fillRef>
+          <a:effectRef idx="1">
+            <a:schemeClr val="accent6"/>
+          </a:effectRef>
+          <a:fontRef idx="minor">
+            <a:schemeClr val="dk1"/>
+          </a:fontRef>
+        </p:style>
+        <p:txBody>
+          <a:bodyPr rtlCol="0" anchor="ctr"/>
+          <a:lstStyle/>
+          <a:p>
+            <a:pPr algn="ctr"/>
+            <a:endParaRPr lang="en-US" sz="1050"/>
+          </a:p>
+        </p:txBody>
+      </p:sp>
+      <p:cxnSp>
+        <p:nvCxnSpPr>
+          <p:cNvPr id="92" name="Elbow Connector 78">
+            <a:extLst>
+              <a:ext uri="{FF2B5EF4-FFF2-40B4-BE49-F238E27FC236}">
+                <a16:creationId xmlns:a16="http://schemas.microsoft.com/office/drawing/2014/main" id="{0B67C235-3F86-40A0-A806-E07F728D6839}"/>
+              </a:ext>
+            </a:extLst>
+          </p:cNvPr>
+          <p:cNvCxnSpPr>
+            <a:cxnSpLocks/>
+            <a:stCxn id="91" idx="3"/>
+            <a:endCxn id="90" idx="1"/>
+          </p:cNvCxnSpPr>
+          <p:nvPr/>
+        </p:nvCxnSpPr>
+        <p:spPr>
+          <a:xfrm flipV="1">
+            <a:off x="5600893" y="1781023"/>
+            <a:ext cx="647507" cy="354157"/>
+          </a:xfrm>
+          <a:prstGeom prst="bentConnector3">
+            <a:avLst/>
+          </a:prstGeom>
+          <a:ln w="19050">
+            <a:solidFill>
+              <a:srgbClr val="7030A0"/>
+            </a:solidFill>
+            <a:headEnd type="none" w="med" len="med"/>
+            <a:tailEnd type="arrow" w="med" len="med"/>
+          </a:ln>
+          <a:effectLst/>
+        </p:spPr>
+        <p:style>
+          <a:lnRef idx="1">
+            <a:schemeClr val="accent2"/>
+          </a:lnRef>
+          <a:fillRef idx="2">
+            <a:schemeClr val="accent2"/>
+          </a:fillRef>
+          <a:effectRef idx="1">
+            <a:schemeClr val="accent2"/>
+          </a:effectRef>
+          <a:fontRef idx="minor">
+            <a:schemeClr val="dk1"/>
+          </a:fontRef>
+        </p:style>
+      </p:cxnSp>
+      <p:sp>
+        <p:nvSpPr>
+          <p:cNvPr id="93" name="Rectangle 8">
+            <a:extLst>
+              <a:ext uri="{FF2B5EF4-FFF2-40B4-BE49-F238E27FC236}">
+                <a16:creationId xmlns:a16="http://schemas.microsoft.com/office/drawing/2014/main" id="{C5780B2D-2AB0-43B1-B9D5-A9CA1192F142}"/>
+              </a:ext>
+            </a:extLst>
+          </p:cNvPr>
+          <p:cNvSpPr/>
+          <p:nvPr/>
+        </p:nvSpPr>
+        <p:spPr>
+          <a:xfrm>
+            <a:off x="6248401" y="1942730"/>
+            <a:ext cx="776557" cy="306915"/>
+          </a:xfrm>
+          <a:prstGeom prst="rect">
+            <a:avLst/>
+          </a:prstGeom>
+          <a:ln w="19050">
+            <a:solidFill>
+              <a:srgbClr val="7030A0"/>
+            </a:solidFill>
+          </a:ln>
+          <a:effectLst/>
+        </p:spPr>
+        <p:style>
+          <a:lnRef idx="1">
+            <a:schemeClr val="accent4"/>
+          </a:lnRef>
+          <a:fillRef idx="2">
+            <a:schemeClr val="accent4"/>
+          </a:fillRef>
+          <a:effectRef idx="1">
+            <a:schemeClr val="accent4"/>
+          </a:effectRef>
+          <a:fontRef idx="minor">
+            <a:schemeClr val="dk1"/>
+          </a:fontRef>
+        </p:style>
+        <p:txBody>
+          <a:bodyPr rtlCol="0" anchor="ctr"/>
+          <a:lstStyle/>
+          <a:p>
+            <a:pPr algn="ctr"/>
+            <a:r>
+              <a:rPr lang="en-US" sz="1050" dirty="0">
+                <a:solidFill>
+                  <a:srgbClr val="7030A0"/>
+                </a:solidFill>
+              </a:rPr>
+              <a:t>Name</a:t>
+            </a:r>
+            <a:endParaRPr lang="en-SG" sz="1050" dirty="0">
+              <a:solidFill>
+                <a:srgbClr val="7030A0"/>
+              </a:solidFill>
+            </a:endParaRPr>
+          </a:p>
+        </p:txBody>
+      </p:sp>
+      <p:cxnSp>
+        <p:nvCxnSpPr>
+          <p:cNvPr id="94" name="Elbow Connector 80">
+            <a:extLst>
+              <a:ext uri="{FF2B5EF4-FFF2-40B4-BE49-F238E27FC236}">
+                <a16:creationId xmlns:a16="http://schemas.microsoft.com/office/drawing/2014/main" id="{D59C1872-2F7C-4254-9451-4D5CD5B89F2E}"/>
+              </a:ext>
+            </a:extLst>
+          </p:cNvPr>
+          <p:cNvCxnSpPr>
+            <a:cxnSpLocks/>
+            <a:stCxn id="91" idx="3"/>
+            <a:endCxn id="93" idx="1"/>
+          </p:cNvCxnSpPr>
+          <p:nvPr/>
+        </p:nvCxnSpPr>
+        <p:spPr>
+          <a:xfrm flipV="1">
+            <a:off x="5600893" y="2096188"/>
+            <a:ext cx="647508" cy="38992"/>
+          </a:xfrm>
+          <a:prstGeom prst="bentConnector3">
+            <a:avLst/>
+          </a:prstGeom>
+          <a:ln w="19050">
+            <a:solidFill>
+              <a:srgbClr val="7030A0"/>
+            </a:solidFill>
+            <a:headEnd type="none" w="med" len="med"/>
+            <a:tailEnd type="arrow" w="med" len="med"/>
+          </a:ln>
+          <a:effectLst/>
+        </p:spPr>
+        <p:style>
+          <a:lnRef idx="1">
+            <a:schemeClr val="accent2"/>
+          </a:lnRef>
+          <a:fillRef idx="2">
+            <a:schemeClr val="accent2"/>
+          </a:fillRef>
+          <a:effectRef idx="1">
+            <a:schemeClr val="accent2"/>
+          </a:effectRef>
+          <a:fontRef idx="minor">
+            <a:schemeClr val="dk1"/>
+          </a:fontRef>
+        </p:style>
+      </p:cxnSp>
+      <p:sp>
+        <p:nvSpPr>
+          <p:cNvPr id="95" name="Rectangle 8">
+            <a:extLst>
+              <a:ext uri="{FF2B5EF4-FFF2-40B4-BE49-F238E27FC236}">
+                <a16:creationId xmlns:a16="http://schemas.microsoft.com/office/drawing/2014/main" id="{948E9861-F8F8-4612-A31D-824A9BE11475}"/>
+              </a:ext>
+            </a:extLst>
+          </p:cNvPr>
+          <p:cNvSpPr/>
+          <p:nvPr/>
+        </p:nvSpPr>
+        <p:spPr>
+          <a:xfrm>
+            <a:off x="6248401" y="2265708"/>
+            <a:ext cx="776557" cy="306915"/>
+          </a:xfrm>
+          <a:prstGeom prst="rect">
+            <a:avLst/>
+          </a:prstGeom>
+          <a:ln w="19050">
+            <a:solidFill>
+              <a:srgbClr val="7030A0"/>
+            </a:solidFill>
+          </a:ln>
+          <a:effectLst/>
+        </p:spPr>
+        <p:style>
+          <a:lnRef idx="1">
+            <a:schemeClr val="accent4"/>
+          </a:lnRef>
+          <a:fillRef idx="2">
+            <a:schemeClr val="accent4"/>
+          </a:fillRef>
+          <a:effectRef idx="1">
+            <a:schemeClr val="accent4"/>
+          </a:effectRef>
+          <a:fontRef idx="minor">
+            <a:schemeClr val="dk1"/>
+          </a:fontRef>
+        </p:style>
+        <p:txBody>
+          <a:bodyPr rtlCol="0" anchor="ctr"/>
+          <a:lstStyle/>
+          <a:p>
+            <a:pPr algn="ctr"/>
+            <a:r>
+              <a:rPr lang="en-US" sz="1050" dirty="0">
+                <a:solidFill>
+                  <a:srgbClr val="7030A0"/>
+                </a:solidFill>
+              </a:rPr>
+              <a:t>Matric Number</a:t>
+            </a:r>
+            <a:endParaRPr lang="en-SG" sz="1050" dirty="0">
+              <a:solidFill>
+                <a:srgbClr val="7030A0"/>
+              </a:solidFill>
+            </a:endParaRPr>
+          </a:p>
+        </p:txBody>
+      </p:sp>
+      <p:cxnSp>
+        <p:nvCxnSpPr>
+          <p:cNvPr id="96" name="Elbow Connector 83">
+            <a:extLst>
+              <a:ext uri="{FF2B5EF4-FFF2-40B4-BE49-F238E27FC236}">
+                <a16:creationId xmlns:a16="http://schemas.microsoft.com/office/drawing/2014/main" id="{CDE43590-4824-4101-85AF-C014A5C5A1D8}"/>
+              </a:ext>
+            </a:extLst>
+          </p:cNvPr>
+          <p:cNvCxnSpPr>
+            <a:cxnSpLocks/>
+            <a:stCxn id="91" idx="3"/>
+            <a:endCxn id="95" idx="1"/>
+          </p:cNvCxnSpPr>
+          <p:nvPr/>
+        </p:nvCxnSpPr>
+        <p:spPr>
+          <a:xfrm>
+            <a:off x="5600893" y="2135180"/>
+            <a:ext cx="647508" cy="283986"/>
+          </a:xfrm>
+          <a:prstGeom prst="bentConnector3">
+            <a:avLst/>
+          </a:prstGeom>
+          <a:ln w="19050">
+            <a:solidFill>
+              <a:srgbClr val="7030A0"/>
+            </a:solidFill>
+            <a:headEnd type="none" w="med" len="med"/>
+            <a:tailEnd type="arrow" w="med" len="med"/>
+          </a:ln>
+          <a:effectLst/>
+        </p:spPr>
+        <p:style>
+          <a:lnRef idx="1">
+            <a:schemeClr val="accent2"/>
+          </a:lnRef>
+          <a:fillRef idx="2">
+            <a:schemeClr val="accent2"/>
+          </a:fillRef>
+          <a:effectRef idx="1">
+            <a:schemeClr val="accent2"/>
+          </a:effectRef>
+          <a:fontRef idx="minor">
+            <a:schemeClr val="dk1"/>
+          </a:fontRef>
+        </p:style>
+      </p:cxnSp>
+      <p:sp>
+        <p:nvSpPr>
+          <p:cNvPr id="98" name="Rectangle 8">
+            <a:extLst>
+              <a:ext uri="{FF2B5EF4-FFF2-40B4-BE49-F238E27FC236}">
+                <a16:creationId xmlns:a16="http://schemas.microsoft.com/office/drawing/2014/main" id="{0D3C30C4-435A-447A-B9C3-7E7F1E42B05D}"/>
+              </a:ext>
+            </a:extLst>
+          </p:cNvPr>
+          <p:cNvSpPr/>
+          <p:nvPr/>
+        </p:nvSpPr>
+        <p:spPr>
+          <a:xfrm>
+            <a:off x="6248401" y="2588685"/>
+            <a:ext cx="776557" cy="306915"/>
+          </a:xfrm>
+          <a:prstGeom prst="rect">
+            <a:avLst/>
+          </a:prstGeom>
+          <a:ln w="19050">
+            <a:solidFill>
+              <a:srgbClr val="7030A0"/>
+            </a:solidFill>
+          </a:ln>
+          <a:effectLst/>
+        </p:spPr>
+        <p:style>
+          <a:lnRef idx="1">
+            <a:schemeClr val="accent4"/>
+          </a:lnRef>
+          <a:fillRef idx="2">
+            <a:schemeClr val="accent4"/>
+          </a:fillRef>
+          <a:effectRef idx="1">
+            <a:schemeClr val="accent4"/>
+          </a:effectRef>
+          <a:fontRef idx="minor">
+            <a:schemeClr val="dk1"/>
+          </a:fontRef>
+        </p:style>
+        <p:txBody>
+          <a:bodyPr rtlCol="0" anchor="ctr"/>
+          <a:lstStyle/>
+          <a:p>
+            <a:pPr algn="ctr"/>
+            <a:r>
+              <a:rPr lang="en-US" sz="1050" dirty="0">
+                <a:solidFill>
+                  <a:srgbClr val="7030A0"/>
+                </a:solidFill>
+              </a:rPr>
+              <a:t>Privilege Level</a:t>
+            </a:r>
+          </a:p>
+        </p:txBody>
+      </p:sp>
+      <p:cxnSp>
+        <p:nvCxnSpPr>
+          <p:cNvPr id="101" name="Elbow Connector 85">
+            <a:extLst>
+              <a:ext uri="{FF2B5EF4-FFF2-40B4-BE49-F238E27FC236}">
+                <a16:creationId xmlns:a16="http://schemas.microsoft.com/office/drawing/2014/main" id="{704F0E22-E4AE-48E0-985D-F88BA9E97A9D}"/>
+              </a:ext>
+            </a:extLst>
+          </p:cNvPr>
+          <p:cNvCxnSpPr>
+            <a:cxnSpLocks/>
+            <a:stCxn id="91" idx="3"/>
+            <a:endCxn id="98" idx="1"/>
+          </p:cNvCxnSpPr>
+          <p:nvPr/>
+        </p:nvCxnSpPr>
+        <p:spPr>
+          <a:xfrm>
+            <a:off x="5600893" y="2135180"/>
+            <a:ext cx="647508" cy="606963"/>
+          </a:xfrm>
+          <a:prstGeom prst="bentConnector3">
+            <a:avLst/>
+          </a:prstGeom>
+          <a:ln w="19050">
+            <a:solidFill>
+              <a:srgbClr val="7030A0"/>
+            </a:solidFill>
+            <a:headEnd type="none" w="med" len="med"/>
+            <a:tailEnd type="arrow" w="med" len="med"/>
+          </a:ln>
+          <a:effectLst/>
+        </p:spPr>
+        <p:style>
+          <a:lnRef idx="1">
+            <a:schemeClr val="accent2"/>
+          </a:lnRef>
+          <a:fillRef idx="2">
+            <a:schemeClr val="accent2"/>
+          </a:fillRef>
+          <a:effectRef idx="1">
+            <a:schemeClr val="accent2"/>
+          </a:effectRef>
+          <a:fontRef idx="minor">
+            <a:schemeClr val="dk1"/>
+          </a:fontRef>
+        </p:style>
+      </p:cxnSp>
+      <p:sp>
+        <p:nvSpPr>
+          <p:cNvPr id="102" name="Rectangle 8">
+            <a:extLst>
+              <a:ext uri="{FF2B5EF4-FFF2-40B4-BE49-F238E27FC236}">
+                <a16:creationId xmlns:a16="http://schemas.microsoft.com/office/drawing/2014/main" id="{BBF9B27E-29BD-4825-89A4-15A0EB16D001}"/>
+              </a:ext>
+            </a:extLst>
+          </p:cNvPr>
+          <p:cNvSpPr/>
+          <p:nvPr/>
+        </p:nvSpPr>
+        <p:spPr>
+          <a:xfrm>
+            <a:off x="7620685" y="1781022"/>
+            <a:ext cx="776557" cy="306915"/>
+          </a:xfrm>
+          <a:prstGeom prst="rect">
+            <a:avLst/>
+          </a:prstGeom>
+          <a:ln w="19050">
+            <a:solidFill>
+              <a:srgbClr val="7030A0"/>
+            </a:solidFill>
+          </a:ln>
+          <a:effectLst/>
+        </p:spPr>
+        <p:style>
+          <a:lnRef idx="1">
+            <a:schemeClr val="accent4"/>
+          </a:lnRef>
+          <a:fillRef idx="2">
+            <a:schemeClr val="accent4"/>
+          </a:fillRef>
+          <a:effectRef idx="1">
+            <a:schemeClr val="accent4"/>
+          </a:effectRef>
+          <a:fontRef idx="minor">
+            <a:schemeClr val="dk1"/>
+          </a:fontRef>
+        </p:style>
+        <p:txBody>
+          <a:bodyPr rtlCol="0" anchor="ctr"/>
+          <a:lstStyle/>
+          <a:p>
+            <a:pPr algn="ctr"/>
+            <a:r>
+              <a:rPr lang="en-US" sz="1050" dirty="0">
+                <a:solidFill>
+                  <a:srgbClr val="7030A0"/>
+                </a:solidFill>
+              </a:rPr>
+              <a:t>Password</a:t>
+            </a:r>
+            <a:endParaRPr lang="en-SG" sz="1050" dirty="0">
+              <a:solidFill>
+                <a:srgbClr val="7030A0"/>
+              </a:solidFill>
+            </a:endParaRPr>
+          </a:p>
+        </p:txBody>
+      </p:sp>
+      <p:sp>
+        <p:nvSpPr>
+          <p:cNvPr id="103" name="Flowchart: Decision 96">
+            <a:extLst>
+              <a:ext uri="{FF2B5EF4-FFF2-40B4-BE49-F238E27FC236}">
+                <a16:creationId xmlns:a16="http://schemas.microsoft.com/office/drawing/2014/main" id="{D33C7115-015D-4B8B-82B5-0BECA0085C6D}"/>
+              </a:ext>
+            </a:extLst>
+          </p:cNvPr>
+          <p:cNvSpPr/>
+          <p:nvPr/>
+        </p:nvSpPr>
+        <p:spPr>
+          <a:xfrm>
+            <a:off x="7033022" y="1692174"/>
+            <a:ext cx="236048" cy="173380"/>
+          </a:xfrm>
+          <a:prstGeom prst="flowChartDecision">
+            <a:avLst/>
+          </a:prstGeom>
+          <a:solidFill>
+            <a:srgbClr val="7030A0"/>
+          </a:solidFill>
+          <a:ln w="19050">
+            <a:solidFill>
+              <a:srgbClr val="7030A0"/>
+            </a:solidFill>
+          </a:ln>
+          <a:effectLst/>
+        </p:spPr>
+        <p:style>
+          <a:lnRef idx="1">
+            <a:schemeClr val="accent6"/>
+          </a:lnRef>
+          <a:fillRef idx="2">
+            <a:schemeClr val="accent6"/>
+          </a:fillRef>
+          <a:effectRef idx="1">
+            <a:schemeClr val="accent6"/>
+          </a:effectRef>
+          <a:fontRef idx="minor">
+            <a:schemeClr val="dk1"/>
+          </a:fontRef>
+        </p:style>
+        <p:txBody>
+          <a:bodyPr rtlCol="0" anchor="ctr"/>
+          <a:lstStyle/>
+          <a:p>
+            <a:pPr algn="ctr"/>
+            <a:endParaRPr lang="en-US" sz="1050"/>
+          </a:p>
+        </p:txBody>
+      </p:sp>
+      <p:cxnSp>
+        <p:nvCxnSpPr>
+          <p:cNvPr id="104" name="Elbow Connector 78">
+            <a:extLst>
+              <a:ext uri="{FF2B5EF4-FFF2-40B4-BE49-F238E27FC236}">
+                <a16:creationId xmlns:a16="http://schemas.microsoft.com/office/drawing/2014/main" id="{4F528271-D99E-4841-8688-8256353D0ACA}"/>
+              </a:ext>
+            </a:extLst>
+          </p:cNvPr>
+          <p:cNvCxnSpPr>
+            <a:cxnSpLocks/>
+            <a:stCxn id="103" idx="3"/>
+            <a:endCxn id="102" idx="1"/>
+          </p:cNvCxnSpPr>
+          <p:nvPr/>
+        </p:nvCxnSpPr>
+        <p:spPr>
+          <a:xfrm>
+            <a:off x="7269070" y="1778864"/>
+            <a:ext cx="351615" cy="155616"/>
+          </a:xfrm>
+          <a:prstGeom prst="bentConnector3">
+            <a:avLst>
+              <a:gd name="adj1" fmla="val 50000"/>
+            </a:avLst>
+          </a:prstGeom>
+          <a:ln w="19050">
+            <a:solidFill>
+              <a:srgbClr val="7030A0"/>
+            </a:solidFill>
+            <a:headEnd type="none" w="med" len="med"/>
+            <a:tailEnd type="arrow" w="med" len="med"/>
+          </a:ln>
+          <a:effectLst/>
+        </p:spPr>
+        <p:style>
+          <a:lnRef idx="1">
+            <a:schemeClr val="accent2"/>
+          </a:lnRef>
+          <a:fillRef idx="2">
+            <a:schemeClr val="accent2"/>
+          </a:fillRef>
+          <a:effectRef idx="1">
+            <a:schemeClr val="accent2"/>
+          </a:effectRef>
+          <a:fontRef idx="minor">
+            <a:schemeClr val="dk1"/>
+          </a:fontRef>
+        </p:style>
+      </p:cxnSp>
+      <p:sp>
+        <p:nvSpPr>
+          <p:cNvPr id="105" name="Rectangle 8">
+            <a:extLst>
+              <a:ext uri="{FF2B5EF4-FFF2-40B4-BE49-F238E27FC236}">
+                <a16:creationId xmlns:a16="http://schemas.microsoft.com/office/drawing/2014/main" id="{CDDCAEA4-3265-42AE-BC25-8820762872DF}"/>
+              </a:ext>
+            </a:extLst>
+          </p:cNvPr>
+          <p:cNvSpPr/>
+          <p:nvPr/>
+        </p:nvSpPr>
+        <p:spPr>
+          <a:xfrm>
+            <a:off x="7620686" y="1465976"/>
+            <a:ext cx="776557" cy="306915"/>
+          </a:xfrm>
+          <a:prstGeom prst="rect">
+            <a:avLst/>
+          </a:prstGeom>
+          <a:ln w="19050">
+            <a:solidFill>
+              <a:srgbClr val="7030A0"/>
+            </a:solidFill>
+          </a:ln>
+          <a:effectLst/>
+        </p:spPr>
+        <p:style>
+          <a:lnRef idx="1">
+            <a:schemeClr val="accent4"/>
+          </a:lnRef>
+          <a:fillRef idx="2">
+            <a:schemeClr val="accent4"/>
+          </a:fillRef>
+          <a:effectRef idx="1">
+            <a:schemeClr val="accent4"/>
+          </a:effectRef>
+          <a:fontRef idx="minor">
+            <a:schemeClr val="dk1"/>
+          </a:fontRef>
+        </p:style>
+        <p:txBody>
+          <a:bodyPr rtlCol="0" anchor="ctr"/>
+          <a:lstStyle/>
+          <a:p>
+            <a:pPr algn="ctr"/>
+            <a:r>
+              <a:rPr lang="en-US" sz="1050" dirty="0">
+                <a:solidFill>
+                  <a:srgbClr val="7030A0"/>
+                </a:solidFill>
+              </a:rPr>
+              <a:t>Username</a:t>
+            </a:r>
+            <a:endParaRPr lang="en-SG" sz="1050" dirty="0">
+              <a:solidFill>
+                <a:srgbClr val="7030A0"/>
+              </a:solidFill>
+            </a:endParaRPr>
+          </a:p>
+        </p:txBody>
+      </p:sp>
+      <p:cxnSp>
+        <p:nvCxnSpPr>
+          <p:cNvPr id="106" name="Elbow Connector 80">
+            <a:extLst>
+              <a:ext uri="{FF2B5EF4-FFF2-40B4-BE49-F238E27FC236}">
+                <a16:creationId xmlns:a16="http://schemas.microsoft.com/office/drawing/2014/main" id="{80422802-34CE-403B-9677-B4F8FE542B0E}"/>
+              </a:ext>
+            </a:extLst>
+          </p:cNvPr>
+          <p:cNvCxnSpPr>
+            <a:cxnSpLocks/>
+            <a:stCxn id="103" idx="3"/>
+            <a:endCxn id="105" idx="1"/>
+          </p:cNvCxnSpPr>
+          <p:nvPr/>
+        </p:nvCxnSpPr>
+        <p:spPr>
+          <a:xfrm flipV="1">
+            <a:off x="7269070" y="1619434"/>
+            <a:ext cx="351616" cy="159430"/>
+          </a:xfrm>
+          <a:prstGeom prst="bentConnector3">
+            <a:avLst>
+              <a:gd name="adj1" fmla="val 50000"/>
+            </a:avLst>
+          </a:prstGeom>
+          <a:ln w="19050">
+            <a:solidFill>
+              <a:srgbClr val="7030A0"/>
+            </a:solidFill>
+            <a:headEnd type="none" w="med" len="med"/>
+            <a:tailEnd type="arrow" w="med" len="med"/>
+          </a:ln>
+          <a:effectLst/>
+        </p:spPr>
+        <p:style>
+          <a:lnRef idx="1">
+            <a:schemeClr val="accent2"/>
+          </a:lnRef>
+          <a:fillRef idx="2">
+            <a:schemeClr val="accent2"/>
+          </a:fillRef>
+          <a:effectRef idx="1">
+            <a:schemeClr val="accent2"/>
+          </a:effectRef>
+          <a:fontRef idx="minor">
+            <a:schemeClr val="dk1"/>
+          </a:fontRef>
+        </p:style>
+      </p:cxnSp>
+      <p:sp>
+        <p:nvSpPr>
+          <p:cNvPr id="131" name="Flowchart: Decision 96">
+            <a:extLst>
+              <a:ext uri="{FF2B5EF4-FFF2-40B4-BE49-F238E27FC236}">
+                <a16:creationId xmlns:a16="http://schemas.microsoft.com/office/drawing/2014/main" id="{0F8D98CC-BB0E-423A-B979-585AFD618D7D}"/>
+              </a:ext>
+            </a:extLst>
+          </p:cNvPr>
+          <p:cNvSpPr/>
+          <p:nvPr/>
+        </p:nvSpPr>
+        <p:spPr>
+          <a:xfrm>
+            <a:off x="2420048" y="2976094"/>
+            <a:ext cx="236048" cy="173380"/>
+          </a:xfrm>
+          <a:prstGeom prst="flowChartDecision">
+            <a:avLst/>
+          </a:prstGeom>
+          <a:noFill/>
+          <a:ln w="19050">
+            <a:solidFill>
+              <a:srgbClr val="7030A0"/>
+            </a:solidFill>
+          </a:ln>
+          <a:effectLst/>
+        </p:spPr>
+        <p:style>
+          <a:lnRef idx="1">
+            <a:schemeClr val="accent6"/>
+          </a:lnRef>
+          <a:fillRef idx="2">
+            <a:schemeClr val="accent6"/>
+          </a:fillRef>
+          <a:effectRef idx="1">
+            <a:schemeClr val="accent6"/>
+          </a:effectRef>
+          <a:fontRef idx="minor">
+            <a:schemeClr val="dk1"/>
+          </a:fontRef>
+        </p:style>
+        <p:txBody>
+          <a:bodyPr rtlCol="0" anchor="ctr"/>
+          <a:lstStyle/>
+          <a:p>
+            <a:pPr algn="ctr"/>
+            <a:endParaRPr lang="en-US" sz="1050"/>
           </a:p>
         </p:txBody>
       </p:sp>
@@ -5763,13 +6916,6 @@
   <p:clrMapOvr>
     <a:masterClrMapping/>
   </p:clrMapOvr>
-  <p:timing>
-    <p:tnLst>
-      <p:par>
-        <p:cTn id="1" dur="indefinite" restart="never" nodeType="tmRoot"/>
-      </p:par>
-    </p:tnLst>
-  </p:timing>
 </p:sld>
 </file>
 

</xml_diff>

<commit_message>
Updated the find command error.
Updated DG for ListAppointment and Delete.

Updated Glossary of terms.

Updated Major and Minor enhancements for myself.
</commit_message>
<xml_diff>
--- a/docs/diagrams/ModelComponentClassDiagram.pptx
+++ b/docs/diagrams/ModelComponentClassDiagram.pptx
@@ -208,7 +208,7 @@
           <a:p>
             <a:fld id="{F5CC4B3F-88C1-4FFA-B1B6-F41C21DC6924}" type="datetimeFigureOut">
               <a:rPr lang="en-US" smtClean="0"/>
-              <a:t>1/1/18</a:t>
+              <a:t>4/15/2018</a:t>
             </a:fld>
             <a:endParaRPr lang="en-US"/>
           </a:p>
@@ -272,38 +272,37 @@
           <a:p>
             <a:pPr lvl="0"/>
             <a:r>
-              <a:rPr lang="en-US" smtClean="0"/>
+              <a:rPr lang="en-US"/>
               <a:t>Click to edit Master text styles</a:t>
             </a:r>
           </a:p>
           <a:p>
             <a:pPr lvl="1"/>
             <a:r>
-              <a:rPr lang="en-US" smtClean="0"/>
+              <a:rPr lang="en-US"/>
               <a:t>Second level</a:t>
             </a:r>
           </a:p>
           <a:p>
             <a:pPr lvl="2"/>
             <a:r>
-              <a:rPr lang="en-US" smtClean="0"/>
+              <a:rPr lang="en-US"/>
               <a:t>Third level</a:t>
             </a:r>
           </a:p>
           <a:p>
             <a:pPr lvl="3"/>
             <a:r>
-              <a:rPr lang="en-US" smtClean="0"/>
+              <a:rPr lang="en-US"/>
               <a:t>Fourth level</a:t>
             </a:r>
           </a:p>
           <a:p>
             <a:pPr lvl="4"/>
             <a:r>
-              <a:rPr lang="en-US" smtClean="0"/>
+              <a:rPr lang="en-US"/>
               <a:t>Fifth level</a:t>
             </a:r>
-            <a:endParaRPr lang="en-US"/>
           </a:p>
         </p:txBody>
       </p:sp>
@@ -476,6 +475,90 @@
 </p:notesMaster>
 </file>
 
+<file path=ppt/notesSlides/notesSlide1.xml><?xml version="1.0" encoding="utf-8"?>
+<p:notes xmlns:a="http://schemas.openxmlformats.org/drawingml/2006/main" xmlns:r="http://schemas.openxmlformats.org/officeDocument/2006/relationships" xmlns:p="http://schemas.openxmlformats.org/presentationml/2006/main">
+  <p:cSld>
+    <p:spTree>
+      <p:nvGrpSpPr>
+        <p:cNvPr id="1" name=""/>
+        <p:cNvGrpSpPr/>
+        <p:nvPr/>
+      </p:nvGrpSpPr>
+      <p:grpSpPr>
+        <a:xfrm>
+          <a:off x="0" y="0"/>
+          <a:ext cx="0" cy="0"/>
+          <a:chOff x="0" y="0"/>
+          <a:chExt cx="0" cy="0"/>
+        </a:xfrm>
+      </p:grpSpPr>
+      <p:sp>
+        <p:nvSpPr>
+          <p:cNvPr id="2" name="Slide Image Placeholder 1"/>
+          <p:cNvSpPr>
+            <a:spLocks noGrp="1" noRot="1" noChangeAspect="1"/>
+          </p:cNvSpPr>
+          <p:nvPr>
+            <p:ph type="sldImg"/>
+          </p:nvPr>
+        </p:nvSpPr>
+        <p:spPr/>
+      </p:sp>
+      <p:sp>
+        <p:nvSpPr>
+          <p:cNvPr id="3" name="Notes Placeholder 2"/>
+          <p:cNvSpPr>
+            <a:spLocks noGrp="1"/>
+          </p:cNvSpPr>
+          <p:nvPr>
+            <p:ph type="body" idx="1"/>
+          </p:nvPr>
+        </p:nvSpPr>
+        <p:spPr/>
+        <p:txBody>
+          <a:bodyPr/>
+          <a:lstStyle/>
+          <a:p>
+            <a:endParaRPr lang="en-SG" dirty="0"/>
+          </a:p>
+        </p:txBody>
+      </p:sp>
+      <p:sp>
+        <p:nvSpPr>
+          <p:cNvPr id="4" name="Slide Number Placeholder 3"/>
+          <p:cNvSpPr>
+            <a:spLocks noGrp="1"/>
+          </p:cNvSpPr>
+          <p:nvPr>
+            <p:ph type="sldNum" sz="quarter" idx="10"/>
+          </p:nvPr>
+        </p:nvSpPr>
+        <p:spPr/>
+        <p:txBody>
+          <a:bodyPr/>
+          <a:lstStyle/>
+          <a:p>
+            <a:fld id="{5A7AB025-77E3-4BD1-A2FD-B3183DBA47A3}" type="slidenum">
+              <a:rPr lang="en-US" smtClean="0"/>
+              <a:t>1</a:t>
+            </a:fld>
+            <a:endParaRPr lang="en-US"/>
+          </a:p>
+        </p:txBody>
+      </p:sp>
+    </p:spTree>
+    <p:extLst>
+      <p:ext uri="{BB962C8B-B14F-4D97-AF65-F5344CB8AC3E}">
+        <p14:creationId xmlns:p14="http://schemas.microsoft.com/office/powerpoint/2010/main" val="388378361"/>
+      </p:ext>
+    </p:extLst>
+  </p:cSld>
+  <p:clrMapOvr>
+    <a:masterClrMapping/>
+  </p:clrMapOvr>
+</p:notes>
+</file>
+
 <file path=ppt/slideLayouts/slideLayout1.xml><?xml version="1.0" encoding="utf-8"?>
 <p:sldLayout xmlns:a="http://schemas.openxmlformats.org/drawingml/2006/main" xmlns:r="http://schemas.openxmlformats.org/officeDocument/2006/relationships" xmlns:p="http://schemas.openxmlformats.org/presentationml/2006/main" type="title" preserve="1">
   <p:cSld name="Title Slide">
@@ -514,10 +597,9 @@
           <a:lstStyle/>
           <a:p>
             <a:r>
-              <a:rPr lang="en-US" smtClean="0"/>
+              <a:rPr lang="en-US"/>
               <a:t>Click to edit Master title style</a:t>
             </a:r>
-            <a:endParaRPr lang="en-US"/>
           </a:p>
         </p:txBody>
       </p:sp>
@@ -633,10 +715,9 @@
           </a:lstStyle>
           <a:p>
             <a:r>
-              <a:rPr lang="en-US" smtClean="0"/>
+              <a:rPr lang="en-US"/>
               <a:t>Click to edit Master subtitle style</a:t>
             </a:r>
-            <a:endParaRPr lang="en-US"/>
           </a:p>
         </p:txBody>
       </p:sp>
@@ -657,7 +738,7 @@
           <a:p>
             <a:fld id="{78C97017-6FC3-485B-9764-EAC9E56C1D49}" type="datetimeFigureOut">
               <a:rPr lang="en-US" smtClean="0"/>
-              <a:t>1/1/18</a:t>
+              <a:t>4/15/2018</a:t>
             </a:fld>
             <a:endParaRPr lang="en-US"/>
           </a:p>
@@ -751,10 +832,9 @@
           <a:lstStyle/>
           <a:p>
             <a:r>
-              <a:rPr lang="en-US" smtClean="0"/>
+              <a:rPr lang="en-US"/>
               <a:t>Click to edit Master title style</a:t>
             </a:r>
-            <a:endParaRPr lang="en-US"/>
           </a:p>
         </p:txBody>
       </p:sp>
@@ -775,38 +855,37 @@
           <a:p>
             <a:pPr lvl="0"/>
             <a:r>
-              <a:rPr lang="en-US" smtClean="0"/>
+              <a:rPr lang="en-US"/>
               <a:t>Click to edit Master text styles</a:t>
             </a:r>
           </a:p>
           <a:p>
             <a:pPr lvl="1"/>
             <a:r>
-              <a:rPr lang="en-US" smtClean="0"/>
+              <a:rPr lang="en-US"/>
               <a:t>Second level</a:t>
             </a:r>
           </a:p>
           <a:p>
             <a:pPr lvl="2"/>
             <a:r>
-              <a:rPr lang="en-US" smtClean="0"/>
+              <a:rPr lang="en-US"/>
               <a:t>Third level</a:t>
             </a:r>
           </a:p>
           <a:p>
             <a:pPr lvl="3"/>
             <a:r>
-              <a:rPr lang="en-US" smtClean="0"/>
+              <a:rPr lang="en-US"/>
               <a:t>Fourth level</a:t>
             </a:r>
           </a:p>
           <a:p>
             <a:pPr lvl="4"/>
             <a:r>
-              <a:rPr lang="en-US" smtClean="0"/>
+              <a:rPr lang="en-US"/>
               <a:t>Fifth level</a:t>
             </a:r>
-            <a:endParaRPr lang="en-US"/>
           </a:p>
         </p:txBody>
       </p:sp>
@@ -827,7 +906,7 @@
           <a:p>
             <a:fld id="{78C97017-6FC3-485B-9764-EAC9E56C1D49}" type="datetimeFigureOut">
               <a:rPr lang="en-US" smtClean="0"/>
-              <a:t>1/1/18</a:t>
+              <a:t>4/15/2018</a:t>
             </a:fld>
             <a:endParaRPr lang="en-US"/>
           </a:p>
@@ -926,10 +1005,9 @@
           <a:lstStyle/>
           <a:p>
             <a:r>
-              <a:rPr lang="en-US" smtClean="0"/>
+              <a:rPr lang="en-US"/>
               <a:t>Click to edit Master title style</a:t>
             </a:r>
-            <a:endParaRPr lang="en-US"/>
           </a:p>
         </p:txBody>
       </p:sp>
@@ -955,38 +1033,37 @@
           <a:p>
             <a:pPr lvl="0"/>
             <a:r>
-              <a:rPr lang="en-US" smtClean="0"/>
+              <a:rPr lang="en-US"/>
               <a:t>Click to edit Master text styles</a:t>
             </a:r>
           </a:p>
           <a:p>
             <a:pPr lvl="1"/>
             <a:r>
-              <a:rPr lang="en-US" smtClean="0"/>
+              <a:rPr lang="en-US"/>
               <a:t>Second level</a:t>
             </a:r>
           </a:p>
           <a:p>
             <a:pPr lvl="2"/>
             <a:r>
-              <a:rPr lang="en-US" smtClean="0"/>
+              <a:rPr lang="en-US"/>
               <a:t>Third level</a:t>
             </a:r>
           </a:p>
           <a:p>
             <a:pPr lvl="3"/>
             <a:r>
-              <a:rPr lang="en-US" smtClean="0"/>
+              <a:rPr lang="en-US"/>
               <a:t>Fourth level</a:t>
             </a:r>
           </a:p>
           <a:p>
             <a:pPr lvl="4"/>
             <a:r>
-              <a:rPr lang="en-US" smtClean="0"/>
+              <a:rPr lang="en-US"/>
               <a:t>Fifth level</a:t>
             </a:r>
-            <a:endParaRPr lang="en-US"/>
           </a:p>
         </p:txBody>
       </p:sp>
@@ -1007,7 +1084,7 @@
           <a:p>
             <a:fld id="{78C97017-6FC3-485B-9764-EAC9E56C1D49}" type="datetimeFigureOut">
               <a:rPr lang="en-US" smtClean="0"/>
-              <a:t>1/1/18</a:t>
+              <a:t>4/15/2018</a:t>
             </a:fld>
             <a:endParaRPr lang="en-US"/>
           </a:p>
@@ -1101,10 +1178,9 @@
           <a:lstStyle/>
           <a:p>
             <a:r>
-              <a:rPr lang="en-US" smtClean="0"/>
+              <a:rPr lang="en-US"/>
               <a:t>Click to edit Master title style</a:t>
             </a:r>
-            <a:endParaRPr lang="en-US"/>
           </a:p>
         </p:txBody>
       </p:sp>
@@ -1125,38 +1201,37 @@
           <a:p>
             <a:pPr lvl="0"/>
             <a:r>
-              <a:rPr lang="en-US" smtClean="0"/>
+              <a:rPr lang="en-US"/>
               <a:t>Click to edit Master text styles</a:t>
             </a:r>
           </a:p>
           <a:p>
             <a:pPr lvl="1"/>
             <a:r>
-              <a:rPr lang="en-US" smtClean="0"/>
+              <a:rPr lang="en-US"/>
               <a:t>Second level</a:t>
             </a:r>
           </a:p>
           <a:p>
             <a:pPr lvl="2"/>
             <a:r>
-              <a:rPr lang="en-US" smtClean="0"/>
+              <a:rPr lang="en-US"/>
               <a:t>Third level</a:t>
             </a:r>
           </a:p>
           <a:p>
             <a:pPr lvl="3"/>
             <a:r>
-              <a:rPr lang="en-US" smtClean="0"/>
+              <a:rPr lang="en-US"/>
               <a:t>Fourth level</a:t>
             </a:r>
           </a:p>
           <a:p>
             <a:pPr lvl="4"/>
             <a:r>
-              <a:rPr lang="en-US" smtClean="0"/>
+              <a:rPr lang="en-US"/>
               <a:t>Fifth level</a:t>
             </a:r>
-            <a:endParaRPr lang="en-US"/>
           </a:p>
         </p:txBody>
       </p:sp>
@@ -1177,7 +1252,7 @@
           <a:p>
             <a:fld id="{78C97017-6FC3-485B-9764-EAC9E56C1D49}" type="datetimeFigureOut">
               <a:rPr lang="en-US" smtClean="0"/>
-              <a:t>1/1/18</a:t>
+              <a:t>4/15/2018</a:t>
             </a:fld>
             <a:endParaRPr lang="en-US"/>
           </a:p>
@@ -1280,10 +1355,9 @@
           </a:lstStyle>
           <a:p>
             <a:r>
-              <a:rPr lang="en-US" smtClean="0"/>
+              <a:rPr lang="en-US"/>
               <a:t>Click to edit Master title style</a:t>
             </a:r>
-            <a:endParaRPr lang="en-US"/>
           </a:p>
         </p:txBody>
       </p:sp>
@@ -1400,7 +1474,7 @@
           <a:p>
             <a:pPr lvl="0"/>
             <a:r>
-              <a:rPr lang="en-US" smtClean="0"/>
+              <a:rPr lang="en-US"/>
               <a:t>Click to edit Master text styles</a:t>
             </a:r>
           </a:p>
@@ -1423,7 +1497,7 @@
           <a:p>
             <a:fld id="{78C97017-6FC3-485B-9764-EAC9E56C1D49}" type="datetimeFigureOut">
               <a:rPr lang="en-US" smtClean="0"/>
-              <a:t>1/1/18</a:t>
+              <a:t>4/15/2018</a:t>
             </a:fld>
             <a:endParaRPr lang="en-US"/>
           </a:p>
@@ -1517,10 +1591,9 @@
           <a:lstStyle/>
           <a:p>
             <a:r>
-              <a:rPr lang="en-US" smtClean="0"/>
+              <a:rPr lang="en-US"/>
               <a:t>Click to edit Master title style</a:t>
             </a:r>
-            <a:endParaRPr lang="en-US"/>
           </a:p>
         </p:txBody>
       </p:sp>
@@ -1574,38 +1647,37 @@
           <a:p>
             <a:pPr lvl="0"/>
             <a:r>
-              <a:rPr lang="en-US" smtClean="0"/>
+              <a:rPr lang="en-US"/>
               <a:t>Click to edit Master text styles</a:t>
             </a:r>
           </a:p>
           <a:p>
             <a:pPr lvl="1"/>
             <a:r>
-              <a:rPr lang="en-US" smtClean="0"/>
+              <a:rPr lang="en-US"/>
               <a:t>Second level</a:t>
             </a:r>
           </a:p>
           <a:p>
             <a:pPr lvl="2"/>
             <a:r>
-              <a:rPr lang="en-US" smtClean="0"/>
+              <a:rPr lang="en-US"/>
               <a:t>Third level</a:t>
             </a:r>
           </a:p>
           <a:p>
             <a:pPr lvl="3"/>
             <a:r>
-              <a:rPr lang="en-US" smtClean="0"/>
+              <a:rPr lang="en-US"/>
               <a:t>Fourth level</a:t>
             </a:r>
           </a:p>
           <a:p>
             <a:pPr lvl="4"/>
             <a:r>
-              <a:rPr lang="en-US" smtClean="0"/>
+              <a:rPr lang="en-US"/>
               <a:t>Fifth level</a:t>
             </a:r>
-            <a:endParaRPr lang="en-US"/>
           </a:p>
         </p:txBody>
       </p:sp>
@@ -1659,38 +1731,37 @@
           <a:p>
             <a:pPr lvl="0"/>
             <a:r>
-              <a:rPr lang="en-US" smtClean="0"/>
+              <a:rPr lang="en-US"/>
               <a:t>Click to edit Master text styles</a:t>
             </a:r>
           </a:p>
           <a:p>
             <a:pPr lvl="1"/>
             <a:r>
-              <a:rPr lang="en-US" smtClean="0"/>
+              <a:rPr lang="en-US"/>
               <a:t>Second level</a:t>
             </a:r>
           </a:p>
           <a:p>
             <a:pPr lvl="2"/>
             <a:r>
-              <a:rPr lang="en-US" smtClean="0"/>
+              <a:rPr lang="en-US"/>
               <a:t>Third level</a:t>
             </a:r>
           </a:p>
           <a:p>
             <a:pPr lvl="3"/>
             <a:r>
-              <a:rPr lang="en-US" smtClean="0"/>
+              <a:rPr lang="en-US"/>
               <a:t>Fourth level</a:t>
             </a:r>
           </a:p>
           <a:p>
             <a:pPr lvl="4"/>
             <a:r>
-              <a:rPr lang="en-US" smtClean="0"/>
+              <a:rPr lang="en-US"/>
               <a:t>Fifth level</a:t>
             </a:r>
-            <a:endParaRPr lang="en-US"/>
           </a:p>
         </p:txBody>
       </p:sp>
@@ -1711,7 +1782,7 @@
           <a:p>
             <a:fld id="{78C97017-6FC3-485B-9764-EAC9E56C1D49}" type="datetimeFigureOut">
               <a:rPr lang="en-US" smtClean="0"/>
-              <a:t>1/1/18</a:t>
+              <a:t>4/15/2018</a:t>
             </a:fld>
             <a:endParaRPr lang="en-US"/>
           </a:p>
@@ -1809,10 +1880,9 @@
           </a:lstStyle>
           <a:p>
             <a:r>
-              <a:rPr lang="en-US" smtClean="0"/>
+              <a:rPr lang="en-US"/>
               <a:t>Click to edit Master title style</a:t>
             </a:r>
-            <a:endParaRPr lang="en-US"/>
           </a:p>
         </p:txBody>
       </p:sp>
@@ -1875,7 +1945,7 @@
           <a:p>
             <a:pPr lvl="0"/>
             <a:r>
-              <a:rPr lang="en-US" smtClean="0"/>
+              <a:rPr lang="en-US"/>
               <a:t>Click to edit Master text styles</a:t>
             </a:r>
           </a:p>
@@ -1931,38 +2001,37 @@
           <a:p>
             <a:pPr lvl="0"/>
             <a:r>
-              <a:rPr lang="en-US" smtClean="0"/>
+              <a:rPr lang="en-US"/>
               <a:t>Click to edit Master text styles</a:t>
             </a:r>
           </a:p>
           <a:p>
             <a:pPr lvl="1"/>
             <a:r>
-              <a:rPr lang="en-US" smtClean="0"/>
+              <a:rPr lang="en-US"/>
               <a:t>Second level</a:t>
             </a:r>
           </a:p>
           <a:p>
             <a:pPr lvl="2"/>
             <a:r>
-              <a:rPr lang="en-US" smtClean="0"/>
+              <a:rPr lang="en-US"/>
               <a:t>Third level</a:t>
             </a:r>
           </a:p>
           <a:p>
             <a:pPr lvl="3"/>
             <a:r>
-              <a:rPr lang="en-US" smtClean="0"/>
+              <a:rPr lang="en-US"/>
               <a:t>Fourth level</a:t>
             </a:r>
           </a:p>
           <a:p>
             <a:pPr lvl="4"/>
             <a:r>
-              <a:rPr lang="en-US" smtClean="0"/>
+              <a:rPr lang="en-US"/>
               <a:t>Fifth level</a:t>
             </a:r>
-            <a:endParaRPr lang="en-US"/>
           </a:p>
         </p:txBody>
       </p:sp>
@@ -2025,7 +2094,7 @@
           <a:p>
             <a:pPr lvl="0"/>
             <a:r>
-              <a:rPr lang="en-US" smtClean="0"/>
+              <a:rPr lang="en-US"/>
               <a:t>Click to edit Master text styles</a:t>
             </a:r>
           </a:p>
@@ -2081,38 +2150,37 @@
           <a:p>
             <a:pPr lvl="0"/>
             <a:r>
-              <a:rPr lang="en-US" smtClean="0"/>
+              <a:rPr lang="en-US"/>
               <a:t>Click to edit Master text styles</a:t>
             </a:r>
           </a:p>
           <a:p>
             <a:pPr lvl="1"/>
             <a:r>
-              <a:rPr lang="en-US" smtClean="0"/>
+              <a:rPr lang="en-US"/>
               <a:t>Second level</a:t>
             </a:r>
           </a:p>
           <a:p>
             <a:pPr lvl="2"/>
             <a:r>
-              <a:rPr lang="en-US" smtClean="0"/>
+              <a:rPr lang="en-US"/>
               <a:t>Third level</a:t>
             </a:r>
           </a:p>
           <a:p>
             <a:pPr lvl="3"/>
             <a:r>
-              <a:rPr lang="en-US" smtClean="0"/>
+              <a:rPr lang="en-US"/>
               <a:t>Fourth level</a:t>
             </a:r>
           </a:p>
           <a:p>
             <a:pPr lvl="4"/>
             <a:r>
-              <a:rPr lang="en-US" smtClean="0"/>
+              <a:rPr lang="en-US"/>
               <a:t>Fifth level</a:t>
             </a:r>
-            <a:endParaRPr lang="en-US"/>
           </a:p>
         </p:txBody>
       </p:sp>
@@ -2133,7 +2201,7 @@
           <a:p>
             <a:fld id="{78C97017-6FC3-485B-9764-EAC9E56C1D49}" type="datetimeFigureOut">
               <a:rPr lang="en-US" smtClean="0"/>
-              <a:t>1/1/18</a:t>
+              <a:t>4/15/2018</a:t>
             </a:fld>
             <a:endParaRPr lang="en-US"/>
           </a:p>
@@ -2227,10 +2295,9 @@
           <a:lstStyle/>
           <a:p>
             <a:r>
-              <a:rPr lang="en-US" smtClean="0"/>
+              <a:rPr lang="en-US"/>
               <a:t>Click to edit Master title style</a:t>
             </a:r>
-            <a:endParaRPr lang="en-US"/>
           </a:p>
         </p:txBody>
       </p:sp>
@@ -2251,7 +2318,7 @@
           <a:p>
             <a:fld id="{78C97017-6FC3-485B-9764-EAC9E56C1D49}" type="datetimeFigureOut">
               <a:rPr lang="en-US" smtClean="0"/>
-              <a:t>1/1/18</a:t>
+              <a:t>4/15/2018</a:t>
             </a:fld>
             <a:endParaRPr lang="en-US"/>
           </a:p>
@@ -2346,7 +2413,7 @@
           <a:p>
             <a:fld id="{78C97017-6FC3-485B-9764-EAC9E56C1D49}" type="datetimeFigureOut">
               <a:rPr lang="en-US" smtClean="0"/>
-              <a:t>1/1/18</a:t>
+              <a:t>4/15/2018</a:t>
             </a:fld>
             <a:endParaRPr lang="en-US"/>
           </a:p>
@@ -2449,10 +2516,9 @@
           </a:lstStyle>
           <a:p>
             <a:r>
-              <a:rPr lang="en-US" smtClean="0"/>
+              <a:rPr lang="en-US"/>
               <a:t>Click to edit Master title style</a:t>
             </a:r>
-            <a:endParaRPr lang="en-US"/>
           </a:p>
         </p:txBody>
       </p:sp>
@@ -2506,38 +2572,37 @@
           <a:p>
             <a:pPr lvl="0"/>
             <a:r>
-              <a:rPr lang="en-US" smtClean="0"/>
+              <a:rPr lang="en-US"/>
               <a:t>Click to edit Master text styles</a:t>
             </a:r>
           </a:p>
           <a:p>
             <a:pPr lvl="1"/>
             <a:r>
-              <a:rPr lang="en-US" smtClean="0"/>
+              <a:rPr lang="en-US"/>
               <a:t>Second level</a:t>
             </a:r>
           </a:p>
           <a:p>
             <a:pPr lvl="2"/>
             <a:r>
-              <a:rPr lang="en-US" smtClean="0"/>
+              <a:rPr lang="en-US"/>
               <a:t>Third level</a:t>
             </a:r>
           </a:p>
           <a:p>
             <a:pPr lvl="3"/>
             <a:r>
-              <a:rPr lang="en-US" smtClean="0"/>
+              <a:rPr lang="en-US"/>
               <a:t>Fourth level</a:t>
             </a:r>
           </a:p>
           <a:p>
             <a:pPr lvl="4"/>
             <a:r>
-              <a:rPr lang="en-US" smtClean="0"/>
+              <a:rPr lang="en-US"/>
               <a:t>Fifth level</a:t>
             </a:r>
-            <a:endParaRPr lang="en-US"/>
           </a:p>
         </p:txBody>
       </p:sp>
@@ -2600,7 +2665,7 @@
           <a:p>
             <a:pPr lvl="0"/>
             <a:r>
-              <a:rPr lang="en-US" smtClean="0"/>
+              <a:rPr lang="en-US"/>
               <a:t>Click to edit Master text styles</a:t>
             </a:r>
           </a:p>
@@ -2623,7 +2688,7 @@
           <a:p>
             <a:fld id="{78C97017-6FC3-485B-9764-EAC9E56C1D49}" type="datetimeFigureOut">
               <a:rPr lang="en-US" smtClean="0"/>
-              <a:t>1/1/18</a:t>
+              <a:t>4/15/2018</a:t>
             </a:fld>
             <a:endParaRPr lang="en-US"/>
           </a:p>
@@ -2726,10 +2791,9 @@
           </a:lstStyle>
           <a:p>
             <a:r>
-              <a:rPr lang="en-US" smtClean="0"/>
+              <a:rPr lang="en-US"/>
               <a:t>Click to edit Master title style</a:t>
             </a:r>
-            <a:endParaRPr lang="en-US"/>
           </a:p>
         </p:txBody>
       </p:sp>
@@ -2853,7 +2917,7 @@
           <a:p>
             <a:pPr lvl="0"/>
             <a:r>
-              <a:rPr lang="en-US" smtClean="0"/>
+              <a:rPr lang="en-US"/>
               <a:t>Click to edit Master text styles</a:t>
             </a:r>
           </a:p>
@@ -2876,7 +2940,7 @@
           <a:p>
             <a:fld id="{78C97017-6FC3-485B-9764-EAC9E56C1D49}" type="datetimeFigureOut">
               <a:rPr lang="en-US" smtClean="0"/>
-              <a:t>1/1/18</a:t>
+              <a:t>4/15/2018</a:t>
             </a:fld>
             <a:endParaRPr lang="en-US"/>
           </a:p>
@@ -2985,10 +3049,9 @@
           <a:lstStyle/>
           <a:p>
             <a:r>
-              <a:rPr lang="en-US" smtClean="0"/>
+              <a:rPr lang="en-US"/>
               <a:t>Click to edit Master title style</a:t>
             </a:r>
-            <a:endParaRPr lang="en-US"/>
           </a:p>
         </p:txBody>
       </p:sp>
@@ -3019,38 +3082,37 @@
           <a:p>
             <a:pPr lvl="0"/>
             <a:r>
-              <a:rPr lang="en-US" smtClean="0"/>
+              <a:rPr lang="en-US"/>
               <a:t>Click to edit Master text styles</a:t>
             </a:r>
           </a:p>
           <a:p>
             <a:pPr lvl="1"/>
             <a:r>
-              <a:rPr lang="en-US" smtClean="0"/>
+              <a:rPr lang="en-US"/>
               <a:t>Second level</a:t>
             </a:r>
           </a:p>
           <a:p>
             <a:pPr lvl="2"/>
             <a:r>
-              <a:rPr lang="en-US" smtClean="0"/>
+              <a:rPr lang="en-US"/>
               <a:t>Third level</a:t>
             </a:r>
           </a:p>
           <a:p>
             <a:pPr lvl="3"/>
             <a:r>
-              <a:rPr lang="en-US" smtClean="0"/>
+              <a:rPr lang="en-US"/>
               <a:t>Fourth level</a:t>
             </a:r>
           </a:p>
           <a:p>
             <a:pPr lvl="4"/>
             <a:r>
-              <a:rPr lang="en-US" smtClean="0"/>
+              <a:rPr lang="en-US"/>
               <a:t>Fifth level</a:t>
             </a:r>
-            <a:endParaRPr lang="en-US"/>
           </a:p>
         </p:txBody>
       </p:sp>
@@ -3089,7 +3151,7 @@
           <a:p>
             <a:fld id="{78C97017-6FC3-485B-9764-EAC9E56C1D49}" type="datetimeFigureOut">
               <a:rPr lang="en-US" smtClean="0"/>
-              <a:t>1/1/18</a:t>
+              <a:t>4/15/2018</a:t>
             </a:fld>
             <a:endParaRPr lang="en-US"/>
           </a:p>
@@ -3472,8 +3534,8 @@
         </p:nvSpPr>
         <p:spPr>
           <a:xfrm>
-            <a:off x="1119865" y="1727200"/>
-            <a:ext cx="7490735" cy="2997200"/>
+            <a:off x="609600" y="1404923"/>
+            <a:ext cx="8534400" cy="4452625"/>
           </a:xfrm>
           <a:prstGeom prst="roundRect">
             <a:avLst>
@@ -3510,7 +3572,7 @@
           <a:lstStyle/>
           <a:p>
             <a:r>
-              <a:rPr lang="en-US" sz="1200" b="1" dirty="0" smtClean="0">
+              <a:rPr lang="en-US" sz="1200" b="1" dirty="0">
                 <a:solidFill>
                   <a:srgbClr val="7030A0"/>
                 </a:solidFill>
@@ -3533,7 +3595,7 @@
         </p:nvSpPr>
         <p:spPr>
           <a:xfrm>
-            <a:off x="2877180" y="3158440"/>
+            <a:off x="2314926" y="4614648"/>
             <a:ext cx="1093635" cy="346760"/>
           </a:xfrm>
           <a:prstGeom prst="rect">
@@ -3569,7 +3631,7 @@
           <a:p>
             <a:pPr algn="ctr"/>
             <a:r>
-              <a:rPr lang="en-US" sz="1050" dirty="0" err="1" smtClean="0">
+              <a:rPr lang="en-US" sz="1050" dirty="0" err="1">
                 <a:solidFill>
                   <a:schemeClr val="bg1"/>
                 </a:solidFill>
@@ -3592,8 +3654,8 @@
         </p:nvSpPr>
         <p:spPr>
           <a:xfrm rot="16200000">
-            <a:off x="1683963" y="2868687"/>
-            <a:ext cx="1093635" cy="346760"/>
+            <a:off x="468506" y="3550744"/>
+            <a:ext cx="2457750" cy="346760"/>
           </a:xfrm>
           <a:prstGeom prst="rect">
             <a:avLst/>
@@ -3628,7 +3690,7 @@
           <a:p>
             <a:pPr algn="ctr"/>
             <a:r>
-              <a:rPr lang="en-US" sz="1050" dirty="0" err="1" smtClean="0">
+              <a:rPr lang="en-US" sz="1050" dirty="0" err="1">
                 <a:solidFill>
                   <a:schemeClr val="bg1"/>
                 </a:solidFill>
@@ -3643,50 +3705,6 @@
           </a:p>
         </p:txBody>
       </p:sp>
-      <p:cxnSp>
-        <p:nvCxnSpPr>
-          <p:cNvPr id="107" name="Elbow Connector 106"/>
-          <p:cNvCxnSpPr>
-            <a:stCxn id="9" idx="1"/>
-          </p:cNvCxnSpPr>
-          <p:nvPr/>
-        </p:nvCxnSpPr>
-        <p:spPr>
-          <a:xfrm rot="5400000" flipH="1" flipV="1">
-            <a:off x="4360065" y="1080909"/>
-            <a:ext cx="378691" cy="4637261"/>
-          </a:xfrm>
-          <a:prstGeom prst="bentConnector4">
-            <a:avLst>
-              <a:gd name="adj1" fmla="val -101829"/>
-              <a:gd name="adj2" fmla="val 99976"/>
-            </a:avLst>
-          </a:prstGeom>
-          <a:ln w="19050">
-            <a:solidFill>
-              <a:srgbClr val="7030A0"/>
-            </a:solidFill>
-            <a:prstDash val="solid"/>
-            <a:headEnd type="none" w="med" len="med"/>
-            <a:tailEnd type="arrow" w="med" len="med"/>
-          </a:ln>
-          <a:effectLst/>
-        </p:spPr>
-        <p:style>
-          <a:lnRef idx="1">
-            <a:schemeClr val="accent2"/>
-          </a:lnRef>
-          <a:fillRef idx="2">
-            <a:schemeClr val="accent2"/>
-          </a:fillRef>
-          <a:effectRef idx="1">
-            <a:schemeClr val="accent2"/>
-          </a:effectRef>
-          <a:fontRef idx="minor">
-            <a:schemeClr val="dk1"/>
-          </a:fontRef>
-        </p:style>
-      </p:cxnSp>
       <p:sp>
         <p:nvSpPr>
           <p:cNvPr id="119" name="Rectangle 62"/>
@@ -3695,7 +3713,7 @@
         </p:nvSpPr>
         <p:spPr>
           <a:xfrm rot="16200000">
-            <a:off x="956202" y="2861202"/>
+            <a:off x="422802" y="2861202"/>
             <a:ext cx="1093635" cy="346760"/>
           </a:xfrm>
           <a:prstGeom prst="rect">
@@ -3742,7 +3760,7 @@
           <a:p>
             <a:pPr algn="ctr"/>
             <a:r>
-              <a:rPr lang="en-US" sz="1050" dirty="0" smtClean="0">
+              <a:rPr lang="en-US" sz="1050" dirty="0">
                 <a:solidFill>
                   <a:schemeClr val="bg1"/>
                 </a:solidFill>
@@ -3765,7 +3783,7 @@
         </p:nvSpPr>
         <p:spPr>
           <a:xfrm rot="16200000">
-            <a:off x="1626910" y="2952291"/>
+            <a:off x="1093510" y="2952291"/>
             <a:ext cx="270504" cy="175523"/>
           </a:xfrm>
           <a:prstGeom prst="triangle">
@@ -3815,8 +3833,8 @@
         </p:nvCxnSpPr>
         <p:spPr>
           <a:xfrm>
-            <a:off x="2656370" y="3326536"/>
-            <a:ext cx="220810" cy="5284"/>
+            <a:off x="2113519" y="4781575"/>
+            <a:ext cx="201407" cy="6453"/>
           </a:xfrm>
           <a:prstGeom prst="straightConnector1">
             <a:avLst/>
@@ -3853,7 +3871,7 @@
         </p:nvCxnSpPr>
         <p:spPr>
           <a:xfrm>
-            <a:off x="910091" y="3040053"/>
+            <a:off x="376691" y="3040053"/>
             <a:ext cx="419548" cy="2860"/>
           </a:xfrm>
           <a:prstGeom prst="bentConnector3">
@@ -3898,7 +3916,7 @@
         </p:nvCxnSpPr>
         <p:spPr>
           <a:xfrm flipV="1">
-            <a:off x="1849924" y="3040052"/>
+            <a:off x="1316524" y="3040052"/>
             <a:ext cx="216105" cy="1"/>
           </a:xfrm>
           <a:prstGeom prst="line">
@@ -3937,7 +3955,7 @@
         </p:nvSpPr>
         <p:spPr>
           <a:xfrm>
-            <a:off x="2420322" y="3239846"/>
+            <a:off x="1877471" y="4694885"/>
             <a:ext cx="236048" cy="173380"/>
           </a:xfrm>
           <a:prstGeom prst="flowChartDecision">
@@ -3981,9 +3999,9 @@
           <p:nvPr/>
         </p:nvSpPr>
         <p:spPr>
-          <a:xfrm>
-            <a:off x="2879490" y="2627420"/>
-            <a:ext cx="1093635" cy="346760"/>
+          <a:xfrm rot="16200000">
+            <a:off x="1882142" y="3160650"/>
+            <a:ext cx="2021532" cy="343965"/>
           </a:xfrm>
           <a:prstGeom prst="rect">
             <a:avLst/>
@@ -4015,7 +4033,7 @@
           <a:p>
             <a:pPr algn="ctr"/>
             <a:r>
-              <a:rPr lang="en-US" sz="1050" dirty="0" err="1" smtClean="0">
+              <a:rPr lang="en-US" sz="1050" dirty="0" err="1">
                 <a:solidFill>
                   <a:srgbClr val="7030A0"/>
                 </a:solidFill>
@@ -4034,15 +4052,15 @@
         <p:nvCxnSpPr>
           <p:cNvPr id="47" name="Straight Arrow Connector 46"/>
           <p:cNvCxnSpPr>
+            <a:cxnSpLocks/>
             <a:stCxn id="48" idx="3"/>
-            <a:endCxn id="46" idx="1"/>
           </p:cNvCxnSpPr>
           <p:nvPr/>
         </p:nvCxnSpPr>
         <p:spPr>
           <a:xfrm>
-            <a:off x="2658680" y="2795516"/>
-            <a:ext cx="220810" cy="5284"/>
+            <a:off x="2125280" y="3189910"/>
+            <a:ext cx="595644" cy="4221"/>
           </a:xfrm>
           <a:prstGeom prst="straightConnector1">
             <a:avLst/>
@@ -4079,7 +4097,7 @@
         </p:nvSpPr>
         <p:spPr>
           <a:xfrm>
-            <a:off x="2422632" y="2708826"/>
+            <a:off x="1889232" y="3103220"/>
             <a:ext cx="236048" cy="173380"/>
           </a:xfrm>
           <a:prstGeom prst="flowChartDecision">
@@ -4124,7 +4142,7 @@
         </p:nvSpPr>
         <p:spPr>
           <a:xfrm>
-            <a:off x="4487017" y="2847371"/>
+            <a:off x="4233238" y="1558518"/>
             <a:ext cx="1156969" cy="346760"/>
           </a:xfrm>
           <a:prstGeom prst="rect">
@@ -4157,7 +4175,7 @@
           <a:p>
             <a:pPr algn="ctr"/>
             <a:r>
-              <a:rPr lang="en-US" sz="1050" dirty="0" err="1" smtClean="0">
+              <a:rPr lang="en-US" sz="1050" dirty="0" err="1">
                 <a:solidFill>
                   <a:srgbClr val="7030A0"/>
                 </a:solidFill>
@@ -4180,7 +4198,7 @@
         </p:nvSpPr>
         <p:spPr>
           <a:xfrm>
-            <a:off x="3984303" y="2673991"/>
+            <a:off x="3071812" y="3032210"/>
             <a:ext cx="236048" cy="173380"/>
           </a:xfrm>
           <a:prstGeom prst="flowChartDecision">
@@ -4223,18 +4241,21 @@
         <p:nvCxnSpPr>
           <p:cNvPr id="30" name="Elbow Connector 29"/>
           <p:cNvCxnSpPr>
+            <a:cxnSpLocks/>
             <a:stCxn id="51" idx="3"/>
             <a:endCxn id="49" idx="1"/>
           </p:cNvCxnSpPr>
           <p:nvPr/>
         </p:nvCxnSpPr>
         <p:spPr>
-          <a:xfrm>
-            <a:off x="4220351" y="2760681"/>
-            <a:ext cx="266666" cy="260070"/>
+          <a:xfrm flipV="1">
+            <a:off x="3307860" y="1731898"/>
+            <a:ext cx="925378" cy="1387002"/>
           </a:xfrm>
           <a:prstGeom prst="bentConnector3">
-            <a:avLst/>
+            <a:avLst>
+              <a:gd name="adj1" fmla="val 20150"/>
+            </a:avLst>
           </a:prstGeom>
           <a:ln w="19050">
             <a:solidFill>
@@ -4268,7 +4289,7 @@
         </p:nvSpPr>
         <p:spPr>
           <a:xfrm>
-            <a:off x="4477328" y="2280569"/>
+            <a:off x="4227075" y="2706039"/>
             <a:ext cx="1156969" cy="346760"/>
           </a:xfrm>
           <a:prstGeom prst="rect">
@@ -4301,7 +4322,7 @@
           <a:p>
             <a:pPr algn="ctr"/>
             <a:r>
-              <a:rPr lang="en-US" sz="1050" dirty="0" err="1" smtClean="0">
+              <a:rPr lang="en-US" sz="1050" dirty="0" err="1">
                 <a:solidFill>
                   <a:srgbClr val="7030A0"/>
                 </a:solidFill>
@@ -4320,6 +4341,7 @@
         <p:nvCxnSpPr>
           <p:cNvPr id="59" name="Elbow Connector 58"/>
           <p:cNvCxnSpPr>
+            <a:cxnSpLocks/>
             <a:stCxn id="51" idx="3"/>
             <a:endCxn id="57" idx="1"/>
           </p:cNvCxnSpPr>
@@ -4327,12 +4349,12 @@
         </p:nvCxnSpPr>
         <p:spPr>
           <a:xfrm flipV="1">
-            <a:off x="4220351" y="2453949"/>
-            <a:ext cx="256977" cy="306732"/>
+            <a:off x="3307860" y="2879419"/>
+            <a:ext cx="919215" cy="239481"/>
           </a:xfrm>
           <a:prstGeom prst="bentConnector3">
             <a:avLst>
-              <a:gd name="adj1" fmla="val 50000"/>
+              <a:gd name="adj1" fmla="val 20381"/>
             </a:avLst>
           </a:prstGeom>
           <a:ln w="19050">
@@ -4367,7 +4389,7 @@
         </p:nvSpPr>
         <p:spPr>
           <a:xfrm>
-            <a:off x="6313677" y="2858066"/>
+            <a:off x="6041193" y="2103143"/>
             <a:ext cx="708186" cy="346760"/>
           </a:xfrm>
           <a:prstGeom prst="rect">
@@ -4400,7 +4422,7 @@
           <a:p>
             <a:pPr algn="ctr"/>
             <a:r>
-              <a:rPr lang="en-US" sz="1050" dirty="0" smtClean="0">
+              <a:rPr lang="en-US" sz="1050" dirty="0">
                 <a:solidFill>
                   <a:srgbClr val="7030A0"/>
                 </a:solidFill>
@@ -4423,7 +4445,7 @@
         </p:nvSpPr>
         <p:spPr>
           <a:xfrm>
-            <a:off x="5643227" y="2943979"/>
+            <a:off x="5389448" y="1655126"/>
             <a:ext cx="236048" cy="173380"/>
           </a:xfrm>
           <a:prstGeom prst="flowChartDecision">
@@ -4464,17 +4486,18 @@
         <p:nvCxnSpPr>
           <p:cNvPr id="64" name="Elbow Connector 63"/>
           <p:cNvCxnSpPr>
+            <a:cxnSpLocks/>
             <a:stCxn id="63" idx="3"/>
-            <a:endCxn id="62" idx="1"/>
+            <a:endCxn id="62" idx="0"/>
           </p:cNvCxnSpPr>
           <p:nvPr/>
         </p:nvCxnSpPr>
         <p:spPr>
           <a:xfrm>
-            <a:off x="5879275" y="3030669"/>
-            <a:ext cx="434402" cy="777"/>
-          </a:xfrm>
-          <a:prstGeom prst="bentConnector3">
+            <a:off x="5625496" y="1741816"/>
+            <a:ext cx="698400" cy="361327"/>
+          </a:xfrm>
+          <a:prstGeom prst="bentConnector2">
             <a:avLst/>
           </a:prstGeom>
           <a:ln w="19050">
@@ -4509,7 +4532,7 @@
         </p:nvSpPr>
         <p:spPr>
           <a:xfrm>
-            <a:off x="5336105" y="1809332"/>
+            <a:off x="5077967" y="2229248"/>
             <a:ext cx="483700" cy="346760"/>
           </a:xfrm>
           <a:prstGeom prst="rect">
@@ -4542,7 +4565,7 @@
           <a:p>
             <a:pPr algn="ctr"/>
             <a:r>
-              <a:rPr lang="en-US" sz="1050" dirty="0" smtClean="0">
+              <a:rPr lang="en-US" sz="1050" dirty="0">
                 <a:solidFill>
                   <a:srgbClr val="7030A0"/>
                 </a:solidFill>
@@ -4565,7 +4588,7 @@
         </p:nvSpPr>
         <p:spPr>
           <a:xfrm rot="16200000">
-            <a:off x="4921666" y="2066540"/>
+            <a:off x="4663528" y="2486456"/>
             <a:ext cx="236048" cy="173380"/>
           </a:xfrm>
           <a:prstGeom prst="flowChartDecision">
@@ -4613,7 +4636,7 @@
         </p:nvCxnSpPr>
         <p:spPr>
           <a:xfrm rot="5400000" flipH="1" flipV="1">
-            <a:off x="5161650" y="1860752"/>
+            <a:off x="4903512" y="2280668"/>
             <a:ext cx="52494" cy="296415"/>
           </a:xfrm>
           <a:prstGeom prst="bentConnector2">
@@ -4651,8 +4674,8 @@
         </p:nvSpPr>
         <p:spPr>
           <a:xfrm>
-            <a:off x="7712397" y="2564238"/>
-            <a:ext cx="708186" cy="285783"/>
+            <a:off x="7396876" y="1800491"/>
+            <a:ext cx="832812" cy="285783"/>
           </a:xfrm>
           <a:prstGeom prst="rect">
             <a:avLst/>
@@ -4684,7 +4707,7 @@
           <a:p>
             <a:pPr algn="ctr"/>
             <a:r>
-              <a:rPr lang="en-US" sz="1050" dirty="0" smtClean="0">
+              <a:rPr lang="en-US" sz="1050" dirty="0">
                 <a:solidFill>
                   <a:srgbClr val="7030A0"/>
                 </a:solidFill>
@@ -4707,7 +4730,7 @@
         </p:nvSpPr>
         <p:spPr>
           <a:xfrm>
-            <a:off x="7041947" y="2948201"/>
+            <a:off x="6762259" y="2179670"/>
             <a:ext cx="236048" cy="173380"/>
           </a:xfrm>
           <a:prstGeom prst="flowChartDecision">
@@ -4750,6 +4773,7 @@
         <p:nvCxnSpPr>
           <p:cNvPr id="79" name="Elbow Connector 78"/>
           <p:cNvCxnSpPr>
+            <a:cxnSpLocks/>
             <a:stCxn id="78" idx="3"/>
             <a:endCxn id="76" idx="1"/>
           </p:cNvCxnSpPr>
@@ -4757,11 +4781,13 @@
         </p:nvCxnSpPr>
         <p:spPr>
           <a:xfrm flipV="1">
-            <a:off x="7277995" y="2707130"/>
-            <a:ext cx="434402" cy="327761"/>
+            <a:off x="6998307" y="1943383"/>
+            <a:ext cx="398569" cy="322977"/>
           </a:xfrm>
           <a:prstGeom prst="bentConnector3">
-            <a:avLst/>
+            <a:avLst>
+              <a:gd name="adj1" fmla="val 50000"/>
+            </a:avLst>
           </a:prstGeom>
           <a:ln w="19050">
             <a:solidFill>
@@ -4795,8 +4821,8 @@
         </p:nvSpPr>
         <p:spPr>
           <a:xfrm>
-            <a:off x="7712397" y="2887216"/>
-            <a:ext cx="708186" cy="285783"/>
+            <a:off x="7396876" y="2123469"/>
+            <a:ext cx="832812" cy="285783"/>
           </a:xfrm>
           <a:prstGeom prst="rect">
             <a:avLst/>
@@ -4828,7 +4854,7 @@
           <a:p>
             <a:pPr algn="ctr"/>
             <a:r>
-              <a:rPr lang="en-US" sz="1050" dirty="0" smtClean="0">
+              <a:rPr lang="en-US" sz="1050" dirty="0">
                 <a:solidFill>
                   <a:srgbClr val="7030A0"/>
                 </a:solidFill>
@@ -4847,17 +4873,18 @@
         <p:nvCxnSpPr>
           <p:cNvPr id="81" name="Elbow Connector 80"/>
           <p:cNvCxnSpPr>
+            <a:cxnSpLocks/>
             <a:stCxn id="78" idx="3"/>
             <a:endCxn id="80" idx="1"/>
           </p:cNvCxnSpPr>
           <p:nvPr/>
         </p:nvCxnSpPr>
         <p:spPr>
-          <a:xfrm flipV="1">
-            <a:off x="7277995" y="3030108"/>
-            <a:ext cx="434402" cy="4783"/>
-          </a:xfrm>
-          <a:prstGeom prst="bentConnector3">
+          <a:xfrm>
+            <a:off x="6998307" y="2266360"/>
+            <a:ext cx="398569" cy="1"/>
+          </a:xfrm>
+          <a:prstGeom prst="straightConnector1">
             <a:avLst/>
           </a:prstGeom>
           <a:ln w="19050">
@@ -4892,8 +4919,8 @@
         </p:nvSpPr>
         <p:spPr>
           <a:xfrm>
-            <a:off x="7712397" y="3210194"/>
-            <a:ext cx="708186" cy="285783"/>
+            <a:off x="7396876" y="2446447"/>
+            <a:ext cx="832812" cy="285783"/>
           </a:xfrm>
           <a:prstGeom prst="rect">
             <a:avLst/>
@@ -4925,7 +4952,7 @@
           <a:p>
             <a:pPr algn="ctr"/>
             <a:r>
-              <a:rPr lang="en-US" sz="1050" dirty="0" smtClean="0">
+              <a:rPr lang="en-US" sz="1050" dirty="0">
                 <a:solidFill>
                   <a:srgbClr val="7030A0"/>
                 </a:solidFill>
@@ -4944,6 +4971,7 @@
         <p:nvCxnSpPr>
           <p:cNvPr id="84" name="Elbow Connector 83"/>
           <p:cNvCxnSpPr>
+            <a:cxnSpLocks/>
             <a:stCxn id="78" idx="3"/>
             <a:endCxn id="83" idx="1"/>
           </p:cNvCxnSpPr>
@@ -4951,11 +4979,13 @@
         </p:nvCxnSpPr>
         <p:spPr>
           <a:xfrm>
-            <a:off x="7277995" y="3034891"/>
-            <a:ext cx="434402" cy="318195"/>
+            <a:off x="6998307" y="2266360"/>
+            <a:ext cx="398569" cy="322979"/>
           </a:xfrm>
           <a:prstGeom prst="bentConnector3">
-            <a:avLst/>
+            <a:avLst>
+              <a:gd name="adj1" fmla="val 50000"/>
+            </a:avLst>
           </a:prstGeom>
           <a:ln w="19050">
             <a:solidFill>
@@ -4989,8 +5019,8 @@
         </p:nvSpPr>
         <p:spPr>
           <a:xfrm>
-            <a:off x="7712397" y="3533171"/>
-            <a:ext cx="708186" cy="285783"/>
+            <a:off x="7396876" y="2769424"/>
+            <a:ext cx="832812" cy="285783"/>
           </a:xfrm>
           <a:prstGeom prst="rect">
             <a:avLst/>
@@ -5022,7 +5052,7 @@
           <a:p>
             <a:pPr algn="ctr"/>
             <a:r>
-              <a:rPr lang="en-US" sz="1050" dirty="0" smtClean="0">
+              <a:rPr lang="en-US" sz="1050" dirty="0">
                 <a:solidFill>
                   <a:srgbClr val="7030A0"/>
                 </a:solidFill>
@@ -5041,6 +5071,7 @@
         <p:nvCxnSpPr>
           <p:cNvPr id="86" name="Elbow Connector 85"/>
           <p:cNvCxnSpPr>
+            <a:cxnSpLocks/>
             <a:stCxn id="78" idx="3"/>
             <a:endCxn id="85" idx="1"/>
           </p:cNvCxnSpPr>
@@ -5048,11 +5079,13 @@
         </p:nvCxnSpPr>
         <p:spPr>
           <a:xfrm>
-            <a:off x="7277995" y="3034891"/>
-            <a:ext cx="434402" cy="641172"/>
+            <a:off x="6998307" y="2266360"/>
+            <a:ext cx="398569" cy="645956"/>
           </a:xfrm>
           <a:prstGeom prst="bentConnector3">
-            <a:avLst/>
+            <a:avLst>
+              <a:gd name="adj1" fmla="val 50000"/>
+            </a:avLst>
           </a:prstGeom>
           <a:ln w="19050">
             <a:solidFill>
@@ -5082,19 +5115,18 @@
         <p:nvCxnSpPr>
           <p:cNvPr id="97" name="Elbow Connector 63"/>
           <p:cNvCxnSpPr>
+            <a:cxnSpLocks/>
             <a:stCxn id="99" idx="3"/>
           </p:cNvCxnSpPr>
           <p:nvPr/>
         </p:nvCxnSpPr>
         <p:spPr>
           <a:xfrm rot="16200000" flipH="1">
-            <a:off x="3279321" y="2485431"/>
-            <a:ext cx="293825" cy="1"/>
-          </a:xfrm>
-          <a:prstGeom prst="bentConnector3">
-            <a:avLst>
-              <a:gd name="adj1" fmla="val 50000"/>
-            </a:avLst>
+            <a:off x="2504161" y="2225274"/>
+            <a:ext cx="180241" cy="253286"/>
+          </a:xfrm>
+          <a:prstGeom prst="bentConnector2">
+            <a:avLst/>
           </a:prstGeom>
           <a:ln w="19050">
             <a:solidFill>
@@ -5129,7 +5161,7 @@
         </p:nvSpPr>
         <p:spPr>
           <a:xfrm rot="10800000" flipV="1">
-            <a:off x="3290981" y="2162997"/>
+            <a:off x="2332386" y="2086274"/>
             <a:ext cx="270504" cy="175523"/>
           </a:xfrm>
           <a:prstGeom prst="triangle">
@@ -5177,7 +5209,7 @@
         </p:nvSpPr>
         <p:spPr>
           <a:xfrm>
-            <a:off x="2660303" y="1806470"/>
+            <a:off x="1879312" y="1733150"/>
             <a:ext cx="1539926" cy="346760"/>
           </a:xfrm>
           <a:prstGeom prst="rect">
@@ -5210,7 +5242,7 @@
           <a:p>
             <a:pPr algn="ctr"/>
             <a:r>
-              <a:rPr lang="en-US" sz="1050" dirty="0" smtClean="0">
+              <a:rPr lang="en-US" sz="1050" dirty="0">
                 <a:solidFill>
                   <a:srgbClr val="7030A0"/>
                 </a:solidFill>
@@ -5218,14 +5250,14 @@
               <a:t>&lt;&lt;interface&gt;&gt;</a:t>
             </a:r>
             <a:br>
-              <a:rPr lang="en-US" sz="1050" dirty="0" smtClean="0">
+              <a:rPr lang="en-US" sz="1050" dirty="0">
                 <a:solidFill>
                   <a:srgbClr val="7030A0"/>
                 </a:solidFill>
               </a:rPr>
             </a:br>
             <a:r>
-              <a:rPr lang="en-US" sz="1050" dirty="0" err="1" smtClean="0">
+              <a:rPr lang="en-US" sz="1050" dirty="0" err="1">
                 <a:solidFill>
                   <a:srgbClr val="7030A0"/>
                 </a:solidFill>
@@ -5242,52 +5274,13 @@
       </p:sp>
       <p:sp>
         <p:nvSpPr>
-          <p:cNvPr id="114" name="TextBox 113"/>
-          <p:cNvSpPr txBox="1"/>
-          <p:nvPr/>
-        </p:nvSpPr>
-        <p:spPr>
-          <a:xfrm rot="16200000">
-            <a:off x="6527512" y="3586305"/>
-            <a:ext cx="881018" cy="261610"/>
-          </a:xfrm>
-          <a:prstGeom prst="rect">
-            <a:avLst/>
-          </a:prstGeom>
-          <a:noFill/>
-        </p:spPr>
-        <p:txBody>
-          <a:bodyPr wrap="square" rtlCol="0">
-            <a:spAutoFit/>
-          </a:bodyPr>
-          <a:lstStyle/>
-          <a:p>
-            <a:pPr algn="r"/>
-            <a:r>
-              <a:rPr lang="en-US" sz="1100" dirty="0" smtClean="0">
-                <a:solidFill>
-                  <a:srgbClr val="7030A0"/>
-                </a:solidFill>
-              </a:rPr>
-              <a:t>filtered list</a:t>
-            </a:r>
-            <a:endParaRPr lang="en-SG" sz="1100" dirty="0">
-              <a:solidFill>
-                <a:srgbClr val="7030A0"/>
-              </a:solidFill>
-            </a:endParaRPr>
-          </a:p>
-        </p:txBody>
-      </p:sp>
-      <p:sp>
-        <p:nvSpPr>
           <p:cNvPr id="122" name="Rectangle 8"/>
           <p:cNvSpPr/>
           <p:nvPr/>
         </p:nvSpPr>
         <p:spPr>
-          <a:xfrm>
-            <a:off x="2057401" y="4239491"/>
+          <a:xfrm rot="16200000">
+            <a:off x="436219" y="5008220"/>
             <a:ext cx="1066800" cy="346760"/>
           </a:xfrm>
           <a:prstGeom prst="rect">
@@ -5320,30 +5313,22 @@
           <a:p>
             <a:pPr algn="ctr"/>
             <a:r>
-              <a:rPr lang="en-US" sz="1050" dirty="0" smtClean="0">
+              <a:rPr lang="en-US" sz="1050" dirty="0">
                 <a:solidFill>
                   <a:srgbClr val="7030A0"/>
                 </a:solidFill>
               </a:rPr>
               <a:t>&lt;&lt;interface&gt;&gt;</a:t>
             </a:r>
-            <a:r>
-              <a:rPr lang="en-US" sz="1050">
-                <a:solidFill>
-                  <a:srgbClr val="7030A0"/>
-                </a:solidFill>
-              </a:rPr>
-              <a:t/>
-            </a:r>
             <a:br>
-              <a:rPr lang="en-US" sz="1050">
+              <a:rPr lang="en-US" sz="1050" dirty="0">
                 <a:solidFill>
                   <a:srgbClr val="7030A0"/>
                 </a:solidFill>
               </a:rPr>
             </a:br>
             <a:r>
-              <a:rPr lang="en-US" sz="1050" dirty="0" err="1" smtClean="0">
+              <a:rPr lang="en-US" sz="1050" dirty="0" err="1">
                 <a:solidFill>
                   <a:srgbClr val="7030A0"/>
                 </a:solidFill>
@@ -5362,18 +5347,21 @@
         <p:nvCxnSpPr>
           <p:cNvPr id="124" name="Elbow Connector 122"/>
           <p:cNvCxnSpPr>
+            <a:cxnSpLocks/>
             <a:stCxn id="119" idx="1"/>
-            <a:endCxn id="122" idx="1"/>
+            <a:endCxn id="122" idx="3"/>
           </p:cNvCxnSpPr>
           <p:nvPr/>
         </p:nvCxnSpPr>
         <p:spPr>
-          <a:xfrm rot="16200000" flipH="1">
-            <a:off x="1364475" y="3719944"/>
-            <a:ext cx="831471" cy="554381"/>
-          </a:xfrm>
-          <a:prstGeom prst="bentConnector2">
-            <a:avLst/>
+          <a:xfrm rot="5400000">
+            <a:off x="436220" y="4114800"/>
+            <a:ext cx="1066800" cy="1"/>
+          </a:xfrm>
+          <a:prstGeom prst="bentConnector3">
+            <a:avLst>
+              <a:gd name="adj1" fmla="val 50000"/>
+            </a:avLst>
           </a:prstGeom>
           <a:ln w="19050">
             <a:solidFill>
@@ -5404,15 +5392,15 @@
         <p:nvCxnSpPr>
           <p:cNvPr id="50" name="Elbow Connector 49"/>
           <p:cNvCxnSpPr>
-            <a:stCxn id="62" idx="0"/>
-            <a:endCxn id="57" idx="3"/>
+            <a:cxnSpLocks/>
+            <a:stCxn id="62" idx="2"/>
           </p:cNvCxnSpPr>
           <p:nvPr/>
         </p:nvCxnSpPr>
         <p:spPr>
-          <a:xfrm rot="16200000" flipV="1">
-            <a:off x="5948976" y="2139271"/>
-            <a:ext cx="404117" cy="1033473"/>
+          <a:xfrm rot="5400000">
+            <a:off x="5712829" y="2129668"/>
+            <a:ext cx="362223" cy="1002693"/>
           </a:xfrm>
           <a:prstGeom prst="bentConnector2">
             <a:avLst/>
@@ -5449,7 +5437,7 @@
         </p:nvSpPr>
         <p:spPr>
           <a:xfrm>
-            <a:off x="4324972" y="2191228"/>
+            <a:off x="4071193" y="2660113"/>
             <a:ext cx="189257" cy="178683"/>
           </a:xfrm>
           <a:prstGeom prst="rect">
@@ -5465,7 +5453,7 @@
           <a:p>
             <a:pPr algn="ctr"/>
             <a:r>
-              <a:rPr lang="en-US" sz="1100" dirty="0" smtClean="0">
+              <a:rPr lang="en-US" sz="1100" dirty="0">
                 <a:solidFill>
                   <a:srgbClr val="7030A0"/>
                 </a:solidFill>
@@ -5488,7 +5476,7 @@
         </p:nvSpPr>
         <p:spPr>
           <a:xfrm>
-            <a:off x="4324972" y="3058864"/>
+            <a:off x="4071193" y="1770011"/>
             <a:ext cx="189257" cy="178683"/>
           </a:xfrm>
           <a:prstGeom prst="rect">
@@ -5504,7 +5492,7 @@
           <a:p>
             <a:pPr algn="ctr"/>
             <a:r>
-              <a:rPr lang="en-US" sz="1100" dirty="0" smtClean="0">
+              <a:rPr lang="en-US" sz="1100" dirty="0">
                 <a:solidFill>
                   <a:srgbClr val="7030A0"/>
                 </a:solidFill>
@@ -5527,7 +5515,7 @@
         </p:nvSpPr>
         <p:spPr>
           <a:xfrm>
-            <a:off x="5689761" y="2495413"/>
+            <a:off x="5462545" y="2832901"/>
             <a:ext cx="189257" cy="178683"/>
           </a:xfrm>
           <a:prstGeom prst="rect">
@@ -5543,7 +5531,7 @@
           <a:p>
             <a:pPr algn="ctr"/>
             <a:r>
-              <a:rPr lang="en-US" sz="1100" dirty="0" smtClean="0">
+              <a:rPr lang="en-US" sz="1100" dirty="0">
                 <a:solidFill>
                   <a:srgbClr val="7030A0"/>
                 </a:solidFill>
@@ -5566,7 +5554,7 @@
         </p:nvSpPr>
         <p:spPr>
           <a:xfrm>
-            <a:off x="5163172" y="1778919"/>
+            <a:off x="4905034" y="2198835"/>
             <a:ext cx="189257" cy="178683"/>
           </a:xfrm>
           <a:prstGeom prst="rect">
@@ -5582,7 +5570,7 @@
           <a:p>
             <a:pPr algn="ctr"/>
             <a:r>
-              <a:rPr lang="en-US" sz="1100" dirty="0" smtClean="0">
+              <a:rPr lang="en-US" sz="1100" dirty="0">
                 <a:solidFill>
                   <a:srgbClr val="7030A0"/>
                 </a:solidFill>
@@ -5605,7 +5593,7 @@
         </p:nvSpPr>
         <p:spPr>
           <a:xfrm>
-            <a:off x="6135256" y="3097917"/>
+            <a:off x="6134370" y="1889111"/>
             <a:ext cx="189257" cy="178683"/>
           </a:xfrm>
           <a:prstGeom prst="rect">
@@ -5621,7 +5609,7 @@
           <a:p>
             <a:pPr algn="ctr"/>
             <a:r>
-              <a:rPr lang="en-US" sz="1100" dirty="0" smtClean="0">
+              <a:rPr lang="en-US" sz="1100" dirty="0">
                 <a:solidFill>
                   <a:srgbClr val="7030A0"/>
                 </a:solidFill>
@@ -5644,7 +5632,7 @@
         </p:nvSpPr>
         <p:spPr>
           <a:xfrm>
-            <a:off x="2687923" y="2564238"/>
+            <a:off x="2563107" y="3205590"/>
             <a:ext cx="189257" cy="178683"/>
           </a:xfrm>
           <a:prstGeom prst="rect">
@@ -5660,7 +5648,7 @@
           <a:p>
             <a:pPr algn="ctr"/>
             <a:r>
-              <a:rPr lang="en-US" sz="1100" dirty="0" smtClean="0">
+              <a:rPr lang="en-US" sz="1100" dirty="0">
                 <a:solidFill>
                   <a:srgbClr val="7030A0"/>
                 </a:solidFill>
@@ -5683,7 +5671,7 @@
         </p:nvSpPr>
         <p:spPr>
           <a:xfrm>
-            <a:off x="2656370" y="3386050"/>
+            <a:off x="2094116" y="4842258"/>
             <a:ext cx="189257" cy="178683"/>
           </a:xfrm>
           <a:prstGeom prst="rect">
@@ -5699,7 +5687,7 @@
           <a:p>
             <a:pPr algn="ctr"/>
             <a:r>
-              <a:rPr lang="en-US" sz="1100" dirty="0" smtClean="0">
+              <a:rPr lang="en-US" sz="1100" dirty="0">
                 <a:solidFill>
                   <a:srgbClr val="7030A0"/>
                 </a:solidFill>
@@ -5722,7 +5710,7 @@
         </p:nvSpPr>
         <p:spPr>
           <a:xfrm>
-            <a:off x="6667770" y="3210194"/>
+            <a:off x="6134370" y="3210194"/>
             <a:ext cx="189257" cy="178683"/>
           </a:xfrm>
           <a:prstGeom prst="rect">
@@ -5737,13 +5725,2442 @@
           <a:lstStyle/>
           <a:p>
             <a:pPr algn="ctr"/>
-            <a:r>
-              <a:rPr lang="en-US" sz="1100" dirty="0" smtClean="0">
+            <a:endParaRPr lang="en-SG" sz="1100" dirty="0">
+              <a:solidFill>
+                <a:srgbClr val="7030A0"/>
+              </a:solidFill>
+            </a:endParaRPr>
+          </a:p>
+        </p:txBody>
+      </p:sp>
+      <p:sp>
+        <p:nvSpPr>
+          <p:cNvPr id="82" name="Rectangle 8">
+            <a:extLst>
+              <a:ext uri="{FF2B5EF4-FFF2-40B4-BE49-F238E27FC236}">
+                <a16:creationId xmlns:a16="http://schemas.microsoft.com/office/drawing/2014/main" id="{395C95BC-83CF-43E1-9C7D-961C67C3BA13}"/>
+              </a:ext>
+            </a:extLst>
+          </p:cNvPr>
+          <p:cNvSpPr/>
+          <p:nvPr/>
+        </p:nvSpPr>
+        <p:spPr>
+          <a:xfrm>
+            <a:off x="7396876" y="3098152"/>
+            <a:ext cx="832812" cy="285783"/>
+          </a:xfrm>
+          <a:prstGeom prst="rect">
+            <a:avLst/>
+          </a:prstGeom>
+          <a:ln w="19050">
+            <a:solidFill>
+              <a:srgbClr val="7030A0"/>
+            </a:solidFill>
+          </a:ln>
+          <a:effectLst/>
+        </p:spPr>
+        <p:style>
+          <a:lnRef idx="1">
+            <a:schemeClr val="accent4"/>
+          </a:lnRef>
+          <a:fillRef idx="2">
+            <a:schemeClr val="accent4"/>
+          </a:fillRef>
+          <a:effectRef idx="1">
+            <a:schemeClr val="accent4"/>
+          </a:effectRef>
+          <a:fontRef idx="minor">
+            <a:schemeClr val="dk1"/>
+          </a:fontRef>
+        </p:style>
+        <p:txBody>
+          <a:bodyPr rtlCol="0" anchor="ctr"/>
+          <a:lstStyle/>
+          <a:p>
+            <a:pPr algn="ctr"/>
+            <a:r>
+              <a:rPr lang="en-US" sz="1050" dirty="0" err="1">
+                <a:solidFill>
+                  <a:srgbClr val="7030A0"/>
+                </a:solidFill>
+              </a:rPr>
+              <a:t>Nric</a:t>
+            </a:r>
+            <a:endParaRPr lang="en-SG" sz="1050" dirty="0">
+              <a:solidFill>
+                <a:srgbClr val="7030A0"/>
+              </a:solidFill>
+            </a:endParaRPr>
+          </a:p>
+        </p:txBody>
+      </p:sp>
+      <p:cxnSp>
+        <p:nvCxnSpPr>
+          <p:cNvPr id="87" name="Elbow Connector 85">
+            <a:extLst>
+              <a:ext uri="{FF2B5EF4-FFF2-40B4-BE49-F238E27FC236}">
+                <a16:creationId xmlns:a16="http://schemas.microsoft.com/office/drawing/2014/main" id="{27FD4266-31C5-495D-B86B-4C62C844AAB8}"/>
+              </a:ext>
+            </a:extLst>
+          </p:cNvPr>
+          <p:cNvCxnSpPr>
+            <a:cxnSpLocks/>
+            <a:stCxn id="78" idx="3"/>
+            <a:endCxn id="82" idx="1"/>
+          </p:cNvCxnSpPr>
+          <p:nvPr/>
+        </p:nvCxnSpPr>
+        <p:spPr>
+          <a:xfrm>
+            <a:off x="6998307" y="2266360"/>
+            <a:ext cx="398569" cy="974684"/>
+          </a:xfrm>
+          <a:prstGeom prst="bentConnector3">
+            <a:avLst>
+              <a:gd name="adj1" fmla="val 50000"/>
+            </a:avLst>
+          </a:prstGeom>
+          <a:ln w="19050">
+            <a:solidFill>
+              <a:srgbClr val="7030A0"/>
+            </a:solidFill>
+            <a:headEnd type="none" w="med" len="med"/>
+            <a:tailEnd type="arrow" w="med" len="med"/>
+          </a:ln>
+          <a:effectLst/>
+        </p:spPr>
+        <p:style>
+          <a:lnRef idx="1">
+            <a:schemeClr val="accent2"/>
+          </a:lnRef>
+          <a:fillRef idx="2">
+            <a:schemeClr val="accent2"/>
+          </a:fillRef>
+          <a:effectRef idx="1">
+            <a:schemeClr val="accent2"/>
+          </a:effectRef>
+          <a:fontRef idx="minor">
+            <a:schemeClr val="dk1"/>
+          </a:fontRef>
+        </p:style>
+      </p:cxnSp>
+      <p:sp>
+        <p:nvSpPr>
+          <p:cNvPr id="142" name="Rectangle 8">
+            <a:extLst>
+              <a:ext uri="{FF2B5EF4-FFF2-40B4-BE49-F238E27FC236}">
+                <a16:creationId xmlns:a16="http://schemas.microsoft.com/office/drawing/2014/main" id="{10207E29-CEF3-4977-815D-D4572C5D7E87}"/>
+              </a:ext>
+            </a:extLst>
+          </p:cNvPr>
+          <p:cNvSpPr/>
+          <p:nvPr/>
+        </p:nvSpPr>
+        <p:spPr>
+          <a:xfrm>
+            <a:off x="3686837" y="3596141"/>
+            <a:ext cx="1352681" cy="346760"/>
+          </a:xfrm>
+          <a:prstGeom prst="rect">
+            <a:avLst/>
+          </a:prstGeom>
+          <a:ln w="19050">
+            <a:solidFill>
+              <a:srgbClr val="7030A0"/>
+            </a:solidFill>
+          </a:ln>
+          <a:effectLst/>
+        </p:spPr>
+        <p:style>
+          <a:lnRef idx="1">
+            <a:schemeClr val="accent4"/>
+          </a:lnRef>
+          <a:fillRef idx="2">
+            <a:schemeClr val="accent4"/>
+          </a:fillRef>
+          <a:effectRef idx="1">
+            <a:schemeClr val="accent4"/>
+          </a:effectRef>
+          <a:fontRef idx="minor">
+            <a:schemeClr val="dk1"/>
+          </a:fontRef>
+        </p:style>
+        <p:txBody>
+          <a:bodyPr rtlCol="0" anchor="ctr"/>
+          <a:lstStyle/>
+          <a:p>
+            <a:pPr algn="ctr"/>
+            <a:r>
+              <a:rPr lang="en-US" sz="1050" dirty="0" err="1">
+                <a:solidFill>
+                  <a:srgbClr val="7030A0"/>
+                </a:solidFill>
+              </a:rPr>
+              <a:t>UniquePetPatientList</a:t>
+            </a:r>
+            <a:endParaRPr lang="en-SG" sz="1050" dirty="0">
+              <a:solidFill>
+                <a:srgbClr val="7030A0"/>
+              </a:solidFill>
+            </a:endParaRPr>
+          </a:p>
+        </p:txBody>
+      </p:sp>
+      <p:cxnSp>
+        <p:nvCxnSpPr>
+          <p:cNvPr id="144" name="Elbow Connector 29">
+            <a:extLst>
+              <a:ext uri="{FF2B5EF4-FFF2-40B4-BE49-F238E27FC236}">
+                <a16:creationId xmlns:a16="http://schemas.microsoft.com/office/drawing/2014/main" id="{33E4A5A9-2101-4C80-BAC0-F09E4D15FA86}"/>
+              </a:ext>
+            </a:extLst>
+          </p:cNvPr>
+          <p:cNvCxnSpPr>
+            <a:cxnSpLocks/>
+            <a:stCxn id="51" idx="3"/>
+            <a:endCxn id="142" idx="1"/>
+          </p:cNvCxnSpPr>
+          <p:nvPr/>
+        </p:nvCxnSpPr>
+        <p:spPr>
+          <a:xfrm>
+            <a:off x="3307860" y="3118900"/>
+            <a:ext cx="378977" cy="650621"/>
+          </a:xfrm>
+          <a:prstGeom prst="bentConnector3">
+            <a:avLst>
+              <a:gd name="adj1" fmla="val 49371"/>
+            </a:avLst>
+          </a:prstGeom>
+          <a:ln w="19050">
+            <a:solidFill>
+              <a:srgbClr val="7030A0"/>
+            </a:solidFill>
+            <a:headEnd type="none" w="med" len="med"/>
+            <a:tailEnd type="arrow" w="med" len="med"/>
+          </a:ln>
+          <a:effectLst/>
+        </p:spPr>
+        <p:style>
+          <a:lnRef idx="1">
+            <a:schemeClr val="accent2"/>
+          </a:lnRef>
+          <a:fillRef idx="2">
+            <a:schemeClr val="accent2"/>
+          </a:fillRef>
+          <a:effectRef idx="1">
+            <a:schemeClr val="accent2"/>
+          </a:effectRef>
+          <a:fontRef idx="minor">
+            <a:schemeClr val="dk1"/>
+          </a:fontRef>
+        </p:style>
+      </p:cxnSp>
+      <p:sp>
+        <p:nvSpPr>
+          <p:cNvPr id="145" name="Rectangle 8">
+            <a:extLst>
+              <a:ext uri="{FF2B5EF4-FFF2-40B4-BE49-F238E27FC236}">
+                <a16:creationId xmlns:a16="http://schemas.microsoft.com/office/drawing/2014/main" id="{0A973B2B-ED23-477B-83D5-B80C61569218}"/>
+              </a:ext>
+            </a:extLst>
+          </p:cNvPr>
+          <p:cNvSpPr/>
+          <p:nvPr/>
+        </p:nvSpPr>
+        <p:spPr>
+          <a:xfrm>
+            <a:off x="4572000" y="4579217"/>
+            <a:ext cx="795884" cy="346760"/>
+          </a:xfrm>
+          <a:prstGeom prst="rect">
+            <a:avLst/>
+          </a:prstGeom>
+          <a:ln w="19050">
+            <a:solidFill>
+              <a:srgbClr val="7030A0"/>
+            </a:solidFill>
+          </a:ln>
+          <a:effectLst/>
+        </p:spPr>
+        <p:style>
+          <a:lnRef idx="1">
+            <a:schemeClr val="accent4"/>
+          </a:lnRef>
+          <a:fillRef idx="2">
+            <a:schemeClr val="accent4"/>
+          </a:fillRef>
+          <a:effectRef idx="1">
+            <a:schemeClr val="accent4"/>
+          </a:effectRef>
+          <a:fontRef idx="minor">
+            <a:schemeClr val="dk1"/>
+          </a:fontRef>
+        </p:style>
+        <p:txBody>
+          <a:bodyPr rtlCol="0" anchor="ctr"/>
+          <a:lstStyle/>
+          <a:p>
+            <a:pPr algn="ctr"/>
+            <a:r>
+              <a:rPr lang="en-US" sz="1050" dirty="0">
+                <a:solidFill>
+                  <a:srgbClr val="7030A0"/>
+                </a:solidFill>
+              </a:rPr>
+              <a:t>Pet Patient</a:t>
+            </a:r>
+            <a:endParaRPr lang="en-SG" sz="1050" dirty="0">
+              <a:solidFill>
+                <a:srgbClr val="7030A0"/>
+              </a:solidFill>
+            </a:endParaRPr>
+          </a:p>
+        </p:txBody>
+      </p:sp>
+      <p:cxnSp>
+        <p:nvCxnSpPr>
+          <p:cNvPr id="146" name="Elbow Connector 63">
+            <a:extLst>
+              <a:ext uri="{FF2B5EF4-FFF2-40B4-BE49-F238E27FC236}">
+                <a16:creationId xmlns:a16="http://schemas.microsoft.com/office/drawing/2014/main" id="{6E31489D-495F-4633-89EA-3591F9287900}"/>
+              </a:ext>
+            </a:extLst>
+          </p:cNvPr>
+          <p:cNvCxnSpPr>
+            <a:cxnSpLocks/>
+            <a:stCxn id="214" idx="3"/>
+            <a:endCxn id="145" idx="1"/>
+          </p:cNvCxnSpPr>
+          <p:nvPr/>
+        </p:nvCxnSpPr>
+        <p:spPr>
+          <a:xfrm rot="16200000" flipH="1">
+            <a:off x="4095920" y="4276517"/>
+            <a:ext cx="554396" cy="397763"/>
+          </a:xfrm>
+          <a:prstGeom prst="bentConnector2">
+            <a:avLst/>
+          </a:prstGeom>
+          <a:ln w="19050">
+            <a:solidFill>
+              <a:srgbClr val="7030A0"/>
+            </a:solidFill>
+            <a:headEnd type="none" w="med" len="med"/>
+            <a:tailEnd type="arrow" w="med" len="med"/>
+          </a:ln>
+          <a:effectLst/>
+        </p:spPr>
+        <p:style>
+          <a:lnRef idx="1">
+            <a:schemeClr val="accent2"/>
+          </a:lnRef>
+          <a:fillRef idx="2">
+            <a:schemeClr val="accent2"/>
+          </a:fillRef>
+          <a:effectRef idx="1">
+            <a:schemeClr val="accent2"/>
+          </a:effectRef>
+          <a:fontRef idx="minor">
+            <a:schemeClr val="dk1"/>
+          </a:fontRef>
+        </p:style>
+      </p:cxnSp>
+      <p:sp>
+        <p:nvSpPr>
+          <p:cNvPr id="156" name="TextBox 155">
+            <a:extLst>
+              <a:ext uri="{FF2B5EF4-FFF2-40B4-BE49-F238E27FC236}">
+                <a16:creationId xmlns:a16="http://schemas.microsoft.com/office/drawing/2014/main" id="{9B93BE0B-A7A1-42F0-BBC3-AD81847A18F5}"/>
+              </a:ext>
+            </a:extLst>
+          </p:cNvPr>
+          <p:cNvSpPr txBox="1"/>
+          <p:nvPr/>
+        </p:nvSpPr>
+        <p:spPr>
+          <a:xfrm>
+            <a:off x="3522911" y="3551230"/>
+            <a:ext cx="189257" cy="178683"/>
+          </a:xfrm>
+          <a:prstGeom prst="rect">
+            <a:avLst/>
+          </a:prstGeom>
+          <a:noFill/>
+        </p:spPr>
+        <p:txBody>
+          <a:bodyPr wrap="square" lIns="0" tIns="0" rIns="0" bIns="0" rtlCol="0">
+            <a:noAutofit/>
+          </a:bodyPr>
+          <a:lstStyle/>
+          <a:p>
+            <a:pPr algn="ctr"/>
+            <a:r>
+              <a:rPr lang="en-US" sz="1100" dirty="0">
                 <a:solidFill>
                   <a:srgbClr val="7030A0"/>
                 </a:solidFill>
               </a:rPr>
               <a:t>1</a:t>
+            </a:r>
+            <a:endParaRPr lang="en-SG" sz="1100" dirty="0">
+              <a:solidFill>
+                <a:srgbClr val="7030A0"/>
+              </a:solidFill>
+            </a:endParaRPr>
+          </a:p>
+        </p:txBody>
+      </p:sp>
+      <p:sp>
+        <p:nvSpPr>
+          <p:cNvPr id="157" name="TextBox 156">
+            <a:extLst>
+              <a:ext uri="{FF2B5EF4-FFF2-40B4-BE49-F238E27FC236}">
+                <a16:creationId xmlns:a16="http://schemas.microsoft.com/office/drawing/2014/main" id="{EFC6D1EF-D183-4842-A011-0E344730E0C7}"/>
+              </a:ext>
+            </a:extLst>
+          </p:cNvPr>
+          <p:cNvSpPr txBox="1"/>
+          <p:nvPr/>
+        </p:nvSpPr>
+        <p:spPr>
+          <a:xfrm>
+            <a:off x="4383463" y="4575861"/>
+            <a:ext cx="189257" cy="178683"/>
+          </a:xfrm>
+          <a:prstGeom prst="rect">
+            <a:avLst/>
+          </a:prstGeom>
+          <a:noFill/>
+        </p:spPr>
+        <p:txBody>
+          <a:bodyPr wrap="square" lIns="0" tIns="0" rIns="0" bIns="0" rtlCol="0">
+            <a:noAutofit/>
+          </a:bodyPr>
+          <a:lstStyle/>
+          <a:p>
+            <a:pPr algn="ctr"/>
+            <a:r>
+              <a:rPr lang="en-US" sz="1100" dirty="0">
+                <a:solidFill>
+                  <a:srgbClr val="7030A0"/>
+                </a:solidFill>
+              </a:rPr>
+              <a:t>*</a:t>
+            </a:r>
+            <a:endParaRPr lang="en-SG" sz="1100" dirty="0">
+              <a:solidFill>
+                <a:srgbClr val="7030A0"/>
+              </a:solidFill>
+            </a:endParaRPr>
+          </a:p>
+        </p:txBody>
+      </p:sp>
+      <p:sp>
+        <p:nvSpPr>
+          <p:cNvPr id="214" name="Flowchart: Decision 96">
+            <a:extLst>
+              <a:ext uri="{FF2B5EF4-FFF2-40B4-BE49-F238E27FC236}">
+                <a16:creationId xmlns:a16="http://schemas.microsoft.com/office/drawing/2014/main" id="{0993F2C9-14B8-456E-8A21-4710B78DA525}"/>
+              </a:ext>
+            </a:extLst>
+          </p:cNvPr>
+          <p:cNvSpPr/>
+          <p:nvPr/>
+        </p:nvSpPr>
+        <p:spPr>
+          <a:xfrm rot="5400000">
+            <a:off x="4056213" y="3993487"/>
+            <a:ext cx="236048" cy="173380"/>
+          </a:xfrm>
+          <a:prstGeom prst="flowChartDecision">
+            <a:avLst/>
+          </a:prstGeom>
+          <a:noFill/>
+          <a:ln w="19050">
+            <a:solidFill>
+              <a:srgbClr val="7030A0"/>
+            </a:solidFill>
+          </a:ln>
+          <a:effectLst/>
+        </p:spPr>
+        <p:style>
+          <a:lnRef idx="1">
+            <a:schemeClr val="accent6"/>
+          </a:lnRef>
+          <a:fillRef idx="2">
+            <a:schemeClr val="accent6"/>
+          </a:fillRef>
+          <a:effectRef idx="1">
+            <a:schemeClr val="accent6"/>
+          </a:effectRef>
+          <a:fontRef idx="minor">
+            <a:schemeClr val="dk1"/>
+          </a:fontRef>
+        </p:style>
+        <p:txBody>
+          <a:bodyPr rtlCol="0" anchor="ctr"/>
+          <a:lstStyle/>
+          <a:p>
+            <a:pPr algn="ctr"/>
+            <a:endParaRPr lang="en-US" sz="1050"/>
+          </a:p>
+        </p:txBody>
+      </p:sp>
+      <p:sp>
+        <p:nvSpPr>
+          <p:cNvPr id="228" name="Rectangle 8">
+            <a:extLst>
+              <a:ext uri="{FF2B5EF4-FFF2-40B4-BE49-F238E27FC236}">
+                <a16:creationId xmlns:a16="http://schemas.microsoft.com/office/drawing/2014/main" id="{38961428-9D09-4D25-A872-2008F15089FF}"/>
+              </a:ext>
+            </a:extLst>
+          </p:cNvPr>
+          <p:cNvSpPr/>
+          <p:nvPr/>
+        </p:nvSpPr>
+        <p:spPr>
+          <a:xfrm>
+            <a:off x="6078960" y="2985280"/>
+            <a:ext cx="832812" cy="285783"/>
+          </a:xfrm>
+          <a:prstGeom prst="rect">
+            <a:avLst/>
+          </a:prstGeom>
+          <a:ln w="19050">
+            <a:solidFill>
+              <a:srgbClr val="7030A0"/>
+            </a:solidFill>
+          </a:ln>
+          <a:effectLst/>
+        </p:spPr>
+        <p:style>
+          <a:lnRef idx="1">
+            <a:schemeClr val="accent4"/>
+          </a:lnRef>
+          <a:fillRef idx="2">
+            <a:schemeClr val="accent4"/>
+          </a:fillRef>
+          <a:effectRef idx="1">
+            <a:schemeClr val="accent4"/>
+          </a:effectRef>
+          <a:fontRef idx="minor">
+            <a:schemeClr val="dk1"/>
+          </a:fontRef>
+        </p:style>
+        <p:txBody>
+          <a:bodyPr rtlCol="0" anchor="ctr"/>
+          <a:lstStyle/>
+          <a:p>
+            <a:pPr algn="ctr"/>
+            <a:r>
+              <a:rPr lang="en-US" sz="1050" dirty="0" err="1">
+                <a:solidFill>
+                  <a:srgbClr val="7030A0"/>
+                </a:solidFill>
+              </a:rPr>
+              <a:t>Nric</a:t>
+            </a:r>
+            <a:endParaRPr lang="en-SG" sz="1050" dirty="0">
+              <a:solidFill>
+                <a:srgbClr val="7030A0"/>
+              </a:solidFill>
+            </a:endParaRPr>
+          </a:p>
+        </p:txBody>
+      </p:sp>
+      <p:sp>
+        <p:nvSpPr>
+          <p:cNvPr id="229" name="Flowchart: Decision 96">
+            <a:extLst>
+              <a:ext uri="{FF2B5EF4-FFF2-40B4-BE49-F238E27FC236}">
+                <a16:creationId xmlns:a16="http://schemas.microsoft.com/office/drawing/2014/main" id="{C9571857-87E5-4164-835A-C5036D8E4A23}"/>
+              </a:ext>
+            </a:extLst>
+          </p:cNvPr>
+          <p:cNvSpPr/>
+          <p:nvPr/>
+        </p:nvSpPr>
+        <p:spPr>
+          <a:xfrm>
+            <a:off x="5381303" y="4663262"/>
+            <a:ext cx="236048" cy="173380"/>
+          </a:xfrm>
+          <a:prstGeom prst="flowChartDecision">
+            <a:avLst/>
+          </a:prstGeom>
+          <a:solidFill>
+            <a:srgbClr val="7030A0"/>
+          </a:solidFill>
+          <a:ln w="19050">
+            <a:solidFill>
+              <a:srgbClr val="7030A0"/>
+            </a:solidFill>
+          </a:ln>
+          <a:effectLst/>
+        </p:spPr>
+        <p:style>
+          <a:lnRef idx="1">
+            <a:schemeClr val="accent6"/>
+          </a:lnRef>
+          <a:fillRef idx="2">
+            <a:schemeClr val="accent6"/>
+          </a:fillRef>
+          <a:effectRef idx="1">
+            <a:schemeClr val="accent6"/>
+          </a:effectRef>
+          <a:fontRef idx="minor">
+            <a:schemeClr val="dk1"/>
+          </a:fontRef>
+        </p:style>
+        <p:txBody>
+          <a:bodyPr rtlCol="0" anchor="ctr"/>
+          <a:lstStyle/>
+          <a:p>
+            <a:pPr algn="ctr"/>
+            <a:endParaRPr lang="en-US" sz="1050"/>
+          </a:p>
+        </p:txBody>
+      </p:sp>
+      <p:cxnSp>
+        <p:nvCxnSpPr>
+          <p:cNvPr id="230" name="Elbow Connector 78">
+            <a:extLst>
+              <a:ext uri="{FF2B5EF4-FFF2-40B4-BE49-F238E27FC236}">
+                <a16:creationId xmlns:a16="http://schemas.microsoft.com/office/drawing/2014/main" id="{E6E27BB6-B96D-4623-BDE6-8339001A5425}"/>
+              </a:ext>
+            </a:extLst>
+          </p:cNvPr>
+          <p:cNvCxnSpPr>
+            <a:cxnSpLocks/>
+            <a:stCxn id="229" idx="3"/>
+            <a:endCxn id="228" idx="1"/>
+          </p:cNvCxnSpPr>
+          <p:nvPr/>
+        </p:nvCxnSpPr>
+        <p:spPr>
+          <a:xfrm flipV="1">
+            <a:off x="5617351" y="3128172"/>
+            <a:ext cx="461609" cy="1621780"/>
+          </a:xfrm>
+          <a:prstGeom prst="bentConnector3">
+            <a:avLst>
+              <a:gd name="adj1" fmla="val 50000"/>
+            </a:avLst>
+          </a:prstGeom>
+          <a:ln w="19050">
+            <a:solidFill>
+              <a:srgbClr val="7030A0"/>
+            </a:solidFill>
+            <a:headEnd type="none" w="med" len="med"/>
+            <a:tailEnd type="arrow" w="med" len="med"/>
+          </a:ln>
+          <a:effectLst/>
+        </p:spPr>
+        <p:style>
+          <a:lnRef idx="1">
+            <a:schemeClr val="accent2"/>
+          </a:lnRef>
+          <a:fillRef idx="2">
+            <a:schemeClr val="accent2"/>
+          </a:fillRef>
+          <a:effectRef idx="1">
+            <a:schemeClr val="accent2"/>
+          </a:effectRef>
+          <a:fontRef idx="minor">
+            <a:schemeClr val="dk1"/>
+          </a:fontRef>
+        </p:style>
+      </p:cxnSp>
+      <p:sp>
+        <p:nvSpPr>
+          <p:cNvPr id="231" name="Rectangle 8">
+            <a:extLst>
+              <a:ext uri="{FF2B5EF4-FFF2-40B4-BE49-F238E27FC236}">
+                <a16:creationId xmlns:a16="http://schemas.microsoft.com/office/drawing/2014/main" id="{64659FD4-E391-4099-A936-10E4B011BFED}"/>
+              </a:ext>
+            </a:extLst>
+          </p:cNvPr>
+          <p:cNvSpPr/>
+          <p:nvPr/>
+        </p:nvSpPr>
+        <p:spPr>
+          <a:xfrm>
+            <a:off x="6078960" y="3308258"/>
+            <a:ext cx="832812" cy="285783"/>
+          </a:xfrm>
+          <a:prstGeom prst="rect">
+            <a:avLst/>
+          </a:prstGeom>
+          <a:ln w="19050">
+            <a:solidFill>
+              <a:srgbClr val="7030A0"/>
+            </a:solidFill>
+          </a:ln>
+          <a:effectLst/>
+        </p:spPr>
+        <p:style>
+          <a:lnRef idx="1">
+            <a:schemeClr val="accent4"/>
+          </a:lnRef>
+          <a:fillRef idx="2">
+            <a:schemeClr val="accent4"/>
+          </a:fillRef>
+          <a:effectRef idx="1">
+            <a:schemeClr val="accent4"/>
+          </a:effectRef>
+          <a:fontRef idx="minor">
+            <a:schemeClr val="dk1"/>
+          </a:fontRef>
+        </p:style>
+        <p:txBody>
+          <a:bodyPr rtlCol="0" anchor="ctr"/>
+          <a:lstStyle/>
+          <a:p>
+            <a:pPr algn="ctr"/>
+            <a:r>
+              <a:rPr lang="en-US" sz="1050" dirty="0">
+                <a:solidFill>
+                  <a:srgbClr val="7030A0"/>
+                </a:solidFill>
+              </a:rPr>
+              <a:t>Species</a:t>
+            </a:r>
+            <a:endParaRPr lang="en-SG" sz="1050" dirty="0">
+              <a:solidFill>
+                <a:srgbClr val="7030A0"/>
+              </a:solidFill>
+            </a:endParaRPr>
+          </a:p>
+        </p:txBody>
+      </p:sp>
+      <p:cxnSp>
+        <p:nvCxnSpPr>
+          <p:cNvPr id="232" name="Elbow Connector 80">
+            <a:extLst>
+              <a:ext uri="{FF2B5EF4-FFF2-40B4-BE49-F238E27FC236}">
+                <a16:creationId xmlns:a16="http://schemas.microsoft.com/office/drawing/2014/main" id="{2E9DFACD-CD73-4477-9349-ACFBA77BBEE2}"/>
+              </a:ext>
+            </a:extLst>
+          </p:cNvPr>
+          <p:cNvCxnSpPr>
+            <a:cxnSpLocks/>
+            <a:stCxn id="229" idx="3"/>
+            <a:endCxn id="231" idx="1"/>
+          </p:cNvCxnSpPr>
+          <p:nvPr/>
+        </p:nvCxnSpPr>
+        <p:spPr>
+          <a:xfrm flipV="1">
+            <a:off x="5617351" y="3451150"/>
+            <a:ext cx="461609" cy="1298802"/>
+          </a:xfrm>
+          <a:prstGeom prst="bentConnector3">
+            <a:avLst>
+              <a:gd name="adj1" fmla="val 50000"/>
+            </a:avLst>
+          </a:prstGeom>
+          <a:ln w="19050">
+            <a:solidFill>
+              <a:srgbClr val="7030A0"/>
+            </a:solidFill>
+            <a:headEnd type="none" w="med" len="med"/>
+            <a:tailEnd type="arrow" w="med" len="med"/>
+          </a:ln>
+          <a:effectLst/>
+        </p:spPr>
+        <p:style>
+          <a:lnRef idx="1">
+            <a:schemeClr val="accent2"/>
+          </a:lnRef>
+          <a:fillRef idx="2">
+            <a:schemeClr val="accent2"/>
+          </a:fillRef>
+          <a:effectRef idx="1">
+            <a:schemeClr val="accent2"/>
+          </a:effectRef>
+          <a:fontRef idx="minor">
+            <a:schemeClr val="dk1"/>
+          </a:fontRef>
+        </p:style>
+      </p:cxnSp>
+      <p:sp>
+        <p:nvSpPr>
+          <p:cNvPr id="233" name="Rectangle 8">
+            <a:extLst>
+              <a:ext uri="{FF2B5EF4-FFF2-40B4-BE49-F238E27FC236}">
+                <a16:creationId xmlns:a16="http://schemas.microsoft.com/office/drawing/2014/main" id="{969EB162-2282-49CD-88ED-E762E264C804}"/>
+              </a:ext>
+            </a:extLst>
+          </p:cNvPr>
+          <p:cNvSpPr/>
+          <p:nvPr/>
+        </p:nvSpPr>
+        <p:spPr>
+          <a:xfrm>
+            <a:off x="6078960" y="3631236"/>
+            <a:ext cx="832812" cy="285783"/>
+          </a:xfrm>
+          <a:prstGeom prst="rect">
+            <a:avLst/>
+          </a:prstGeom>
+          <a:ln w="19050">
+            <a:solidFill>
+              <a:srgbClr val="7030A0"/>
+            </a:solidFill>
+          </a:ln>
+          <a:effectLst/>
+        </p:spPr>
+        <p:style>
+          <a:lnRef idx="1">
+            <a:schemeClr val="accent4"/>
+          </a:lnRef>
+          <a:fillRef idx="2">
+            <a:schemeClr val="accent4"/>
+          </a:fillRef>
+          <a:effectRef idx="1">
+            <a:schemeClr val="accent4"/>
+          </a:effectRef>
+          <a:fontRef idx="minor">
+            <a:schemeClr val="dk1"/>
+          </a:fontRef>
+        </p:style>
+        <p:txBody>
+          <a:bodyPr rtlCol="0" anchor="ctr"/>
+          <a:lstStyle/>
+          <a:p>
+            <a:pPr algn="ctr"/>
+            <a:r>
+              <a:rPr lang="en-US" sz="1050" dirty="0">
+                <a:solidFill>
+                  <a:srgbClr val="7030A0"/>
+                </a:solidFill>
+              </a:rPr>
+              <a:t>Breed</a:t>
+            </a:r>
+            <a:endParaRPr lang="en-SG" sz="1050" dirty="0">
+              <a:solidFill>
+                <a:srgbClr val="7030A0"/>
+              </a:solidFill>
+            </a:endParaRPr>
+          </a:p>
+        </p:txBody>
+      </p:sp>
+      <p:cxnSp>
+        <p:nvCxnSpPr>
+          <p:cNvPr id="234" name="Elbow Connector 83">
+            <a:extLst>
+              <a:ext uri="{FF2B5EF4-FFF2-40B4-BE49-F238E27FC236}">
+                <a16:creationId xmlns:a16="http://schemas.microsoft.com/office/drawing/2014/main" id="{56B94D24-A212-4DC2-B447-C15832A14985}"/>
+              </a:ext>
+            </a:extLst>
+          </p:cNvPr>
+          <p:cNvCxnSpPr>
+            <a:cxnSpLocks/>
+            <a:stCxn id="229" idx="3"/>
+            <a:endCxn id="233" idx="1"/>
+          </p:cNvCxnSpPr>
+          <p:nvPr/>
+        </p:nvCxnSpPr>
+        <p:spPr>
+          <a:xfrm flipV="1">
+            <a:off x="5617351" y="3774128"/>
+            <a:ext cx="461609" cy="975824"/>
+          </a:xfrm>
+          <a:prstGeom prst="bentConnector3">
+            <a:avLst>
+              <a:gd name="adj1" fmla="val 50000"/>
+            </a:avLst>
+          </a:prstGeom>
+          <a:ln w="19050">
+            <a:solidFill>
+              <a:srgbClr val="7030A0"/>
+            </a:solidFill>
+            <a:headEnd type="none" w="med" len="med"/>
+            <a:tailEnd type="arrow" w="med" len="med"/>
+          </a:ln>
+          <a:effectLst/>
+        </p:spPr>
+        <p:style>
+          <a:lnRef idx="1">
+            <a:schemeClr val="accent2"/>
+          </a:lnRef>
+          <a:fillRef idx="2">
+            <a:schemeClr val="accent2"/>
+          </a:fillRef>
+          <a:effectRef idx="1">
+            <a:schemeClr val="accent2"/>
+          </a:effectRef>
+          <a:fontRef idx="minor">
+            <a:schemeClr val="dk1"/>
+          </a:fontRef>
+        </p:style>
+      </p:cxnSp>
+      <p:sp>
+        <p:nvSpPr>
+          <p:cNvPr id="235" name="Rectangle 8">
+            <a:extLst>
+              <a:ext uri="{FF2B5EF4-FFF2-40B4-BE49-F238E27FC236}">
+                <a16:creationId xmlns:a16="http://schemas.microsoft.com/office/drawing/2014/main" id="{74033CF8-C497-4C2D-BE87-C4641351258B}"/>
+              </a:ext>
+            </a:extLst>
+          </p:cNvPr>
+          <p:cNvSpPr/>
+          <p:nvPr/>
+        </p:nvSpPr>
+        <p:spPr>
+          <a:xfrm>
+            <a:off x="6078960" y="3954213"/>
+            <a:ext cx="832812" cy="285783"/>
+          </a:xfrm>
+          <a:prstGeom prst="rect">
+            <a:avLst/>
+          </a:prstGeom>
+          <a:ln w="19050">
+            <a:solidFill>
+              <a:srgbClr val="7030A0"/>
+            </a:solidFill>
+          </a:ln>
+          <a:effectLst/>
+        </p:spPr>
+        <p:style>
+          <a:lnRef idx="1">
+            <a:schemeClr val="accent4"/>
+          </a:lnRef>
+          <a:fillRef idx="2">
+            <a:schemeClr val="accent4"/>
+          </a:fillRef>
+          <a:effectRef idx="1">
+            <a:schemeClr val="accent4"/>
+          </a:effectRef>
+          <a:fontRef idx="minor">
+            <a:schemeClr val="dk1"/>
+          </a:fontRef>
+        </p:style>
+        <p:txBody>
+          <a:bodyPr rtlCol="0" anchor="ctr"/>
+          <a:lstStyle/>
+          <a:p>
+            <a:pPr algn="ctr"/>
+            <a:r>
+              <a:rPr lang="en-US" sz="1050" dirty="0">
+                <a:solidFill>
+                  <a:srgbClr val="7030A0"/>
+                </a:solidFill>
+              </a:rPr>
+              <a:t>Color</a:t>
+            </a:r>
+            <a:endParaRPr lang="en-SG" sz="1050" dirty="0">
+              <a:solidFill>
+                <a:srgbClr val="7030A0"/>
+              </a:solidFill>
+            </a:endParaRPr>
+          </a:p>
+        </p:txBody>
+      </p:sp>
+      <p:cxnSp>
+        <p:nvCxnSpPr>
+          <p:cNvPr id="236" name="Elbow Connector 85">
+            <a:extLst>
+              <a:ext uri="{FF2B5EF4-FFF2-40B4-BE49-F238E27FC236}">
+                <a16:creationId xmlns:a16="http://schemas.microsoft.com/office/drawing/2014/main" id="{2DD8B4C0-11EB-4FC2-9014-A8EAC03587AD}"/>
+              </a:ext>
+            </a:extLst>
+          </p:cNvPr>
+          <p:cNvCxnSpPr>
+            <a:cxnSpLocks/>
+            <a:stCxn id="229" idx="3"/>
+            <a:endCxn id="235" idx="1"/>
+          </p:cNvCxnSpPr>
+          <p:nvPr/>
+        </p:nvCxnSpPr>
+        <p:spPr>
+          <a:xfrm flipV="1">
+            <a:off x="5617351" y="4097105"/>
+            <a:ext cx="461609" cy="652847"/>
+          </a:xfrm>
+          <a:prstGeom prst="bentConnector3">
+            <a:avLst>
+              <a:gd name="adj1" fmla="val 50000"/>
+            </a:avLst>
+          </a:prstGeom>
+          <a:ln w="19050">
+            <a:solidFill>
+              <a:srgbClr val="7030A0"/>
+            </a:solidFill>
+            <a:headEnd type="none" w="med" len="med"/>
+            <a:tailEnd type="arrow" w="med" len="med"/>
+          </a:ln>
+          <a:effectLst/>
+        </p:spPr>
+        <p:style>
+          <a:lnRef idx="1">
+            <a:schemeClr val="accent2"/>
+          </a:lnRef>
+          <a:fillRef idx="2">
+            <a:schemeClr val="accent2"/>
+          </a:fillRef>
+          <a:effectRef idx="1">
+            <a:schemeClr val="accent2"/>
+          </a:effectRef>
+          <a:fontRef idx="minor">
+            <a:schemeClr val="dk1"/>
+          </a:fontRef>
+        </p:style>
+      </p:cxnSp>
+      <p:sp>
+        <p:nvSpPr>
+          <p:cNvPr id="237" name="Rectangle 8">
+            <a:extLst>
+              <a:ext uri="{FF2B5EF4-FFF2-40B4-BE49-F238E27FC236}">
+                <a16:creationId xmlns:a16="http://schemas.microsoft.com/office/drawing/2014/main" id="{ABBFC31D-24C1-4E74-9DEF-54063909778C}"/>
+              </a:ext>
+            </a:extLst>
+          </p:cNvPr>
+          <p:cNvSpPr/>
+          <p:nvPr/>
+        </p:nvSpPr>
+        <p:spPr>
+          <a:xfrm>
+            <a:off x="6078959" y="4282941"/>
+            <a:ext cx="830787" cy="285783"/>
+          </a:xfrm>
+          <a:prstGeom prst="rect">
+            <a:avLst/>
+          </a:prstGeom>
+          <a:ln w="19050">
+            <a:solidFill>
+              <a:srgbClr val="7030A0"/>
+            </a:solidFill>
+          </a:ln>
+          <a:effectLst/>
+        </p:spPr>
+        <p:style>
+          <a:lnRef idx="1">
+            <a:schemeClr val="accent4"/>
+          </a:lnRef>
+          <a:fillRef idx="2">
+            <a:schemeClr val="accent4"/>
+          </a:fillRef>
+          <a:effectRef idx="1">
+            <a:schemeClr val="accent4"/>
+          </a:effectRef>
+          <a:fontRef idx="minor">
+            <a:schemeClr val="dk1"/>
+          </a:fontRef>
+        </p:style>
+        <p:txBody>
+          <a:bodyPr rtlCol="0" anchor="ctr"/>
+          <a:lstStyle/>
+          <a:p>
+            <a:pPr algn="ctr"/>
+            <a:r>
+              <a:rPr lang="en-US" sz="1050" dirty="0">
+                <a:solidFill>
+                  <a:srgbClr val="7030A0"/>
+                </a:solidFill>
+              </a:rPr>
+              <a:t>Blood Type</a:t>
+            </a:r>
+            <a:endParaRPr lang="en-SG" sz="1050" dirty="0">
+              <a:solidFill>
+                <a:srgbClr val="7030A0"/>
+              </a:solidFill>
+            </a:endParaRPr>
+          </a:p>
+        </p:txBody>
+      </p:sp>
+      <p:cxnSp>
+        <p:nvCxnSpPr>
+          <p:cNvPr id="238" name="Elbow Connector 85">
+            <a:extLst>
+              <a:ext uri="{FF2B5EF4-FFF2-40B4-BE49-F238E27FC236}">
+                <a16:creationId xmlns:a16="http://schemas.microsoft.com/office/drawing/2014/main" id="{8A1408AC-ED9D-4DD4-8F3F-A9D82BF7C129}"/>
+              </a:ext>
+            </a:extLst>
+          </p:cNvPr>
+          <p:cNvCxnSpPr>
+            <a:cxnSpLocks/>
+            <a:stCxn id="229" idx="3"/>
+            <a:endCxn id="237" idx="1"/>
+          </p:cNvCxnSpPr>
+          <p:nvPr/>
+        </p:nvCxnSpPr>
+        <p:spPr>
+          <a:xfrm flipV="1">
+            <a:off x="5617351" y="4425833"/>
+            <a:ext cx="461608" cy="324119"/>
+          </a:xfrm>
+          <a:prstGeom prst="bentConnector3">
+            <a:avLst>
+              <a:gd name="adj1" fmla="val 50000"/>
+            </a:avLst>
+          </a:prstGeom>
+          <a:ln w="19050">
+            <a:solidFill>
+              <a:srgbClr val="7030A0"/>
+            </a:solidFill>
+            <a:headEnd type="none" w="med" len="med"/>
+            <a:tailEnd type="arrow" w="med" len="med"/>
+          </a:ln>
+          <a:effectLst/>
+        </p:spPr>
+        <p:style>
+          <a:lnRef idx="1">
+            <a:schemeClr val="accent2"/>
+          </a:lnRef>
+          <a:fillRef idx="2">
+            <a:schemeClr val="accent2"/>
+          </a:fillRef>
+          <a:effectRef idx="1">
+            <a:schemeClr val="accent2"/>
+          </a:effectRef>
+          <a:fontRef idx="minor">
+            <a:schemeClr val="dk1"/>
+          </a:fontRef>
+        </p:style>
+      </p:cxnSp>
+      <p:cxnSp>
+        <p:nvCxnSpPr>
+          <p:cNvPr id="403" name="Elbow Connector 49">
+            <a:extLst>
+              <a:ext uri="{FF2B5EF4-FFF2-40B4-BE49-F238E27FC236}">
+                <a16:creationId xmlns:a16="http://schemas.microsoft.com/office/drawing/2014/main" id="{7EE83309-2610-4BD9-81E2-F6E5AD16CF96}"/>
+              </a:ext>
+            </a:extLst>
+          </p:cNvPr>
+          <p:cNvCxnSpPr>
+            <a:cxnSpLocks/>
+          </p:cNvCxnSpPr>
+          <p:nvPr/>
+        </p:nvCxnSpPr>
+        <p:spPr>
+          <a:xfrm rot="5400000" flipH="1" flipV="1">
+            <a:off x="4503832" y="3409549"/>
+            <a:ext cx="1779045" cy="578313"/>
+          </a:xfrm>
+          <a:prstGeom prst="bentConnector3">
+            <a:avLst>
+              <a:gd name="adj1" fmla="val 50000"/>
+            </a:avLst>
+          </a:prstGeom>
+          <a:ln w="19050">
+            <a:solidFill>
+              <a:srgbClr val="7030A0"/>
+            </a:solidFill>
+            <a:headEnd type="none" w="med" len="med"/>
+            <a:tailEnd type="none" w="med" len="med"/>
+          </a:ln>
+          <a:effectLst/>
+        </p:spPr>
+        <p:style>
+          <a:lnRef idx="1">
+            <a:schemeClr val="accent2"/>
+          </a:lnRef>
+          <a:fillRef idx="2">
+            <a:schemeClr val="accent2"/>
+          </a:fillRef>
+          <a:effectRef idx="1">
+            <a:schemeClr val="accent2"/>
+          </a:effectRef>
+          <a:fontRef idx="minor">
+            <a:schemeClr val="dk1"/>
+          </a:fontRef>
+        </p:style>
+      </p:cxnSp>
+      <p:sp>
+        <p:nvSpPr>
+          <p:cNvPr id="409" name="Rectangle 8">
+            <a:extLst>
+              <a:ext uri="{FF2B5EF4-FFF2-40B4-BE49-F238E27FC236}">
+                <a16:creationId xmlns:a16="http://schemas.microsoft.com/office/drawing/2014/main" id="{D393802E-B216-4772-9304-792505D7DC34}"/>
+              </a:ext>
+            </a:extLst>
+          </p:cNvPr>
+          <p:cNvSpPr/>
+          <p:nvPr/>
+        </p:nvSpPr>
+        <p:spPr>
+          <a:xfrm>
+            <a:off x="3682021" y="5266204"/>
+            <a:ext cx="1488088" cy="346760"/>
+          </a:xfrm>
+          <a:prstGeom prst="rect">
+            <a:avLst/>
+          </a:prstGeom>
+          <a:ln w="19050">
+            <a:solidFill>
+              <a:srgbClr val="7030A0"/>
+            </a:solidFill>
+          </a:ln>
+          <a:effectLst/>
+        </p:spPr>
+        <p:style>
+          <a:lnRef idx="1">
+            <a:schemeClr val="accent4"/>
+          </a:lnRef>
+          <a:fillRef idx="2">
+            <a:schemeClr val="accent4"/>
+          </a:fillRef>
+          <a:effectRef idx="1">
+            <a:schemeClr val="accent4"/>
+          </a:effectRef>
+          <a:fontRef idx="minor">
+            <a:schemeClr val="dk1"/>
+          </a:fontRef>
+        </p:style>
+        <p:txBody>
+          <a:bodyPr rtlCol="0" anchor="ctr"/>
+          <a:lstStyle/>
+          <a:p>
+            <a:pPr algn="ctr"/>
+            <a:r>
+              <a:rPr lang="en-US" sz="1050" dirty="0" err="1">
+                <a:solidFill>
+                  <a:srgbClr val="7030A0"/>
+                </a:solidFill>
+              </a:rPr>
+              <a:t>UniqueAppointmentList</a:t>
+            </a:r>
+            <a:endParaRPr lang="en-SG" sz="1050" dirty="0">
+              <a:solidFill>
+                <a:srgbClr val="7030A0"/>
+              </a:solidFill>
+            </a:endParaRPr>
+          </a:p>
+        </p:txBody>
+      </p:sp>
+      <p:cxnSp>
+        <p:nvCxnSpPr>
+          <p:cNvPr id="410" name="Elbow Connector 29">
+            <a:extLst>
+              <a:ext uri="{FF2B5EF4-FFF2-40B4-BE49-F238E27FC236}">
+                <a16:creationId xmlns:a16="http://schemas.microsoft.com/office/drawing/2014/main" id="{8BA34C7F-8E9E-47C9-B39A-405F6947522E}"/>
+              </a:ext>
+            </a:extLst>
+          </p:cNvPr>
+          <p:cNvCxnSpPr>
+            <a:cxnSpLocks/>
+            <a:stCxn id="51" idx="3"/>
+            <a:endCxn id="409" idx="1"/>
+          </p:cNvCxnSpPr>
+          <p:nvPr/>
+        </p:nvCxnSpPr>
+        <p:spPr>
+          <a:xfrm>
+            <a:off x="3307860" y="3118900"/>
+            <a:ext cx="374161" cy="2320684"/>
+          </a:xfrm>
+          <a:prstGeom prst="bentConnector3">
+            <a:avLst>
+              <a:gd name="adj1" fmla="val 50001"/>
+            </a:avLst>
+          </a:prstGeom>
+          <a:ln w="19050">
+            <a:solidFill>
+              <a:srgbClr val="7030A0"/>
+            </a:solidFill>
+            <a:headEnd type="none" w="med" len="med"/>
+            <a:tailEnd type="arrow" w="med" len="med"/>
+          </a:ln>
+          <a:effectLst/>
+        </p:spPr>
+        <p:style>
+          <a:lnRef idx="1">
+            <a:schemeClr val="accent2"/>
+          </a:lnRef>
+          <a:fillRef idx="2">
+            <a:schemeClr val="accent2"/>
+          </a:fillRef>
+          <a:effectRef idx="1">
+            <a:schemeClr val="accent2"/>
+          </a:effectRef>
+          <a:fontRef idx="minor">
+            <a:schemeClr val="dk1"/>
+          </a:fontRef>
+        </p:style>
+      </p:cxnSp>
+      <p:sp>
+        <p:nvSpPr>
+          <p:cNvPr id="411" name="Rectangle 8">
+            <a:extLst>
+              <a:ext uri="{FF2B5EF4-FFF2-40B4-BE49-F238E27FC236}">
+                <a16:creationId xmlns:a16="http://schemas.microsoft.com/office/drawing/2014/main" id="{0F065C2F-6920-4C27-983F-FE8DFB5C743C}"/>
+              </a:ext>
+            </a:extLst>
+          </p:cNvPr>
+          <p:cNvSpPr/>
+          <p:nvPr/>
+        </p:nvSpPr>
+        <p:spPr>
+          <a:xfrm>
+            <a:off x="6548090" y="5269845"/>
+            <a:ext cx="992044" cy="346760"/>
+          </a:xfrm>
+          <a:prstGeom prst="rect">
+            <a:avLst/>
+          </a:prstGeom>
+          <a:ln w="19050">
+            <a:solidFill>
+              <a:srgbClr val="7030A0"/>
+            </a:solidFill>
+          </a:ln>
+          <a:effectLst/>
+        </p:spPr>
+        <p:style>
+          <a:lnRef idx="1">
+            <a:schemeClr val="accent4"/>
+          </a:lnRef>
+          <a:fillRef idx="2">
+            <a:schemeClr val="accent4"/>
+          </a:fillRef>
+          <a:effectRef idx="1">
+            <a:schemeClr val="accent4"/>
+          </a:effectRef>
+          <a:fontRef idx="minor">
+            <a:schemeClr val="dk1"/>
+          </a:fontRef>
+        </p:style>
+        <p:txBody>
+          <a:bodyPr rtlCol="0" anchor="ctr"/>
+          <a:lstStyle/>
+          <a:p>
+            <a:pPr algn="ctr"/>
+            <a:r>
+              <a:rPr lang="en-US" sz="1050" dirty="0">
+                <a:solidFill>
+                  <a:srgbClr val="7030A0"/>
+                </a:solidFill>
+              </a:rPr>
+              <a:t>Appointment</a:t>
+            </a:r>
+            <a:endParaRPr lang="en-SG" sz="1050" dirty="0">
+              <a:solidFill>
+                <a:srgbClr val="7030A0"/>
+              </a:solidFill>
+            </a:endParaRPr>
+          </a:p>
+        </p:txBody>
+      </p:sp>
+      <p:cxnSp>
+        <p:nvCxnSpPr>
+          <p:cNvPr id="412" name="Elbow Connector 63">
+            <a:extLst>
+              <a:ext uri="{FF2B5EF4-FFF2-40B4-BE49-F238E27FC236}">
+                <a16:creationId xmlns:a16="http://schemas.microsoft.com/office/drawing/2014/main" id="{C1ADFF4F-7EF4-4F1A-A36D-1B270187894A}"/>
+              </a:ext>
+            </a:extLst>
+          </p:cNvPr>
+          <p:cNvCxnSpPr>
+            <a:cxnSpLocks/>
+            <a:stCxn id="414" idx="3"/>
+            <a:endCxn id="411" idx="1"/>
+          </p:cNvCxnSpPr>
+          <p:nvPr/>
+        </p:nvCxnSpPr>
+        <p:spPr>
+          <a:xfrm>
+            <a:off x="5410637" y="5433127"/>
+            <a:ext cx="1137453" cy="10098"/>
+          </a:xfrm>
+          <a:prstGeom prst="straightConnector1">
+            <a:avLst/>
+          </a:prstGeom>
+          <a:ln w="19050">
+            <a:solidFill>
+              <a:srgbClr val="7030A0"/>
+            </a:solidFill>
+            <a:headEnd type="none" w="med" len="med"/>
+            <a:tailEnd type="arrow" w="med" len="med"/>
+          </a:ln>
+          <a:effectLst/>
+        </p:spPr>
+        <p:style>
+          <a:lnRef idx="1">
+            <a:schemeClr val="accent2"/>
+          </a:lnRef>
+          <a:fillRef idx="2">
+            <a:schemeClr val="accent2"/>
+          </a:fillRef>
+          <a:effectRef idx="1">
+            <a:schemeClr val="accent2"/>
+          </a:effectRef>
+          <a:fontRef idx="minor">
+            <a:schemeClr val="dk1"/>
+          </a:fontRef>
+        </p:style>
+      </p:cxnSp>
+      <p:sp>
+        <p:nvSpPr>
+          <p:cNvPr id="413" name="TextBox 412">
+            <a:extLst>
+              <a:ext uri="{FF2B5EF4-FFF2-40B4-BE49-F238E27FC236}">
+                <a16:creationId xmlns:a16="http://schemas.microsoft.com/office/drawing/2014/main" id="{D0BCFE66-71CD-43B8-9534-497B019F0B34}"/>
+              </a:ext>
+            </a:extLst>
+          </p:cNvPr>
+          <p:cNvSpPr txBox="1"/>
+          <p:nvPr/>
+        </p:nvSpPr>
+        <p:spPr>
+          <a:xfrm>
+            <a:off x="6358986" y="5246551"/>
+            <a:ext cx="177811" cy="183586"/>
+          </a:xfrm>
+          <a:prstGeom prst="rect">
+            <a:avLst/>
+          </a:prstGeom>
+          <a:noFill/>
+        </p:spPr>
+        <p:txBody>
+          <a:bodyPr wrap="square" lIns="0" tIns="0" rIns="0" bIns="0" rtlCol="0">
+            <a:noAutofit/>
+          </a:bodyPr>
+          <a:lstStyle/>
+          <a:p>
+            <a:pPr algn="ctr"/>
+            <a:r>
+              <a:rPr lang="en-US" sz="1100" dirty="0">
+                <a:solidFill>
+                  <a:srgbClr val="7030A0"/>
+                </a:solidFill>
+              </a:rPr>
+              <a:t>*</a:t>
+            </a:r>
+            <a:endParaRPr lang="en-SG" sz="1100" dirty="0">
+              <a:solidFill>
+                <a:srgbClr val="7030A0"/>
+              </a:solidFill>
+            </a:endParaRPr>
+          </a:p>
+        </p:txBody>
+      </p:sp>
+      <p:sp>
+        <p:nvSpPr>
+          <p:cNvPr id="414" name="Flowchart: Decision 96">
+            <a:extLst>
+              <a:ext uri="{FF2B5EF4-FFF2-40B4-BE49-F238E27FC236}">
+                <a16:creationId xmlns:a16="http://schemas.microsoft.com/office/drawing/2014/main" id="{1D73E84C-4034-4AB3-8BE1-C580897BD5C8}"/>
+              </a:ext>
+            </a:extLst>
+          </p:cNvPr>
+          <p:cNvSpPr/>
+          <p:nvPr/>
+        </p:nvSpPr>
+        <p:spPr>
+          <a:xfrm>
+            <a:off x="5174589" y="5346437"/>
+            <a:ext cx="236048" cy="173380"/>
+          </a:xfrm>
+          <a:prstGeom prst="flowChartDecision">
+            <a:avLst/>
+          </a:prstGeom>
+          <a:noFill/>
+          <a:ln w="19050">
+            <a:solidFill>
+              <a:srgbClr val="7030A0"/>
+            </a:solidFill>
+          </a:ln>
+          <a:effectLst/>
+        </p:spPr>
+        <p:style>
+          <a:lnRef idx="1">
+            <a:schemeClr val="accent6"/>
+          </a:lnRef>
+          <a:fillRef idx="2">
+            <a:schemeClr val="accent6"/>
+          </a:fillRef>
+          <a:effectRef idx="1">
+            <a:schemeClr val="accent6"/>
+          </a:effectRef>
+          <a:fontRef idx="minor">
+            <a:schemeClr val="dk1"/>
+          </a:fontRef>
+        </p:style>
+        <p:txBody>
+          <a:bodyPr rtlCol="0" anchor="ctr"/>
+          <a:lstStyle/>
+          <a:p>
+            <a:pPr algn="ctr"/>
+            <a:endParaRPr lang="en-US" sz="1050"/>
+          </a:p>
+        </p:txBody>
+      </p:sp>
+      <p:sp>
+        <p:nvSpPr>
+          <p:cNvPr id="415" name="Rectangle 8">
+            <a:extLst>
+              <a:ext uri="{FF2B5EF4-FFF2-40B4-BE49-F238E27FC236}">
+                <a16:creationId xmlns:a16="http://schemas.microsoft.com/office/drawing/2014/main" id="{B052ED5C-9F72-4270-AFDC-96A3F4DA6B17}"/>
+              </a:ext>
+            </a:extLst>
+          </p:cNvPr>
+          <p:cNvSpPr/>
+          <p:nvPr/>
+        </p:nvSpPr>
+        <p:spPr>
+          <a:xfrm>
+            <a:off x="8158788" y="4409102"/>
+            <a:ext cx="832812" cy="285783"/>
+          </a:xfrm>
+          <a:prstGeom prst="rect">
+            <a:avLst/>
+          </a:prstGeom>
+          <a:ln w="19050">
+            <a:solidFill>
+              <a:srgbClr val="7030A0"/>
+            </a:solidFill>
+          </a:ln>
+          <a:effectLst/>
+        </p:spPr>
+        <p:style>
+          <a:lnRef idx="1">
+            <a:schemeClr val="accent4"/>
+          </a:lnRef>
+          <a:fillRef idx="2">
+            <a:schemeClr val="accent4"/>
+          </a:fillRef>
+          <a:effectRef idx="1">
+            <a:schemeClr val="accent4"/>
+          </a:effectRef>
+          <a:fontRef idx="minor">
+            <a:schemeClr val="dk1"/>
+          </a:fontRef>
+        </p:style>
+        <p:txBody>
+          <a:bodyPr rtlCol="0" anchor="ctr"/>
+          <a:lstStyle/>
+          <a:p>
+            <a:pPr algn="ctr"/>
+            <a:r>
+              <a:rPr lang="en-US" sz="1050" dirty="0" err="1">
+                <a:solidFill>
+                  <a:srgbClr val="7030A0"/>
+                </a:solidFill>
+              </a:rPr>
+              <a:t>Nric</a:t>
+            </a:r>
+            <a:endParaRPr lang="en-SG" sz="1050" dirty="0">
+              <a:solidFill>
+                <a:srgbClr val="7030A0"/>
+              </a:solidFill>
+            </a:endParaRPr>
+          </a:p>
+        </p:txBody>
+      </p:sp>
+      <p:sp>
+        <p:nvSpPr>
+          <p:cNvPr id="416" name="Flowchart: Decision 96">
+            <a:extLst>
+              <a:ext uri="{FF2B5EF4-FFF2-40B4-BE49-F238E27FC236}">
+                <a16:creationId xmlns:a16="http://schemas.microsoft.com/office/drawing/2014/main" id="{E4028C24-5332-45CD-9424-29C20ED7FA7C}"/>
+              </a:ext>
+            </a:extLst>
+          </p:cNvPr>
+          <p:cNvSpPr/>
+          <p:nvPr/>
+        </p:nvSpPr>
+        <p:spPr>
+          <a:xfrm>
+            <a:off x="7540134" y="5346184"/>
+            <a:ext cx="236048" cy="173380"/>
+          </a:xfrm>
+          <a:prstGeom prst="flowChartDecision">
+            <a:avLst/>
+          </a:prstGeom>
+          <a:solidFill>
+            <a:srgbClr val="7030A0"/>
+          </a:solidFill>
+          <a:ln w="19050">
+            <a:solidFill>
+              <a:srgbClr val="7030A0"/>
+            </a:solidFill>
+          </a:ln>
+          <a:effectLst/>
+        </p:spPr>
+        <p:style>
+          <a:lnRef idx="1">
+            <a:schemeClr val="accent6"/>
+          </a:lnRef>
+          <a:fillRef idx="2">
+            <a:schemeClr val="accent6"/>
+          </a:fillRef>
+          <a:effectRef idx="1">
+            <a:schemeClr val="accent6"/>
+          </a:effectRef>
+          <a:fontRef idx="minor">
+            <a:schemeClr val="dk1"/>
+          </a:fontRef>
+        </p:style>
+        <p:txBody>
+          <a:bodyPr rtlCol="0" anchor="ctr"/>
+          <a:lstStyle/>
+          <a:p>
+            <a:pPr algn="ctr"/>
+            <a:endParaRPr lang="en-US" sz="1050"/>
+          </a:p>
+        </p:txBody>
+      </p:sp>
+      <p:cxnSp>
+        <p:nvCxnSpPr>
+          <p:cNvPr id="417" name="Elbow Connector 78">
+            <a:extLst>
+              <a:ext uri="{FF2B5EF4-FFF2-40B4-BE49-F238E27FC236}">
+                <a16:creationId xmlns:a16="http://schemas.microsoft.com/office/drawing/2014/main" id="{2BD04FB6-8474-4F41-94FB-986F58D46443}"/>
+              </a:ext>
+            </a:extLst>
+          </p:cNvPr>
+          <p:cNvCxnSpPr>
+            <a:cxnSpLocks/>
+            <a:stCxn id="416" idx="3"/>
+            <a:endCxn id="415" idx="1"/>
+          </p:cNvCxnSpPr>
+          <p:nvPr/>
+        </p:nvCxnSpPr>
+        <p:spPr>
+          <a:xfrm flipV="1">
+            <a:off x="7776182" y="4551994"/>
+            <a:ext cx="382606" cy="880880"/>
+          </a:xfrm>
+          <a:prstGeom prst="bentConnector3">
+            <a:avLst>
+              <a:gd name="adj1" fmla="val 50000"/>
+            </a:avLst>
+          </a:prstGeom>
+          <a:ln w="19050">
+            <a:solidFill>
+              <a:srgbClr val="7030A0"/>
+            </a:solidFill>
+            <a:headEnd type="none" w="med" len="med"/>
+            <a:tailEnd type="arrow" w="med" len="med"/>
+          </a:ln>
+          <a:effectLst/>
+        </p:spPr>
+        <p:style>
+          <a:lnRef idx="1">
+            <a:schemeClr val="accent2"/>
+          </a:lnRef>
+          <a:fillRef idx="2">
+            <a:schemeClr val="accent2"/>
+          </a:fillRef>
+          <a:effectRef idx="1">
+            <a:schemeClr val="accent2"/>
+          </a:effectRef>
+          <a:fontRef idx="minor">
+            <a:schemeClr val="dk1"/>
+          </a:fontRef>
+        </p:style>
+      </p:cxnSp>
+      <p:sp>
+        <p:nvSpPr>
+          <p:cNvPr id="418" name="Rectangle 8">
+            <a:extLst>
+              <a:ext uri="{FF2B5EF4-FFF2-40B4-BE49-F238E27FC236}">
+                <a16:creationId xmlns:a16="http://schemas.microsoft.com/office/drawing/2014/main" id="{7E98E0CA-4FFB-4199-8500-827FE763CDD4}"/>
+              </a:ext>
+            </a:extLst>
+          </p:cNvPr>
+          <p:cNvSpPr/>
+          <p:nvPr/>
+        </p:nvSpPr>
+        <p:spPr>
+          <a:xfrm>
+            <a:off x="8158788" y="4732080"/>
+            <a:ext cx="832812" cy="285783"/>
+          </a:xfrm>
+          <a:prstGeom prst="rect">
+            <a:avLst/>
+          </a:prstGeom>
+          <a:ln w="19050">
+            <a:solidFill>
+              <a:srgbClr val="7030A0"/>
+            </a:solidFill>
+          </a:ln>
+          <a:effectLst/>
+        </p:spPr>
+        <p:style>
+          <a:lnRef idx="1">
+            <a:schemeClr val="accent4"/>
+          </a:lnRef>
+          <a:fillRef idx="2">
+            <a:schemeClr val="accent4"/>
+          </a:fillRef>
+          <a:effectRef idx="1">
+            <a:schemeClr val="accent4"/>
+          </a:effectRef>
+          <a:fontRef idx="minor">
+            <a:schemeClr val="dk1"/>
+          </a:fontRef>
+        </p:style>
+        <p:txBody>
+          <a:bodyPr rtlCol="0" anchor="ctr"/>
+          <a:lstStyle/>
+          <a:p>
+            <a:pPr algn="ctr"/>
+            <a:r>
+              <a:rPr lang="en-US" sz="1050" dirty="0">
+                <a:solidFill>
+                  <a:srgbClr val="7030A0"/>
+                </a:solidFill>
+              </a:rPr>
+              <a:t>Name</a:t>
+            </a:r>
+            <a:endParaRPr lang="en-SG" sz="1050" dirty="0">
+              <a:solidFill>
+                <a:srgbClr val="7030A0"/>
+              </a:solidFill>
+            </a:endParaRPr>
+          </a:p>
+        </p:txBody>
+      </p:sp>
+      <p:cxnSp>
+        <p:nvCxnSpPr>
+          <p:cNvPr id="419" name="Elbow Connector 80">
+            <a:extLst>
+              <a:ext uri="{FF2B5EF4-FFF2-40B4-BE49-F238E27FC236}">
+                <a16:creationId xmlns:a16="http://schemas.microsoft.com/office/drawing/2014/main" id="{E2BD9551-CA8E-42A3-A729-B55471D8D086}"/>
+              </a:ext>
+            </a:extLst>
+          </p:cNvPr>
+          <p:cNvCxnSpPr>
+            <a:cxnSpLocks/>
+            <a:stCxn id="416" idx="3"/>
+            <a:endCxn id="418" idx="1"/>
+          </p:cNvCxnSpPr>
+          <p:nvPr/>
+        </p:nvCxnSpPr>
+        <p:spPr>
+          <a:xfrm flipV="1">
+            <a:off x="7776182" y="4874972"/>
+            <a:ext cx="382606" cy="557902"/>
+          </a:xfrm>
+          <a:prstGeom prst="bentConnector3">
+            <a:avLst>
+              <a:gd name="adj1" fmla="val 50000"/>
+            </a:avLst>
+          </a:prstGeom>
+          <a:ln w="19050">
+            <a:solidFill>
+              <a:srgbClr val="7030A0"/>
+            </a:solidFill>
+            <a:headEnd type="none" w="med" len="med"/>
+            <a:tailEnd type="arrow" w="med" len="med"/>
+          </a:ln>
+          <a:effectLst/>
+        </p:spPr>
+        <p:style>
+          <a:lnRef idx="1">
+            <a:schemeClr val="accent2"/>
+          </a:lnRef>
+          <a:fillRef idx="2">
+            <a:schemeClr val="accent2"/>
+          </a:fillRef>
+          <a:effectRef idx="1">
+            <a:schemeClr val="accent2"/>
+          </a:effectRef>
+          <a:fontRef idx="minor">
+            <a:schemeClr val="dk1"/>
+          </a:fontRef>
+        </p:style>
+      </p:cxnSp>
+      <p:sp>
+        <p:nvSpPr>
+          <p:cNvPr id="420" name="Rectangle 8">
+            <a:extLst>
+              <a:ext uri="{FF2B5EF4-FFF2-40B4-BE49-F238E27FC236}">
+                <a16:creationId xmlns:a16="http://schemas.microsoft.com/office/drawing/2014/main" id="{2832BB2F-05E2-42E5-AE7A-D19937C5303A}"/>
+              </a:ext>
+            </a:extLst>
+          </p:cNvPr>
+          <p:cNvSpPr/>
+          <p:nvPr/>
+        </p:nvSpPr>
+        <p:spPr>
+          <a:xfrm>
+            <a:off x="8158788" y="5055058"/>
+            <a:ext cx="832812" cy="285783"/>
+          </a:xfrm>
+          <a:prstGeom prst="rect">
+            <a:avLst/>
+          </a:prstGeom>
+          <a:ln w="19050">
+            <a:solidFill>
+              <a:srgbClr val="7030A0"/>
+            </a:solidFill>
+          </a:ln>
+          <a:effectLst/>
+        </p:spPr>
+        <p:style>
+          <a:lnRef idx="1">
+            <a:schemeClr val="accent4"/>
+          </a:lnRef>
+          <a:fillRef idx="2">
+            <a:schemeClr val="accent4"/>
+          </a:fillRef>
+          <a:effectRef idx="1">
+            <a:schemeClr val="accent4"/>
+          </a:effectRef>
+          <a:fontRef idx="minor">
+            <a:schemeClr val="dk1"/>
+          </a:fontRef>
+        </p:style>
+        <p:txBody>
+          <a:bodyPr rtlCol="0" anchor="ctr"/>
+          <a:lstStyle/>
+          <a:p>
+            <a:pPr algn="ctr"/>
+            <a:r>
+              <a:rPr lang="en-US" sz="1050" dirty="0">
+                <a:solidFill>
+                  <a:srgbClr val="7030A0"/>
+                </a:solidFill>
+              </a:rPr>
+              <a:t>Date Time</a:t>
+            </a:r>
+            <a:endParaRPr lang="en-SG" sz="1050" dirty="0">
+              <a:solidFill>
+                <a:srgbClr val="7030A0"/>
+              </a:solidFill>
+            </a:endParaRPr>
+          </a:p>
+        </p:txBody>
+      </p:sp>
+      <p:cxnSp>
+        <p:nvCxnSpPr>
+          <p:cNvPr id="421" name="Elbow Connector 83">
+            <a:extLst>
+              <a:ext uri="{FF2B5EF4-FFF2-40B4-BE49-F238E27FC236}">
+                <a16:creationId xmlns:a16="http://schemas.microsoft.com/office/drawing/2014/main" id="{B051B458-04B4-4CAC-8A24-F313E866AB00}"/>
+              </a:ext>
+            </a:extLst>
+          </p:cNvPr>
+          <p:cNvCxnSpPr>
+            <a:cxnSpLocks/>
+            <a:stCxn id="416" idx="3"/>
+            <a:endCxn id="420" idx="1"/>
+          </p:cNvCxnSpPr>
+          <p:nvPr/>
+        </p:nvCxnSpPr>
+        <p:spPr>
+          <a:xfrm flipV="1">
+            <a:off x="7776182" y="5197950"/>
+            <a:ext cx="382606" cy="234924"/>
+          </a:xfrm>
+          <a:prstGeom prst="bentConnector3">
+            <a:avLst>
+              <a:gd name="adj1" fmla="val 50000"/>
+            </a:avLst>
+          </a:prstGeom>
+          <a:ln w="19050">
+            <a:solidFill>
+              <a:srgbClr val="7030A0"/>
+            </a:solidFill>
+            <a:headEnd type="none" w="med" len="med"/>
+            <a:tailEnd type="arrow" w="med" len="med"/>
+          </a:ln>
+          <a:effectLst/>
+        </p:spPr>
+        <p:style>
+          <a:lnRef idx="1">
+            <a:schemeClr val="accent2"/>
+          </a:lnRef>
+          <a:fillRef idx="2">
+            <a:schemeClr val="accent2"/>
+          </a:fillRef>
+          <a:effectRef idx="1">
+            <a:schemeClr val="accent2"/>
+          </a:effectRef>
+          <a:fontRef idx="minor">
+            <a:schemeClr val="dk1"/>
+          </a:fontRef>
+        </p:style>
+      </p:cxnSp>
+      <p:sp>
+        <p:nvSpPr>
+          <p:cNvPr id="422" name="Rectangle 8">
+            <a:extLst>
+              <a:ext uri="{FF2B5EF4-FFF2-40B4-BE49-F238E27FC236}">
+                <a16:creationId xmlns:a16="http://schemas.microsoft.com/office/drawing/2014/main" id="{FDA3661A-000F-427D-BF63-C6CCF8333A63}"/>
+              </a:ext>
+            </a:extLst>
+          </p:cNvPr>
+          <p:cNvSpPr/>
+          <p:nvPr/>
+        </p:nvSpPr>
+        <p:spPr>
+          <a:xfrm>
+            <a:off x="8158788" y="5378035"/>
+            <a:ext cx="832812" cy="285783"/>
+          </a:xfrm>
+          <a:prstGeom prst="rect">
+            <a:avLst/>
+          </a:prstGeom>
+          <a:ln w="19050">
+            <a:solidFill>
+              <a:srgbClr val="7030A0"/>
+            </a:solidFill>
+          </a:ln>
+          <a:effectLst/>
+        </p:spPr>
+        <p:style>
+          <a:lnRef idx="1">
+            <a:schemeClr val="accent4"/>
+          </a:lnRef>
+          <a:fillRef idx="2">
+            <a:schemeClr val="accent4"/>
+          </a:fillRef>
+          <a:effectRef idx="1">
+            <a:schemeClr val="accent4"/>
+          </a:effectRef>
+          <a:fontRef idx="minor">
+            <a:schemeClr val="dk1"/>
+          </a:fontRef>
+        </p:style>
+        <p:txBody>
+          <a:bodyPr rtlCol="0" anchor="ctr"/>
+          <a:lstStyle/>
+          <a:p>
+            <a:pPr algn="ctr"/>
+            <a:r>
+              <a:rPr lang="en-US" sz="1050" dirty="0">
+                <a:solidFill>
+                  <a:srgbClr val="7030A0"/>
+                </a:solidFill>
+              </a:rPr>
+              <a:t>Remarks</a:t>
+            </a:r>
+            <a:endParaRPr lang="en-SG" sz="1050" dirty="0">
+              <a:solidFill>
+                <a:srgbClr val="7030A0"/>
+              </a:solidFill>
+            </a:endParaRPr>
+          </a:p>
+        </p:txBody>
+      </p:sp>
+      <p:cxnSp>
+        <p:nvCxnSpPr>
+          <p:cNvPr id="423" name="Elbow Connector 85">
+            <a:extLst>
+              <a:ext uri="{FF2B5EF4-FFF2-40B4-BE49-F238E27FC236}">
+                <a16:creationId xmlns:a16="http://schemas.microsoft.com/office/drawing/2014/main" id="{B5CFDE29-7008-476F-9490-2CF6A650082D}"/>
+              </a:ext>
+            </a:extLst>
+          </p:cNvPr>
+          <p:cNvCxnSpPr>
+            <a:cxnSpLocks/>
+            <a:stCxn id="416" idx="3"/>
+            <a:endCxn id="422" idx="1"/>
+          </p:cNvCxnSpPr>
+          <p:nvPr/>
+        </p:nvCxnSpPr>
+        <p:spPr>
+          <a:xfrm>
+            <a:off x="7776182" y="5432874"/>
+            <a:ext cx="382606" cy="88053"/>
+          </a:xfrm>
+          <a:prstGeom prst="bentConnector3">
+            <a:avLst>
+              <a:gd name="adj1" fmla="val 50000"/>
+            </a:avLst>
+          </a:prstGeom>
+          <a:ln w="19050">
+            <a:solidFill>
+              <a:srgbClr val="7030A0"/>
+            </a:solidFill>
+            <a:headEnd type="none" w="med" len="med"/>
+            <a:tailEnd type="arrow" w="med" len="med"/>
+          </a:ln>
+          <a:effectLst/>
+        </p:spPr>
+        <p:style>
+          <a:lnRef idx="1">
+            <a:schemeClr val="accent2"/>
+          </a:lnRef>
+          <a:fillRef idx="2">
+            <a:schemeClr val="accent2"/>
+          </a:fillRef>
+          <a:effectRef idx="1">
+            <a:schemeClr val="accent2"/>
+          </a:effectRef>
+          <a:fontRef idx="minor">
+            <a:schemeClr val="dk1"/>
+          </a:fontRef>
+        </p:style>
+      </p:cxnSp>
+      <p:sp>
+        <p:nvSpPr>
+          <p:cNvPr id="436" name="Rectangle 8">
+            <a:extLst>
+              <a:ext uri="{FF2B5EF4-FFF2-40B4-BE49-F238E27FC236}">
+                <a16:creationId xmlns:a16="http://schemas.microsoft.com/office/drawing/2014/main" id="{E2E03CA4-2494-4B07-9DE2-66844FAFBC1E}"/>
+              </a:ext>
+            </a:extLst>
+          </p:cNvPr>
+          <p:cNvSpPr/>
+          <p:nvPr/>
+        </p:nvSpPr>
+        <p:spPr>
+          <a:xfrm>
+            <a:off x="6078959" y="4607061"/>
+            <a:ext cx="830787" cy="285783"/>
+          </a:xfrm>
+          <a:prstGeom prst="rect">
+            <a:avLst/>
+          </a:prstGeom>
+          <a:ln w="19050">
+            <a:solidFill>
+              <a:srgbClr val="7030A0"/>
+            </a:solidFill>
+          </a:ln>
+          <a:effectLst/>
+        </p:spPr>
+        <p:style>
+          <a:lnRef idx="1">
+            <a:schemeClr val="accent4"/>
+          </a:lnRef>
+          <a:fillRef idx="2">
+            <a:schemeClr val="accent4"/>
+          </a:fillRef>
+          <a:effectRef idx="1">
+            <a:schemeClr val="accent4"/>
+          </a:effectRef>
+          <a:fontRef idx="minor">
+            <a:schemeClr val="dk1"/>
+          </a:fontRef>
+        </p:style>
+        <p:txBody>
+          <a:bodyPr rtlCol="0" anchor="ctr"/>
+          <a:lstStyle/>
+          <a:p>
+            <a:pPr algn="ctr"/>
+            <a:r>
+              <a:rPr lang="en-US" sz="1050" dirty="0">
+                <a:solidFill>
+                  <a:srgbClr val="7030A0"/>
+                </a:solidFill>
+              </a:rPr>
+              <a:t>Name</a:t>
+            </a:r>
+            <a:endParaRPr lang="en-SG" sz="1050" dirty="0">
+              <a:solidFill>
+                <a:srgbClr val="7030A0"/>
+              </a:solidFill>
+            </a:endParaRPr>
+          </a:p>
+        </p:txBody>
+      </p:sp>
+      <p:cxnSp>
+        <p:nvCxnSpPr>
+          <p:cNvPr id="437" name="Elbow Connector 85">
+            <a:extLst>
+              <a:ext uri="{FF2B5EF4-FFF2-40B4-BE49-F238E27FC236}">
+                <a16:creationId xmlns:a16="http://schemas.microsoft.com/office/drawing/2014/main" id="{3F05E7CA-E986-44E3-8800-2B283B30707B}"/>
+              </a:ext>
+            </a:extLst>
+          </p:cNvPr>
+          <p:cNvCxnSpPr>
+            <a:cxnSpLocks/>
+            <a:stCxn id="229" idx="3"/>
+            <a:endCxn id="436" idx="1"/>
+          </p:cNvCxnSpPr>
+          <p:nvPr/>
+        </p:nvCxnSpPr>
+        <p:spPr>
+          <a:xfrm>
+            <a:off x="5617351" y="4749952"/>
+            <a:ext cx="461608" cy="1"/>
+          </a:xfrm>
+          <a:prstGeom prst="straightConnector1">
+            <a:avLst/>
+          </a:prstGeom>
+          <a:ln w="19050">
+            <a:solidFill>
+              <a:srgbClr val="7030A0"/>
+            </a:solidFill>
+            <a:headEnd type="none" w="med" len="med"/>
+            <a:tailEnd type="arrow" w="med" len="med"/>
+          </a:ln>
+          <a:effectLst/>
+        </p:spPr>
+        <p:style>
+          <a:lnRef idx="1">
+            <a:schemeClr val="accent2"/>
+          </a:lnRef>
+          <a:fillRef idx="2">
+            <a:schemeClr val="accent2"/>
+          </a:fillRef>
+          <a:effectRef idx="1">
+            <a:schemeClr val="accent2"/>
+          </a:effectRef>
+          <a:fontRef idx="minor">
+            <a:schemeClr val="dk1"/>
+          </a:fontRef>
+        </p:style>
+      </p:cxnSp>
+      <p:cxnSp>
+        <p:nvCxnSpPr>
+          <p:cNvPr id="534" name="Elbow Connector 49">
+            <a:extLst>
+              <a:ext uri="{FF2B5EF4-FFF2-40B4-BE49-F238E27FC236}">
+                <a16:creationId xmlns:a16="http://schemas.microsoft.com/office/drawing/2014/main" id="{888A1DB4-22B9-4925-8519-771D3055E2DB}"/>
+              </a:ext>
+            </a:extLst>
+          </p:cNvPr>
+          <p:cNvCxnSpPr>
+            <a:cxnSpLocks/>
+            <a:stCxn id="411" idx="0"/>
+          </p:cNvCxnSpPr>
+          <p:nvPr/>
+        </p:nvCxnSpPr>
+        <p:spPr>
+          <a:xfrm rot="16200000" flipV="1">
+            <a:off x="5489368" y="3715101"/>
+            <a:ext cx="2460663" cy="648826"/>
+          </a:xfrm>
+          <a:prstGeom prst="bentConnector3">
+            <a:avLst>
+              <a:gd name="adj1" fmla="val 99935"/>
+            </a:avLst>
+          </a:prstGeom>
+          <a:ln w="19050">
+            <a:solidFill>
+              <a:srgbClr val="7030A0"/>
+            </a:solidFill>
+            <a:headEnd type="none" w="med" len="med"/>
+            <a:tailEnd type="none" w="med" len="med"/>
+          </a:ln>
+          <a:effectLst/>
+        </p:spPr>
+        <p:style>
+          <a:lnRef idx="1">
+            <a:schemeClr val="accent2"/>
+          </a:lnRef>
+          <a:fillRef idx="2">
+            <a:schemeClr val="accent2"/>
+          </a:fillRef>
+          <a:effectRef idx="1">
+            <a:schemeClr val="accent2"/>
+          </a:effectRef>
+          <a:fontRef idx="minor">
+            <a:schemeClr val="dk1"/>
+          </a:fontRef>
+        </p:style>
+      </p:cxnSp>
+      <p:sp>
+        <p:nvSpPr>
+          <p:cNvPr id="569" name="TextBox 568">
+            <a:extLst>
+              <a:ext uri="{FF2B5EF4-FFF2-40B4-BE49-F238E27FC236}">
+                <a16:creationId xmlns:a16="http://schemas.microsoft.com/office/drawing/2014/main" id="{4DCEB95D-5B44-45CB-A309-07C86EE41346}"/>
+              </a:ext>
+            </a:extLst>
+          </p:cNvPr>
+          <p:cNvSpPr txBox="1"/>
+          <p:nvPr/>
+        </p:nvSpPr>
+        <p:spPr>
+          <a:xfrm>
+            <a:off x="3494940" y="5199352"/>
+            <a:ext cx="189257" cy="178683"/>
+          </a:xfrm>
+          <a:prstGeom prst="rect">
+            <a:avLst/>
+          </a:prstGeom>
+          <a:noFill/>
+        </p:spPr>
+        <p:txBody>
+          <a:bodyPr wrap="square" lIns="0" tIns="0" rIns="0" bIns="0" rtlCol="0">
+            <a:noAutofit/>
+          </a:bodyPr>
+          <a:lstStyle/>
+          <a:p>
+            <a:pPr algn="ctr"/>
+            <a:r>
+              <a:rPr lang="en-US" sz="1100" dirty="0">
+                <a:solidFill>
+                  <a:srgbClr val="7030A0"/>
+                </a:solidFill>
+              </a:rPr>
+              <a:t>1</a:t>
+            </a:r>
+            <a:endParaRPr lang="en-SG" sz="1100" dirty="0">
+              <a:solidFill>
+                <a:srgbClr val="7030A0"/>
+              </a:solidFill>
+            </a:endParaRPr>
+          </a:p>
+        </p:txBody>
+      </p:sp>
+      <p:cxnSp>
+        <p:nvCxnSpPr>
+          <p:cNvPr id="570" name="Elbow Connector 29">
+            <a:extLst>
+              <a:ext uri="{FF2B5EF4-FFF2-40B4-BE49-F238E27FC236}">
+                <a16:creationId xmlns:a16="http://schemas.microsoft.com/office/drawing/2014/main" id="{FFB58B3F-13EE-48FE-ACA0-2634E4143863}"/>
+              </a:ext>
+            </a:extLst>
+          </p:cNvPr>
+          <p:cNvCxnSpPr>
+            <a:cxnSpLocks/>
+          </p:cNvCxnSpPr>
+          <p:nvPr/>
+        </p:nvCxnSpPr>
+        <p:spPr>
+          <a:xfrm rot="5400000" flipH="1" flipV="1">
+            <a:off x="3940327" y="-139991"/>
+            <a:ext cx="392106" cy="4878000"/>
+          </a:xfrm>
+          <a:prstGeom prst="bentConnector3">
+            <a:avLst>
+              <a:gd name="adj1" fmla="val 260327"/>
+            </a:avLst>
+          </a:prstGeom>
+          <a:ln w="19050">
+            <a:solidFill>
+              <a:srgbClr val="7030A0"/>
+            </a:solidFill>
+            <a:headEnd type="none" w="med" len="med"/>
+            <a:tailEnd type="arrow" w="med" len="med"/>
+          </a:ln>
+          <a:effectLst/>
+        </p:spPr>
+        <p:style>
+          <a:lnRef idx="1">
+            <a:schemeClr val="accent2"/>
+          </a:lnRef>
+          <a:fillRef idx="2">
+            <a:schemeClr val="accent2"/>
+          </a:fillRef>
+          <a:effectRef idx="1">
+            <a:schemeClr val="accent2"/>
+          </a:effectRef>
+          <a:fontRef idx="minor">
+            <a:schemeClr val="dk1"/>
+          </a:fontRef>
+        </p:style>
+      </p:cxnSp>
+      <p:sp>
+        <p:nvSpPr>
+          <p:cNvPr id="577" name="TextBox 576">
+            <a:extLst>
+              <a:ext uri="{FF2B5EF4-FFF2-40B4-BE49-F238E27FC236}">
+                <a16:creationId xmlns:a16="http://schemas.microsoft.com/office/drawing/2014/main" id="{E6EEDEA2-B030-481C-AAF9-25F1F5F17970}"/>
+              </a:ext>
+            </a:extLst>
+          </p:cNvPr>
+          <p:cNvSpPr txBox="1"/>
+          <p:nvPr/>
+        </p:nvSpPr>
+        <p:spPr>
+          <a:xfrm>
+            <a:off x="6395760" y="1859352"/>
+            <a:ext cx="189257" cy="178683"/>
+          </a:xfrm>
+          <a:prstGeom prst="rect">
+            <a:avLst/>
+          </a:prstGeom>
+          <a:noFill/>
+        </p:spPr>
+        <p:txBody>
+          <a:bodyPr wrap="square" lIns="0" tIns="0" rIns="0" bIns="0" rtlCol="0">
+            <a:noAutofit/>
+          </a:bodyPr>
+          <a:lstStyle/>
+          <a:p>
+            <a:pPr algn="ctr"/>
+            <a:r>
+              <a:rPr lang="en-US" sz="1100" dirty="0">
+                <a:solidFill>
+                  <a:srgbClr val="7030A0"/>
+                </a:solidFill>
+              </a:rPr>
+              <a:t>1</a:t>
+            </a:r>
+            <a:endParaRPr lang="en-SG" sz="1100" dirty="0">
+              <a:solidFill>
+                <a:srgbClr val="7030A0"/>
+              </a:solidFill>
+            </a:endParaRPr>
+          </a:p>
+        </p:txBody>
+      </p:sp>
+      <p:cxnSp>
+        <p:nvCxnSpPr>
+          <p:cNvPr id="578" name="Elbow Connector 29">
+            <a:extLst>
+              <a:ext uri="{FF2B5EF4-FFF2-40B4-BE49-F238E27FC236}">
+                <a16:creationId xmlns:a16="http://schemas.microsoft.com/office/drawing/2014/main" id="{6AF2E87F-6C76-4AC9-80C1-1F74A24BCA6A}"/>
+              </a:ext>
+            </a:extLst>
+          </p:cNvPr>
+          <p:cNvCxnSpPr>
+            <a:cxnSpLocks/>
+            <a:stCxn id="9" idx="1"/>
+            <a:endCxn id="411" idx="2"/>
+          </p:cNvCxnSpPr>
+          <p:nvPr/>
+        </p:nvCxnSpPr>
+        <p:spPr>
+          <a:xfrm rot="16200000" flipH="1">
+            <a:off x="4038943" y="2611436"/>
+            <a:ext cx="663606" cy="5346731"/>
+          </a:xfrm>
+          <a:prstGeom prst="bentConnector3">
+            <a:avLst>
+              <a:gd name="adj1" fmla="val 127644"/>
+            </a:avLst>
+          </a:prstGeom>
+          <a:ln w="19050">
+            <a:solidFill>
+              <a:srgbClr val="7030A0"/>
+            </a:solidFill>
+            <a:headEnd type="none" w="med" len="med"/>
+            <a:tailEnd type="arrow" w="med" len="med"/>
+          </a:ln>
+          <a:effectLst/>
+        </p:spPr>
+        <p:style>
+          <a:lnRef idx="1">
+            <a:schemeClr val="accent2"/>
+          </a:lnRef>
+          <a:fillRef idx="2">
+            <a:schemeClr val="accent2"/>
+          </a:fillRef>
+          <a:effectRef idx="1">
+            <a:schemeClr val="accent2"/>
+          </a:effectRef>
+          <a:fontRef idx="minor">
+            <a:schemeClr val="dk1"/>
+          </a:fontRef>
+        </p:style>
+      </p:cxnSp>
+      <p:sp>
+        <p:nvSpPr>
+          <p:cNvPr id="582" name="TextBox 581">
+            <a:extLst>
+              <a:ext uri="{FF2B5EF4-FFF2-40B4-BE49-F238E27FC236}">
+                <a16:creationId xmlns:a16="http://schemas.microsoft.com/office/drawing/2014/main" id="{FC122E4F-FC36-4A71-AAD7-3A1AF287A3C3}"/>
+              </a:ext>
+            </a:extLst>
+          </p:cNvPr>
+          <p:cNvSpPr txBox="1"/>
+          <p:nvPr/>
+        </p:nvSpPr>
+        <p:spPr>
+          <a:xfrm>
+            <a:off x="6815117" y="5622842"/>
+            <a:ext cx="189257" cy="178683"/>
+          </a:xfrm>
+          <a:prstGeom prst="rect">
+            <a:avLst/>
+          </a:prstGeom>
+          <a:noFill/>
+        </p:spPr>
+        <p:txBody>
+          <a:bodyPr wrap="square" lIns="0" tIns="0" rIns="0" bIns="0" rtlCol="0">
+            <a:noAutofit/>
+          </a:bodyPr>
+          <a:lstStyle/>
+          <a:p>
+            <a:pPr algn="ctr"/>
+            <a:r>
+              <a:rPr lang="en-US" sz="1100" dirty="0">
+                <a:solidFill>
+                  <a:srgbClr val="7030A0"/>
+                </a:solidFill>
+              </a:rPr>
+              <a:t>1</a:t>
+            </a:r>
+            <a:endParaRPr lang="en-SG" sz="1100" dirty="0">
+              <a:solidFill>
+                <a:srgbClr val="7030A0"/>
+              </a:solidFill>
+            </a:endParaRPr>
+          </a:p>
+        </p:txBody>
+      </p:sp>
+      <p:sp>
+        <p:nvSpPr>
+          <p:cNvPr id="583" name="TextBox 582">
+            <a:extLst>
+              <a:ext uri="{FF2B5EF4-FFF2-40B4-BE49-F238E27FC236}">
+                <a16:creationId xmlns:a16="http://schemas.microsoft.com/office/drawing/2014/main" id="{6465D74B-4FCD-4CFB-9B7D-B3FFF8E8850C}"/>
+              </a:ext>
+            </a:extLst>
+          </p:cNvPr>
+          <p:cNvSpPr txBox="1"/>
+          <p:nvPr/>
+        </p:nvSpPr>
+        <p:spPr>
+          <a:xfrm>
+            <a:off x="5474118" y="5609408"/>
+            <a:ext cx="957517" cy="213057"/>
+          </a:xfrm>
+          <a:prstGeom prst="rect">
+            <a:avLst/>
+          </a:prstGeom>
+          <a:noFill/>
+        </p:spPr>
+        <p:txBody>
+          <a:bodyPr wrap="square" lIns="0" tIns="0" rIns="0" bIns="0" rtlCol="0">
+            <a:noAutofit/>
+          </a:bodyPr>
+          <a:lstStyle/>
+          <a:p>
+            <a:pPr algn="ctr"/>
+            <a:r>
+              <a:rPr lang="en-US" sz="1100" dirty="0">
+                <a:solidFill>
+                  <a:srgbClr val="7030A0"/>
+                </a:solidFill>
+              </a:rPr>
+              <a:t>filtered list</a:t>
+            </a:r>
+            <a:endParaRPr lang="en-SG" sz="1100" dirty="0">
+              <a:solidFill>
+                <a:srgbClr val="7030A0"/>
+              </a:solidFill>
+            </a:endParaRPr>
+          </a:p>
+        </p:txBody>
+      </p:sp>
+      <p:sp>
+        <p:nvSpPr>
+          <p:cNvPr id="584" name="TextBox 583">
+            <a:extLst>
+              <a:ext uri="{FF2B5EF4-FFF2-40B4-BE49-F238E27FC236}">
+                <a16:creationId xmlns:a16="http://schemas.microsoft.com/office/drawing/2014/main" id="{2AE1465A-FAC5-45B0-A43A-2836D8605268}"/>
+              </a:ext>
+            </a:extLst>
+          </p:cNvPr>
+          <p:cNvSpPr txBox="1"/>
+          <p:nvPr/>
+        </p:nvSpPr>
+        <p:spPr>
+          <a:xfrm rot="16200000">
+            <a:off x="6261274" y="1619553"/>
+            <a:ext cx="957517" cy="213057"/>
+          </a:xfrm>
+          <a:prstGeom prst="rect">
+            <a:avLst/>
+          </a:prstGeom>
+          <a:noFill/>
+        </p:spPr>
+        <p:txBody>
+          <a:bodyPr wrap="square" lIns="0" tIns="0" rIns="0" bIns="0" rtlCol="0">
+            <a:noAutofit/>
+          </a:bodyPr>
+          <a:lstStyle/>
+          <a:p>
+            <a:pPr algn="ctr"/>
+            <a:r>
+              <a:rPr lang="en-US" sz="1100" dirty="0">
+                <a:solidFill>
+                  <a:srgbClr val="7030A0"/>
+                </a:solidFill>
+              </a:rPr>
+              <a:t>filtered list</a:t>
             </a:r>
             <a:endParaRPr lang="en-SG" sz="1100" dirty="0">
               <a:solidFill>
@@ -5763,13 +8180,6 @@
   <p:clrMapOvr>
     <a:masterClrMapping/>
   </p:clrMapOvr>
-  <p:timing>
-    <p:tnLst>
-      <p:par>
-        <p:cTn id="1" dur="indefinite" restart="never" nodeType="tmRoot"/>
-      </p:par>
-    </p:tnLst>
-  </p:timing>
 </p:sld>
 </file>
 

</xml_diff>

<commit_message>
Added my diagrams and updated my portfolio
</commit_message>
<xml_diff>
--- a/docs/diagrams/ModelComponentClassDiagram.pptx
+++ b/docs/diagrams/ModelComponentClassDiagram.pptx
@@ -208,7 +208,7 @@
           <a:p>
             <a:fld id="{F5CC4B3F-88C1-4FFA-B1B6-F41C21DC6924}" type="datetimeFigureOut">
               <a:rPr lang="en-US" smtClean="0"/>
-              <a:t>4/11/2018</a:t>
+              <a:t>4/15/2018</a:t>
             </a:fld>
             <a:endParaRPr lang="en-US"/>
           </a:p>
@@ -367,7 +367,7 @@
           <a:p>
             <a:fld id="{5A7AB025-77E3-4BD1-A2FD-B3183DBA47A3}" type="slidenum">
               <a:rPr lang="en-US" smtClean="0"/>
-              <a:t>‹#›</a:t>
+              <a:t>‹N°›</a:t>
             </a:fld>
             <a:endParaRPr lang="en-US"/>
           </a:p>
@@ -657,7 +657,7 @@
           <a:p>
             <a:fld id="{78C97017-6FC3-485B-9764-EAC9E56C1D49}" type="datetimeFigureOut">
               <a:rPr lang="en-US" smtClean="0"/>
-              <a:t>4/11/2018</a:t>
+              <a:t>4/15/2018</a:t>
             </a:fld>
             <a:endParaRPr lang="en-US"/>
           </a:p>
@@ -699,7 +699,7 @@
           <a:p>
             <a:fld id="{FB34683C-161B-4520-BF45-B179E228CF2A}" type="slidenum">
               <a:rPr lang="en-US" smtClean="0"/>
-              <a:t>‹#›</a:t>
+              <a:t>‹N°›</a:t>
             </a:fld>
             <a:endParaRPr lang="en-US"/>
           </a:p>
@@ -827,7 +827,7 @@
           <a:p>
             <a:fld id="{78C97017-6FC3-485B-9764-EAC9E56C1D49}" type="datetimeFigureOut">
               <a:rPr lang="en-US" smtClean="0"/>
-              <a:t>4/11/2018</a:t>
+              <a:t>4/15/2018</a:t>
             </a:fld>
             <a:endParaRPr lang="en-US"/>
           </a:p>
@@ -869,7 +869,7 @@
           <a:p>
             <a:fld id="{FB34683C-161B-4520-BF45-B179E228CF2A}" type="slidenum">
               <a:rPr lang="en-US" smtClean="0"/>
-              <a:t>‹#›</a:t>
+              <a:t>‹N°›</a:t>
             </a:fld>
             <a:endParaRPr lang="en-US"/>
           </a:p>
@@ -1007,7 +1007,7 @@
           <a:p>
             <a:fld id="{78C97017-6FC3-485B-9764-EAC9E56C1D49}" type="datetimeFigureOut">
               <a:rPr lang="en-US" smtClean="0"/>
-              <a:t>4/11/2018</a:t>
+              <a:t>4/15/2018</a:t>
             </a:fld>
             <a:endParaRPr lang="en-US"/>
           </a:p>
@@ -1049,7 +1049,7 @@
           <a:p>
             <a:fld id="{FB34683C-161B-4520-BF45-B179E228CF2A}" type="slidenum">
               <a:rPr lang="en-US" smtClean="0"/>
-              <a:t>‹#›</a:t>
+              <a:t>‹N°›</a:t>
             </a:fld>
             <a:endParaRPr lang="en-US"/>
           </a:p>
@@ -1177,7 +1177,7 @@
           <a:p>
             <a:fld id="{78C97017-6FC3-485B-9764-EAC9E56C1D49}" type="datetimeFigureOut">
               <a:rPr lang="en-US" smtClean="0"/>
-              <a:t>4/11/2018</a:t>
+              <a:t>4/15/2018</a:t>
             </a:fld>
             <a:endParaRPr lang="en-US"/>
           </a:p>
@@ -1219,7 +1219,7 @@
           <a:p>
             <a:fld id="{FB34683C-161B-4520-BF45-B179E228CF2A}" type="slidenum">
               <a:rPr lang="en-US" smtClean="0"/>
-              <a:t>‹#›</a:t>
+              <a:t>‹N°›</a:t>
             </a:fld>
             <a:endParaRPr lang="en-US"/>
           </a:p>
@@ -1423,7 +1423,7 @@
           <a:p>
             <a:fld id="{78C97017-6FC3-485B-9764-EAC9E56C1D49}" type="datetimeFigureOut">
               <a:rPr lang="en-US" smtClean="0"/>
-              <a:t>4/11/2018</a:t>
+              <a:t>4/15/2018</a:t>
             </a:fld>
             <a:endParaRPr lang="en-US"/>
           </a:p>
@@ -1465,7 +1465,7 @@
           <a:p>
             <a:fld id="{FB34683C-161B-4520-BF45-B179E228CF2A}" type="slidenum">
               <a:rPr lang="en-US" smtClean="0"/>
-              <a:t>‹#›</a:t>
+              <a:t>‹N°›</a:t>
             </a:fld>
             <a:endParaRPr lang="en-US"/>
           </a:p>
@@ -1711,7 +1711,7 @@
           <a:p>
             <a:fld id="{78C97017-6FC3-485B-9764-EAC9E56C1D49}" type="datetimeFigureOut">
               <a:rPr lang="en-US" smtClean="0"/>
-              <a:t>4/11/2018</a:t>
+              <a:t>4/15/2018</a:t>
             </a:fld>
             <a:endParaRPr lang="en-US"/>
           </a:p>
@@ -1753,7 +1753,7 @@
           <a:p>
             <a:fld id="{FB34683C-161B-4520-BF45-B179E228CF2A}" type="slidenum">
               <a:rPr lang="en-US" smtClean="0"/>
-              <a:t>‹#›</a:t>
+              <a:t>‹N°›</a:t>
             </a:fld>
             <a:endParaRPr lang="en-US"/>
           </a:p>
@@ -2133,7 +2133,7 @@
           <a:p>
             <a:fld id="{78C97017-6FC3-485B-9764-EAC9E56C1D49}" type="datetimeFigureOut">
               <a:rPr lang="en-US" smtClean="0"/>
-              <a:t>4/11/2018</a:t>
+              <a:t>4/15/2018</a:t>
             </a:fld>
             <a:endParaRPr lang="en-US"/>
           </a:p>
@@ -2175,7 +2175,7 @@
           <a:p>
             <a:fld id="{FB34683C-161B-4520-BF45-B179E228CF2A}" type="slidenum">
               <a:rPr lang="en-US" smtClean="0"/>
-              <a:t>‹#›</a:t>
+              <a:t>‹N°›</a:t>
             </a:fld>
             <a:endParaRPr lang="en-US"/>
           </a:p>
@@ -2251,7 +2251,7 @@
           <a:p>
             <a:fld id="{78C97017-6FC3-485B-9764-EAC9E56C1D49}" type="datetimeFigureOut">
               <a:rPr lang="en-US" smtClean="0"/>
-              <a:t>4/11/2018</a:t>
+              <a:t>4/15/2018</a:t>
             </a:fld>
             <a:endParaRPr lang="en-US"/>
           </a:p>
@@ -2293,7 +2293,7 @@
           <a:p>
             <a:fld id="{FB34683C-161B-4520-BF45-B179E228CF2A}" type="slidenum">
               <a:rPr lang="en-US" smtClean="0"/>
-              <a:t>‹#›</a:t>
+              <a:t>‹N°›</a:t>
             </a:fld>
             <a:endParaRPr lang="en-US"/>
           </a:p>
@@ -2346,7 +2346,7 @@
           <a:p>
             <a:fld id="{78C97017-6FC3-485B-9764-EAC9E56C1D49}" type="datetimeFigureOut">
               <a:rPr lang="en-US" smtClean="0"/>
-              <a:t>4/11/2018</a:t>
+              <a:t>4/15/2018</a:t>
             </a:fld>
             <a:endParaRPr lang="en-US"/>
           </a:p>
@@ -2388,7 +2388,7 @@
           <a:p>
             <a:fld id="{FB34683C-161B-4520-BF45-B179E228CF2A}" type="slidenum">
               <a:rPr lang="en-US" smtClean="0"/>
-              <a:t>‹#›</a:t>
+              <a:t>‹N°›</a:t>
             </a:fld>
             <a:endParaRPr lang="en-US"/>
           </a:p>
@@ -2623,7 +2623,7 @@
           <a:p>
             <a:fld id="{78C97017-6FC3-485B-9764-EAC9E56C1D49}" type="datetimeFigureOut">
               <a:rPr lang="en-US" smtClean="0"/>
-              <a:t>4/11/2018</a:t>
+              <a:t>4/15/2018</a:t>
             </a:fld>
             <a:endParaRPr lang="en-US"/>
           </a:p>
@@ -2665,7 +2665,7 @@
           <a:p>
             <a:fld id="{FB34683C-161B-4520-BF45-B179E228CF2A}" type="slidenum">
               <a:rPr lang="en-US" smtClean="0"/>
-              <a:t>‹#›</a:t>
+              <a:t>‹N°›</a:t>
             </a:fld>
             <a:endParaRPr lang="en-US"/>
           </a:p>
@@ -2876,7 +2876,7 @@
           <a:p>
             <a:fld id="{78C97017-6FC3-485B-9764-EAC9E56C1D49}" type="datetimeFigureOut">
               <a:rPr lang="en-US" smtClean="0"/>
-              <a:t>4/11/2018</a:t>
+              <a:t>4/15/2018</a:t>
             </a:fld>
             <a:endParaRPr lang="en-US"/>
           </a:p>
@@ -2918,7 +2918,7 @@
           <a:p>
             <a:fld id="{FB34683C-161B-4520-BF45-B179E228CF2A}" type="slidenum">
               <a:rPr lang="en-US" smtClean="0"/>
-              <a:t>‹#›</a:t>
+              <a:t>‹N°›</a:t>
             </a:fld>
             <a:endParaRPr lang="en-US"/>
           </a:p>
@@ -3089,7 +3089,7 @@
           <a:p>
             <a:fld id="{78C97017-6FC3-485B-9764-EAC9E56C1D49}" type="datetimeFigureOut">
               <a:rPr lang="en-US" smtClean="0"/>
-              <a:t>4/11/2018</a:t>
+              <a:t>4/15/2018</a:t>
             </a:fld>
             <a:endParaRPr lang="en-US"/>
           </a:p>
@@ -3167,7 +3167,7 @@
           <a:p>
             <a:fld id="{FB34683C-161B-4520-BF45-B179E228CF2A}" type="slidenum">
               <a:rPr lang="en-US" smtClean="0"/>
-              <a:t>‹#›</a:t>
+              <a:t>‹N°›</a:t>
             </a:fld>
             <a:endParaRPr lang="en-US"/>
           </a:p>
@@ -3472,8 +3472,8 @@
         </p:nvSpPr>
         <p:spPr>
           <a:xfrm>
-            <a:off x="1119865" y="838200"/>
-            <a:ext cx="7490735" cy="4648200"/>
+            <a:off x="1143000" y="762000"/>
+            <a:ext cx="7490735" cy="5791200"/>
           </a:xfrm>
           <a:prstGeom prst="roundRect">
             <a:avLst>
@@ -6574,6 +6574,771 @@
           </a:fontRef>
         </p:style>
       </p:cxnSp>
+      <p:sp>
+        <p:nvSpPr>
+          <p:cNvPr id="71" name="Rectangle 8"/>
+          <p:cNvSpPr/>
+          <p:nvPr/>
+        </p:nvSpPr>
+        <p:spPr>
+          <a:xfrm>
+            <a:off x="6553200" y="5207792"/>
+            <a:ext cx="708186" cy="285783"/>
+          </a:xfrm>
+          <a:prstGeom prst="rect">
+            <a:avLst/>
+          </a:prstGeom>
+          <a:ln w="19050">
+            <a:solidFill>
+              <a:srgbClr val="7030A0"/>
+            </a:solidFill>
+          </a:ln>
+          <a:effectLst/>
+        </p:spPr>
+        <p:style>
+          <a:lnRef idx="1">
+            <a:schemeClr val="accent4"/>
+          </a:lnRef>
+          <a:fillRef idx="2">
+            <a:schemeClr val="accent4"/>
+          </a:fillRef>
+          <a:effectRef idx="1">
+            <a:schemeClr val="accent4"/>
+          </a:effectRef>
+          <a:fontRef idx="minor">
+            <a:schemeClr val="dk1"/>
+          </a:fontRef>
+        </p:style>
+        <p:txBody>
+          <a:bodyPr rtlCol="0" anchor="ctr"/>
+          <a:lstStyle/>
+          <a:p>
+            <a:pPr algn="ctr"/>
+            <a:r>
+              <a:rPr lang="en-US" sz="1050" dirty="0" smtClean="0">
+                <a:solidFill>
+                  <a:srgbClr val="7030A0"/>
+                </a:solidFill>
+              </a:rPr>
+              <a:t>Policy</a:t>
+            </a:r>
+            <a:endParaRPr lang="en-SG" sz="1050" dirty="0">
+              <a:solidFill>
+                <a:srgbClr val="7030A0"/>
+              </a:solidFill>
+            </a:endParaRPr>
+          </a:p>
+        </p:txBody>
+      </p:sp>
+      <p:sp>
+        <p:nvSpPr>
+          <p:cNvPr id="7" name="ZoneTexte 6"/>
+          <p:cNvSpPr txBox="1"/>
+          <p:nvPr/>
+        </p:nvSpPr>
+        <p:spPr>
+          <a:xfrm>
+            <a:off x="7239000" y="5358942"/>
+            <a:ext cx="409086" cy="230832"/>
+          </a:xfrm>
+          <a:prstGeom prst="rect">
+            <a:avLst/>
+          </a:prstGeom>
+          <a:noFill/>
+        </p:spPr>
+        <p:txBody>
+          <a:bodyPr wrap="none" rtlCol="0">
+            <a:spAutoFit/>
+          </a:bodyPr>
+          <a:lstStyle/>
+          <a:p>
+            <a:r>
+              <a:rPr lang="fr-FR" sz="900" dirty="0" smtClean="0">
+                <a:solidFill>
+                  <a:srgbClr val="7030A0"/>
+                </a:solidFill>
+              </a:rPr>
+              <a:t>0 .. 1</a:t>
+            </a:r>
+            <a:endParaRPr lang="fr-FR" sz="900" dirty="0">
+              <a:solidFill>
+                <a:srgbClr val="7030A0"/>
+              </a:solidFill>
+            </a:endParaRPr>
+          </a:p>
+        </p:txBody>
+      </p:sp>
+      <p:cxnSp>
+        <p:nvCxnSpPr>
+          <p:cNvPr id="103" name="Elbow Connector 97"/>
+          <p:cNvCxnSpPr>
+            <a:endCxn id="71" idx="3"/>
+          </p:cNvCxnSpPr>
+          <p:nvPr/>
+        </p:nvCxnSpPr>
+        <p:spPr>
+          <a:xfrm rot="5400000">
+            <a:off x="7251495" y="5106982"/>
+            <a:ext cx="253593" cy="233810"/>
+          </a:xfrm>
+          <a:prstGeom prst="bentConnector2">
+            <a:avLst/>
+          </a:prstGeom>
+          <a:ln w="19050">
+            <a:solidFill>
+              <a:srgbClr val="7030A0"/>
+            </a:solidFill>
+            <a:headEnd type="none" w="med" len="med"/>
+            <a:tailEnd type="arrow" w="med" len="med"/>
+          </a:ln>
+          <a:effectLst/>
+        </p:spPr>
+        <p:style>
+          <a:lnRef idx="1">
+            <a:schemeClr val="accent2"/>
+          </a:lnRef>
+          <a:fillRef idx="2">
+            <a:schemeClr val="accent2"/>
+          </a:fillRef>
+          <a:effectRef idx="1">
+            <a:schemeClr val="accent2"/>
+          </a:effectRef>
+          <a:fontRef idx="minor">
+            <a:schemeClr val="dk1"/>
+          </a:fontRef>
+        </p:style>
+      </p:cxnSp>
+      <p:sp>
+        <p:nvSpPr>
+          <p:cNvPr id="104" name="Flowchart: Decision 96"/>
+          <p:cNvSpPr/>
+          <p:nvPr/>
+        </p:nvSpPr>
+        <p:spPr>
+          <a:xfrm>
+            <a:off x="6308971" y="5272252"/>
+            <a:ext cx="236048" cy="173380"/>
+          </a:xfrm>
+          <a:prstGeom prst="flowChartDecision">
+            <a:avLst/>
+          </a:prstGeom>
+          <a:solidFill>
+            <a:srgbClr val="7030A0"/>
+          </a:solidFill>
+          <a:ln w="19050">
+            <a:solidFill>
+              <a:srgbClr val="7030A0"/>
+            </a:solidFill>
+          </a:ln>
+          <a:effectLst/>
+        </p:spPr>
+        <p:style>
+          <a:lnRef idx="1">
+            <a:schemeClr val="accent6"/>
+          </a:lnRef>
+          <a:fillRef idx="2">
+            <a:schemeClr val="accent6"/>
+          </a:fillRef>
+          <a:effectRef idx="1">
+            <a:schemeClr val="accent6"/>
+          </a:effectRef>
+          <a:fontRef idx="minor">
+            <a:schemeClr val="dk1"/>
+          </a:fontRef>
+        </p:style>
+        <p:txBody>
+          <a:bodyPr rtlCol="0" anchor="ctr"/>
+          <a:lstStyle/>
+          <a:p>
+            <a:pPr algn="ctr"/>
+            <a:endParaRPr lang="en-US" sz="1050"/>
+          </a:p>
+        </p:txBody>
+      </p:sp>
+      <p:cxnSp>
+        <p:nvCxnSpPr>
+          <p:cNvPr id="105" name="Elbow Connector 97"/>
+          <p:cNvCxnSpPr/>
+          <p:nvPr/>
+        </p:nvCxnSpPr>
+        <p:spPr>
+          <a:xfrm rot="10800000">
+            <a:off x="5497571" y="4838526"/>
+            <a:ext cx="811400" cy="520416"/>
+          </a:xfrm>
+          <a:prstGeom prst="bentConnector3">
+            <a:avLst>
+              <a:gd name="adj1" fmla="val 50000"/>
+            </a:avLst>
+          </a:prstGeom>
+          <a:ln w="19050">
+            <a:solidFill>
+              <a:srgbClr val="7030A0"/>
+            </a:solidFill>
+            <a:headEnd type="none" w="med" len="med"/>
+            <a:tailEnd type="arrow" w="med" len="med"/>
+          </a:ln>
+          <a:effectLst/>
+        </p:spPr>
+        <p:style>
+          <a:lnRef idx="1">
+            <a:schemeClr val="accent2"/>
+          </a:lnRef>
+          <a:fillRef idx="2">
+            <a:schemeClr val="accent2"/>
+          </a:fillRef>
+          <a:effectRef idx="1">
+            <a:schemeClr val="accent2"/>
+          </a:effectRef>
+          <a:fontRef idx="minor">
+            <a:schemeClr val="dk1"/>
+          </a:fontRef>
+        </p:style>
+      </p:cxnSp>
+      <p:sp>
+        <p:nvSpPr>
+          <p:cNvPr id="106" name="Rectangle 8"/>
+          <p:cNvSpPr/>
+          <p:nvPr/>
+        </p:nvSpPr>
+        <p:spPr>
+          <a:xfrm>
+            <a:off x="4789384" y="4695634"/>
+            <a:ext cx="708186" cy="285783"/>
+          </a:xfrm>
+          <a:prstGeom prst="rect">
+            <a:avLst/>
+          </a:prstGeom>
+          <a:ln w="19050">
+            <a:solidFill>
+              <a:srgbClr val="7030A0"/>
+            </a:solidFill>
+          </a:ln>
+          <a:effectLst/>
+        </p:spPr>
+        <p:style>
+          <a:lnRef idx="1">
+            <a:schemeClr val="accent4"/>
+          </a:lnRef>
+          <a:fillRef idx="2">
+            <a:schemeClr val="accent4"/>
+          </a:fillRef>
+          <a:effectRef idx="1">
+            <a:schemeClr val="accent4"/>
+          </a:effectRef>
+          <a:fontRef idx="minor">
+            <a:schemeClr val="dk1"/>
+          </a:fontRef>
+        </p:style>
+        <p:txBody>
+          <a:bodyPr rtlCol="0" anchor="ctr"/>
+          <a:lstStyle/>
+          <a:p>
+            <a:pPr algn="ctr"/>
+            <a:r>
+              <a:rPr lang="en-US" sz="1050" dirty="0" smtClean="0">
+                <a:solidFill>
+                  <a:srgbClr val="7030A0"/>
+                </a:solidFill>
+              </a:rPr>
+              <a:t>Date</a:t>
+            </a:r>
+            <a:endParaRPr lang="en-SG" sz="1050" dirty="0">
+              <a:solidFill>
+                <a:srgbClr val="7030A0"/>
+              </a:solidFill>
+            </a:endParaRPr>
+          </a:p>
+        </p:txBody>
+      </p:sp>
+      <p:sp>
+        <p:nvSpPr>
+          <p:cNvPr id="108" name="ZoneTexte 107"/>
+          <p:cNvSpPr txBox="1"/>
+          <p:nvPr/>
+        </p:nvSpPr>
+        <p:spPr>
+          <a:xfrm>
+            <a:off x="5549642" y="4635651"/>
+            <a:ext cx="242374" cy="230832"/>
+          </a:xfrm>
+          <a:prstGeom prst="rect">
+            <a:avLst/>
+          </a:prstGeom>
+          <a:noFill/>
+        </p:spPr>
+        <p:txBody>
+          <a:bodyPr wrap="none" rtlCol="0">
+            <a:spAutoFit/>
+          </a:bodyPr>
+          <a:lstStyle/>
+          <a:p>
+            <a:r>
+              <a:rPr lang="fr-FR" sz="900" dirty="0">
+                <a:solidFill>
+                  <a:srgbClr val="7030A0"/>
+                </a:solidFill>
+              </a:rPr>
+              <a:t>2</a:t>
+            </a:r>
+          </a:p>
+        </p:txBody>
+      </p:sp>
+      <p:cxnSp>
+        <p:nvCxnSpPr>
+          <p:cNvPr id="110" name="Elbow Connector 97"/>
+          <p:cNvCxnSpPr/>
+          <p:nvPr/>
+        </p:nvCxnSpPr>
+        <p:spPr>
+          <a:xfrm rot="10800000" flipV="1">
+            <a:off x="5504806" y="5359846"/>
+            <a:ext cx="787446" cy="1129"/>
+          </a:xfrm>
+          <a:prstGeom prst="bentConnector3">
+            <a:avLst>
+              <a:gd name="adj1" fmla="val 50000"/>
+            </a:avLst>
+          </a:prstGeom>
+          <a:ln w="19050">
+            <a:solidFill>
+              <a:srgbClr val="7030A0"/>
+            </a:solidFill>
+            <a:headEnd type="none" w="med" len="med"/>
+            <a:tailEnd type="arrow" w="med" len="med"/>
+          </a:ln>
+          <a:effectLst/>
+        </p:spPr>
+        <p:style>
+          <a:lnRef idx="1">
+            <a:schemeClr val="accent2"/>
+          </a:lnRef>
+          <a:fillRef idx="2">
+            <a:schemeClr val="accent2"/>
+          </a:fillRef>
+          <a:effectRef idx="1">
+            <a:schemeClr val="accent2"/>
+          </a:effectRef>
+          <a:fontRef idx="minor">
+            <a:schemeClr val="dk1"/>
+          </a:fontRef>
+        </p:style>
+      </p:cxnSp>
+      <p:sp>
+        <p:nvSpPr>
+          <p:cNvPr id="111" name="Rectangle 8"/>
+          <p:cNvSpPr/>
+          <p:nvPr/>
+        </p:nvSpPr>
+        <p:spPr>
+          <a:xfrm>
+            <a:off x="4788260" y="5201681"/>
+            <a:ext cx="708186" cy="285783"/>
+          </a:xfrm>
+          <a:prstGeom prst="rect">
+            <a:avLst/>
+          </a:prstGeom>
+          <a:ln w="19050">
+            <a:solidFill>
+              <a:srgbClr val="7030A0"/>
+            </a:solidFill>
+          </a:ln>
+          <a:effectLst/>
+        </p:spPr>
+        <p:style>
+          <a:lnRef idx="1">
+            <a:schemeClr val="accent4"/>
+          </a:lnRef>
+          <a:fillRef idx="2">
+            <a:schemeClr val="accent4"/>
+          </a:fillRef>
+          <a:effectRef idx="1">
+            <a:schemeClr val="accent4"/>
+          </a:effectRef>
+          <a:fontRef idx="minor">
+            <a:schemeClr val="dk1"/>
+          </a:fontRef>
+        </p:style>
+        <p:txBody>
+          <a:bodyPr rtlCol="0" anchor="ctr"/>
+          <a:lstStyle/>
+          <a:p>
+            <a:pPr algn="ctr"/>
+            <a:r>
+              <a:rPr lang="en-US" sz="1050" dirty="0" smtClean="0">
+                <a:solidFill>
+                  <a:srgbClr val="7030A0"/>
+                </a:solidFill>
+              </a:rPr>
+              <a:t>Price</a:t>
+            </a:r>
+            <a:endParaRPr lang="en-SG" sz="1050" dirty="0">
+              <a:solidFill>
+                <a:srgbClr val="7030A0"/>
+              </a:solidFill>
+            </a:endParaRPr>
+          </a:p>
+        </p:txBody>
+      </p:sp>
+      <p:cxnSp>
+        <p:nvCxnSpPr>
+          <p:cNvPr id="112" name="Elbow Connector 97"/>
+          <p:cNvCxnSpPr/>
+          <p:nvPr/>
+        </p:nvCxnSpPr>
+        <p:spPr>
+          <a:xfrm rot="10800000" flipV="1">
+            <a:off x="5527242" y="5358941"/>
+            <a:ext cx="749246" cy="554307"/>
+          </a:xfrm>
+          <a:prstGeom prst="bentConnector3">
+            <a:avLst>
+              <a:gd name="adj1" fmla="val 50000"/>
+            </a:avLst>
+          </a:prstGeom>
+          <a:ln w="19050">
+            <a:solidFill>
+              <a:srgbClr val="7030A0"/>
+            </a:solidFill>
+            <a:headEnd type="none" w="med" len="med"/>
+            <a:tailEnd type="arrow" w="med" len="med"/>
+          </a:ln>
+          <a:effectLst/>
+        </p:spPr>
+        <p:style>
+          <a:lnRef idx="1">
+            <a:schemeClr val="accent2"/>
+          </a:lnRef>
+          <a:fillRef idx="2">
+            <a:schemeClr val="accent2"/>
+          </a:fillRef>
+          <a:effectRef idx="1">
+            <a:schemeClr val="accent2"/>
+          </a:effectRef>
+          <a:fontRef idx="minor">
+            <a:schemeClr val="dk1"/>
+          </a:fontRef>
+        </p:style>
+      </p:cxnSp>
+      <p:sp>
+        <p:nvSpPr>
+          <p:cNvPr id="113" name="Rectangle 8"/>
+          <p:cNvSpPr/>
+          <p:nvPr/>
+        </p:nvSpPr>
+        <p:spPr>
+          <a:xfrm>
+            <a:off x="4804908" y="5770357"/>
+            <a:ext cx="708186" cy="285783"/>
+          </a:xfrm>
+          <a:prstGeom prst="rect">
+            <a:avLst/>
+          </a:prstGeom>
+          <a:ln w="19050">
+            <a:solidFill>
+              <a:srgbClr val="7030A0"/>
+            </a:solidFill>
+          </a:ln>
+          <a:effectLst/>
+        </p:spPr>
+        <p:style>
+          <a:lnRef idx="1">
+            <a:schemeClr val="accent4"/>
+          </a:lnRef>
+          <a:fillRef idx="2">
+            <a:schemeClr val="accent4"/>
+          </a:fillRef>
+          <a:effectRef idx="1">
+            <a:schemeClr val="accent4"/>
+          </a:effectRef>
+          <a:fontRef idx="minor">
+            <a:schemeClr val="dk1"/>
+          </a:fontRef>
+        </p:style>
+        <p:txBody>
+          <a:bodyPr rtlCol="0" anchor="ctr"/>
+          <a:lstStyle/>
+          <a:p>
+            <a:pPr algn="ctr"/>
+            <a:r>
+              <a:rPr lang="en-US" sz="1050" dirty="0" smtClean="0">
+                <a:solidFill>
+                  <a:srgbClr val="7030A0"/>
+                </a:solidFill>
+              </a:rPr>
+              <a:t>Coverage</a:t>
+            </a:r>
+            <a:endParaRPr lang="en-SG" sz="1050" dirty="0">
+              <a:solidFill>
+                <a:srgbClr val="7030A0"/>
+              </a:solidFill>
+            </a:endParaRPr>
+          </a:p>
+        </p:txBody>
+      </p:sp>
+      <p:sp>
+        <p:nvSpPr>
+          <p:cNvPr id="116" name="Flowchart: Decision 96"/>
+          <p:cNvSpPr/>
+          <p:nvPr/>
+        </p:nvSpPr>
+        <p:spPr>
+          <a:xfrm>
+            <a:off x="4548244" y="5826558"/>
+            <a:ext cx="236048" cy="173380"/>
+          </a:xfrm>
+          <a:prstGeom prst="flowChartDecision">
+            <a:avLst/>
+          </a:prstGeom>
+          <a:solidFill>
+            <a:srgbClr val="7030A0"/>
+          </a:solidFill>
+          <a:ln w="19050">
+            <a:solidFill>
+              <a:srgbClr val="7030A0"/>
+            </a:solidFill>
+          </a:ln>
+          <a:effectLst/>
+        </p:spPr>
+        <p:style>
+          <a:lnRef idx="1">
+            <a:schemeClr val="accent6"/>
+          </a:lnRef>
+          <a:fillRef idx="2">
+            <a:schemeClr val="accent6"/>
+          </a:fillRef>
+          <a:effectRef idx="1">
+            <a:schemeClr val="accent6"/>
+          </a:effectRef>
+          <a:fontRef idx="minor">
+            <a:schemeClr val="dk1"/>
+          </a:fontRef>
+        </p:style>
+        <p:txBody>
+          <a:bodyPr rtlCol="0" anchor="ctr"/>
+          <a:lstStyle/>
+          <a:p>
+            <a:pPr algn="ctr"/>
+            <a:endParaRPr lang="en-US" sz="1050"/>
+          </a:p>
+        </p:txBody>
+      </p:sp>
+      <p:cxnSp>
+        <p:nvCxnSpPr>
+          <p:cNvPr id="117" name="Elbow Connector 97"/>
+          <p:cNvCxnSpPr/>
+          <p:nvPr/>
+        </p:nvCxnSpPr>
+        <p:spPr>
+          <a:xfrm rot="10800000">
+            <a:off x="4114801" y="5913248"/>
+            <a:ext cx="449929" cy="2401"/>
+          </a:xfrm>
+          <a:prstGeom prst="bentConnector3">
+            <a:avLst>
+              <a:gd name="adj1" fmla="val 50000"/>
+            </a:avLst>
+          </a:prstGeom>
+          <a:ln w="19050">
+            <a:solidFill>
+              <a:srgbClr val="7030A0"/>
+            </a:solidFill>
+            <a:headEnd type="none" w="med" len="med"/>
+            <a:tailEnd type="arrow" w="med" len="med"/>
+          </a:ln>
+          <a:effectLst/>
+        </p:spPr>
+        <p:style>
+          <a:lnRef idx="1">
+            <a:schemeClr val="accent2"/>
+          </a:lnRef>
+          <a:fillRef idx="2">
+            <a:schemeClr val="accent2"/>
+          </a:fillRef>
+          <a:effectRef idx="1">
+            <a:schemeClr val="accent2"/>
+          </a:effectRef>
+          <a:fontRef idx="minor">
+            <a:schemeClr val="dk1"/>
+          </a:fontRef>
+        </p:style>
+      </p:cxnSp>
+      <p:sp>
+        <p:nvSpPr>
+          <p:cNvPr id="121" name="Rectangle 8"/>
+          <p:cNvSpPr/>
+          <p:nvPr/>
+        </p:nvSpPr>
+        <p:spPr>
+          <a:xfrm>
+            <a:off x="2930768" y="5676258"/>
+            <a:ext cx="1179410" cy="473979"/>
+          </a:xfrm>
+          <a:prstGeom prst="rect">
+            <a:avLst/>
+          </a:prstGeom>
+          <a:ln w="19050">
+            <a:solidFill>
+              <a:srgbClr val="7030A0"/>
+            </a:solidFill>
+          </a:ln>
+          <a:effectLst/>
+        </p:spPr>
+        <p:style>
+          <a:lnRef idx="1">
+            <a:schemeClr val="accent4"/>
+          </a:lnRef>
+          <a:fillRef idx="2">
+            <a:schemeClr val="accent4"/>
+          </a:fillRef>
+          <a:effectRef idx="1">
+            <a:schemeClr val="accent4"/>
+          </a:effectRef>
+          <a:fontRef idx="minor">
+            <a:schemeClr val="dk1"/>
+          </a:fontRef>
+        </p:style>
+        <p:txBody>
+          <a:bodyPr rtlCol="0" anchor="ctr"/>
+          <a:lstStyle/>
+          <a:p>
+            <a:pPr algn="ctr"/>
+            <a:r>
+              <a:rPr lang="en-US" sz="1050" dirty="0" smtClean="0">
+                <a:solidFill>
+                  <a:srgbClr val="7030A0"/>
+                </a:solidFill>
+              </a:rPr>
+              <a:t>&lt;&lt;enumeration&gt;&gt;</a:t>
+            </a:r>
+          </a:p>
+          <a:p>
+            <a:pPr algn="ctr"/>
+            <a:r>
+              <a:rPr lang="en-US" sz="1050" dirty="0" smtClean="0">
+                <a:solidFill>
+                  <a:srgbClr val="7030A0"/>
+                </a:solidFill>
+              </a:rPr>
+              <a:t>Issue</a:t>
+            </a:r>
+            <a:endParaRPr lang="en-SG" sz="1050" dirty="0">
+              <a:solidFill>
+                <a:srgbClr val="7030A0"/>
+              </a:solidFill>
+            </a:endParaRPr>
+          </a:p>
+        </p:txBody>
+      </p:sp>
+      <p:sp>
+        <p:nvSpPr>
+          <p:cNvPr id="125" name="ZoneTexte 124"/>
+          <p:cNvSpPr txBox="1"/>
+          <p:nvPr/>
+        </p:nvSpPr>
+        <p:spPr>
+          <a:xfrm>
+            <a:off x="4148254" y="5688916"/>
+            <a:ext cx="242374" cy="230832"/>
+          </a:xfrm>
+          <a:prstGeom prst="rect">
+            <a:avLst/>
+          </a:prstGeom>
+          <a:noFill/>
+        </p:spPr>
+        <p:txBody>
+          <a:bodyPr wrap="none" rtlCol="0">
+            <a:spAutoFit/>
+          </a:bodyPr>
+          <a:lstStyle/>
+          <a:p>
+            <a:r>
+              <a:rPr lang="fr-FR" sz="900" dirty="0" smtClean="0">
+                <a:solidFill>
+                  <a:srgbClr val="7030A0"/>
+                </a:solidFill>
+              </a:rPr>
+              <a:t>*</a:t>
+            </a:r>
+            <a:endParaRPr lang="fr-FR" sz="900" dirty="0">
+              <a:solidFill>
+                <a:srgbClr val="7030A0"/>
+              </a:solidFill>
+            </a:endParaRPr>
+          </a:p>
+        </p:txBody>
+      </p:sp>
+      <p:sp>
+        <p:nvSpPr>
+          <p:cNvPr id="126" name="ZoneTexte 125"/>
+          <p:cNvSpPr txBox="1"/>
+          <p:nvPr/>
+        </p:nvSpPr>
+        <p:spPr>
+          <a:xfrm>
+            <a:off x="5549642" y="5128109"/>
+            <a:ext cx="242374" cy="230832"/>
+          </a:xfrm>
+          <a:prstGeom prst="rect">
+            <a:avLst/>
+          </a:prstGeom>
+          <a:noFill/>
+        </p:spPr>
+        <p:txBody>
+          <a:bodyPr wrap="none" rtlCol="0">
+            <a:spAutoFit/>
+          </a:bodyPr>
+          <a:lstStyle/>
+          <a:p>
+            <a:r>
+              <a:rPr lang="fr-FR" sz="900" dirty="0">
+                <a:solidFill>
+                  <a:srgbClr val="7030A0"/>
+                </a:solidFill>
+              </a:rPr>
+              <a:t>1</a:t>
+            </a:r>
+          </a:p>
+        </p:txBody>
+      </p:sp>
+      <p:sp>
+        <p:nvSpPr>
+          <p:cNvPr id="127" name="ZoneTexte 126"/>
+          <p:cNvSpPr txBox="1"/>
+          <p:nvPr/>
+        </p:nvSpPr>
+        <p:spPr>
+          <a:xfrm>
+            <a:off x="5563723" y="5688166"/>
+            <a:ext cx="242374" cy="230832"/>
+          </a:xfrm>
+          <a:prstGeom prst="rect">
+            <a:avLst/>
+          </a:prstGeom>
+          <a:noFill/>
+        </p:spPr>
+        <p:txBody>
+          <a:bodyPr wrap="none" rtlCol="0">
+            <a:spAutoFit/>
+          </a:bodyPr>
+          <a:lstStyle/>
+          <a:p>
+            <a:r>
+              <a:rPr lang="fr-FR" sz="900" dirty="0" smtClean="0">
+                <a:solidFill>
+                  <a:srgbClr val="7030A0"/>
+                </a:solidFill>
+              </a:rPr>
+              <a:t>1</a:t>
+            </a:r>
+            <a:endParaRPr lang="fr-FR" sz="900" dirty="0">
+              <a:solidFill>
+                <a:srgbClr val="7030A0"/>
+              </a:solidFill>
+            </a:endParaRPr>
+          </a:p>
+        </p:txBody>
+      </p:sp>
     </p:spTree>
     <p:extLst>
       <p:ext uri="{BB962C8B-B14F-4D97-AF65-F5344CB8AC3E}">

</xml_diff>

<commit_message>
DG and UG improvements (#274)
* Update developer guide and user guide

* Add to appendix F of DG

* Update documentation

* Fix checkstyle error

* Revert "Fix checkstyle error"

This reverts commit bb31698cd7b5e1cbd190ea98aa6e059aa97c71d1.

* Fix checkstyle error
</commit_message>
<xml_diff>
--- a/docs/diagrams/ModelComponentClassDiagram.pptx
+++ b/docs/diagrams/ModelComponentClassDiagram.pptx
@@ -109,7 +109,7 @@
   </p:defaultTextStyle>
   <p:extLst>
     <p:ext uri="{EFAFB233-063F-42B5-8137-9DF3F51BA10A}">
-      <p15:sldGuideLst xmlns="" xmlns:p15="http://schemas.microsoft.com/office/powerpoint/2012/main">
+      <p15:sldGuideLst xmlns:p15="http://schemas.microsoft.com/office/powerpoint/2012/main">
         <p15:guide id="1" orient="horz" pos="1488">
           <p15:clr>
             <a:srgbClr val="A4A3A4"/>
@@ -208,7 +208,7 @@
           <a:p>
             <a:fld id="{F5CC4B3F-88C1-4FFA-B1B6-F41C21DC6924}" type="datetimeFigureOut">
               <a:rPr lang="en-US" smtClean="0"/>
-              <a:t>4/4/2018</a:t>
+              <a:t>4/15/2018</a:t>
             </a:fld>
             <a:endParaRPr lang="en-US"/>
           </a:p>
@@ -654,7 +654,7 @@
           <a:p>
             <a:fld id="{78C97017-6FC3-485B-9764-EAC9E56C1D49}" type="datetimeFigureOut">
               <a:rPr lang="en-US" smtClean="0"/>
-              <a:t>4/4/2018</a:t>
+              <a:t>4/15/2018</a:t>
             </a:fld>
             <a:endParaRPr lang="en-US"/>
           </a:p>
@@ -822,7 +822,7 @@
           <a:p>
             <a:fld id="{78C97017-6FC3-485B-9764-EAC9E56C1D49}" type="datetimeFigureOut">
               <a:rPr lang="en-US" smtClean="0"/>
-              <a:t>4/4/2018</a:t>
+              <a:t>4/15/2018</a:t>
             </a:fld>
             <a:endParaRPr lang="en-US"/>
           </a:p>
@@ -1000,7 +1000,7 @@
           <a:p>
             <a:fld id="{78C97017-6FC3-485B-9764-EAC9E56C1D49}" type="datetimeFigureOut">
               <a:rPr lang="en-US" smtClean="0"/>
-              <a:t>4/4/2018</a:t>
+              <a:t>4/15/2018</a:t>
             </a:fld>
             <a:endParaRPr lang="en-US"/>
           </a:p>
@@ -1168,7 +1168,7 @@
           <a:p>
             <a:fld id="{78C97017-6FC3-485B-9764-EAC9E56C1D49}" type="datetimeFigureOut">
               <a:rPr lang="en-US" smtClean="0"/>
-              <a:t>4/4/2018</a:t>
+              <a:t>4/15/2018</a:t>
             </a:fld>
             <a:endParaRPr lang="en-US"/>
           </a:p>
@@ -1413,7 +1413,7 @@
           <a:p>
             <a:fld id="{78C97017-6FC3-485B-9764-EAC9E56C1D49}" type="datetimeFigureOut">
               <a:rPr lang="en-US" smtClean="0"/>
-              <a:t>4/4/2018</a:t>
+              <a:t>4/15/2018</a:t>
             </a:fld>
             <a:endParaRPr lang="en-US"/>
           </a:p>
@@ -1698,7 +1698,7 @@
           <a:p>
             <a:fld id="{78C97017-6FC3-485B-9764-EAC9E56C1D49}" type="datetimeFigureOut">
               <a:rPr lang="en-US" smtClean="0"/>
-              <a:t>4/4/2018</a:t>
+              <a:t>4/15/2018</a:t>
             </a:fld>
             <a:endParaRPr lang="en-US"/>
           </a:p>
@@ -2117,7 +2117,7 @@
           <a:p>
             <a:fld id="{78C97017-6FC3-485B-9764-EAC9E56C1D49}" type="datetimeFigureOut">
               <a:rPr lang="en-US" smtClean="0"/>
-              <a:t>4/4/2018</a:t>
+              <a:t>4/15/2018</a:t>
             </a:fld>
             <a:endParaRPr lang="en-US"/>
           </a:p>
@@ -2234,7 +2234,7 @@
           <a:p>
             <a:fld id="{78C97017-6FC3-485B-9764-EAC9E56C1D49}" type="datetimeFigureOut">
               <a:rPr lang="en-US" smtClean="0"/>
-              <a:t>4/4/2018</a:t>
+              <a:t>4/15/2018</a:t>
             </a:fld>
             <a:endParaRPr lang="en-US"/>
           </a:p>
@@ -2329,7 +2329,7 @@
           <a:p>
             <a:fld id="{78C97017-6FC3-485B-9764-EAC9E56C1D49}" type="datetimeFigureOut">
               <a:rPr lang="en-US" smtClean="0"/>
-              <a:t>4/4/2018</a:t>
+              <a:t>4/15/2018</a:t>
             </a:fld>
             <a:endParaRPr lang="en-US"/>
           </a:p>
@@ -2604,7 +2604,7 @@
           <a:p>
             <a:fld id="{78C97017-6FC3-485B-9764-EAC9E56C1D49}" type="datetimeFigureOut">
               <a:rPr lang="en-US" smtClean="0"/>
-              <a:t>4/4/2018</a:t>
+              <a:t>4/15/2018</a:t>
             </a:fld>
             <a:endParaRPr lang="en-US"/>
           </a:p>
@@ -2856,7 +2856,7 @@
           <a:p>
             <a:fld id="{78C97017-6FC3-485B-9764-EAC9E56C1D49}" type="datetimeFigureOut">
               <a:rPr lang="en-US" smtClean="0"/>
-              <a:t>4/4/2018</a:t>
+              <a:t>4/15/2018</a:t>
             </a:fld>
             <a:endParaRPr lang="en-US"/>
           </a:p>
@@ -3067,7 +3067,7 @@
           <a:p>
             <a:fld id="{78C97017-6FC3-485B-9764-EAC9E56C1D49}" type="datetimeFigureOut">
               <a:rPr lang="en-US" smtClean="0"/>
-              <a:t>4/4/2018</a:t>
+              <a:t>4/15/2018</a:t>
             </a:fld>
             <a:endParaRPr lang="en-US"/>
           </a:p>
@@ -3450,8 +3450,8 @@
         </p:nvSpPr>
         <p:spPr>
           <a:xfrm>
-            <a:off x="1119865" y="1727200"/>
-            <a:ext cx="7490735" cy="3225800"/>
+            <a:off x="1119865" y="1459240"/>
+            <a:ext cx="7795535" cy="3493760"/>
           </a:xfrm>
           <a:prstGeom prst="roundRect">
             <a:avLst>
@@ -4629,8 +4629,8 @@
         </p:nvSpPr>
         <p:spPr>
           <a:xfrm>
-            <a:off x="7696805" y="2255953"/>
-            <a:ext cx="822002" cy="285783"/>
+            <a:off x="7696804" y="2255953"/>
+            <a:ext cx="1049049" cy="285783"/>
           </a:xfrm>
           <a:prstGeom prst="rect">
             <a:avLst/>
@@ -4662,12 +4662,12 @@
           <a:p>
             <a:pPr algn="ctr"/>
             <a:r>
-              <a:rPr lang="en-US" sz="1050" dirty="0">
+              <a:rPr lang="en-US" sz="1050" dirty="0" err="1">
                 <a:solidFill>
                   <a:srgbClr val="7030A0"/>
                 </a:solidFill>
               </a:rPr>
-              <a:t>Priority</a:t>
+              <a:t>updatedPriority</a:t>
             </a:r>
             <a:endParaRPr lang="en-SG" sz="1050" dirty="0">
               <a:solidFill>
@@ -4728,6 +4728,7 @@
         <p:nvCxnSpPr>
           <p:cNvPr id="79" name="Elbow Connector 78"/>
           <p:cNvCxnSpPr>
+            <a:cxnSpLocks/>
             <a:stCxn id="78" idx="3"/>
             <a:endCxn id="76" idx="1"/>
           </p:cNvCxnSpPr>
@@ -4736,7 +4737,7 @@
         <p:spPr>
           <a:xfrm flipV="1">
             <a:off x="7277995" y="2398845"/>
-            <a:ext cx="418810" cy="636046"/>
+            <a:ext cx="418809" cy="636046"/>
           </a:xfrm>
           <a:prstGeom prst="bentConnector3">
             <a:avLst/>
@@ -4774,7 +4775,7 @@
         <p:spPr>
           <a:xfrm>
             <a:off x="7702537" y="2574182"/>
-            <a:ext cx="822002" cy="285783"/>
+            <a:ext cx="1043316" cy="285783"/>
           </a:xfrm>
           <a:prstGeom prst="rect">
             <a:avLst/>
@@ -4825,6 +4826,7 @@
         <p:nvCxnSpPr>
           <p:cNvPr id="81" name="Elbow Connector 80"/>
           <p:cNvCxnSpPr>
+            <a:cxnSpLocks/>
             <a:stCxn id="78" idx="3"/>
             <a:endCxn id="80" idx="1"/>
           </p:cNvCxnSpPr>
@@ -4871,7 +4873,7 @@
         <p:spPr>
           <a:xfrm>
             <a:off x="7702537" y="2897160"/>
-            <a:ext cx="822002" cy="285783"/>
+            <a:ext cx="1043316" cy="285783"/>
           </a:xfrm>
           <a:prstGeom prst="rect">
             <a:avLst/>
@@ -4922,6 +4924,7 @@
         <p:nvCxnSpPr>
           <p:cNvPr id="84" name="Elbow Connector 83"/>
           <p:cNvCxnSpPr>
+            <a:cxnSpLocks/>
             <a:stCxn id="78" idx="3"/>
             <a:endCxn id="83" idx="1"/>
           </p:cNvCxnSpPr>
@@ -4968,7 +4971,7 @@
         <p:spPr>
           <a:xfrm>
             <a:off x="7702536" y="3220137"/>
-            <a:ext cx="822003" cy="285783"/>
+            <a:ext cx="1043317" cy="285783"/>
           </a:xfrm>
           <a:prstGeom prst="rect">
             <a:avLst/>
@@ -5019,6 +5022,7 @@
         <p:nvCxnSpPr>
           <p:cNvPr id="86" name="Elbow Connector 85"/>
           <p:cNvCxnSpPr>
+            <a:cxnSpLocks/>
             <a:stCxn id="78" idx="3"/>
             <a:endCxn id="85" idx="1"/>
           </p:cNvCxnSpPr>
@@ -5304,14 +5308,6 @@
                 </a:solidFill>
               </a:rPr>
               <a:t>&lt;&lt;interface&gt;&gt;</a:t>
-            </a:r>
-            <a:r>
-              <a:rPr lang="en-US" sz="1050">
-                <a:solidFill>
-                  <a:srgbClr val="7030A0"/>
-                </a:solidFill>
-              </a:rPr>
-              <a:t/>
             </a:r>
             <a:br>
               <a:rPr lang="en-US" sz="1050">
@@ -5740,7 +5736,7 @@
         <p:spPr>
           <a:xfrm>
             <a:off x="7702537" y="3541208"/>
-            <a:ext cx="822002" cy="285783"/>
+            <a:ext cx="1043316" cy="285783"/>
           </a:xfrm>
           <a:prstGeom prst="rect">
             <a:avLst/>
@@ -5795,8 +5791,8 @@
         </p:nvSpPr>
         <p:spPr>
           <a:xfrm>
-            <a:off x="7704269" y="1937725"/>
-            <a:ext cx="822002" cy="285783"/>
+            <a:off x="7704268" y="1937725"/>
+            <a:ext cx="1041585" cy="285783"/>
           </a:xfrm>
           <a:prstGeom prst="rect">
             <a:avLst/>
@@ -5828,12 +5824,12 @@
           <a:p>
             <a:pPr algn="ctr"/>
             <a:r>
-              <a:rPr lang="en-US" sz="1050" dirty="0">
+              <a:rPr lang="en-US" sz="1050" dirty="0" err="1">
                 <a:solidFill>
                   <a:srgbClr val="7030A0"/>
                 </a:solidFill>
               </a:rPr>
-              <a:t>Name</a:t>
+              <a:t>basePriority</a:t>
             </a:r>
             <a:endParaRPr lang="en-SG" sz="1050" dirty="0">
               <a:solidFill>
@@ -5889,13 +5885,13 @@
         <p:nvCxnSpPr>
           <p:cNvPr id="72" name="Elbow Connector 71"/>
           <p:cNvCxnSpPr>
-            <a:endCxn id="53" idx="1"/>
+            <a:cxnSpLocks/>
           </p:cNvCxnSpPr>
           <p:nvPr/>
         </p:nvCxnSpPr>
         <p:spPr>
           <a:xfrm rot="5400000" flipH="1" flipV="1">
-            <a:off x="7438062" y="2127889"/>
+            <a:off x="7438063" y="2127889"/>
             <a:ext cx="313478" cy="218935"/>
           </a:xfrm>
           <a:prstGeom prst="bentConnector2">
@@ -5934,7 +5930,7 @@
         <p:spPr>
           <a:xfrm>
             <a:off x="7704269" y="3865644"/>
-            <a:ext cx="822002" cy="285783"/>
+            <a:ext cx="1043316" cy="285783"/>
           </a:xfrm>
           <a:prstGeom prst="rect">
             <a:avLst/>
@@ -6024,7 +6020,7 @@
           <p:cNvPr id="74" name="Rectangle 8">
             <a:extLst>
               <a:ext uri="{FF2B5EF4-FFF2-40B4-BE49-F238E27FC236}">
-                <a16:creationId xmlns="" xmlns:a16="http://schemas.microsoft.com/office/drawing/2014/main" id="{D1EA267A-1EFE-4F58-9EFF-6A0405CC6ADE}"/>
+                <a16:creationId xmlns:a16="http://schemas.microsoft.com/office/drawing/2014/main" id="{D1EA267A-1EFE-4F58-9EFF-6A0405CC6ADE}"/>
               </a:ext>
             </a:extLst>
           </p:cNvPr>
@@ -6034,7 +6030,7 @@
         <p:spPr>
           <a:xfrm>
             <a:off x="7704269" y="4190571"/>
-            <a:ext cx="822002" cy="285783"/>
+            <a:ext cx="1043316" cy="285783"/>
           </a:xfrm>
           <a:prstGeom prst="rect">
             <a:avLst/>
@@ -6086,7 +6082,7 @@
           <p:cNvPr id="77" name="Elbow Connector 72">
             <a:extLst>
               <a:ext uri="{FF2B5EF4-FFF2-40B4-BE49-F238E27FC236}">
-                <a16:creationId xmlns="" xmlns:a16="http://schemas.microsoft.com/office/drawing/2014/main" id="{8AE386F3-2DFC-4117-9793-35573E1679BB}"/>
+                <a16:creationId xmlns:a16="http://schemas.microsoft.com/office/drawing/2014/main" id="{8AE386F3-2DFC-4117-9793-35573E1679BB}"/>
               </a:ext>
             </a:extLst>
           </p:cNvPr>
@@ -6169,7 +6165,7 @@
           <a:p>
             <a:pPr algn="ctr"/>
             <a:r>
-              <a:rPr lang="en-US" sz="1050" dirty="0" smtClean="0">
+              <a:rPr lang="en-US" sz="1050" dirty="0">
                 <a:solidFill>
                   <a:srgbClr val="7030A0"/>
                 </a:solidFill>
@@ -6189,7 +6185,7 @@
           <p:cNvPr id="87" name="Elbow Connector 72">
             <a:extLst>
               <a:ext uri="{FF2B5EF4-FFF2-40B4-BE49-F238E27FC236}">
-                <a16:creationId xmlns="" xmlns:a16="http://schemas.microsoft.com/office/drawing/2014/main" id="{8AE386F3-2DFC-4117-9793-35573E1679BB}"/>
+                <a16:creationId xmlns:a16="http://schemas.microsoft.com/office/drawing/2014/main" id="{8AE386F3-2DFC-4117-9793-35573E1679BB}"/>
               </a:ext>
             </a:extLst>
           </p:cNvPr>
@@ -6273,7 +6269,7 @@
           <a:p>
             <a:pPr algn="ctr"/>
             <a:r>
-              <a:rPr lang="en-US" sz="1050" dirty="0" err="1" smtClean="0">
+              <a:rPr lang="en-US" sz="1050" dirty="0" err="1">
                 <a:solidFill>
                   <a:srgbClr val="7030A0"/>
                 </a:solidFill>
@@ -6534,7 +6530,7 @@
           <a:p>
             <a:pPr algn="ctr"/>
             <a:r>
-              <a:rPr lang="en-US" sz="1050" dirty="0" err="1" smtClean="0">
+              <a:rPr lang="en-US" sz="1050" dirty="0" err="1">
                 <a:solidFill>
                   <a:srgbClr val="7030A0"/>
                 </a:solidFill>
@@ -6680,6 +6676,220 @@
             <a:endParaRPr lang="en-SG" sz="1050" b="1">
               <a:solidFill>
                 <a:srgbClr val="92D050"/>
+              </a:solidFill>
+            </a:endParaRPr>
+          </a:p>
+        </p:txBody>
+      </p:sp>
+      <p:cxnSp>
+        <p:nvCxnSpPr>
+          <p:cNvPr id="101" name="Elbow Connector 71">
+            <a:extLst>
+              <a:ext uri="{FF2B5EF4-FFF2-40B4-BE49-F238E27FC236}">
+                <a16:creationId xmlns:a16="http://schemas.microsoft.com/office/drawing/2014/main" id="{3274DDA3-AD47-418D-A302-813ABFFB2404}"/>
+              </a:ext>
+            </a:extLst>
+          </p:cNvPr>
+          <p:cNvCxnSpPr>
+            <a:cxnSpLocks/>
+          </p:cNvCxnSpPr>
+          <p:nvPr/>
+        </p:nvCxnSpPr>
+        <p:spPr>
+          <a:xfrm rot="16200000" flipH="1">
+            <a:off x="7438062" y="4374550"/>
+            <a:ext cx="313478" cy="218935"/>
+          </a:xfrm>
+          <a:prstGeom prst="bentConnector2">
+            <a:avLst/>
+          </a:prstGeom>
+          <a:ln w="19050">
+            <a:solidFill>
+              <a:srgbClr val="7030A0"/>
+            </a:solidFill>
+            <a:headEnd type="none" w="med" len="med"/>
+            <a:tailEnd type="arrow" w="med" len="med"/>
+          </a:ln>
+          <a:effectLst/>
+        </p:spPr>
+        <p:style>
+          <a:lnRef idx="1">
+            <a:schemeClr val="accent2"/>
+          </a:lnRef>
+          <a:fillRef idx="2">
+            <a:schemeClr val="accent2"/>
+          </a:fillRef>
+          <a:effectRef idx="1">
+            <a:schemeClr val="accent2"/>
+          </a:effectRef>
+          <a:fontRef idx="minor">
+            <a:schemeClr val="dk1"/>
+          </a:fontRef>
+        </p:style>
+      </p:cxnSp>
+      <p:cxnSp>
+        <p:nvCxnSpPr>
+          <p:cNvPr id="102" name="Elbow Connector 71">
+            <a:extLst>
+              <a:ext uri="{FF2B5EF4-FFF2-40B4-BE49-F238E27FC236}">
+                <a16:creationId xmlns:a16="http://schemas.microsoft.com/office/drawing/2014/main" id="{852FC246-9FB2-4D86-87FF-20537531B1C0}"/>
+              </a:ext>
+            </a:extLst>
+          </p:cNvPr>
+          <p:cNvCxnSpPr/>
+          <p:nvPr/>
+        </p:nvCxnSpPr>
+        <p:spPr>
+          <a:xfrm rot="5400000" flipH="1" flipV="1">
+            <a:off x="7438063" y="1822911"/>
+            <a:ext cx="313478" cy="218935"/>
+          </a:xfrm>
+          <a:prstGeom prst="bentConnector2">
+            <a:avLst/>
+          </a:prstGeom>
+          <a:ln w="19050">
+            <a:solidFill>
+              <a:srgbClr val="7030A0"/>
+            </a:solidFill>
+            <a:headEnd type="none" w="med" len="med"/>
+            <a:tailEnd type="arrow" w="med" len="med"/>
+          </a:ln>
+          <a:effectLst/>
+        </p:spPr>
+        <p:style>
+          <a:lnRef idx="1">
+            <a:schemeClr val="accent2"/>
+          </a:lnRef>
+          <a:fillRef idx="2">
+            <a:schemeClr val="accent2"/>
+          </a:fillRef>
+          <a:effectRef idx="1">
+            <a:schemeClr val="accent2"/>
+          </a:effectRef>
+          <a:fontRef idx="minor">
+            <a:schemeClr val="dk1"/>
+          </a:fontRef>
+        </p:style>
+      </p:cxnSp>
+      <p:sp>
+        <p:nvSpPr>
+          <p:cNvPr id="103" name="Rectangle 8">
+            <a:extLst>
+              <a:ext uri="{FF2B5EF4-FFF2-40B4-BE49-F238E27FC236}">
+                <a16:creationId xmlns:a16="http://schemas.microsoft.com/office/drawing/2014/main" id="{7B509C9C-C2FA-497D-A625-A4E9301C9224}"/>
+              </a:ext>
+            </a:extLst>
+          </p:cNvPr>
+          <p:cNvSpPr/>
+          <p:nvPr/>
+        </p:nvSpPr>
+        <p:spPr>
+          <a:xfrm>
+            <a:off x="7696805" y="1615437"/>
+            <a:ext cx="1049048" cy="285783"/>
+          </a:xfrm>
+          <a:prstGeom prst="rect">
+            <a:avLst/>
+          </a:prstGeom>
+          <a:ln w="19050">
+            <a:solidFill>
+              <a:srgbClr val="7030A0"/>
+            </a:solidFill>
+          </a:ln>
+          <a:effectLst/>
+        </p:spPr>
+        <p:style>
+          <a:lnRef idx="1">
+            <a:schemeClr val="accent4"/>
+          </a:lnRef>
+          <a:fillRef idx="2">
+            <a:schemeClr val="accent4"/>
+          </a:fillRef>
+          <a:effectRef idx="1">
+            <a:schemeClr val="accent4"/>
+          </a:effectRef>
+          <a:fontRef idx="minor">
+            <a:schemeClr val="dk1"/>
+          </a:fontRef>
+        </p:style>
+        <p:txBody>
+          <a:bodyPr rtlCol="0" anchor="ctr"/>
+          <a:lstStyle/>
+          <a:p>
+            <a:pPr algn="ctr"/>
+            <a:r>
+              <a:rPr lang="en-US" sz="1050" dirty="0">
+                <a:solidFill>
+                  <a:srgbClr val="7030A0"/>
+                </a:solidFill>
+              </a:rPr>
+              <a:t>Name</a:t>
+            </a:r>
+            <a:endParaRPr lang="en-SG" sz="1050" dirty="0">
+              <a:solidFill>
+                <a:srgbClr val="7030A0"/>
+              </a:solidFill>
+            </a:endParaRPr>
+          </a:p>
+        </p:txBody>
+      </p:sp>
+      <p:sp>
+        <p:nvSpPr>
+          <p:cNvPr id="104" name="Rectangle 8">
+            <a:extLst>
+              <a:ext uri="{FF2B5EF4-FFF2-40B4-BE49-F238E27FC236}">
+                <a16:creationId xmlns:a16="http://schemas.microsoft.com/office/drawing/2014/main" id="{0EE57B67-D2F3-436C-9ABF-1A85CE50B785}"/>
+              </a:ext>
+            </a:extLst>
+          </p:cNvPr>
+          <p:cNvSpPr/>
+          <p:nvPr/>
+        </p:nvSpPr>
+        <p:spPr>
+          <a:xfrm>
+            <a:off x="7704267" y="4522369"/>
+            <a:ext cx="1041585" cy="285783"/>
+          </a:xfrm>
+          <a:prstGeom prst="rect">
+            <a:avLst/>
+          </a:prstGeom>
+          <a:ln w="19050">
+            <a:solidFill>
+              <a:srgbClr val="7030A0"/>
+            </a:solidFill>
+          </a:ln>
+          <a:effectLst/>
+        </p:spPr>
+        <p:style>
+          <a:lnRef idx="1">
+            <a:schemeClr val="accent4"/>
+          </a:lnRef>
+          <a:fillRef idx="2">
+            <a:schemeClr val="accent4"/>
+          </a:fillRef>
+          <a:effectRef idx="1">
+            <a:schemeClr val="accent4"/>
+          </a:effectRef>
+          <a:fontRef idx="minor">
+            <a:schemeClr val="dk1"/>
+          </a:fontRef>
+        </p:style>
+        <p:txBody>
+          <a:bodyPr rtlCol="0" anchor="ctr"/>
+          <a:lstStyle/>
+          <a:p>
+            <a:pPr algn="ctr"/>
+            <a:r>
+              <a:rPr lang="en-US" sz="1050" dirty="0">
+                <a:solidFill>
+                  <a:srgbClr val="7030A0"/>
+                </a:solidFill>
+              </a:rPr>
+              <a:t>Recurrence</a:t>
+            </a:r>
+            <a:endParaRPr lang="en-SG" sz="1050" dirty="0">
+              <a:solidFill>
+                <a:srgbClr val="7030A0"/>
               </a:solidFill>
             </a:endParaRPr>
           </a:p>

</xml_diff>